<commit_message>
Update slides wrt Methods/Exploratory Analysis/Models & Algs
Update slides wrt Methods/Exploratory Analysis/Models & Algs
</commit_message>
<xml_diff>
--- a/infographic.pptx
+++ b/infographic.pptx
@@ -1,19 +1,30 @@
 
 <file path=ppt/presentation.xml><?xml version="1.0" encoding="utf-8"?>
-<p:presentation xmlns:a="http://schemas.openxmlformats.org/drawingml/2006/main" xmlns:r="http://schemas.openxmlformats.org/officeDocument/2006/relationships" xmlns:p="http://schemas.openxmlformats.org/presentationml/2006/main" saveSubsetFonts="1">
+<p:presentation xmlns:a="http://schemas.openxmlformats.org/drawingml/2006/main" xmlns:r="http://schemas.openxmlformats.org/officeDocument/2006/relationships" xmlns:p="http://schemas.openxmlformats.org/presentationml/2006/main" showSpecialPlsOnTitleSld="0" saveSubsetFonts="1">
   <p:sldMasterIdLst>
     <p:sldMasterId id="2147483648" r:id="rId1"/>
   </p:sldMasterIdLst>
+  <p:notesMasterIdLst>
+    <p:notesMasterId r:id="rId19"/>
+  </p:notesMasterIdLst>
   <p:sldIdLst>
     <p:sldId id="257" r:id="rId2"/>
     <p:sldId id="258" r:id="rId3"/>
     <p:sldId id="262" r:id="rId4"/>
     <p:sldId id="259" r:id="rId5"/>
     <p:sldId id="264" r:id="rId6"/>
-    <p:sldId id="263" r:id="rId7"/>
-    <p:sldId id="260" r:id="rId8"/>
-    <p:sldId id="256" r:id="rId9"/>
-    <p:sldId id="261" r:id="rId10"/>
+    <p:sldId id="273" r:id="rId7"/>
+    <p:sldId id="274" r:id="rId8"/>
+    <p:sldId id="260" r:id="rId9"/>
+    <p:sldId id="268" r:id="rId10"/>
+    <p:sldId id="269" r:id="rId11"/>
+    <p:sldId id="270" r:id="rId12"/>
+    <p:sldId id="271" r:id="rId13"/>
+    <p:sldId id="275" r:id="rId14"/>
+    <p:sldId id="277" r:id="rId15"/>
+    <p:sldId id="278" r:id="rId16"/>
+    <p:sldId id="256" r:id="rId17"/>
+    <p:sldId id="261" r:id="rId18"/>
   </p:sldIdLst>
   <p:sldSz cx="12192000" cy="6858000"/>
   <p:notesSz cx="6858000" cy="9144000"/>
@@ -114,10 +125,360 @@
   </p:defaultTextStyle>
   <p:extLst>
     <p:ext uri="{EFAFB233-063F-42B5-8137-9DF3F51BA10A}">
-      <p15:sldGuideLst xmlns:p15="http://schemas.microsoft.com/office/powerpoint/2012/main"/>
+      <p15:sldGuideLst xmlns="" xmlns:p15="http://schemas.microsoft.com/office/powerpoint/2012/main"/>
     </p:ext>
   </p:extLst>
 </p:presentation>
+</file>
+
+<file path=ppt/notesMasters/notesMaster1.xml><?xml version="1.0" encoding="utf-8"?>
+<p:notesMaster xmlns:a="http://schemas.openxmlformats.org/drawingml/2006/main" xmlns:r="http://schemas.openxmlformats.org/officeDocument/2006/relationships" xmlns:p="http://schemas.openxmlformats.org/presentationml/2006/main">
+  <p:cSld>
+    <p:bg>
+      <p:bgRef idx="1001">
+        <a:schemeClr val="bg1"/>
+      </p:bgRef>
+    </p:bg>
+    <p:spTree>
+      <p:nvGrpSpPr>
+        <p:cNvPr id="1" name=""/>
+        <p:cNvGrpSpPr/>
+        <p:nvPr/>
+      </p:nvGrpSpPr>
+      <p:grpSpPr>
+        <a:xfrm>
+          <a:off x="0" y="0"/>
+          <a:ext cx="0" cy="0"/>
+          <a:chOff x="0" y="0"/>
+          <a:chExt cx="0" cy="0"/>
+        </a:xfrm>
+      </p:grpSpPr>
+      <p:sp>
+        <p:nvSpPr>
+          <p:cNvPr id="2" name="Header Placeholder 1"/>
+          <p:cNvSpPr>
+            <a:spLocks noGrp="1"/>
+          </p:cNvSpPr>
+          <p:nvPr>
+            <p:ph type="hdr" sz="quarter"/>
+          </p:nvPr>
+        </p:nvSpPr>
+        <p:spPr>
+          <a:xfrm>
+            <a:off x="0" y="0"/>
+            <a:ext cx="2971800" cy="457200"/>
+          </a:xfrm>
+          <a:prstGeom prst="rect">
+            <a:avLst/>
+          </a:prstGeom>
+        </p:spPr>
+        <p:txBody>
+          <a:bodyPr vert="horz" lIns="91440" tIns="45720" rIns="91440" bIns="45720" rtlCol="0"/>
+          <a:lstStyle>
+            <a:lvl1pPr algn="l">
+              <a:defRPr sz="1200"/>
+            </a:lvl1pPr>
+          </a:lstStyle>
+          <a:p>
+            <a:endParaRPr lang="en-US"/>
+          </a:p>
+        </p:txBody>
+      </p:sp>
+      <p:sp>
+        <p:nvSpPr>
+          <p:cNvPr id="3" name="Date Placeholder 2"/>
+          <p:cNvSpPr>
+            <a:spLocks noGrp="1"/>
+          </p:cNvSpPr>
+          <p:nvPr>
+            <p:ph type="dt" idx="1"/>
+          </p:nvPr>
+        </p:nvSpPr>
+        <p:spPr>
+          <a:xfrm>
+            <a:off x="3884613" y="0"/>
+            <a:ext cx="2971800" cy="457200"/>
+          </a:xfrm>
+          <a:prstGeom prst="rect">
+            <a:avLst/>
+          </a:prstGeom>
+        </p:spPr>
+        <p:txBody>
+          <a:bodyPr vert="horz" lIns="91440" tIns="45720" rIns="91440" bIns="45720" rtlCol="0"/>
+          <a:lstStyle>
+            <a:lvl1pPr algn="r">
+              <a:defRPr sz="1200"/>
+            </a:lvl1pPr>
+          </a:lstStyle>
+          <a:p>
+            <a:fld id="{E3A6CB1D-A3B7-434B-ABB5-99D9CB0EF729}" type="datetimeFigureOut">
+              <a:rPr lang="en-US" smtClean="0"/>
+              <a:t>7/4/2017</a:t>
+            </a:fld>
+            <a:endParaRPr lang="en-US"/>
+          </a:p>
+        </p:txBody>
+      </p:sp>
+      <p:sp>
+        <p:nvSpPr>
+          <p:cNvPr id="4" name="Slide Image Placeholder 3"/>
+          <p:cNvSpPr>
+            <a:spLocks noGrp="1" noRot="1" noChangeAspect="1"/>
+          </p:cNvSpPr>
+          <p:nvPr>
+            <p:ph type="sldImg" idx="2"/>
+          </p:nvPr>
+        </p:nvSpPr>
+        <p:spPr>
+          <a:xfrm>
+            <a:off x="381000" y="685800"/>
+            <a:ext cx="6096000" cy="3429000"/>
+          </a:xfrm>
+          <a:prstGeom prst="rect">
+            <a:avLst/>
+          </a:prstGeom>
+          <a:noFill/>
+          <a:ln w="12700">
+            <a:solidFill>
+              <a:prstClr val="black"/>
+            </a:solidFill>
+          </a:ln>
+        </p:spPr>
+        <p:txBody>
+          <a:bodyPr vert="horz" lIns="91440" tIns="45720" rIns="91440" bIns="45720" rtlCol="0" anchor="ctr"/>
+          <a:lstStyle/>
+          <a:p>
+            <a:endParaRPr lang="en-US"/>
+          </a:p>
+        </p:txBody>
+      </p:sp>
+      <p:sp>
+        <p:nvSpPr>
+          <p:cNvPr id="5" name="Notes Placeholder 4"/>
+          <p:cNvSpPr>
+            <a:spLocks noGrp="1"/>
+          </p:cNvSpPr>
+          <p:nvPr>
+            <p:ph type="body" sz="quarter" idx="3"/>
+          </p:nvPr>
+        </p:nvSpPr>
+        <p:spPr>
+          <a:xfrm>
+            <a:off x="685800" y="4343400"/>
+            <a:ext cx="5486400" cy="4114800"/>
+          </a:xfrm>
+          <a:prstGeom prst="rect">
+            <a:avLst/>
+          </a:prstGeom>
+        </p:spPr>
+        <p:txBody>
+          <a:bodyPr vert="horz" lIns="91440" tIns="45720" rIns="91440" bIns="45720" rtlCol="0"/>
+          <a:lstStyle/>
+          <a:p>
+            <a:pPr lvl="0"/>
+            <a:r>
+              <a:rPr lang="en-US" smtClean="0"/>
+              <a:t>Click to edit Master text styles</a:t>
+            </a:r>
+          </a:p>
+          <a:p>
+            <a:pPr lvl="1"/>
+            <a:r>
+              <a:rPr lang="en-US" smtClean="0"/>
+              <a:t>Second level</a:t>
+            </a:r>
+          </a:p>
+          <a:p>
+            <a:pPr lvl="2"/>
+            <a:r>
+              <a:rPr lang="en-US" smtClean="0"/>
+              <a:t>Third level</a:t>
+            </a:r>
+          </a:p>
+          <a:p>
+            <a:pPr lvl="3"/>
+            <a:r>
+              <a:rPr lang="en-US" smtClean="0"/>
+              <a:t>Fourth level</a:t>
+            </a:r>
+          </a:p>
+          <a:p>
+            <a:pPr lvl="4"/>
+            <a:r>
+              <a:rPr lang="en-US" smtClean="0"/>
+              <a:t>Fifth level</a:t>
+            </a:r>
+            <a:endParaRPr lang="en-US"/>
+          </a:p>
+        </p:txBody>
+      </p:sp>
+      <p:sp>
+        <p:nvSpPr>
+          <p:cNvPr id="6" name="Footer Placeholder 5"/>
+          <p:cNvSpPr>
+            <a:spLocks noGrp="1"/>
+          </p:cNvSpPr>
+          <p:nvPr>
+            <p:ph type="ftr" sz="quarter" idx="4"/>
+          </p:nvPr>
+        </p:nvSpPr>
+        <p:spPr>
+          <a:xfrm>
+            <a:off x="0" y="8685213"/>
+            <a:ext cx="2971800" cy="457200"/>
+          </a:xfrm>
+          <a:prstGeom prst="rect">
+            <a:avLst/>
+          </a:prstGeom>
+        </p:spPr>
+        <p:txBody>
+          <a:bodyPr vert="horz" lIns="91440" tIns="45720" rIns="91440" bIns="45720" rtlCol="0" anchor="b"/>
+          <a:lstStyle>
+            <a:lvl1pPr algn="l">
+              <a:defRPr sz="1200"/>
+            </a:lvl1pPr>
+          </a:lstStyle>
+          <a:p>
+            <a:endParaRPr lang="en-US"/>
+          </a:p>
+        </p:txBody>
+      </p:sp>
+      <p:sp>
+        <p:nvSpPr>
+          <p:cNvPr id="7" name="Slide Number Placeholder 6"/>
+          <p:cNvSpPr>
+            <a:spLocks noGrp="1"/>
+          </p:cNvSpPr>
+          <p:nvPr>
+            <p:ph type="sldNum" sz="quarter" idx="5"/>
+          </p:nvPr>
+        </p:nvSpPr>
+        <p:spPr>
+          <a:xfrm>
+            <a:off x="3884613" y="8685213"/>
+            <a:ext cx="2971800" cy="457200"/>
+          </a:xfrm>
+          <a:prstGeom prst="rect">
+            <a:avLst/>
+          </a:prstGeom>
+        </p:spPr>
+        <p:txBody>
+          <a:bodyPr vert="horz" lIns="91440" tIns="45720" rIns="91440" bIns="45720" rtlCol="0" anchor="b"/>
+          <a:lstStyle>
+            <a:lvl1pPr algn="r">
+              <a:defRPr sz="1200"/>
+            </a:lvl1pPr>
+          </a:lstStyle>
+          <a:p>
+            <a:fld id="{BE9E425B-2894-4318-AA7F-42BC23137CA4}" type="slidenum">
+              <a:rPr lang="en-US" smtClean="0"/>
+              <a:t>‹#›</a:t>
+            </a:fld>
+            <a:endParaRPr lang="en-US"/>
+          </a:p>
+        </p:txBody>
+      </p:sp>
+    </p:spTree>
+    <p:extLst>
+      <p:ext uri="{BB962C8B-B14F-4D97-AF65-F5344CB8AC3E}">
+        <p14:creationId xmlns:p14="http://schemas.microsoft.com/office/powerpoint/2010/main" val="3642874154"/>
+      </p:ext>
+    </p:extLst>
+  </p:cSld>
+  <p:clrMap bg1="lt1" tx1="dk1" bg2="lt2" tx2="dk2" accent1="accent1" accent2="accent2" accent3="accent3" accent4="accent4" accent5="accent5" accent6="accent6" hlink="hlink" folHlink="folHlink"/>
+  <p:notesStyle>
+    <a:lvl1pPr marL="0" algn="l" defTabSz="914400" rtl="0" eaLnBrk="1" latinLnBrk="0" hangingPunct="1">
+      <a:defRPr sz="1200" kern="1200">
+        <a:solidFill>
+          <a:schemeClr val="tx1"/>
+        </a:solidFill>
+        <a:latin typeface="+mn-lt"/>
+        <a:ea typeface="+mn-ea"/>
+        <a:cs typeface="+mn-cs"/>
+      </a:defRPr>
+    </a:lvl1pPr>
+    <a:lvl2pPr marL="457200" algn="l" defTabSz="914400" rtl="0" eaLnBrk="1" latinLnBrk="0" hangingPunct="1">
+      <a:defRPr sz="1200" kern="1200">
+        <a:solidFill>
+          <a:schemeClr val="tx1"/>
+        </a:solidFill>
+        <a:latin typeface="+mn-lt"/>
+        <a:ea typeface="+mn-ea"/>
+        <a:cs typeface="+mn-cs"/>
+      </a:defRPr>
+    </a:lvl2pPr>
+    <a:lvl3pPr marL="914400" algn="l" defTabSz="914400" rtl="0" eaLnBrk="1" latinLnBrk="0" hangingPunct="1">
+      <a:defRPr sz="1200" kern="1200">
+        <a:solidFill>
+          <a:schemeClr val="tx1"/>
+        </a:solidFill>
+        <a:latin typeface="+mn-lt"/>
+        <a:ea typeface="+mn-ea"/>
+        <a:cs typeface="+mn-cs"/>
+      </a:defRPr>
+    </a:lvl3pPr>
+    <a:lvl4pPr marL="1371600" algn="l" defTabSz="914400" rtl="0" eaLnBrk="1" latinLnBrk="0" hangingPunct="1">
+      <a:defRPr sz="1200" kern="1200">
+        <a:solidFill>
+          <a:schemeClr val="tx1"/>
+        </a:solidFill>
+        <a:latin typeface="+mn-lt"/>
+        <a:ea typeface="+mn-ea"/>
+        <a:cs typeface="+mn-cs"/>
+      </a:defRPr>
+    </a:lvl4pPr>
+    <a:lvl5pPr marL="1828800" algn="l" defTabSz="914400" rtl="0" eaLnBrk="1" latinLnBrk="0" hangingPunct="1">
+      <a:defRPr sz="1200" kern="1200">
+        <a:solidFill>
+          <a:schemeClr val="tx1"/>
+        </a:solidFill>
+        <a:latin typeface="+mn-lt"/>
+        <a:ea typeface="+mn-ea"/>
+        <a:cs typeface="+mn-cs"/>
+      </a:defRPr>
+    </a:lvl5pPr>
+    <a:lvl6pPr marL="2286000" algn="l" defTabSz="914400" rtl="0" eaLnBrk="1" latinLnBrk="0" hangingPunct="1">
+      <a:defRPr sz="1200" kern="1200">
+        <a:solidFill>
+          <a:schemeClr val="tx1"/>
+        </a:solidFill>
+        <a:latin typeface="+mn-lt"/>
+        <a:ea typeface="+mn-ea"/>
+        <a:cs typeface="+mn-cs"/>
+      </a:defRPr>
+    </a:lvl6pPr>
+    <a:lvl7pPr marL="2743200" algn="l" defTabSz="914400" rtl="0" eaLnBrk="1" latinLnBrk="0" hangingPunct="1">
+      <a:defRPr sz="1200" kern="1200">
+        <a:solidFill>
+          <a:schemeClr val="tx1"/>
+        </a:solidFill>
+        <a:latin typeface="+mn-lt"/>
+        <a:ea typeface="+mn-ea"/>
+        <a:cs typeface="+mn-cs"/>
+      </a:defRPr>
+    </a:lvl7pPr>
+    <a:lvl8pPr marL="3200400" algn="l" defTabSz="914400" rtl="0" eaLnBrk="1" latinLnBrk="0" hangingPunct="1">
+      <a:defRPr sz="1200" kern="1200">
+        <a:solidFill>
+          <a:schemeClr val="tx1"/>
+        </a:solidFill>
+        <a:latin typeface="+mn-lt"/>
+        <a:ea typeface="+mn-ea"/>
+        <a:cs typeface="+mn-cs"/>
+      </a:defRPr>
+    </a:lvl8pPr>
+    <a:lvl9pPr marL="3657600" algn="l" defTabSz="914400" rtl="0" eaLnBrk="1" latinLnBrk="0" hangingPunct="1">
+      <a:defRPr sz="1200" kern="1200">
+        <a:solidFill>
+          <a:schemeClr val="tx1"/>
+        </a:solidFill>
+        <a:latin typeface="+mn-lt"/>
+        <a:ea typeface="+mn-ea"/>
+        <a:cs typeface="+mn-cs"/>
+      </a:defRPr>
+    </a:lvl9pPr>
+  </p:notesStyle>
+</p:notesMaster>
 </file>
 
 <file path=ppt/slideLayouts/slideLayout1.xml><?xml version="1.0" encoding="utf-8"?>
@@ -249,9 +610,9 @@
           <a:bodyPr/>
           <a:lstStyle/>
           <a:p>
-            <a:fld id="{60A84BDC-FBD1-4FF9-BFB2-F92C03FDCEF5}" type="datetimeFigureOut">
-              <a:rPr lang="en-US" smtClean="0"/>
-              <a:t>7/3/2017</a:t>
+            <a:fld id="{2BFD8FD3-6BC4-425F-891D-0741A439FEF5}" type="datetime1">
+              <a:rPr lang="en-US" smtClean="0"/>
+              <a:t>7/4/2017</a:t>
             </a:fld>
             <a:endParaRPr lang="en-US"/>
           </a:p>
@@ -419,9 +780,9 @@
           <a:bodyPr/>
           <a:lstStyle/>
           <a:p>
-            <a:fld id="{60A84BDC-FBD1-4FF9-BFB2-F92C03FDCEF5}" type="datetimeFigureOut">
-              <a:rPr lang="en-US" smtClean="0"/>
-              <a:t>7/3/2017</a:t>
+            <a:fld id="{B05E5C68-9EED-413E-B086-4145A3935548}" type="datetime1">
+              <a:rPr lang="en-US" smtClean="0"/>
+              <a:t>7/4/2017</a:t>
             </a:fld>
             <a:endParaRPr lang="en-US"/>
           </a:p>
@@ -599,9 +960,9 @@
           <a:bodyPr/>
           <a:lstStyle/>
           <a:p>
-            <a:fld id="{60A84BDC-FBD1-4FF9-BFB2-F92C03FDCEF5}" type="datetimeFigureOut">
-              <a:rPr lang="en-US" smtClean="0"/>
-              <a:t>7/3/2017</a:t>
+            <a:fld id="{D6E95037-ADD3-4F59-BB44-F82689BBE7AE}" type="datetime1">
+              <a:rPr lang="en-US" smtClean="0"/>
+              <a:t>7/4/2017</a:t>
             </a:fld>
             <a:endParaRPr lang="en-US"/>
           </a:p>
@@ -769,9 +1130,9 @@
           <a:bodyPr/>
           <a:lstStyle/>
           <a:p>
-            <a:fld id="{60A84BDC-FBD1-4FF9-BFB2-F92C03FDCEF5}" type="datetimeFigureOut">
-              <a:rPr lang="en-US" smtClean="0"/>
-              <a:t>7/3/2017</a:t>
+            <a:fld id="{8D37BDF8-5683-484F-8DBC-E9A1DA889130}" type="datetime1">
+              <a:rPr lang="en-US" smtClean="0"/>
+              <a:t>7/4/2017</a:t>
             </a:fld>
             <a:endParaRPr lang="en-US"/>
           </a:p>
@@ -1015,9 +1376,9 @@
           <a:bodyPr/>
           <a:lstStyle/>
           <a:p>
-            <a:fld id="{60A84BDC-FBD1-4FF9-BFB2-F92C03FDCEF5}" type="datetimeFigureOut">
-              <a:rPr lang="en-US" smtClean="0"/>
-              <a:t>7/3/2017</a:t>
+            <a:fld id="{4DECC4F6-A32E-467C-A154-8BAEC0788F1F}" type="datetime1">
+              <a:rPr lang="en-US" smtClean="0"/>
+              <a:t>7/4/2017</a:t>
             </a:fld>
             <a:endParaRPr lang="en-US"/>
           </a:p>
@@ -1247,9 +1608,9 @@
           <a:bodyPr/>
           <a:lstStyle/>
           <a:p>
-            <a:fld id="{60A84BDC-FBD1-4FF9-BFB2-F92C03FDCEF5}" type="datetimeFigureOut">
-              <a:rPr lang="en-US" smtClean="0"/>
-              <a:t>7/3/2017</a:t>
+            <a:fld id="{29A1F4E2-A66E-4CEA-BAB6-29487134D526}" type="datetime1">
+              <a:rPr lang="en-US" smtClean="0"/>
+              <a:t>7/4/2017</a:t>
             </a:fld>
             <a:endParaRPr lang="en-US"/>
           </a:p>
@@ -1614,9 +1975,9 @@
           <a:bodyPr/>
           <a:lstStyle/>
           <a:p>
-            <a:fld id="{60A84BDC-FBD1-4FF9-BFB2-F92C03FDCEF5}" type="datetimeFigureOut">
-              <a:rPr lang="en-US" smtClean="0"/>
-              <a:t>7/3/2017</a:t>
+            <a:fld id="{AD5924CE-E8D1-46CA-9144-2068016453D9}" type="datetime1">
+              <a:rPr lang="en-US" smtClean="0"/>
+              <a:t>7/4/2017</a:t>
             </a:fld>
             <a:endParaRPr lang="en-US"/>
           </a:p>
@@ -1732,9 +2093,9 @@
           <a:bodyPr/>
           <a:lstStyle/>
           <a:p>
-            <a:fld id="{60A84BDC-FBD1-4FF9-BFB2-F92C03FDCEF5}" type="datetimeFigureOut">
-              <a:rPr lang="en-US" smtClean="0"/>
-              <a:t>7/3/2017</a:t>
+            <a:fld id="{A818CF9F-D515-4605-8464-4C06C1DFB243}" type="datetime1">
+              <a:rPr lang="en-US" smtClean="0"/>
+              <a:t>7/4/2017</a:t>
             </a:fld>
             <a:endParaRPr lang="en-US"/>
           </a:p>
@@ -1827,9 +2188,9 @@
           <a:bodyPr/>
           <a:lstStyle/>
           <a:p>
-            <a:fld id="{60A84BDC-FBD1-4FF9-BFB2-F92C03FDCEF5}" type="datetimeFigureOut">
-              <a:rPr lang="en-US" smtClean="0"/>
-              <a:t>7/3/2017</a:t>
+            <a:fld id="{D6C9B92B-7D36-4A45-A718-E0E1FC80AFD2}" type="datetime1">
+              <a:rPr lang="en-US" smtClean="0"/>
+              <a:t>7/4/2017</a:t>
             </a:fld>
             <a:endParaRPr lang="en-US"/>
           </a:p>
@@ -2104,9 +2465,9 @@
           <a:bodyPr/>
           <a:lstStyle/>
           <a:p>
-            <a:fld id="{60A84BDC-FBD1-4FF9-BFB2-F92C03FDCEF5}" type="datetimeFigureOut">
-              <a:rPr lang="en-US" smtClean="0"/>
-              <a:t>7/3/2017</a:t>
+            <a:fld id="{B68FD5C0-512F-45C2-ACB2-607A00A4510C}" type="datetime1">
+              <a:rPr lang="en-US" smtClean="0"/>
+              <a:t>7/4/2017</a:t>
             </a:fld>
             <a:endParaRPr lang="en-US"/>
           </a:p>
@@ -2357,9 +2718,9 @@
           <a:bodyPr/>
           <a:lstStyle/>
           <a:p>
-            <a:fld id="{60A84BDC-FBD1-4FF9-BFB2-F92C03FDCEF5}" type="datetimeFigureOut">
-              <a:rPr lang="en-US" smtClean="0"/>
-              <a:t>7/3/2017</a:t>
+            <a:fld id="{A8C85F23-E154-4B47-A9F9-89A52AA15E6B}" type="datetime1">
+              <a:rPr lang="en-US" smtClean="0"/>
+              <a:t>7/4/2017</a:t>
             </a:fld>
             <a:endParaRPr lang="en-US"/>
           </a:p>
@@ -2570,9 +2931,9 @@
             </a:lvl1pPr>
           </a:lstStyle>
           <a:p>
-            <a:fld id="{60A84BDC-FBD1-4FF9-BFB2-F92C03FDCEF5}" type="datetimeFigureOut">
-              <a:rPr lang="en-US" smtClean="0"/>
-              <a:t>7/3/2017</a:t>
+            <a:fld id="{441CFBDD-FC00-4979-962A-B16E941AAB17}" type="datetime1">
+              <a:rPr lang="en-US" smtClean="0"/>
+              <a:t>7/4/2017</a:t>
             </a:fld>
             <a:endParaRPr lang="en-US"/>
           </a:p>
@@ -2677,6 +3038,7 @@
     <p:sldLayoutId id="2147483658" r:id="rId10"/>
     <p:sldLayoutId id="2147483659" r:id="rId11"/>
   </p:sldLayoutIdLst>
+  <p:hf hdr="0" ftr="0" dt="0"/>
   <p:txStyles>
     <p:titleStyle>
       <a:lvl1pPr algn="l" defTabSz="914400" rtl="0" eaLnBrk="1" latinLnBrk="0" hangingPunct="1">
@@ -3032,7 +3394,7 @@
 </p:sld>
 </file>
 
-<file path=ppt/slides/slide2.xml><?xml version="1.0" encoding="utf-8"?>
+<file path=ppt/slides/slide10.xml><?xml version="1.0" encoding="utf-8"?>
 <p:sld xmlns:a="http://schemas.openxmlformats.org/drawingml/2006/main" xmlns:r="http://schemas.openxmlformats.org/officeDocument/2006/relationships" xmlns:p="http://schemas.openxmlformats.org/presentationml/2006/main">
   <p:cSld>
     <p:spTree>
@@ -3066,7 +3428,15 @@
           <a:p>
             <a:r>
               <a:rPr lang="en-US" dirty="0" smtClean="0"/>
-              <a:t>Abstract</a:t>
+              <a:t>Men’s </a:t>
+            </a:r>
+            <a:r>
+              <a:rPr lang="en-US" dirty="0"/>
+              <a:t>Runner Results - </a:t>
+            </a:r>
+            <a:r>
+              <a:rPr lang="en-US" dirty="0" smtClean="0"/>
+              <a:t>Time</a:t>
             </a:r>
             <a:endParaRPr lang="en-US" dirty="0"/>
           </a:p>
@@ -3074,12 +3444,12 @@
       </p:sp>
       <p:sp>
         <p:nvSpPr>
-          <p:cNvPr id="3" name="Content Placeholder 2"/>
-          <p:cNvSpPr>
-            <a:spLocks noGrp="1"/>
-          </p:cNvSpPr>
-          <p:nvPr>
-            <p:ph idx="1"/>
+          <p:cNvPr id="4" name="Text Placeholder 3"/>
+          <p:cNvSpPr>
+            <a:spLocks noGrp="1"/>
+          </p:cNvSpPr>
+          <p:nvPr>
+            <p:ph type="body" sz="half" idx="2"/>
           </p:nvPr>
         </p:nvSpPr>
         <p:spPr/>
@@ -3089,18 +3459,335 @@
           <a:p>
             <a:r>
               <a:rPr lang="en-US" dirty="0" smtClean="0"/>
-              <a:t>Austin</a:t>
-            </a:r>
-          </a:p>
-          <a:p>
+              <a:t>Boxplot by Year</a:t>
+            </a:r>
+          </a:p>
+          <a:p>
+            <a:r>
+              <a:rPr lang="en-US" dirty="0" smtClean="0"/>
+              <a:t>Boxplot by Age/Year</a:t>
+            </a:r>
+          </a:p>
+          <a:p>
+            <a:r>
+              <a:rPr lang="en-US" dirty="0" smtClean="0"/>
+              <a:t>Histogram</a:t>
+            </a:r>
+          </a:p>
+          <a:p>
+            <a:r>
+              <a:rPr lang="en-US" dirty="0" smtClean="0"/>
+              <a:t>Density plot</a:t>
+            </a:r>
+          </a:p>
+          <a:p>
+            <a:r>
+              <a:rPr lang="en-US" dirty="0" smtClean="0"/>
+              <a:t>QQ plot</a:t>
+            </a:r>
             <a:endParaRPr lang="en-US" dirty="0"/>
           </a:p>
         </p:txBody>
       </p:sp>
+      <p:sp>
+        <p:nvSpPr>
+          <p:cNvPr id="5" name="Slide Number Placeholder 4"/>
+          <p:cNvSpPr>
+            <a:spLocks noGrp="1"/>
+          </p:cNvSpPr>
+          <p:nvPr>
+            <p:ph type="sldNum" sz="quarter" idx="12"/>
+          </p:nvPr>
+        </p:nvSpPr>
+        <p:spPr/>
+        <p:txBody>
+          <a:bodyPr/>
+          <a:lstStyle/>
+          <a:p>
+            <a:fld id="{7B7DB76D-28D5-4DAC-900A-A1330999554A}" type="slidenum">
+              <a:rPr lang="en-US" smtClean="0"/>
+              <a:t>10</a:t>
+            </a:fld>
+            <a:endParaRPr lang="en-US"/>
+          </a:p>
+        </p:txBody>
+      </p:sp>
+      <p:pic>
+        <p:nvPicPr>
+          <p:cNvPr id="2050" name="Picture 2"/>
+          <p:cNvPicPr>
+            <a:picLocks noChangeAspect="1" noChangeArrowheads="1"/>
+          </p:cNvPicPr>
+          <p:nvPr/>
+        </p:nvPicPr>
+        <p:blipFill>
+          <a:blip r:embed="rId2">
+            <a:extLst>
+              <a:ext uri="{28A0092B-C50C-407E-A947-70E740481C1C}">
+                <a14:useLocalDpi xmlns:a14="http://schemas.microsoft.com/office/drawing/2010/main" val="0"/>
+              </a:ext>
+            </a:extLst>
+          </a:blip>
+          <a:srcRect/>
+          <a:stretch>
+            <a:fillRect/>
+          </a:stretch>
+        </p:blipFill>
+        <p:spPr bwMode="auto">
+          <a:xfrm>
+            <a:off x="5217457" y="968189"/>
+            <a:ext cx="3119719" cy="2545976"/>
+          </a:xfrm>
+          <a:prstGeom prst="rect">
+            <a:avLst/>
+          </a:prstGeom>
+          <a:noFill/>
+          <a:ln>
+            <a:noFill/>
+          </a:ln>
+          <a:extLst>
+            <a:ext uri="{909E8E84-426E-40DD-AFC4-6F175D3DCCD1}">
+              <a14:hiddenFill xmlns:a14="http://schemas.microsoft.com/office/drawing/2010/main">
+                <a:solidFill>
+                  <a:schemeClr val="accent1"/>
+                </a:solidFill>
+              </a14:hiddenFill>
+            </a:ext>
+            <a:ext uri="{91240B29-F687-4F45-9708-019B960494DF}">
+              <a14:hiddenLine xmlns:a14="http://schemas.microsoft.com/office/drawing/2010/main" w="9525">
+                <a:solidFill>
+                  <a:schemeClr val="tx1"/>
+                </a:solidFill>
+                <a:miter lim="800000"/>
+                <a:headEnd/>
+                <a:tailEnd/>
+              </a14:hiddenLine>
+            </a:ext>
+          </a:extLst>
+        </p:spPr>
+      </p:pic>
+      <p:pic>
+        <p:nvPicPr>
+          <p:cNvPr id="2051" name="Picture 3"/>
+          <p:cNvPicPr>
+            <a:picLocks noChangeAspect="1" noChangeArrowheads="1"/>
+          </p:cNvPicPr>
+          <p:nvPr/>
+        </p:nvPicPr>
+        <p:blipFill>
+          <a:blip r:embed="rId3" cstate="print">
+            <a:extLst>
+              <a:ext uri="{28A0092B-C50C-407E-A947-70E740481C1C}">
+                <a14:useLocalDpi xmlns:a14="http://schemas.microsoft.com/office/drawing/2010/main" val="0"/>
+              </a:ext>
+            </a:extLst>
+          </a:blip>
+          <a:srcRect/>
+          <a:stretch>
+            <a:fillRect/>
+          </a:stretch>
+        </p:blipFill>
+        <p:spPr bwMode="auto">
+          <a:xfrm>
+            <a:off x="8337177" y="968190"/>
+            <a:ext cx="2959147" cy="2348751"/>
+          </a:xfrm>
+          <a:prstGeom prst="rect">
+            <a:avLst/>
+          </a:prstGeom>
+          <a:noFill/>
+          <a:ln>
+            <a:noFill/>
+          </a:ln>
+          <a:extLst>
+            <a:ext uri="{909E8E84-426E-40DD-AFC4-6F175D3DCCD1}">
+              <a14:hiddenFill xmlns:a14="http://schemas.microsoft.com/office/drawing/2010/main">
+                <a:solidFill>
+                  <a:schemeClr val="accent1"/>
+                </a:solidFill>
+              </a14:hiddenFill>
+            </a:ext>
+            <a:ext uri="{91240B29-F687-4F45-9708-019B960494DF}">
+              <a14:hiddenLine xmlns:a14="http://schemas.microsoft.com/office/drawing/2010/main" w="9525">
+                <a:solidFill>
+                  <a:schemeClr val="tx1"/>
+                </a:solidFill>
+                <a:miter lim="800000"/>
+                <a:headEnd/>
+                <a:tailEnd/>
+              </a14:hiddenLine>
+            </a:ext>
+          </a:extLst>
+        </p:spPr>
+      </p:pic>
+      <p:pic>
+        <p:nvPicPr>
+          <p:cNvPr id="2052" name="Picture 4"/>
+          <p:cNvPicPr>
+            <a:picLocks noGrp="1" noChangeAspect="1" noChangeArrowheads="1"/>
+          </p:cNvPicPr>
+          <p:nvPr>
+            <p:ph type="pic" idx="1"/>
+          </p:nvPr>
+        </p:nvPicPr>
+        <p:blipFill>
+          <a:blip r:embed="rId4" cstate="print">
+            <a:extLst>
+              <a:ext uri="{28A0092B-C50C-407E-A947-70E740481C1C}">
+                <a14:useLocalDpi xmlns:a14="http://schemas.microsoft.com/office/drawing/2010/main" val="0"/>
+              </a:ext>
+            </a:extLst>
+          </a:blip>
+          <a:srcRect l="3479" r="3479"/>
+          <a:stretch>
+            <a:fillRect/>
+          </a:stretch>
+        </p:blipFill>
+        <p:spPr bwMode="auto">
+          <a:xfrm>
+            <a:off x="5481919" y="3514165"/>
+            <a:ext cx="2855258" cy="2420470"/>
+          </a:xfrm>
+          <a:prstGeom prst="rect">
+            <a:avLst/>
+          </a:prstGeom>
+          <a:noFill/>
+          <a:ln>
+            <a:noFill/>
+          </a:ln>
+          <a:extLst>
+            <a:ext uri="{909E8E84-426E-40DD-AFC4-6F175D3DCCD1}">
+              <a14:hiddenFill xmlns:a14="http://schemas.microsoft.com/office/drawing/2010/main">
+                <a:solidFill>
+                  <a:schemeClr val="accent1"/>
+                </a:solidFill>
+              </a14:hiddenFill>
+            </a:ext>
+            <a:ext uri="{91240B29-F687-4F45-9708-019B960494DF}">
+              <a14:hiddenLine xmlns:a14="http://schemas.microsoft.com/office/drawing/2010/main" w="9525">
+                <a:solidFill>
+                  <a:schemeClr val="tx1"/>
+                </a:solidFill>
+                <a:miter lim="800000"/>
+                <a:headEnd/>
+                <a:tailEnd/>
+              </a14:hiddenLine>
+            </a:ext>
+          </a:extLst>
+        </p:spPr>
+      </p:pic>
+      <p:pic>
+        <p:nvPicPr>
+          <p:cNvPr id="2053" name="Picture 5"/>
+          <p:cNvPicPr>
+            <a:picLocks noChangeAspect="1" noChangeArrowheads="1"/>
+          </p:cNvPicPr>
+          <p:nvPr/>
+        </p:nvPicPr>
+        <p:blipFill>
+          <a:blip r:embed="rId5">
+            <a:extLst>
+              <a:ext uri="{28A0092B-C50C-407E-A947-70E740481C1C}">
+                <a14:useLocalDpi xmlns:a14="http://schemas.microsoft.com/office/drawing/2010/main" val="0"/>
+              </a:ext>
+            </a:extLst>
+          </a:blip>
+          <a:srcRect/>
+          <a:stretch>
+            <a:fillRect/>
+          </a:stretch>
+        </p:blipFill>
+        <p:spPr bwMode="auto">
+          <a:xfrm>
+            <a:off x="8337177" y="3058506"/>
+            <a:ext cx="2832847" cy="2553401"/>
+          </a:xfrm>
+          <a:prstGeom prst="rect">
+            <a:avLst/>
+          </a:prstGeom>
+          <a:noFill/>
+          <a:ln>
+            <a:noFill/>
+          </a:ln>
+          <a:extLst>
+            <a:ext uri="{909E8E84-426E-40DD-AFC4-6F175D3DCCD1}">
+              <a14:hiddenFill xmlns:a14="http://schemas.microsoft.com/office/drawing/2010/main">
+                <a:solidFill>
+                  <a:schemeClr val="accent1"/>
+                </a:solidFill>
+              </a14:hiddenFill>
+            </a:ext>
+            <a:ext uri="{91240B29-F687-4F45-9708-019B960494DF}">
+              <a14:hiddenLine xmlns:a14="http://schemas.microsoft.com/office/drawing/2010/main" w="9525">
+                <a:solidFill>
+                  <a:schemeClr val="tx1"/>
+                </a:solidFill>
+                <a:miter lim="800000"/>
+                <a:headEnd/>
+                <a:tailEnd/>
+              </a14:hiddenLine>
+            </a:ext>
+          </a:extLst>
+        </p:spPr>
+      </p:pic>
+      <p:pic>
+        <p:nvPicPr>
+          <p:cNvPr id="2054" name="Picture 6"/>
+          <p:cNvPicPr>
+            <a:picLocks noChangeAspect="1" noChangeArrowheads="1"/>
+          </p:cNvPicPr>
+          <p:nvPr/>
+        </p:nvPicPr>
+        <p:blipFill>
+          <a:blip r:embed="rId6" cstate="print">
+            <a:extLst>
+              <a:ext uri="{28A0092B-C50C-407E-A947-70E740481C1C}">
+                <a14:useLocalDpi xmlns:a14="http://schemas.microsoft.com/office/drawing/2010/main" val="0"/>
+              </a:ext>
+            </a:extLst>
+          </a:blip>
+          <a:srcRect/>
+          <a:stretch>
+            <a:fillRect/>
+          </a:stretch>
+        </p:blipFill>
+        <p:spPr bwMode="auto">
+          <a:xfrm>
+            <a:off x="1936375" y="3693457"/>
+            <a:ext cx="3281082" cy="2133602"/>
+          </a:xfrm>
+          <a:prstGeom prst="rect">
+            <a:avLst/>
+          </a:prstGeom>
+          <a:noFill/>
+          <a:ln>
+            <a:noFill/>
+          </a:ln>
+          <a:extLst>
+            <a:ext uri="{909E8E84-426E-40DD-AFC4-6F175D3DCCD1}">
+              <a14:hiddenFill xmlns:a14="http://schemas.microsoft.com/office/drawing/2010/main">
+                <a:solidFill>
+                  <a:schemeClr val="accent1"/>
+                </a:solidFill>
+              </a14:hiddenFill>
+            </a:ext>
+            <a:ext uri="{91240B29-F687-4F45-9708-019B960494DF}">
+              <a14:hiddenLine xmlns:a14="http://schemas.microsoft.com/office/drawing/2010/main" w="9525">
+                <a:solidFill>
+                  <a:schemeClr val="tx1"/>
+                </a:solidFill>
+                <a:miter lim="800000"/>
+                <a:headEnd/>
+                <a:tailEnd/>
+              </a14:hiddenLine>
+            </a:ext>
+          </a:extLst>
+        </p:spPr>
+      </p:pic>
     </p:spTree>
     <p:extLst>
       <p:ext uri="{BB962C8B-B14F-4D97-AF65-F5344CB8AC3E}">
-        <p14:creationId xmlns:p14="http://schemas.microsoft.com/office/powerpoint/2010/main" val="2163746313"/>
+        <p14:creationId xmlns:p14="http://schemas.microsoft.com/office/powerpoint/2010/main" val="4015490736"/>
       </p:ext>
     </p:extLst>
   </p:cSld>
@@ -3110,7 +3797,7 @@
 </p:sld>
 </file>
 
-<file path=ppt/slides/slide3.xml><?xml version="1.0" encoding="utf-8"?>
+<file path=ppt/slides/slide11.xml><?xml version="1.0" encoding="utf-8"?>
 <p:sld xmlns:a="http://schemas.openxmlformats.org/drawingml/2006/main" xmlns:r="http://schemas.openxmlformats.org/officeDocument/2006/relationships" xmlns:p="http://schemas.openxmlformats.org/presentationml/2006/main">
   <p:cSld>
     <p:spTree>
@@ -3144,7 +3831,14 @@
           <a:p>
             <a:r>
               <a:rPr lang="en-US" dirty="0" smtClean="0"/>
-              <a:t>Background</a:t>
+              <a:t>Men’s Runners Results</a:t>
+            </a:r>
+            <a:br>
+              <a:rPr lang="en-US" dirty="0" smtClean="0"/>
+            </a:br>
+            <a:r>
+              <a:rPr lang="en-US" dirty="0" smtClean="0"/>
+              <a:t>Age versus Time and Age per Year</a:t>
             </a:r>
             <a:endParaRPr lang="en-US" dirty="0"/>
           </a:p>
@@ -3152,31 +3846,391 @@
       </p:sp>
       <p:sp>
         <p:nvSpPr>
-          <p:cNvPr id="3" name="Content Placeholder 2"/>
-          <p:cNvSpPr>
-            <a:spLocks noGrp="1"/>
-          </p:cNvSpPr>
-          <p:nvPr>
-            <p:ph idx="1"/>
+          <p:cNvPr id="3" name="Picture Placeholder 2"/>
+          <p:cNvSpPr>
+            <a:spLocks noGrp="1"/>
+          </p:cNvSpPr>
+          <p:nvPr>
+            <p:ph type="pic" idx="1"/>
           </p:nvPr>
         </p:nvSpPr>
         <p:spPr/>
+      </p:sp>
+      <p:sp>
+        <p:nvSpPr>
+          <p:cNvPr id="4" name="Text Placeholder 3"/>
+          <p:cNvSpPr>
+            <a:spLocks noGrp="1"/>
+          </p:cNvSpPr>
+          <p:nvPr>
+            <p:ph type="body" sz="half" idx="2"/>
+          </p:nvPr>
+        </p:nvSpPr>
+        <p:spPr/>
         <p:txBody>
           <a:bodyPr/>
           <a:lstStyle/>
           <a:p>
             <a:r>
               <a:rPr lang="en-US" dirty="0" smtClean="0"/>
-              <a:t>Austin</a:t>
-            </a:r>
-            <a:endParaRPr lang="en-US" dirty="0"/>
-          </a:p>
-        </p:txBody>
-      </p:sp>
+              <a:t>XY Plot – Time versus Age by Year</a:t>
+            </a:r>
+          </a:p>
+          <a:p>
+            <a:r>
+              <a:rPr lang="en-US" dirty="0" smtClean="0"/>
+              <a:t>XY Plot – Time vs Age Regression by  Year</a:t>
+            </a:r>
+          </a:p>
+          <a:p>
+            <a:r>
+              <a:rPr lang="en-US" dirty="0" smtClean="0"/>
+              <a:t>XY Plot –  Time vs. </a:t>
+            </a:r>
+            <a:r>
+              <a:rPr lang="en-US" dirty="0" err="1" smtClean="0"/>
+              <a:t>Avg</a:t>
+            </a:r>
+            <a:r>
+              <a:rPr lang="en-US" dirty="0" smtClean="0"/>
+              <a:t> Time for </a:t>
+            </a:r>
+            <a:r>
+              <a:rPr lang="en-US" dirty="0" err="1" smtClean="0"/>
+              <a:t>Avg</a:t>
+            </a:r>
+            <a:r>
+              <a:rPr lang="en-US" dirty="0" smtClean="0"/>
+              <a:t> Age</a:t>
+            </a:r>
+          </a:p>
+          <a:p>
+            <a:r>
+              <a:rPr lang="en-US" dirty="0" smtClean="0"/>
+              <a:t>XY Plot – Age vs. </a:t>
+            </a:r>
+            <a:r>
+              <a:rPr lang="en-US" dirty="0" err="1" smtClean="0"/>
+              <a:t>Avg</a:t>
+            </a:r>
+            <a:r>
+              <a:rPr lang="en-US" dirty="0" smtClean="0"/>
+              <a:t> Age by Year</a:t>
+            </a:r>
+          </a:p>
+          <a:p>
+            <a:r>
+              <a:rPr lang="en-US" dirty="0" smtClean="0"/>
+              <a:t>XY Plot – Time vs. </a:t>
+            </a:r>
+            <a:r>
+              <a:rPr lang="en-US" dirty="0" err="1" smtClean="0"/>
+              <a:t>Avg</a:t>
+            </a:r>
+            <a:r>
+              <a:rPr lang="en-US" dirty="0" smtClean="0"/>
+              <a:t> Time by Year</a:t>
+            </a:r>
+          </a:p>
+        </p:txBody>
+      </p:sp>
+      <p:sp>
+        <p:nvSpPr>
+          <p:cNvPr id="5" name="Slide Number Placeholder 4"/>
+          <p:cNvSpPr>
+            <a:spLocks noGrp="1"/>
+          </p:cNvSpPr>
+          <p:nvPr>
+            <p:ph type="sldNum" sz="quarter" idx="12"/>
+          </p:nvPr>
+        </p:nvSpPr>
+        <p:spPr/>
+        <p:txBody>
+          <a:bodyPr/>
+          <a:lstStyle/>
+          <a:p>
+            <a:fld id="{7B7DB76D-28D5-4DAC-900A-A1330999554A}" type="slidenum">
+              <a:rPr lang="en-US" smtClean="0"/>
+              <a:t>11</a:t>
+            </a:fld>
+            <a:endParaRPr lang="en-US"/>
+          </a:p>
+        </p:txBody>
+      </p:sp>
+      <p:pic>
+        <p:nvPicPr>
+          <p:cNvPr id="3074" name="Picture 2"/>
+          <p:cNvPicPr>
+            <a:picLocks noChangeAspect="1" noChangeArrowheads="1"/>
+          </p:cNvPicPr>
+          <p:nvPr/>
+        </p:nvPicPr>
+        <p:blipFill>
+          <a:blip r:embed="rId2" cstate="print">
+            <a:extLst>
+              <a:ext uri="{28A0092B-C50C-407E-A947-70E740481C1C}">
+                <a14:useLocalDpi xmlns:a14="http://schemas.microsoft.com/office/drawing/2010/main" val="0"/>
+              </a:ext>
+            </a:extLst>
+          </a:blip>
+          <a:srcRect/>
+          <a:stretch>
+            <a:fillRect/>
+          </a:stretch>
+        </p:blipFill>
+        <p:spPr bwMode="auto">
+          <a:xfrm>
+            <a:off x="5145740" y="920284"/>
+            <a:ext cx="3137647" cy="2414587"/>
+          </a:xfrm>
+          <a:prstGeom prst="rect">
+            <a:avLst/>
+          </a:prstGeom>
+          <a:noFill/>
+          <a:ln>
+            <a:noFill/>
+          </a:ln>
+          <a:extLst>
+            <a:ext uri="{909E8E84-426E-40DD-AFC4-6F175D3DCCD1}">
+              <a14:hiddenFill xmlns:a14="http://schemas.microsoft.com/office/drawing/2010/main">
+                <a:solidFill>
+                  <a:schemeClr val="accent1"/>
+                </a:solidFill>
+              </a14:hiddenFill>
+            </a:ext>
+            <a:ext uri="{91240B29-F687-4F45-9708-019B960494DF}">
+              <a14:hiddenLine xmlns:a14="http://schemas.microsoft.com/office/drawing/2010/main" w="9525">
+                <a:solidFill>
+                  <a:schemeClr val="tx1"/>
+                </a:solidFill>
+                <a:miter lim="800000"/>
+                <a:headEnd/>
+                <a:tailEnd/>
+              </a14:hiddenLine>
+            </a:ext>
+          </a:extLst>
+        </p:spPr>
+      </p:pic>
+      <p:pic>
+        <p:nvPicPr>
+          <p:cNvPr id="3075" name="Picture 3"/>
+          <p:cNvPicPr>
+            <a:picLocks noChangeAspect="1" noChangeArrowheads="1"/>
+          </p:cNvPicPr>
+          <p:nvPr/>
+        </p:nvPicPr>
+        <p:blipFill>
+          <a:blip r:embed="rId3" cstate="print">
+            <a:extLst>
+              <a:ext uri="{28A0092B-C50C-407E-A947-70E740481C1C}">
+                <a14:useLocalDpi xmlns:a14="http://schemas.microsoft.com/office/drawing/2010/main" val="0"/>
+              </a:ext>
+            </a:extLst>
+          </a:blip>
+          <a:srcRect/>
+          <a:stretch>
+            <a:fillRect/>
+          </a:stretch>
+        </p:blipFill>
+        <p:spPr bwMode="auto">
+          <a:xfrm>
+            <a:off x="8283388" y="920284"/>
+            <a:ext cx="2994213" cy="2289081"/>
+          </a:xfrm>
+          <a:prstGeom prst="rect">
+            <a:avLst/>
+          </a:prstGeom>
+          <a:noFill/>
+          <a:ln>
+            <a:noFill/>
+          </a:ln>
+          <a:extLst>
+            <a:ext uri="{909E8E84-426E-40DD-AFC4-6F175D3DCCD1}">
+              <a14:hiddenFill xmlns:a14="http://schemas.microsoft.com/office/drawing/2010/main">
+                <a:solidFill>
+                  <a:schemeClr val="accent1"/>
+                </a:solidFill>
+              </a14:hiddenFill>
+            </a:ext>
+            <a:ext uri="{91240B29-F687-4F45-9708-019B960494DF}">
+              <a14:hiddenLine xmlns:a14="http://schemas.microsoft.com/office/drawing/2010/main" w="9525">
+                <a:solidFill>
+                  <a:schemeClr val="tx1"/>
+                </a:solidFill>
+                <a:miter lim="800000"/>
+                <a:headEnd/>
+                <a:tailEnd/>
+              </a14:hiddenLine>
+            </a:ext>
+          </a:extLst>
+        </p:spPr>
+      </p:pic>
+      <p:pic>
+        <p:nvPicPr>
+          <p:cNvPr id="3076" name="Picture 4"/>
+          <p:cNvPicPr>
+            <a:picLocks noChangeAspect="1" noChangeArrowheads="1"/>
+          </p:cNvPicPr>
+          <p:nvPr/>
+        </p:nvPicPr>
+        <p:blipFill>
+          <a:blip r:embed="rId4">
+            <a:extLst>
+              <a:ext uri="{28A0092B-C50C-407E-A947-70E740481C1C}">
+                <a14:useLocalDpi xmlns:a14="http://schemas.microsoft.com/office/drawing/2010/main" val="0"/>
+              </a:ext>
+            </a:extLst>
+          </a:blip>
+          <a:srcRect/>
+          <a:stretch>
+            <a:fillRect/>
+          </a:stretch>
+        </p:blipFill>
+        <p:spPr bwMode="auto">
+          <a:xfrm>
+            <a:off x="5145741" y="3209365"/>
+            <a:ext cx="3137648" cy="2563905"/>
+          </a:xfrm>
+          <a:prstGeom prst="rect">
+            <a:avLst/>
+          </a:prstGeom>
+          <a:noFill/>
+          <a:ln>
+            <a:noFill/>
+          </a:ln>
+          <a:extLst>
+            <a:ext uri="{909E8E84-426E-40DD-AFC4-6F175D3DCCD1}">
+              <a14:hiddenFill xmlns:a14="http://schemas.microsoft.com/office/drawing/2010/main">
+                <a:solidFill>
+                  <a:schemeClr val="accent1"/>
+                </a:solidFill>
+              </a14:hiddenFill>
+            </a:ext>
+            <a:ext uri="{91240B29-F687-4F45-9708-019B960494DF}">
+              <a14:hiddenLine xmlns:a14="http://schemas.microsoft.com/office/drawing/2010/main" w="9525">
+                <a:solidFill>
+                  <a:schemeClr val="tx1"/>
+                </a:solidFill>
+                <a:miter lim="800000"/>
+                <a:headEnd/>
+                <a:tailEnd/>
+              </a14:hiddenLine>
+            </a:ext>
+          </a:extLst>
+        </p:spPr>
+      </p:pic>
+      <p:pic>
+        <p:nvPicPr>
+          <p:cNvPr id="3077" name="Picture 5"/>
+          <p:cNvPicPr>
+            <a:picLocks noChangeAspect="1" noChangeArrowheads="1"/>
+          </p:cNvPicPr>
+          <p:nvPr/>
+        </p:nvPicPr>
+        <p:blipFill>
+          <a:blip r:embed="rId5">
+            <a:extLst>
+              <a:ext uri="{28A0092B-C50C-407E-A947-70E740481C1C}">
+                <a14:useLocalDpi xmlns:a14="http://schemas.microsoft.com/office/drawing/2010/main" val="0"/>
+              </a:ext>
+            </a:extLst>
+          </a:blip>
+          <a:srcRect/>
+          <a:stretch>
+            <a:fillRect/>
+          </a:stretch>
+        </p:blipFill>
+        <p:spPr bwMode="auto">
+          <a:xfrm>
+            <a:off x="8390965" y="3209365"/>
+            <a:ext cx="2886636" cy="2563905"/>
+          </a:xfrm>
+          <a:prstGeom prst="rect">
+            <a:avLst/>
+          </a:prstGeom>
+          <a:noFill/>
+          <a:ln>
+            <a:noFill/>
+          </a:ln>
+          <a:extLst>
+            <a:ext uri="{909E8E84-426E-40DD-AFC4-6F175D3DCCD1}">
+              <a14:hiddenFill xmlns:a14="http://schemas.microsoft.com/office/drawing/2010/main">
+                <a:solidFill>
+                  <a:schemeClr val="accent1"/>
+                </a:solidFill>
+              </a14:hiddenFill>
+            </a:ext>
+            <a:ext uri="{91240B29-F687-4F45-9708-019B960494DF}">
+              <a14:hiddenLine xmlns:a14="http://schemas.microsoft.com/office/drawing/2010/main" w="9525">
+                <a:solidFill>
+                  <a:schemeClr val="tx1"/>
+                </a:solidFill>
+                <a:miter lim="800000"/>
+                <a:headEnd/>
+                <a:tailEnd/>
+              </a14:hiddenLine>
+            </a:ext>
+          </a:extLst>
+        </p:spPr>
+      </p:pic>
+      <p:pic>
+        <p:nvPicPr>
+          <p:cNvPr id="3078" name="Picture 6"/>
+          <p:cNvPicPr>
+            <a:picLocks noChangeAspect="1" noChangeArrowheads="1"/>
+          </p:cNvPicPr>
+          <p:nvPr/>
+        </p:nvPicPr>
+        <p:blipFill>
+          <a:blip r:embed="rId6">
+            <a:extLst>
+              <a:ext uri="{28A0092B-C50C-407E-A947-70E740481C1C}">
+                <a14:useLocalDpi xmlns:a14="http://schemas.microsoft.com/office/drawing/2010/main" val="0"/>
+              </a:ext>
+            </a:extLst>
+          </a:blip>
+          <a:srcRect/>
+          <a:stretch>
+            <a:fillRect/>
+          </a:stretch>
+        </p:blipFill>
+        <p:spPr bwMode="auto">
+          <a:xfrm>
+            <a:off x="784692" y="3841376"/>
+            <a:ext cx="4056249" cy="2415989"/>
+          </a:xfrm>
+          <a:prstGeom prst="rect">
+            <a:avLst/>
+          </a:prstGeom>
+          <a:noFill/>
+          <a:ln>
+            <a:noFill/>
+          </a:ln>
+          <a:extLst>
+            <a:ext uri="{909E8E84-426E-40DD-AFC4-6F175D3DCCD1}">
+              <a14:hiddenFill xmlns:a14="http://schemas.microsoft.com/office/drawing/2010/main">
+                <a:solidFill>
+                  <a:schemeClr val="accent1"/>
+                </a:solidFill>
+              </a14:hiddenFill>
+            </a:ext>
+            <a:ext uri="{91240B29-F687-4F45-9708-019B960494DF}">
+              <a14:hiddenLine xmlns:a14="http://schemas.microsoft.com/office/drawing/2010/main" w="9525">
+                <a:solidFill>
+                  <a:schemeClr val="tx1"/>
+                </a:solidFill>
+                <a:miter lim="800000"/>
+                <a:headEnd/>
+                <a:tailEnd/>
+              </a14:hiddenLine>
+            </a:ext>
+          </a:extLst>
+        </p:spPr>
+      </p:pic>
     </p:spTree>
     <p:extLst>
       <p:ext uri="{BB962C8B-B14F-4D97-AF65-F5344CB8AC3E}">
-        <p14:creationId xmlns:p14="http://schemas.microsoft.com/office/powerpoint/2010/main" val="423536800"/>
+        <p14:creationId xmlns:p14="http://schemas.microsoft.com/office/powerpoint/2010/main" val="2457170447"/>
       </p:ext>
     </p:extLst>
   </p:cSld>
@@ -3186,7 +4240,7 @@
 </p:sld>
 </file>
 
-<file path=ppt/slides/slide4.xml><?xml version="1.0" encoding="utf-8"?>
+<file path=ppt/slides/slide12.xml><?xml version="1.0" encoding="utf-8"?>
 <p:sld xmlns:a="http://schemas.openxmlformats.org/drawingml/2006/main" xmlns:r="http://schemas.openxmlformats.org/officeDocument/2006/relationships" xmlns:p="http://schemas.openxmlformats.org/presentationml/2006/main">
   <p:cSld>
     <p:spTree>
@@ -3220,7 +4274,7 @@
           <a:p>
             <a:r>
               <a:rPr lang="en-US" dirty="0" smtClean="0"/>
-              <a:t>Data Loading/Prep</a:t>
+              <a:t>More …..</a:t>
             </a:r>
             <a:endParaRPr lang="en-US" dirty="0"/>
           </a:p>
@@ -3228,12 +4282,12 @@
       </p:sp>
       <p:sp>
         <p:nvSpPr>
-          <p:cNvPr id="3" name="Content Placeholder 2"/>
-          <p:cNvSpPr>
-            <a:spLocks noGrp="1"/>
-          </p:cNvSpPr>
-          <p:nvPr>
-            <p:ph idx="1"/>
+          <p:cNvPr id="4" name="Text Placeholder 3"/>
+          <p:cNvSpPr>
+            <a:spLocks noGrp="1"/>
+          </p:cNvSpPr>
+          <p:nvPr>
+            <p:ph type="body" sz="half" idx="2"/>
           </p:nvPr>
         </p:nvSpPr>
         <p:spPr/>
@@ -3243,7 +4297,29 @@
           <a:p>
             <a:r>
               <a:rPr lang="en-US" dirty="0" smtClean="0"/>
-              <a:t>Matt</a:t>
+              <a:t>XY Plot – Time vs. </a:t>
+            </a:r>
+            <a:r>
+              <a:rPr lang="en-US" dirty="0" err="1" smtClean="0"/>
+              <a:t>Avg</a:t>
+            </a:r>
+            <a:r>
+              <a:rPr lang="en-US" dirty="0" smtClean="0"/>
+              <a:t> Time by Year for Age Group 40-49</a:t>
+            </a:r>
+          </a:p>
+          <a:p>
+            <a:r>
+              <a:rPr lang="en-US" dirty="0" smtClean="0"/>
+              <a:t>XY Plot – Time vs. Std. Dev Time vs </a:t>
+            </a:r>
+            <a:r>
+              <a:rPr lang="en-US" dirty="0" err="1" smtClean="0"/>
+              <a:t>Std</a:t>
+            </a:r>
+            <a:r>
+              <a:rPr lang="en-US" dirty="0" smtClean="0"/>
+              <a:t> Dev Age</a:t>
             </a:r>
           </a:p>
           <a:p>
@@ -3251,10 +4327,143 @@
           </a:p>
         </p:txBody>
       </p:sp>
+      <p:sp>
+        <p:nvSpPr>
+          <p:cNvPr id="5" name="Slide Number Placeholder 4"/>
+          <p:cNvSpPr>
+            <a:spLocks noGrp="1"/>
+          </p:cNvSpPr>
+          <p:nvPr>
+            <p:ph type="sldNum" sz="quarter" idx="12"/>
+          </p:nvPr>
+        </p:nvSpPr>
+        <p:spPr/>
+        <p:txBody>
+          <a:bodyPr/>
+          <a:lstStyle/>
+          <a:p>
+            <a:fld id="{7B7DB76D-28D5-4DAC-900A-A1330999554A}" type="slidenum">
+              <a:rPr lang="en-US" smtClean="0"/>
+              <a:t>12</a:t>
+            </a:fld>
+            <a:endParaRPr lang="en-US"/>
+          </a:p>
+        </p:txBody>
+      </p:sp>
+      <p:pic>
+        <p:nvPicPr>
+          <p:cNvPr id="4098" name="Picture 2"/>
+          <p:cNvPicPr>
+            <a:picLocks noChangeAspect="1" noChangeArrowheads="1"/>
+          </p:cNvPicPr>
+          <p:nvPr/>
+        </p:nvPicPr>
+        <p:blipFill>
+          <a:blip r:embed="rId2" cstate="print">
+            <a:extLst>
+              <a:ext uri="{28A0092B-C50C-407E-A947-70E740481C1C}">
+                <a14:useLocalDpi xmlns:a14="http://schemas.microsoft.com/office/drawing/2010/main" val="0"/>
+              </a:ext>
+            </a:extLst>
+          </a:blip>
+          <a:srcRect/>
+          <a:stretch>
+            <a:fillRect/>
+          </a:stretch>
+        </p:blipFill>
+        <p:spPr bwMode="auto">
+          <a:xfrm>
+            <a:off x="5163670" y="1039908"/>
+            <a:ext cx="2725271" cy="2169458"/>
+          </a:xfrm>
+          <a:prstGeom prst="rect">
+            <a:avLst/>
+          </a:prstGeom>
+          <a:noFill/>
+          <a:ln>
+            <a:noFill/>
+          </a:ln>
+          <a:extLst>
+            <a:ext uri="{909E8E84-426E-40DD-AFC4-6F175D3DCCD1}">
+              <a14:hiddenFill xmlns:a14="http://schemas.microsoft.com/office/drawing/2010/main">
+                <a:solidFill>
+                  <a:schemeClr val="accent1"/>
+                </a:solidFill>
+              </a14:hiddenFill>
+            </a:ext>
+            <a:ext uri="{91240B29-F687-4F45-9708-019B960494DF}">
+              <a14:hiddenLine xmlns:a14="http://schemas.microsoft.com/office/drawing/2010/main" w="9525">
+                <a:solidFill>
+                  <a:schemeClr val="tx1"/>
+                </a:solidFill>
+                <a:miter lim="800000"/>
+                <a:headEnd/>
+                <a:tailEnd/>
+              </a14:hiddenLine>
+            </a:ext>
+          </a:extLst>
+        </p:spPr>
+      </p:pic>
+      <p:pic>
+        <p:nvPicPr>
+          <p:cNvPr id="4099" name="Picture 3"/>
+          <p:cNvPicPr>
+            <a:picLocks noGrp="1" noChangeAspect="1" noChangeArrowheads="1"/>
+          </p:cNvPicPr>
+          <p:nvPr>
+            <p:ph type="pic" idx="1"/>
+          </p:nvPr>
+        </p:nvPicPr>
+        <p:blipFill>
+          <a:blip r:embed="rId3">
+            <a:extLst>
+              <a:ext uri="{28A0092B-C50C-407E-A947-70E740481C1C}">
+                <a14:useLocalDpi xmlns:a14="http://schemas.microsoft.com/office/drawing/2010/main" val="0"/>
+              </a:ext>
+            </a:extLst>
+          </a:blip>
+          <a:srcRect l="3479" r="3479"/>
+          <a:stretch>
+            <a:fillRect/>
+          </a:stretch>
+        </p:blipFill>
+        <p:spPr bwMode="auto">
+          <a:xfrm>
+            <a:off x="8175812" y="987425"/>
+            <a:ext cx="3179576" cy="2221941"/>
+          </a:xfrm>
+          <a:prstGeom prst="rect">
+            <a:avLst/>
+          </a:prstGeom>
+          <a:noFill/>
+          <a:ln>
+            <a:noFill/>
+          </a:ln>
+          <a:extLst>
+            <a:ext uri="{909E8E84-426E-40DD-AFC4-6F175D3DCCD1}">
+              <a14:hiddenFill xmlns:a14="http://schemas.microsoft.com/office/drawing/2010/main">
+                <a:solidFill>
+                  <a:schemeClr val="accent1"/>
+                </a:solidFill>
+              </a14:hiddenFill>
+            </a:ext>
+            <a:ext uri="{91240B29-F687-4F45-9708-019B960494DF}">
+              <a14:hiddenLine xmlns:a14="http://schemas.microsoft.com/office/drawing/2010/main" w="9525">
+                <a:solidFill>
+                  <a:schemeClr val="tx1"/>
+                </a:solidFill>
+                <a:miter lim="800000"/>
+                <a:headEnd/>
+                <a:tailEnd/>
+              </a14:hiddenLine>
+            </a:ext>
+          </a:extLst>
+        </p:spPr>
+      </p:pic>
     </p:spTree>
     <p:extLst>
       <p:ext uri="{BB962C8B-B14F-4D97-AF65-F5344CB8AC3E}">
-        <p14:creationId xmlns:p14="http://schemas.microsoft.com/office/powerpoint/2010/main" val="3117168750"/>
+        <p14:creationId xmlns:p14="http://schemas.microsoft.com/office/powerpoint/2010/main" val="2662121671"/>
       </p:ext>
     </p:extLst>
   </p:cSld>
@@ -3264,7 +4473,7 @@
 </p:sld>
 </file>
 
-<file path=ppt/slides/slide5.xml><?xml version="1.0" encoding="utf-8"?>
+<file path=ppt/slides/slide13.xml><?xml version="1.0" encoding="utf-8"?>
 <p:sld xmlns:a="http://schemas.openxmlformats.org/drawingml/2006/main" xmlns:r="http://schemas.openxmlformats.org/officeDocument/2006/relationships" xmlns:p="http://schemas.openxmlformats.org/presentationml/2006/main">
   <p:cSld>
     <p:spTree>
@@ -3283,7 +4492,7 @@
       </p:grpSpPr>
       <p:sp>
         <p:nvSpPr>
-          <p:cNvPr id="2" name="Title 1"/>
+          <p:cNvPr id="6" name="Title 5"/>
           <p:cNvSpPr>
             <a:spLocks noGrp="1"/>
           </p:cNvSpPr>
@@ -3298,7 +4507,7 @@
           <a:p>
             <a:r>
               <a:rPr lang="en-US" dirty="0" smtClean="0"/>
-              <a:t>Data Prep</a:t>
+              <a:t>Models &amp; Algorithms  - used in the R code</a:t>
             </a:r>
             <a:endParaRPr lang="en-US" dirty="0"/>
           </a:p>
@@ -3306,7 +4515,7 @@
       </p:sp>
       <p:sp>
         <p:nvSpPr>
-          <p:cNvPr id="3" name="Content Placeholder 2"/>
+          <p:cNvPr id="7" name="Content Placeholder 6"/>
           <p:cNvSpPr>
             <a:spLocks noGrp="1"/>
           </p:cNvSpPr>
@@ -3316,23 +4525,67 @@
         </p:nvSpPr>
         <p:spPr/>
         <p:txBody>
-          <a:bodyPr/>
+          <a:bodyPr>
+            <a:normAutofit/>
+          </a:bodyPr>
           <a:lstStyle/>
           <a:p>
             <a:r>
               <a:rPr lang="en-US" dirty="0" smtClean="0"/>
-              <a:t>Matt</a:t>
-            </a:r>
-          </a:p>
-          <a:p>
-            <a:endParaRPr lang="en-US" dirty="0"/>
+              <a:t>MANOVA is a Multivariate extension of ANOVA with the only difference being that in MANOVA there are Multiple Dependent Variable.</a:t>
+            </a:r>
+          </a:p>
+          <a:p>
+            <a:r>
+              <a:rPr lang="en-US" dirty="0" smtClean="0"/>
+              <a:t>ANOVA  - 1 DV</a:t>
+            </a:r>
+          </a:p>
+          <a:p>
+            <a:r>
+              <a:rPr lang="en-US" dirty="0" smtClean="0"/>
+              <a:t>MANOVA – 2 or more DVs</a:t>
+            </a:r>
+          </a:p>
+          <a:p>
+            <a:r>
+              <a:rPr lang="en-US" dirty="0"/>
+              <a:t>Experimental designs in which researchers manipulate or control one or more IVs to determine the effect on one DV (ANOVA) or more DVs (MANOVA</a:t>
+            </a:r>
+            <a:r>
+              <a:rPr lang="en-US" dirty="0" smtClean="0"/>
+              <a:t>)</a:t>
+            </a:r>
+          </a:p>
+        </p:txBody>
+      </p:sp>
+      <p:sp>
+        <p:nvSpPr>
+          <p:cNvPr id="5" name="Slide Number Placeholder 4"/>
+          <p:cNvSpPr>
+            <a:spLocks noGrp="1"/>
+          </p:cNvSpPr>
+          <p:nvPr>
+            <p:ph type="sldNum" sz="quarter" idx="12"/>
+          </p:nvPr>
+        </p:nvSpPr>
+        <p:spPr/>
+        <p:txBody>
+          <a:bodyPr/>
+          <a:lstStyle/>
+          <a:p>
+            <a:fld id="{7B7DB76D-28D5-4DAC-900A-A1330999554A}" type="slidenum">
+              <a:rPr lang="en-US" smtClean="0"/>
+              <a:t>13</a:t>
+            </a:fld>
+            <a:endParaRPr lang="en-US"/>
           </a:p>
         </p:txBody>
       </p:sp>
     </p:spTree>
     <p:extLst>
       <p:ext uri="{BB962C8B-B14F-4D97-AF65-F5344CB8AC3E}">
-        <p14:creationId xmlns:p14="http://schemas.microsoft.com/office/powerpoint/2010/main" val="25843840"/>
+        <p14:creationId xmlns:p14="http://schemas.microsoft.com/office/powerpoint/2010/main" val="4037245483"/>
       </p:ext>
     </p:extLst>
   </p:cSld>
@@ -3342,7 +4595,7 @@
 </p:sld>
 </file>
 
-<file path=ppt/slides/slide6.xml><?xml version="1.0" encoding="utf-8"?>
+<file path=ppt/slides/slide14.xml><?xml version="1.0" encoding="utf-8"?>
 <p:sld xmlns:a="http://schemas.openxmlformats.org/drawingml/2006/main" xmlns:r="http://schemas.openxmlformats.org/officeDocument/2006/relationships" xmlns:p="http://schemas.openxmlformats.org/presentationml/2006/main">
   <p:cSld>
     <p:spTree>
@@ -3361,7 +4614,7 @@
       </p:grpSpPr>
       <p:sp>
         <p:nvSpPr>
-          <p:cNvPr id="2" name="Title 1"/>
+          <p:cNvPr id="6" name="Title 5"/>
           <p:cNvSpPr>
             <a:spLocks noGrp="1"/>
           </p:cNvSpPr>
@@ -3376,7 +4629,7 @@
           <a:p>
             <a:r>
               <a:rPr lang="en-US" dirty="0" smtClean="0"/>
-              <a:t>Methods</a:t>
+              <a:t>Models &amp; Algorithms  - used in Excel</a:t>
             </a:r>
             <a:endParaRPr lang="en-US" dirty="0"/>
           </a:p>
@@ -3384,12 +4637,67 @@
       </p:sp>
       <p:sp>
         <p:nvSpPr>
+          <p:cNvPr id="2" name="Content Placeholder 1"/>
+          <p:cNvSpPr>
+            <a:spLocks noGrp="1"/>
+          </p:cNvSpPr>
+          <p:nvPr>
+            <p:ph sz="half" idx="1"/>
+          </p:nvPr>
+        </p:nvSpPr>
+        <p:spPr/>
+        <p:txBody>
+          <a:bodyPr/>
+          <a:lstStyle/>
+          <a:p>
+            <a:r>
+              <a:rPr lang="en-US" b="1" dirty="0" smtClean="0"/>
+              <a:t>T-Test: (parametric) </a:t>
+            </a:r>
+            <a:r>
+              <a:rPr lang="en-US" dirty="0" smtClean="0"/>
+              <a:t>Used to compare two groups means</a:t>
+            </a:r>
+          </a:p>
+          <a:p>
+            <a:pPr lvl="1"/>
+            <a:r>
+              <a:rPr lang="en-US" dirty="0" smtClean="0"/>
+              <a:t>Can only be used for two Age groups (not multiple)</a:t>
+            </a:r>
+          </a:p>
+          <a:p>
+            <a:pPr lvl="1"/>
+            <a:r>
+              <a:rPr lang="en-US" dirty="0" smtClean="0"/>
+              <a:t>Assume the data to have a normal distribution (bell-shaped curve)</a:t>
+            </a:r>
+          </a:p>
+          <a:p>
+            <a:pPr lvl="1"/>
+            <a:r>
+              <a:rPr lang="en-US" dirty="0" smtClean="0"/>
+              <a:t>Similar standard deviation</a:t>
+            </a:r>
+          </a:p>
+          <a:p>
+            <a:pPr lvl="1"/>
+            <a:r>
+              <a:rPr lang="en-US" dirty="0" smtClean="0"/>
+              <a:t>Data must be measured values</a:t>
+            </a:r>
+            <a:endParaRPr lang="en-US" dirty="0"/>
+          </a:p>
+        </p:txBody>
+      </p:sp>
+      <p:sp>
+        <p:nvSpPr>
           <p:cNvPr id="3" name="Content Placeholder 2"/>
           <p:cNvSpPr>
             <a:spLocks noGrp="1"/>
           </p:cNvSpPr>
           <p:nvPr>
-            <p:ph idx="1"/>
+            <p:ph sz="half" idx="2"/>
           </p:nvPr>
         </p:nvSpPr>
         <p:spPr/>
@@ -3398,17 +4706,61 @@
           <a:lstStyle/>
           <a:p>
             <a:r>
+              <a:rPr lang="en-US" b="1" dirty="0" smtClean="0"/>
+              <a:t>Chi-Square Test: (non-parametric)</a:t>
+            </a:r>
+          </a:p>
+          <a:p>
+            <a:pPr lvl="1"/>
+            <a:r>
               <a:rPr lang="en-US" dirty="0" smtClean="0"/>
-              <a:t>Ben</a:t>
+              <a:t>Sample size must be more than 20</a:t>
+            </a:r>
+          </a:p>
+          <a:p>
+            <a:pPr lvl="1"/>
+            <a:r>
+              <a:rPr lang="en-US" dirty="0" smtClean="0"/>
+              <a:t>Only be used to compare an experimental result w/a theoretical outcome</a:t>
+            </a:r>
+          </a:p>
+          <a:p>
+            <a:pPr lvl="1"/>
+            <a:r>
+              <a:rPr lang="en-US" dirty="0" smtClean="0"/>
+              <a:t>Aims to test the null hypothesis of NO DIFFERENCE between data sets</a:t>
             </a:r>
             <a:endParaRPr lang="en-US" dirty="0"/>
+          </a:p>
+        </p:txBody>
+      </p:sp>
+      <p:sp>
+        <p:nvSpPr>
+          <p:cNvPr id="5" name="Slide Number Placeholder 4"/>
+          <p:cNvSpPr>
+            <a:spLocks noGrp="1"/>
+          </p:cNvSpPr>
+          <p:nvPr>
+            <p:ph type="sldNum" sz="quarter" idx="12"/>
+          </p:nvPr>
+        </p:nvSpPr>
+        <p:spPr/>
+        <p:txBody>
+          <a:bodyPr/>
+          <a:lstStyle/>
+          <a:p>
+            <a:fld id="{7B7DB76D-28D5-4DAC-900A-A1330999554A}" type="slidenum">
+              <a:rPr lang="en-US" smtClean="0"/>
+              <a:t>14</a:t>
+            </a:fld>
+            <a:endParaRPr lang="en-US"/>
           </a:p>
         </p:txBody>
       </p:sp>
     </p:spTree>
     <p:extLst>
       <p:ext uri="{BB962C8B-B14F-4D97-AF65-F5344CB8AC3E}">
-        <p14:creationId xmlns:p14="http://schemas.microsoft.com/office/powerpoint/2010/main" val="4203658968"/>
+        <p14:creationId xmlns:p14="http://schemas.microsoft.com/office/powerpoint/2010/main" val="2068078882"/>
       </p:ext>
     </p:extLst>
   </p:cSld>
@@ -3418,7 +4770,7 @@
 </p:sld>
 </file>
 
-<file path=ppt/slides/slide7.xml><?xml version="1.0" encoding="utf-8"?>
+<file path=ppt/slides/slide15.xml><?xml version="1.0" encoding="utf-8"?>
 <p:sld xmlns:a="http://schemas.openxmlformats.org/drawingml/2006/main" xmlns:r="http://schemas.openxmlformats.org/officeDocument/2006/relationships" xmlns:p="http://schemas.openxmlformats.org/presentationml/2006/main">
   <p:cSld>
     <p:spTree>
@@ -3437,7 +4789,7 @@
       </p:grpSpPr>
       <p:sp>
         <p:nvSpPr>
-          <p:cNvPr id="2" name="Title 1"/>
+          <p:cNvPr id="6" name="Title 5"/>
           <p:cNvSpPr>
             <a:spLocks noGrp="1"/>
           </p:cNvSpPr>
@@ -3451,8 +4803,66 @@
           <a:lstStyle/>
           <a:p>
             <a:r>
+              <a:rPr lang="en-US" dirty="0"/>
+              <a:t>Models &amp; Algorithms  - used in Excel</a:t>
+            </a:r>
+          </a:p>
+        </p:txBody>
+      </p:sp>
+      <p:sp>
+        <p:nvSpPr>
+          <p:cNvPr id="9" name="Content Placeholder 8"/>
+          <p:cNvSpPr>
+            <a:spLocks noGrp="1"/>
+          </p:cNvSpPr>
+          <p:nvPr>
+            <p:ph sz="half" idx="1"/>
+          </p:nvPr>
+        </p:nvSpPr>
+        <p:spPr/>
+        <p:txBody>
+          <a:bodyPr/>
+          <a:lstStyle/>
+          <a:p>
+            <a:r>
               <a:rPr lang="en-US" dirty="0" smtClean="0"/>
-              <a:t>Exploratory</a:t>
+              <a:t>Models used</a:t>
+            </a:r>
+          </a:p>
+          <a:p>
+            <a:pPr lvl="1"/>
+            <a:r>
+              <a:rPr lang="en-US" dirty="0" smtClean="0"/>
+              <a:t>T-Test</a:t>
+            </a:r>
+          </a:p>
+          <a:p>
+            <a:pPr lvl="2"/>
+            <a:r>
+              <a:rPr lang="en-US" dirty="0" smtClean="0"/>
+              <a:t>2009 compared to 2010 age group means</a:t>
+            </a:r>
+          </a:p>
+          <a:p>
+            <a:pPr lvl="1"/>
+            <a:r>
+              <a:rPr lang="en-US" dirty="0" smtClean="0"/>
+              <a:t>Chi-Square</a:t>
+            </a:r>
+          </a:p>
+          <a:p>
+            <a:pPr lvl="2"/>
+            <a:r>
+              <a:rPr lang="en-US" dirty="0" smtClean="0"/>
+              <a:t>Compared two or more </a:t>
+            </a:r>
+            <a:r>
+              <a:rPr lang="en-US" smtClean="0"/>
+              <a:t>groups </a:t>
+            </a:r>
+            <a:r>
+              <a:rPr lang="en-US" smtClean="0"/>
+              <a:t>variances</a:t>
             </a:r>
             <a:endParaRPr lang="en-US" dirty="0"/>
           </a:p>
@@ -3460,12 +4870,12 @@
       </p:sp>
       <p:sp>
         <p:nvSpPr>
-          <p:cNvPr id="3" name="Content Placeholder 2"/>
-          <p:cNvSpPr>
-            <a:spLocks noGrp="1"/>
-          </p:cNvSpPr>
-          <p:nvPr>
-            <p:ph idx="1"/>
+          <p:cNvPr id="5" name="Slide Number Placeholder 4"/>
+          <p:cNvSpPr>
+            <a:spLocks noGrp="1"/>
+          </p:cNvSpPr>
+          <p:nvPr>
+            <p:ph type="sldNum" sz="quarter" idx="12"/>
           </p:nvPr>
         </p:nvSpPr>
         <p:spPr/>
@@ -3473,28 +4883,91 @@
           <a:bodyPr/>
           <a:lstStyle/>
           <a:p>
-            <a:r>
-              <a:rPr lang="en-US" dirty="0" smtClean="0"/>
-              <a:t>Ben/Austin</a:t>
-            </a:r>
-            <a:endParaRPr lang="en-US" dirty="0"/>
-          </a:p>
-        </p:txBody>
-      </p:sp>
+            <a:fld id="{7B7DB76D-28D5-4DAC-900A-A1330999554A}" type="slidenum">
+              <a:rPr lang="en-US" smtClean="0"/>
+              <a:t>15</a:t>
+            </a:fld>
+            <a:endParaRPr lang="en-US"/>
+          </a:p>
+        </p:txBody>
+      </p:sp>
+      <p:pic>
+        <p:nvPicPr>
+          <p:cNvPr id="12" name="Picture 2"/>
+          <p:cNvPicPr>
+            <a:picLocks noGrp="1" noChangeAspect="1" noChangeArrowheads="1"/>
+          </p:cNvPicPr>
+          <p:nvPr>
+            <p:ph sz="half" idx="2"/>
+          </p:nvPr>
+        </p:nvPicPr>
+        <p:blipFill>
+          <a:blip r:embed="rId2">
+            <a:extLst>
+              <a:ext uri="{28A0092B-C50C-407E-A947-70E740481C1C}">
+                <a14:useLocalDpi xmlns:a14="http://schemas.microsoft.com/office/drawing/2010/main" val="0"/>
+              </a:ext>
+            </a:extLst>
+          </a:blip>
+          <a:srcRect/>
+          <a:stretch>
+            <a:fillRect/>
+          </a:stretch>
+        </p:blipFill>
+        <p:spPr bwMode="auto">
+          <a:xfrm>
+            <a:off x="6572524" y="1808922"/>
+            <a:ext cx="4738206" cy="4214191"/>
+          </a:xfrm>
+          <a:prstGeom prst="rect">
+            <a:avLst/>
+          </a:prstGeom>
+          <a:noFill/>
+          <a:ln>
+            <a:noFill/>
+          </a:ln>
+          <a:extLst>
+            <a:ext uri="{909E8E84-426E-40DD-AFC4-6F175D3DCCD1}">
+              <a14:hiddenFill xmlns:a14="http://schemas.microsoft.com/office/drawing/2010/main">
+                <a:solidFill>
+                  <a:schemeClr val="accent1"/>
+                </a:solidFill>
+              </a14:hiddenFill>
+            </a:ext>
+            <a:ext uri="{91240B29-F687-4F45-9708-019B960494DF}">
+              <a14:hiddenLine xmlns:a14="http://schemas.microsoft.com/office/drawing/2010/main" w="9525">
+                <a:solidFill>
+                  <a:schemeClr val="tx1"/>
+                </a:solidFill>
+                <a:miter lim="800000"/>
+                <a:headEnd/>
+                <a:tailEnd/>
+              </a14:hiddenLine>
+            </a:ext>
+          </a:extLst>
+        </p:spPr>
+      </p:pic>
     </p:spTree>
     <p:extLst>
       <p:ext uri="{BB962C8B-B14F-4D97-AF65-F5344CB8AC3E}">
-        <p14:creationId xmlns:p14="http://schemas.microsoft.com/office/powerpoint/2010/main" val="4270067039"/>
+        <p14:creationId xmlns:p14="http://schemas.microsoft.com/office/powerpoint/2010/main" val="331772905"/>
       </p:ext>
     </p:extLst>
   </p:cSld>
   <p:clrMapOvr>
     <a:masterClrMapping/>
   </p:clrMapOvr>
+  <p:timing>
+    <p:tnLst>
+      <p:par>
+        <p:cTn id="1" dur="indefinite" restart="never" nodeType="tmRoot"/>
+      </p:par>
+    </p:tnLst>
+  </p:timing>
 </p:sld>
 </file>
 
-<file path=ppt/slides/slide8.xml><?xml version="1.0" encoding="utf-8"?>
+<file path=ppt/slides/slide16.xml><?xml version="1.0" encoding="utf-8"?>
 <p:sld xmlns:a="http://schemas.openxmlformats.org/drawingml/2006/main" xmlns:r="http://schemas.openxmlformats.org/officeDocument/2006/relationships" xmlns:p="http://schemas.openxmlformats.org/presentationml/2006/main">
   <p:cSld>
     <p:spTree>
@@ -3880,7 +5353,7 @@
                         <m:chr m:val="̅"/>
                         <m:ctrlPr>
                           <a:rPr lang="en-US" sz="1400" i="1" dirty="0" smtClean="0">
-                            <a:latin typeface="Cambria Math" panose="02040503050406030204" pitchFamily="18" charset="0"/>
+                            <a:latin typeface="Cambria Math"/>
                           </a:rPr>
                         </m:ctrlPr>
                       </m:accPr>
@@ -4136,7 +5609,7 @@
                         <m:chr m:val="̅"/>
                         <m:ctrlPr>
                           <a:rPr lang="en-US" sz="1400" i="1" dirty="0" smtClean="0">
-                            <a:latin typeface="Cambria Math" panose="02040503050406030204" pitchFamily="18" charset="0"/>
+                            <a:latin typeface="Cambria Math"/>
                           </a:rPr>
                         </m:ctrlPr>
                       </m:accPr>
@@ -5941,6 +7414,29 @@
           </a:p>
         </p:txBody>
       </p:sp>
+      <p:sp>
+        <p:nvSpPr>
+          <p:cNvPr id="2" name="Slide Number Placeholder 1"/>
+          <p:cNvSpPr>
+            <a:spLocks noGrp="1"/>
+          </p:cNvSpPr>
+          <p:nvPr>
+            <p:ph type="sldNum" sz="quarter" idx="12"/>
+          </p:nvPr>
+        </p:nvSpPr>
+        <p:spPr/>
+        <p:txBody>
+          <a:bodyPr/>
+          <a:lstStyle/>
+          <a:p>
+            <a:fld id="{7B7DB76D-28D5-4DAC-900A-A1330999554A}" type="slidenum">
+              <a:rPr lang="en-US" smtClean="0"/>
+              <a:t>16</a:t>
+            </a:fld>
+            <a:endParaRPr lang="en-US"/>
+          </a:p>
+        </p:txBody>
+      </p:sp>
     </p:spTree>
     <p:extLst>
       <p:ext uri="{BB962C8B-B14F-4D97-AF65-F5344CB8AC3E}">
@@ -5951,6 +7447,925 @@
   <p:clrMapOvr>
     <a:masterClrMapping/>
   </p:clrMapOvr>
+  <p:timing>
+    <p:tnLst>
+      <p:par>
+        <p:cTn id="1" dur="indefinite" restart="never" nodeType="tmRoot"/>
+      </p:par>
+    </p:tnLst>
+  </p:timing>
+</p:sld>
+</file>
+
+<file path=ppt/slides/slide17.xml><?xml version="1.0" encoding="utf-8"?>
+<p:sld xmlns:a="http://schemas.openxmlformats.org/drawingml/2006/main" xmlns:r="http://schemas.openxmlformats.org/officeDocument/2006/relationships" xmlns:p="http://schemas.openxmlformats.org/presentationml/2006/main">
+  <p:cSld>
+    <p:spTree>
+      <p:nvGrpSpPr>
+        <p:cNvPr id="1" name=""/>
+        <p:cNvGrpSpPr/>
+        <p:nvPr/>
+      </p:nvGrpSpPr>
+      <p:grpSpPr>
+        <a:xfrm>
+          <a:off x="0" y="0"/>
+          <a:ext cx="0" cy="0"/>
+          <a:chOff x="0" y="0"/>
+          <a:chExt cx="0" cy="0"/>
+        </a:xfrm>
+      </p:grpSpPr>
+      <p:sp>
+        <p:nvSpPr>
+          <p:cNvPr id="2" name="Title 1"/>
+          <p:cNvSpPr>
+            <a:spLocks noGrp="1"/>
+          </p:cNvSpPr>
+          <p:nvPr>
+            <p:ph type="title"/>
+          </p:nvPr>
+        </p:nvSpPr>
+        <p:spPr/>
+        <p:txBody>
+          <a:bodyPr/>
+          <a:lstStyle/>
+          <a:p>
+            <a:r>
+              <a:rPr lang="en-US" dirty="0" smtClean="0"/>
+              <a:t>Conclusion/Discussions</a:t>
+            </a:r>
+            <a:endParaRPr lang="en-US" dirty="0"/>
+          </a:p>
+        </p:txBody>
+      </p:sp>
+      <p:sp>
+        <p:nvSpPr>
+          <p:cNvPr id="3" name="Content Placeholder 2"/>
+          <p:cNvSpPr>
+            <a:spLocks noGrp="1"/>
+          </p:cNvSpPr>
+          <p:nvPr>
+            <p:ph idx="1"/>
+          </p:nvPr>
+        </p:nvSpPr>
+        <p:spPr/>
+        <p:txBody>
+          <a:bodyPr/>
+          <a:lstStyle/>
+          <a:p>
+            <a:r>
+              <a:rPr lang="en-US" dirty="0" smtClean="0"/>
+              <a:t>All</a:t>
+            </a:r>
+            <a:endParaRPr lang="en-US" dirty="0"/>
+          </a:p>
+        </p:txBody>
+      </p:sp>
+      <p:sp>
+        <p:nvSpPr>
+          <p:cNvPr id="4" name="Slide Number Placeholder 3"/>
+          <p:cNvSpPr>
+            <a:spLocks noGrp="1"/>
+          </p:cNvSpPr>
+          <p:nvPr>
+            <p:ph type="sldNum" sz="quarter" idx="12"/>
+          </p:nvPr>
+        </p:nvSpPr>
+        <p:spPr/>
+        <p:txBody>
+          <a:bodyPr/>
+          <a:lstStyle/>
+          <a:p>
+            <a:fld id="{7B7DB76D-28D5-4DAC-900A-A1330999554A}" type="slidenum">
+              <a:rPr lang="en-US" smtClean="0"/>
+              <a:t>17</a:t>
+            </a:fld>
+            <a:endParaRPr lang="en-US"/>
+          </a:p>
+        </p:txBody>
+      </p:sp>
+    </p:spTree>
+    <p:extLst>
+      <p:ext uri="{BB962C8B-B14F-4D97-AF65-F5344CB8AC3E}">
+        <p14:creationId xmlns:p14="http://schemas.microsoft.com/office/powerpoint/2010/main" val="721653042"/>
+      </p:ext>
+    </p:extLst>
+  </p:cSld>
+  <p:clrMapOvr>
+    <a:masterClrMapping/>
+  </p:clrMapOvr>
+  <p:timing>
+    <p:tnLst>
+      <p:par>
+        <p:cTn id="1" dur="indefinite" restart="never" nodeType="tmRoot"/>
+      </p:par>
+    </p:tnLst>
+  </p:timing>
+</p:sld>
+</file>
+
+<file path=ppt/slides/slide2.xml><?xml version="1.0" encoding="utf-8"?>
+<p:sld xmlns:a="http://schemas.openxmlformats.org/drawingml/2006/main" xmlns:r="http://schemas.openxmlformats.org/officeDocument/2006/relationships" xmlns:p="http://schemas.openxmlformats.org/presentationml/2006/main">
+  <p:cSld>
+    <p:spTree>
+      <p:nvGrpSpPr>
+        <p:cNvPr id="1" name=""/>
+        <p:cNvGrpSpPr/>
+        <p:nvPr/>
+      </p:nvGrpSpPr>
+      <p:grpSpPr>
+        <a:xfrm>
+          <a:off x="0" y="0"/>
+          <a:ext cx="0" cy="0"/>
+          <a:chOff x="0" y="0"/>
+          <a:chExt cx="0" cy="0"/>
+        </a:xfrm>
+      </p:grpSpPr>
+      <p:sp>
+        <p:nvSpPr>
+          <p:cNvPr id="2" name="Title 1"/>
+          <p:cNvSpPr>
+            <a:spLocks noGrp="1"/>
+          </p:cNvSpPr>
+          <p:nvPr>
+            <p:ph type="title"/>
+          </p:nvPr>
+        </p:nvSpPr>
+        <p:spPr/>
+        <p:txBody>
+          <a:bodyPr/>
+          <a:lstStyle/>
+          <a:p>
+            <a:r>
+              <a:rPr lang="en-US" dirty="0" smtClean="0"/>
+              <a:t>Abstract</a:t>
+            </a:r>
+            <a:endParaRPr lang="en-US" dirty="0"/>
+          </a:p>
+        </p:txBody>
+      </p:sp>
+      <p:sp>
+        <p:nvSpPr>
+          <p:cNvPr id="3" name="Content Placeholder 2"/>
+          <p:cNvSpPr>
+            <a:spLocks noGrp="1"/>
+          </p:cNvSpPr>
+          <p:nvPr>
+            <p:ph idx="1"/>
+          </p:nvPr>
+        </p:nvSpPr>
+        <p:spPr/>
+        <p:txBody>
+          <a:bodyPr/>
+          <a:lstStyle/>
+          <a:p>
+            <a:r>
+              <a:rPr lang="en-US" dirty="0" smtClean="0"/>
+              <a:t>Austin</a:t>
+            </a:r>
+          </a:p>
+          <a:p>
+            <a:endParaRPr lang="en-US" dirty="0"/>
+          </a:p>
+        </p:txBody>
+      </p:sp>
+      <p:sp>
+        <p:nvSpPr>
+          <p:cNvPr id="4" name="Slide Number Placeholder 3"/>
+          <p:cNvSpPr>
+            <a:spLocks noGrp="1"/>
+          </p:cNvSpPr>
+          <p:nvPr>
+            <p:ph type="sldNum" sz="quarter" idx="12"/>
+          </p:nvPr>
+        </p:nvSpPr>
+        <p:spPr/>
+        <p:txBody>
+          <a:bodyPr/>
+          <a:lstStyle/>
+          <a:p>
+            <a:fld id="{7B7DB76D-28D5-4DAC-900A-A1330999554A}" type="slidenum">
+              <a:rPr lang="en-US" smtClean="0"/>
+              <a:t>2</a:t>
+            </a:fld>
+            <a:endParaRPr lang="en-US"/>
+          </a:p>
+        </p:txBody>
+      </p:sp>
+    </p:spTree>
+    <p:extLst>
+      <p:ext uri="{BB962C8B-B14F-4D97-AF65-F5344CB8AC3E}">
+        <p14:creationId xmlns:p14="http://schemas.microsoft.com/office/powerpoint/2010/main" val="2163746313"/>
+      </p:ext>
+    </p:extLst>
+  </p:cSld>
+  <p:clrMapOvr>
+    <a:masterClrMapping/>
+  </p:clrMapOvr>
+</p:sld>
+</file>
+
+<file path=ppt/slides/slide3.xml><?xml version="1.0" encoding="utf-8"?>
+<p:sld xmlns:a="http://schemas.openxmlformats.org/drawingml/2006/main" xmlns:r="http://schemas.openxmlformats.org/officeDocument/2006/relationships" xmlns:p="http://schemas.openxmlformats.org/presentationml/2006/main">
+  <p:cSld>
+    <p:spTree>
+      <p:nvGrpSpPr>
+        <p:cNvPr id="1" name=""/>
+        <p:cNvGrpSpPr/>
+        <p:nvPr/>
+      </p:nvGrpSpPr>
+      <p:grpSpPr>
+        <a:xfrm>
+          <a:off x="0" y="0"/>
+          <a:ext cx="0" cy="0"/>
+          <a:chOff x="0" y="0"/>
+          <a:chExt cx="0" cy="0"/>
+        </a:xfrm>
+      </p:grpSpPr>
+      <p:sp>
+        <p:nvSpPr>
+          <p:cNvPr id="2" name="Title 1"/>
+          <p:cNvSpPr>
+            <a:spLocks noGrp="1"/>
+          </p:cNvSpPr>
+          <p:nvPr>
+            <p:ph type="title"/>
+          </p:nvPr>
+        </p:nvSpPr>
+        <p:spPr/>
+        <p:txBody>
+          <a:bodyPr/>
+          <a:lstStyle/>
+          <a:p>
+            <a:r>
+              <a:rPr lang="en-US" dirty="0" smtClean="0"/>
+              <a:t>Background</a:t>
+            </a:r>
+            <a:endParaRPr lang="en-US" dirty="0"/>
+          </a:p>
+        </p:txBody>
+      </p:sp>
+      <p:sp>
+        <p:nvSpPr>
+          <p:cNvPr id="3" name="Content Placeholder 2"/>
+          <p:cNvSpPr>
+            <a:spLocks noGrp="1"/>
+          </p:cNvSpPr>
+          <p:nvPr>
+            <p:ph idx="1"/>
+          </p:nvPr>
+        </p:nvSpPr>
+        <p:spPr/>
+        <p:txBody>
+          <a:bodyPr/>
+          <a:lstStyle/>
+          <a:p>
+            <a:r>
+              <a:rPr lang="en-US" dirty="0" smtClean="0"/>
+              <a:t>Austin</a:t>
+            </a:r>
+            <a:endParaRPr lang="en-US" dirty="0"/>
+          </a:p>
+        </p:txBody>
+      </p:sp>
+      <p:sp>
+        <p:nvSpPr>
+          <p:cNvPr id="4" name="Slide Number Placeholder 3"/>
+          <p:cNvSpPr>
+            <a:spLocks noGrp="1"/>
+          </p:cNvSpPr>
+          <p:nvPr>
+            <p:ph type="sldNum" sz="quarter" idx="12"/>
+          </p:nvPr>
+        </p:nvSpPr>
+        <p:spPr/>
+        <p:txBody>
+          <a:bodyPr/>
+          <a:lstStyle/>
+          <a:p>
+            <a:fld id="{7B7DB76D-28D5-4DAC-900A-A1330999554A}" type="slidenum">
+              <a:rPr lang="en-US" smtClean="0"/>
+              <a:t>3</a:t>
+            </a:fld>
+            <a:endParaRPr lang="en-US"/>
+          </a:p>
+        </p:txBody>
+      </p:sp>
+    </p:spTree>
+    <p:extLst>
+      <p:ext uri="{BB962C8B-B14F-4D97-AF65-F5344CB8AC3E}">
+        <p14:creationId xmlns:p14="http://schemas.microsoft.com/office/powerpoint/2010/main" val="423536800"/>
+      </p:ext>
+    </p:extLst>
+  </p:cSld>
+  <p:clrMapOvr>
+    <a:masterClrMapping/>
+  </p:clrMapOvr>
+</p:sld>
+</file>
+
+<file path=ppt/slides/slide4.xml><?xml version="1.0" encoding="utf-8"?>
+<p:sld xmlns:a="http://schemas.openxmlformats.org/drawingml/2006/main" xmlns:r="http://schemas.openxmlformats.org/officeDocument/2006/relationships" xmlns:p="http://schemas.openxmlformats.org/presentationml/2006/main">
+  <p:cSld>
+    <p:spTree>
+      <p:nvGrpSpPr>
+        <p:cNvPr id="1" name=""/>
+        <p:cNvGrpSpPr/>
+        <p:nvPr/>
+      </p:nvGrpSpPr>
+      <p:grpSpPr>
+        <a:xfrm>
+          <a:off x="0" y="0"/>
+          <a:ext cx="0" cy="0"/>
+          <a:chOff x="0" y="0"/>
+          <a:chExt cx="0" cy="0"/>
+        </a:xfrm>
+      </p:grpSpPr>
+      <p:sp>
+        <p:nvSpPr>
+          <p:cNvPr id="2" name="Title 1"/>
+          <p:cNvSpPr>
+            <a:spLocks noGrp="1"/>
+          </p:cNvSpPr>
+          <p:nvPr>
+            <p:ph type="title"/>
+          </p:nvPr>
+        </p:nvSpPr>
+        <p:spPr/>
+        <p:txBody>
+          <a:bodyPr/>
+          <a:lstStyle/>
+          <a:p>
+            <a:r>
+              <a:rPr lang="en-US" dirty="0" smtClean="0"/>
+              <a:t>Data Loading/Prep</a:t>
+            </a:r>
+            <a:endParaRPr lang="en-US" dirty="0"/>
+          </a:p>
+        </p:txBody>
+      </p:sp>
+      <p:sp>
+        <p:nvSpPr>
+          <p:cNvPr id="3" name="Content Placeholder 2"/>
+          <p:cNvSpPr>
+            <a:spLocks noGrp="1"/>
+          </p:cNvSpPr>
+          <p:nvPr>
+            <p:ph idx="1"/>
+          </p:nvPr>
+        </p:nvSpPr>
+        <p:spPr/>
+        <p:txBody>
+          <a:bodyPr/>
+          <a:lstStyle/>
+          <a:p>
+            <a:r>
+              <a:rPr lang="en-US" dirty="0" smtClean="0"/>
+              <a:t>Matt</a:t>
+            </a:r>
+          </a:p>
+          <a:p>
+            <a:endParaRPr lang="en-US" dirty="0"/>
+          </a:p>
+        </p:txBody>
+      </p:sp>
+      <p:sp>
+        <p:nvSpPr>
+          <p:cNvPr id="4" name="Slide Number Placeholder 3"/>
+          <p:cNvSpPr>
+            <a:spLocks noGrp="1"/>
+          </p:cNvSpPr>
+          <p:nvPr>
+            <p:ph type="sldNum" sz="quarter" idx="12"/>
+          </p:nvPr>
+        </p:nvSpPr>
+        <p:spPr/>
+        <p:txBody>
+          <a:bodyPr/>
+          <a:lstStyle/>
+          <a:p>
+            <a:fld id="{7B7DB76D-28D5-4DAC-900A-A1330999554A}" type="slidenum">
+              <a:rPr lang="en-US" smtClean="0"/>
+              <a:t>4</a:t>
+            </a:fld>
+            <a:endParaRPr lang="en-US"/>
+          </a:p>
+        </p:txBody>
+      </p:sp>
+    </p:spTree>
+    <p:extLst>
+      <p:ext uri="{BB962C8B-B14F-4D97-AF65-F5344CB8AC3E}">
+        <p14:creationId xmlns:p14="http://schemas.microsoft.com/office/powerpoint/2010/main" val="3117168750"/>
+      </p:ext>
+    </p:extLst>
+  </p:cSld>
+  <p:clrMapOvr>
+    <a:masterClrMapping/>
+  </p:clrMapOvr>
+</p:sld>
+</file>
+
+<file path=ppt/slides/slide5.xml><?xml version="1.0" encoding="utf-8"?>
+<p:sld xmlns:a="http://schemas.openxmlformats.org/drawingml/2006/main" xmlns:r="http://schemas.openxmlformats.org/officeDocument/2006/relationships" xmlns:p="http://schemas.openxmlformats.org/presentationml/2006/main">
+  <p:cSld>
+    <p:spTree>
+      <p:nvGrpSpPr>
+        <p:cNvPr id="1" name=""/>
+        <p:cNvGrpSpPr/>
+        <p:nvPr/>
+      </p:nvGrpSpPr>
+      <p:grpSpPr>
+        <a:xfrm>
+          <a:off x="0" y="0"/>
+          <a:ext cx="0" cy="0"/>
+          <a:chOff x="0" y="0"/>
+          <a:chExt cx="0" cy="0"/>
+        </a:xfrm>
+      </p:grpSpPr>
+      <p:sp>
+        <p:nvSpPr>
+          <p:cNvPr id="2" name="Title 1"/>
+          <p:cNvSpPr>
+            <a:spLocks noGrp="1"/>
+          </p:cNvSpPr>
+          <p:nvPr>
+            <p:ph type="title"/>
+          </p:nvPr>
+        </p:nvSpPr>
+        <p:spPr/>
+        <p:txBody>
+          <a:bodyPr/>
+          <a:lstStyle/>
+          <a:p>
+            <a:r>
+              <a:rPr lang="en-US" dirty="0" smtClean="0"/>
+              <a:t>Data Prep</a:t>
+            </a:r>
+            <a:endParaRPr lang="en-US" dirty="0"/>
+          </a:p>
+        </p:txBody>
+      </p:sp>
+      <p:sp>
+        <p:nvSpPr>
+          <p:cNvPr id="3" name="Content Placeholder 2"/>
+          <p:cNvSpPr>
+            <a:spLocks noGrp="1"/>
+          </p:cNvSpPr>
+          <p:nvPr>
+            <p:ph idx="1"/>
+          </p:nvPr>
+        </p:nvSpPr>
+        <p:spPr/>
+        <p:txBody>
+          <a:bodyPr/>
+          <a:lstStyle/>
+          <a:p>
+            <a:r>
+              <a:rPr lang="en-US" dirty="0" smtClean="0"/>
+              <a:t>Matt</a:t>
+            </a:r>
+          </a:p>
+          <a:p>
+            <a:endParaRPr lang="en-US" dirty="0"/>
+          </a:p>
+        </p:txBody>
+      </p:sp>
+      <p:sp>
+        <p:nvSpPr>
+          <p:cNvPr id="4" name="Slide Number Placeholder 3"/>
+          <p:cNvSpPr>
+            <a:spLocks noGrp="1"/>
+          </p:cNvSpPr>
+          <p:nvPr>
+            <p:ph type="sldNum" sz="quarter" idx="12"/>
+          </p:nvPr>
+        </p:nvSpPr>
+        <p:spPr/>
+        <p:txBody>
+          <a:bodyPr/>
+          <a:lstStyle/>
+          <a:p>
+            <a:fld id="{7B7DB76D-28D5-4DAC-900A-A1330999554A}" type="slidenum">
+              <a:rPr lang="en-US" smtClean="0"/>
+              <a:t>5</a:t>
+            </a:fld>
+            <a:endParaRPr lang="en-US"/>
+          </a:p>
+        </p:txBody>
+      </p:sp>
+    </p:spTree>
+    <p:extLst>
+      <p:ext uri="{BB962C8B-B14F-4D97-AF65-F5344CB8AC3E}">
+        <p14:creationId xmlns:p14="http://schemas.microsoft.com/office/powerpoint/2010/main" val="25843840"/>
+      </p:ext>
+    </p:extLst>
+  </p:cSld>
+  <p:clrMapOvr>
+    <a:masterClrMapping/>
+  </p:clrMapOvr>
+</p:sld>
+</file>
+
+<file path=ppt/slides/slide6.xml><?xml version="1.0" encoding="utf-8"?>
+<p:sld xmlns:a="http://schemas.openxmlformats.org/drawingml/2006/main" xmlns:r="http://schemas.openxmlformats.org/officeDocument/2006/relationships" xmlns:p="http://schemas.openxmlformats.org/presentationml/2006/main">
+  <p:cSld>
+    <p:spTree>
+      <p:nvGrpSpPr>
+        <p:cNvPr id="1" name=""/>
+        <p:cNvGrpSpPr/>
+        <p:nvPr/>
+      </p:nvGrpSpPr>
+      <p:grpSpPr>
+        <a:xfrm>
+          <a:off x="0" y="0"/>
+          <a:ext cx="0" cy="0"/>
+          <a:chOff x="0" y="0"/>
+          <a:chExt cx="0" cy="0"/>
+        </a:xfrm>
+      </p:grpSpPr>
+      <p:sp>
+        <p:nvSpPr>
+          <p:cNvPr id="2" name="Title 1"/>
+          <p:cNvSpPr>
+            <a:spLocks noGrp="1"/>
+          </p:cNvSpPr>
+          <p:nvPr>
+            <p:ph type="title"/>
+          </p:nvPr>
+        </p:nvSpPr>
+        <p:spPr/>
+        <p:txBody>
+          <a:bodyPr>
+            <a:normAutofit/>
+          </a:bodyPr>
+          <a:lstStyle/>
+          <a:p>
+            <a:pPr eaLnBrk="1" hangingPunct="1">
+              <a:defRPr/>
+            </a:pPr>
+            <a:r>
+              <a:rPr lang="en-US" dirty="0" smtClean="0">
+                <a:solidFill>
+                  <a:schemeClr val="tx2">
+                    <a:tint val="100000"/>
+                    <a:shade val="90000"/>
+                    <a:satMod val="250000"/>
+                    <a:alpha val="100000"/>
+                  </a:schemeClr>
+                </a:solidFill>
+              </a:rPr>
+              <a:t>What Do Data Scientists Do?</a:t>
+            </a:r>
+            <a:endParaRPr lang="en-US" dirty="0"/>
+          </a:p>
+        </p:txBody>
+      </p:sp>
+      <p:sp>
+        <p:nvSpPr>
+          <p:cNvPr id="4" name="Slide Number Placeholder 3"/>
+          <p:cNvSpPr>
+            <a:spLocks noGrp="1"/>
+          </p:cNvSpPr>
+          <p:nvPr>
+            <p:ph type="sldNum" sz="quarter" idx="12"/>
+          </p:nvPr>
+        </p:nvSpPr>
+        <p:spPr/>
+        <p:txBody>
+          <a:bodyPr/>
+          <a:lstStyle/>
+          <a:p>
+            <a:pPr>
+              <a:defRPr/>
+            </a:pPr>
+            <a:fld id="{F32DFCDF-66AA-4743-8F02-BF6E28551162}" type="slidenum">
+              <a:rPr lang="en-US" smtClean="0"/>
+              <a:pPr>
+                <a:defRPr/>
+              </a:pPr>
+              <a:t>6</a:t>
+            </a:fld>
+            <a:endParaRPr lang="en-US"/>
+          </a:p>
+        </p:txBody>
+      </p:sp>
+      <p:pic>
+        <p:nvPicPr>
+          <p:cNvPr id="2051" name="Picture 3"/>
+          <p:cNvPicPr>
+            <a:picLocks noGrp="1" noChangeAspect="1" noChangeArrowheads="1"/>
+          </p:cNvPicPr>
+          <p:nvPr>
+            <p:ph idx="1"/>
+          </p:nvPr>
+        </p:nvPicPr>
+        <p:blipFill>
+          <a:blip r:embed="rId2">
+            <a:extLst>
+              <a:ext uri="{28A0092B-C50C-407E-A947-70E740481C1C}">
+                <a14:useLocalDpi xmlns:a14="http://schemas.microsoft.com/office/drawing/2010/main" val="0"/>
+              </a:ext>
+            </a:extLst>
+          </a:blip>
+          <a:srcRect/>
+          <a:stretch>
+            <a:fillRect/>
+          </a:stretch>
+        </p:blipFill>
+        <p:spPr bwMode="auto">
+          <a:xfrm>
+            <a:off x="555812" y="1577788"/>
+            <a:ext cx="10936941" cy="4554071"/>
+          </a:xfrm>
+          <a:prstGeom prst="rect">
+            <a:avLst/>
+          </a:prstGeom>
+          <a:noFill/>
+          <a:ln>
+            <a:noFill/>
+          </a:ln>
+          <a:extLst>
+            <a:ext uri="{909E8E84-426E-40DD-AFC4-6F175D3DCCD1}">
+              <a14:hiddenFill xmlns:a14="http://schemas.microsoft.com/office/drawing/2010/main">
+                <a:solidFill>
+                  <a:schemeClr val="accent1"/>
+                </a:solidFill>
+              </a14:hiddenFill>
+            </a:ext>
+            <a:ext uri="{91240B29-F687-4F45-9708-019B960494DF}">
+              <a14:hiddenLine xmlns:a14="http://schemas.microsoft.com/office/drawing/2010/main" w="9525">
+                <a:solidFill>
+                  <a:schemeClr val="tx1"/>
+                </a:solidFill>
+                <a:miter lim="800000"/>
+                <a:headEnd/>
+                <a:tailEnd/>
+              </a14:hiddenLine>
+            </a:ext>
+          </a:extLst>
+        </p:spPr>
+      </p:pic>
+    </p:spTree>
+    <p:extLst>
+      <p:ext uri="{BB962C8B-B14F-4D97-AF65-F5344CB8AC3E}">
+        <p14:creationId xmlns:p14="http://schemas.microsoft.com/office/powerpoint/2010/main" val="1520420049"/>
+      </p:ext>
+    </p:extLst>
+  </p:cSld>
+  <p:clrMapOvr>
+    <a:masterClrMapping/>
+  </p:clrMapOvr>
+</p:sld>
+</file>
+
+<file path=ppt/slides/slide7.xml><?xml version="1.0" encoding="utf-8"?>
+<p:sld xmlns:a="http://schemas.openxmlformats.org/drawingml/2006/main" xmlns:r="http://schemas.openxmlformats.org/officeDocument/2006/relationships" xmlns:p="http://schemas.openxmlformats.org/presentationml/2006/main">
+  <p:cSld>
+    <p:spTree>
+      <p:nvGrpSpPr>
+        <p:cNvPr id="1" name=""/>
+        <p:cNvGrpSpPr/>
+        <p:nvPr/>
+      </p:nvGrpSpPr>
+      <p:grpSpPr>
+        <a:xfrm>
+          <a:off x="0" y="0"/>
+          <a:ext cx="0" cy="0"/>
+          <a:chOff x="0" y="0"/>
+          <a:chExt cx="0" cy="0"/>
+        </a:xfrm>
+      </p:grpSpPr>
+      <p:sp>
+        <p:nvSpPr>
+          <p:cNvPr id="2" name="Title 1"/>
+          <p:cNvSpPr>
+            <a:spLocks noGrp="1"/>
+          </p:cNvSpPr>
+          <p:nvPr>
+            <p:ph type="title"/>
+          </p:nvPr>
+        </p:nvSpPr>
+        <p:spPr/>
+        <p:txBody>
+          <a:bodyPr/>
+          <a:lstStyle/>
+          <a:p>
+            <a:r>
+              <a:rPr lang="en-US" dirty="0" smtClean="0"/>
+              <a:t>Processing and Cleaning the Data</a:t>
+            </a:r>
+            <a:endParaRPr lang="en-US" dirty="0"/>
+          </a:p>
+        </p:txBody>
+      </p:sp>
+      <p:sp>
+        <p:nvSpPr>
+          <p:cNvPr id="3" name="Content Placeholder 2"/>
+          <p:cNvSpPr>
+            <a:spLocks noGrp="1"/>
+          </p:cNvSpPr>
+          <p:nvPr>
+            <p:ph idx="1"/>
+          </p:nvPr>
+        </p:nvSpPr>
+        <p:spPr/>
+        <p:txBody>
+          <a:bodyPr/>
+          <a:lstStyle/>
+          <a:p>
+            <a:r>
+              <a:rPr lang="en-US" dirty="0" smtClean="0"/>
+              <a:t>Determine Important  Features</a:t>
+            </a:r>
+          </a:p>
+          <a:p>
+            <a:pPr lvl="1"/>
+            <a:r>
+              <a:rPr lang="en-US" dirty="0" smtClean="0"/>
+              <a:t>Age</a:t>
+            </a:r>
+          </a:p>
+          <a:p>
+            <a:pPr lvl="1"/>
+            <a:r>
+              <a:rPr lang="en-US" dirty="0" smtClean="0"/>
+              <a:t>Time</a:t>
+            </a:r>
+          </a:p>
+          <a:p>
+            <a:pPr lvl="1"/>
+            <a:r>
+              <a:rPr lang="en-US" dirty="0" smtClean="0"/>
+              <a:t>Year</a:t>
+            </a:r>
+          </a:p>
+          <a:p>
+            <a:r>
+              <a:rPr lang="en-US" dirty="0" smtClean="0"/>
+              <a:t>Investigate outliers </a:t>
+            </a:r>
+          </a:p>
+          <a:p>
+            <a:pPr lvl="1"/>
+            <a:r>
+              <a:rPr lang="en-US" dirty="0" smtClean="0"/>
+              <a:t>Age</a:t>
+            </a:r>
+          </a:p>
+          <a:p>
+            <a:pPr lvl="1"/>
+            <a:r>
+              <a:rPr lang="en-US" dirty="0" smtClean="0"/>
+              <a:t>Time</a:t>
+            </a:r>
+          </a:p>
+          <a:p>
+            <a:r>
+              <a:rPr lang="en-US" dirty="0" smtClean="0"/>
+              <a:t>Data Wrangling</a:t>
+            </a:r>
+            <a:endParaRPr lang="en-US" dirty="0"/>
+          </a:p>
+        </p:txBody>
+      </p:sp>
+      <p:sp>
+        <p:nvSpPr>
+          <p:cNvPr id="4" name="Slide Number Placeholder 3"/>
+          <p:cNvSpPr>
+            <a:spLocks noGrp="1"/>
+          </p:cNvSpPr>
+          <p:nvPr>
+            <p:ph type="sldNum" sz="quarter" idx="12"/>
+          </p:nvPr>
+        </p:nvSpPr>
+        <p:spPr/>
+        <p:txBody>
+          <a:bodyPr/>
+          <a:lstStyle/>
+          <a:p>
+            <a:fld id="{7B7DB76D-28D5-4DAC-900A-A1330999554A}" type="slidenum">
+              <a:rPr lang="en-US" smtClean="0"/>
+              <a:t>7</a:t>
+            </a:fld>
+            <a:endParaRPr lang="en-US"/>
+          </a:p>
+        </p:txBody>
+      </p:sp>
+    </p:spTree>
+    <p:extLst>
+      <p:ext uri="{BB962C8B-B14F-4D97-AF65-F5344CB8AC3E}">
+        <p14:creationId xmlns:p14="http://schemas.microsoft.com/office/powerpoint/2010/main" val="2405364122"/>
+      </p:ext>
+    </p:extLst>
+  </p:cSld>
+  <p:clrMapOvr>
+    <a:masterClrMapping/>
+  </p:clrMapOvr>
+</p:sld>
+</file>
+
+<file path=ppt/slides/slide8.xml><?xml version="1.0" encoding="utf-8"?>
+<p:sld xmlns:a="http://schemas.openxmlformats.org/drawingml/2006/main" xmlns:r="http://schemas.openxmlformats.org/officeDocument/2006/relationships" xmlns:p="http://schemas.openxmlformats.org/presentationml/2006/main">
+  <p:cSld>
+    <p:spTree>
+      <p:nvGrpSpPr>
+        <p:cNvPr id="1" name=""/>
+        <p:cNvGrpSpPr/>
+        <p:nvPr/>
+      </p:nvGrpSpPr>
+      <p:grpSpPr>
+        <a:xfrm>
+          <a:off x="0" y="0"/>
+          <a:ext cx="0" cy="0"/>
+          <a:chOff x="0" y="0"/>
+          <a:chExt cx="0" cy="0"/>
+        </a:xfrm>
+      </p:grpSpPr>
+      <p:sp>
+        <p:nvSpPr>
+          <p:cNvPr id="2" name="Title 1"/>
+          <p:cNvSpPr>
+            <a:spLocks noGrp="1"/>
+          </p:cNvSpPr>
+          <p:nvPr>
+            <p:ph type="title"/>
+          </p:nvPr>
+        </p:nvSpPr>
+        <p:spPr/>
+        <p:txBody>
+          <a:bodyPr/>
+          <a:lstStyle/>
+          <a:p>
+            <a:r>
+              <a:rPr lang="en-US" dirty="0" smtClean="0"/>
+              <a:t>Exploratory</a:t>
+            </a:r>
+            <a:endParaRPr lang="en-US" dirty="0"/>
+          </a:p>
+        </p:txBody>
+      </p:sp>
+      <p:sp>
+        <p:nvSpPr>
+          <p:cNvPr id="3" name="Content Placeholder 2"/>
+          <p:cNvSpPr>
+            <a:spLocks noGrp="1"/>
+          </p:cNvSpPr>
+          <p:nvPr>
+            <p:ph idx="1"/>
+          </p:nvPr>
+        </p:nvSpPr>
+        <p:spPr/>
+        <p:txBody>
+          <a:bodyPr/>
+          <a:lstStyle/>
+          <a:p>
+            <a:r>
+              <a:rPr lang="en-US" dirty="0" smtClean="0"/>
+              <a:t>Ben/Austin</a:t>
+            </a:r>
+            <a:endParaRPr lang="en-US" dirty="0"/>
+          </a:p>
+        </p:txBody>
+      </p:sp>
+      <p:sp>
+        <p:nvSpPr>
+          <p:cNvPr id="4" name="Slide Number Placeholder 3"/>
+          <p:cNvSpPr>
+            <a:spLocks noGrp="1"/>
+          </p:cNvSpPr>
+          <p:nvPr>
+            <p:ph type="sldNum" sz="quarter" idx="12"/>
+          </p:nvPr>
+        </p:nvSpPr>
+        <p:spPr/>
+        <p:txBody>
+          <a:bodyPr/>
+          <a:lstStyle/>
+          <a:p>
+            <a:fld id="{7B7DB76D-28D5-4DAC-900A-A1330999554A}" type="slidenum">
+              <a:rPr lang="en-US" smtClean="0"/>
+              <a:t>8</a:t>
+            </a:fld>
+            <a:endParaRPr lang="en-US"/>
+          </a:p>
+        </p:txBody>
+      </p:sp>
+    </p:spTree>
+    <p:extLst>
+      <p:ext uri="{BB962C8B-B14F-4D97-AF65-F5344CB8AC3E}">
+        <p14:creationId xmlns:p14="http://schemas.microsoft.com/office/powerpoint/2010/main" val="4270067039"/>
+      </p:ext>
+    </p:extLst>
+  </p:cSld>
+  <p:clrMapOvr>
+    <a:masterClrMapping/>
+  </p:clrMapOvr>
+  <p:timing>
+    <p:tnLst>
+      <p:par>
+        <p:cTn id="1" dur="indefinite" restart="never" nodeType="tmRoot"/>
+      </p:par>
+    </p:tnLst>
+  </p:timing>
 </p:sld>
 </file>
 
@@ -5973,7 +8388,7 @@
       </p:grpSpPr>
       <p:sp>
         <p:nvSpPr>
-          <p:cNvPr id="2" name="Title 1"/>
+          <p:cNvPr id="5" name="Title 4"/>
           <p:cNvSpPr>
             <a:spLocks noGrp="1"/>
           </p:cNvSpPr>
@@ -5988,20 +8403,76 @@
           <a:p>
             <a:r>
               <a:rPr lang="en-US" dirty="0" smtClean="0"/>
-              <a:t>Conclusion/Discussions</a:t>
+              <a:t>Men’s Runner Results - Age</a:t>
             </a:r>
             <a:endParaRPr lang="en-US" dirty="0"/>
           </a:p>
         </p:txBody>
       </p:sp>
-      <p:sp>
-        <p:nvSpPr>
-          <p:cNvPr id="3" name="Content Placeholder 2"/>
-          <p:cNvSpPr>
-            <a:spLocks noGrp="1"/>
-          </p:cNvSpPr>
-          <p:nvPr>
-            <p:ph idx="1"/>
+      <p:pic>
+        <p:nvPicPr>
+          <p:cNvPr id="1026" name="Picture 2"/>
+          <p:cNvPicPr>
+            <a:picLocks noGrp="1" noChangeAspect="1" noChangeArrowheads="1"/>
+          </p:cNvPicPr>
+          <p:nvPr>
+            <p:ph type="pic" idx="1"/>
+          </p:nvPr>
+        </p:nvPicPr>
+        <p:blipFill>
+          <a:blip r:embed="rId2">
+            <a:extLst>
+              <a:ext uri="{28A0092B-C50C-407E-A947-70E740481C1C}">
+                <a14:useLocalDpi xmlns:a14="http://schemas.microsoft.com/office/drawing/2010/main" val="0"/>
+              </a:ext>
+            </a:extLst>
+          </a:blip>
+          <a:srcRect l="3479" r="3479"/>
+          <a:stretch>
+            <a:fillRect/>
+          </a:stretch>
+        </p:blipFill>
+        <p:spPr bwMode="auto">
+          <a:xfrm>
+            <a:off x="5183188" y="1344708"/>
+            <a:ext cx="3512577" cy="2223245"/>
+          </a:xfrm>
+          <a:prstGeom prst="rect">
+            <a:avLst/>
+          </a:prstGeom>
+          <a:noFill/>
+          <a:ln>
+            <a:noFill/>
+          </a:ln>
+          <a:extLst>
+            <a:ext uri="{909E8E84-426E-40DD-AFC4-6F175D3DCCD1}">
+              <a14:hiddenFill xmlns:a14="http://schemas.microsoft.com/office/drawing/2010/main">
+                <a:solidFill>
+                  <a:schemeClr val="accent1"/>
+                </a:solidFill>
+              </a14:hiddenFill>
+            </a:ext>
+            <a:ext uri="{91240B29-F687-4F45-9708-019B960494DF}">
+              <a14:hiddenLine xmlns:a14="http://schemas.microsoft.com/office/drawing/2010/main" w="9525">
+                <a:solidFill>
+                  <a:schemeClr val="tx1"/>
+                </a:solidFill>
+                <a:miter lim="800000"/>
+                <a:headEnd/>
+                <a:tailEnd/>
+              </a14:hiddenLine>
+            </a:ext>
+          </a:extLst>
+        </p:spPr>
+      </p:pic>
+      <p:sp>
+        <p:nvSpPr>
+          <p:cNvPr id="6" name="Text Placeholder 5"/>
+          <p:cNvSpPr>
+            <a:spLocks noGrp="1"/>
+          </p:cNvSpPr>
+          <p:nvPr>
+            <p:ph type="body" sz="half" idx="2"/>
           </p:nvPr>
         </p:nvSpPr>
         <p:spPr/>
@@ -6011,22 +8482,231 @@
           <a:p>
             <a:r>
               <a:rPr lang="en-US" dirty="0" smtClean="0"/>
-              <a:t>All</a:t>
-            </a:r>
-            <a:endParaRPr lang="en-US" dirty="0"/>
-          </a:p>
-        </p:txBody>
-      </p:sp>
+              <a:t>Boxplots</a:t>
+            </a:r>
+          </a:p>
+          <a:p>
+            <a:r>
+              <a:rPr lang="en-US" dirty="0" smtClean="0"/>
+              <a:t>Histograms</a:t>
+            </a:r>
+          </a:p>
+          <a:p>
+            <a:r>
+              <a:rPr lang="en-US" dirty="0" smtClean="0"/>
+              <a:t>Density Plot</a:t>
+            </a:r>
+          </a:p>
+          <a:p>
+            <a:r>
+              <a:rPr lang="en-US" dirty="0" smtClean="0"/>
+              <a:t>QQ Plot</a:t>
+            </a:r>
+          </a:p>
+        </p:txBody>
+      </p:sp>
+      <p:sp>
+        <p:nvSpPr>
+          <p:cNvPr id="4" name="Slide Number Placeholder 3"/>
+          <p:cNvSpPr>
+            <a:spLocks noGrp="1"/>
+          </p:cNvSpPr>
+          <p:nvPr>
+            <p:ph type="sldNum" sz="quarter" idx="12"/>
+          </p:nvPr>
+        </p:nvSpPr>
+        <p:spPr/>
+        <p:txBody>
+          <a:bodyPr/>
+          <a:lstStyle/>
+          <a:p>
+            <a:fld id="{7B7DB76D-28D5-4DAC-900A-A1330999554A}" type="slidenum">
+              <a:rPr lang="en-US" smtClean="0"/>
+              <a:t>9</a:t>
+            </a:fld>
+            <a:endParaRPr lang="en-US"/>
+          </a:p>
+        </p:txBody>
+      </p:sp>
+      <p:pic>
+        <p:nvPicPr>
+          <p:cNvPr id="1027" name="Picture 3"/>
+          <p:cNvPicPr>
+            <a:picLocks noChangeAspect="1" noChangeArrowheads="1"/>
+          </p:cNvPicPr>
+          <p:nvPr/>
+        </p:nvPicPr>
+        <p:blipFill>
+          <a:blip r:embed="rId3">
+            <a:extLst>
+              <a:ext uri="{28A0092B-C50C-407E-A947-70E740481C1C}">
+                <a14:useLocalDpi xmlns:a14="http://schemas.microsoft.com/office/drawing/2010/main" val="0"/>
+              </a:ext>
+            </a:extLst>
+          </a:blip>
+          <a:srcRect/>
+          <a:stretch>
+            <a:fillRect/>
+          </a:stretch>
+        </p:blipFill>
+        <p:spPr bwMode="auto">
+          <a:xfrm>
+            <a:off x="5253319" y="3609695"/>
+            <a:ext cx="3496234" cy="2414587"/>
+          </a:xfrm>
+          <a:prstGeom prst="rect">
+            <a:avLst/>
+          </a:prstGeom>
+          <a:noFill/>
+          <a:ln>
+            <a:noFill/>
+          </a:ln>
+          <a:extLst>
+            <a:ext uri="{909E8E84-426E-40DD-AFC4-6F175D3DCCD1}">
+              <a14:hiddenFill xmlns:a14="http://schemas.microsoft.com/office/drawing/2010/main">
+                <a:solidFill>
+                  <a:schemeClr val="accent1"/>
+                </a:solidFill>
+              </a14:hiddenFill>
+            </a:ext>
+            <a:ext uri="{91240B29-F687-4F45-9708-019B960494DF}">
+              <a14:hiddenLine xmlns:a14="http://schemas.microsoft.com/office/drawing/2010/main" w="9525">
+                <a:solidFill>
+                  <a:schemeClr val="tx1"/>
+                </a:solidFill>
+                <a:miter lim="800000"/>
+                <a:headEnd/>
+                <a:tailEnd/>
+              </a14:hiddenLine>
+            </a:ext>
+          </a:extLst>
+        </p:spPr>
+      </p:pic>
+      <p:pic>
+        <p:nvPicPr>
+          <p:cNvPr id="1028" name="Picture 4"/>
+          <p:cNvPicPr>
+            <a:picLocks noChangeAspect="1" noChangeArrowheads="1"/>
+          </p:cNvPicPr>
+          <p:nvPr/>
+        </p:nvPicPr>
+        <p:blipFill>
+          <a:blip r:embed="rId4" cstate="print">
+            <a:extLst>
+              <a:ext uri="{28A0092B-C50C-407E-A947-70E740481C1C}">
+                <a14:useLocalDpi xmlns:a14="http://schemas.microsoft.com/office/drawing/2010/main" val="0"/>
+              </a:ext>
+            </a:extLst>
+          </a:blip>
+          <a:srcRect/>
+          <a:stretch>
+            <a:fillRect/>
+          </a:stretch>
+        </p:blipFill>
+        <p:spPr bwMode="auto">
+          <a:xfrm>
+            <a:off x="8749553" y="1293720"/>
+            <a:ext cx="2886634" cy="2315975"/>
+          </a:xfrm>
+          <a:prstGeom prst="rect">
+            <a:avLst/>
+          </a:prstGeom>
+          <a:noFill/>
+          <a:ln>
+            <a:noFill/>
+          </a:ln>
+          <a:extLst>
+            <a:ext uri="{909E8E84-426E-40DD-AFC4-6F175D3DCCD1}">
+              <a14:hiddenFill xmlns:a14="http://schemas.microsoft.com/office/drawing/2010/main">
+                <a:solidFill>
+                  <a:schemeClr val="accent1"/>
+                </a:solidFill>
+              </a14:hiddenFill>
+            </a:ext>
+            <a:ext uri="{91240B29-F687-4F45-9708-019B960494DF}">
+              <a14:hiddenLine xmlns:a14="http://schemas.microsoft.com/office/drawing/2010/main" w="9525">
+                <a:solidFill>
+                  <a:schemeClr val="tx1"/>
+                </a:solidFill>
+                <a:miter lim="800000"/>
+                <a:headEnd/>
+                <a:tailEnd/>
+              </a14:hiddenLine>
+            </a:ext>
+          </a:extLst>
+        </p:spPr>
+      </p:pic>
+      <p:pic>
+        <p:nvPicPr>
+          <p:cNvPr id="1029" name="Picture 5"/>
+          <p:cNvPicPr>
+            <a:picLocks noChangeAspect="1" noChangeArrowheads="1"/>
+          </p:cNvPicPr>
+          <p:nvPr/>
+        </p:nvPicPr>
+        <p:blipFill>
+          <a:blip r:embed="rId5" cstate="print">
+            <a:extLst>
+              <a:ext uri="{28A0092B-C50C-407E-A947-70E740481C1C}">
+                <a14:useLocalDpi xmlns:a14="http://schemas.microsoft.com/office/drawing/2010/main" val="0"/>
+              </a:ext>
+            </a:extLst>
+          </a:blip>
+          <a:srcRect/>
+          <a:stretch>
+            <a:fillRect/>
+          </a:stretch>
+        </p:blipFill>
+        <p:spPr bwMode="auto">
+          <a:xfrm>
+            <a:off x="8901041" y="3412472"/>
+            <a:ext cx="2960967" cy="2414587"/>
+          </a:xfrm>
+          <a:prstGeom prst="rect">
+            <a:avLst/>
+          </a:prstGeom>
+          <a:noFill/>
+          <a:ln>
+            <a:noFill/>
+          </a:ln>
+          <a:extLst>
+            <a:ext uri="{909E8E84-426E-40DD-AFC4-6F175D3DCCD1}">
+              <a14:hiddenFill xmlns:a14="http://schemas.microsoft.com/office/drawing/2010/main">
+                <a:solidFill>
+                  <a:schemeClr val="accent1"/>
+                </a:solidFill>
+              </a14:hiddenFill>
+            </a:ext>
+            <a:ext uri="{91240B29-F687-4F45-9708-019B960494DF}">
+              <a14:hiddenLine xmlns:a14="http://schemas.microsoft.com/office/drawing/2010/main" w="9525">
+                <a:solidFill>
+                  <a:schemeClr val="tx1"/>
+                </a:solidFill>
+                <a:miter lim="800000"/>
+                <a:headEnd/>
+                <a:tailEnd/>
+              </a14:hiddenLine>
+            </a:ext>
+          </a:extLst>
+        </p:spPr>
+      </p:pic>
     </p:spTree>
     <p:extLst>
       <p:ext uri="{BB962C8B-B14F-4D97-AF65-F5344CB8AC3E}">
-        <p14:creationId xmlns:p14="http://schemas.microsoft.com/office/powerpoint/2010/main" val="721653042"/>
+        <p14:creationId xmlns:p14="http://schemas.microsoft.com/office/powerpoint/2010/main" val="1810542516"/>
       </p:ext>
     </p:extLst>
   </p:cSld>
   <p:clrMapOvr>
     <a:masterClrMapping/>
   </p:clrMapOvr>
+  <p:timing>
+    <p:tnLst>
+      <p:par>
+        <p:cTn id="1" dur="indefinite" restart="never" nodeType="tmRoot"/>
+      </p:par>
+    </p:tnLst>
+  </p:timing>
 </p:sld>
 </file>
 
@@ -6285,8 +8965,293 @@
   <a:extraClrSchemeLst/>
   <a:extLst>
     <a:ext uri="{05A4C25C-085E-4340-85A3-A5531E510DB2}">
-      <thm15:themeFamily xmlns:thm15="http://schemas.microsoft.com/office/thememl/2012/main" name="Office Theme" id="{62F939B6-93AF-4DB8-9C6B-D6C7DFDC589F}" vid="{4A3C46E8-61CC-4603-A589-7422A47A8E4A}"/>
+      <thm15:themeFamily xmlns="" xmlns:thm15="http://schemas.microsoft.com/office/thememl/2012/main" name="Office Theme" id="{62F939B6-93AF-4DB8-9C6B-D6C7DFDC589F}" vid="{4A3C46E8-61CC-4603-A589-7422A47A8E4A}"/>
     </a:ext>
   </a:extLst>
 </a:theme>
+</file>
+
+<file path=ppt/theme/theme2.xml><?xml version="1.0" encoding="utf-8"?>
+<a:theme xmlns:a="http://schemas.openxmlformats.org/drawingml/2006/main" name="Office Theme">
+  <a:themeElements>
+    <a:clrScheme name="Office">
+      <a:dk1>
+        <a:sysClr val="windowText" lastClr="000000"/>
+      </a:dk1>
+      <a:lt1>
+        <a:sysClr val="window" lastClr="FFFFFF"/>
+      </a:lt1>
+      <a:dk2>
+        <a:srgbClr val="1F497D"/>
+      </a:dk2>
+      <a:lt2>
+        <a:srgbClr val="EEECE1"/>
+      </a:lt2>
+      <a:accent1>
+        <a:srgbClr val="4F81BD"/>
+      </a:accent1>
+      <a:accent2>
+        <a:srgbClr val="C0504D"/>
+      </a:accent2>
+      <a:accent3>
+        <a:srgbClr val="9BBB59"/>
+      </a:accent3>
+      <a:accent4>
+        <a:srgbClr val="8064A2"/>
+      </a:accent4>
+      <a:accent5>
+        <a:srgbClr val="4BACC6"/>
+      </a:accent5>
+      <a:accent6>
+        <a:srgbClr val="F79646"/>
+      </a:accent6>
+      <a:hlink>
+        <a:srgbClr val="0000FF"/>
+      </a:hlink>
+      <a:folHlink>
+        <a:srgbClr val="800080"/>
+      </a:folHlink>
+    </a:clrScheme>
+    <a:fontScheme name="Office">
+      <a:majorFont>
+        <a:latin typeface="Calibri"/>
+        <a:ea typeface=""/>
+        <a:cs typeface=""/>
+        <a:font script="Jpan" typeface="ＭＳ Ｐゴシック"/>
+        <a:font script="Hang" typeface="맑은 고딕"/>
+        <a:font script="Hans" typeface="宋体"/>
+        <a:font script="Hant" typeface="新細明體"/>
+        <a:font script="Arab" typeface="Times New Roman"/>
+        <a:font script="Hebr" typeface="Times New Roman"/>
+        <a:font script="Thai" typeface="Angsana New"/>
+        <a:font script="Ethi" typeface="Nyala"/>
+        <a:font script="Beng" typeface="Vrinda"/>
+        <a:font script="Gujr" typeface="Shruti"/>
+        <a:font script="Khmr" typeface="MoolBoran"/>
+        <a:font script="Knda" typeface="Tunga"/>
+        <a:font script="Guru" typeface="Raavi"/>
+        <a:font script="Cans" typeface="Euphemia"/>
+        <a:font script="Cher" typeface="Plantagenet Cherokee"/>
+        <a:font script="Yiii" typeface="Microsoft Yi Baiti"/>
+        <a:font script="Tibt" typeface="Microsoft Himalaya"/>
+        <a:font script="Thaa" typeface="MV Boli"/>
+        <a:font script="Deva" typeface="Mangal"/>
+        <a:font script="Telu" typeface="Gautami"/>
+        <a:font script="Taml" typeface="Latha"/>
+        <a:font script="Syrc" typeface="Estrangelo Edessa"/>
+        <a:font script="Orya" typeface="Kalinga"/>
+        <a:font script="Mlym" typeface="Kartika"/>
+        <a:font script="Laoo" typeface="DokChampa"/>
+        <a:font script="Sinh" typeface="Iskoola Pota"/>
+        <a:font script="Mong" typeface="Mongolian Baiti"/>
+        <a:font script="Viet" typeface="Times New Roman"/>
+        <a:font script="Uigh" typeface="Microsoft Uighur"/>
+        <a:font script="Geor" typeface="Sylfaen"/>
+      </a:majorFont>
+      <a:minorFont>
+        <a:latin typeface="Calibri"/>
+        <a:ea typeface=""/>
+        <a:cs typeface=""/>
+        <a:font script="Jpan" typeface="ＭＳ Ｐゴシック"/>
+        <a:font script="Hang" typeface="맑은 고딕"/>
+        <a:font script="Hans" typeface="宋体"/>
+        <a:font script="Hant" typeface="新細明體"/>
+        <a:font script="Arab" typeface="Arial"/>
+        <a:font script="Hebr" typeface="Arial"/>
+        <a:font script="Thai" typeface="Cordia New"/>
+        <a:font script="Ethi" typeface="Nyala"/>
+        <a:font script="Beng" typeface="Vrinda"/>
+        <a:font script="Gujr" typeface="Shruti"/>
+        <a:font script="Khmr" typeface="DaunPenh"/>
+        <a:font script="Knda" typeface="Tunga"/>
+        <a:font script="Guru" typeface="Raavi"/>
+        <a:font script="Cans" typeface="Euphemia"/>
+        <a:font script="Cher" typeface="Plantagenet Cherokee"/>
+        <a:font script="Yiii" typeface="Microsoft Yi Baiti"/>
+        <a:font script="Tibt" typeface="Microsoft Himalaya"/>
+        <a:font script="Thaa" typeface="MV Boli"/>
+        <a:font script="Deva" typeface="Mangal"/>
+        <a:font script="Telu" typeface="Gautami"/>
+        <a:font script="Taml" typeface="Latha"/>
+        <a:font script="Syrc" typeface="Estrangelo Edessa"/>
+        <a:font script="Orya" typeface="Kalinga"/>
+        <a:font script="Mlym" typeface="Kartika"/>
+        <a:font script="Laoo" typeface="DokChampa"/>
+        <a:font script="Sinh" typeface="Iskoola Pota"/>
+        <a:font script="Mong" typeface="Mongolian Baiti"/>
+        <a:font script="Viet" typeface="Arial"/>
+        <a:font script="Uigh" typeface="Microsoft Uighur"/>
+        <a:font script="Geor" typeface="Sylfaen"/>
+      </a:minorFont>
+    </a:fontScheme>
+    <a:fmtScheme name="Office">
+      <a:fillStyleLst>
+        <a:solidFill>
+          <a:schemeClr val="phClr"/>
+        </a:solidFill>
+        <a:gradFill rotWithShape="1">
+          <a:gsLst>
+            <a:gs pos="0">
+              <a:schemeClr val="phClr">
+                <a:tint val="50000"/>
+                <a:satMod val="300000"/>
+              </a:schemeClr>
+            </a:gs>
+            <a:gs pos="35000">
+              <a:schemeClr val="phClr">
+                <a:tint val="37000"/>
+                <a:satMod val="300000"/>
+              </a:schemeClr>
+            </a:gs>
+            <a:gs pos="100000">
+              <a:schemeClr val="phClr">
+                <a:tint val="15000"/>
+                <a:satMod val="350000"/>
+              </a:schemeClr>
+            </a:gs>
+          </a:gsLst>
+          <a:lin ang="16200000" scaled="1"/>
+        </a:gradFill>
+        <a:gradFill rotWithShape="1">
+          <a:gsLst>
+            <a:gs pos="0">
+              <a:schemeClr val="phClr">
+                <a:shade val="51000"/>
+                <a:satMod val="130000"/>
+              </a:schemeClr>
+            </a:gs>
+            <a:gs pos="80000">
+              <a:schemeClr val="phClr">
+                <a:shade val="93000"/>
+                <a:satMod val="130000"/>
+              </a:schemeClr>
+            </a:gs>
+            <a:gs pos="100000">
+              <a:schemeClr val="phClr">
+                <a:shade val="94000"/>
+                <a:satMod val="135000"/>
+              </a:schemeClr>
+            </a:gs>
+          </a:gsLst>
+          <a:lin ang="16200000" scaled="0"/>
+        </a:gradFill>
+      </a:fillStyleLst>
+      <a:lnStyleLst>
+        <a:ln w="9525" cap="flat" cmpd="sng" algn="ctr">
+          <a:solidFill>
+            <a:schemeClr val="phClr">
+              <a:shade val="95000"/>
+              <a:satMod val="105000"/>
+            </a:schemeClr>
+          </a:solidFill>
+          <a:prstDash val="solid"/>
+        </a:ln>
+        <a:ln w="25400" cap="flat" cmpd="sng" algn="ctr">
+          <a:solidFill>
+            <a:schemeClr val="phClr"/>
+          </a:solidFill>
+          <a:prstDash val="solid"/>
+        </a:ln>
+        <a:ln w="38100" cap="flat" cmpd="sng" algn="ctr">
+          <a:solidFill>
+            <a:schemeClr val="phClr"/>
+          </a:solidFill>
+          <a:prstDash val="solid"/>
+        </a:ln>
+      </a:lnStyleLst>
+      <a:effectStyleLst>
+        <a:effectStyle>
+          <a:effectLst>
+            <a:outerShdw blurRad="40000" dist="20000" dir="5400000" rotWithShape="0">
+              <a:srgbClr val="000000">
+                <a:alpha val="38000"/>
+              </a:srgbClr>
+            </a:outerShdw>
+          </a:effectLst>
+        </a:effectStyle>
+        <a:effectStyle>
+          <a:effectLst>
+            <a:outerShdw blurRad="40000" dist="23000" dir="5400000" rotWithShape="0">
+              <a:srgbClr val="000000">
+                <a:alpha val="35000"/>
+              </a:srgbClr>
+            </a:outerShdw>
+          </a:effectLst>
+        </a:effectStyle>
+        <a:effectStyle>
+          <a:effectLst>
+            <a:outerShdw blurRad="40000" dist="23000" dir="5400000" rotWithShape="0">
+              <a:srgbClr val="000000">
+                <a:alpha val="35000"/>
+              </a:srgbClr>
+            </a:outerShdw>
+          </a:effectLst>
+          <a:scene3d>
+            <a:camera prst="orthographicFront">
+              <a:rot lat="0" lon="0" rev="0"/>
+            </a:camera>
+            <a:lightRig rig="threePt" dir="t">
+              <a:rot lat="0" lon="0" rev="1200000"/>
+            </a:lightRig>
+          </a:scene3d>
+          <a:sp3d>
+            <a:bevelT w="63500" h="25400"/>
+          </a:sp3d>
+        </a:effectStyle>
+      </a:effectStyleLst>
+      <a:bgFillStyleLst>
+        <a:solidFill>
+          <a:schemeClr val="phClr"/>
+        </a:solidFill>
+        <a:gradFill rotWithShape="1">
+          <a:gsLst>
+            <a:gs pos="0">
+              <a:schemeClr val="phClr">
+                <a:tint val="40000"/>
+                <a:satMod val="350000"/>
+              </a:schemeClr>
+            </a:gs>
+            <a:gs pos="40000">
+              <a:schemeClr val="phClr">
+                <a:tint val="45000"/>
+                <a:shade val="99000"/>
+                <a:satMod val="350000"/>
+              </a:schemeClr>
+            </a:gs>
+            <a:gs pos="100000">
+              <a:schemeClr val="phClr">
+                <a:shade val="20000"/>
+                <a:satMod val="255000"/>
+              </a:schemeClr>
+            </a:gs>
+          </a:gsLst>
+          <a:path path="circle">
+            <a:fillToRect l="50000" t="-80000" r="50000" b="180000"/>
+          </a:path>
+        </a:gradFill>
+        <a:gradFill rotWithShape="1">
+          <a:gsLst>
+            <a:gs pos="0">
+              <a:schemeClr val="phClr">
+                <a:tint val="80000"/>
+                <a:satMod val="300000"/>
+              </a:schemeClr>
+            </a:gs>
+            <a:gs pos="100000">
+              <a:schemeClr val="phClr">
+                <a:shade val="30000"/>
+                <a:satMod val="200000"/>
+              </a:schemeClr>
+            </a:gs>
+          </a:gsLst>
+          <a:path path="circle">
+            <a:fillToRect l="50000" t="50000" r="50000" b="50000"/>
+          </a:path>
+        </a:gradFill>
+      </a:bgFillStyleLst>
+    </a:fmtScheme>
+  </a:themeElements>
+  <a:objectDefaults/>
+  <a:extraClrSchemeLst/>
+</a:theme>
 </file>
</xml_diff>

<commit_message>
Add age-group to the Data Wrangling area (slide 7)
Add age-group to the Data Wrangling area (slide 7)
</commit_message>
<xml_diff>
--- a/infographic.pptx
+++ b/infographic.pptx
@@ -125,7 +125,7 @@
   </p:defaultTextStyle>
   <p:extLst>
     <p:ext uri="{EFAFB233-063F-42B5-8137-9DF3F51BA10A}">
-      <p15:sldGuideLst xmlns="" xmlns:p15="http://schemas.microsoft.com/office/powerpoint/2012/main"/>
+      <p15:sldGuideLst xmlns:p15="http://schemas.microsoft.com/office/powerpoint/2012/main" xmlns=""/>
     </p:ext>
   </p:extLst>
 </p:presentation>
@@ -4858,11 +4858,7 @@
             </a:r>
             <a:r>
               <a:rPr lang="en-US" smtClean="0"/>
-              <a:t>groups </a:t>
-            </a:r>
-            <a:r>
-              <a:rPr lang="en-US" smtClean="0"/>
-              <a:t>variances</a:t>
+              <a:t>groups variances</a:t>
             </a:r>
             <a:endParaRPr lang="en-US" dirty="0"/>
           </a:p>
@@ -8221,7 +8217,18 @@
           <a:p>
             <a:r>
               <a:rPr lang="en-US" dirty="0" smtClean="0"/>
-              <a:t>Data Wrangling</a:t>
+              <a:t>Data </a:t>
+            </a:r>
+            <a:r>
+              <a:rPr lang="en-US" dirty="0" smtClean="0"/>
+              <a:t>Wrangling</a:t>
+            </a:r>
+          </a:p>
+          <a:p>
+            <a:pPr lvl="1"/>
+            <a:r>
+              <a:rPr lang="en-US" dirty="0" smtClean="0"/>
+              <a:t>Age-Group</a:t>
             </a:r>
             <a:endParaRPr lang="en-US" dirty="0"/>
           </a:p>
@@ -8965,7 +8972,7 @@
   <a:extraClrSchemeLst/>
   <a:extLst>
     <a:ext uri="{05A4C25C-085E-4340-85A3-A5531E510DB2}">
-      <thm15:themeFamily xmlns="" xmlns:thm15="http://schemas.microsoft.com/office/thememl/2012/main" name="Office Theme" id="{62F939B6-93AF-4DB8-9C6B-D6C7DFDC589F}" vid="{4A3C46E8-61CC-4603-A589-7422A47A8E4A}"/>
+      <thm15:themeFamily xmlns:thm15="http://schemas.microsoft.com/office/thememl/2012/main" xmlns="" name="Office Theme" id="{62F939B6-93AF-4DB8-9C6B-D6C7DFDC589F}" vid="{4A3C46E8-61CC-4603-A589-7422A47A8E4A}"/>
     </a:ext>
   </a:extLst>
 </a:theme>

</xml_diff>

<commit_message>
Added title page, abstract and started on background.
More to come
</commit_message>
<xml_diff>
--- a/infographic.pptx
+++ b/infographic.pptx
@@ -125,7 +125,18 @@
   </p:defaultTextStyle>
   <p:extLst>
     <p:ext uri="{EFAFB233-063F-42B5-8137-9DF3F51BA10A}">
-      <p15:sldGuideLst xmlns:p15="http://schemas.microsoft.com/office/powerpoint/2012/main" xmlns=""/>
+      <p15:sldGuideLst xmlns:p15="http://schemas.microsoft.com/office/powerpoint/2012/main">
+        <p15:guide id="1" orient="horz" pos="2160">
+          <p15:clr>
+            <a:srgbClr val="A4A3A4"/>
+          </p15:clr>
+        </p15:guide>
+        <p15:guide id="2" pos="3840">
+          <p15:clr>
+            <a:srgbClr val="A4A3A4"/>
+          </p15:clr>
+        </p15:guide>
+      </p15:sldGuideLst>
     </p:ext>
   </p:extLst>
 </p:presentation>
@@ -3339,6 +3350,47 @@
           <a:chExt cx="0" cy="0"/>
         </a:xfrm>
       </p:grpSpPr>
+      <p:pic>
+        <p:nvPicPr>
+          <p:cNvPr id="1026" name="Picture 2" descr="Image result for Cherry Blossom png"/>
+          <p:cNvPicPr>
+            <a:picLocks noChangeArrowheads="1"/>
+          </p:cNvPicPr>
+          <p:nvPr/>
+        </p:nvPicPr>
+        <p:blipFill>
+          <a:blip r:embed="rId2">
+            <a:extLst>
+              <a:ext uri="{28A0092B-C50C-407E-A947-70E740481C1C}">
+                <a14:useLocalDpi xmlns:a14="http://schemas.microsoft.com/office/drawing/2010/main" val="0"/>
+              </a:ext>
+            </a:extLst>
+          </a:blip>
+          <a:srcRect/>
+          <a:stretch>
+            <a:fillRect/>
+          </a:stretch>
+        </p:blipFill>
+        <p:spPr bwMode="auto">
+          <a:xfrm>
+            <a:off x="0" y="-1"/>
+            <a:ext cx="12192000" cy="6858001"/>
+          </a:xfrm>
+          <a:prstGeom prst="rect">
+            <a:avLst/>
+          </a:prstGeom>
+          <a:noFill/>
+          <a:extLst>
+            <a:ext uri="{909E8E84-426E-40DD-AFC4-6F175D3DCCD1}">
+              <a14:hiddenFill xmlns:a14="http://schemas.microsoft.com/office/drawing/2010/main">
+                <a:solidFill>
+                  <a:srgbClr val="FFFFFF"/>
+                </a:solidFill>
+              </a14:hiddenFill>
+            </a:ext>
+          </a:extLst>
+        </p:spPr>
+      </p:pic>
       <p:sp>
         <p:nvSpPr>
           <p:cNvPr id="2" name="Title 1"/>
@@ -3356,7 +3408,14 @@
           <a:p>
             <a:r>
               <a:rPr lang="en-US" dirty="0" smtClean="0"/>
-              <a:t>Title</a:t>
+              <a:t>Case Study 08</a:t>
+            </a:r>
+            <a:br>
+              <a:rPr lang="en-US" dirty="0" smtClean="0"/>
+            </a:br>
+            <a:r>
+              <a:rPr lang="en-US" sz="4400" dirty="0" smtClean="0"/>
+              <a:t>Chapter 2, Question 10</a:t>
             </a:r>
             <a:endParaRPr lang="en-US" dirty="0"/>
           </a:p>
@@ -3377,7 +3436,19 @@
           <a:bodyPr/>
           <a:lstStyle/>
           <a:p>
-            <a:endParaRPr lang="en-US"/>
+            <a:r>
+              <a:rPr lang="en-US" i="1" dirty="0" smtClean="0"/>
+              <a:t>Matthew </a:t>
+            </a:r>
+            <a:r>
+              <a:rPr lang="en-US" i="1" dirty="0" err="1" smtClean="0"/>
+              <a:t>Baldree</a:t>
+            </a:r>
+            <a:r>
+              <a:rPr lang="en-US" i="1" dirty="0" smtClean="0"/>
+              <a:t>, Ben Brock, Tom Elkins, Austin Kelly</a:t>
+            </a:r>
+            <a:endParaRPr lang="en-US" i="1" dirty="0"/>
           </a:p>
         </p:txBody>
       </p:sp>
@@ -5349,7 +5420,7 @@
                         <m:chr m:val="̅"/>
                         <m:ctrlPr>
                           <a:rPr lang="en-US" sz="1400" i="1" dirty="0" smtClean="0">
-                            <a:latin typeface="Cambria Math"/>
+                            <a:latin typeface="Cambria Math" panose="02040503050406030204" pitchFamily="18" charset="0"/>
                           </a:rPr>
                         </m:ctrlPr>
                       </m:accPr>
@@ -5605,7 +5676,7 @@
                         <m:chr m:val="̅"/>
                         <m:ctrlPr>
                           <a:rPr lang="en-US" sz="1400" i="1" dirty="0" smtClean="0">
-                            <a:latin typeface="Cambria Math"/>
+                            <a:latin typeface="Cambria Math" panose="02040503050406030204" pitchFamily="18" charset="0"/>
                           </a:rPr>
                         </m:ctrlPr>
                       </m:accPr>
@@ -7609,17 +7680,20 @@
             <p:ph idx="1"/>
           </p:nvPr>
         </p:nvSpPr>
-        <p:spPr/>
-        <p:txBody>
-          <a:bodyPr/>
-          <a:lstStyle/>
-          <a:p>
-            <a:r>
-              <a:rPr lang="en-US" dirty="0" smtClean="0"/>
-              <a:t>Austin</a:t>
-            </a:r>
-          </a:p>
-          <a:p>
+        <p:spPr>
+          <a:xfrm>
+            <a:off x="838200" y="2005012"/>
+            <a:ext cx="10515600" cy="4351338"/>
+          </a:xfrm>
+        </p:spPr>
+        <p:txBody>
+          <a:bodyPr/>
+          <a:lstStyle/>
+          <a:p>
+            <a:r>
+              <a:rPr lang="en-US" i="1" dirty="0" smtClean="0"/>
+              <a:t>We will be analyzing data from the annual Washington D.C. Cherry Blossom Race; Years: 1999-2012. There is a noticeable difference of age distribution over the years along with average run times. We will use statistical methods to explore and examine the change of the runners over time to help determine significant events in the history of the race.</a:t>
+            </a:r>
             <a:endParaRPr lang="en-US" dirty="0"/>
           </a:p>
         </p:txBody>
@@ -7647,6 +7721,30 @@
           </a:p>
         </p:txBody>
       </p:sp>
+      <p:pic>
+        <p:nvPicPr>
+          <p:cNvPr id="5" name="Picture 4"/>
+          <p:cNvPicPr>
+            <a:picLocks noChangeAspect="1"/>
+          </p:cNvPicPr>
+          <p:nvPr/>
+        </p:nvPicPr>
+        <p:blipFill>
+          <a:blip r:embed="rId2"/>
+          <a:stretch>
+            <a:fillRect/>
+          </a:stretch>
+        </p:blipFill>
+        <p:spPr>
+          <a:xfrm>
+            <a:off x="7314856" y="365125"/>
+            <a:ext cx="4591050" cy="1390650"/>
+          </a:xfrm>
+          <a:prstGeom prst="rect">
+            <a:avLst/>
+          </a:prstGeom>
+        </p:spPr>
+      </p:pic>
     </p:spTree>
     <p:extLst>
       <p:ext uri="{BB962C8B-B14F-4D97-AF65-F5344CB8AC3E}">
@@ -7717,8 +7815,35 @@
           <a:p>
             <a:r>
               <a:rPr lang="en-US" dirty="0" smtClean="0"/>
-              <a:t>Austin</a:t>
-            </a:r>
+              <a:t>The primary focus of this case study: </a:t>
+            </a:r>
+            <a:r>
+              <a:rPr lang="en-US" i="1" dirty="0" smtClean="0"/>
+              <a:t>“Getting the data into the right format”</a:t>
+            </a:r>
+            <a:endParaRPr lang="en-US" dirty="0" smtClean="0"/>
+          </a:p>
+          <a:p>
+            <a:r>
+              <a:rPr lang="en-US" dirty="0" smtClean="0"/>
+              <a:t>The results of each year of the race must be scraped from </a:t>
+            </a:r>
+            <a:r>
+              <a:rPr lang="en-US" dirty="0" smtClean="0">
+                <a:hlinkClick r:id="rId2"/>
+              </a:rPr>
+              <a:t>www.cherryblossom.org</a:t>
+            </a:r>
+            <a:r>
+              <a:rPr lang="en-US" dirty="0" smtClean="0"/>
+              <a:t> with multiple </a:t>
+            </a:r>
+            <a:r>
+              <a:rPr lang="en-US" smtClean="0"/>
+              <a:t>formats  covering many years</a:t>
+            </a:r>
+          </a:p>
+          <a:p>
             <a:endParaRPr lang="en-US" dirty="0"/>
           </a:p>
         </p:txBody>
@@ -8217,11 +8342,7 @@
           <a:p>
             <a:r>
               <a:rPr lang="en-US" dirty="0" smtClean="0"/>
-              <a:t>Data </a:t>
-            </a:r>
-            <a:r>
-              <a:rPr lang="en-US" dirty="0" smtClean="0"/>
-              <a:t>Wrangling</a:t>
+              <a:t>Data Wrangling</a:t>
             </a:r>
           </a:p>
           <a:p>
@@ -8972,7 +9093,7 @@
   <a:extraClrSchemeLst/>
   <a:extLst>
     <a:ext uri="{05A4C25C-085E-4340-85A3-A5531E510DB2}">
-      <thm15:themeFamily xmlns:thm15="http://schemas.microsoft.com/office/thememl/2012/main" xmlns="" name="Office Theme" id="{62F939B6-93AF-4DB8-9C6B-D6C7DFDC589F}" vid="{4A3C46E8-61CC-4603-A589-7422A47A8E4A}"/>
+      <thm15:themeFamily xmlns:thm15="http://schemas.microsoft.com/office/thememl/2012/main" name="Office Theme" id="{62F939B6-93AF-4DB8-9C6B-D6C7DFDC589F}" vid="{4A3C46E8-61CC-4603-A589-7422A47A8E4A}"/>
     </a:ext>
   </a:extLst>
 </a:theme>

</xml_diff>

<commit_message>
Merged Matt's files into Master
</commit_message>
<xml_diff>
--- a/infographic.pptx
+++ b/infographic.pptx
@@ -5,7 +5,7 @@
     <p:sldMasterId id="2147483660" r:id="rId1"/>
   </p:sldMasterIdLst>
   <p:notesMasterIdLst>
-    <p:notesMasterId r:id="rId21"/>
+    <p:notesMasterId r:id="rId23"/>
   </p:notesMasterIdLst>
   <p:sldIdLst>
     <p:sldId id="257" r:id="rId2"/>
@@ -13,20 +13,22 @@
     <p:sldId id="262" r:id="rId4"/>
     <p:sldId id="259" r:id="rId5"/>
     <p:sldId id="264" r:id="rId6"/>
-    <p:sldId id="273" r:id="rId7"/>
-    <p:sldId id="274" r:id="rId8"/>
-    <p:sldId id="260" r:id="rId9"/>
-    <p:sldId id="268" r:id="rId10"/>
-    <p:sldId id="279" r:id="rId11"/>
-    <p:sldId id="269" r:id="rId12"/>
-    <p:sldId id="280" r:id="rId13"/>
-    <p:sldId id="270" r:id="rId14"/>
-    <p:sldId id="271" r:id="rId15"/>
-    <p:sldId id="275" r:id="rId16"/>
-    <p:sldId id="277" r:id="rId17"/>
-    <p:sldId id="278" r:id="rId18"/>
-    <p:sldId id="256" r:id="rId19"/>
-    <p:sldId id="261" r:id="rId20"/>
+    <p:sldId id="281" r:id="rId7"/>
+    <p:sldId id="282" r:id="rId8"/>
+    <p:sldId id="273" r:id="rId9"/>
+    <p:sldId id="274" r:id="rId10"/>
+    <p:sldId id="260" r:id="rId11"/>
+    <p:sldId id="268" r:id="rId12"/>
+    <p:sldId id="279" r:id="rId13"/>
+    <p:sldId id="269" r:id="rId14"/>
+    <p:sldId id="280" r:id="rId15"/>
+    <p:sldId id="270" r:id="rId16"/>
+    <p:sldId id="271" r:id="rId17"/>
+    <p:sldId id="275" r:id="rId18"/>
+    <p:sldId id="277" r:id="rId19"/>
+    <p:sldId id="278" r:id="rId20"/>
+    <p:sldId id="256" r:id="rId21"/>
+    <p:sldId id="261" r:id="rId22"/>
   </p:sldIdLst>
   <p:sldSz cx="12192000" cy="6858000"/>
   <p:notesSz cx="6858000" cy="9144000"/>
@@ -567,7 +569,7 @@
           <a:p>
             <a:fld id="{BE9E425B-2894-4318-AA7F-42BC23137CA4}" type="slidenum">
               <a:rPr lang="en-US" smtClean="0"/>
-              <a:t>18</a:t>
+              <a:t>20</a:t>
             </a:fld>
             <a:endParaRPr lang="en-US"/>
           </a:p>
@@ -636,7 +638,7 @@
           <a:noFill/>
           <a:extLst>
             <a:ext uri="{909E8E84-426E-40dd-AFC4-6F175D3DCCD1}">
-              <a14:hiddenFill xmlns:a14="http://schemas.microsoft.com/office/drawing/2010/main" xmlns="">
+              <a14:hiddenFill xmlns="" xmlns:a14="http://schemas.microsoft.com/office/drawing/2010/main">
                 <a:solidFill>
                   <a:srgbClr val="FFFFFF"/>
                 </a:solidFill>
@@ -696,7 +698,7 @@
             </a:ln>
             <a:extLst>
               <a:ext uri="{91240B29-F687-4f45-9708-019B960494DF}">
-                <a14:hiddenLine xmlns:a14="http://schemas.microsoft.com/office/drawing/2010/main" xmlns="" w="9525">
+                <a14:hiddenLine xmlns="" xmlns:a14="http://schemas.microsoft.com/office/drawing/2010/main" w="9525">
                   <a:solidFill>
                     <a:srgbClr val="000000"/>
                   </a:solidFill>
@@ -786,7 +788,7 @@
             </a:ln>
             <a:extLst>
               <a:ext uri="{91240B29-F687-4f45-9708-019B960494DF}">
-                <a14:hiddenLine xmlns:a14="http://schemas.microsoft.com/office/drawing/2010/main" xmlns="" w="9525">
+                <a14:hiddenLine xmlns="" xmlns:a14="http://schemas.microsoft.com/office/drawing/2010/main" w="9525">
                   <a:solidFill>
                     <a:srgbClr val="000000"/>
                   </a:solidFill>
@@ -876,7 +878,7 @@
             </a:ln>
             <a:extLst>
               <a:ext uri="{91240B29-F687-4f45-9708-019B960494DF}">
-                <a14:hiddenLine xmlns:a14="http://schemas.microsoft.com/office/drawing/2010/main" xmlns="" w="9525">
+                <a14:hiddenLine xmlns="" xmlns:a14="http://schemas.microsoft.com/office/drawing/2010/main" w="9525">
                   <a:solidFill>
                     <a:srgbClr val="000000"/>
                   </a:solidFill>
@@ -910,7 +912,7 @@
             </a:ln>
             <a:extLst>
               <a:ext uri="{91240B29-F687-4f45-9708-019B960494DF}">
-                <a14:hiddenLine xmlns:a14="http://schemas.microsoft.com/office/drawing/2010/main" xmlns="" w="9525">
+                <a14:hiddenLine xmlns="" xmlns:a14="http://schemas.microsoft.com/office/drawing/2010/main" w="9525">
                   <a:solidFill>
                     <a:srgbClr val="000000"/>
                   </a:solidFill>
@@ -1000,7 +1002,7 @@
             </a:ln>
             <a:extLst>
               <a:ext uri="{91240B29-F687-4f45-9708-019B960494DF}">
-                <a14:hiddenLine xmlns:a14="http://schemas.microsoft.com/office/drawing/2010/main" xmlns="" w="9525">
+                <a14:hiddenLine xmlns="" xmlns:a14="http://schemas.microsoft.com/office/drawing/2010/main" w="9525">
                   <a:solidFill>
                     <a:srgbClr val="000000"/>
                   </a:solidFill>
@@ -1062,7 +1064,7 @@
             </a:ln>
             <a:extLst>
               <a:ext uri="{91240B29-F687-4f45-9708-019B960494DF}">
-                <a14:hiddenLine xmlns:a14="http://schemas.microsoft.com/office/drawing/2010/main" xmlns="" w="9525">
+                <a14:hiddenLine xmlns="" xmlns:a14="http://schemas.microsoft.com/office/drawing/2010/main" w="9525">
                   <a:solidFill>
                     <a:srgbClr val="000000"/>
                   </a:solidFill>
@@ -1124,7 +1126,7 @@
             </a:ln>
             <a:extLst>
               <a:ext uri="{91240B29-F687-4f45-9708-019B960494DF}">
-                <a14:hiddenLine xmlns:a14="http://schemas.microsoft.com/office/drawing/2010/main" xmlns="" w="9525">
+                <a14:hiddenLine xmlns="" xmlns:a14="http://schemas.microsoft.com/office/drawing/2010/main" w="9525">
                   <a:solidFill>
                     <a:srgbClr val="000000"/>
                   </a:solidFill>
@@ -1214,7 +1216,7 @@
             </a:ln>
             <a:extLst>
               <a:ext uri="{91240B29-F687-4f45-9708-019B960494DF}">
-                <a14:hiddenLine xmlns:a14="http://schemas.microsoft.com/office/drawing/2010/main" xmlns="" w="9525">
+                <a14:hiddenLine xmlns="" xmlns:a14="http://schemas.microsoft.com/office/drawing/2010/main" w="9525">
                   <a:solidFill>
                     <a:srgbClr val="000000"/>
                   </a:solidFill>
@@ -1276,7 +1278,7 @@
             </a:ln>
             <a:extLst>
               <a:ext uri="{91240B29-F687-4f45-9708-019B960494DF}">
-                <a14:hiddenLine xmlns:a14="http://schemas.microsoft.com/office/drawing/2010/main" xmlns="" w="9525">
+                <a14:hiddenLine xmlns="" xmlns:a14="http://schemas.microsoft.com/office/drawing/2010/main" w="9525">
                   <a:solidFill>
                     <a:srgbClr val="000000"/>
                   </a:solidFill>
@@ -1338,7 +1340,7 @@
             </a:ln>
             <a:extLst>
               <a:ext uri="{91240B29-F687-4f45-9708-019B960494DF}">
-                <a14:hiddenLine xmlns:a14="http://schemas.microsoft.com/office/drawing/2010/main" xmlns="" w="9525">
+                <a14:hiddenLine xmlns="" xmlns:a14="http://schemas.microsoft.com/office/drawing/2010/main" w="9525">
                   <a:solidFill>
                     <a:srgbClr val="000000"/>
                   </a:solidFill>
@@ -1428,7 +1430,7 @@
             </a:ln>
             <a:extLst>
               <a:ext uri="{91240B29-F687-4f45-9708-019B960494DF}">
-                <a14:hiddenLine xmlns:a14="http://schemas.microsoft.com/office/drawing/2010/main" xmlns="" w="9525">
+                <a14:hiddenLine xmlns="" xmlns:a14="http://schemas.microsoft.com/office/drawing/2010/main" w="9525">
                   <a:solidFill>
                     <a:srgbClr val="000000"/>
                   </a:solidFill>
@@ -1518,7 +1520,7 @@
             </a:ln>
             <a:extLst>
               <a:ext uri="{91240B29-F687-4f45-9708-019B960494DF}">
-                <a14:hiddenLine xmlns:a14="http://schemas.microsoft.com/office/drawing/2010/main" xmlns="" w="9525">
+                <a14:hiddenLine xmlns="" xmlns:a14="http://schemas.microsoft.com/office/drawing/2010/main" w="9525">
                   <a:solidFill>
                     <a:srgbClr val="000000"/>
                   </a:solidFill>
@@ -1580,7 +1582,7 @@
             </a:ln>
             <a:extLst>
               <a:ext uri="{91240B29-F687-4f45-9708-019B960494DF}">
-                <a14:hiddenLine xmlns:a14="http://schemas.microsoft.com/office/drawing/2010/main" xmlns="" w="9525">
+                <a14:hiddenLine xmlns="" xmlns:a14="http://schemas.microsoft.com/office/drawing/2010/main" w="9525">
                   <a:solidFill>
                     <a:srgbClr val="000000"/>
                   </a:solidFill>
@@ -1690,7 +1692,7 @@
             </a:ln>
             <a:extLst>
               <a:ext uri="{91240B29-F687-4f45-9708-019B960494DF}">
-                <a14:hiddenLine xmlns:a14="http://schemas.microsoft.com/office/drawing/2010/main" xmlns="" w="9525">
+                <a14:hiddenLine xmlns="" xmlns:a14="http://schemas.microsoft.com/office/drawing/2010/main" w="9525">
                   <a:solidFill>
                     <a:srgbClr val="000000"/>
                   </a:solidFill>
@@ -1752,7 +1754,7 @@
             </a:ln>
             <a:extLst>
               <a:ext uri="{91240B29-F687-4f45-9708-019B960494DF}">
-                <a14:hiddenLine xmlns:a14="http://schemas.microsoft.com/office/drawing/2010/main" xmlns="" w="9525">
+                <a14:hiddenLine xmlns="" xmlns:a14="http://schemas.microsoft.com/office/drawing/2010/main" w="9525">
                   <a:solidFill>
                     <a:srgbClr val="000000"/>
                   </a:solidFill>
@@ -1842,7 +1844,7 @@
             </a:ln>
             <a:extLst>
               <a:ext uri="{91240B29-F687-4f45-9708-019B960494DF}">
-                <a14:hiddenLine xmlns:a14="http://schemas.microsoft.com/office/drawing/2010/main" xmlns="" w="9525">
+                <a14:hiddenLine xmlns="" xmlns:a14="http://schemas.microsoft.com/office/drawing/2010/main" w="9525">
                   <a:solidFill>
                     <a:srgbClr val="000000"/>
                   </a:solidFill>
@@ -1932,7 +1934,7 @@
             </a:ln>
             <a:extLst>
               <a:ext uri="{91240B29-F687-4f45-9708-019B960494DF}">
-                <a14:hiddenLine xmlns:a14="http://schemas.microsoft.com/office/drawing/2010/main" xmlns="" w="9525">
+                <a14:hiddenLine xmlns="" xmlns:a14="http://schemas.microsoft.com/office/drawing/2010/main" w="9525">
                   <a:solidFill>
                     <a:srgbClr val="000000"/>
                   </a:solidFill>
@@ -1994,7 +1996,7 @@
             </a:ln>
             <a:extLst>
               <a:ext uri="{91240B29-F687-4f45-9708-019B960494DF}">
-                <a14:hiddenLine xmlns:a14="http://schemas.microsoft.com/office/drawing/2010/main" xmlns="" w="9525">
+                <a14:hiddenLine xmlns="" xmlns:a14="http://schemas.microsoft.com/office/drawing/2010/main" w="9525">
                   <a:solidFill>
                     <a:srgbClr val="000000"/>
                   </a:solidFill>
@@ -2084,7 +2086,7 @@
             </a:ln>
             <a:extLst>
               <a:ext uri="{91240B29-F687-4f45-9708-019B960494DF}">
-                <a14:hiddenLine xmlns:a14="http://schemas.microsoft.com/office/drawing/2010/main" xmlns="" w="9525">
+                <a14:hiddenLine xmlns="" xmlns:a14="http://schemas.microsoft.com/office/drawing/2010/main" w="9525">
                   <a:solidFill>
                     <a:srgbClr val="000000"/>
                   </a:solidFill>
@@ -2174,7 +2176,7 @@
             </a:ln>
             <a:extLst>
               <a:ext uri="{91240B29-F687-4f45-9708-019B960494DF}">
-                <a14:hiddenLine xmlns:a14="http://schemas.microsoft.com/office/drawing/2010/main" xmlns="" w="9525">
+                <a14:hiddenLine xmlns="" xmlns:a14="http://schemas.microsoft.com/office/drawing/2010/main" w="9525">
                   <a:solidFill>
                     <a:srgbClr val="000000"/>
                   </a:solidFill>
@@ -2230,7 +2232,7 @@
             </a:ln>
             <a:extLst>
               <a:ext uri="{91240B29-F687-4f45-9708-019B960494DF}">
-                <a14:hiddenLine xmlns:a14="http://schemas.microsoft.com/office/drawing/2010/main" xmlns="" w="9525">
+                <a14:hiddenLine xmlns="" xmlns:a14="http://schemas.microsoft.com/office/drawing/2010/main" w="9525">
                   <a:solidFill>
                     <a:srgbClr val="000000"/>
                   </a:solidFill>
@@ -2320,7 +2322,7 @@
             </a:ln>
             <a:extLst>
               <a:ext uri="{91240B29-F687-4f45-9708-019B960494DF}">
-                <a14:hiddenLine xmlns:a14="http://schemas.microsoft.com/office/drawing/2010/main" xmlns="" w="9525">
+                <a14:hiddenLine xmlns="" xmlns:a14="http://schemas.microsoft.com/office/drawing/2010/main" w="9525">
                   <a:solidFill>
                     <a:srgbClr val="000000"/>
                   </a:solidFill>
@@ -2376,7 +2378,7 @@
             </a:ln>
             <a:extLst>
               <a:ext uri="{91240B29-F687-4f45-9708-019B960494DF}">
-                <a14:hiddenLine xmlns:a14="http://schemas.microsoft.com/office/drawing/2010/main" xmlns="" w="9525">
+                <a14:hiddenLine xmlns="" xmlns:a14="http://schemas.microsoft.com/office/drawing/2010/main" w="9525">
                   <a:solidFill>
                     <a:srgbClr val="000000"/>
                   </a:solidFill>
@@ -2466,7 +2468,7 @@
             </a:ln>
             <a:extLst>
               <a:ext uri="{91240B29-F687-4f45-9708-019B960494DF}">
-                <a14:hiddenLine xmlns:a14="http://schemas.microsoft.com/office/drawing/2010/main" xmlns="" w="9525">
+                <a14:hiddenLine xmlns="" xmlns:a14="http://schemas.microsoft.com/office/drawing/2010/main" w="9525">
                   <a:solidFill>
                     <a:srgbClr val="000000"/>
                   </a:solidFill>
@@ -2534,7 +2536,7 @@
             </a:ln>
             <a:extLst>
               <a:ext uri="{91240B29-F687-4f45-9708-019B960494DF}">
-                <a14:hiddenLine xmlns:a14="http://schemas.microsoft.com/office/drawing/2010/main" xmlns="" w="9525">
+                <a14:hiddenLine xmlns="" xmlns:a14="http://schemas.microsoft.com/office/drawing/2010/main" w="9525">
                   <a:solidFill>
                     <a:srgbClr val="000000"/>
                   </a:solidFill>
@@ -2624,7 +2626,7 @@
             </a:ln>
             <a:extLst>
               <a:ext uri="{91240B29-F687-4f45-9708-019B960494DF}">
-                <a14:hiddenLine xmlns:a14="http://schemas.microsoft.com/office/drawing/2010/main" xmlns="" w="9525">
+                <a14:hiddenLine xmlns="" xmlns:a14="http://schemas.microsoft.com/office/drawing/2010/main" w="9525">
                   <a:solidFill>
                     <a:srgbClr val="000000"/>
                   </a:solidFill>
@@ -2692,7 +2694,7 @@
             </a:ln>
             <a:extLst>
               <a:ext uri="{91240B29-F687-4f45-9708-019B960494DF}">
-                <a14:hiddenLine xmlns:a14="http://schemas.microsoft.com/office/drawing/2010/main" xmlns="" w="9525">
+                <a14:hiddenLine xmlns="" xmlns:a14="http://schemas.microsoft.com/office/drawing/2010/main" w="9525">
                   <a:solidFill>
                     <a:srgbClr val="000000"/>
                   </a:solidFill>
@@ -2782,7 +2784,7 @@
             </a:ln>
             <a:extLst>
               <a:ext uri="{91240B29-F687-4f45-9708-019B960494DF}">
-                <a14:hiddenLine xmlns:a14="http://schemas.microsoft.com/office/drawing/2010/main" xmlns="" w="9525">
+                <a14:hiddenLine xmlns="" xmlns:a14="http://schemas.microsoft.com/office/drawing/2010/main" w="9525">
                   <a:solidFill>
                     <a:srgbClr val="000000"/>
                   </a:solidFill>
@@ -2816,7 +2818,7 @@
             </a:ln>
             <a:extLst>
               <a:ext uri="{91240B29-F687-4f45-9708-019B960494DF}">
-                <a14:hiddenLine xmlns:a14="http://schemas.microsoft.com/office/drawing/2010/main" xmlns="" w="9525">
+                <a14:hiddenLine xmlns="" xmlns:a14="http://schemas.microsoft.com/office/drawing/2010/main" w="9525">
                   <a:solidFill>
                     <a:srgbClr val="000000"/>
                   </a:solidFill>
@@ -2906,7 +2908,7 @@
             </a:ln>
             <a:extLst>
               <a:ext uri="{91240B29-F687-4f45-9708-019B960494DF}">
-                <a14:hiddenLine xmlns:a14="http://schemas.microsoft.com/office/drawing/2010/main" xmlns="" w="9525">
+                <a14:hiddenLine xmlns="" xmlns:a14="http://schemas.microsoft.com/office/drawing/2010/main" w="9525">
                   <a:solidFill>
                     <a:srgbClr val="000000"/>
                   </a:solidFill>
@@ -2968,7 +2970,7 @@
             </a:ln>
             <a:extLst>
               <a:ext uri="{91240B29-F687-4f45-9708-019B960494DF}">
-                <a14:hiddenLine xmlns:a14="http://schemas.microsoft.com/office/drawing/2010/main" xmlns="" w="9525">
+                <a14:hiddenLine xmlns="" xmlns:a14="http://schemas.microsoft.com/office/drawing/2010/main" w="9525">
                   <a:solidFill>
                     <a:srgbClr val="000000"/>
                   </a:solidFill>
@@ -3030,7 +3032,7 @@
             </a:ln>
             <a:extLst>
               <a:ext uri="{91240B29-F687-4f45-9708-019B960494DF}">
-                <a14:hiddenLine xmlns:a14="http://schemas.microsoft.com/office/drawing/2010/main" xmlns="" w="9525">
+                <a14:hiddenLine xmlns="" xmlns:a14="http://schemas.microsoft.com/office/drawing/2010/main" w="9525">
                   <a:solidFill>
                     <a:srgbClr val="000000"/>
                   </a:solidFill>
@@ -3120,7 +3122,7 @@
             </a:ln>
             <a:extLst>
               <a:ext uri="{91240B29-F687-4f45-9708-019B960494DF}">
-                <a14:hiddenLine xmlns:a14="http://schemas.microsoft.com/office/drawing/2010/main" xmlns="" w="9525">
+                <a14:hiddenLine xmlns="" xmlns:a14="http://schemas.microsoft.com/office/drawing/2010/main" w="9525">
                   <a:solidFill>
                     <a:srgbClr val="000000"/>
                   </a:solidFill>
@@ -3188,7 +3190,7 @@
             </a:ln>
             <a:extLst>
               <a:ext uri="{91240B29-F687-4f45-9708-019B960494DF}">
-                <a14:hiddenLine xmlns:a14="http://schemas.microsoft.com/office/drawing/2010/main" xmlns="" w="9525">
+                <a14:hiddenLine xmlns="" xmlns:a14="http://schemas.microsoft.com/office/drawing/2010/main" w="9525">
                   <a:solidFill>
                     <a:srgbClr val="000000"/>
                   </a:solidFill>
@@ -3250,7 +3252,7 @@
             </a:ln>
             <a:extLst>
               <a:ext uri="{91240B29-F687-4f45-9708-019B960494DF}">
-                <a14:hiddenLine xmlns:a14="http://schemas.microsoft.com/office/drawing/2010/main" xmlns="" w="9525">
+                <a14:hiddenLine xmlns="" xmlns:a14="http://schemas.microsoft.com/office/drawing/2010/main" w="9525">
                   <a:solidFill>
                     <a:srgbClr val="000000"/>
                   </a:solidFill>
@@ -3340,7 +3342,7 @@
             </a:ln>
             <a:extLst>
               <a:ext uri="{91240B29-F687-4f45-9708-019B960494DF}">
-                <a14:hiddenLine xmlns:a14="http://schemas.microsoft.com/office/drawing/2010/main" xmlns="" w="9525">
+                <a14:hiddenLine xmlns="" xmlns:a14="http://schemas.microsoft.com/office/drawing/2010/main" w="9525">
                   <a:solidFill>
                     <a:srgbClr val="000000"/>
                   </a:solidFill>
@@ -3402,7 +3404,7 @@
             </a:ln>
             <a:extLst>
               <a:ext uri="{91240B29-F687-4f45-9708-019B960494DF}">
-                <a14:hiddenLine xmlns:a14="http://schemas.microsoft.com/office/drawing/2010/main" xmlns="" w="9525">
+                <a14:hiddenLine xmlns="" xmlns:a14="http://schemas.microsoft.com/office/drawing/2010/main" w="9525">
                   <a:solidFill>
                     <a:srgbClr val="000000"/>
                   </a:solidFill>
@@ -3492,7 +3494,7 @@
             </a:ln>
             <a:extLst>
               <a:ext uri="{91240B29-F687-4f45-9708-019B960494DF}">
-                <a14:hiddenLine xmlns:a14="http://schemas.microsoft.com/office/drawing/2010/main" xmlns="" w="9525">
+                <a14:hiddenLine xmlns="" xmlns:a14="http://schemas.microsoft.com/office/drawing/2010/main" w="9525">
                   <a:solidFill>
                     <a:srgbClr val="000000"/>
                   </a:solidFill>
@@ -3554,7 +3556,7 @@
             </a:ln>
             <a:extLst>
               <a:ext uri="{91240B29-F687-4f45-9708-019B960494DF}">
-                <a14:hiddenLine xmlns:a14="http://schemas.microsoft.com/office/drawing/2010/main" xmlns="" w="9525">
+                <a14:hiddenLine xmlns="" xmlns:a14="http://schemas.microsoft.com/office/drawing/2010/main" w="9525">
                   <a:solidFill>
                     <a:srgbClr val="000000"/>
                   </a:solidFill>
@@ -3644,7 +3646,7 @@
             </a:ln>
             <a:extLst>
               <a:ext uri="{91240B29-F687-4f45-9708-019B960494DF}">
-                <a14:hiddenLine xmlns:a14="http://schemas.microsoft.com/office/drawing/2010/main" xmlns="" w="9525">
+                <a14:hiddenLine xmlns="" xmlns:a14="http://schemas.microsoft.com/office/drawing/2010/main" w="9525">
                   <a:solidFill>
                     <a:srgbClr val="000000"/>
                   </a:solidFill>
@@ -3678,7 +3680,7 @@
             </a:ln>
             <a:extLst>
               <a:ext uri="{91240B29-F687-4f45-9708-019B960494DF}">
-                <a14:hiddenLine xmlns:a14="http://schemas.microsoft.com/office/drawing/2010/main" xmlns="" w="9525">
+                <a14:hiddenLine xmlns="" xmlns:a14="http://schemas.microsoft.com/office/drawing/2010/main" w="9525">
                   <a:solidFill>
                     <a:srgbClr val="000000"/>
                   </a:solidFill>
@@ -3743,7 +3745,7 @@
             </a:ln>
             <a:extLst>
               <a:ext uri="{91240B29-F687-4f45-9708-019B960494DF}">
-                <a14:hiddenLine xmlns:a14="http://schemas.microsoft.com/office/drawing/2010/main" xmlns="" w="9525">
+                <a14:hiddenLine xmlns="" xmlns:a14="http://schemas.microsoft.com/office/drawing/2010/main" w="9525">
                   <a:solidFill>
                     <a:srgbClr val="000000"/>
                   </a:solidFill>
@@ -3833,7 +3835,7 @@
             </a:ln>
             <a:extLst>
               <a:ext uri="{91240B29-F687-4f45-9708-019B960494DF}">
-                <a14:hiddenLine xmlns:a14="http://schemas.microsoft.com/office/drawing/2010/main" xmlns="" w="9525">
+                <a14:hiddenLine xmlns="" xmlns:a14="http://schemas.microsoft.com/office/drawing/2010/main" w="9525">
                   <a:solidFill>
                     <a:srgbClr val="000000"/>
                   </a:solidFill>
@@ -3895,7 +3897,7 @@
             </a:ln>
             <a:extLst>
               <a:ext uri="{91240B29-F687-4f45-9708-019B960494DF}">
-                <a14:hiddenLine xmlns:a14="http://schemas.microsoft.com/office/drawing/2010/main" xmlns="" w="9525">
+                <a14:hiddenLine xmlns="" xmlns:a14="http://schemas.microsoft.com/office/drawing/2010/main" w="9525">
                   <a:solidFill>
                     <a:srgbClr val="000000"/>
                   </a:solidFill>
@@ -3985,7 +3987,7 @@
             </a:ln>
             <a:extLst>
               <a:ext uri="{91240B29-F687-4f45-9708-019B960494DF}">
-                <a14:hiddenLine xmlns:a14="http://schemas.microsoft.com/office/drawing/2010/main" xmlns="" w="9525">
+                <a14:hiddenLine xmlns="" xmlns:a14="http://schemas.microsoft.com/office/drawing/2010/main" w="9525">
                   <a:solidFill>
                     <a:srgbClr val="000000"/>
                   </a:solidFill>
@@ -4075,7 +4077,7 @@
             </a:ln>
             <a:extLst>
               <a:ext uri="{91240B29-F687-4f45-9708-019B960494DF}">
-                <a14:hiddenLine xmlns:a14="http://schemas.microsoft.com/office/drawing/2010/main" xmlns="" w="9525">
+                <a14:hiddenLine xmlns="" xmlns:a14="http://schemas.microsoft.com/office/drawing/2010/main" w="9525">
                   <a:solidFill>
                     <a:srgbClr val="000000"/>
                   </a:solidFill>
@@ -4140,7 +4142,7 @@
             </a:ln>
             <a:extLst>
               <a:ext uri="{91240B29-F687-4f45-9708-019B960494DF}">
-                <a14:hiddenLine xmlns:a14="http://schemas.microsoft.com/office/drawing/2010/main" xmlns="" w="9525">
+                <a14:hiddenLine xmlns="" xmlns:a14="http://schemas.microsoft.com/office/drawing/2010/main" w="9525">
                   <a:solidFill>
                     <a:srgbClr val="000000"/>
                   </a:solidFill>
@@ -4202,7 +4204,7 @@
             </a:ln>
             <a:extLst>
               <a:ext uri="{91240B29-F687-4f45-9708-019B960494DF}">
-                <a14:hiddenLine xmlns:a14="http://schemas.microsoft.com/office/drawing/2010/main" xmlns="" w="9525">
+                <a14:hiddenLine xmlns="" xmlns:a14="http://schemas.microsoft.com/office/drawing/2010/main" w="9525">
                   <a:solidFill>
                     <a:srgbClr val="000000"/>
                   </a:solidFill>
@@ -4292,7 +4294,7 @@
             </a:ln>
             <a:extLst>
               <a:ext uri="{91240B29-F687-4f45-9708-019B960494DF}">
-                <a14:hiddenLine xmlns:a14="http://schemas.microsoft.com/office/drawing/2010/main" xmlns="" w="9525">
+                <a14:hiddenLine xmlns="" xmlns:a14="http://schemas.microsoft.com/office/drawing/2010/main" w="9525">
                   <a:solidFill>
                     <a:srgbClr val="000000"/>
                   </a:solidFill>
@@ -4382,7 +4384,7 @@
             </a:ln>
             <a:extLst>
               <a:ext uri="{91240B29-F687-4f45-9708-019B960494DF}">
-                <a14:hiddenLine xmlns:a14="http://schemas.microsoft.com/office/drawing/2010/main" xmlns="" w="9525">
+                <a14:hiddenLine xmlns="" xmlns:a14="http://schemas.microsoft.com/office/drawing/2010/main" w="9525">
                   <a:solidFill>
                     <a:srgbClr val="000000"/>
                   </a:solidFill>
@@ -4444,7 +4446,7 @@
             </a:ln>
             <a:extLst>
               <a:ext uri="{91240B29-F687-4f45-9708-019B960494DF}">
-                <a14:hiddenLine xmlns:a14="http://schemas.microsoft.com/office/drawing/2010/main" xmlns="" w="9525">
+                <a14:hiddenLine xmlns="" xmlns:a14="http://schemas.microsoft.com/office/drawing/2010/main" w="9525">
                   <a:solidFill>
                     <a:srgbClr val="000000"/>
                   </a:solidFill>
@@ -4564,7 +4566,7 @@
             </a:ln>
             <a:extLst>
               <a:ext uri="{91240B29-F687-4f45-9708-019B960494DF}">
-                <a14:hiddenLine xmlns:a14="http://schemas.microsoft.com/office/drawing/2010/main" xmlns="" w="9525">
+                <a14:hiddenLine xmlns="" xmlns:a14="http://schemas.microsoft.com/office/drawing/2010/main" w="9525">
                   <a:solidFill>
                     <a:srgbClr val="000000"/>
                   </a:solidFill>
@@ -4632,7 +4634,7 @@
             </a:ln>
             <a:extLst>
               <a:ext uri="{91240B29-F687-4f45-9708-019B960494DF}">
-                <a14:hiddenLine xmlns:a14="http://schemas.microsoft.com/office/drawing/2010/main" xmlns="" w="9525">
+                <a14:hiddenLine xmlns="" xmlns:a14="http://schemas.microsoft.com/office/drawing/2010/main" w="9525">
                   <a:solidFill>
                     <a:srgbClr val="000000"/>
                   </a:solidFill>
@@ -4722,7 +4724,7 @@
             </a:ln>
             <a:extLst>
               <a:ext uri="{91240B29-F687-4f45-9708-019B960494DF}">
-                <a14:hiddenLine xmlns:a14="http://schemas.microsoft.com/office/drawing/2010/main" xmlns="" w="9525">
+                <a14:hiddenLine xmlns="" xmlns:a14="http://schemas.microsoft.com/office/drawing/2010/main" w="9525">
                   <a:solidFill>
                     <a:srgbClr val="000000"/>
                   </a:solidFill>
@@ -9535,7 +9537,7 @@
           <a:noFill/>
           <a:extLst>
             <a:ext uri="{909E8E84-426E-40dd-AFC4-6F175D3DCCD1}">
-              <a14:hiddenFill xmlns:a14="http://schemas.microsoft.com/office/drawing/2010/main" xmlns="">
+              <a14:hiddenFill xmlns="" xmlns:a14="http://schemas.microsoft.com/office/drawing/2010/main">
                 <a:solidFill>
                   <a:srgbClr val="FFFFFF"/>
                 </a:solidFill>
@@ -9609,7 +9611,7 @@
               </a:ln>
               <a:extLst>
                 <a:ext uri="{91240B29-F687-4f45-9708-019B960494DF}">
-                  <a14:hiddenLine xmlns:a14="http://schemas.microsoft.com/office/drawing/2010/main" xmlns="" w="9525">
+                  <a14:hiddenLine xmlns="" xmlns:a14="http://schemas.microsoft.com/office/drawing/2010/main" w="9525">
                     <a:solidFill>
                       <a:srgbClr val="000000"/>
                     </a:solidFill>
@@ -9699,7 +9701,7 @@
               </a:ln>
               <a:extLst>
                 <a:ext uri="{91240B29-F687-4f45-9708-019B960494DF}">
-                  <a14:hiddenLine xmlns:a14="http://schemas.microsoft.com/office/drawing/2010/main" xmlns="" w="9525">
+                  <a14:hiddenLine xmlns="" xmlns:a14="http://schemas.microsoft.com/office/drawing/2010/main" w="9525">
                     <a:solidFill>
                       <a:srgbClr val="000000"/>
                     </a:solidFill>
@@ -9789,7 +9791,7 @@
               </a:ln>
               <a:extLst>
                 <a:ext uri="{91240B29-F687-4f45-9708-019B960494DF}">
-                  <a14:hiddenLine xmlns:a14="http://schemas.microsoft.com/office/drawing/2010/main" xmlns="" w="9525">
+                  <a14:hiddenLine xmlns="" xmlns:a14="http://schemas.microsoft.com/office/drawing/2010/main" w="9525">
                     <a:solidFill>
                       <a:srgbClr val="000000"/>
                     </a:solidFill>
@@ -9851,7 +9853,7 @@
               </a:ln>
               <a:extLst>
                 <a:ext uri="{91240B29-F687-4f45-9708-019B960494DF}">
-                  <a14:hiddenLine xmlns:a14="http://schemas.microsoft.com/office/drawing/2010/main" xmlns="" w="9525">
+                  <a14:hiddenLine xmlns="" xmlns:a14="http://schemas.microsoft.com/office/drawing/2010/main" w="9525">
                     <a:solidFill>
                       <a:srgbClr val="000000"/>
                     </a:solidFill>
@@ -9941,7 +9943,7 @@
               </a:ln>
               <a:extLst>
                 <a:ext uri="{91240B29-F687-4f45-9708-019B960494DF}">
-                  <a14:hiddenLine xmlns:a14="http://schemas.microsoft.com/office/drawing/2010/main" xmlns="" w="9525">
+                  <a14:hiddenLine xmlns="" xmlns:a14="http://schemas.microsoft.com/office/drawing/2010/main" w="9525">
                     <a:solidFill>
                       <a:srgbClr val="000000"/>
                     </a:solidFill>
@@ -10003,7 +10005,7 @@
               </a:ln>
               <a:extLst>
                 <a:ext uri="{91240B29-F687-4f45-9708-019B960494DF}">
-                  <a14:hiddenLine xmlns:a14="http://schemas.microsoft.com/office/drawing/2010/main" xmlns="" w="9525">
+                  <a14:hiddenLine xmlns="" xmlns:a14="http://schemas.microsoft.com/office/drawing/2010/main" w="9525">
                     <a:solidFill>
                       <a:srgbClr val="000000"/>
                     </a:solidFill>
@@ -10065,7 +10067,7 @@
               </a:ln>
               <a:extLst>
                 <a:ext uri="{91240B29-F687-4f45-9708-019B960494DF}">
-                  <a14:hiddenLine xmlns:a14="http://schemas.microsoft.com/office/drawing/2010/main" xmlns="" w="9525">
+                  <a14:hiddenLine xmlns="" xmlns:a14="http://schemas.microsoft.com/office/drawing/2010/main" w="9525">
                     <a:solidFill>
                       <a:srgbClr val="000000"/>
                     </a:solidFill>
@@ -10155,7 +10157,7 @@
               </a:ln>
               <a:extLst>
                 <a:ext uri="{91240B29-F687-4f45-9708-019B960494DF}">
-                  <a14:hiddenLine xmlns:a14="http://schemas.microsoft.com/office/drawing/2010/main" xmlns="" w="9525">
+                  <a14:hiddenLine xmlns="" xmlns:a14="http://schemas.microsoft.com/office/drawing/2010/main" w="9525">
                     <a:solidFill>
                       <a:srgbClr val="000000"/>
                     </a:solidFill>
@@ -10245,7 +10247,7 @@
               </a:ln>
               <a:extLst>
                 <a:ext uri="{91240B29-F687-4f45-9708-019B960494DF}">
-                  <a14:hiddenLine xmlns:a14="http://schemas.microsoft.com/office/drawing/2010/main" xmlns="" w="9525">
+                  <a14:hiddenLine xmlns="" xmlns:a14="http://schemas.microsoft.com/office/drawing/2010/main" w="9525">
                     <a:solidFill>
                       <a:srgbClr val="000000"/>
                     </a:solidFill>
@@ -10307,7 +10309,7 @@
               </a:ln>
               <a:extLst>
                 <a:ext uri="{91240B29-F687-4f45-9708-019B960494DF}">
-                  <a14:hiddenLine xmlns:a14="http://schemas.microsoft.com/office/drawing/2010/main" xmlns="" w="9525">
+                  <a14:hiddenLine xmlns="" xmlns:a14="http://schemas.microsoft.com/office/drawing/2010/main" w="9525">
                     <a:solidFill>
                       <a:srgbClr val="000000"/>
                     </a:solidFill>
@@ -10417,7 +10419,7 @@
               </a:ln>
               <a:extLst>
                 <a:ext uri="{91240B29-F687-4f45-9708-019B960494DF}">
-                  <a14:hiddenLine xmlns:a14="http://schemas.microsoft.com/office/drawing/2010/main" xmlns="" w="9525">
+                  <a14:hiddenLine xmlns="" xmlns:a14="http://schemas.microsoft.com/office/drawing/2010/main" w="9525">
                     <a:solidFill>
                       <a:srgbClr val="000000"/>
                     </a:solidFill>
@@ -10501,7 +10503,7 @@
               </a:ln>
               <a:extLst>
                 <a:ext uri="{91240B29-F687-4f45-9708-019B960494DF}">
-                  <a14:hiddenLine xmlns:a14="http://schemas.microsoft.com/office/drawing/2010/main" xmlns="" w="9525">
+                  <a14:hiddenLine xmlns="" xmlns:a14="http://schemas.microsoft.com/office/drawing/2010/main" w="9525">
                     <a:solidFill>
                       <a:srgbClr val="000000"/>
                     </a:solidFill>
@@ -10563,7 +10565,7 @@
               </a:ln>
               <a:extLst>
                 <a:ext uri="{91240B29-F687-4f45-9708-019B960494DF}">
-                  <a14:hiddenLine xmlns:a14="http://schemas.microsoft.com/office/drawing/2010/main" xmlns="" w="9525">
+                  <a14:hiddenLine xmlns="" xmlns:a14="http://schemas.microsoft.com/office/drawing/2010/main" w="9525">
                     <a:solidFill>
                       <a:srgbClr val="000000"/>
                     </a:solidFill>
@@ -10625,7 +10627,7 @@
               </a:ln>
               <a:extLst>
                 <a:ext uri="{91240B29-F687-4f45-9708-019B960494DF}">
-                  <a14:hiddenLine xmlns:a14="http://schemas.microsoft.com/office/drawing/2010/main" xmlns="" w="9525">
+                  <a14:hiddenLine xmlns="" xmlns:a14="http://schemas.microsoft.com/office/drawing/2010/main" w="9525">
                     <a:solidFill>
                       <a:srgbClr val="000000"/>
                     </a:solidFill>
@@ -10715,7 +10717,7 @@
               </a:ln>
               <a:extLst>
                 <a:ext uri="{91240B29-F687-4f45-9708-019B960494DF}">
-                  <a14:hiddenLine xmlns:a14="http://schemas.microsoft.com/office/drawing/2010/main" xmlns="" w="9525">
+                  <a14:hiddenLine xmlns="" xmlns:a14="http://schemas.microsoft.com/office/drawing/2010/main" w="9525">
                     <a:solidFill>
                       <a:srgbClr val="000000"/>
                     </a:solidFill>
@@ -10749,7 +10751,7 @@
               </a:ln>
               <a:extLst>
                 <a:ext uri="{91240B29-F687-4f45-9708-019B960494DF}">
-                  <a14:hiddenLine xmlns:a14="http://schemas.microsoft.com/office/drawing/2010/main" xmlns="" w="9525">
+                  <a14:hiddenLine xmlns="" xmlns:a14="http://schemas.microsoft.com/office/drawing/2010/main" w="9525">
                     <a:solidFill>
                       <a:srgbClr val="000000"/>
                     </a:solidFill>
@@ -10814,7 +10816,7 @@
               </a:ln>
               <a:extLst>
                 <a:ext uri="{91240B29-F687-4f45-9708-019B960494DF}">
-                  <a14:hiddenLine xmlns:a14="http://schemas.microsoft.com/office/drawing/2010/main" xmlns="" w="9525">
+                  <a14:hiddenLine xmlns="" xmlns:a14="http://schemas.microsoft.com/office/drawing/2010/main" w="9525">
                     <a:solidFill>
                       <a:srgbClr val="000000"/>
                     </a:solidFill>
@@ -10904,7 +10906,7 @@
               </a:ln>
               <a:extLst>
                 <a:ext uri="{91240B29-F687-4f45-9708-019B960494DF}">
-                  <a14:hiddenLine xmlns:a14="http://schemas.microsoft.com/office/drawing/2010/main" xmlns="" w="9525">
+                  <a14:hiddenLine xmlns="" xmlns:a14="http://schemas.microsoft.com/office/drawing/2010/main" w="9525">
                     <a:solidFill>
                       <a:srgbClr val="000000"/>
                     </a:solidFill>
@@ -10966,7 +10968,7 @@
               </a:ln>
               <a:extLst>
                 <a:ext uri="{91240B29-F687-4f45-9708-019B960494DF}">
-                  <a14:hiddenLine xmlns:a14="http://schemas.microsoft.com/office/drawing/2010/main" xmlns="" w="9525">
+                  <a14:hiddenLine xmlns="" xmlns:a14="http://schemas.microsoft.com/office/drawing/2010/main" w="9525">
                     <a:solidFill>
                       <a:srgbClr val="000000"/>
                     </a:solidFill>
@@ -11056,7 +11058,7 @@
               </a:ln>
               <a:extLst>
                 <a:ext uri="{91240B29-F687-4f45-9708-019B960494DF}">
-                  <a14:hiddenLine xmlns:a14="http://schemas.microsoft.com/office/drawing/2010/main" xmlns="" w="9525">
+                  <a14:hiddenLine xmlns="" xmlns:a14="http://schemas.microsoft.com/office/drawing/2010/main" w="9525">
                     <a:solidFill>
                       <a:srgbClr val="000000"/>
                     </a:solidFill>
@@ -11121,7 +11123,7 @@
               </a:ln>
               <a:extLst>
                 <a:ext uri="{91240B29-F687-4f45-9708-019B960494DF}">
-                  <a14:hiddenLine xmlns:a14="http://schemas.microsoft.com/office/drawing/2010/main" xmlns="" w="9525">
+                  <a14:hiddenLine xmlns="" xmlns:a14="http://schemas.microsoft.com/office/drawing/2010/main" w="9525">
                     <a:solidFill>
                       <a:srgbClr val="000000"/>
                     </a:solidFill>
@@ -11183,7 +11185,7 @@
               </a:ln>
               <a:extLst>
                 <a:ext uri="{91240B29-F687-4f45-9708-019B960494DF}">
-                  <a14:hiddenLine xmlns:a14="http://schemas.microsoft.com/office/drawing/2010/main" xmlns="" w="9525">
+                  <a14:hiddenLine xmlns="" xmlns:a14="http://schemas.microsoft.com/office/drawing/2010/main" w="9525">
                     <a:solidFill>
                       <a:srgbClr val="000000"/>
                     </a:solidFill>
@@ -11273,7 +11275,7 @@
               </a:ln>
               <a:extLst>
                 <a:ext uri="{91240B29-F687-4f45-9708-019B960494DF}">
-                  <a14:hiddenLine xmlns:a14="http://schemas.microsoft.com/office/drawing/2010/main" xmlns="" w="9525">
+                  <a14:hiddenLine xmlns="" xmlns:a14="http://schemas.microsoft.com/office/drawing/2010/main" w="9525">
                     <a:solidFill>
                       <a:srgbClr val="000000"/>
                     </a:solidFill>
@@ -11363,7 +11365,7 @@
               </a:ln>
               <a:extLst>
                 <a:ext uri="{91240B29-F687-4f45-9708-019B960494DF}">
-                  <a14:hiddenLine xmlns:a14="http://schemas.microsoft.com/office/drawing/2010/main" xmlns="" w="9525">
+                  <a14:hiddenLine xmlns="" xmlns:a14="http://schemas.microsoft.com/office/drawing/2010/main" w="9525">
                     <a:solidFill>
                       <a:srgbClr val="000000"/>
                     </a:solidFill>
@@ -11428,7 +11430,7 @@
               </a:ln>
               <a:extLst>
                 <a:ext uri="{91240B29-F687-4f45-9708-019B960494DF}">
-                  <a14:hiddenLine xmlns:a14="http://schemas.microsoft.com/office/drawing/2010/main" xmlns="" w="9525">
+                  <a14:hiddenLine xmlns="" xmlns:a14="http://schemas.microsoft.com/office/drawing/2010/main" w="9525">
                     <a:solidFill>
                       <a:srgbClr val="000000"/>
                     </a:solidFill>
@@ -11548,7 +11550,7 @@
               </a:ln>
               <a:extLst>
                 <a:ext uri="{91240B29-F687-4f45-9708-019B960494DF}">
-                  <a14:hiddenLine xmlns:a14="http://schemas.microsoft.com/office/drawing/2010/main" xmlns="" w="9525">
+                  <a14:hiddenLine xmlns="" xmlns:a14="http://schemas.microsoft.com/office/drawing/2010/main" w="9525">
                     <a:solidFill>
                       <a:srgbClr val="000000"/>
                     </a:solidFill>
@@ -11646,7 +11648,7 @@
               </a:ln>
               <a:extLst>
                 <a:ext uri="{91240B29-F687-4f45-9708-019B960494DF}">
-                  <a14:hiddenLine xmlns:a14="http://schemas.microsoft.com/office/drawing/2010/main" xmlns="" w="9525">
+                  <a14:hiddenLine xmlns="" xmlns:a14="http://schemas.microsoft.com/office/drawing/2010/main" w="9525">
                     <a:solidFill>
                       <a:srgbClr val="000000"/>
                     </a:solidFill>
@@ -11761,7 +11763,7 @@
               </a:ln>
               <a:extLst>
                 <a:ext uri="{91240B29-F687-4f45-9708-019B960494DF}">
-                  <a14:hiddenLine xmlns:a14="http://schemas.microsoft.com/office/drawing/2010/main" xmlns="" w="9525">
+                  <a14:hiddenLine xmlns="" xmlns:a14="http://schemas.microsoft.com/office/drawing/2010/main" w="9525">
                     <a:solidFill>
                       <a:srgbClr val="000000"/>
                     </a:solidFill>
@@ -11851,7 +11853,7 @@
               </a:ln>
               <a:extLst>
                 <a:ext uri="{91240B29-F687-4f45-9708-019B960494DF}">
-                  <a14:hiddenLine xmlns:a14="http://schemas.microsoft.com/office/drawing/2010/main" xmlns="" w="9525">
+                  <a14:hiddenLine xmlns="" xmlns:a14="http://schemas.microsoft.com/office/drawing/2010/main" w="9525">
                     <a:solidFill>
                       <a:srgbClr val="000000"/>
                     </a:solidFill>
@@ -11916,7 +11918,7 @@
               </a:ln>
               <a:extLst>
                 <a:ext uri="{91240B29-F687-4f45-9708-019B960494DF}">
-                  <a14:hiddenLine xmlns:a14="http://schemas.microsoft.com/office/drawing/2010/main" xmlns="" w="9525">
+                  <a14:hiddenLine xmlns="" xmlns:a14="http://schemas.microsoft.com/office/drawing/2010/main" w="9525">
                     <a:solidFill>
                       <a:srgbClr val="000000"/>
                     </a:solidFill>
@@ -12006,7 +12008,7 @@
               </a:ln>
               <a:extLst>
                 <a:ext uri="{91240B29-F687-4f45-9708-019B960494DF}">
-                  <a14:hiddenLine xmlns:a14="http://schemas.microsoft.com/office/drawing/2010/main" xmlns="" w="9525">
+                  <a14:hiddenLine xmlns="" xmlns:a14="http://schemas.microsoft.com/office/drawing/2010/main" w="9525">
                     <a:solidFill>
                       <a:srgbClr val="000000"/>
                     </a:solidFill>
@@ -12074,7 +12076,7 @@
               </a:ln>
               <a:extLst>
                 <a:ext uri="{91240B29-F687-4f45-9708-019B960494DF}">
-                  <a14:hiddenLine xmlns:a14="http://schemas.microsoft.com/office/drawing/2010/main" xmlns="" w="9525">
+                  <a14:hiddenLine xmlns="" xmlns:a14="http://schemas.microsoft.com/office/drawing/2010/main" w="9525">
                     <a:solidFill>
                       <a:srgbClr val="000000"/>
                     </a:solidFill>
@@ -12164,7 +12166,7 @@
               </a:ln>
               <a:extLst>
                 <a:ext uri="{91240B29-F687-4f45-9708-019B960494DF}">
-                  <a14:hiddenLine xmlns:a14="http://schemas.microsoft.com/office/drawing/2010/main" xmlns="" w="9525">
+                  <a14:hiddenLine xmlns="" xmlns:a14="http://schemas.microsoft.com/office/drawing/2010/main" w="9525">
                     <a:solidFill>
                       <a:srgbClr val="000000"/>
                     </a:solidFill>
@@ -12232,7 +12234,7 @@
               </a:ln>
               <a:extLst>
                 <a:ext uri="{91240B29-F687-4f45-9708-019B960494DF}">
-                  <a14:hiddenLine xmlns:a14="http://schemas.microsoft.com/office/drawing/2010/main" xmlns="" w="9525">
+                  <a14:hiddenLine xmlns="" xmlns:a14="http://schemas.microsoft.com/office/drawing/2010/main" w="9525">
                     <a:solidFill>
                       <a:srgbClr val="000000"/>
                     </a:solidFill>
@@ -12322,7 +12324,7 @@
               </a:ln>
               <a:extLst>
                 <a:ext uri="{91240B29-F687-4f45-9708-019B960494DF}">
-                  <a14:hiddenLine xmlns:a14="http://schemas.microsoft.com/office/drawing/2010/main" xmlns="" w="9525">
+                  <a14:hiddenLine xmlns="" xmlns:a14="http://schemas.microsoft.com/office/drawing/2010/main" w="9525">
                     <a:solidFill>
                       <a:srgbClr val="000000"/>
                     </a:solidFill>
@@ -12356,7 +12358,7 @@
               </a:ln>
               <a:extLst>
                 <a:ext uri="{91240B29-F687-4f45-9708-019B960494DF}">
-                  <a14:hiddenLine xmlns:a14="http://schemas.microsoft.com/office/drawing/2010/main" xmlns="" w="9525">
+                  <a14:hiddenLine xmlns="" xmlns:a14="http://schemas.microsoft.com/office/drawing/2010/main" w="9525">
                     <a:solidFill>
                       <a:srgbClr val="000000"/>
                     </a:solidFill>
@@ -13066,12 +13068,31 @@
           <a:lstStyle/>
           <a:p>
             <a:r>
-              <a:rPr lang="en-US" dirty="0"/>
-              <a:t>Men’s Runner Results </a:t>
-            </a:r>
-            <a:r>
               <a:rPr lang="en-US" dirty="0" smtClean="0"/>
-              <a:t>– Age (continued)</a:t>
+              <a:t>Exploratory</a:t>
+            </a:r>
+            <a:endParaRPr lang="en-US" dirty="0"/>
+          </a:p>
+        </p:txBody>
+      </p:sp>
+      <p:sp>
+        <p:nvSpPr>
+          <p:cNvPr id="3" name="Content Placeholder 2"/>
+          <p:cNvSpPr>
+            <a:spLocks noGrp="1"/>
+          </p:cNvSpPr>
+          <p:nvPr>
+            <p:ph idx="1"/>
+          </p:nvPr>
+        </p:nvSpPr>
+        <p:spPr/>
+        <p:txBody>
+          <a:bodyPr/>
+          <a:lstStyle/>
+          <a:p>
+            <a:r>
+              <a:rPr lang="en-US" dirty="0" smtClean="0"/>
+              <a:t>Ben/Austin</a:t>
             </a:r>
             <a:endParaRPr lang="en-US" dirty="0"/>
           </a:p>
@@ -13095,6 +13116,331 @@
             <a:fld id="{7B7DB76D-28D5-4DAC-900A-A1330999554A}" type="slidenum">
               <a:rPr lang="en-US" smtClean="0"/>
               <a:t>10</a:t>
+            </a:fld>
+            <a:endParaRPr lang="en-US"/>
+          </a:p>
+        </p:txBody>
+      </p:sp>
+    </p:spTree>
+    <p:extLst>
+      <p:ext uri="{BB962C8B-B14F-4D97-AF65-F5344CB8AC3E}">
+        <p14:creationId xmlns:p14="http://schemas.microsoft.com/office/powerpoint/2010/main" val="4270067039"/>
+      </p:ext>
+    </p:extLst>
+  </p:cSld>
+  <p:clrMapOvr>
+    <a:masterClrMapping/>
+  </p:clrMapOvr>
+  <p:timing>
+    <p:tnLst>
+      <p:par>
+        <p:cTn id="1" dur="indefinite" restart="never" nodeType="tmRoot"/>
+      </p:par>
+    </p:tnLst>
+  </p:timing>
+</p:sld>
+</file>
+
+<file path=ppt/slides/slide11.xml><?xml version="1.0" encoding="utf-8"?>
+<p:sld xmlns:a="http://schemas.openxmlformats.org/drawingml/2006/main" xmlns:r="http://schemas.openxmlformats.org/officeDocument/2006/relationships" xmlns:p="http://schemas.openxmlformats.org/presentationml/2006/main">
+  <p:cSld>
+    <p:spTree>
+      <p:nvGrpSpPr>
+        <p:cNvPr id="1" name=""/>
+        <p:cNvGrpSpPr/>
+        <p:nvPr/>
+      </p:nvGrpSpPr>
+      <p:grpSpPr>
+        <a:xfrm>
+          <a:off x="0" y="0"/>
+          <a:ext cx="0" cy="0"/>
+          <a:chOff x="0" y="0"/>
+          <a:chExt cx="0" cy="0"/>
+        </a:xfrm>
+      </p:grpSpPr>
+      <p:sp>
+        <p:nvSpPr>
+          <p:cNvPr id="5" name="Title 4"/>
+          <p:cNvSpPr>
+            <a:spLocks noGrp="1"/>
+          </p:cNvSpPr>
+          <p:nvPr>
+            <p:ph type="title"/>
+          </p:nvPr>
+        </p:nvSpPr>
+        <p:spPr/>
+        <p:txBody>
+          <a:bodyPr/>
+          <a:lstStyle/>
+          <a:p>
+            <a:r>
+              <a:rPr lang="en-US" dirty="0" smtClean="0"/>
+              <a:t>Men’s Runner Results - Age</a:t>
+            </a:r>
+            <a:endParaRPr lang="en-US" dirty="0"/>
+          </a:p>
+        </p:txBody>
+      </p:sp>
+      <p:pic>
+        <p:nvPicPr>
+          <p:cNvPr id="1026" name="Picture 2"/>
+          <p:cNvPicPr>
+            <a:picLocks noGrp="1" noChangeAspect="1" noChangeArrowheads="1"/>
+          </p:cNvPicPr>
+          <p:nvPr>
+            <p:ph type="pic" idx="1"/>
+          </p:nvPr>
+        </p:nvPicPr>
+        <p:blipFill>
+          <a:blip r:embed="rId2">
+            <a:extLst>
+              <a:ext uri="{28A0092B-C50C-407E-A947-70E740481C1C}">
+                <a14:useLocalDpi xmlns:a14="http://schemas.microsoft.com/office/drawing/2010/main" val="0"/>
+              </a:ext>
+            </a:extLst>
+          </a:blip>
+          <a:srcRect l="3479" r="3479"/>
+          <a:stretch>
+            <a:fillRect/>
+          </a:stretch>
+        </p:blipFill>
+        <p:spPr bwMode="auto">
+          <a:xfrm>
+            <a:off x="839788" y="2362994"/>
+            <a:ext cx="5324981" cy="3370385"/>
+          </a:xfrm>
+          <a:prstGeom prst="rect">
+            <a:avLst/>
+          </a:prstGeom>
+          <a:noFill/>
+          <a:ln>
+            <a:noFill/>
+          </a:ln>
+          <a:extLst>
+            <a:ext uri="{909E8E84-426E-40DD-AFC4-6F175D3DCCD1}">
+              <a14:hiddenFill xmlns:a14="http://schemas.microsoft.com/office/drawing/2010/main">
+                <a:solidFill>
+                  <a:schemeClr val="accent1"/>
+                </a:solidFill>
+              </a14:hiddenFill>
+            </a:ext>
+            <a:ext uri="{91240B29-F687-4F45-9708-019B960494DF}">
+              <a14:hiddenLine xmlns:a14="http://schemas.microsoft.com/office/drawing/2010/main" w="9525">
+                <a:solidFill>
+                  <a:schemeClr val="tx1"/>
+                </a:solidFill>
+                <a:miter lim="800000"/>
+                <a:headEnd/>
+                <a:tailEnd/>
+              </a14:hiddenLine>
+            </a:ext>
+          </a:extLst>
+        </p:spPr>
+      </p:pic>
+      <p:sp>
+        <p:nvSpPr>
+          <p:cNvPr id="6" name="Text Placeholder 5"/>
+          <p:cNvSpPr>
+            <a:spLocks noGrp="1"/>
+          </p:cNvSpPr>
+          <p:nvPr>
+            <p:ph type="body" sz="half" idx="2"/>
+          </p:nvPr>
+        </p:nvSpPr>
+        <p:spPr>
+          <a:xfrm>
+            <a:off x="6729628" y="305426"/>
+            <a:ext cx="3932237" cy="3811588"/>
+          </a:xfrm>
+        </p:spPr>
+        <p:txBody>
+          <a:bodyPr/>
+          <a:lstStyle/>
+          <a:p>
+            <a:r>
+              <a:rPr lang="en-US" dirty="0" smtClean="0"/>
+              <a:t>Boxplots</a:t>
+            </a:r>
+          </a:p>
+          <a:p>
+            <a:r>
+              <a:rPr lang="en-US" dirty="0" smtClean="0"/>
+              <a:t>Histograms</a:t>
+            </a:r>
+          </a:p>
+          <a:p>
+            <a:r>
+              <a:rPr lang="en-US" dirty="0" smtClean="0"/>
+              <a:t>Density Plot</a:t>
+            </a:r>
+          </a:p>
+          <a:p>
+            <a:r>
+              <a:rPr lang="en-US" dirty="0" smtClean="0"/>
+              <a:t>QQ Plot</a:t>
+            </a:r>
+          </a:p>
+        </p:txBody>
+      </p:sp>
+      <p:sp>
+        <p:nvSpPr>
+          <p:cNvPr id="4" name="Slide Number Placeholder 3"/>
+          <p:cNvSpPr>
+            <a:spLocks noGrp="1"/>
+          </p:cNvSpPr>
+          <p:nvPr>
+            <p:ph type="sldNum" sz="quarter" idx="12"/>
+          </p:nvPr>
+        </p:nvSpPr>
+        <p:spPr/>
+        <p:txBody>
+          <a:bodyPr/>
+          <a:lstStyle/>
+          <a:p>
+            <a:fld id="{7B7DB76D-28D5-4DAC-900A-A1330999554A}" type="slidenum">
+              <a:rPr lang="en-US" smtClean="0"/>
+              <a:t>11</a:t>
+            </a:fld>
+            <a:endParaRPr lang="en-US"/>
+          </a:p>
+        </p:txBody>
+      </p:sp>
+      <p:pic>
+        <p:nvPicPr>
+          <p:cNvPr id="1028" name="Picture 4"/>
+          <p:cNvPicPr>
+            <a:picLocks noChangeAspect="1" noChangeArrowheads="1"/>
+          </p:cNvPicPr>
+          <p:nvPr/>
+        </p:nvPicPr>
+        <p:blipFill>
+          <a:blip r:embed="rId3" cstate="print">
+            <a:extLst>
+              <a:ext uri="{28A0092B-C50C-407E-A947-70E740481C1C}">
+                <a14:useLocalDpi xmlns:a14="http://schemas.microsoft.com/office/drawing/2010/main" val="0"/>
+              </a:ext>
+            </a:extLst>
+          </a:blip>
+          <a:srcRect/>
+          <a:stretch>
+            <a:fillRect/>
+          </a:stretch>
+        </p:blipFill>
+        <p:spPr bwMode="auto">
+          <a:xfrm>
+            <a:off x="6478921" y="2211220"/>
+            <a:ext cx="4808832" cy="3673932"/>
+          </a:xfrm>
+          <a:prstGeom prst="rect">
+            <a:avLst/>
+          </a:prstGeom>
+          <a:noFill/>
+          <a:ln>
+            <a:noFill/>
+          </a:ln>
+          <a:extLst>
+            <a:ext uri="{909E8E84-426E-40DD-AFC4-6F175D3DCCD1}">
+              <a14:hiddenFill xmlns:a14="http://schemas.microsoft.com/office/drawing/2010/main">
+                <a:solidFill>
+                  <a:schemeClr val="accent1"/>
+                </a:solidFill>
+              </a14:hiddenFill>
+            </a:ext>
+            <a:ext uri="{91240B29-F687-4F45-9708-019B960494DF}">
+              <a14:hiddenLine xmlns:a14="http://schemas.microsoft.com/office/drawing/2010/main" w="9525">
+                <a:solidFill>
+                  <a:schemeClr val="tx1"/>
+                </a:solidFill>
+                <a:miter lim="800000"/>
+                <a:headEnd/>
+                <a:tailEnd/>
+              </a14:hiddenLine>
+            </a:ext>
+          </a:extLst>
+        </p:spPr>
+      </p:pic>
+    </p:spTree>
+    <p:extLst>
+      <p:ext uri="{BB962C8B-B14F-4D97-AF65-F5344CB8AC3E}">
+        <p14:creationId xmlns:p14="http://schemas.microsoft.com/office/powerpoint/2010/main" val="1810542516"/>
+      </p:ext>
+    </p:extLst>
+  </p:cSld>
+  <p:clrMapOvr>
+    <a:masterClrMapping/>
+  </p:clrMapOvr>
+  <p:timing>
+    <p:tnLst>
+      <p:par>
+        <p:cTn id="1" dur="indefinite" restart="never" nodeType="tmRoot"/>
+      </p:par>
+    </p:tnLst>
+  </p:timing>
+</p:sld>
+</file>
+
+<file path=ppt/slides/slide12.xml><?xml version="1.0" encoding="utf-8"?>
+<p:sld xmlns:a="http://schemas.openxmlformats.org/drawingml/2006/main" xmlns:r="http://schemas.openxmlformats.org/officeDocument/2006/relationships" xmlns:p="http://schemas.openxmlformats.org/presentationml/2006/main">
+  <p:cSld>
+    <p:spTree>
+      <p:nvGrpSpPr>
+        <p:cNvPr id="1" name=""/>
+        <p:cNvGrpSpPr/>
+        <p:nvPr/>
+      </p:nvGrpSpPr>
+      <p:grpSpPr>
+        <a:xfrm>
+          <a:off x="0" y="0"/>
+          <a:ext cx="0" cy="0"/>
+          <a:chOff x="0" y="0"/>
+          <a:chExt cx="0" cy="0"/>
+        </a:xfrm>
+      </p:grpSpPr>
+      <p:sp>
+        <p:nvSpPr>
+          <p:cNvPr id="2" name="Title 1"/>
+          <p:cNvSpPr>
+            <a:spLocks noGrp="1"/>
+          </p:cNvSpPr>
+          <p:nvPr>
+            <p:ph type="title"/>
+          </p:nvPr>
+        </p:nvSpPr>
+        <p:spPr/>
+        <p:txBody>
+          <a:bodyPr/>
+          <a:lstStyle/>
+          <a:p>
+            <a:r>
+              <a:rPr lang="en-US" dirty="0"/>
+              <a:t>Men’s Runner Results </a:t>
+            </a:r>
+            <a:r>
+              <a:rPr lang="en-US" dirty="0" smtClean="0"/>
+              <a:t>– Age (continued)</a:t>
+            </a:r>
+            <a:endParaRPr lang="en-US" dirty="0"/>
+          </a:p>
+        </p:txBody>
+      </p:sp>
+      <p:sp>
+        <p:nvSpPr>
+          <p:cNvPr id="4" name="Slide Number Placeholder 3"/>
+          <p:cNvSpPr>
+            <a:spLocks noGrp="1"/>
+          </p:cNvSpPr>
+          <p:nvPr>
+            <p:ph type="sldNum" sz="quarter" idx="12"/>
+          </p:nvPr>
+        </p:nvSpPr>
+        <p:spPr/>
+        <p:txBody>
+          <a:bodyPr/>
+          <a:lstStyle/>
+          <a:p>
+            <a:fld id="{7B7DB76D-28D5-4DAC-900A-A1330999554A}" type="slidenum">
+              <a:rPr lang="en-US" smtClean="0"/>
+              <a:t>12</a:t>
             </a:fld>
             <a:endParaRPr lang="en-US"/>
           </a:p>
@@ -13221,7 +13567,7 @@
 </p:sld>
 </file>
 
-<file path=ppt/slides/slide11.xml><?xml version="1.0" encoding="utf-8"?>
+<file path=ppt/slides/slide13.xml><?xml version="1.0" encoding="utf-8"?>
 <p:sld xmlns:a="http://schemas.openxmlformats.org/drawingml/2006/main" xmlns:r="http://schemas.openxmlformats.org/officeDocument/2006/relationships" xmlns:p="http://schemas.openxmlformats.org/presentationml/2006/main">
   <p:cSld>
     <p:spTree>
@@ -13333,7 +13679,7 @@
           <a:p>
             <a:fld id="{7B7DB76D-28D5-4DAC-900A-A1330999554A}" type="slidenum">
               <a:rPr lang="en-US" smtClean="0"/>
-              <a:t>11</a:t>
+              <a:t>13</a:t>
             </a:fld>
             <a:endParaRPr lang="en-US"/>
           </a:p>
@@ -13460,7 +13806,7 @@
 </p:sld>
 </file>
 
-<file path=ppt/slides/slide12.xml><?xml version="1.0" encoding="utf-8"?>
+<file path=ppt/slides/slide14.xml><?xml version="1.0" encoding="utf-8"?>
 <p:sld xmlns:a="http://schemas.openxmlformats.org/drawingml/2006/main" xmlns:r="http://schemas.openxmlformats.org/officeDocument/2006/relationships" xmlns:p="http://schemas.openxmlformats.org/presentationml/2006/main">
   <p:cSld>
     <p:spTree>
@@ -13521,7 +13867,7 @@
           <a:p>
             <a:fld id="{7B7DB76D-28D5-4DAC-900A-A1330999554A}" type="slidenum">
               <a:rPr lang="en-US" smtClean="0"/>
-              <a:t>12</a:t>
+              <a:t>14</a:t>
             </a:fld>
             <a:endParaRPr lang="en-US"/>
           </a:p>
@@ -13702,7 +14048,7 @@
 </p:sld>
 </file>
 
-<file path=ppt/slides/slide13.xml><?xml version="1.0" encoding="utf-8"?>
+<file path=ppt/slides/slide15.xml><?xml version="1.0" encoding="utf-8"?>
 <p:sld xmlns:a="http://schemas.openxmlformats.org/drawingml/2006/main" xmlns:r="http://schemas.openxmlformats.org/officeDocument/2006/relationships" xmlns:p="http://schemas.openxmlformats.org/presentationml/2006/main">
   <p:cSld>
     <p:spTree>
@@ -13856,7 +14202,7 @@
           <a:p>
             <a:fld id="{7B7DB76D-28D5-4DAC-900A-A1330999554A}" type="slidenum">
               <a:rPr lang="en-US" smtClean="0"/>
-              <a:t>13</a:t>
+              <a:t>15</a:t>
             </a:fld>
             <a:endParaRPr lang="en-US"/>
           </a:p>
@@ -14145,7 +14491,7 @@
 </p:sld>
 </file>
 
-<file path=ppt/slides/slide14.xml><?xml version="1.0" encoding="utf-8"?>
+<file path=ppt/slides/slide16.xml><?xml version="1.0" encoding="utf-8"?>
 <p:sld xmlns:a="http://schemas.openxmlformats.org/drawingml/2006/main" xmlns:r="http://schemas.openxmlformats.org/officeDocument/2006/relationships" xmlns:p="http://schemas.openxmlformats.org/presentationml/2006/main">
   <p:cSld>
     <p:spTree>
@@ -14305,7 +14651,7 @@
           <a:p>
             <a:fld id="{7B7DB76D-28D5-4DAC-900A-A1330999554A}" type="slidenum">
               <a:rPr lang="en-US" smtClean="0"/>
-              <a:t>14</a:t>
+              <a:t>16</a:t>
             </a:fld>
             <a:endParaRPr lang="en-US"/>
           </a:p>
@@ -14378,7 +14724,7 @@
 </p:sld>
 </file>
 
-<file path=ppt/slides/slide15.xml><?xml version="1.0" encoding="utf-8"?>
+<file path=ppt/slides/slide17.xml><?xml version="1.0" encoding="utf-8"?>
 <p:sld xmlns:a="http://schemas.openxmlformats.org/drawingml/2006/main" xmlns:r="http://schemas.openxmlformats.org/officeDocument/2006/relationships" xmlns:p="http://schemas.openxmlformats.org/presentationml/2006/main">
   <p:cSld>
     <p:spTree>
@@ -14437,13 +14783,8 @@
           <a:p>
             <a:r>
               <a:rPr lang="en-US" dirty="0" smtClean="0"/>
-              <a:t>MANOVA is a Multivariate extension of ANOVA with the only difference being that in MANOVA there are Multiple Dependent </a:t>
-            </a:r>
-            <a:r>
-              <a:rPr lang="en-US" dirty="0" smtClean="0"/>
-              <a:t>Variables (DV).</a:t>
-            </a:r>
-            <a:endParaRPr lang="en-US" dirty="0" smtClean="0"/>
+              <a:t>MANOVA is a Multivariate extension of ANOVA with the only difference being that in MANOVA there are Multiple Dependent Variables (DV).</a:t>
+            </a:r>
           </a:p>
           <a:p>
             <a:r>
@@ -14486,7 +14827,7 @@
           <a:p>
             <a:fld id="{7B7DB76D-28D5-4DAC-900A-A1330999554A}" type="slidenum">
               <a:rPr lang="en-US" smtClean="0"/>
-              <a:t>15</a:t>
+              <a:t>17</a:t>
             </a:fld>
             <a:endParaRPr lang="en-US"/>
           </a:p>
@@ -14505,7 +14846,7 @@
 </p:sld>
 </file>
 
-<file path=ppt/slides/slide16.xml><?xml version="1.0" encoding="utf-8"?>
+<file path=ppt/slides/slide18.xml><?xml version="1.0" encoding="utf-8"?>
 <p:sld xmlns:a="http://schemas.openxmlformats.org/drawingml/2006/main" xmlns:r="http://schemas.openxmlformats.org/officeDocument/2006/relationships" xmlns:p="http://schemas.openxmlformats.org/presentationml/2006/main">
   <p:cSld>
     <p:spTree>
@@ -14661,7 +15002,7 @@
           <a:p>
             <a:fld id="{7B7DB76D-28D5-4DAC-900A-A1330999554A}" type="slidenum">
               <a:rPr lang="en-US" smtClean="0"/>
-              <a:t>16</a:t>
+              <a:t>18</a:t>
             </a:fld>
             <a:endParaRPr lang="en-US"/>
           </a:p>
@@ -14680,7 +15021,7 @@
 </p:sld>
 </file>
 
-<file path=ppt/slides/slide17.xml><?xml version="1.0" encoding="utf-8"?>
+<file path=ppt/slides/slide19.xml><?xml version="1.0" encoding="utf-8"?>
 <p:sld xmlns:a="http://schemas.openxmlformats.org/drawingml/2006/main" xmlns:r="http://schemas.openxmlformats.org/officeDocument/2006/relationships" xmlns:p="http://schemas.openxmlformats.org/presentationml/2006/main">
   <p:cSld>
     <p:spTree>
@@ -14847,7 +15188,7 @@
           <a:p>
             <a:fld id="{7B7DB76D-28D5-4DAC-900A-A1330999554A}" type="slidenum">
               <a:rPr lang="en-US" smtClean="0"/>
-              <a:t>17</a:t>
+              <a:t>19</a:t>
             </a:fld>
             <a:endParaRPr lang="en-US"/>
           </a:p>
@@ -14873,7 +15214,135 @@
 </p:sld>
 </file>
 
-<file path=ppt/slides/slide18.xml><?xml version="1.0" encoding="utf-8"?>
+<file path=ppt/slides/slide2.xml><?xml version="1.0" encoding="utf-8"?>
+<p:sld xmlns:a="http://schemas.openxmlformats.org/drawingml/2006/main" xmlns:r="http://schemas.openxmlformats.org/officeDocument/2006/relationships" xmlns:p="http://schemas.openxmlformats.org/presentationml/2006/main">
+  <p:cSld>
+    <p:spTree>
+      <p:nvGrpSpPr>
+        <p:cNvPr id="1" name=""/>
+        <p:cNvGrpSpPr/>
+        <p:nvPr/>
+      </p:nvGrpSpPr>
+      <p:grpSpPr>
+        <a:xfrm>
+          <a:off x="0" y="0"/>
+          <a:ext cx="0" cy="0"/>
+          <a:chOff x="0" y="0"/>
+          <a:chExt cx="0" cy="0"/>
+        </a:xfrm>
+      </p:grpSpPr>
+      <p:sp>
+        <p:nvSpPr>
+          <p:cNvPr id="2" name="Title 1"/>
+          <p:cNvSpPr>
+            <a:spLocks noGrp="1"/>
+          </p:cNvSpPr>
+          <p:nvPr>
+            <p:ph type="title"/>
+          </p:nvPr>
+        </p:nvSpPr>
+        <p:spPr/>
+        <p:txBody>
+          <a:bodyPr/>
+          <a:lstStyle/>
+          <a:p>
+            <a:r>
+              <a:rPr lang="en-US" dirty="0" smtClean="0"/>
+              <a:t>Abstract</a:t>
+            </a:r>
+            <a:endParaRPr lang="en-US" dirty="0"/>
+          </a:p>
+        </p:txBody>
+      </p:sp>
+      <p:sp>
+        <p:nvSpPr>
+          <p:cNvPr id="3" name="Content Placeholder 2"/>
+          <p:cNvSpPr>
+            <a:spLocks noGrp="1"/>
+          </p:cNvSpPr>
+          <p:nvPr>
+            <p:ph idx="1"/>
+          </p:nvPr>
+        </p:nvSpPr>
+        <p:spPr>
+          <a:xfrm>
+            <a:off x="838200" y="2005012"/>
+            <a:ext cx="10515600" cy="4351338"/>
+          </a:xfrm>
+        </p:spPr>
+        <p:txBody>
+          <a:bodyPr/>
+          <a:lstStyle/>
+          <a:p>
+            <a:r>
+              <a:rPr lang="en-US" i="1" dirty="0" smtClean="0"/>
+              <a:t>We will be analyzing data from the annual Washington D.C. Cherry Blossom Race; Years: 1999-2012. There is a noticeable difference of age distribution over the years along with average run times. We will use statistical methods to explore and examine the change of the runners over time to help determine significant events in the history of the race.</a:t>
+            </a:r>
+            <a:endParaRPr lang="en-US" dirty="0"/>
+          </a:p>
+        </p:txBody>
+      </p:sp>
+      <p:sp>
+        <p:nvSpPr>
+          <p:cNvPr id="4" name="Slide Number Placeholder 3"/>
+          <p:cNvSpPr>
+            <a:spLocks noGrp="1"/>
+          </p:cNvSpPr>
+          <p:nvPr>
+            <p:ph type="sldNum" sz="quarter" idx="12"/>
+          </p:nvPr>
+        </p:nvSpPr>
+        <p:spPr/>
+        <p:txBody>
+          <a:bodyPr/>
+          <a:lstStyle/>
+          <a:p>
+            <a:fld id="{7B7DB76D-28D5-4DAC-900A-A1330999554A}" type="slidenum">
+              <a:rPr lang="en-US" smtClean="0"/>
+              <a:t>2</a:t>
+            </a:fld>
+            <a:endParaRPr lang="en-US"/>
+          </a:p>
+        </p:txBody>
+      </p:sp>
+      <p:pic>
+        <p:nvPicPr>
+          <p:cNvPr id="5" name="Picture 4"/>
+          <p:cNvPicPr>
+            <a:picLocks noChangeAspect="1"/>
+          </p:cNvPicPr>
+          <p:nvPr/>
+        </p:nvPicPr>
+        <p:blipFill>
+          <a:blip r:embed="rId2"/>
+          <a:stretch>
+            <a:fillRect/>
+          </a:stretch>
+        </p:blipFill>
+        <p:spPr>
+          <a:xfrm>
+            <a:off x="7314856" y="365125"/>
+            <a:ext cx="4591050" cy="1390650"/>
+          </a:xfrm>
+          <a:prstGeom prst="rect">
+            <a:avLst/>
+          </a:prstGeom>
+        </p:spPr>
+      </p:pic>
+    </p:spTree>
+    <p:extLst>
+      <p:ext uri="{BB962C8B-B14F-4D97-AF65-F5344CB8AC3E}">
+        <p14:creationId xmlns:p14="http://schemas.microsoft.com/office/powerpoint/2010/main" val="2163746313"/>
+      </p:ext>
+    </p:extLst>
+  </p:cSld>
+  <p:clrMapOvr>
+    <a:masterClrMapping/>
+  </p:clrMapOvr>
+</p:sld>
+</file>
+
+<file path=ppt/slides/slide20.xml><?xml version="1.0" encoding="utf-8"?>
 <p:sld xmlns:a="http://schemas.openxmlformats.org/drawingml/2006/main" xmlns:r="http://schemas.openxmlformats.org/officeDocument/2006/relationships" xmlns:p="http://schemas.openxmlformats.org/presentationml/2006/main">
   <p:cSld>
     <p:spTree>
@@ -17337,7 +17806,7 @@
           <a:p>
             <a:fld id="{7B7DB76D-28D5-4DAC-900A-A1330999554A}" type="slidenum">
               <a:rPr lang="en-US" smtClean="0"/>
-              <a:t>18</a:t>
+              <a:t>20</a:t>
             </a:fld>
             <a:endParaRPr lang="en-US"/>
           </a:p>
@@ -17363,7 +17832,7 @@
 </p:sld>
 </file>
 
-<file path=ppt/slides/slide19.xml><?xml version="1.0" encoding="utf-8"?>
+<file path=ppt/slides/slide21.xml><?xml version="1.0" encoding="utf-8"?>
 <p:sld xmlns:a="http://schemas.openxmlformats.org/drawingml/2006/main" xmlns:r="http://schemas.openxmlformats.org/officeDocument/2006/relationships" xmlns:p="http://schemas.openxmlformats.org/presentationml/2006/main">
   <p:cSld>
     <p:spTree>
@@ -17443,7 +17912,7 @@
           <a:p>
             <a:fld id="{7B7DB76D-28D5-4DAC-900A-A1330999554A}" type="slidenum">
               <a:rPr lang="en-US" smtClean="0"/>
-              <a:t>19</a:t>
+              <a:t>21</a:t>
             </a:fld>
             <a:endParaRPr lang="en-US"/>
           </a:p>
@@ -17466,134 +17935,6 @@
       </p:par>
     </p:tnLst>
   </p:timing>
-</p:sld>
-</file>
-
-<file path=ppt/slides/slide2.xml><?xml version="1.0" encoding="utf-8"?>
-<p:sld xmlns:a="http://schemas.openxmlformats.org/drawingml/2006/main" xmlns:r="http://schemas.openxmlformats.org/officeDocument/2006/relationships" xmlns:p="http://schemas.openxmlformats.org/presentationml/2006/main">
-  <p:cSld>
-    <p:spTree>
-      <p:nvGrpSpPr>
-        <p:cNvPr id="1" name=""/>
-        <p:cNvGrpSpPr/>
-        <p:nvPr/>
-      </p:nvGrpSpPr>
-      <p:grpSpPr>
-        <a:xfrm>
-          <a:off x="0" y="0"/>
-          <a:ext cx="0" cy="0"/>
-          <a:chOff x="0" y="0"/>
-          <a:chExt cx="0" cy="0"/>
-        </a:xfrm>
-      </p:grpSpPr>
-      <p:sp>
-        <p:nvSpPr>
-          <p:cNvPr id="2" name="Title 1"/>
-          <p:cNvSpPr>
-            <a:spLocks noGrp="1"/>
-          </p:cNvSpPr>
-          <p:nvPr>
-            <p:ph type="title"/>
-          </p:nvPr>
-        </p:nvSpPr>
-        <p:spPr/>
-        <p:txBody>
-          <a:bodyPr/>
-          <a:lstStyle/>
-          <a:p>
-            <a:r>
-              <a:rPr lang="en-US" dirty="0" smtClean="0"/>
-              <a:t>Abstract</a:t>
-            </a:r>
-            <a:endParaRPr lang="en-US" dirty="0"/>
-          </a:p>
-        </p:txBody>
-      </p:sp>
-      <p:sp>
-        <p:nvSpPr>
-          <p:cNvPr id="3" name="Content Placeholder 2"/>
-          <p:cNvSpPr>
-            <a:spLocks noGrp="1"/>
-          </p:cNvSpPr>
-          <p:nvPr>
-            <p:ph idx="1"/>
-          </p:nvPr>
-        </p:nvSpPr>
-        <p:spPr>
-          <a:xfrm>
-            <a:off x="838200" y="2005012"/>
-            <a:ext cx="10515600" cy="4351338"/>
-          </a:xfrm>
-        </p:spPr>
-        <p:txBody>
-          <a:bodyPr/>
-          <a:lstStyle/>
-          <a:p>
-            <a:r>
-              <a:rPr lang="en-US" i="1" dirty="0" smtClean="0"/>
-              <a:t>We will be analyzing data from the annual Washington D.C. Cherry Blossom Race; Years: 1999-2012. There is a noticeable difference of age distribution over the years along with average run times. We will use statistical methods to explore and examine the change of the runners over time to help determine significant events in the history of the race.</a:t>
-            </a:r>
-            <a:endParaRPr lang="en-US" dirty="0"/>
-          </a:p>
-        </p:txBody>
-      </p:sp>
-      <p:sp>
-        <p:nvSpPr>
-          <p:cNvPr id="4" name="Slide Number Placeholder 3"/>
-          <p:cNvSpPr>
-            <a:spLocks noGrp="1"/>
-          </p:cNvSpPr>
-          <p:nvPr>
-            <p:ph type="sldNum" sz="quarter" idx="12"/>
-          </p:nvPr>
-        </p:nvSpPr>
-        <p:spPr/>
-        <p:txBody>
-          <a:bodyPr/>
-          <a:lstStyle/>
-          <a:p>
-            <a:fld id="{7B7DB76D-28D5-4DAC-900A-A1330999554A}" type="slidenum">
-              <a:rPr lang="en-US" smtClean="0"/>
-              <a:t>2</a:t>
-            </a:fld>
-            <a:endParaRPr lang="en-US"/>
-          </a:p>
-        </p:txBody>
-      </p:sp>
-      <p:pic>
-        <p:nvPicPr>
-          <p:cNvPr id="5" name="Picture 4"/>
-          <p:cNvPicPr>
-            <a:picLocks noChangeAspect="1"/>
-          </p:cNvPicPr>
-          <p:nvPr/>
-        </p:nvPicPr>
-        <p:blipFill>
-          <a:blip r:embed="rId2"/>
-          <a:stretch>
-            <a:fillRect/>
-          </a:stretch>
-        </p:blipFill>
-        <p:spPr>
-          <a:xfrm>
-            <a:off x="7314856" y="365125"/>
-            <a:ext cx="4591050" cy="1390650"/>
-          </a:xfrm>
-          <a:prstGeom prst="rect">
-            <a:avLst/>
-          </a:prstGeom>
-        </p:spPr>
-      </p:pic>
-    </p:spTree>
-    <p:extLst>
-      <p:ext uri="{BB962C8B-B14F-4D97-AF65-F5344CB8AC3E}">
-        <p14:creationId xmlns:p14="http://schemas.microsoft.com/office/powerpoint/2010/main" val="2163746313"/>
-      </p:ext>
-    </p:extLst>
-  </p:cSld>
-  <p:clrMapOvr>
-    <a:masterClrMapping/>
-  </p:clrMapOvr>
 </p:sld>
 </file>
 
@@ -17658,11 +17999,7 @@
             </a:r>
             <a:r>
               <a:rPr lang="en-US" i="1" dirty="0" smtClean="0"/>
-              <a:t>“Getting the data into the right </a:t>
-            </a:r>
-            <a:r>
-              <a:rPr lang="en-US" i="1" dirty="0" smtClean="0"/>
-              <a:t>format.”</a:t>
+              <a:t>“Getting the data into the right format.”</a:t>
             </a:r>
             <a:endParaRPr lang="en-US" dirty="0" smtClean="0"/>
           </a:p>
@@ -17679,19 +18016,7 @@
             </a:r>
             <a:r>
               <a:rPr lang="en-US" dirty="0" smtClean="0"/>
-              <a:t> with multiple formats </a:t>
-            </a:r>
-            <a:r>
-              <a:rPr lang="en-US" dirty="0" smtClean="0"/>
-              <a:t>covering </a:t>
-            </a:r>
-            <a:r>
-              <a:rPr lang="en-US" dirty="0" smtClean="0"/>
-              <a:t>many </a:t>
-            </a:r>
-            <a:r>
-              <a:rPr lang="en-US" dirty="0" smtClean="0"/>
-              <a:t>years</a:t>
+              <a:t> with multiple formats covering many years</a:t>
             </a:r>
           </a:p>
           <a:p>
@@ -17699,7 +18024,6 @@
               <a:rPr lang="en-US" dirty="0" smtClean="0"/>
               <a:t>Runner-selection moved to a lottery system in 2009. The organization claims the introduction may have affected the geographic distribution of runners.</a:t>
             </a:r>
-            <a:endParaRPr lang="en-US" dirty="0" smtClean="0"/>
           </a:p>
           <a:p>
             <a:endParaRPr lang="en-US" dirty="0"/>
@@ -17784,31 +18108,6 @@
       </p:sp>
       <p:sp>
         <p:nvSpPr>
-          <p:cNvPr id="3" name="Content Placeholder 2"/>
-          <p:cNvSpPr>
-            <a:spLocks noGrp="1"/>
-          </p:cNvSpPr>
-          <p:nvPr>
-            <p:ph idx="1"/>
-          </p:nvPr>
-        </p:nvSpPr>
-        <p:spPr/>
-        <p:txBody>
-          <a:bodyPr/>
-          <a:lstStyle/>
-          <a:p>
-            <a:r>
-              <a:rPr lang="en-US" dirty="0" smtClean="0"/>
-              <a:t>Matt</a:t>
-            </a:r>
-          </a:p>
-          <a:p>
-            <a:endParaRPr lang="en-US" dirty="0"/>
-          </a:p>
-        </p:txBody>
-      </p:sp>
-      <p:sp>
-        <p:nvSpPr>
           <p:cNvPr id="4" name="Slide Number Placeholder 3"/>
           <p:cNvSpPr>
             <a:spLocks noGrp="1"/>
@@ -17830,6 +18129,345 @@
           </a:p>
         </p:txBody>
       </p:sp>
+      <p:grpSp>
+        <p:nvGrpSpPr>
+          <p:cNvPr id="9" name="Group 8"/>
+          <p:cNvGrpSpPr/>
+          <p:nvPr/>
+        </p:nvGrpSpPr>
+        <p:grpSpPr>
+          <a:xfrm>
+            <a:off x="1141413" y="1714498"/>
+            <a:ext cx="10515600" cy="4351338"/>
+            <a:chOff x="1141413" y="1714498"/>
+            <a:chExt cx="10515600" cy="4351338"/>
+          </a:xfrm>
+        </p:grpSpPr>
+        <p:sp>
+          <p:nvSpPr>
+            <p:cNvPr id="5" name="Content Placeholder 2"/>
+            <p:cNvSpPr txBox="1">
+              <a:spLocks/>
+            </p:cNvSpPr>
+            <p:nvPr/>
+          </p:nvSpPr>
+          <p:spPr>
+            <a:xfrm>
+              <a:off x="1141413" y="1714498"/>
+              <a:ext cx="10515600" cy="4351338"/>
+            </a:xfrm>
+            <a:prstGeom prst="rect">
+              <a:avLst/>
+            </a:prstGeom>
+          </p:spPr>
+          <p:txBody>
+            <a:bodyPr vert="horz" lIns="91440" tIns="45720" rIns="91440" bIns="45720" rtlCol="0">
+              <a:normAutofit/>
+            </a:bodyPr>
+            <a:lstStyle>
+              <a:lvl1pPr marL="228600" indent="-228600" algn="l" defTabSz="914400" rtl="0" eaLnBrk="1" latinLnBrk="0" hangingPunct="1">
+                <a:lnSpc>
+                  <a:spcPct val="120000"/>
+                </a:lnSpc>
+                <a:spcBef>
+                  <a:spcPts val="1000"/>
+                </a:spcBef>
+                <a:buSzPct val="125000"/>
+                <a:buFont typeface="Arial" panose="020B0604020202020204" pitchFamily="34" charset="0"/>
+                <a:buChar char="•"/>
+                <a:defRPr sz="2400" kern="1200">
+                  <a:solidFill>
+                    <a:schemeClr val="tx1"/>
+                  </a:solidFill>
+                  <a:latin typeface="+mn-lt"/>
+                  <a:ea typeface="+mn-ea"/>
+                  <a:cs typeface="+mn-cs"/>
+                </a:defRPr>
+              </a:lvl1pPr>
+              <a:lvl2pPr marL="685800" indent="-228600" algn="l" defTabSz="914400" rtl="0" eaLnBrk="1" latinLnBrk="0" hangingPunct="1">
+                <a:lnSpc>
+                  <a:spcPct val="120000"/>
+                </a:lnSpc>
+                <a:spcBef>
+                  <a:spcPts val="500"/>
+                </a:spcBef>
+                <a:buSzPct val="125000"/>
+                <a:buFont typeface="Arial" panose="020B0604020202020204" pitchFamily="34" charset="0"/>
+                <a:buChar char="•"/>
+                <a:defRPr sz="2000" kern="1200">
+                  <a:solidFill>
+                    <a:schemeClr val="tx1"/>
+                  </a:solidFill>
+                  <a:latin typeface="+mn-lt"/>
+                  <a:ea typeface="+mn-ea"/>
+                  <a:cs typeface="+mn-cs"/>
+                </a:defRPr>
+              </a:lvl2pPr>
+              <a:lvl3pPr marL="1143000" indent="-228600" algn="l" defTabSz="914400" rtl="0" eaLnBrk="1" latinLnBrk="0" hangingPunct="1">
+                <a:lnSpc>
+                  <a:spcPct val="120000"/>
+                </a:lnSpc>
+                <a:spcBef>
+                  <a:spcPts val="500"/>
+                </a:spcBef>
+                <a:buSzPct val="125000"/>
+                <a:buFont typeface="Arial" panose="020B0604020202020204" pitchFamily="34" charset="0"/>
+                <a:buChar char="•"/>
+                <a:defRPr sz="1800" kern="1200">
+                  <a:solidFill>
+                    <a:schemeClr val="tx1"/>
+                  </a:solidFill>
+                  <a:latin typeface="+mn-lt"/>
+                  <a:ea typeface="+mn-ea"/>
+                  <a:cs typeface="+mn-cs"/>
+                </a:defRPr>
+              </a:lvl3pPr>
+              <a:lvl4pPr marL="1600200" indent="-228600" algn="l" defTabSz="914400" rtl="0" eaLnBrk="1" latinLnBrk="0" hangingPunct="1">
+                <a:lnSpc>
+                  <a:spcPct val="120000"/>
+                </a:lnSpc>
+                <a:spcBef>
+                  <a:spcPts val="500"/>
+                </a:spcBef>
+                <a:buSzPct val="125000"/>
+                <a:buFont typeface="Arial" panose="020B0604020202020204" pitchFamily="34" charset="0"/>
+                <a:buChar char="•"/>
+                <a:defRPr sz="1600" kern="1200">
+                  <a:solidFill>
+                    <a:schemeClr val="tx1"/>
+                  </a:solidFill>
+                  <a:latin typeface="+mn-lt"/>
+                  <a:ea typeface="+mn-ea"/>
+                  <a:cs typeface="+mn-cs"/>
+                </a:defRPr>
+              </a:lvl4pPr>
+              <a:lvl5pPr marL="2057400" indent="-228600" algn="l" defTabSz="914400" rtl="0" eaLnBrk="1" latinLnBrk="0" hangingPunct="1">
+                <a:lnSpc>
+                  <a:spcPct val="120000"/>
+                </a:lnSpc>
+                <a:spcBef>
+                  <a:spcPts val="500"/>
+                </a:spcBef>
+                <a:buSzPct val="125000"/>
+                <a:buFont typeface="Arial" panose="020B0604020202020204" pitchFamily="34" charset="0"/>
+                <a:buChar char="•"/>
+                <a:defRPr sz="1600" kern="1200">
+                  <a:solidFill>
+                    <a:schemeClr val="tx1"/>
+                  </a:solidFill>
+                  <a:latin typeface="+mn-lt"/>
+                  <a:ea typeface="+mn-ea"/>
+                  <a:cs typeface="+mn-cs"/>
+                </a:defRPr>
+              </a:lvl5pPr>
+              <a:lvl6pPr marL="2514600" indent="-228600" algn="l" defTabSz="914400" rtl="0" eaLnBrk="1" latinLnBrk="0" hangingPunct="1">
+                <a:lnSpc>
+                  <a:spcPct val="120000"/>
+                </a:lnSpc>
+                <a:spcBef>
+                  <a:spcPts val="500"/>
+                </a:spcBef>
+                <a:buSzPct val="125000"/>
+                <a:buFont typeface="Arial" panose="020B0604020202020204" pitchFamily="34" charset="0"/>
+                <a:buChar char="•"/>
+                <a:defRPr sz="1400" kern="1200">
+                  <a:solidFill>
+                    <a:schemeClr val="tx1"/>
+                  </a:solidFill>
+                  <a:latin typeface="+mn-lt"/>
+                  <a:ea typeface="+mn-ea"/>
+                  <a:cs typeface="+mn-cs"/>
+                </a:defRPr>
+              </a:lvl6pPr>
+              <a:lvl7pPr marL="2971800" indent="-228600" algn="l" defTabSz="914400" rtl="0" eaLnBrk="1" latinLnBrk="0" hangingPunct="1">
+                <a:lnSpc>
+                  <a:spcPct val="120000"/>
+                </a:lnSpc>
+                <a:spcBef>
+                  <a:spcPts val="500"/>
+                </a:spcBef>
+                <a:buSzPct val="125000"/>
+                <a:buFont typeface="Arial" panose="020B0604020202020204" pitchFamily="34" charset="0"/>
+                <a:buChar char="•"/>
+                <a:defRPr sz="1400" kern="1200">
+                  <a:solidFill>
+                    <a:schemeClr val="tx1"/>
+                  </a:solidFill>
+                  <a:latin typeface="+mn-lt"/>
+                  <a:ea typeface="+mn-ea"/>
+                  <a:cs typeface="+mn-cs"/>
+                </a:defRPr>
+              </a:lvl7pPr>
+              <a:lvl8pPr marL="3429000" indent="-228600" algn="l" defTabSz="914400" rtl="0" eaLnBrk="1" latinLnBrk="0" hangingPunct="1">
+                <a:lnSpc>
+                  <a:spcPct val="120000"/>
+                </a:lnSpc>
+                <a:spcBef>
+                  <a:spcPts val="500"/>
+                </a:spcBef>
+                <a:buSzPct val="125000"/>
+                <a:buFont typeface="Arial" panose="020B0604020202020204" pitchFamily="34" charset="0"/>
+                <a:buChar char="•"/>
+                <a:defRPr sz="1400" kern="1200">
+                  <a:solidFill>
+                    <a:schemeClr val="tx1"/>
+                  </a:solidFill>
+                  <a:latin typeface="+mn-lt"/>
+                  <a:ea typeface="+mn-ea"/>
+                  <a:cs typeface="+mn-cs"/>
+                </a:defRPr>
+              </a:lvl8pPr>
+              <a:lvl9pPr marL="3886200" indent="-228600" algn="l" defTabSz="914400" rtl="0" eaLnBrk="1" latinLnBrk="0" hangingPunct="1">
+                <a:lnSpc>
+                  <a:spcPct val="120000"/>
+                </a:lnSpc>
+                <a:spcBef>
+                  <a:spcPts val="500"/>
+                </a:spcBef>
+                <a:buSzPct val="125000"/>
+                <a:buFont typeface="Arial" panose="020B0604020202020204" pitchFamily="34" charset="0"/>
+                <a:buChar char="•"/>
+                <a:defRPr sz="1400" kern="1200">
+                  <a:solidFill>
+                    <a:schemeClr val="tx1"/>
+                  </a:solidFill>
+                  <a:latin typeface="+mn-lt"/>
+                  <a:ea typeface="+mn-ea"/>
+                  <a:cs typeface="+mn-cs"/>
+                </a:defRPr>
+              </a:lvl9pPr>
+            </a:lstStyle>
+            <a:p>
+              <a:r>
+                <a:rPr lang="en-US" dirty="0" smtClean="0"/>
+                <a:t>Data was loaded from Cherry Blossom and </a:t>
+              </a:r>
+              <a:r>
+                <a:rPr lang="en-US" dirty="0" err="1" smtClean="0"/>
+                <a:t>github</a:t>
+              </a:r>
+              <a:r>
+                <a:rPr lang="en-US" dirty="0" smtClean="0"/>
+                <a:t> sites.</a:t>
+              </a:r>
+            </a:p>
+            <a:p>
+              <a:pPr lvl="1"/>
+              <a:r>
+                <a:rPr lang="en-US" dirty="0" smtClean="0"/>
+                <a:t>R data: 1999 and 2000 from </a:t>
+              </a:r>
+              <a:r>
+                <a:rPr lang="en-US" dirty="0" err="1" smtClean="0"/>
+                <a:t>dtkaplan</a:t>
+              </a:r>
+              <a:r>
+                <a:rPr lang="en-US" dirty="0" smtClean="0"/>
+                <a:t>/</a:t>
+              </a:r>
+              <a:r>
+                <a:rPr lang="en-US" dirty="0" err="1" smtClean="0"/>
+                <a:t>statisticalModeling</a:t>
+              </a:r>
+              <a:r>
+                <a:rPr lang="en-US" dirty="0" smtClean="0"/>
+                <a:t> site</a:t>
+              </a:r>
+            </a:p>
+            <a:p>
+              <a:pPr lvl="1"/>
+              <a:r>
+                <a:rPr lang="en-US" dirty="0" smtClean="0"/>
+                <a:t>Web data: 2001 through 2012 from ”</a:t>
+              </a:r>
+              <a:r>
+                <a:rPr lang="mr-IN" dirty="0" smtClean="0"/>
+                <a:t>…</a:t>
+              </a:r>
+              <a:r>
+                <a:rPr lang="en-US" dirty="0" smtClean="0"/>
+                <a:t>/results/year/</a:t>
+              </a:r>
+              <a:r>
+                <a:rPr lang="mr-IN" dirty="0" smtClean="0"/>
+                <a:t>…</a:t>
+              </a:r>
+              <a:r>
+                <a:rPr lang="en-US" dirty="0" smtClean="0"/>
+                <a:t>” pages</a:t>
+              </a:r>
+            </a:p>
+            <a:p>
+              <a:pPr lvl="1"/>
+              <a:endParaRPr lang="en-US" dirty="0" smtClean="0"/>
+            </a:p>
+            <a:p>
+              <a:pPr lvl="1"/>
+              <a:endParaRPr lang="en-US" dirty="0" smtClean="0"/>
+            </a:p>
+            <a:p>
+              <a:r>
+                <a:rPr lang="en-US" dirty="0" smtClean="0"/>
+                <a:t>Data frames created from R and Web sites were merged into one data frame.</a:t>
+              </a:r>
+            </a:p>
+            <a:p>
+              <a:endParaRPr lang="en-US" dirty="0" smtClean="0"/>
+            </a:p>
+            <a:p>
+              <a:endParaRPr lang="en-US" dirty="0" smtClean="0"/>
+            </a:p>
+          </p:txBody>
+        </p:sp>
+        <p:pic>
+          <p:nvPicPr>
+            <p:cNvPr id="7" name="Picture 6"/>
+            <p:cNvPicPr>
+              <a:picLocks noChangeAspect="1"/>
+            </p:cNvPicPr>
+            <p:nvPr/>
+          </p:nvPicPr>
+          <p:blipFill>
+            <a:blip r:embed="rId2"/>
+            <a:stretch>
+              <a:fillRect/>
+            </a:stretch>
+          </p:blipFill>
+          <p:spPr>
+            <a:xfrm>
+              <a:off x="2842683" y="3260406"/>
+              <a:ext cx="4254500" cy="571500"/>
+            </a:xfrm>
+            <a:prstGeom prst="rect">
+              <a:avLst/>
+            </a:prstGeom>
+          </p:spPr>
+        </p:pic>
+        <p:pic>
+          <p:nvPicPr>
+            <p:cNvPr id="8" name="Picture 7"/>
+            <p:cNvPicPr>
+              <a:picLocks noChangeAspect="1"/>
+            </p:cNvPicPr>
+            <p:nvPr/>
+          </p:nvPicPr>
+          <p:blipFill>
+            <a:blip r:embed="rId3"/>
+            <a:stretch>
+              <a:fillRect/>
+            </a:stretch>
+          </p:blipFill>
+          <p:spPr>
+            <a:xfrm>
+              <a:off x="2588683" y="4926567"/>
+              <a:ext cx="4508500" cy="1130300"/>
+            </a:xfrm>
+            <a:prstGeom prst="rect">
+              <a:avLst/>
+            </a:prstGeom>
+          </p:spPr>
+        </p:pic>
+      </p:grpSp>
     </p:spTree>
     <p:extLst>
       <p:ext uri="{BB962C8B-B14F-4D97-AF65-F5344CB8AC3E}">
@@ -17884,33 +18522,12 @@
           <a:p>
             <a:r>
               <a:rPr lang="en-US" dirty="0" smtClean="0"/>
-              <a:t>Data Prep</a:t>
-            </a:r>
-            <a:endParaRPr lang="en-US" dirty="0"/>
-          </a:p>
-        </p:txBody>
-      </p:sp>
-      <p:sp>
-        <p:nvSpPr>
-          <p:cNvPr id="3" name="Content Placeholder 2"/>
-          <p:cNvSpPr>
-            <a:spLocks noGrp="1"/>
-          </p:cNvSpPr>
-          <p:nvPr>
-            <p:ph idx="1"/>
-          </p:nvPr>
-        </p:nvSpPr>
-        <p:spPr/>
-        <p:txBody>
-          <a:bodyPr/>
-          <a:lstStyle/>
-          <a:p>
+              <a:t>Data </a:t>
+            </a:r>
             <a:r>
               <a:rPr lang="en-US" dirty="0" smtClean="0"/>
-              <a:t>Matt</a:t>
-            </a:r>
-          </a:p>
-          <a:p>
+              <a:t>loading: years 1999 and 2000</a:t>
+            </a:r>
             <a:endParaRPr lang="en-US" dirty="0"/>
           </a:p>
         </p:txBody>
@@ -17938,6 +18555,125 @@
           </a:p>
         </p:txBody>
       </p:sp>
+      <p:sp>
+        <p:nvSpPr>
+          <p:cNvPr id="6" name="Content Placeholder 2"/>
+          <p:cNvSpPr>
+            <a:spLocks noGrp="1"/>
+          </p:cNvSpPr>
+          <p:nvPr>
+            <p:ph idx="1"/>
+          </p:nvPr>
+        </p:nvSpPr>
+        <p:spPr>
+          <a:xfrm>
+            <a:off x="838200" y="1825625"/>
+            <a:ext cx="10515599" cy="1685756"/>
+          </a:xfrm>
+        </p:spPr>
+        <p:txBody>
+          <a:bodyPr>
+            <a:normAutofit fontScale="77500" lnSpcReduction="20000"/>
+          </a:bodyPr>
+          <a:lstStyle/>
+          <a:p>
+            <a:r>
+              <a:rPr lang="en-US" dirty="0" smtClean="0"/>
+              <a:t>Load </a:t>
+            </a:r>
+            <a:r>
+              <a:rPr lang="en-US" dirty="0" err="1" smtClean="0"/>
+              <a:t>devtools</a:t>
+            </a:r>
+            <a:r>
+              <a:rPr lang="en-US" dirty="0" smtClean="0"/>
+              <a:t> in order to load R library from </a:t>
+            </a:r>
+            <a:r>
+              <a:rPr lang="en-US" dirty="0" err="1" smtClean="0"/>
+              <a:t>github</a:t>
+            </a:r>
+            <a:r>
+              <a:rPr lang="en-US" dirty="0" smtClean="0"/>
+              <a:t>.</a:t>
+            </a:r>
+          </a:p>
+          <a:p>
+            <a:r>
+              <a:rPr lang="en-US" dirty="0" smtClean="0"/>
+              <a:t>Load data </a:t>
+            </a:r>
+            <a:r>
+              <a:rPr lang="en-US" i="1" dirty="0" smtClean="0"/>
+              <a:t>Runners </a:t>
+            </a:r>
+            <a:r>
+              <a:rPr lang="en-US" dirty="0" smtClean="0"/>
+              <a:t>and filter on years 1999 and 2000.</a:t>
+            </a:r>
+          </a:p>
+          <a:p>
+            <a:r>
+              <a:rPr lang="en-US" dirty="0" smtClean="0"/>
+              <a:t>Drop columns and appropriate data.</a:t>
+            </a:r>
+          </a:p>
+          <a:p>
+            <a:r>
+              <a:rPr lang="en-US" dirty="0" smtClean="0"/>
+              <a:t>Rename column.</a:t>
+            </a:r>
+          </a:p>
+        </p:txBody>
+      </p:sp>
+      <p:pic>
+        <p:nvPicPr>
+          <p:cNvPr id="7" name="Picture 6"/>
+          <p:cNvPicPr>
+            <a:picLocks noChangeAspect="1"/>
+          </p:cNvPicPr>
+          <p:nvPr/>
+        </p:nvPicPr>
+        <p:blipFill>
+          <a:blip r:embed="rId2"/>
+          <a:stretch>
+            <a:fillRect/>
+          </a:stretch>
+        </p:blipFill>
+        <p:spPr>
+          <a:xfrm>
+            <a:off x="4038600" y="3265848"/>
+            <a:ext cx="7484533" cy="2665581"/>
+          </a:xfrm>
+          <a:prstGeom prst="rect">
+            <a:avLst/>
+          </a:prstGeom>
+        </p:spPr>
+      </p:pic>
+      <p:pic>
+        <p:nvPicPr>
+          <p:cNvPr id="8" name="Picture 7"/>
+          <p:cNvPicPr>
+            <a:picLocks noChangeAspect="1"/>
+          </p:cNvPicPr>
+          <p:nvPr/>
+        </p:nvPicPr>
+        <p:blipFill>
+          <a:blip r:embed="rId3"/>
+          <a:stretch>
+            <a:fillRect/>
+          </a:stretch>
+        </p:blipFill>
+        <p:spPr>
+          <a:xfrm>
+            <a:off x="0" y="4249388"/>
+            <a:ext cx="3810000" cy="1257300"/>
+          </a:xfrm>
+          <a:prstGeom prst="rect">
+            <a:avLst/>
+          </a:prstGeom>
+        </p:spPr>
+      </p:pic>
     </p:spTree>
     <p:extLst>
       <p:ext uri="{BB962C8B-B14F-4D97-AF65-F5344CB8AC3E}">
@@ -17959,6 +18695,280 @@
 </file>
 
 <file path=ppt/slides/slide6.xml><?xml version="1.0" encoding="utf-8"?>
+<p:sld xmlns:a="http://schemas.openxmlformats.org/drawingml/2006/main" xmlns:r="http://schemas.openxmlformats.org/officeDocument/2006/relationships" xmlns:p="http://schemas.openxmlformats.org/presentationml/2006/main">
+  <p:cSld>
+    <p:spTree>
+      <p:nvGrpSpPr>
+        <p:cNvPr id="1" name=""/>
+        <p:cNvGrpSpPr/>
+        <p:nvPr/>
+      </p:nvGrpSpPr>
+      <p:grpSpPr>
+        <a:xfrm>
+          <a:off x="0" y="0"/>
+          <a:ext cx="0" cy="0"/>
+          <a:chOff x="0" y="0"/>
+          <a:chExt cx="0" cy="0"/>
+        </a:xfrm>
+      </p:grpSpPr>
+      <p:sp>
+        <p:nvSpPr>
+          <p:cNvPr id="4" name="Slide Number Placeholder 3"/>
+          <p:cNvSpPr>
+            <a:spLocks noGrp="1"/>
+          </p:cNvSpPr>
+          <p:nvPr>
+            <p:ph type="sldNum" sz="quarter" idx="12"/>
+          </p:nvPr>
+        </p:nvSpPr>
+        <p:spPr/>
+        <p:txBody>
+          <a:bodyPr/>
+          <a:lstStyle/>
+          <a:p>
+            <a:fld id="{7B7DB76D-28D5-4DAC-900A-A1330999554A}" type="slidenum">
+              <a:rPr lang="en-US" smtClean="0"/>
+              <a:t>6</a:t>
+            </a:fld>
+            <a:endParaRPr lang="en-US"/>
+          </a:p>
+        </p:txBody>
+      </p:sp>
+    </p:spTree>
+    <p:extLst>
+      <p:ext uri="{BB962C8B-B14F-4D97-AF65-F5344CB8AC3E}">
+        <p14:creationId xmlns:p14="http://schemas.microsoft.com/office/powerpoint/2010/main" val="3643836349"/>
+      </p:ext>
+    </p:extLst>
+  </p:cSld>
+  <p:clrMapOvr>
+    <a:masterClrMapping/>
+  </p:clrMapOvr>
+</p:sld>
+</file>
+
+<file path=ppt/slides/slide7.xml><?xml version="1.0" encoding="utf-8"?>
+<p:sld xmlns:a="http://schemas.openxmlformats.org/drawingml/2006/main" xmlns:r="http://schemas.openxmlformats.org/officeDocument/2006/relationships" xmlns:p="http://schemas.openxmlformats.org/presentationml/2006/main">
+  <p:cSld>
+    <p:spTree>
+      <p:nvGrpSpPr>
+        <p:cNvPr id="1" name=""/>
+        <p:cNvGrpSpPr/>
+        <p:nvPr/>
+      </p:nvGrpSpPr>
+      <p:grpSpPr>
+        <a:xfrm>
+          <a:off x="0" y="0"/>
+          <a:ext cx="0" cy="0"/>
+          <a:chOff x="0" y="0"/>
+          <a:chExt cx="0" cy="0"/>
+        </a:xfrm>
+      </p:grpSpPr>
+      <p:sp>
+        <p:nvSpPr>
+          <p:cNvPr id="2" name="Title 1"/>
+          <p:cNvSpPr>
+            <a:spLocks noGrp="1"/>
+          </p:cNvSpPr>
+          <p:nvPr>
+            <p:ph type="title"/>
+          </p:nvPr>
+        </p:nvSpPr>
+        <p:spPr>
+          <a:xfrm>
+            <a:off x="1141412" y="-67612"/>
+            <a:ext cx="9905998" cy="1478570"/>
+          </a:xfrm>
+        </p:spPr>
+        <p:txBody>
+          <a:bodyPr/>
+          <a:lstStyle/>
+          <a:p>
+            <a:r>
+              <a:rPr lang="en-US" dirty="0" smtClean="0"/>
+              <a:t>Data Loading: 2001 </a:t>
+            </a:r>
+            <a:r>
+              <a:rPr lang="mr-IN" dirty="0" smtClean="0"/>
+              <a:t>–</a:t>
+            </a:r>
+            <a:r>
+              <a:rPr lang="en-US" dirty="0" smtClean="0"/>
+              <a:t> 2012 Years</a:t>
+            </a:r>
+            <a:endParaRPr lang="en-US" dirty="0"/>
+          </a:p>
+        </p:txBody>
+      </p:sp>
+      <p:sp>
+        <p:nvSpPr>
+          <p:cNvPr id="3" name="Content Placeholder 2"/>
+          <p:cNvSpPr>
+            <a:spLocks noGrp="1"/>
+          </p:cNvSpPr>
+          <p:nvPr>
+            <p:ph idx="1"/>
+          </p:nvPr>
+        </p:nvSpPr>
+        <p:spPr>
+          <a:xfrm>
+            <a:off x="868055" y="867202"/>
+            <a:ext cx="10452712" cy="4400293"/>
+          </a:xfrm>
+        </p:spPr>
+        <p:txBody>
+          <a:bodyPr/>
+          <a:lstStyle/>
+          <a:p>
+            <a:r>
+              <a:rPr lang="en-US" dirty="0" smtClean="0"/>
+              <a:t>Extract data from web pages into table with year heading</a:t>
+            </a:r>
+          </a:p>
+          <a:p>
+            <a:endParaRPr lang="en-US" dirty="0"/>
+          </a:p>
+          <a:p>
+            <a:endParaRPr lang="en-US" dirty="0" smtClean="0"/>
+          </a:p>
+          <a:p>
+            <a:r>
+              <a:rPr lang="en-US" dirty="0" smtClean="0"/>
+              <a:t>Extract variables from tables and create data frame per year</a:t>
+            </a:r>
+          </a:p>
+          <a:p>
+            <a:endParaRPr lang="en-US" dirty="0" smtClean="0"/>
+          </a:p>
+          <a:p>
+            <a:endParaRPr lang="en-US" dirty="0" smtClean="0"/>
+          </a:p>
+          <a:p>
+            <a:r>
+              <a:rPr lang="en-US" dirty="0" smtClean="0"/>
+              <a:t>Merge yearly data frame into one data frame</a:t>
+            </a:r>
+          </a:p>
+          <a:p>
+            <a:endParaRPr lang="en-US" dirty="0" smtClean="0"/>
+          </a:p>
+          <a:p>
+            <a:endParaRPr lang="en-US" dirty="0" smtClean="0"/>
+          </a:p>
+          <a:p>
+            <a:endParaRPr lang="en-US" dirty="0" smtClean="0"/>
+          </a:p>
+        </p:txBody>
+      </p:sp>
+      <p:sp>
+        <p:nvSpPr>
+          <p:cNvPr id="4" name="Slide Number Placeholder 3"/>
+          <p:cNvSpPr>
+            <a:spLocks noGrp="1"/>
+          </p:cNvSpPr>
+          <p:nvPr>
+            <p:ph type="sldNum" sz="quarter" idx="12"/>
+          </p:nvPr>
+        </p:nvSpPr>
+        <p:spPr/>
+        <p:txBody>
+          <a:bodyPr/>
+          <a:lstStyle/>
+          <a:p>
+            <a:fld id="{7B7DB76D-28D5-4DAC-900A-A1330999554A}" type="slidenum">
+              <a:rPr lang="en-US" smtClean="0"/>
+              <a:t>7</a:t>
+            </a:fld>
+            <a:endParaRPr lang="en-US"/>
+          </a:p>
+        </p:txBody>
+      </p:sp>
+      <p:pic>
+        <p:nvPicPr>
+          <p:cNvPr id="5" name="Picture 4"/>
+          <p:cNvPicPr>
+            <a:picLocks noChangeAspect="1"/>
+          </p:cNvPicPr>
+          <p:nvPr/>
+        </p:nvPicPr>
+        <p:blipFill>
+          <a:blip r:embed="rId2"/>
+          <a:stretch>
+            <a:fillRect/>
+          </a:stretch>
+        </p:blipFill>
+        <p:spPr>
+          <a:xfrm>
+            <a:off x="3079099" y="1445835"/>
+            <a:ext cx="3600450" cy="1119973"/>
+          </a:xfrm>
+          <a:prstGeom prst="rect">
+            <a:avLst/>
+          </a:prstGeom>
+        </p:spPr>
+      </p:pic>
+      <p:pic>
+        <p:nvPicPr>
+          <p:cNvPr id="6" name="Picture 5"/>
+          <p:cNvPicPr>
+            <a:picLocks noChangeAspect="1"/>
+          </p:cNvPicPr>
+          <p:nvPr/>
+        </p:nvPicPr>
+        <p:blipFill>
+          <a:blip r:embed="rId3"/>
+          <a:stretch>
+            <a:fillRect/>
+          </a:stretch>
+        </p:blipFill>
+        <p:spPr>
+          <a:xfrm>
+            <a:off x="2069533" y="3320776"/>
+            <a:ext cx="6464300" cy="965200"/>
+          </a:xfrm>
+          <a:prstGeom prst="rect">
+            <a:avLst/>
+          </a:prstGeom>
+        </p:spPr>
+      </p:pic>
+      <p:pic>
+        <p:nvPicPr>
+          <p:cNvPr id="7" name="Picture 6"/>
+          <p:cNvPicPr>
+            <a:picLocks noChangeAspect="1"/>
+          </p:cNvPicPr>
+          <p:nvPr/>
+        </p:nvPicPr>
+        <p:blipFill>
+          <a:blip r:embed="rId4"/>
+          <a:stretch>
+            <a:fillRect/>
+          </a:stretch>
+        </p:blipFill>
+        <p:spPr>
+          <a:xfrm>
+            <a:off x="1704900" y="5040945"/>
+            <a:ext cx="7193567" cy="1707563"/>
+          </a:xfrm>
+          <a:prstGeom prst="rect">
+            <a:avLst/>
+          </a:prstGeom>
+        </p:spPr>
+      </p:pic>
+    </p:spTree>
+    <p:extLst>
+      <p:ext uri="{BB962C8B-B14F-4D97-AF65-F5344CB8AC3E}">
+        <p14:creationId xmlns:p14="http://schemas.microsoft.com/office/powerpoint/2010/main" val="1272963125"/>
+      </p:ext>
+    </p:extLst>
+  </p:cSld>
+  <p:clrMapOvr>
+    <a:masterClrMapping/>
+  </p:clrMapOvr>
+</p:sld>
+</file>
+
+<file path=ppt/slides/slide8.xml><?xml version="1.0" encoding="utf-8"?>
 <p:sld xmlns:a="http://schemas.openxmlformats.org/drawingml/2006/main" xmlns:r="http://schemas.openxmlformats.org/officeDocument/2006/relationships" xmlns:p="http://schemas.openxmlformats.org/presentationml/2006/main">
   <p:cSld>
     <p:spTree>
@@ -18091,7 +19101,7 @@
               <a:pPr>
                 <a:defRPr/>
               </a:pPr>
-              <a:t>6</a:t>
+              <a:t>8</a:t>
             </a:fld>
             <a:endParaRPr lang="en-US"/>
           </a:p>
@@ -18110,7 +19120,7 @@
 </p:sld>
 </file>
 
-<file path=ppt/slides/slide7.xml><?xml version="1.0" encoding="utf-8"?>
+<file path=ppt/slides/slide9.xml><?xml version="1.0" encoding="utf-8"?>
 <p:sld xmlns:a="http://schemas.openxmlformats.org/drawingml/2006/main" xmlns:r="http://schemas.openxmlformats.org/officeDocument/2006/relationships" xmlns:p="http://schemas.openxmlformats.org/presentationml/2006/main">
   <p:cSld>
     <p:spTree>
@@ -18246,7 +19256,7 @@
           <a:p>
             <a:fld id="{7B7DB76D-28D5-4DAC-900A-A1330999554A}" type="slidenum">
               <a:rPr lang="en-US" smtClean="0"/>
-              <a:t>7</a:t>
+              <a:t>9</a:t>
             </a:fld>
             <a:endParaRPr lang="en-US"/>
           </a:p>
@@ -18262,351 +19272,6 @@
   <p:clrMapOvr>
     <a:masterClrMapping/>
   </p:clrMapOvr>
-</p:sld>
-</file>
-
-<file path=ppt/slides/slide8.xml><?xml version="1.0" encoding="utf-8"?>
-<p:sld xmlns:a="http://schemas.openxmlformats.org/drawingml/2006/main" xmlns:r="http://schemas.openxmlformats.org/officeDocument/2006/relationships" xmlns:p="http://schemas.openxmlformats.org/presentationml/2006/main">
-  <p:cSld>
-    <p:spTree>
-      <p:nvGrpSpPr>
-        <p:cNvPr id="1" name=""/>
-        <p:cNvGrpSpPr/>
-        <p:nvPr/>
-      </p:nvGrpSpPr>
-      <p:grpSpPr>
-        <a:xfrm>
-          <a:off x="0" y="0"/>
-          <a:ext cx="0" cy="0"/>
-          <a:chOff x="0" y="0"/>
-          <a:chExt cx="0" cy="0"/>
-        </a:xfrm>
-      </p:grpSpPr>
-      <p:sp>
-        <p:nvSpPr>
-          <p:cNvPr id="2" name="Title 1"/>
-          <p:cNvSpPr>
-            <a:spLocks noGrp="1"/>
-          </p:cNvSpPr>
-          <p:nvPr>
-            <p:ph type="title"/>
-          </p:nvPr>
-        </p:nvSpPr>
-        <p:spPr/>
-        <p:txBody>
-          <a:bodyPr/>
-          <a:lstStyle/>
-          <a:p>
-            <a:r>
-              <a:rPr lang="en-US" dirty="0" smtClean="0"/>
-              <a:t>Exploratory</a:t>
-            </a:r>
-            <a:endParaRPr lang="en-US" dirty="0"/>
-          </a:p>
-        </p:txBody>
-      </p:sp>
-      <p:sp>
-        <p:nvSpPr>
-          <p:cNvPr id="3" name="Content Placeholder 2"/>
-          <p:cNvSpPr>
-            <a:spLocks noGrp="1"/>
-          </p:cNvSpPr>
-          <p:nvPr>
-            <p:ph idx="1"/>
-          </p:nvPr>
-        </p:nvSpPr>
-        <p:spPr/>
-        <p:txBody>
-          <a:bodyPr/>
-          <a:lstStyle/>
-          <a:p>
-            <a:r>
-              <a:rPr lang="en-US" dirty="0" smtClean="0"/>
-              <a:t>Ben/Austin</a:t>
-            </a:r>
-            <a:endParaRPr lang="en-US" dirty="0"/>
-          </a:p>
-        </p:txBody>
-      </p:sp>
-      <p:sp>
-        <p:nvSpPr>
-          <p:cNvPr id="4" name="Slide Number Placeholder 3"/>
-          <p:cNvSpPr>
-            <a:spLocks noGrp="1"/>
-          </p:cNvSpPr>
-          <p:nvPr>
-            <p:ph type="sldNum" sz="quarter" idx="12"/>
-          </p:nvPr>
-        </p:nvSpPr>
-        <p:spPr/>
-        <p:txBody>
-          <a:bodyPr/>
-          <a:lstStyle/>
-          <a:p>
-            <a:fld id="{7B7DB76D-28D5-4DAC-900A-A1330999554A}" type="slidenum">
-              <a:rPr lang="en-US" smtClean="0"/>
-              <a:t>8</a:t>
-            </a:fld>
-            <a:endParaRPr lang="en-US"/>
-          </a:p>
-        </p:txBody>
-      </p:sp>
-    </p:spTree>
-    <p:extLst>
-      <p:ext uri="{BB962C8B-B14F-4D97-AF65-F5344CB8AC3E}">
-        <p14:creationId xmlns:p14="http://schemas.microsoft.com/office/powerpoint/2010/main" val="4270067039"/>
-      </p:ext>
-    </p:extLst>
-  </p:cSld>
-  <p:clrMapOvr>
-    <a:masterClrMapping/>
-  </p:clrMapOvr>
-  <p:timing>
-    <p:tnLst>
-      <p:par>
-        <p:cTn id="1" dur="indefinite" restart="never" nodeType="tmRoot"/>
-      </p:par>
-    </p:tnLst>
-  </p:timing>
-</p:sld>
-</file>
-
-<file path=ppt/slides/slide9.xml><?xml version="1.0" encoding="utf-8"?>
-<p:sld xmlns:a="http://schemas.openxmlformats.org/drawingml/2006/main" xmlns:r="http://schemas.openxmlformats.org/officeDocument/2006/relationships" xmlns:p="http://schemas.openxmlformats.org/presentationml/2006/main">
-  <p:cSld>
-    <p:spTree>
-      <p:nvGrpSpPr>
-        <p:cNvPr id="1" name=""/>
-        <p:cNvGrpSpPr/>
-        <p:nvPr/>
-      </p:nvGrpSpPr>
-      <p:grpSpPr>
-        <a:xfrm>
-          <a:off x="0" y="0"/>
-          <a:ext cx="0" cy="0"/>
-          <a:chOff x="0" y="0"/>
-          <a:chExt cx="0" cy="0"/>
-        </a:xfrm>
-      </p:grpSpPr>
-      <p:sp>
-        <p:nvSpPr>
-          <p:cNvPr id="5" name="Title 4"/>
-          <p:cNvSpPr>
-            <a:spLocks noGrp="1"/>
-          </p:cNvSpPr>
-          <p:nvPr>
-            <p:ph type="title"/>
-          </p:nvPr>
-        </p:nvSpPr>
-        <p:spPr/>
-        <p:txBody>
-          <a:bodyPr/>
-          <a:lstStyle/>
-          <a:p>
-            <a:r>
-              <a:rPr lang="en-US" dirty="0" smtClean="0"/>
-              <a:t>Men’s Runner Results - Age</a:t>
-            </a:r>
-            <a:endParaRPr lang="en-US" dirty="0"/>
-          </a:p>
-        </p:txBody>
-      </p:sp>
-      <p:pic>
-        <p:nvPicPr>
-          <p:cNvPr id="1026" name="Picture 2"/>
-          <p:cNvPicPr>
-            <a:picLocks noGrp="1" noChangeAspect="1" noChangeArrowheads="1"/>
-          </p:cNvPicPr>
-          <p:nvPr>
-            <p:ph type="pic" idx="1"/>
-          </p:nvPr>
-        </p:nvPicPr>
-        <p:blipFill>
-          <a:blip r:embed="rId2">
-            <a:extLst>
-              <a:ext uri="{28A0092B-C50C-407E-A947-70E740481C1C}">
-                <a14:useLocalDpi xmlns:a14="http://schemas.microsoft.com/office/drawing/2010/main" val="0"/>
-              </a:ext>
-            </a:extLst>
-          </a:blip>
-          <a:srcRect l="3479" r="3479"/>
-          <a:stretch>
-            <a:fillRect/>
-          </a:stretch>
-        </p:blipFill>
-        <p:spPr bwMode="auto">
-          <a:xfrm>
-            <a:off x="839788" y="2362994"/>
-            <a:ext cx="5324981" cy="3370385"/>
-          </a:xfrm>
-          <a:prstGeom prst="rect">
-            <a:avLst/>
-          </a:prstGeom>
-          <a:noFill/>
-          <a:ln>
-            <a:noFill/>
-          </a:ln>
-          <a:extLst>
-            <a:ext uri="{909E8E84-426E-40DD-AFC4-6F175D3DCCD1}">
-              <a14:hiddenFill xmlns:a14="http://schemas.microsoft.com/office/drawing/2010/main">
-                <a:solidFill>
-                  <a:schemeClr val="accent1"/>
-                </a:solidFill>
-              </a14:hiddenFill>
-            </a:ext>
-            <a:ext uri="{91240B29-F687-4F45-9708-019B960494DF}">
-              <a14:hiddenLine xmlns:a14="http://schemas.microsoft.com/office/drawing/2010/main" w="9525">
-                <a:solidFill>
-                  <a:schemeClr val="tx1"/>
-                </a:solidFill>
-                <a:miter lim="800000"/>
-                <a:headEnd/>
-                <a:tailEnd/>
-              </a14:hiddenLine>
-            </a:ext>
-          </a:extLst>
-        </p:spPr>
-      </p:pic>
-      <p:sp>
-        <p:nvSpPr>
-          <p:cNvPr id="6" name="Text Placeholder 5"/>
-          <p:cNvSpPr>
-            <a:spLocks noGrp="1"/>
-          </p:cNvSpPr>
-          <p:nvPr>
-            <p:ph type="body" sz="half" idx="2"/>
-          </p:nvPr>
-        </p:nvSpPr>
-        <p:spPr>
-          <a:xfrm>
-            <a:off x="6729628" y="305426"/>
-            <a:ext cx="3932237" cy="3811588"/>
-          </a:xfrm>
-        </p:spPr>
-        <p:txBody>
-          <a:bodyPr/>
-          <a:lstStyle/>
-          <a:p>
-            <a:r>
-              <a:rPr lang="en-US" dirty="0" smtClean="0"/>
-              <a:t>Boxplots</a:t>
-            </a:r>
-          </a:p>
-          <a:p>
-            <a:r>
-              <a:rPr lang="en-US" dirty="0" smtClean="0"/>
-              <a:t>Histograms</a:t>
-            </a:r>
-          </a:p>
-          <a:p>
-            <a:r>
-              <a:rPr lang="en-US" dirty="0" smtClean="0"/>
-              <a:t>Density Plot</a:t>
-            </a:r>
-          </a:p>
-          <a:p>
-            <a:r>
-              <a:rPr lang="en-US" dirty="0" smtClean="0"/>
-              <a:t>QQ Plot</a:t>
-            </a:r>
-            <a:endParaRPr lang="en-US" dirty="0" smtClean="0"/>
-          </a:p>
-        </p:txBody>
-      </p:sp>
-      <p:sp>
-        <p:nvSpPr>
-          <p:cNvPr id="4" name="Slide Number Placeholder 3"/>
-          <p:cNvSpPr>
-            <a:spLocks noGrp="1"/>
-          </p:cNvSpPr>
-          <p:nvPr>
-            <p:ph type="sldNum" sz="quarter" idx="12"/>
-          </p:nvPr>
-        </p:nvSpPr>
-        <p:spPr/>
-        <p:txBody>
-          <a:bodyPr/>
-          <a:lstStyle/>
-          <a:p>
-            <a:fld id="{7B7DB76D-28D5-4DAC-900A-A1330999554A}" type="slidenum">
-              <a:rPr lang="en-US" smtClean="0"/>
-              <a:t>9</a:t>
-            </a:fld>
-            <a:endParaRPr lang="en-US"/>
-          </a:p>
-        </p:txBody>
-      </p:sp>
-      <p:pic>
-        <p:nvPicPr>
-          <p:cNvPr id="1028" name="Picture 4"/>
-          <p:cNvPicPr>
-            <a:picLocks noChangeAspect="1" noChangeArrowheads="1"/>
-          </p:cNvPicPr>
-          <p:nvPr/>
-        </p:nvPicPr>
-        <p:blipFill>
-          <a:blip r:embed="rId3" cstate="print">
-            <a:extLst>
-              <a:ext uri="{28A0092B-C50C-407E-A947-70E740481C1C}">
-                <a14:useLocalDpi xmlns:a14="http://schemas.microsoft.com/office/drawing/2010/main" val="0"/>
-              </a:ext>
-            </a:extLst>
-          </a:blip>
-          <a:srcRect/>
-          <a:stretch>
-            <a:fillRect/>
-          </a:stretch>
-        </p:blipFill>
-        <p:spPr bwMode="auto">
-          <a:xfrm>
-            <a:off x="6478921" y="2211220"/>
-            <a:ext cx="4808832" cy="3673932"/>
-          </a:xfrm>
-          <a:prstGeom prst="rect">
-            <a:avLst/>
-          </a:prstGeom>
-          <a:noFill/>
-          <a:ln>
-            <a:noFill/>
-          </a:ln>
-          <a:extLst>
-            <a:ext uri="{909E8E84-426E-40DD-AFC4-6F175D3DCCD1}">
-              <a14:hiddenFill xmlns:a14="http://schemas.microsoft.com/office/drawing/2010/main">
-                <a:solidFill>
-                  <a:schemeClr val="accent1"/>
-                </a:solidFill>
-              </a14:hiddenFill>
-            </a:ext>
-            <a:ext uri="{91240B29-F687-4F45-9708-019B960494DF}">
-              <a14:hiddenLine xmlns:a14="http://schemas.microsoft.com/office/drawing/2010/main" w="9525">
-                <a:solidFill>
-                  <a:schemeClr val="tx1"/>
-                </a:solidFill>
-                <a:miter lim="800000"/>
-                <a:headEnd/>
-                <a:tailEnd/>
-              </a14:hiddenLine>
-            </a:ext>
-          </a:extLst>
-        </p:spPr>
-      </p:pic>
-    </p:spTree>
-    <p:extLst>
-      <p:ext uri="{BB962C8B-B14F-4D97-AF65-F5344CB8AC3E}">
-        <p14:creationId xmlns:p14="http://schemas.microsoft.com/office/powerpoint/2010/main" val="1810542516"/>
-      </p:ext>
-    </p:extLst>
-  </p:cSld>
-  <p:clrMapOvr>
-    <a:masterClrMapping/>
-  </p:clrMapOvr>
-  <p:timing>
-    <p:tnLst>
-      <p:par>
-        <p:cTn id="1" dur="indefinite" restart="never" nodeType="tmRoot"/>
-      </p:par>
-    </p:tnLst>
-  </p:timing>
 </p:sld>
 </file>
 

</xml_diff>

<commit_message>
Added .gifs for the various charts
</commit_message>
<xml_diff>
--- a/infographic.pptx
+++ b/infographic.pptx
@@ -5,7 +5,7 @@
     <p:sldMasterId id="2147483660" r:id="rId1"/>
   </p:sldMasterIdLst>
   <p:notesMasterIdLst>
-    <p:notesMasterId r:id="rId23"/>
+    <p:notesMasterId r:id="rId26"/>
   </p:notesMasterIdLst>
   <p:sldIdLst>
     <p:sldId id="257" r:id="rId2"/>
@@ -18,17 +18,20 @@
     <p:sldId id="273" r:id="rId9"/>
     <p:sldId id="274" r:id="rId10"/>
     <p:sldId id="260" r:id="rId11"/>
-    <p:sldId id="268" r:id="rId12"/>
-    <p:sldId id="279" r:id="rId13"/>
-    <p:sldId id="269" r:id="rId14"/>
-    <p:sldId id="280" r:id="rId15"/>
-    <p:sldId id="270" r:id="rId16"/>
-    <p:sldId id="271" r:id="rId17"/>
-    <p:sldId id="275" r:id="rId18"/>
-    <p:sldId id="277" r:id="rId19"/>
-    <p:sldId id="278" r:id="rId20"/>
-    <p:sldId id="256" r:id="rId21"/>
-    <p:sldId id="261" r:id="rId22"/>
+    <p:sldId id="283" r:id="rId12"/>
+    <p:sldId id="284" r:id="rId13"/>
+    <p:sldId id="285" r:id="rId14"/>
+    <p:sldId id="268" r:id="rId15"/>
+    <p:sldId id="279" r:id="rId16"/>
+    <p:sldId id="269" r:id="rId17"/>
+    <p:sldId id="280" r:id="rId18"/>
+    <p:sldId id="270" r:id="rId19"/>
+    <p:sldId id="271" r:id="rId20"/>
+    <p:sldId id="275" r:id="rId21"/>
+    <p:sldId id="277" r:id="rId22"/>
+    <p:sldId id="278" r:id="rId23"/>
+    <p:sldId id="256" r:id="rId24"/>
+    <p:sldId id="261" r:id="rId25"/>
   </p:sldIdLst>
   <p:sldSz cx="12192000" cy="6858000"/>
   <p:notesSz cx="6858000" cy="9144000"/>
@@ -569,7 +572,7 @@
           <a:p>
             <a:fld id="{BE9E425B-2894-4318-AA7F-42BC23137CA4}" type="slidenum">
               <a:rPr lang="en-US" smtClean="0"/>
-              <a:t>20</a:t>
+              <a:t>23</a:t>
             </a:fld>
             <a:endParaRPr lang="en-US"/>
           </a:p>
@@ -638,7 +641,7 @@
           <a:noFill/>
           <a:extLst>
             <a:ext uri="{909E8E84-426E-40dd-AFC4-6F175D3DCCD1}">
-              <a14:hiddenFill xmlns="" xmlns:a14="http://schemas.microsoft.com/office/drawing/2010/main">
+              <a14:hiddenFill xmlns:a14="http://schemas.microsoft.com/office/drawing/2010/main" xmlns="">
                 <a:solidFill>
                   <a:srgbClr val="FFFFFF"/>
                 </a:solidFill>
@@ -698,7 +701,7 @@
             </a:ln>
             <a:extLst>
               <a:ext uri="{91240B29-F687-4f45-9708-019B960494DF}">
-                <a14:hiddenLine xmlns="" xmlns:a14="http://schemas.microsoft.com/office/drawing/2010/main" w="9525">
+                <a14:hiddenLine xmlns:a14="http://schemas.microsoft.com/office/drawing/2010/main" xmlns="" w="9525">
                   <a:solidFill>
                     <a:srgbClr val="000000"/>
                   </a:solidFill>
@@ -788,7 +791,7 @@
             </a:ln>
             <a:extLst>
               <a:ext uri="{91240B29-F687-4f45-9708-019B960494DF}">
-                <a14:hiddenLine xmlns="" xmlns:a14="http://schemas.microsoft.com/office/drawing/2010/main" w="9525">
+                <a14:hiddenLine xmlns:a14="http://schemas.microsoft.com/office/drawing/2010/main" xmlns="" w="9525">
                   <a:solidFill>
                     <a:srgbClr val="000000"/>
                   </a:solidFill>
@@ -878,7 +881,7 @@
             </a:ln>
             <a:extLst>
               <a:ext uri="{91240B29-F687-4f45-9708-019B960494DF}">
-                <a14:hiddenLine xmlns="" xmlns:a14="http://schemas.microsoft.com/office/drawing/2010/main" w="9525">
+                <a14:hiddenLine xmlns:a14="http://schemas.microsoft.com/office/drawing/2010/main" xmlns="" w="9525">
                   <a:solidFill>
                     <a:srgbClr val="000000"/>
                   </a:solidFill>
@@ -912,7 +915,7 @@
             </a:ln>
             <a:extLst>
               <a:ext uri="{91240B29-F687-4f45-9708-019B960494DF}">
-                <a14:hiddenLine xmlns="" xmlns:a14="http://schemas.microsoft.com/office/drawing/2010/main" w="9525">
+                <a14:hiddenLine xmlns:a14="http://schemas.microsoft.com/office/drawing/2010/main" xmlns="" w="9525">
                   <a:solidFill>
                     <a:srgbClr val="000000"/>
                   </a:solidFill>
@@ -1002,7 +1005,7 @@
             </a:ln>
             <a:extLst>
               <a:ext uri="{91240B29-F687-4f45-9708-019B960494DF}">
-                <a14:hiddenLine xmlns="" xmlns:a14="http://schemas.microsoft.com/office/drawing/2010/main" w="9525">
+                <a14:hiddenLine xmlns:a14="http://schemas.microsoft.com/office/drawing/2010/main" xmlns="" w="9525">
                   <a:solidFill>
                     <a:srgbClr val="000000"/>
                   </a:solidFill>
@@ -1064,7 +1067,7 @@
             </a:ln>
             <a:extLst>
               <a:ext uri="{91240B29-F687-4f45-9708-019B960494DF}">
-                <a14:hiddenLine xmlns="" xmlns:a14="http://schemas.microsoft.com/office/drawing/2010/main" w="9525">
+                <a14:hiddenLine xmlns:a14="http://schemas.microsoft.com/office/drawing/2010/main" xmlns="" w="9525">
                   <a:solidFill>
                     <a:srgbClr val="000000"/>
                   </a:solidFill>
@@ -1126,7 +1129,7 @@
             </a:ln>
             <a:extLst>
               <a:ext uri="{91240B29-F687-4f45-9708-019B960494DF}">
-                <a14:hiddenLine xmlns="" xmlns:a14="http://schemas.microsoft.com/office/drawing/2010/main" w="9525">
+                <a14:hiddenLine xmlns:a14="http://schemas.microsoft.com/office/drawing/2010/main" xmlns="" w="9525">
                   <a:solidFill>
                     <a:srgbClr val="000000"/>
                   </a:solidFill>
@@ -1216,7 +1219,7 @@
             </a:ln>
             <a:extLst>
               <a:ext uri="{91240B29-F687-4f45-9708-019B960494DF}">
-                <a14:hiddenLine xmlns="" xmlns:a14="http://schemas.microsoft.com/office/drawing/2010/main" w="9525">
+                <a14:hiddenLine xmlns:a14="http://schemas.microsoft.com/office/drawing/2010/main" xmlns="" w="9525">
                   <a:solidFill>
                     <a:srgbClr val="000000"/>
                   </a:solidFill>
@@ -1278,7 +1281,7 @@
             </a:ln>
             <a:extLst>
               <a:ext uri="{91240B29-F687-4f45-9708-019B960494DF}">
-                <a14:hiddenLine xmlns="" xmlns:a14="http://schemas.microsoft.com/office/drawing/2010/main" w="9525">
+                <a14:hiddenLine xmlns:a14="http://schemas.microsoft.com/office/drawing/2010/main" xmlns="" w="9525">
                   <a:solidFill>
                     <a:srgbClr val="000000"/>
                   </a:solidFill>
@@ -1340,7 +1343,7 @@
             </a:ln>
             <a:extLst>
               <a:ext uri="{91240B29-F687-4f45-9708-019B960494DF}">
-                <a14:hiddenLine xmlns="" xmlns:a14="http://schemas.microsoft.com/office/drawing/2010/main" w="9525">
+                <a14:hiddenLine xmlns:a14="http://schemas.microsoft.com/office/drawing/2010/main" xmlns="" w="9525">
                   <a:solidFill>
                     <a:srgbClr val="000000"/>
                   </a:solidFill>
@@ -1430,7 +1433,7 @@
             </a:ln>
             <a:extLst>
               <a:ext uri="{91240B29-F687-4f45-9708-019B960494DF}">
-                <a14:hiddenLine xmlns="" xmlns:a14="http://schemas.microsoft.com/office/drawing/2010/main" w="9525">
+                <a14:hiddenLine xmlns:a14="http://schemas.microsoft.com/office/drawing/2010/main" xmlns="" w="9525">
                   <a:solidFill>
                     <a:srgbClr val="000000"/>
                   </a:solidFill>
@@ -1520,7 +1523,7 @@
             </a:ln>
             <a:extLst>
               <a:ext uri="{91240B29-F687-4f45-9708-019B960494DF}">
-                <a14:hiddenLine xmlns="" xmlns:a14="http://schemas.microsoft.com/office/drawing/2010/main" w="9525">
+                <a14:hiddenLine xmlns:a14="http://schemas.microsoft.com/office/drawing/2010/main" xmlns="" w="9525">
                   <a:solidFill>
                     <a:srgbClr val="000000"/>
                   </a:solidFill>
@@ -1582,7 +1585,7 @@
             </a:ln>
             <a:extLst>
               <a:ext uri="{91240B29-F687-4f45-9708-019B960494DF}">
-                <a14:hiddenLine xmlns="" xmlns:a14="http://schemas.microsoft.com/office/drawing/2010/main" w="9525">
+                <a14:hiddenLine xmlns:a14="http://schemas.microsoft.com/office/drawing/2010/main" xmlns="" w="9525">
                   <a:solidFill>
                     <a:srgbClr val="000000"/>
                   </a:solidFill>
@@ -1692,7 +1695,7 @@
             </a:ln>
             <a:extLst>
               <a:ext uri="{91240B29-F687-4f45-9708-019B960494DF}">
-                <a14:hiddenLine xmlns="" xmlns:a14="http://schemas.microsoft.com/office/drawing/2010/main" w="9525">
+                <a14:hiddenLine xmlns:a14="http://schemas.microsoft.com/office/drawing/2010/main" xmlns="" w="9525">
                   <a:solidFill>
                     <a:srgbClr val="000000"/>
                   </a:solidFill>
@@ -1754,7 +1757,7 @@
             </a:ln>
             <a:extLst>
               <a:ext uri="{91240B29-F687-4f45-9708-019B960494DF}">
-                <a14:hiddenLine xmlns="" xmlns:a14="http://schemas.microsoft.com/office/drawing/2010/main" w="9525">
+                <a14:hiddenLine xmlns:a14="http://schemas.microsoft.com/office/drawing/2010/main" xmlns="" w="9525">
                   <a:solidFill>
                     <a:srgbClr val="000000"/>
                   </a:solidFill>
@@ -1844,7 +1847,7 @@
             </a:ln>
             <a:extLst>
               <a:ext uri="{91240B29-F687-4f45-9708-019B960494DF}">
-                <a14:hiddenLine xmlns="" xmlns:a14="http://schemas.microsoft.com/office/drawing/2010/main" w="9525">
+                <a14:hiddenLine xmlns:a14="http://schemas.microsoft.com/office/drawing/2010/main" xmlns="" w="9525">
                   <a:solidFill>
                     <a:srgbClr val="000000"/>
                   </a:solidFill>
@@ -1934,7 +1937,7 @@
             </a:ln>
             <a:extLst>
               <a:ext uri="{91240B29-F687-4f45-9708-019B960494DF}">
-                <a14:hiddenLine xmlns="" xmlns:a14="http://schemas.microsoft.com/office/drawing/2010/main" w="9525">
+                <a14:hiddenLine xmlns:a14="http://schemas.microsoft.com/office/drawing/2010/main" xmlns="" w="9525">
                   <a:solidFill>
                     <a:srgbClr val="000000"/>
                   </a:solidFill>
@@ -1996,7 +1999,7 @@
             </a:ln>
             <a:extLst>
               <a:ext uri="{91240B29-F687-4f45-9708-019B960494DF}">
-                <a14:hiddenLine xmlns="" xmlns:a14="http://schemas.microsoft.com/office/drawing/2010/main" w="9525">
+                <a14:hiddenLine xmlns:a14="http://schemas.microsoft.com/office/drawing/2010/main" xmlns="" w="9525">
                   <a:solidFill>
                     <a:srgbClr val="000000"/>
                   </a:solidFill>
@@ -2086,7 +2089,7 @@
             </a:ln>
             <a:extLst>
               <a:ext uri="{91240B29-F687-4f45-9708-019B960494DF}">
-                <a14:hiddenLine xmlns="" xmlns:a14="http://schemas.microsoft.com/office/drawing/2010/main" w="9525">
+                <a14:hiddenLine xmlns:a14="http://schemas.microsoft.com/office/drawing/2010/main" xmlns="" w="9525">
                   <a:solidFill>
                     <a:srgbClr val="000000"/>
                   </a:solidFill>
@@ -2176,7 +2179,7 @@
             </a:ln>
             <a:extLst>
               <a:ext uri="{91240B29-F687-4f45-9708-019B960494DF}">
-                <a14:hiddenLine xmlns="" xmlns:a14="http://schemas.microsoft.com/office/drawing/2010/main" w="9525">
+                <a14:hiddenLine xmlns:a14="http://schemas.microsoft.com/office/drawing/2010/main" xmlns="" w="9525">
                   <a:solidFill>
                     <a:srgbClr val="000000"/>
                   </a:solidFill>
@@ -2232,7 +2235,7 @@
             </a:ln>
             <a:extLst>
               <a:ext uri="{91240B29-F687-4f45-9708-019B960494DF}">
-                <a14:hiddenLine xmlns="" xmlns:a14="http://schemas.microsoft.com/office/drawing/2010/main" w="9525">
+                <a14:hiddenLine xmlns:a14="http://schemas.microsoft.com/office/drawing/2010/main" xmlns="" w="9525">
                   <a:solidFill>
                     <a:srgbClr val="000000"/>
                   </a:solidFill>
@@ -2322,7 +2325,7 @@
             </a:ln>
             <a:extLst>
               <a:ext uri="{91240B29-F687-4f45-9708-019B960494DF}">
-                <a14:hiddenLine xmlns="" xmlns:a14="http://schemas.microsoft.com/office/drawing/2010/main" w="9525">
+                <a14:hiddenLine xmlns:a14="http://schemas.microsoft.com/office/drawing/2010/main" xmlns="" w="9525">
                   <a:solidFill>
                     <a:srgbClr val="000000"/>
                   </a:solidFill>
@@ -2378,7 +2381,7 @@
             </a:ln>
             <a:extLst>
               <a:ext uri="{91240B29-F687-4f45-9708-019B960494DF}">
-                <a14:hiddenLine xmlns="" xmlns:a14="http://schemas.microsoft.com/office/drawing/2010/main" w="9525">
+                <a14:hiddenLine xmlns:a14="http://schemas.microsoft.com/office/drawing/2010/main" xmlns="" w="9525">
                   <a:solidFill>
                     <a:srgbClr val="000000"/>
                   </a:solidFill>
@@ -2468,7 +2471,7 @@
             </a:ln>
             <a:extLst>
               <a:ext uri="{91240B29-F687-4f45-9708-019B960494DF}">
-                <a14:hiddenLine xmlns="" xmlns:a14="http://schemas.microsoft.com/office/drawing/2010/main" w="9525">
+                <a14:hiddenLine xmlns:a14="http://schemas.microsoft.com/office/drawing/2010/main" xmlns="" w="9525">
                   <a:solidFill>
                     <a:srgbClr val="000000"/>
                   </a:solidFill>
@@ -2536,7 +2539,7 @@
             </a:ln>
             <a:extLst>
               <a:ext uri="{91240B29-F687-4f45-9708-019B960494DF}">
-                <a14:hiddenLine xmlns="" xmlns:a14="http://schemas.microsoft.com/office/drawing/2010/main" w="9525">
+                <a14:hiddenLine xmlns:a14="http://schemas.microsoft.com/office/drawing/2010/main" xmlns="" w="9525">
                   <a:solidFill>
                     <a:srgbClr val="000000"/>
                   </a:solidFill>
@@ -2626,7 +2629,7 @@
             </a:ln>
             <a:extLst>
               <a:ext uri="{91240B29-F687-4f45-9708-019B960494DF}">
-                <a14:hiddenLine xmlns="" xmlns:a14="http://schemas.microsoft.com/office/drawing/2010/main" w="9525">
+                <a14:hiddenLine xmlns:a14="http://schemas.microsoft.com/office/drawing/2010/main" xmlns="" w="9525">
                   <a:solidFill>
                     <a:srgbClr val="000000"/>
                   </a:solidFill>
@@ -2694,7 +2697,7 @@
             </a:ln>
             <a:extLst>
               <a:ext uri="{91240B29-F687-4f45-9708-019B960494DF}">
-                <a14:hiddenLine xmlns="" xmlns:a14="http://schemas.microsoft.com/office/drawing/2010/main" w="9525">
+                <a14:hiddenLine xmlns:a14="http://schemas.microsoft.com/office/drawing/2010/main" xmlns="" w="9525">
                   <a:solidFill>
                     <a:srgbClr val="000000"/>
                   </a:solidFill>
@@ -2784,7 +2787,7 @@
             </a:ln>
             <a:extLst>
               <a:ext uri="{91240B29-F687-4f45-9708-019B960494DF}">
-                <a14:hiddenLine xmlns="" xmlns:a14="http://schemas.microsoft.com/office/drawing/2010/main" w="9525">
+                <a14:hiddenLine xmlns:a14="http://schemas.microsoft.com/office/drawing/2010/main" xmlns="" w="9525">
                   <a:solidFill>
                     <a:srgbClr val="000000"/>
                   </a:solidFill>
@@ -2818,7 +2821,7 @@
             </a:ln>
             <a:extLst>
               <a:ext uri="{91240B29-F687-4f45-9708-019B960494DF}">
-                <a14:hiddenLine xmlns="" xmlns:a14="http://schemas.microsoft.com/office/drawing/2010/main" w="9525">
+                <a14:hiddenLine xmlns:a14="http://schemas.microsoft.com/office/drawing/2010/main" xmlns="" w="9525">
                   <a:solidFill>
                     <a:srgbClr val="000000"/>
                   </a:solidFill>
@@ -2908,7 +2911,7 @@
             </a:ln>
             <a:extLst>
               <a:ext uri="{91240B29-F687-4f45-9708-019B960494DF}">
-                <a14:hiddenLine xmlns="" xmlns:a14="http://schemas.microsoft.com/office/drawing/2010/main" w="9525">
+                <a14:hiddenLine xmlns:a14="http://schemas.microsoft.com/office/drawing/2010/main" xmlns="" w="9525">
                   <a:solidFill>
                     <a:srgbClr val="000000"/>
                   </a:solidFill>
@@ -2970,7 +2973,7 @@
             </a:ln>
             <a:extLst>
               <a:ext uri="{91240B29-F687-4f45-9708-019B960494DF}">
-                <a14:hiddenLine xmlns="" xmlns:a14="http://schemas.microsoft.com/office/drawing/2010/main" w="9525">
+                <a14:hiddenLine xmlns:a14="http://schemas.microsoft.com/office/drawing/2010/main" xmlns="" w="9525">
                   <a:solidFill>
                     <a:srgbClr val="000000"/>
                   </a:solidFill>
@@ -3032,7 +3035,7 @@
             </a:ln>
             <a:extLst>
               <a:ext uri="{91240B29-F687-4f45-9708-019B960494DF}">
-                <a14:hiddenLine xmlns="" xmlns:a14="http://schemas.microsoft.com/office/drawing/2010/main" w="9525">
+                <a14:hiddenLine xmlns:a14="http://schemas.microsoft.com/office/drawing/2010/main" xmlns="" w="9525">
                   <a:solidFill>
                     <a:srgbClr val="000000"/>
                   </a:solidFill>
@@ -3122,7 +3125,7 @@
             </a:ln>
             <a:extLst>
               <a:ext uri="{91240B29-F687-4f45-9708-019B960494DF}">
-                <a14:hiddenLine xmlns="" xmlns:a14="http://schemas.microsoft.com/office/drawing/2010/main" w="9525">
+                <a14:hiddenLine xmlns:a14="http://schemas.microsoft.com/office/drawing/2010/main" xmlns="" w="9525">
                   <a:solidFill>
                     <a:srgbClr val="000000"/>
                   </a:solidFill>
@@ -3190,7 +3193,7 @@
             </a:ln>
             <a:extLst>
               <a:ext uri="{91240B29-F687-4f45-9708-019B960494DF}">
-                <a14:hiddenLine xmlns="" xmlns:a14="http://schemas.microsoft.com/office/drawing/2010/main" w="9525">
+                <a14:hiddenLine xmlns:a14="http://schemas.microsoft.com/office/drawing/2010/main" xmlns="" w="9525">
                   <a:solidFill>
                     <a:srgbClr val="000000"/>
                   </a:solidFill>
@@ -3252,7 +3255,7 @@
             </a:ln>
             <a:extLst>
               <a:ext uri="{91240B29-F687-4f45-9708-019B960494DF}">
-                <a14:hiddenLine xmlns="" xmlns:a14="http://schemas.microsoft.com/office/drawing/2010/main" w="9525">
+                <a14:hiddenLine xmlns:a14="http://schemas.microsoft.com/office/drawing/2010/main" xmlns="" w="9525">
                   <a:solidFill>
                     <a:srgbClr val="000000"/>
                   </a:solidFill>
@@ -3342,7 +3345,7 @@
             </a:ln>
             <a:extLst>
               <a:ext uri="{91240B29-F687-4f45-9708-019B960494DF}">
-                <a14:hiddenLine xmlns="" xmlns:a14="http://schemas.microsoft.com/office/drawing/2010/main" w="9525">
+                <a14:hiddenLine xmlns:a14="http://schemas.microsoft.com/office/drawing/2010/main" xmlns="" w="9525">
                   <a:solidFill>
                     <a:srgbClr val="000000"/>
                   </a:solidFill>
@@ -3404,7 +3407,7 @@
             </a:ln>
             <a:extLst>
               <a:ext uri="{91240B29-F687-4f45-9708-019B960494DF}">
-                <a14:hiddenLine xmlns="" xmlns:a14="http://schemas.microsoft.com/office/drawing/2010/main" w="9525">
+                <a14:hiddenLine xmlns:a14="http://schemas.microsoft.com/office/drawing/2010/main" xmlns="" w="9525">
                   <a:solidFill>
                     <a:srgbClr val="000000"/>
                   </a:solidFill>
@@ -3494,7 +3497,7 @@
             </a:ln>
             <a:extLst>
               <a:ext uri="{91240B29-F687-4f45-9708-019B960494DF}">
-                <a14:hiddenLine xmlns="" xmlns:a14="http://schemas.microsoft.com/office/drawing/2010/main" w="9525">
+                <a14:hiddenLine xmlns:a14="http://schemas.microsoft.com/office/drawing/2010/main" xmlns="" w="9525">
                   <a:solidFill>
                     <a:srgbClr val="000000"/>
                   </a:solidFill>
@@ -3556,7 +3559,7 @@
             </a:ln>
             <a:extLst>
               <a:ext uri="{91240B29-F687-4f45-9708-019B960494DF}">
-                <a14:hiddenLine xmlns="" xmlns:a14="http://schemas.microsoft.com/office/drawing/2010/main" w="9525">
+                <a14:hiddenLine xmlns:a14="http://schemas.microsoft.com/office/drawing/2010/main" xmlns="" w="9525">
                   <a:solidFill>
                     <a:srgbClr val="000000"/>
                   </a:solidFill>
@@ -3646,7 +3649,7 @@
             </a:ln>
             <a:extLst>
               <a:ext uri="{91240B29-F687-4f45-9708-019B960494DF}">
-                <a14:hiddenLine xmlns="" xmlns:a14="http://schemas.microsoft.com/office/drawing/2010/main" w="9525">
+                <a14:hiddenLine xmlns:a14="http://schemas.microsoft.com/office/drawing/2010/main" xmlns="" w="9525">
                   <a:solidFill>
                     <a:srgbClr val="000000"/>
                   </a:solidFill>
@@ -3680,7 +3683,7 @@
             </a:ln>
             <a:extLst>
               <a:ext uri="{91240B29-F687-4f45-9708-019B960494DF}">
-                <a14:hiddenLine xmlns="" xmlns:a14="http://schemas.microsoft.com/office/drawing/2010/main" w="9525">
+                <a14:hiddenLine xmlns:a14="http://schemas.microsoft.com/office/drawing/2010/main" xmlns="" w="9525">
                   <a:solidFill>
                     <a:srgbClr val="000000"/>
                   </a:solidFill>
@@ -3745,7 +3748,7 @@
             </a:ln>
             <a:extLst>
               <a:ext uri="{91240B29-F687-4f45-9708-019B960494DF}">
-                <a14:hiddenLine xmlns="" xmlns:a14="http://schemas.microsoft.com/office/drawing/2010/main" w="9525">
+                <a14:hiddenLine xmlns:a14="http://schemas.microsoft.com/office/drawing/2010/main" xmlns="" w="9525">
                   <a:solidFill>
                     <a:srgbClr val="000000"/>
                   </a:solidFill>
@@ -3835,7 +3838,7 @@
             </a:ln>
             <a:extLst>
               <a:ext uri="{91240B29-F687-4f45-9708-019B960494DF}">
-                <a14:hiddenLine xmlns="" xmlns:a14="http://schemas.microsoft.com/office/drawing/2010/main" w="9525">
+                <a14:hiddenLine xmlns:a14="http://schemas.microsoft.com/office/drawing/2010/main" xmlns="" w="9525">
                   <a:solidFill>
                     <a:srgbClr val="000000"/>
                   </a:solidFill>
@@ -3897,7 +3900,7 @@
             </a:ln>
             <a:extLst>
               <a:ext uri="{91240B29-F687-4f45-9708-019B960494DF}">
-                <a14:hiddenLine xmlns="" xmlns:a14="http://schemas.microsoft.com/office/drawing/2010/main" w="9525">
+                <a14:hiddenLine xmlns:a14="http://schemas.microsoft.com/office/drawing/2010/main" xmlns="" w="9525">
                   <a:solidFill>
                     <a:srgbClr val="000000"/>
                   </a:solidFill>
@@ -3987,7 +3990,7 @@
             </a:ln>
             <a:extLst>
               <a:ext uri="{91240B29-F687-4f45-9708-019B960494DF}">
-                <a14:hiddenLine xmlns="" xmlns:a14="http://schemas.microsoft.com/office/drawing/2010/main" w="9525">
+                <a14:hiddenLine xmlns:a14="http://schemas.microsoft.com/office/drawing/2010/main" xmlns="" w="9525">
                   <a:solidFill>
                     <a:srgbClr val="000000"/>
                   </a:solidFill>
@@ -4077,7 +4080,7 @@
             </a:ln>
             <a:extLst>
               <a:ext uri="{91240B29-F687-4f45-9708-019B960494DF}">
-                <a14:hiddenLine xmlns="" xmlns:a14="http://schemas.microsoft.com/office/drawing/2010/main" w="9525">
+                <a14:hiddenLine xmlns:a14="http://schemas.microsoft.com/office/drawing/2010/main" xmlns="" w="9525">
                   <a:solidFill>
                     <a:srgbClr val="000000"/>
                   </a:solidFill>
@@ -4142,7 +4145,7 @@
             </a:ln>
             <a:extLst>
               <a:ext uri="{91240B29-F687-4f45-9708-019B960494DF}">
-                <a14:hiddenLine xmlns="" xmlns:a14="http://schemas.microsoft.com/office/drawing/2010/main" w="9525">
+                <a14:hiddenLine xmlns:a14="http://schemas.microsoft.com/office/drawing/2010/main" xmlns="" w="9525">
                   <a:solidFill>
                     <a:srgbClr val="000000"/>
                   </a:solidFill>
@@ -4204,7 +4207,7 @@
             </a:ln>
             <a:extLst>
               <a:ext uri="{91240B29-F687-4f45-9708-019B960494DF}">
-                <a14:hiddenLine xmlns="" xmlns:a14="http://schemas.microsoft.com/office/drawing/2010/main" w="9525">
+                <a14:hiddenLine xmlns:a14="http://schemas.microsoft.com/office/drawing/2010/main" xmlns="" w="9525">
                   <a:solidFill>
                     <a:srgbClr val="000000"/>
                   </a:solidFill>
@@ -4294,7 +4297,7 @@
             </a:ln>
             <a:extLst>
               <a:ext uri="{91240B29-F687-4f45-9708-019B960494DF}">
-                <a14:hiddenLine xmlns="" xmlns:a14="http://schemas.microsoft.com/office/drawing/2010/main" w="9525">
+                <a14:hiddenLine xmlns:a14="http://schemas.microsoft.com/office/drawing/2010/main" xmlns="" w="9525">
                   <a:solidFill>
                     <a:srgbClr val="000000"/>
                   </a:solidFill>
@@ -4384,7 +4387,7 @@
             </a:ln>
             <a:extLst>
               <a:ext uri="{91240B29-F687-4f45-9708-019B960494DF}">
-                <a14:hiddenLine xmlns="" xmlns:a14="http://schemas.microsoft.com/office/drawing/2010/main" w="9525">
+                <a14:hiddenLine xmlns:a14="http://schemas.microsoft.com/office/drawing/2010/main" xmlns="" w="9525">
                   <a:solidFill>
                     <a:srgbClr val="000000"/>
                   </a:solidFill>
@@ -4446,7 +4449,7 @@
             </a:ln>
             <a:extLst>
               <a:ext uri="{91240B29-F687-4f45-9708-019B960494DF}">
-                <a14:hiddenLine xmlns="" xmlns:a14="http://schemas.microsoft.com/office/drawing/2010/main" w="9525">
+                <a14:hiddenLine xmlns:a14="http://schemas.microsoft.com/office/drawing/2010/main" xmlns="" w="9525">
                   <a:solidFill>
                     <a:srgbClr val="000000"/>
                   </a:solidFill>
@@ -4566,7 +4569,7 @@
             </a:ln>
             <a:extLst>
               <a:ext uri="{91240B29-F687-4f45-9708-019B960494DF}">
-                <a14:hiddenLine xmlns="" xmlns:a14="http://schemas.microsoft.com/office/drawing/2010/main" w="9525">
+                <a14:hiddenLine xmlns:a14="http://schemas.microsoft.com/office/drawing/2010/main" xmlns="" w="9525">
                   <a:solidFill>
                     <a:srgbClr val="000000"/>
                   </a:solidFill>
@@ -4634,7 +4637,7 @@
             </a:ln>
             <a:extLst>
               <a:ext uri="{91240B29-F687-4f45-9708-019B960494DF}">
-                <a14:hiddenLine xmlns="" xmlns:a14="http://schemas.microsoft.com/office/drawing/2010/main" w="9525">
+                <a14:hiddenLine xmlns:a14="http://schemas.microsoft.com/office/drawing/2010/main" xmlns="" w="9525">
                   <a:solidFill>
                     <a:srgbClr val="000000"/>
                   </a:solidFill>
@@ -4724,7 +4727,7 @@
             </a:ln>
             <a:extLst>
               <a:ext uri="{91240B29-F687-4f45-9708-019B960494DF}">
-                <a14:hiddenLine xmlns="" xmlns:a14="http://schemas.microsoft.com/office/drawing/2010/main" w="9525">
+                <a14:hiddenLine xmlns:a14="http://schemas.microsoft.com/office/drawing/2010/main" xmlns="" w="9525">
                   <a:solidFill>
                     <a:srgbClr val="000000"/>
                   </a:solidFill>
@@ -9537,7 +9540,7 @@
           <a:noFill/>
           <a:extLst>
             <a:ext uri="{909E8E84-426E-40dd-AFC4-6F175D3DCCD1}">
-              <a14:hiddenFill xmlns="" xmlns:a14="http://schemas.microsoft.com/office/drawing/2010/main">
+              <a14:hiddenFill xmlns:a14="http://schemas.microsoft.com/office/drawing/2010/main" xmlns="">
                 <a:solidFill>
                   <a:srgbClr val="FFFFFF"/>
                 </a:solidFill>
@@ -9611,7 +9614,7 @@
               </a:ln>
               <a:extLst>
                 <a:ext uri="{91240B29-F687-4f45-9708-019B960494DF}">
-                  <a14:hiddenLine xmlns="" xmlns:a14="http://schemas.microsoft.com/office/drawing/2010/main" w="9525">
+                  <a14:hiddenLine xmlns:a14="http://schemas.microsoft.com/office/drawing/2010/main" xmlns="" w="9525">
                     <a:solidFill>
                       <a:srgbClr val="000000"/>
                     </a:solidFill>
@@ -9701,7 +9704,7 @@
               </a:ln>
               <a:extLst>
                 <a:ext uri="{91240B29-F687-4f45-9708-019B960494DF}">
-                  <a14:hiddenLine xmlns="" xmlns:a14="http://schemas.microsoft.com/office/drawing/2010/main" w="9525">
+                  <a14:hiddenLine xmlns:a14="http://schemas.microsoft.com/office/drawing/2010/main" xmlns="" w="9525">
                     <a:solidFill>
                       <a:srgbClr val="000000"/>
                     </a:solidFill>
@@ -9791,7 +9794,7 @@
               </a:ln>
               <a:extLst>
                 <a:ext uri="{91240B29-F687-4f45-9708-019B960494DF}">
-                  <a14:hiddenLine xmlns="" xmlns:a14="http://schemas.microsoft.com/office/drawing/2010/main" w="9525">
+                  <a14:hiddenLine xmlns:a14="http://schemas.microsoft.com/office/drawing/2010/main" xmlns="" w="9525">
                     <a:solidFill>
                       <a:srgbClr val="000000"/>
                     </a:solidFill>
@@ -9853,7 +9856,7 @@
               </a:ln>
               <a:extLst>
                 <a:ext uri="{91240B29-F687-4f45-9708-019B960494DF}">
-                  <a14:hiddenLine xmlns="" xmlns:a14="http://schemas.microsoft.com/office/drawing/2010/main" w="9525">
+                  <a14:hiddenLine xmlns:a14="http://schemas.microsoft.com/office/drawing/2010/main" xmlns="" w="9525">
                     <a:solidFill>
                       <a:srgbClr val="000000"/>
                     </a:solidFill>
@@ -9943,7 +9946,7 @@
               </a:ln>
               <a:extLst>
                 <a:ext uri="{91240B29-F687-4f45-9708-019B960494DF}">
-                  <a14:hiddenLine xmlns="" xmlns:a14="http://schemas.microsoft.com/office/drawing/2010/main" w="9525">
+                  <a14:hiddenLine xmlns:a14="http://schemas.microsoft.com/office/drawing/2010/main" xmlns="" w="9525">
                     <a:solidFill>
                       <a:srgbClr val="000000"/>
                     </a:solidFill>
@@ -10005,7 +10008,7 @@
               </a:ln>
               <a:extLst>
                 <a:ext uri="{91240B29-F687-4f45-9708-019B960494DF}">
-                  <a14:hiddenLine xmlns="" xmlns:a14="http://schemas.microsoft.com/office/drawing/2010/main" w="9525">
+                  <a14:hiddenLine xmlns:a14="http://schemas.microsoft.com/office/drawing/2010/main" xmlns="" w="9525">
                     <a:solidFill>
                       <a:srgbClr val="000000"/>
                     </a:solidFill>
@@ -10067,7 +10070,7 @@
               </a:ln>
               <a:extLst>
                 <a:ext uri="{91240B29-F687-4f45-9708-019B960494DF}">
-                  <a14:hiddenLine xmlns="" xmlns:a14="http://schemas.microsoft.com/office/drawing/2010/main" w="9525">
+                  <a14:hiddenLine xmlns:a14="http://schemas.microsoft.com/office/drawing/2010/main" xmlns="" w="9525">
                     <a:solidFill>
                       <a:srgbClr val="000000"/>
                     </a:solidFill>
@@ -10157,7 +10160,7 @@
               </a:ln>
               <a:extLst>
                 <a:ext uri="{91240B29-F687-4f45-9708-019B960494DF}">
-                  <a14:hiddenLine xmlns="" xmlns:a14="http://schemas.microsoft.com/office/drawing/2010/main" w="9525">
+                  <a14:hiddenLine xmlns:a14="http://schemas.microsoft.com/office/drawing/2010/main" xmlns="" w="9525">
                     <a:solidFill>
                       <a:srgbClr val="000000"/>
                     </a:solidFill>
@@ -10247,7 +10250,7 @@
               </a:ln>
               <a:extLst>
                 <a:ext uri="{91240B29-F687-4f45-9708-019B960494DF}">
-                  <a14:hiddenLine xmlns="" xmlns:a14="http://schemas.microsoft.com/office/drawing/2010/main" w="9525">
+                  <a14:hiddenLine xmlns:a14="http://schemas.microsoft.com/office/drawing/2010/main" xmlns="" w="9525">
                     <a:solidFill>
                       <a:srgbClr val="000000"/>
                     </a:solidFill>
@@ -10309,7 +10312,7 @@
               </a:ln>
               <a:extLst>
                 <a:ext uri="{91240B29-F687-4f45-9708-019B960494DF}">
-                  <a14:hiddenLine xmlns="" xmlns:a14="http://schemas.microsoft.com/office/drawing/2010/main" w="9525">
+                  <a14:hiddenLine xmlns:a14="http://schemas.microsoft.com/office/drawing/2010/main" xmlns="" w="9525">
                     <a:solidFill>
                       <a:srgbClr val="000000"/>
                     </a:solidFill>
@@ -10419,7 +10422,7 @@
               </a:ln>
               <a:extLst>
                 <a:ext uri="{91240B29-F687-4f45-9708-019B960494DF}">
-                  <a14:hiddenLine xmlns="" xmlns:a14="http://schemas.microsoft.com/office/drawing/2010/main" w="9525">
+                  <a14:hiddenLine xmlns:a14="http://schemas.microsoft.com/office/drawing/2010/main" xmlns="" w="9525">
                     <a:solidFill>
                       <a:srgbClr val="000000"/>
                     </a:solidFill>
@@ -10503,7 +10506,7 @@
               </a:ln>
               <a:extLst>
                 <a:ext uri="{91240B29-F687-4f45-9708-019B960494DF}">
-                  <a14:hiddenLine xmlns="" xmlns:a14="http://schemas.microsoft.com/office/drawing/2010/main" w="9525">
+                  <a14:hiddenLine xmlns:a14="http://schemas.microsoft.com/office/drawing/2010/main" xmlns="" w="9525">
                     <a:solidFill>
                       <a:srgbClr val="000000"/>
                     </a:solidFill>
@@ -10565,7 +10568,7 @@
               </a:ln>
               <a:extLst>
                 <a:ext uri="{91240B29-F687-4f45-9708-019B960494DF}">
-                  <a14:hiddenLine xmlns="" xmlns:a14="http://schemas.microsoft.com/office/drawing/2010/main" w="9525">
+                  <a14:hiddenLine xmlns:a14="http://schemas.microsoft.com/office/drawing/2010/main" xmlns="" w="9525">
                     <a:solidFill>
                       <a:srgbClr val="000000"/>
                     </a:solidFill>
@@ -10627,7 +10630,7 @@
               </a:ln>
               <a:extLst>
                 <a:ext uri="{91240B29-F687-4f45-9708-019B960494DF}">
-                  <a14:hiddenLine xmlns="" xmlns:a14="http://schemas.microsoft.com/office/drawing/2010/main" w="9525">
+                  <a14:hiddenLine xmlns:a14="http://schemas.microsoft.com/office/drawing/2010/main" xmlns="" w="9525">
                     <a:solidFill>
                       <a:srgbClr val="000000"/>
                     </a:solidFill>
@@ -10717,7 +10720,7 @@
               </a:ln>
               <a:extLst>
                 <a:ext uri="{91240B29-F687-4f45-9708-019B960494DF}">
-                  <a14:hiddenLine xmlns="" xmlns:a14="http://schemas.microsoft.com/office/drawing/2010/main" w="9525">
+                  <a14:hiddenLine xmlns:a14="http://schemas.microsoft.com/office/drawing/2010/main" xmlns="" w="9525">
                     <a:solidFill>
                       <a:srgbClr val="000000"/>
                     </a:solidFill>
@@ -10751,7 +10754,7 @@
               </a:ln>
               <a:extLst>
                 <a:ext uri="{91240B29-F687-4f45-9708-019B960494DF}">
-                  <a14:hiddenLine xmlns="" xmlns:a14="http://schemas.microsoft.com/office/drawing/2010/main" w="9525">
+                  <a14:hiddenLine xmlns:a14="http://schemas.microsoft.com/office/drawing/2010/main" xmlns="" w="9525">
                     <a:solidFill>
                       <a:srgbClr val="000000"/>
                     </a:solidFill>
@@ -10816,7 +10819,7 @@
               </a:ln>
               <a:extLst>
                 <a:ext uri="{91240B29-F687-4f45-9708-019B960494DF}">
-                  <a14:hiddenLine xmlns="" xmlns:a14="http://schemas.microsoft.com/office/drawing/2010/main" w="9525">
+                  <a14:hiddenLine xmlns:a14="http://schemas.microsoft.com/office/drawing/2010/main" xmlns="" w="9525">
                     <a:solidFill>
                       <a:srgbClr val="000000"/>
                     </a:solidFill>
@@ -10906,7 +10909,7 @@
               </a:ln>
               <a:extLst>
                 <a:ext uri="{91240B29-F687-4f45-9708-019B960494DF}">
-                  <a14:hiddenLine xmlns="" xmlns:a14="http://schemas.microsoft.com/office/drawing/2010/main" w="9525">
+                  <a14:hiddenLine xmlns:a14="http://schemas.microsoft.com/office/drawing/2010/main" xmlns="" w="9525">
                     <a:solidFill>
                       <a:srgbClr val="000000"/>
                     </a:solidFill>
@@ -10968,7 +10971,7 @@
               </a:ln>
               <a:extLst>
                 <a:ext uri="{91240B29-F687-4f45-9708-019B960494DF}">
-                  <a14:hiddenLine xmlns="" xmlns:a14="http://schemas.microsoft.com/office/drawing/2010/main" w="9525">
+                  <a14:hiddenLine xmlns:a14="http://schemas.microsoft.com/office/drawing/2010/main" xmlns="" w="9525">
                     <a:solidFill>
                       <a:srgbClr val="000000"/>
                     </a:solidFill>
@@ -11058,7 +11061,7 @@
               </a:ln>
               <a:extLst>
                 <a:ext uri="{91240B29-F687-4f45-9708-019B960494DF}">
-                  <a14:hiddenLine xmlns="" xmlns:a14="http://schemas.microsoft.com/office/drawing/2010/main" w="9525">
+                  <a14:hiddenLine xmlns:a14="http://schemas.microsoft.com/office/drawing/2010/main" xmlns="" w="9525">
                     <a:solidFill>
                       <a:srgbClr val="000000"/>
                     </a:solidFill>
@@ -11123,7 +11126,7 @@
               </a:ln>
               <a:extLst>
                 <a:ext uri="{91240B29-F687-4f45-9708-019B960494DF}">
-                  <a14:hiddenLine xmlns="" xmlns:a14="http://schemas.microsoft.com/office/drawing/2010/main" w="9525">
+                  <a14:hiddenLine xmlns:a14="http://schemas.microsoft.com/office/drawing/2010/main" xmlns="" w="9525">
                     <a:solidFill>
                       <a:srgbClr val="000000"/>
                     </a:solidFill>
@@ -11185,7 +11188,7 @@
               </a:ln>
               <a:extLst>
                 <a:ext uri="{91240B29-F687-4f45-9708-019B960494DF}">
-                  <a14:hiddenLine xmlns="" xmlns:a14="http://schemas.microsoft.com/office/drawing/2010/main" w="9525">
+                  <a14:hiddenLine xmlns:a14="http://schemas.microsoft.com/office/drawing/2010/main" xmlns="" w="9525">
                     <a:solidFill>
                       <a:srgbClr val="000000"/>
                     </a:solidFill>
@@ -11275,7 +11278,7 @@
               </a:ln>
               <a:extLst>
                 <a:ext uri="{91240B29-F687-4f45-9708-019B960494DF}">
-                  <a14:hiddenLine xmlns="" xmlns:a14="http://schemas.microsoft.com/office/drawing/2010/main" w="9525">
+                  <a14:hiddenLine xmlns:a14="http://schemas.microsoft.com/office/drawing/2010/main" xmlns="" w="9525">
                     <a:solidFill>
                       <a:srgbClr val="000000"/>
                     </a:solidFill>
@@ -11365,7 +11368,7 @@
               </a:ln>
               <a:extLst>
                 <a:ext uri="{91240B29-F687-4f45-9708-019B960494DF}">
-                  <a14:hiddenLine xmlns="" xmlns:a14="http://schemas.microsoft.com/office/drawing/2010/main" w="9525">
+                  <a14:hiddenLine xmlns:a14="http://schemas.microsoft.com/office/drawing/2010/main" xmlns="" w="9525">
                     <a:solidFill>
                       <a:srgbClr val="000000"/>
                     </a:solidFill>
@@ -11430,7 +11433,7 @@
               </a:ln>
               <a:extLst>
                 <a:ext uri="{91240B29-F687-4f45-9708-019B960494DF}">
-                  <a14:hiddenLine xmlns="" xmlns:a14="http://schemas.microsoft.com/office/drawing/2010/main" w="9525">
+                  <a14:hiddenLine xmlns:a14="http://schemas.microsoft.com/office/drawing/2010/main" xmlns="" w="9525">
                     <a:solidFill>
                       <a:srgbClr val="000000"/>
                     </a:solidFill>
@@ -11550,7 +11553,7 @@
               </a:ln>
               <a:extLst>
                 <a:ext uri="{91240B29-F687-4f45-9708-019B960494DF}">
-                  <a14:hiddenLine xmlns="" xmlns:a14="http://schemas.microsoft.com/office/drawing/2010/main" w="9525">
+                  <a14:hiddenLine xmlns:a14="http://schemas.microsoft.com/office/drawing/2010/main" xmlns="" w="9525">
                     <a:solidFill>
                       <a:srgbClr val="000000"/>
                     </a:solidFill>
@@ -11648,7 +11651,7 @@
               </a:ln>
               <a:extLst>
                 <a:ext uri="{91240B29-F687-4f45-9708-019B960494DF}">
-                  <a14:hiddenLine xmlns="" xmlns:a14="http://schemas.microsoft.com/office/drawing/2010/main" w="9525">
+                  <a14:hiddenLine xmlns:a14="http://schemas.microsoft.com/office/drawing/2010/main" xmlns="" w="9525">
                     <a:solidFill>
                       <a:srgbClr val="000000"/>
                     </a:solidFill>
@@ -11763,7 +11766,7 @@
               </a:ln>
               <a:extLst>
                 <a:ext uri="{91240B29-F687-4f45-9708-019B960494DF}">
-                  <a14:hiddenLine xmlns="" xmlns:a14="http://schemas.microsoft.com/office/drawing/2010/main" w="9525">
+                  <a14:hiddenLine xmlns:a14="http://schemas.microsoft.com/office/drawing/2010/main" xmlns="" w="9525">
                     <a:solidFill>
                       <a:srgbClr val="000000"/>
                     </a:solidFill>
@@ -11853,7 +11856,7 @@
               </a:ln>
               <a:extLst>
                 <a:ext uri="{91240B29-F687-4f45-9708-019B960494DF}">
-                  <a14:hiddenLine xmlns="" xmlns:a14="http://schemas.microsoft.com/office/drawing/2010/main" w="9525">
+                  <a14:hiddenLine xmlns:a14="http://schemas.microsoft.com/office/drawing/2010/main" xmlns="" w="9525">
                     <a:solidFill>
                       <a:srgbClr val="000000"/>
                     </a:solidFill>
@@ -11918,7 +11921,7 @@
               </a:ln>
               <a:extLst>
                 <a:ext uri="{91240B29-F687-4f45-9708-019B960494DF}">
-                  <a14:hiddenLine xmlns="" xmlns:a14="http://schemas.microsoft.com/office/drawing/2010/main" w="9525">
+                  <a14:hiddenLine xmlns:a14="http://schemas.microsoft.com/office/drawing/2010/main" xmlns="" w="9525">
                     <a:solidFill>
                       <a:srgbClr val="000000"/>
                     </a:solidFill>
@@ -12008,7 +12011,7 @@
               </a:ln>
               <a:extLst>
                 <a:ext uri="{91240B29-F687-4f45-9708-019B960494DF}">
-                  <a14:hiddenLine xmlns="" xmlns:a14="http://schemas.microsoft.com/office/drawing/2010/main" w="9525">
+                  <a14:hiddenLine xmlns:a14="http://schemas.microsoft.com/office/drawing/2010/main" xmlns="" w="9525">
                     <a:solidFill>
                       <a:srgbClr val="000000"/>
                     </a:solidFill>
@@ -12076,7 +12079,7 @@
               </a:ln>
               <a:extLst>
                 <a:ext uri="{91240B29-F687-4f45-9708-019B960494DF}">
-                  <a14:hiddenLine xmlns="" xmlns:a14="http://schemas.microsoft.com/office/drawing/2010/main" w="9525">
+                  <a14:hiddenLine xmlns:a14="http://schemas.microsoft.com/office/drawing/2010/main" xmlns="" w="9525">
                     <a:solidFill>
                       <a:srgbClr val="000000"/>
                     </a:solidFill>
@@ -12166,7 +12169,7 @@
               </a:ln>
               <a:extLst>
                 <a:ext uri="{91240B29-F687-4f45-9708-019B960494DF}">
-                  <a14:hiddenLine xmlns="" xmlns:a14="http://schemas.microsoft.com/office/drawing/2010/main" w="9525">
+                  <a14:hiddenLine xmlns:a14="http://schemas.microsoft.com/office/drawing/2010/main" xmlns="" w="9525">
                     <a:solidFill>
                       <a:srgbClr val="000000"/>
                     </a:solidFill>
@@ -12234,7 +12237,7 @@
               </a:ln>
               <a:extLst>
                 <a:ext uri="{91240B29-F687-4f45-9708-019B960494DF}">
-                  <a14:hiddenLine xmlns="" xmlns:a14="http://schemas.microsoft.com/office/drawing/2010/main" w="9525">
+                  <a14:hiddenLine xmlns:a14="http://schemas.microsoft.com/office/drawing/2010/main" xmlns="" w="9525">
                     <a:solidFill>
                       <a:srgbClr val="000000"/>
                     </a:solidFill>
@@ -12324,7 +12327,7 @@
               </a:ln>
               <a:extLst>
                 <a:ext uri="{91240B29-F687-4f45-9708-019B960494DF}">
-                  <a14:hiddenLine xmlns="" xmlns:a14="http://schemas.microsoft.com/office/drawing/2010/main" w="9525">
+                  <a14:hiddenLine xmlns:a14="http://schemas.microsoft.com/office/drawing/2010/main" xmlns="" w="9525">
                     <a:solidFill>
                       <a:srgbClr val="000000"/>
                     </a:solidFill>
@@ -12358,7 +12361,7 @@
               </a:ln>
               <a:extLst>
                 <a:ext uri="{91240B29-F687-4f45-9708-019B960494DF}">
-                  <a14:hiddenLine xmlns="" xmlns:a14="http://schemas.microsoft.com/office/drawing/2010/main" w="9525">
+                  <a14:hiddenLine xmlns:a14="http://schemas.microsoft.com/office/drawing/2010/main" xmlns="" w="9525">
                     <a:solidFill>
                       <a:srgbClr val="000000"/>
                     </a:solidFill>
@@ -13160,6 +13163,372 @@
       </p:grpSpPr>
       <p:sp>
         <p:nvSpPr>
+          <p:cNvPr id="2" name="Title 1"/>
+          <p:cNvSpPr>
+            <a:spLocks noGrp="1"/>
+          </p:cNvSpPr>
+          <p:nvPr>
+            <p:ph type="title"/>
+          </p:nvPr>
+        </p:nvSpPr>
+        <p:spPr/>
+        <p:txBody>
+          <a:bodyPr/>
+          <a:lstStyle/>
+          <a:p>
+            <a:r>
+              <a:rPr lang="en-US" dirty="0" smtClean="0"/>
+              <a:t>How run times vary by year</a:t>
+            </a:r>
+            <a:endParaRPr lang="en-US" dirty="0"/>
+          </a:p>
+        </p:txBody>
+      </p:sp>
+      <p:pic>
+        <p:nvPicPr>
+          <p:cNvPr id="5" name="Content Placeholder 4"/>
+          <p:cNvPicPr>
+            <a:picLocks noGrp="1" noChangeAspect="1"/>
+          </p:cNvPicPr>
+          <p:nvPr>
+            <p:ph idx="1"/>
+          </p:nvPr>
+        </p:nvPicPr>
+        <p:blipFill>
+          <a:blip r:embed="rId2">
+            <a:extLst>
+              <a:ext uri="{28A0092B-C50C-407E-A947-70E740481C1C}">
+                <a14:useLocalDpi xmlns:a14="http://schemas.microsoft.com/office/drawing/2010/main" val="0"/>
+              </a:ext>
+            </a:extLst>
+          </a:blip>
+          <a:stretch>
+            <a:fillRect/>
+          </a:stretch>
+        </p:blipFill>
+        <p:spPr>
+          <a:xfrm>
+            <a:off x="2825160" y="1770185"/>
+            <a:ext cx="5842127" cy="4021015"/>
+          </a:xfrm>
+        </p:spPr>
+      </p:pic>
+      <p:sp>
+        <p:nvSpPr>
+          <p:cNvPr id="4" name="Slide Number Placeholder 3"/>
+          <p:cNvSpPr>
+            <a:spLocks noGrp="1"/>
+          </p:cNvSpPr>
+          <p:nvPr>
+            <p:ph type="sldNum" sz="quarter" idx="12"/>
+          </p:nvPr>
+        </p:nvSpPr>
+        <p:spPr/>
+        <p:txBody>
+          <a:bodyPr/>
+          <a:lstStyle/>
+          <a:p>
+            <a:fld id="{7B7DB76D-28D5-4DAC-900A-A1330999554A}" type="slidenum">
+              <a:rPr lang="en-US" smtClean="0"/>
+              <a:t>11</a:t>
+            </a:fld>
+            <a:endParaRPr lang="en-US"/>
+          </a:p>
+        </p:txBody>
+      </p:sp>
+    </p:spTree>
+    <p:extLst>
+      <p:ext uri="{BB962C8B-B14F-4D97-AF65-F5344CB8AC3E}">
+        <p14:creationId xmlns:p14="http://schemas.microsoft.com/office/powerpoint/2010/main" val="2807468785"/>
+      </p:ext>
+    </p:extLst>
+  </p:cSld>
+  <p:clrMapOvr>
+    <a:masterClrMapping/>
+  </p:clrMapOvr>
+  <p:timing>
+    <p:tnLst>
+      <p:par>
+        <p:cTn id="1" dur="indefinite" restart="never" nodeType="tmRoot"/>
+      </p:par>
+    </p:tnLst>
+  </p:timing>
+</p:sld>
+</file>
+
+<file path=ppt/slides/slide12.xml><?xml version="1.0" encoding="utf-8"?>
+<p:sld xmlns:a="http://schemas.openxmlformats.org/drawingml/2006/main" xmlns:r="http://schemas.openxmlformats.org/officeDocument/2006/relationships" xmlns:p="http://schemas.openxmlformats.org/presentationml/2006/main">
+  <p:cSld>
+    <p:spTree>
+      <p:nvGrpSpPr>
+        <p:cNvPr id="1" name=""/>
+        <p:cNvGrpSpPr/>
+        <p:nvPr/>
+      </p:nvGrpSpPr>
+      <p:grpSpPr>
+        <a:xfrm>
+          <a:off x="0" y="0"/>
+          <a:ext cx="0" cy="0"/>
+          <a:chOff x="0" y="0"/>
+          <a:chExt cx="0" cy="0"/>
+        </a:xfrm>
+      </p:grpSpPr>
+      <p:sp>
+        <p:nvSpPr>
+          <p:cNvPr id="2" name="Title 1"/>
+          <p:cNvSpPr>
+            <a:spLocks noGrp="1"/>
+          </p:cNvSpPr>
+          <p:nvPr>
+            <p:ph type="title"/>
+          </p:nvPr>
+        </p:nvSpPr>
+        <p:spPr/>
+        <p:txBody>
+          <a:bodyPr/>
+          <a:lstStyle/>
+          <a:p>
+            <a:r>
+              <a:rPr lang="en-US" dirty="0" smtClean="0"/>
+              <a:t>How age distributions vary by year</a:t>
+            </a:r>
+            <a:endParaRPr lang="en-US" dirty="0"/>
+          </a:p>
+        </p:txBody>
+      </p:sp>
+      <p:pic>
+        <p:nvPicPr>
+          <p:cNvPr id="5" name="Content Placeholder 4"/>
+          <p:cNvPicPr>
+            <a:picLocks noGrp="1" noChangeAspect="1"/>
+          </p:cNvPicPr>
+          <p:nvPr>
+            <p:ph idx="1"/>
+          </p:nvPr>
+        </p:nvPicPr>
+        <p:blipFill>
+          <a:blip r:embed="rId2">
+            <a:extLst>
+              <a:ext uri="{28A0092B-C50C-407E-A947-70E740481C1C}">
+                <a14:useLocalDpi xmlns:a14="http://schemas.microsoft.com/office/drawing/2010/main" val="0"/>
+              </a:ext>
+            </a:extLst>
+          </a:blip>
+          <a:stretch>
+            <a:fillRect/>
+          </a:stretch>
+        </p:blipFill>
+        <p:spPr>
+          <a:xfrm>
+            <a:off x="128953" y="2312815"/>
+            <a:ext cx="5908431" cy="4066651"/>
+          </a:xfrm>
+        </p:spPr>
+      </p:pic>
+      <p:sp>
+        <p:nvSpPr>
+          <p:cNvPr id="4" name="Slide Number Placeholder 3"/>
+          <p:cNvSpPr>
+            <a:spLocks noGrp="1"/>
+          </p:cNvSpPr>
+          <p:nvPr>
+            <p:ph type="sldNum" sz="quarter" idx="12"/>
+          </p:nvPr>
+        </p:nvSpPr>
+        <p:spPr/>
+        <p:txBody>
+          <a:bodyPr/>
+          <a:lstStyle/>
+          <a:p>
+            <a:fld id="{7B7DB76D-28D5-4DAC-900A-A1330999554A}" type="slidenum">
+              <a:rPr lang="en-US" smtClean="0"/>
+              <a:t>12</a:t>
+            </a:fld>
+            <a:endParaRPr lang="en-US"/>
+          </a:p>
+        </p:txBody>
+      </p:sp>
+      <p:pic>
+        <p:nvPicPr>
+          <p:cNvPr id="6" name="Picture 5"/>
+          <p:cNvPicPr>
+            <a:picLocks noChangeAspect="1"/>
+          </p:cNvPicPr>
+          <p:nvPr/>
+        </p:nvPicPr>
+        <p:blipFill>
+          <a:blip r:embed="rId3">
+            <a:extLst>
+              <a:ext uri="{28A0092B-C50C-407E-A947-70E740481C1C}">
+                <a14:useLocalDpi xmlns:a14="http://schemas.microsoft.com/office/drawing/2010/main" val="0"/>
+              </a:ext>
+            </a:extLst>
+          </a:blip>
+          <a:stretch>
+            <a:fillRect/>
+          </a:stretch>
+        </p:blipFill>
+        <p:spPr>
+          <a:xfrm>
+            <a:off x="6119446" y="2312816"/>
+            <a:ext cx="5911961" cy="4069080"/>
+          </a:xfrm>
+          <a:prstGeom prst="rect">
+            <a:avLst/>
+          </a:prstGeom>
+        </p:spPr>
+      </p:pic>
+    </p:spTree>
+    <p:extLst>
+      <p:ext uri="{BB962C8B-B14F-4D97-AF65-F5344CB8AC3E}">
+        <p14:creationId xmlns:p14="http://schemas.microsoft.com/office/powerpoint/2010/main" val="1886516530"/>
+      </p:ext>
+    </p:extLst>
+  </p:cSld>
+  <p:clrMapOvr>
+    <a:masterClrMapping/>
+  </p:clrMapOvr>
+  <p:timing>
+    <p:tnLst>
+      <p:par>
+        <p:cTn id="1" dur="indefinite" restart="never" nodeType="tmRoot"/>
+      </p:par>
+    </p:tnLst>
+  </p:timing>
+</p:sld>
+</file>
+
+<file path=ppt/slides/slide13.xml><?xml version="1.0" encoding="utf-8"?>
+<p:sld xmlns:a="http://schemas.openxmlformats.org/drawingml/2006/main" xmlns:r="http://schemas.openxmlformats.org/officeDocument/2006/relationships" xmlns:p="http://schemas.openxmlformats.org/presentationml/2006/main">
+  <p:cSld>
+    <p:spTree>
+      <p:nvGrpSpPr>
+        <p:cNvPr id="1" name=""/>
+        <p:cNvGrpSpPr/>
+        <p:nvPr/>
+      </p:nvGrpSpPr>
+      <p:grpSpPr>
+        <a:xfrm>
+          <a:off x="0" y="0"/>
+          <a:ext cx="0" cy="0"/>
+          <a:chOff x="0" y="0"/>
+          <a:chExt cx="0" cy="0"/>
+        </a:xfrm>
+      </p:grpSpPr>
+      <p:sp>
+        <p:nvSpPr>
+          <p:cNvPr id="2" name="Title 1"/>
+          <p:cNvSpPr>
+            <a:spLocks noGrp="1"/>
+          </p:cNvSpPr>
+          <p:nvPr>
+            <p:ph type="title"/>
+          </p:nvPr>
+        </p:nvSpPr>
+        <p:spPr/>
+        <p:txBody>
+          <a:bodyPr/>
+          <a:lstStyle/>
+          <a:p>
+            <a:r>
+              <a:rPr lang="en-US" dirty="0" smtClean="0"/>
+              <a:t>Growth of race by year</a:t>
+            </a:r>
+            <a:endParaRPr lang="en-US" dirty="0"/>
+          </a:p>
+        </p:txBody>
+      </p:sp>
+      <p:pic>
+        <p:nvPicPr>
+          <p:cNvPr id="5" name="Content Placeholder 4"/>
+          <p:cNvPicPr>
+            <a:picLocks noGrp="1" noChangeAspect="1"/>
+          </p:cNvPicPr>
+          <p:nvPr>
+            <p:ph idx="1"/>
+          </p:nvPr>
+        </p:nvPicPr>
+        <p:blipFill>
+          <a:blip r:embed="rId2">
+            <a:extLst>
+              <a:ext uri="{28A0092B-C50C-407E-A947-70E740481C1C}">
+                <a14:useLocalDpi xmlns:a14="http://schemas.microsoft.com/office/drawing/2010/main" val="0"/>
+              </a:ext>
+            </a:extLst>
+          </a:blip>
+          <a:stretch>
+            <a:fillRect/>
+          </a:stretch>
+        </p:blipFill>
+        <p:spPr>
+          <a:xfrm>
+            <a:off x="2814258" y="1733075"/>
+            <a:ext cx="6560308" cy="4515324"/>
+          </a:xfrm>
+        </p:spPr>
+      </p:pic>
+      <p:sp>
+        <p:nvSpPr>
+          <p:cNvPr id="4" name="Slide Number Placeholder 3"/>
+          <p:cNvSpPr>
+            <a:spLocks noGrp="1"/>
+          </p:cNvSpPr>
+          <p:nvPr>
+            <p:ph type="sldNum" sz="quarter" idx="12"/>
+          </p:nvPr>
+        </p:nvSpPr>
+        <p:spPr/>
+        <p:txBody>
+          <a:bodyPr/>
+          <a:lstStyle/>
+          <a:p>
+            <a:fld id="{7B7DB76D-28D5-4DAC-900A-A1330999554A}" type="slidenum">
+              <a:rPr lang="en-US" smtClean="0"/>
+              <a:t>13</a:t>
+            </a:fld>
+            <a:endParaRPr lang="en-US"/>
+          </a:p>
+        </p:txBody>
+      </p:sp>
+    </p:spTree>
+    <p:extLst>
+      <p:ext uri="{BB962C8B-B14F-4D97-AF65-F5344CB8AC3E}">
+        <p14:creationId xmlns:p14="http://schemas.microsoft.com/office/powerpoint/2010/main" val="3560575147"/>
+      </p:ext>
+    </p:extLst>
+  </p:cSld>
+  <p:clrMapOvr>
+    <a:masterClrMapping/>
+  </p:clrMapOvr>
+  <p:timing>
+    <p:tnLst>
+      <p:par>
+        <p:cTn id="1" dur="indefinite" restart="never" nodeType="tmRoot"/>
+      </p:par>
+    </p:tnLst>
+  </p:timing>
+</p:sld>
+</file>
+
+<file path=ppt/slides/slide14.xml><?xml version="1.0" encoding="utf-8"?>
+<p:sld xmlns:a="http://schemas.openxmlformats.org/drawingml/2006/main" xmlns:r="http://schemas.openxmlformats.org/officeDocument/2006/relationships" xmlns:p="http://schemas.openxmlformats.org/presentationml/2006/main">
+  <p:cSld>
+    <p:spTree>
+      <p:nvGrpSpPr>
+        <p:cNvPr id="1" name=""/>
+        <p:cNvGrpSpPr/>
+        <p:nvPr/>
+      </p:nvGrpSpPr>
+      <p:grpSpPr>
+        <a:xfrm>
+          <a:off x="0" y="0"/>
+          <a:ext cx="0" cy="0"/>
+          <a:chOff x="0" y="0"/>
+          <a:chExt cx="0" cy="0"/>
+        </a:xfrm>
+      </p:grpSpPr>
+      <p:sp>
+        <p:nvSpPr>
           <p:cNvPr id="5" name="Title 4"/>
           <p:cNvSpPr>
             <a:spLocks noGrp="1"/>
@@ -13299,7 +13668,7 @@
           <a:p>
             <a:fld id="{7B7DB76D-28D5-4DAC-900A-A1330999554A}" type="slidenum">
               <a:rPr lang="en-US" smtClean="0"/>
-              <a:t>11</a:t>
+              <a:t>14</a:t>
             </a:fld>
             <a:endParaRPr lang="en-US"/>
           </a:p>
@@ -13379,7 +13748,7 @@
 </p:sld>
 </file>
 
-<file path=ppt/slides/slide12.xml><?xml version="1.0" encoding="utf-8"?>
+<file path=ppt/slides/slide15.xml><?xml version="1.0" encoding="utf-8"?>
 <p:sld xmlns:a="http://schemas.openxmlformats.org/drawingml/2006/main" xmlns:r="http://schemas.openxmlformats.org/officeDocument/2006/relationships" xmlns:p="http://schemas.openxmlformats.org/presentationml/2006/main">
   <p:cSld>
     <p:spTree>
@@ -13440,7 +13809,7 @@
           <a:p>
             <a:fld id="{7B7DB76D-28D5-4DAC-900A-A1330999554A}" type="slidenum">
               <a:rPr lang="en-US" smtClean="0"/>
-              <a:t>12</a:t>
+              <a:t>15</a:t>
             </a:fld>
             <a:endParaRPr lang="en-US"/>
           </a:p>
@@ -13567,7 +13936,7 @@
 </p:sld>
 </file>
 
-<file path=ppt/slides/slide13.xml><?xml version="1.0" encoding="utf-8"?>
+<file path=ppt/slides/slide16.xml><?xml version="1.0" encoding="utf-8"?>
 <p:sld xmlns:a="http://schemas.openxmlformats.org/drawingml/2006/main" xmlns:r="http://schemas.openxmlformats.org/officeDocument/2006/relationships" xmlns:p="http://schemas.openxmlformats.org/presentationml/2006/main">
   <p:cSld>
     <p:spTree>
@@ -13679,7 +14048,7 @@
           <a:p>
             <a:fld id="{7B7DB76D-28D5-4DAC-900A-A1330999554A}" type="slidenum">
               <a:rPr lang="en-US" smtClean="0"/>
-              <a:t>13</a:t>
+              <a:t>16</a:t>
             </a:fld>
             <a:endParaRPr lang="en-US"/>
           </a:p>
@@ -13806,7 +14175,7 @@
 </p:sld>
 </file>
 
-<file path=ppt/slides/slide14.xml><?xml version="1.0" encoding="utf-8"?>
+<file path=ppt/slides/slide17.xml><?xml version="1.0" encoding="utf-8"?>
 <p:sld xmlns:a="http://schemas.openxmlformats.org/drawingml/2006/main" xmlns:r="http://schemas.openxmlformats.org/officeDocument/2006/relationships" xmlns:p="http://schemas.openxmlformats.org/presentationml/2006/main">
   <p:cSld>
     <p:spTree>
@@ -13867,7 +14236,7 @@
           <a:p>
             <a:fld id="{7B7DB76D-28D5-4DAC-900A-A1330999554A}" type="slidenum">
               <a:rPr lang="en-US" smtClean="0"/>
-              <a:t>14</a:t>
+              <a:t>17</a:t>
             </a:fld>
             <a:endParaRPr lang="en-US"/>
           </a:p>
@@ -14048,7 +14417,7 @@
 </p:sld>
 </file>
 
-<file path=ppt/slides/slide15.xml><?xml version="1.0" encoding="utf-8"?>
+<file path=ppt/slides/slide18.xml><?xml version="1.0" encoding="utf-8"?>
 <p:sld xmlns:a="http://schemas.openxmlformats.org/drawingml/2006/main" xmlns:r="http://schemas.openxmlformats.org/officeDocument/2006/relationships" xmlns:p="http://schemas.openxmlformats.org/presentationml/2006/main">
   <p:cSld>
     <p:spTree>
@@ -14202,7 +14571,7 @@
           <a:p>
             <a:fld id="{7B7DB76D-28D5-4DAC-900A-A1330999554A}" type="slidenum">
               <a:rPr lang="en-US" smtClean="0"/>
-              <a:t>15</a:t>
+              <a:t>18</a:t>
             </a:fld>
             <a:endParaRPr lang="en-US"/>
           </a:p>
@@ -14491,7 +14860,7 @@
 </p:sld>
 </file>
 
-<file path=ppt/slides/slide16.xml><?xml version="1.0" encoding="utf-8"?>
+<file path=ppt/slides/slide19.xml><?xml version="1.0" encoding="utf-8"?>
 <p:sld xmlns:a="http://schemas.openxmlformats.org/drawingml/2006/main" xmlns:r="http://schemas.openxmlformats.org/officeDocument/2006/relationships" xmlns:p="http://schemas.openxmlformats.org/presentationml/2006/main">
   <p:cSld>
     <p:spTree>
@@ -14651,7 +15020,7 @@
           <a:p>
             <a:fld id="{7B7DB76D-28D5-4DAC-900A-A1330999554A}" type="slidenum">
               <a:rPr lang="en-US" smtClean="0"/>
-              <a:t>16</a:t>
+              <a:t>19</a:t>
             </a:fld>
             <a:endParaRPr lang="en-US"/>
           </a:p>
@@ -14724,7 +15093,135 @@
 </p:sld>
 </file>
 
-<file path=ppt/slides/slide17.xml><?xml version="1.0" encoding="utf-8"?>
+<file path=ppt/slides/slide2.xml><?xml version="1.0" encoding="utf-8"?>
+<p:sld xmlns:a="http://schemas.openxmlformats.org/drawingml/2006/main" xmlns:r="http://schemas.openxmlformats.org/officeDocument/2006/relationships" xmlns:p="http://schemas.openxmlformats.org/presentationml/2006/main">
+  <p:cSld>
+    <p:spTree>
+      <p:nvGrpSpPr>
+        <p:cNvPr id="1" name=""/>
+        <p:cNvGrpSpPr/>
+        <p:nvPr/>
+      </p:nvGrpSpPr>
+      <p:grpSpPr>
+        <a:xfrm>
+          <a:off x="0" y="0"/>
+          <a:ext cx="0" cy="0"/>
+          <a:chOff x="0" y="0"/>
+          <a:chExt cx="0" cy="0"/>
+        </a:xfrm>
+      </p:grpSpPr>
+      <p:sp>
+        <p:nvSpPr>
+          <p:cNvPr id="2" name="Title 1"/>
+          <p:cNvSpPr>
+            <a:spLocks noGrp="1"/>
+          </p:cNvSpPr>
+          <p:nvPr>
+            <p:ph type="title"/>
+          </p:nvPr>
+        </p:nvSpPr>
+        <p:spPr/>
+        <p:txBody>
+          <a:bodyPr/>
+          <a:lstStyle/>
+          <a:p>
+            <a:r>
+              <a:rPr lang="en-US" dirty="0" smtClean="0"/>
+              <a:t>Abstract</a:t>
+            </a:r>
+            <a:endParaRPr lang="en-US" dirty="0"/>
+          </a:p>
+        </p:txBody>
+      </p:sp>
+      <p:sp>
+        <p:nvSpPr>
+          <p:cNvPr id="3" name="Content Placeholder 2"/>
+          <p:cNvSpPr>
+            <a:spLocks noGrp="1"/>
+          </p:cNvSpPr>
+          <p:nvPr>
+            <p:ph idx="1"/>
+          </p:nvPr>
+        </p:nvSpPr>
+        <p:spPr>
+          <a:xfrm>
+            <a:off x="838200" y="2005012"/>
+            <a:ext cx="10515600" cy="4351338"/>
+          </a:xfrm>
+        </p:spPr>
+        <p:txBody>
+          <a:bodyPr/>
+          <a:lstStyle/>
+          <a:p>
+            <a:r>
+              <a:rPr lang="en-US" i="1" dirty="0" smtClean="0"/>
+              <a:t>We will be analyzing data from the annual Washington D.C. Cherry Blossom Race; Years: 1999-2012. There is a noticeable difference of age distribution over the years along with average run times. We will use statistical methods to explore and examine the change of the runners over time to help determine significant events in the history of the race.</a:t>
+            </a:r>
+            <a:endParaRPr lang="en-US" dirty="0"/>
+          </a:p>
+        </p:txBody>
+      </p:sp>
+      <p:sp>
+        <p:nvSpPr>
+          <p:cNvPr id="4" name="Slide Number Placeholder 3"/>
+          <p:cNvSpPr>
+            <a:spLocks noGrp="1"/>
+          </p:cNvSpPr>
+          <p:nvPr>
+            <p:ph type="sldNum" sz="quarter" idx="12"/>
+          </p:nvPr>
+        </p:nvSpPr>
+        <p:spPr/>
+        <p:txBody>
+          <a:bodyPr/>
+          <a:lstStyle/>
+          <a:p>
+            <a:fld id="{7B7DB76D-28D5-4DAC-900A-A1330999554A}" type="slidenum">
+              <a:rPr lang="en-US" smtClean="0"/>
+              <a:t>2</a:t>
+            </a:fld>
+            <a:endParaRPr lang="en-US"/>
+          </a:p>
+        </p:txBody>
+      </p:sp>
+      <p:pic>
+        <p:nvPicPr>
+          <p:cNvPr id="5" name="Picture 4"/>
+          <p:cNvPicPr>
+            <a:picLocks noChangeAspect="1"/>
+          </p:cNvPicPr>
+          <p:nvPr/>
+        </p:nvPicPr>
+        <p:blipFill>
+          <a:blip r:embed="rId2"/>
+          <a:stretch>
+            <a:fillRect/>
+          </a:stretch>
+        </p:blipFill>
+        <p:spPr>
+          <a:xfrm>
+            <a:off x="7314856" y="365125"/>
+            <a:ext cx="4591050" cy="1390650"/>
+          </a:xfrm>
+          <a:prstGeom prst="rect">
+            <a:avLst/>
+          </a:prstGeom>
+        </p:spPr>
+      </p:pic>
+    </p:spTree>
+    <p:extLst>
+      <p:ext uri="{BB962C8B-B14F-4D97-AF65-F5344CB8AC3E}">
+        <p14:creationId xmlns:p14="http://schemas.microsoft.com/office/powerpoint/2010/main" val="2163746313"/>
+      </p:ext>
+    </p:extLst>
+  </p:cSld>
+  <p:clrMapOvr>
+    <a:masterClrMapping/>
+  </p:clrMapOvr>
+</p:sld>
+</file>
+
+<file path=ppt/slides/slide20.xml><?xml version="1.0" encoding="utf-8"?>
 <p:sld xmlns:a="http://schemas.openxmlformats.org/drawingml/2006/main" xmlns:r="http://schemas.openxmlformats.org/officeDocument/2006/relationships" xmlns:p="http://schemas.openxmlformats.org/presentationml/2006/main">
   <p:cSld>
     <p:spTree>
@@ -14827,7 +15324,7 @@
           <a:p>
             <a:fld id="{7B7DB76D-28D5-4DAC-900A-A1330999554A}" type="slidenum">
               <a:rPr lang="en-US" smtClean="0"/>
-              <a:t>17</a:t>
+              <a:t>20</a:t>
             </a:fld>
             <a:endParaRPr lang="en-US"/>
           </a:p>
@@ -14846,7 +15343,7 @@
 </p:sld>
 </file>
 
-<file path=ppt/slides/slide18.xml><?xml version="1.0" encoding="utf-8"?>
+<file path=ppt/slides/slide21.xml><?xml version="1.0" encoding="utf-8"?>
 <p:sld xmlns:a="http://schemas.openxmlformats.org/drawingml/2006/main" xmlns:r="http://schemas.openxmlformats.org/officeDocument/2006/relationships" xmlns:p="http://schemas.openxmlformats.org/presentationml/2006/main">
   <p:cSld>
     <p:spTree>
@@ -15002,7 +15499,7 @@
           <a:p>
             <a:fld id="{7B7DB76D-28D5-4DAC-900A-A1330999554A}" type="slidenum">
               <a:rPr lang="en-US" smtClean="0"/>
-              <a:t>18</a:t>
+              <a:t>21</a:t>
             </a:fld>
             <a:endParaRPr lang="en-US"/>
           </a:p>
@@ -15021,7 +15518,7 @@
 </p:sld>
 </file>
 
-<file path=ppt/slides/slide19.xml><?xml version="1.0" encoding="utf-8"?>
+<file path=ppt/slides/slide22.xml><?xml version="1.0" encoding="utf-8"?>
 <p:sld xmlns:a="http://schemas.openxmlformats.org/drawingml/2006/main" xmlns:r="http://schemas.openxmlformats.org/officeDocument/2006/relationships" xmlns:p="http://schemas.openxmlformats.org/presentationml/2006/main">
   <p:cSld>
     <p:spTree>
@@ -15188,7 +15685,7 @@
           <a:p>
             <a:fld id="{7B7DB76D-28D5-4DAC-900A-A1330999554A}" type="slidenum">
               <a:rPr lang="en-US" smtClean="0"/>
-              <a:t>19</a:t>
+              <a:t>22</a:t>
             </a:fld>
             <a:endParaRPr lang="en-US"/>
           </a:p>
@@ -15214,135 +15711,7 @@
 </p:sld>
 </file>
 
-<file path=ppt/slides/slide2.xml><?xml version="1.0" encoding="utf-8"?>
-<p:sld xmlns:a="http://schemas.openxmlformats.org/drawingml/2006/main" xmlns:r="http://schemas.openxmlformats.org/officeDocument/2006/relationships" xmlns:p="http://schemas.openxmlformats.org/presentationml/2006/main">
-  <p:cSld>
-    <p:spTree>
-      <p:nvGrpSpPr>
-        <p:cNvPr id="1" name=""/>
-        <p:cNvGrpSpPr/>
-        <p:nvPr/>
-      </p:nvGrpSpPr>
-      <p:grpSpPr>
-        <a:xfrm>
-          <a:off x="0" y="0"/>
-          <a:ext cx="0" cy="0"/>
-          <a:chOff x="0" y="0"/>
-          <a:chExt cx="0" cy="0"/>
-        </a:xfrm>
-      </p:grpSpPr>
-      <p:sp>
-        <p:nvSpPr>
-          <p:cNvPr id="2" name="Title 1"/>
-          <p:cNvSpPr>
-            <a:spLocks noGrp="1"/>
-          </p:cNvSpPr>
-          <p:nvPr>
-            <p:ph type="title"/>
-          </p:nvPr>
-        </p:nvSpPr>
-        <p:spPr/>
-        <p:txBody>
-          <a:bodyPr/>
-          <a:lstStyle/>
-          <a:p>
-            <a:r>
-              <a:rPr lang="en-US" dirty="0" smtClean="0"/>
-              <a:t>Abstract</a:t>
-            </a:r>
-            <a:endParaRPr lang="en-US" dirty="0"/>
-          </a:p>
-        </p:txBody>
-      </p:sp>
-      <p:sp>
-        <p:nvSpPr>
-          <p:cNvPr id="3" name="Content Placeholder 2"/>
-          <p:cNvSpPr>
-            <a:spLocks noGrp="1"/>
-          </p:cNvSpPr>
-          <p:nvPr>
-            <p:ph idx="1"/>
-          </p:nvPr>
-        </p:nvSpPr>
-        <p:spPr>
-          <a:xfrm>
-            <a:off x="838200" y="2005012"/>
-            <a:ext cx="10515600" cy="4351338"/>
-          </a:xfrm>
-        </p:spPr>
-        <p:txBody>
-          <a:bodyPr/>
-          <a:lstStyle/>
-          <a:p>
-            <a:r>
-              <a:rPr lang="en-US" i="1" dirty="0" smtClean="0"/>
-              <a:t>We will be analyzing data from the annual Washington D.C. Cherry Blossom Race; Years: 1999-2012. There is a noticeable difference of age distribution over the years along with average run times. We will use statistical methods to explore and examine the change of the runners over time to help determine significant events in the history of the race.</a:t>
-            </a:r>
-            <a:endParaRPr lang="en-US" dirty="0"/>
-          </a:p>
-        </p:txBody>
-      </p:sp>
-      <p:sp>
-        <p:nvSpPr>
-          <p:cNvPr id="4" name="Slide Number Placeholder 3"/>
-          <p:cNvSpPr>
-            <a:spLocks noGrp="1"/>
-          </p:cNvSpPr>
-          <p:nvPr>
-            <p:ph type="sldNum" sz="quarter" idx="12"/>
-          </p:nvPr>
-        </p:nvSpPr>
-        <p:spPr/>
-        <p:txBody>
-          <a:bodyPr/>
-          <a:lstStyle/>
-          <a:p>
-            <a:fld id="{7B7DB76D-28D5-4DAC-900A-A1330999554A}" type="slidenum">
-              <a:rPr lang="en-US" smtClean="0"/>
-              <a:t>2</a:t>
-            </a:fld>
-            <a:endParaRPr lang="en-US"/>
-          </a:p>
-        </p:txBody>
-      </p:sp>
-      <p:pic>
-        <p:nvPicPr>
-          <p:cNvPr id="5" name="Picture 4"/>
-          <p:cNvPicPr>
-            <a:picLocks noChangeAspect="1"/>
-          </p:cNvPicPr>
-          <p:nvPr/>
-        </p:nvPicPr>
-        <p:blipFill>
-          <a:blip r:embed="rId2"/>
-          <a:stretch>
-            <a:fillRect/>
-          </a:stretch>
-        </p:blipFill>
-        <p:spPr>
-          <a:xfrm>
-            <a:off x="7314856" y="365125"/>
-            <a:ext cx="4591050" cy="1390650"/>
-          </a:xfrm>
-          <a:prstGeom prst="rect">
-            <a:avLst/>
-          </a:prstGeom>
-        </p:spPr>
-      </p:pic>
-    </p:spTree>
-    <p:extLst>
-      <p:ext uri="{BB962C8B-B14F-4D97-AF65-F5344CB8AC3E}">
-        <p14:creationId xmlns:p14="http://schemas.microsoft.com/office/powerpoint/2010/main" val="2163746313"/>
-      </p:ext>
-    </p:extLst>
-  </p:cSld>
-  <p:clrMapOvr>
-    <a:masterClrMapping/>
-  </p:clrMapOvr>
-</p:sld>
-</file>
-
-<file path=ppt/slides/slide20.xml><?xml version="1.0" encoding="utf-8"?>
+<file path=ppt/slides/slide23.xml><?xml version="1.0" encoding="utf-8"?>
 <p:sld xmlns:a="http://schemas.openxmlformats.org/drawingml/2006/main" xmlns:r="http://schemas.openxmlformats.org/officeDocument/2006/relationships" xmlns:p="http://schemas.openxmlformats.org/presentationml/2006/main">
   <p:cSld>
     <p:spTree>
@@ -17806,7 +18175,7 @@
           <a:p>
             <a:fld id="{7B7DB76D-28D5-4DAC-900A-A1330999554A}" type="slidenum">
               <a:rPr lang="en-US" smtClean="0"/>
-              <a:t>20</a:t>
+              <a:t>23</a:t>
             </a:fld>
             <a:endParaRPr lang="en-US"/>
           </a:p>
@@ -17832,7 +18201,7 @@
 </p:sld>
 </file>
 
-<file path=ppt/slides/slide21.xml><?xml version="1.0" encoding="utf-8"?>
+<file path=ppt/slides/slide24.xml><?xml version="1.0" encoding="utf-8"?>
 <p:sld xmlns:a="http://schemas.openxmlformats.org/drawingml/2006/main" xmlns:r="http://schemas.openxmlformats.org/officeDocument/2006/relationships" xmlns:p="http://schemas.openxmlformats.org/presentationml/2006/main">
   <p:cSld>
     <p:spTree>
@@ -17912,7 +18281,7 @@
           <a:p>
             <a:fld id="{7B7DB76D-28D5-4DAC-900A-A1330999554A}" type="slidenum">
               <a:rPr lang="en-US" smtClean="0"/>
-              <a:t>21</a:t>
+              <a:t>24</a:t>
             </a:fld>
             <a:endParaRPr lang="en-US"/>
           </a:p>
@@ -18522,11 +18891,7 @@
           <a:p>
             <a:r>
               <a:rPr lang="en-US" dirty="0" smtClean="0"/>
-              <a:t>Data </a:t>
-            </a:r>
-            <a:r>
-              <a:rPr lang="en-US" dirty="0" smtClean="0"/>
-              <a:t>loading: years 1999 and 2000</a:t>
+              <a:t>Data loading: years 1999 and 2000</a:t>
             </a:r>
             <a:endParaRPr lang="en-US" dirty="0"/>
           </a:p>

</xml_diff>

<commit_message>
Added explanations to charts and reorganized a bit. Taking a break. Will continue to work on it this evening.
</commit_message>
<xml_diff>
--- a/infographic.pptx
+++ b/infographic.pptx
@@ -13,17 +13,17 @@
     <p:sldId id="262" r:id="rId4"/>
     <p:sldId id="259" r:id="rId5"/>
     <p:sldId id="264" r:id="rId6"/>
-    <p:sldId id="281" r:id="rId7"/>
-    <p:sldId id="282" r:id="rId8"/>
-    <p:sldId id="273" r:id="rId9"/>
-    <p:sldId id="274" r:id="rId10"/>
-    <p:sldId id="260" r:id="rId11"/>
-    <p:sldId id="283" r:id="rId12"/>
-    <p:sldId id="284" r:id="rId13"/>
-    <p:sldId id="285" r:id="rId14"/>
-    <p:sldId id="268" r:id="rId15"/>
-    <p:sldId id="279" r:id="rId16"/>
-    <p:sldId id="269" r:id="rId17"/>
+    <p:sldId id="282" r:id="rId7"/>
+    <p:sldId id="273" r:id="rId8"/>
+    <p:sldId id="274" r:id="rId9"/>
+    <p:sldId id="260" r:id="rId10"/>
+    <p:sldId id="284" r:id="rId11"/>
+    <p:sldId id="286" r:id="rId12"/>
+    <p:sldId id="285" r:id="rId13"/>
+    <p:sldId id="268" r:id="rId14"/>
+    <p:sldId id="279" r:id="rId15"/>
+    <p:sldId id="269" r:id="rId16"/>
+    <p:sldId id="283" r:id="rId17"/>
     <p:sldId id="280" r:id="rId18"/>
     <p:sldId id="270" r:id="rId19"/>
     <p:sldId id="271" r:id="rId20"/>
@@ -543,6 +543,90 @@
           <a:bodyPr/>
           <a:lstStyle/>
           <a:p>
+            <a:endParaRPr lang="en-US"/>
+          </a:p>
+        </p:txBody>
+      </p:sp>
+      <p:sp>
+        <p:nvSpPr>
+          <p:cNvPr id="4" name="Slide Number Placeholder 3"/>
+          <p:cNvSpPr>
+            <a:spLocks noGrp="1"/>
+          </p:cNvSpPr>
+          <p:nvPr>
+            <p:ph type="sldNum" sz="quarter" idx="10"/>
+          </p:nvPr>
+        </p:nvSpPr>
+        <p:spPr/>
+        <p:txBody>
+          <a:bodyPr/>
+          <a:lstStyle/>
+          <a:p>
+            <a:fld id="{BE9E425B-2894-4318-AA7F-42BC23137CA4}" type="slidenum">
+              <a:rPr lang="en-US" smtClean="0"/>
+              <a:t>16</a:t>
+            </a:fld>
+            <a:endParaRPr lang="en-US"/>
+          </a:p>
+        </p:txBody>
+      </p:sp>
+    </p:spTree>
+    <p:extLst>
+      <p:ext uri="{BB962C8B-B14F-4D97-AF65-F5344CB8AC3E}">
+        <p14:creationId xmlns:p14="http://schemas.microsoft.com/office/powerpoint/2010/main" val="1435147070"/>
+      </p:ext>
+    </p:extLst>
+  </p:cSld>
+  <p:clrMapOvr>
+    <a:masterClrMapping/>
+  </p:clrMapOvr>
+</p:notes>
+</file>
+
+<file path=ppt/notesSlides/notesSlide2.xml><?xml version="1.0" encoding="utf-8"?>
+<p:notes xmlns:a="http://schemas.openxmlformats.org/drawingml/2006/main" xmlns:r="http://schemas.openxmlformats.org/officeDocument/2006/relationships" xmlns:p="http://schemas.openxmlformats.org/presentationml/2006/main">
+  <p:cSld>
+    <p:spTree>
+      <p:nvGrpSpPr>
+        <p:cNvPr id="1" name=""/>
+        <p:cNvGrpSpPr/>
+        <p:nvPr/>
+      </p:nvGrpSpPr>
+      <p:grpSpPr>
+        <a:xfrm>
+          <a:off x="0" y="0"/>
+          <a:ext cx="0" cy="0"/>
+          <a:chOff x="0" y="0"/>
+          <a:chExt cx="0" cy="0"/>
+        </a:xfrm>
+      </p:grpSpPr>
+      <p:sp>
+        <p:nvSpPr>
+          <p:cNvPr id="2" name="Slide Image Placeholder 1"/>
+          <p:cNvSpPr>
+            <a:spLocks noGrp="1" noRot="1" noChangeAspect="1"/>
+          </p:cNvSpPr>
+          <p:nvPr>
+            <p:ph type="sldImg"/>
+          </p:nvPr>
+        </p:nvSpPr>
+        <p:spPr/>
+      </p:sp>
+      <p:sp>
+        <p:nvSpPr>
+          <p:cNvPr id="3" name="Notes Placeholder 2"/>
+          <p:cNvSpPr>
+            <a:spLocks noGrp="1"/>
+          </p:cNvSpPr>
+          <p:nvPr>
+            <p:ph type="body" idx="1"/>
+          </p:nvPr>
+        </p:nvSpPr>
+        <p:spPr/>
+        <p:txBody>
+          <a:bodyPr/>
+          <a:lstStyle/>
+          <a:p>
             <a:r>
               <a:rPr lang="en-US" dirty="0" smtClean="0"/>
               <a:t>Should we put the findings section on another</a:t>
@@ -641,7 +725,7 @@
           <a:noFill/>
           <a:extLst>
             <a:ext uri="{909E8E84-426E-40dd-AFC4-6F175D3DCCD1}">
-              <a14:hiddenFill xmlns:a14="http://schemas.microsoft.com/office/drawing/2010/main" xmlns="">
+              <a14:hiddenFill xmlns="" xmlns:a14="http://schemas.microsoft.com/office/drawing/2010/main">
                 <a:solidFill>
                   <a:srgbClr val="FFFFFF"/>
                 </a:solidFill>
@@ -701,7 +785,7 @@
             </a:ln>
             <a:extLst>
               <a:ext uri="{91240B29-F687-4f45-9708-019B960494DF}">
-                <a14:hiddenLine xmlns:a14="http://schemas.microsoft.com/office/drawing/2010/main" xmlns="" w="9525">
+                <a14:hiddenLine xmlns="" xmlns:a14="http://schemas.microsoft.com/office/drawing/2010/main" w="9525">
                   <a:solidFill>
                     <a:srgbClr val="000000"/>
                   </a:solidFill>
@@ -791,7 +875,7 @@
             </a:ln>
             <a:extLst>
               <a:ext uri="{91240B29-F687-4f45-9708-019B960494DF}">
-                <a14:hiddenLine xmlns:a14="http://schemas.microsoft.com/office/drawing/2010/main" xmlns="" w="9525">
+                <a14:hiddenLine xmlns="" xmlns:a14="http://schemas.microsoft.com/office/drawing/2010/main" w="9525">
                   <a:solidFill>
                     <a:srgbClr val="000000"/>
                   </a:solidFill>
@@ -881,7 +965,7 @@
             </a:ln>
             <a:extLst>
               <a:ext uri="{91240B29-F687-4f45-9708-019B960494DF}">
-                <a14:hiddenLine xmlns:a14="http://schemas.microsoft.com/office/drawing/2010/main" xmlns="" w="9525">
+                <a14:hiddenLine xmlns="" xmlns:a14="http://schemas.microsoft.com/office/drawing/2010/main" w="9525">
                   <a:solidFill>
                     <a:srgbClr val="000000"/>
                   </a:solidFill>
@@ -915,7 +999,7 @@
             </a:ln>
             <a:extLst>
               <a:ext uri="{91240B29-F687-4f45-9708-019B960494DF}">
-                <a14:hiddenLine xmlns:a14="http://schemas.microsoft.com/office/drawing/2010/main" xmlns="" w="9525">
+                <a14:hiddenLine xmlns="" xmlns:a14="http://schemas.microsoft.com/office/drawing/2010/main" w="9525">
                   <a:solidFill>
                     <a:srgbClr val="000000"/>
                   </a:solidFill>
@@ -1005,7 +1089,7 @@
             </a:ln>
             <a:extLst>
               <a:ext uri="{91240B29-F687-4f45-9708-019B960494DF}">
-                <a14:hiddenLine xmlns:a14="http://schemas.microsoft.com/office/drawing/2010/main" xmlns="" w="9525">
+                <a14:hiddenLine xmlns="" xmlns:a14="http://schemas.microsoft.com/office/drawing/2010/main" w="9525">
                   <a:solidFill>
                     <a:srgbClr val="000000"/>
                   </a:solidFill>
@@ -1067,7 +1151,7 @@
             </a:ln>
             <a:extLst>
               <a:ext uri="{91240B29-F687-4f45-9708-019B960494DF}">
-                <a14:hiddenLine xmlns:a14="http://schemas.microsoft.com/office/drawing/2010/main" xmlns="" w="9525">
+                <a14:hiddenLine xmlns="" xmlns:a14="http://schemas.microsoft.com/office/drawing/2010/main" w="9525">
                   <a:solidFill>
                     <a:srgbClr val="000000"/>
                   </a:solidFill>
@@ -1129,7 +1213,7 @@
             </a:ln>
             <a:extLst>
               <a:ext uri="{91240B29-F687-4f45-9708-019B960494DF}">
-                <a14:hiddenLine xmlns:a14="http://schemas.microsoft.com/office/drawing/2010/main" xmlns="" w="9525">
+                <a14:hiddenLine xmlns="" xmlns:a14="http://schemas.microsoft.com/office/drawing/2010/main" w="9525">
                   <a:solidFill>
                     <a:srgbClr val="000000"/>
                   </a:solidFill>
@@ -1219,7 +1303,7 @@
             </a:ln>
             <a:extLst>
               <a:ext uri="{91240B29-F687-4f45-9708-019B960494DF}">
-                <a14:hiddenLine xmlns:a14="http://schemas.microsoft.com/office/drawing/2010/main" xmlns="" w="9525">
+                <a14:hiddenLine xmlns="" xmlns:a14="http://schemas.microsoft.com/office/drawing/2010/main" w="9525">
                   <a:solidFill>
                     <a:srgbClr val="000000"/>
                   </a:solidFill>
@@ -1281,7 +1365,7 @@
             </a:ln>
             <a:extLst>
               <a:ext uri="{91240B29-F687-4f45-9708-019B960494DF}">
-                <a14:hiddenLine xmlns:a14="http://schemas.microsoft.com/office/drawing/2010/main" xmlns="" w="9525">
+                <a14:hiddenLine xmlns="" xmlns:a14="http://schemas.microsoft.com/office/drawing/2010/main" w="9525">
                   <a:solidFill>
                     <a:srgbClr val="000000"/>
                   </a:solidFill>
@@ -1343,7 +1427,7 @@
             </a:ln>
             <a:extLst>
               <a:ext uri="{91240B29-F687-4f45-9708-019B960494DF}">
-                <a14:hiddenLine xmlns:a14="http://schemas.microsoft.com/office/drawing/2010/main" xmlns="" w="9525">
+                <a14:hiddenLine xmlns="" xmlns:a14="http://schemas.microsoft.com/office/drawing/2010/main" w="9525">
                   <a:solidFill>
                     <a:srgbClr val="000000"/>
                   </a:solidFill>
@@ -1433,7 +1517,7 @@
             </a:ln>
             <a:extLst>
               <a:ext uri="{91240B29-F687-4f45-9708-019B960494DF}">
-                <a14:hiddenLine xmlns:a14="http://schemas.microsoft.com/office/drawing/2010/main" xmlns="" w="9525">
+                <a14:hiddenLine xmlns="" xmlns:a14="http://schemas.microsoft.com/office/drawing/2010/main" w="9525">
                   <a:solidFill>
                     <a:srgbClr val="000000"/>
                   </a:solidFill>
@@ -1523,7 +1607,7 @@
             </a:ln>
             <a:extLst>
               <a:ext uri="{91240B29-F687-4f45-9708-019B960494DF}">
-                <a14:hiddenLine xmlns:a14="http://schemas.microsoft.com/office/drawing/2010/main" xmlns="" w="9525">
+                <a14:hiddenLine xmlns="" xmlns:a14="http://schemas.microsoft.com/office/drawing/2010/main" w="9525">
                   <a:solidFill>
                     <a:srgbClr val="000000"/>
                   </a:solidFill>
@@ -1585,7 +1669,7 @@
             </a:ln>
             <a:extLst>
               <a:ext uri="{91240B29-F687-4f45-9708-019B960494DF}">
-                <a14:hiddenLine xmlns:a14="http://schemas.microsoft.com/office/drawing/2010/main" xmlns="" w="9525">
+                <a14:hiddenLine xmlns="" xmlns:a14="http://schemas.microsoft.com/office/drawing/2010/main" w="9525">
                   <a:solidFill>
                     <a:srgbClr val="000000"/>
                   </a:solidFill>
@@ -1695,7 +1779,7 @@
             </a:ln>
             <a:extLst>
               <a:ext uri="{91240B29-F687-4f45-9708-019B960494DF}">
-                <a14:hiddenLine xmlns:a14="http://schemas.microsoft.com/office/drawing/2010/main" xmlns="" w="9525">
+                <a14:hiddenLine xmlns="" xmlns:a14="http://schemas.microsoft.com/office/drawing/2010/main" w="9525">
                   <a:solidFill>
                     <a:srgbClr val="000000"/>
                   </a:solidFill>
@@ -1757,7 +1841,7 @@
             </a:ln>
             <a:extLst>
               <a:ext uri="{91240B29-F687-4f45-9708-019B960494DF}">
-                <a14:hiddenLine xmlns:a14="http://schemas.microsoft.com/office/drawing/2010/main" xmlns="" w="9525">
+                <a14:hiddenLine xmlns="" xmlns:a14="http://schemas.microsoft.com/office/drawing/2010/main" w="9525">
                   <a:solidFill>
                     <a:srgbClr val="000000"/>
                   </a:solidFill>
@@ -1847,7 +1931,7 @@
             </a:ln>
             <a:extLst>
               <a:ext uri="{91240B29-F687-4f45-9708-019B960494DF}">
-                <a14:hiddenLine xmlns:a14="http://schemas.microsoft.com/office/drawing/2010/main" xmlns="" w="9525">
+                <a14:hiddenLine xmlns="" xmlns:a14="http://schemas.microsoft.com/office/drawing/2010/main" w="9525">
                   <a:solidFill>
                     <a:srgbClr val="000000"/>
                   </a:solidFill>
@@ -1937,7 +2021,7 @@
             </a:ln>
             <a:extLst>
               <a:ext uri="{91240B29-F687-4f45-9708-019B960494DF}">
-                <a14:hiddenLine xmlns:a14="http://schemas.microsoft.com/office/drawing/2010/main" xmlns="" w="9525">
+                <a14:hiddenLine xmlns="" xmlns:a14="http://schemas.microsoft.com/office/drawing/2010/main" w="9525">
                   <a:solidFill>
                     <a:srgbClr val="000000"/>
                   </a:solidFill>
@@ -1999,7 +2083,7 @@
             </a:ln>
             <a:extLst>
               <a:ext uri="{91240B29-F687-4f45-9708-019B960494DF}">
-                <a14:hiddenLine xmlns:a14="http://schemas.microsoft.com/office/drawing/2010/main" xmlns="" w="9525">
+                <a14:hiddenLine xmlns="" xmlns:a14="http://schemas.microsoft.com/office/drawing/2010/main" w="9525">
                   <a:solidFill>
                     <a:srgbClr val="000000"/>
                   </a:solidFill>
@@ -2089,7 +2173,7 @@
             </a:ln>
             <a:extLst>
               <a:ext uri="{91240B29-F687-4f45-9708-019B960494DF}">
-                <a14:hiddenLine xmlns:a14="http://schemas.microsoft.com/office/drawing/2010/main" xmlns="" w="9525">
+                <a14:hiddenLine xmlns="" xmlns:a14="http://schemas.microsoft.com/office/drawing/2010/main" w="9525">
                   <a:solidFill>
                     <a:srgbClr val="000000"/>
                   </a:solidFill>
@@ -2179,7 +2263,7 @@
             </a:ln>
             <a:extLst>
               <a:ext uri="{91240B29-F687-4f45-9708-019B960494DF}">
-                <a14:hiddenLine xmlns:a14="http://schemas.microsoft.com/office/drawing/2010/main" xmlns="" w="9525">
+                <a14:hiddenLine xmlns="" xmlns:a14="http://schemas.microsoft.com/office/drawing/2010/main" w="9525">
                   <a:solidFill>
                     <a:srgbClr val="000000"/>
                   </a:solidFill>
@@ -2235,7 +2319,7 @@
             </a:ln>
             <a:extLst>
               <a:ext uri="{91240B29-F687-4f45-9708-019B960494DF}">
-                <a14:hiddenLine xmlns:a14="http://schemas.microsoft.com/office/drawing/2010/main" xmlns="" w="9525">
+                <a14:hiddenLine xmlns="" xmlns:a14="http://schemas.microsoft.com/office/drawing/2010/main" w="9525">
                   <a:solidFill>
                     <a:srgbClr val="000000"/>
                   </a:solidFill>
@@ -2325,7 +2409,7 @@
             </a:ln>
             <a:extLst>
               <a:ext uri="{91240B29-F687-4f45-9708-019B960494DF}">
-                <a14:hiddenLine xmlns:a14="http://schemas.microsoft.com/office/drawing/2010/main" xmlns="" w="9525">
+                <a14:hiddenLine xmlns="" xmlns:a14="http://schemas.microsoft.com/office/drawing/2010/main" w="9525">
                   <a:solidFill>
                     <a:srgbClr val="000000"/>
                   </a:solidFill>
@@ -2381,7 +2465,7 @@
             </a:ln>
             <a:extLst>
               <a:ext uri="{91240B29-F687-4f45-9708-019B960494DF}">
-                <a14:hiddenLine xmlns:a14="http://schemas.microsoft.com/office/drawing/2010/main" xmlns="" w="9525">
+                <a14:hiddenLine xmlns="" xmlns:a14="http://schemas.microsoft.com/office/drawing/2010/main" w="9525">
                   <a:solidFill>
                     <a:srgbClr val="000000"/>
                   </a:solidFill>
@@ -2471,7 +2555,7 @@
             </a:ln>
             <a:extLst>
               <a:ext uri="{91240B29-F687-4f45-9708-019B960494DF}">
-                <a14:hiddenLine xmlns:a14="http://schemas.microsoft.com/office/drawing/2010/main" xmlns="" w="9525">
+                <a14:hiddenLine xmlns="" xmlns:a14="http://schemas.microsoft.com/office/drawing/2010/main" w="9525">
                   <a:solidFill>
                     <a:srgbClr val="000000"/>
                   </a:solidFill>
@@ -2539,7 +2623,7 @@
             </a:ln>
             <a:extLst>
               <a:ext uri="{91240B29-F687-4f45-9708-019B960494DF}">
-                <a14:hiddenLine xmlns:a14="http://schemas.microsoft.com/office/drawing/2010/main" xmlns="" w="9525">
+                <a14:hiddenLine xmlns="" xmlns:a14="http://schemas.microsoft.com/office/drawing/2010/main" w="9525">
                   <a:solidFill>
                     <a:srgbClr val="000000"/>
                   </a:solidFill>
@@ -2629,7 +2713,7 @@
             </a:ln>
             <a:extLst>
               <a:ext uri="{91240B29-F687-4f45-9708-019B960494DF}">
-                <a14:hiddenLine xmlns:a14="http://schemas.microsoft.com/office/drawing/2010/main" xmlns="" w="9525">
+                <a14:hiddenLine xmlns="" xmlns:a14="http://schemas.microsoft.com/office/drawing/2010/main" w="9525">
                   <a:solidFill>
                     <a:srgbClr val="000000"/>
                   </a:solidFill>
@@ -2697,7 +2781,7 @@
             </a:ln>
             <a:extLst>
               <a:ext uri="{91240B29-F687-4f45-9708-019B960494DF}">
-                <a14:hiddenLine xmlns:a14="http://schemas.microsoft.com/office/drawing/2010/main" xmlns="" w="9525">
+                <a14:hiddenLine xmlns="" xmlns:a14="http://schemas.microsoft.com/office/drawing/2010/main" w="9525">
                   <a:solidFill>
                     <a:srgbClr val="000000"/>
                   </a:solidFill>
@@ -2787,7 +2871,7 @@
             </a:ln>
             <a:extLst>
               <a:ext uri="{91240B29-F687-4f45-9708-019B960494DF}">
-                <a14:hiddenLine xmlns:a14="http://schemas.microsoft.com/office/drawing/2010/main" xmlns="" w="9525">
+                <a14:hiddenLine xmlns="" xmlns:a14="http://schemas.microsoft.com/office/drawing/2010/main" w="9525">
                   <a:solidFill>
                     <a:srgbClr val="000000"/>
                   </a:solidFill>
@@ -2821,7 +2905,7 @@
             </a:ln>
             <a:extLst>
               <a:ext uri="{91240B29-F687-4f45-9708-019B960494DF}">
-                <a14:hiddenLine xmlns:a14="http://schemas.microsoft.com/office/drawing/2010/main" xmlns="" w="9525">
+                <a14:hiddenLine xmlns="" xmlns:a14="http://schemas.microsoft.com/office/drawing/2010/main" w="9525">
                   <a:solidFill>
                     <a:srgbClr val="000000"/>
                   </a:solidFill>
@@ -2911,7 +2995,7 @@
             </a:ln>
             <a:extLst>
               <a:ext uri="{91240B29-F687-4f45-9708-019B960494DF}">
-                <a14:hiddenLine xmlns:a14="http://schemas.microsoft.com/office/drawing/2010/main" xmlns="" w="9525">
+                <a14:hiddenLine xmlns="" xmlns:a14="http://schemas.microsoft.com/office/drawing/2010/main" w="9525">
                   <a:solidFill>
                     <a:srgbClr val="000000"/>
                   </a:solidFill>
@@ -2973,7 +3057,7 @@
             </a:ln>
             <a:extLst>
               <a:ext uri="{91240B29-F687-4f45-9708-019B960494DF}">
-                <a14:hiddenLine xmlns:a14="http://schemas.microsoft.com/office/drawing/2010/main" xmlns="" w="9525">
+                <a14:hiddenLine xmlns="" xmlns:a14="http://schemas.microsoft.com/office/drawing/2010/main" w="9525">
                   <a:solidFill>
                     <a:srgbClr val="000000"/>
                   </a:solidFill>
@@ -3035,7 +3119,7 @@
             </a:ln>
             <a:extLst>
               <a:ext uri="{91240B29-F687-4f45-9708-019B960494DF}">
-                <a14:hiddenLine xmlns:a14="http://schemas.microsoft.com/office/drawing/2010/main" xmlns="" w="9525">
+                <a14:hiddenLine xmlns="" xmlns:a14="http://schemas.microsoft.com/office/drawing/2010/main" w="9525">
                   <a:solidFill>
                     <a:srgbClr val="000000"/>
                   </a:solidFill>
@@ -3125,7 +3209,7 @@
             </a:ln>
             <a:extLst>
               <a:ext uri="{91240B29-F687-4f45-9708-019B960494DF}">
-                <a14:hiddenLine xmlns:a14="http://schemas.microsoft.com/office/drawing/2010/main" xmlns="" w="9525">
+                <a14:hiddenLine xmlns="" xmlns:a14="http://schemas.microsoft.com/office/drawing/2010/main" w="9525">
                   <a:solidFill>
                     <a:srgbClr val="000000"/>
                   </a:solidFill>
@@ -3193,7 +3277,7 @@
             </a:ln>
             <a:extLst>
               <a:ext uri="{91240B29-F687-4f45-9708-019B960494DF}">
-                <a14:hiddenLine xmlns:a14="http://schemas.microsoft.com/office/drawing/2010/main" xmlns="" w="9525">
+                <a14:hiddenLine xmlns="" xmlns:a14="http://schemas.microsoft.com/office/drawing/2010/main" w="9525">
                   <a:solidFill>
                     <a:srgbClr val="000000"/>
                   </a:solidFill>
@@ -3255,7 +3339,7 @@
             </a:ln>
             <a:extLst>
               <a:ext uri="{91240B29-F687-4f45-9708-019B960494DF}">
-                <a14:hiddenLine xmlns:a14="http://schemas.microsoft.com/office/drawing/2010/main" xmlns="" w="9525">
+                <a14:hiddenLine xmlns="" xmlns:a14="http://schemas.microsoft.com/office/drawing/2010/main" w="9525">
                   <a:solidFill>
                     <a:srgbClr val="000000"/>
                   </a:solidFill>
@@ -3345,7 +3429,7 @@
             </a:ln>
             <a:extLst>
               <a:ext uri="{91240B29-F687-4f45-9708-019B960494DF}">
-                <a14:hiddenLine xmlns:a14="http://schemas.microsoft.com/office/drawing/2010/main" xmlns="" w="9525">
+                <a14:hiddenLine xmlns="" xmlns:a14="http://schemas.microsoft.com/office/drawing/2010/main" w="9525">
                   <a:solidFill>
                     <a:srgbClr val="000000"/>
                   </a:solidFill>
@@ -3407,7 +3491,7 @@
             </a:ln>
             <a:extLst>
               <a:ext uri="{91240B29-F687-4f45-9708-019B960494DF}">
-                <a14:hiddenLine xmlns:a14="http://schemas.microsoft.com/office/drawing/2010/main" xmlns="" w="9525">
+                <a14:hiddenLine xmlns="" xmlns:a14="http://schemas.microsoft.com/office/drawing/2010/main" w="9525">
                   <a:solidFill>
                     <a:srgbClr val="000000"/>
                   </a:solidFill>
@@ -3497,7 +3581,7 @@
             </a:ln>
             <a:extLst>
               <a:ext uri="{91240B29-F687-4f45-9708-019B960494DF}">
-                <a14:hiddenLine xmlns:a14="http://schemas.microsoft.com/office/drawing/2010/main" xmlns="" w="9525">
+                <a14:hiddenLine xmlns="" xmlns:a14="http://schemas.microsoft.com/office/drawing/2010/main" w="9525">
                   <a:solidFill>
                     <a:srgbClr val="000000"/>
                   </a:solidFill>
@@ -3559,7 +3643,7 @@
             </a:ln>
             <a:extLst>
               <a:ext uri="{91240B29-F687-4f45-9708-019B960494DF}">
-                <a14:hiddenLine xmlns:a14="http://schemas.microsoft.com/office/drawing/2010/main" xmlns="" w="9525">
+                <a14:hiddenLine xmlns="" xmlns:a14="http://schemas.microsoft.com/office/drawing/2010/main" w="9525">
                   <a:solidFill>
                     <a:srgbClr val="000000"/>
                   </a:solidFill>
@@ -3649,7 +3733,7 @@
             </a:ln>
             <a:extLst>
               <a:ext uri="{91240B29-F687-4f45-9708-019B960494DF}">
-                <a14:hiddenLine xmlns:a14="http://schemas.microsoft.com/office/drawing/2010/main" xmlns="" w="9525">
+                <a14:hiddenLine xmlns="" xmlns:a14="http://schemas.microsoft.com/office/drawing/2010/main" w="9525">
                   <a:solidFill>
                     <a:srgbClr val="000000"/>
                   </a:solidFill>
@@ -3683,7 +3767,7 @@
             </a:ln>
             <a:extLst>
               <a:ext uri="{91240B29-F687-4f45-9708-019B960494DF}">
-                <a14:hiddenLine xmlns:a14="http://schemas.microsoft.com/office/drawing/2010/main" xmlns="" w="9525">
+                <a14:hiddenLine xmlns="" xmlns:a14="http://schemas.microsoft.com/office/drawing/2010/main" w="9525">
                   <a:solidFill>
                     <a:srgbClr val="000000"/>
                   </a:solidFill>
@@ -3748,7 +3832,7 @@
             </a:ln>
             <a:extLst>
               <a:ext uri="{91240B29-F687-4f45-9708-019B960494DF}">
-                <a14:hiddenLine xmlns:a14="http://schemas.microsoft.com/office/drawing/2010/main" xmlns="" w="9525">
+                <a14:hiddenLine xmlns="" xmlns:a14="http://schemas.microsoft.com/office/drawing/2010/main" w="9525">
                   <a:solidFill>
                     <a:srgbClr val="000000"/>
                   </a:solidFill>
@@ -3838,7 +3922,7 @@
             </a:ln>
             <a:extLst>
               <a:ext uri="{91240B29-F687-4f45-9708-019B960494DF}">
-                <a14:hiddenLine xmlns:a14="http://schemas.microsoft.com/office/drawing/2010/main" xmlns="" w="9525">
+                <a14:hiddenLine xmlns="" xmlns:a14="http://schemas.microsoft.com/office/drawing/2010/main" w="9525">
                   <a:solidFill>
                     <a:srgbClr val="000000"/>
                   </a:solidFill>
@@ -3900,7 +3984,7 @@
             </a:ln>
             <a:extLst>
               <a:ext uri="{91240B29-F687-4f45-9708-019B960494DF}">
-                <a14:hiddenLine xmlns:a14="http://schemas.microsoft.com/office/drawing/2010/main" xmlns="" w="9525">
+                <a14:hiddenLine xmlns="" xmlns:a14="http://schemas.microsoft.com/office/drawing/2010/main" w="9525">
                   <a:solidFill>
                     <a:srgbClr val="000000"/>
                   </a:solidFill>
@@ -3990,7 +4074,7 @@
             </a:ln>
             <a:extLst>
               <a:ext uri="{91240B29-F687-4f45-9708-019B960494DF}">
-                <a14:hiddenLine xmlns:a14="http://schemas.microsoft.com/office/drawing/2010/main" xmlns="" w="9525">
+                <a14:hiddenLine xmlns="" xmlns:a14="http://schemas.microsoft.com/office/drawing/2010/main" w="9525">
                   <a:solidFill>
                     <a:srgbClr val="000000"/>
                   </a:solidFill>
@@ -4080,7 +4164,7 @@
             </a:ln>
             <a:extLst>
               <a:ext uri="{91240B29-F687-4f45-9708-019B960494DF}">
-                <a14:hiddenLine xmlns:a14="http://schemas.microsoft.com/office/drawing/2010/main" xmlns="" w="9525">
+                <a14:hiddenLine xmlns="" xmlns:a14="http://schemas.microsoft.com/office/drawing/2010/main" w="9525">
                   <a:solidFill>
                     <a:srgbClr val="000000"/>
                   </a:solidFill>
@@ -4145,7 +4229,7 @@
             </a:ln>
             <a:extLst>
               <a:ext uri="{91240B29-F687-4f45-9708-019B960494DF}">
-                <a14:hiddenLine xmlns:a14="http://schemas.microsoft.com/office/drawing/2010/main" xmlns="" w="9525">
+                <a14:hiddenLine xmlns="" xmlns:a14="http://schemas.microsoft.com/office/drawing/2010/main" w="9525">
                   <a:solidFill>
                     <a:srgbClr val="000000"/>
                   </a:solidFill>
@@ -4207,7 +4291,7 @@
             </a:ln>
             <a:extLst>
               <a:ext uri="{91240B29-F687-4f45-9708-019B960494DF}">
-                <a14:hiddenLine xmlns:a14="http://schemas.microsoft.com/office/drawing/2010/main" xmlns="" w="9525">
+                <a14:hiddenLine xmlns="" xmlns:a14="http://schemas.microsoft.com/office/drawing/2010/main" w="9525">
                   <a:solidFill>
                     <a:srgbClr val="000000"/>
                   </a:solidFill>
@@ -4297,7 +4381,7 @@
             </a:ln>
             <a:extLst>
               <a:ext uri="{91240B29-F687-4f45-9708-019B960494DF}">
-                <a14:hiddenLine xmlns:a14="http://schemas.microsoft.com/office/drawing/2010/main" xmlns="" w="9525">
+                <a14:hiddenLine xmlns="" xmlns:a14="http://schemas.microsoft.com/office/drawing/2010/main" w="9525">
                   <a:solidFill>
                     <a:srgbClr val="000000"/>
                   </a:solidFill>
@@ -4387,7 +4471,7 @@
             </a:ln>
             <a:extLst>
               <a:ext uri="{91240B29-F687-4f45-9708-019B960494DF}">
-                <a14:hiddenLine xmlns:a14="http://schemas.microsoft.com/office/drawing/2010/main" xmlns="" w="9525">
+                <a14:hiddenLine xmlns="" xmlns:a14="http://schemas.microsoft.com/office/drawing/2010/main" w="9525">
                   <a:solidFill>
                     <a:srgbClr val="000000"/>
                   </a:solidFill>
@@ -4449,7 +4533,7 @@
             </a:ln>
             <a:extLst>
               <a:ext uri="{91240B29-F687-4f45-9708-019B960494DF}">
-                <a14:hiddenLine xmlns:a14="http://schemas.microsoft.com/office/drawing/2010/main" xmlns="" w="9525">
+                <a14:hiddenLine xmlns="" xmlns:a14="http://schemas.microsoft.com/office/drawing/2010/main" w="9525">
                   <a:solidFill>
                     <a:srgbClr val="000000"/>
                   </a:solidFill>
@@ -4569,7 +4653,7 @@
             </a:ln>
             <a:extLst>
               <a:ext uri="{91240B29-F687-4f45-9708-019B960494DF}">
-                <a14:hiddenLine xmlns:a14="http://schemas.microsoft.com/office/drawing/2010/main" xmlns="" w="9525">
+                <a14:hiddenLine xmlns="" xmlns:a14="http://schemas.microsoft.com/office/drawing/2010/main" w="9525">
                   <a:solidFill>
                     <a:srgbClr val="000000"/>
                   </a:solidFill>
@@ -4637,7 +4721,7 @@
             </a:ln>
             <a:extLst>
               <a:ext uri="{91240B29-F687-4f45-9708-019B960494DF}">
-                <a14:hiddenLine xmlns:a14="http://schemas.microsoft.com/office/drawing/2010/main" xmlns="" w="9525">
+                <a14:hiddenLine xmlns="" xmlns:a14="http://schemas.microsoft.com/office/drawing/2010/main" w="9525">
                   <a:solidFill>
                     <a:srgbClr val="000000"/>
                   </a:solidFill>
@@ -4727,7 +4811,7 @@
             </a:ln>
             <a:extLst>
               <a:ext uri="{91240B29-F687-4f45-9708-019B960494DF}">
-                <a14:hiddenLine xmlns:a14="http://schemas.microsoft.com/office/drawing/2010/main" xmlns="" w="9525">
+                <a14:hiddenLine xmlns="" xmlns:a14="http://schemas.microsoft.com/office/drawing/2010/main" w="9525">
                   <a:solidFill>
                     <a:srgbClr val="000000"/>
                   </a:solidFill>
@@ -9540,7 +9624,7 @@
           <a:noFill/>
           <a:extLst>
             <a:ext uri="{909E8E84-426E-40dd-AFC4-6F175D3DCCD1}">
-              <a14:hiddenFill xmlns:a14="http://schemas.microsoft.com/office/drawing/2010/main" xmlns="">
+              <a14:hiddenFill xmlns="" xmlns:a14="http://schemas.microsoft.com/office/drawing/2010/main">
                 <a:solidFill>
                   <a:srgbClr val="FFFFFF"/>
                 </a:solidFill>
@@ -9614,7 +9698,7 @@
               </a:ln>
               <a:extLst>
                 <a:ext uri="{91240B29-F687-4f45-9708-019B960494DF}">
-                  <a14:hiddenLine xmlns:a14="http://schemas.microsoft.com/office/drawing/2010/main" xmlns="" w="9525">
+                  <a14:hiddenLine xmlns="" xmlns:a14="http://schemas.microsoft.com/office/drawing/2010/main" w="9525">
                     <a:solidFill>
                       <a:srgbClr val="000000"/>
                     </a:solidFill>
@@ -9704,7 +9788,7 @@
               </a:ln>
               <a:extLst>
                 <a:ext uri="{91240B29-F687-4f45-9708-019B960494DF}">
-                  <a14:hiddenLine xmlns:a14="http://schemas.microsoft.com/office/drawing/2010/main" xmlns="" w="9525">
+                  <a14:hiddenLine xmlns="" xmlns:a14="http://schemas.microsoft.com/office/drawing/2010/main" w="9525">
                     <a:solidFill>
                       <a:srgbClr val="000000"/>
                     </a:solidFill>
@@ -9794,7 +9878,7 @@
               </a:ln>
               <a:extLst>
                 <a:ext uri="{91240B29-F687-4f45-9708-019B960494DF}">
-                  <a14:hiddenLine xmlns:a14="http://schemas.microsoft.com/office/drawing/2010/main" xmlns="" w="9525">
+                  <a14:hiddenLine xmlns="" xmlns:a14="http://schemas.microsoft.com/office/drawing/2010/main" w="9525">
                     <a:solidFill>
                       <a:srgbClr val="000000"/>
                     </a:solidFill>
@@ -9856,7 +9940,7 @@
               </a:ln>
               <a:extLst>
                 <a:ext uri="{91240B29-F687-4f45-9708-019B960494DF}">
-                  <a14:hiddenLine xmlns:a14="http://schemas.microsoft.com/office/drawing/2010/main" xmlns="" w="9525">
+                  <a14:hiddenLine xmlns="" xmlns:a14="http://schemas.microsoft.com/office/drawing/2010/main" w="9525">
                     <a:solidFill>
                       <a:srgbClr val="000000"/>
                     </a:solidFill>
@@ -9946,7 +10030,7 @@
               </a:ln>
               <a:extLst>
                 <a:ext uri="{91240B29-F687-4f45-9708-019B960494DF}">
-                  <a14:hiddenLine xmlns:a14="http://schemas.microsoft.com/office/drawing/2010/main" xmlns="" w="9525">
+                  <a14:hiddenLine xmlns="" xmlns:a14="http://schemas.microsoft.com/office/drawing/2010/main" w="9525">
                     <a:solidFill>
                       <a:srgbClr val="000000"/>
                     </a:solidFill>
@@ -10008,7 +10092,7 @@
               </a:ln>
               <a:extLst>
                 <a:ext uri="{91240B29-F687-4f45-9708-019B960494DF}">
-                  <a14:hiddenLine xmlns:a14="http://schemas.microsoft.com/office/drawing/2010/main" xmlns="" w="9525">
+                  <a14:hiddenLine xmlns="" xmlns:a14="http://schemas.microsoft.com/office/drawing/2010/main" w="9525">
                     <a:solidFill>
                       <a:srgbClr val="000000"/>
                     </a:solidFill>
@@ -10070,7 +10154,7 @@
               </a:ln>
               <a:extLst>
                 <a:ext uri="{91240B29-F687-4f45-9708-019B960494DF}">
-                  <a14:hiddenLine xmlns:a14="http://schemas.microsoft.com/office/drawing/2010/main" xmlns="" w="9525">
+                  <a14:hiddenLine xmlns="" xmlns:a14="http://schemas.microsoft.com/office/drawing/2010/main" w="9525">
                     <a:solidFill>
                       <a:srgbClr val="000000"/>
                     </a:solidFill>
@@ -10160,7 +10244,7 @@
               </a:ln>
               <a:extLst>
                 <a:ext uri="{91240B29-F687-4f45-9708-019B960494DF}">
-                  <a14:hiddenLine xmlns:a14="http://schemas.microsoft.com/office/drawing/2010/main" xmlns="" w="9525">
+                  <a14:hiddenLine xmlns="" xmlns:a14="http://schemas.microsoft.com/office/drawing/2010/main" w="9525">
                     <a:solidFill>
                       <a:srgbClr val="000000"/>
                     </a:solidFill>
@@ -10250,7 +10334,7 @@
               </a:ln>
               <a:extLst>
                 <a:ext uri="{91240B29-F687-4f45-9708-019B960494DF}">
-                  <a14:hiddenLine xmlns:a14="http://schemas.microsoft.com/office/drawing/2010/main" xmlns="" w="9525">
+                  <a14:hiddenLine xmlns="" xmlns:a14="http://schemas.microsoft.com/office/drawing/2010/main" w="9525">
                     <a:solidFill>
                       <a:srgbClr val="000000"/>
                     </a:solidFill>
@@ -10312,7 +10396,7 @@
               </a:ln>
               <a:extLst>
                 <a:ext uri="{91240B29-F687-4f45-9708-019B960494DF}">
-                  <a14:hiddenLine xmlns:a14="http://schemas.microsoft.com/office/drawing/2010/main" xmlns="" w="9525">
+                  <a14:hiddenLine xmlns="" xmlns:a14="http://schemas.microsoft.com/office/drawing/2010/main" w="9525">
                     <a:solidFill>
                       <a:srgbClr val="000000"/>
                     </a:solidFill>
@@ -10422,7 +10506,7 @@
               </a:ln>
               <a:extLst>
                 <a:ext uri="{91240B29-F687-4f45-9708-019B960494DF}">
-                  <a14:hiddenLine xmlns:a14="http://schemas.microsoft.com/office/drawing/2010/main" xmlns="" w="9525">
+                  <a14:hiddenLine xmlns="" xmlns:a14="http://schemas.microsoft.com/office/drawing/2010/main" w="9525">
                     <a:solidFill>
                       <a:srgbClr val="000000"/>
                     </a:solidFill>
@@ -10506,7 +10590,7 @@
               </a:ln>
               <a:extLst>
                 <a:ext uri="{91240B29-F687-4f45-9708-019B960494DF}">
-                  <a14:hiddenLine xmlns:a14="http://schemas.microsoft.com/office/drawing/2010/main" xmlns="" w="9525">
+                  <a14:hiddenLine xmlns="" xmlns:a14="http://schemas.microsoft.com/office/drawing/2010/main" w="9525">
                     <a:solidFill>
                       <a:srgbClr val="000000"/>
                     </a:solidFill>
@@ -10568,7 +10652,7 @@
               </a:ln>
               <a:extLst>
                 <a:ext uri="{91240B29-F687-4f45-9708-019B960494DF}">
-                  <a14:hiddenLine xmlns:a14="http://schemas.microsoft.com/office/drawing/2010/main" xmlns="" w="9525">
+                  <a14:hiddenLine xmlns="" xmlns:a14="http://schemas.microsoft.com/office/drawing/2010/main" w="9525">
                     <a:solidFill>
                       <a:srgbClr val="000000"/>
                     </a:solidFill>
@@ -10630,7 +10714,7 @@
               </a:ln>
               <a:extLst>
                 <a:ext uri="{91240B29-F687-4f45-9708-019B960494DF}">
-                  <a14:hiddenLine xmlns:a14="http://schemas.microsoft.com/office/drawing/2010/main" xmlns="" w="9525">
+                  <a14:hiddenLine xmlns="" xmlns:a14="http://schemas.microsoft.com/office/drawing/2010/main" w="9525">
                     <a:solidFill>
                       <a:srgbClr val="000000"/>
                     </a:solidFill>
@@ -10720,7 +10804,7 @@
               </a:ln>
               <a:extLst>
                 <a:ext uri="{91240B29-F687-4f45-9708-019B960494DF}">
-                  <a14:hiddenLine xmlns:a14="http://schemas.microsoft.com/office/drawing/2010/main" xmlns="" w="9525">
+                  <a14:hiddenLine xmlns="" xmlns:a14="http://schemas.microsoft.com/office/drawing/2010/main" w="9525">
                     <a:solidFill>
                       <a:srgbClr val="000000"/>
                     </a:solidFill>
@@ -10754,7 +10838,7 @@
               </a:ln>
               <a:extLst>
                 <a:ext uri="{91240B29-F687-4f45-9708-019B960494DF}">
-                  <a14:hiddenLine xmlns:a14="http://schemas.microsoft.com/office/drawing/2010/main" xmlns="" w="9525">
+                  <a14:hiddenLine xmlns="" xmlns:a14="http://schemas.microsoft.com/office/drawing/2010/main" w="9525">
                     <a:solidFill>
                       <a:srgbClr val="000000"/>
                     </a:solidFill>
@@ -10819,7 +10903,7 @@
               </a:ln>
               <a:extLst>
                 <a:ext uri="{91240B29-F687-4f45-9708-019B960494DF}">
-                  <a14:hiddenLine xmlns:a14="http://schemas.microsoft.com/office/drawing/2010/main" xmlns="" w="9525">
+                  <a14:hiddenLine xmlns="" xmlns:a14="http://schemas.microsoft.com/office/drawing/2010/main" w="9525">
                     <a:solidFill>
                       <a:srgbClr val="000000"/>
                     </a:solidFill>
@@ -10909,7 +10993,7 @@
               </a:ln>
               <a:extLst>
                 <a:ext uri="{91240B29-F687-4f45-9708-019B960494DF}">
-                  <a14:hiddenLine xmlns:a14="http://schemas.microsoft.com/office/drawing/2010/main" xmlns="" w="9525">
+                  <a14:hiddenLine xmlns="" xmlns:a14="http://schemas.microsoft.com/office/drawing/2010/main" w="9525">
                     <a:solidFill>
                       <a:srgbClr val="000000"/>
                     </a:solidFill>
@@ -10971,7 +11055,7 @@
               </a:ln>
               <a:extLst>
                 <a:ext uri="{91240B29-F687-4f45-9708-019B960494DF}">
-                  <a14:hiddenLine xmlns:a14="http://schemas.microsoft.com/office/drawing/2010/main" xmlns="" w="9525">
+                  <a14:hiddenLine xmlns="" xmlns:a14="http://schemas.microsoft.com/office/drawing/2010/main" w="9525">
                     <a:solidFill>
                       <a:srgbClr val="000000"/>
                     </a:solidFill>
@@ -11061,7 +11145,7 @@
               </a:ln>
               <a:extLst>
                 <a:ext uri="{91240B29-F687-4f45-9708-019B960494DF}">
-                  <a14:hiddenLine xmlns:a14="http://schemas.microsoft.com/office/drawing/2010/main" xmlns="" w="9525">
+                  <a14:hiddenLine xmlns="" xmlns:a14="http://schemas.microsoft.com/office/drawing/2010/main" w="9525">
                     <a:solidFill>
                       <a:srgbClr val="000000"/>
                     </a:solidFill>
@@ -11126,7 +11210,7 @@
               </a:ln>
               <a:extLst>
                 <a:ext uri="{91240B29-F687-4f45-9708-019B960494DF}">
-                  <a14:hiddenLine xmlns:a14="http://schemas.microsoft.com/office/drawing/2010/main" xmlns="" w="9525">
+                  <a14:hiddenLine xmlns="" xmlns:a14="http://schemas.microsoft.com/office/drawing/2010/main" w="9525">
                     <a:solidFill>
                       <a:srgbClr val="000000"/>
                     </a:solidFill>
@@ -11188,7 +11272,7 @@
               </a:ln>
               <a:extLst>
                 <a:ext uri="{91240B29-F687-4f45-9708-019B960494DF}">
-                  <a14:hiddenLine xmlns:a14="http://schemas.microsoft.com/office/drawing/2010/main" xmlns="" w="9525">
+                  <a14:hiddenLine xmlns="" xmlns:a14="http://schemas.microsoft.com/office/drawing/2010/main" w="9525">
                     <a:solidFill>
                       <a:srgbClr val="000000"/>
                     </a:solidFill>
@@ -11278,7 +11362,7 @@
               </a:ln>
               <a:extLst>
                 <a:ext uri="{91240B29-F687-4f45-9708-019B960494DF}">
-                  <a14:hiddenLine xmlns:a14="http://schemas.microsoft.com/office/drawing/2010/main" xmlns="" w="9525">
+                  <a14:hiddenLine xmlns="" xmlns:a14="http://schemas.microsoft.com/office/drawing/2010/main" w="9525">
                     <a:solidFill>
                       <a:srgbClr val="000000"/>
                     </a:solidFill>
@@ -11368,7 +11452,7 @@
               </a:ln>
               <a:extLst>
                 <a:ext uri="{91240B29-F687-4f45-9708-019B960494DF}">
-                  <a14:hiddenLine xmlns:a14="http://schemas.microsoft.com/office/drawing/2010/main" xmlns="" w="9525">
+                  <a14:hiddenLine xmlns="" xmlns:a14="http://schemas.microsoft.com/office/drawing/2010/main" w="9525">
                     <a:solidFill>
                       <a:srgbClr val="000000"/>
                     </a:solidFill>
@@ -11433,7 +11517,7 @@
               </a:ln>
               <a:extLst>
                 <a:ext uri="{91240B29-F687-4f45-9708-019B960494DF}">
-                  <a14:hiddenLine xmlns:a14="http://schemas.microsoft.com/office/drawing/2010/main" xmlns="" w="9525">
+                  <a14:hiddenLine xmlns="" xmlns:a14="http://schemas.microsoft.com/office/drawing/2010/main" w="9525">
                     <a:solidFill>
                       <a:srgbClr val="000000"/>
                     </a:solidFill>
@@ -11553,7 +11637,7 @@
               </a:ln>
               <a:extLst>
                 <a:ext uri="{91240B29-F687-4f45-9708-019B960494DF}">
-                  <a14:hiddenLine xmlns:a14="http://schemas.microsoft.com/office/drawing/2010/main" xmlns="" w="9525">
+                  <a14:hiddenLine xmlns="" xmlns:a14="http://schemas.microsoft.com/office/drawing/2010/main" w="9525">
                     <a:solidFill>
                       <a:srgbClr val="000000"/>
                     </a:solidFill>
@@ -11651,7 +11735,7 @@
               </a:ln>
               <a:extLst>
                 <a:ext uri="{91240B29-F687-4f45-9708-019B960494DF}">
-                  <a14:hiddenLine xmlns:a14="http://schemas.microsoft.com/office/drawing/2010/main" xmlns="" w="9525">
+                  <a14:hiddenLine xmlns="" xmlns:a14="http://schemas.microsoft.com/office/drawing/2010/main" w="9525">
                     <a:solidFill>
                       <a:srgbClr val="000000"/>
                     </a:solidFill>
@@ -11766,7 +11850,7 @@
               </a:ln>
               <a:extLst>
                 <a:ext uri="{91240B29-F687-4f45-9708-019B960494DF}">
-                  <a14:hiddenLine xmlns:a14="http://schemas.microsoft.com/office/drawing/2010/main" xmlns="" w="9525">
+                  <a14:hiddenLine xmlns="" xmlns:a14="http://schemas.microsoft.com/office/drawing/2010/main" w="9525">
                     <a:solidFill>
                       <a:srgbClr val="000000"/>
                     </a:solidFill>
@@ -11856,7 +11940,7 @@
               </a:ln>
               <a:extLst>
                 <a:ext uri="{91240B29-F687-4f45-9708-019B960494DF}">
-                  <a14:hiddenLine xmlns:a14="http://schemas.microsoft.com/office/drawing/2010/main" xmlns="" w="9525">
+                  <a14:hiddenLine xmlns="" xmlns:a14="http://schemas.microsoft.com/office/drawing/2010/main" w="9525">
                     <a:solidFill>
                       <a:srgbClr val="000000"/>
                     </a:solidFill>
@@ -11921,7 +12005,7 @@
               </a:ln>
               <a:extLst>
                 <a:ext uri="{91240B29-F687-4f45-9708-019B960494DF}">
-                  <a14:hiddenLine xmlns:a14="http://schemas.microsoft.com/office/drawing/2010/main" xmlns="" w="9525">
+                  <a14:hiddenLine xmlns="" xmlns:a14="http://schemas.microsoft.com/office/drawing/2010/main" w="9525">
                     <a:solidFill>
                       <a:srgbClr val="000000"/>
                     </a:solidFill>
@@ -12011,7 +12095,7 @@
               </a:ln>
               <a:extLst>
                 <a:ext uri="{91240B29-F687-4f45-9708-019B960494DF}">
-                  <a14:hiddenLine xmlns:a14="http://schemas.microsoft.com/office/drawing/2010/main" xmlns="" w="9525">
+                  <a14:hiddenLine xmlns="" xmlns:a14="http://schemas.microsoft.com/office/drawing/2010/main" w="9525">
                     <a:solidFill>
                       <a:srgbClr val="000000"/>
                     </a:solidFill>
@@ -12079,7 +12163,7 @@
               </a:ln>
               <a:extLst>
                 <a:ext uri="{91240B29-F687-4f45-9708-019B960494DF}">
-                  <a14:hiddenLine xmlns:a14="http://schemas.microsoft.com/office/drawing/2010/main" xmlns="" w="9525">
+                  <a14:hiddenLine xmlns="" xmlns:a14="http://schemas.microsoft.com/office/drawing/2010/main" w="9525">
                     <a:solidFill>
                       <a:srgbClr val="000000"/>
                     </a:solidFill>
@@ -12169,7 +12253,7 @@
               </a:ln>
               <a:extLst>
                 <a:ext uri="{91240B29-F687-4f45-9708-019B960494DF}">
-                  <a14:hiddenLine xmlns:a14="http://schemas.microsoft.com/office/drawing/2010/main" xmlns="" w="9525">
+                  <a14:hiddenLine xmlns="" xmlns:a14="http://schemas.microsoft.com/office/drawing/2010/main" w="9525">
                     <a:solidFill>
                       <a:srgbClr val="000000"/>
                     </a:solidFill>
@@ -12237,7 +12321,7 @@
               </a:ln>
               <a:extLst>
                 <a:ext uri="{91240B29-F687-4f45-9708-019B960494DF}">
-                  <a14:hiddenLine xmlns:a14="http://schemas.microsoft.com/office/drawing/2010/main" xmlns="" w="9525">
+                  <a14:hiddenLine xmlns="" xmlns:a14="http://schemas.microsoft.com/office/drawing/2010/main" w="9525">
                     <a:solidFill>
                       <a:srgbClr val="000000"/>
                     </a:solidFill>
@@ -12327,7 +12411,7 @@
               </a:ln>
               <a:extLst>
                 <a:ext uri="{91240B29-F687-4f45-9708-019B960494DF}">
-                  <a14:hiddenLine xmlns:a14="http://schemas.microsoft.com/office/drawing/2010/main" xmlns="" w="9525">
+                  <a14:hiddenLine xmlns="" xmlns:a14="http://schemas.microsoft.com/office/drawing/2010/main" w="9525">
                     <a:solidFill>
                       <a:srgbClr val="000000"/>
                     </a:solidFill>
@@ -12361,7 +12445,7 @@
               </a:ln>
               <a:extLst>
                 <a:ext uri="{91240B29-F687-4f45-9708-019B960494DF}">
-                  <a14:hiddenLine xmlns:a14="http://schemas.microsoft.com/office/drawing/2010/main" xmlns="" w="9525">
+                  <a14:hiddenLine xmlns="" xmlns:a14="http://schemas.microsoft.com/office/drawing/2010/main" w="9525">
                     <a:solidFill>
                       <a:srgbClr val="000000"/>
                     </a:solidFill>
@@ -13072,224 +13156,6 @@
           <a:p>
             <a:r>
               <a:rPr lang="en-US" dirty="0" smtClean="0"/>
-              <a:t>Exploratory</a:t>
-            </a:r>
-            <a:endParaRPr lang="en-US" dirty="0"/>
-          </a:p>
-        </p:txBody>
-      </p:sp>
-      <p:sp>
-        <p:nvSpPr>
-          <p:cNvPr id="3" name="Content Placeholder 2"/>
-          <p:cNvSpPr>
-            <a:spLocks noGrp="1"/>
-          </p:cNvSpPr>
-          <p:nvPr>
-            <p:ph idx="1"/>
-          </p:nvPr>
-        </p:nvSpPr>
-        <p:spPr/>
-        <p:txBody>
-          <a:bodyPr/>
-          <a:lstStyle/>
-          <a:p>
-            <a:r>
-              <a:rPr lang="en-US" dirty="0" smtClean="0"/>
-              <a:t>Ben/Austin</a:t>
-            </a:r>
-            <a:endParaRPr lang="en-US" dirty="0"/>
-          </a:p>
-        </p:txBody>
-      </p:sp>
-      <p:sp>
-        <p:nvSpPr>
-          <p:cNvPr id="4" name="Slide Number Placeholder 3"/>
-          <p:cNvSpPr>
-            <a:spLocks noGrp="1"/>
-          </p:cNvSpPr>
-          <p:nvPr>
-            <p:ph type="sldNum" sz="quarter" idx="12"/>
-          </p:nvPr>
-        </p:nvSpPr>
-        <p:spPr/>
-        <p:txBody>
-          <a:bodyPr/>
-          <a:lstStyle/>
-          <a:p>
-            <a:fld id="{7B7DB76D-28D5-4DAC-900A-A1330999554A}" type="slidenum">
-              <a:rPr lang="en-US" smtClean="0"/>
-              <a:t>10</a:t>
-            </a:fld>
-            <a:endParaRPr lang="en-US"/>
-          </a:p>
-        </p:txBody>
-      </p:sp>
-    </p:spTree>
-    <p:extLst>
-      <p:ext uri="{BB962C8B-B14F-4D97-AF65-F5344CB8AC3E}">
-        <p14:creationId xmlns:p14="http://schemas.microsoft.com/office/powerpoint/2010/main" val="4270067039"/>
-      </p:ext>
-    </p:extLst>
-  </p:cSld>
-  <p:clrMapOvr>
-    <a:masterClrMapping/>
-  </p:clrMapOvr>
-  <p:timing>
-    <p:tnLst>
-      <p:par>
-        <p:cTn id="1" dur="indefinite" restart="never" nodeType="tmRoot"/>
-      </p:par>
-    </p:tnLst>
-  </p:timing>
-</p:sld>
-</file>
-
-<file path=ppt/slides/slide11.xml><?xml version="1.0" encoding="utf-8"?>
-<p:sld xmlns:a="http://schemas.openxmlformats.org/drawingml/2006/main" xmlns:r="http://schemas.openxmlformats.org/officeDocument/2006/relationships" xmlns:p="http://schemas.openxmlformats.org/presentationml/2006/main">
-  <p:cSld>
-    <p:spTree>
-      <p:nvGrpSpPr>
-        <p:cNvPr id="1" name=""/>
-        <p:cNvGrpSpPr/>
-        <p:nvPr/>
-      </p:nvGrpSpPr>
-      <p:grpSpPr>
-        <a:xfrm>
-          <a:off x="0" y="0"/>
-          <a:ext cx="0" cy="0"/>
-          <a:chOff x="0" y="0"/>
-          <a:chExt cx="0" cy="0"/>
-        </a:xfrm>
-      </p:grpSpPr>
-      <p:sp>
-        <p:nvSpPr>
-          <p:cNvPr id="2" name="Title 1"/>
-          <p:cNvSpPr>
-            <a:spLocks noGrp="1"/>
-          </p:cNvSpPr>
-          <p:nvPr>
-            <p:ph type="title"/>
-          </p:nvPr>
-        </p:nvSpPr>
-        <p:spPr/>
-        <p:txBody>
-          <a:bodyPr/>
-          <a:lstStyle/>
-          <a:p>
-            <a:r>
-              <a:rPr lang="en-US" dirty="0" smtClean="0"/>
-              <a:t>How run times vary by year</a:t>
-            </a:r>
-            <a:endParaRPr lang="en-US" dirty="0"/>
-          </a:p>
-        </p:txBody>
-      </p:sp>
-      <p:pic>
-        <p:nvPicPr>
-          <p:cNvPr id="5" name="Content Placeholder 4"/>
-          <p:cNvPicPr>
-            <a:picLocks noGrp="1" noChangeAspect="1"/>
-          </p:cNvPicPr>
-          <p:nvPr>
-            <p:ph idx="1"/>
-          </p:nvPr>
-        </p:nvPicPr>
-        <p:blipFill>
-          <a:blip r:embed="rId2">
-            <a:extLst>
-              <a:ext uri="{28A0092B-C50C-407E-A947-70E740481C1C}">
-                <a14:useLocalDpi xmlns:a14="http://schemas.microsoft.com/office/drawing/2010/main" val="0"/>
-              </a:ext>
-            </a:extLst>
-          </a:blip>
-          <a:stretch>
-            <a:fillRect/>
-          </a:stretch>
-        </p:blipFill>
-        <p:spPr>
-          <a:xfrm>
-            <a:off x="2825160" y="1770185"/>
-            <a:ext cx="5842127" cy="4021015"/>
-          </a:xfrm>
-        </p:spPr>
-      </p:pic>
-      <p:sp>
-        <p:nvSpPr>
-          <p:cNvPr id="4" name="Slide Number Placeholder 3"/>
-          <p:cNvSpPr>
-            <a:spLocks noGrp="1"/>
-          </p:cNvSpPr>
-          <p:nvPr>
-            <p:ph type="sldNum" sz="quarter" idx="12"/>
-          </p:nvPr>
-        </p:nvSpPr>
-        <p:spPr/>
-        <p:txBody>
-          <a:bodyPr/>
-          <a:lstStyle/>
-          <a:p>
-            <a:fld id="{7B7DB76D-28D5-4DAC-900A-A1330999554A}" type="slidenum">
-              <a:rPr lang="en-US" smtClean="0"/>
-              <a:t>11</a:t>
-            </a:fld>
-            <a:endParaRPr lang="en-US"/>
-          </a:p>
-        </p:txBody>
-      </p:sp>
-    </p:spTree>
-    <p:extLst>
-      <p:ext uri="{BB962C8B-B14F-4D97-AF65-F5344CB8AC3E}">
-        <p14:creationId xmlns:p14="http://schemas.microsoft.com/office/powerpoint/2010/main" val="2807468785"/>
-      </p:ext>
-    </p:extLst>
-  </p:cSld>
-  <p:clrMapOvr>
-    <a:masterClrMapping/>
-  </p:clrMapOvr>
-  <p:timing>
-    <p:tnLst>
-      <p:par>
-        <p:cTn id="1" dur="indefinite" restart="never" nodeType="tmRoot"/>
-      </p:par>
-    </p:tnLst>
-  </p:timing>
-</p:sld>
-</file>
-
-<file path=ppt/slides/slide12.xml><?xml version="1.0" encoding="utf-8"?>
-<p:sld xmlns:a="http://schemas.openxmlformats.org/drawingml/2006/main" xmlns:r="http://schemas.openxmlformats.org/officeDocument/2006/relationships" xmlns:p="http://schemas.openxmlformats.org/presentationml/2006/main">
-  <p:cSld>
-    <p:spTree>
-      <p:nvGrpSpPr>
-        <p:cNvPr id="1" name=""/>
-        <p:cNvGrpSpPr/>
-        <p:nvPr/>
-      </p:nvGrpSpPr>
-      <p:grpSpPr>
-        <a:xfrm>
-          <a:off x="0" y="0"/>
-          <a:ext cx="0" cy="0"/>
-          <a:chOff x="0" y="0"/>
-          <a:chExt cx="0" cy="0"/>
-        </a:xfrm>
-      </p:grpSpPr>
-      <p:sp>
-        <p:nvSpPr>
-          <p:cNvPr id="2" name="Title 1"/>
-          <p:cNvSpPr>
-            <a:spLocks noGrp="1"/>
-          </p:cNvSpPr>
-          <p:nvPr>
-            <p:ph type="title"/>
-          </p:nvPr>
-        </p:nvSpPr>
-        <p:spPr/>
-        <p:txBody>
-          <a:bodyPr/>
-          <a:lstStyle/>
-          <a:p>
-            <a:r>
-              <a:rPr lang="en-US" dirty="0" smtClean="0"/>
               <a:t>How age distributions vary by year</a:t>
             </a:r>
             <a:endParaRPr lang="en-US" dirty="0"/>
@@ -13342,7 +13208,7 @@
           <a:p>
             <a:fld id="{7B7DB76D-28D5-4DAC-900A-A1330999554A}" type="slidenum">
               <a:rPr lang="en-US" smtClean="0"/>
-              <a:t>12</a:t>
+              <a:t>10</a:t>
             </a:fld>
             <a:endParaRPr lang="en-US"/>
           </a:p>
@@ -13398,7 +13264,112 @@
 </p:sld>
 </file>
 
-<file path=ppt/slides/slide13.xml><?xml version="1.0" encoding="utf-8"?>
+<file path=ppt/slides/slide11.xml><?xml version="1.0" encoding="utf-8"?>
+<p:sld xmlns:a="http://schemas.openxmlformats.org/drawingml/2006/main" xmlns:r="http://schemas.openxmlformats.org/officeDocument/2006/relationships" xmlns:p="http://schemas.openxmlformats.org/presentationml/2006/main">
+  <p:cSld>
+    <p:spTree>
+      <p:nvGrpSpPr>
+        <p:cNvPr id="1" name=""/>
+        <p:cNvGrpSpPr/>
+        <p:nvPr/>
+      </p:nvGrpSpPr>
+      <p:grpSpPr>
+        <a:xfrm>
+          <a:off x="0" y="0"/>
+          <a:ext cx="0" cy="0"/>
+          <a:chOff x="0" y="0"/>
+          <a:chExt cx="0" cy="0"/>
+        </a:xfrm>
+      </p:grpSpPr>
+      <p:sp>
+        <p:nvSpPr>
+          <p:cNvPr id="2" name="Title 1"/>
+          <p:cNvSpPr>
+            <a:spLocks noGrp="1"/>
+          </p:cNvSpPr>
+          <p:nvPr>
+            <p:ph type="title"/>
+          </p:nvPr>
+        </p:nvSpPr>
+        <p:spPr/>
+        <p:txBody>
+          <a:bodyPr/>
+          <a:lstStyle/>
+          <a:p>
+            <a:r>
+              <a:rPr lang="en-US" dirty="0" smtClean="0"/>
+              <a:t>What are these graphs telling us?</a:t>
+            </a:r>
+            <a:endParaRPr lang="en-US" dirty="0"/>
+          </a:p>
+        </p:txBody>
+      </p:sp>
+      <p:sp>
+        <p:nvSpPr>
+          <p:cNvPr id="3" name="Content Placeholder 2"/>
+          <p:cNvSpPr>
+            <a:spLocks noGrp="1"/>
+          </p:cNvSpPr>
+          <p:nvPr>
+            <p:ph idx="1"/>
+          </p:nvPr>
+        </p:nvSpPr>
+        <p:spPr/>
+        <p:txBody>
+          <a:bodyPr/>
+          <a:lstStyle/>
+          <a:p>
+            <a:r>
+              <a:rPr lang="en-US" dirty="0" smtClean="0"/>
+              <a:t>The mean of the boxplot animation  has a gradual shift to the left, indicating a lower mean age of the Men as the years of the race progress. </a:t>
+            </a:r>
+          </a:p>
+          <a:p>
+            <a:r>
+              <a:rPr lang="en-US" dirty="0" smtClean="0"/>
+              <a:t>The histogram rolls to the left at the same rate, validating our observation of the boxplot.</a:t>
+            </a:r>
+            <a:endParaRPr lang="en-US" dirty="0"/>
+          </a:p>
+        </p:txBody>
+      </p:sp>
+      <p:sp>
+        <p:nvSpPr>
+          <p:cNvPr id="4" name="Slide Number Placeholder 3"/>
+          <p:cNvSpPr>
+            <a:spLocks noGrp="1"/>
+          </p:cNvSpPr>
+          <p:nvPr>
+            <p:ph type="sldNum" sz="quarter" idx="12"/>
+          </p:nvPr>
+        </p:nvSpPr>
+        <p:spPr/>
+        <p:txBody>
+          <a:bodyPr/>
+          <a:lstStyle/>
+          <a:p>
+            <a:fld id="{7B7DB76D-28D5-4DAC-900A-A1330999554A}" type="slidenum">
+              <a:rPr lang="en-US" smtClean="0"/>
+              <a:t>11</a:t>
+            </a:fld>
+            <a:endParaRPr lang="en-US"/>
+          </a:p>
+        </p:txBody>
+      </p:sp>
+    </p:spTree>
+    <p:extLst>
+      <p:ext uri="{BB962C8B-B14F-4D97-AF65-F5344CB8AC3E}">
+        <p14:creationId xmlns:p14="http://schemas.microsoft.com/office/powerpoint/2010/main" val="2660268130"/>
+      </p:ext>
+    </p:extLst>
+  </p:cSld>
+  <p:clrMapOvr>
+    <a:masterClrMapping/>
+  </p:clrMapOvr>
+</p:sld>
+</file>
+
+<file path=ppt/slides/slide12.xml><?xml version="1.0" encoding="utf-8"?>
 <p:sld xmlns:a="http://schemas.openxmlformats.org/drawingml/2006/main" xmlns:r="http://schemas.openxmlformats.org/officeDocument/2006/relationships" xmlns:p="http://schemas.openxmlformats.org/presentationml/2006/main">
   <p:cSld>
     <p:spTree>
@@ -13484,7 +13455,7 @@
           <a:p>
             <a:fld id="{7B7DB76D-28D5-4DAC-900A-A1330999554A}" type="slidenum">
               <a:rPr lang="en-US" smtClean="0"/>
-              <a:t>13</a:t>
+              <a:t>12</a:t>
             </a:fld>
             <a:endParaRPr lang="en-US"/>
           </a:p>
@@ -13510,7 +13481,7 @@
 </p:sld>
 </file>
 
-<file path=ppt/slides/slide14.xml><?xml version="1.0" encoding="utf-8"?>
+<file path=ppt/slides/slide13.xml><?xml version="1.0" encoding="utf-8"?>
 <p:sld xmlns:a="http://schemas.openxmlformats.org/drawingml/2006/main" xmlns:r="http://schemas.openxmlformats.org/officeDocument/2006/relationships" xmlns:p="http://schemas.openxmlformats.org/presentationml/2006/main">
   <p:cSld>
     <p:spTree>
@@ -13537,7 +13508,12 @@
             <p:ph type="title"/>
           </p:nvPr>
         </p:nvSpPr>
-        <p:spPr/>
+        <p:spPr>
+          <a:xfrm>
+            <a:off x="1301262" y="270830"/>
+            <a:ext cx="5934508" cy="648049"/>
+          </a:xfrm>
+        </p:spPr>
         <p:txBody>
           <a:bodyPr/>
           <a:lstStyle/>
@@ -13575,7 +13551,7 @@
         </p:blipFill>
         <p:spPr bwMode="auto">
           <a:xfrm>
-            <a:off x="839788" y="2362994"/>
+            <a:off x="675244" y="1070652"/>
             <a:ext cx="5324981" cy="3370385"/>
           </a:xfrm>
           <a:prstGeom prst="rect">
@@ -13618,8 +13594,8 @@
         </p:nvSpPr>
         <p:spPr>
           <a:xfrm>
-            <a:off x="6729628" y="305426"/>
-            <a:ext cx="3932237" cy="3811588"/>
+            <a:off x="1301261" y="4794738"/>
+            <a:ext cx="8323385" cy="1853246"/>
           </a:xfrm>
         </p:spPr>
         <p:txBody>
@@ -13628,26 +13604,16 @@
           <a:p>
             <a:r>
               <a:rPr lang="en-US" dirty="0" smtClean="0"/>
-              <a:t>Boxplots</a:t>
-            </a:r>
+              <a:t>Boxplot distribution shows the average runner’s age decreases over the years</a:t>
+            </a:r>
+            <a:endParaRPr lang="en-US" dirty="0" smtClean="0"/>
           </a:p>
           <a:p>
             <a:r>
               <a:rPr lang="en-US" dirty="0" smtClean="0"/>
-              <a:t>Histograms</a:t>
-            </a:r>
-          </a:p>
-          <a:p>
-            <a:r>
-              <a:rPr lang="en-US" dirty="0" smtClean="0"/>
-              <a:t>Density Plot</a:t>
-            </a:r>
-          </a:p>
-          <a:p>
-            <a:r>
-              <a:rPr lang="en-US" dirty="0" smtClean="0"/>
-              <a:t>QQ Plot</a:t>
-            </a:r>
+              <a:t>Density Plots indicate a shift to the left, validating the boxplot pattern. Vertical line is stationed at mean for 1999 and ends to the right of the mean for 2009.</a:t>
+            </a:r>
+            <a:endParaRPr lang="en-US" dirty="0" smtClean="0"/>
           </a:p>
         </p:txBody>
       </p:sp>
@@ -13668,7 +13634,7 @@
           <a:p>
             <a:fld id="{7B7DB76D-28D5-4DAC-900A-A1330999554A}" type="slidenum">
               <a:rPr lang="en-US" smtClean="0"/>
-              <a:t>14</a:t>
+              <a:t>13</a:t>
             </a:fld>
             <a:endParaRPr lang="en-US"/>
           </a:p>
@@ -13697,7 +13663,7 @@
         </p:blipFill>
         <p:spPr bwMode="auto">
           <a:xfrm>
-            <a:off x="6478921" y="2211220"/>
+            <a:off x="6238578" y="918879"/>
             <a:ext cx="4808832" cy="3673932"/>
           </a:xfrm>
           <a:prstGeom prst="rect">
@@ -13728,6 +13694,77 @@
           </a:extLst>
         </p:spPr>
       </p:pic>
+      <p:cxnSp>
+        <p:nvCxnSpPr>
+          <p:cNvPr id="3" name="Straight Arrow Connector 2"/>
+          <p:cNvCxnSpPr/>
+          <p:nvPr/>
+        </p:nvCxnSpPr>
+        <p:spPr>
+          <a:xfrm>
+            <a:off x="1060919" y="2824673"/>
+            <a:ext cx="4700953" cy="326032"/>
+          </a:xfrm>
+          <a:prstGeom prst="straightConnector1">
+            <a:avLst/>
+          </a:prstGeom>
+          <a:ln w="28575">
+            <a:solidFill>
+              <a:srgbClr val="FF0000"/>
+            </a:solidFill>
+            <a:tailEnd type="triangle"/>
+          </a:ln>
+        </p:spPr>
+        <p:style>
+          <a:lnRef idx="1">
+            <a:schemeClr val="accent1"/>
+          </a:lnRef>
+          <a:fillRef idx="0">
+            <a:schemeClr val="accent1"/>
+          </a:fillRef>
+          <a:effectRef idx="0">
+            <a:schemeClr val="accent1"/>
+          </a:effectRef>
+          <a:fontRef idx="minor">
+            <a:schemeClr val="tx1"/>
+          </a:fontRef>
+        </p:style>
+      </p:cxnSp>
+      <p:cxnSp>
+        <p:nvCxnSpPr>
+          <p:cNvPr id="10" name="Straight Connector 9"/>
+          <p:cNvCxnSpPr/>
+          <p:nvPr/>
+        </p:nvCxnSpPr>
+        <p:spPr>
+          <a:xfrm flipH="1" flipV="1">
+            <a:off x="7045568" y="1488831"/>
+            <a:ext cx="0" cy="2672861"/>
+          </a:xfrm>
+          <a:prstGeom prst="line">
+            <a:avLst/>
+          </a:prstGeom>
+          <a:ln w="28575">
+            <a:solidFill>
+              <a:srgbClr val="FF0000"/>
+            </a:solidFill>
+          </a:ln>
+        </p:spPr>
+        <p:style>
+          <a:lnRef idx="1">
+            <a:schemeClr val="accent1"/>
+          </a:lnRef>
+          <a:fillRef idx="0">
+            <a:schemeClr val="accent1"/>
+          </a:fillRef>
+          <a:effectRef idx="0">
+            <a:schemeClr val="accent1"/>
+          </a:effectRef>
+          <a:fontRef idx="minor">
+            <a:schemeClr val="tx1"/>
+          </a:fontRef>
+        </p:style>
+      </p:cxnSp>
     </p:spTree>
     <p:extLst>
       <p:ext uri="{BB962C8B-B14F-4D97-AF65-F5344CB8AC3E}">
@@ -13748,7 +13785,7 @@
 </p:sld>
 </file>
 
-<file path=ppt/slides/slide15.xml><?xml version="1.0" encoding="utf-8"?>
+<file path=ppt/slides/slide14.xml><?xml version="1.0" encoding="utf-8"?>
 <p:sld xmlns:a="http://schemas.openxmlformats.org/drawingml/2006/main" xmlns:r="http://schemas.openxmlformats.org/officeDocument/2006/relationships" xmlns:p="http://schemas.openxmlformats.org/presentationml/2006/main">
   <p:cSld>
     <p:spTree>
@@ -13775,18 +13812,43 @@
             <p:ph type="title"/>
           </p:nvPr>
         </p:nvSpPr>
-        <p:spPr/>
+        <p:spPr>
+          <a:xfrm>
+            <a:off x="838200" y="501287"/>
+            <a:ext cx="5051965" cy="1478570"/>
+          </a:xfrm>
+        </p:spPr>
         <p:txBody>
           <a:bodyPr/>
           <a:lstStyle/>
           <a:p>
+            <a:pPr algn="r"/>
             <a:r>
               <a:rPr lang="en-US" dirty="0"/>
               <a:t>Men’s Runner Results </a:t>
             </a:r>
             <a:r>
               <a:rPr lang="en-US" dirty="0" smtClean="0"/>
-              <a:t>– Age (continued)</a:t>
+              <a:t>– </a:t>
+            </a:r>
+            <a:r>
+              <a:rPr lang="en-US" dirty="0" smtClean="0"/>
+              <a:t/>
+            </a:r>
+            <a:br>
+              <a:rPr lang="en-US" dirty="0" smtClean="0"/>
+            </a:br>
+            <a:r>
+              <a:rPr lang="en-US" dirty="0"/>
+              <a:t>	</a:t>
+            </a:r>
+            <a:r>
+              <a:rPr lang="en-US" dirty="0" smtClean="0"/>
+              <a:t>Age </a:t>
+            </a:r>
+            <a:r>
+              <a:rPr lang="en-US" dirty="0" smtClean="0"/>
+              <a:t>(continued)</a:t>
             </a:r>
             <a:endParaRPr lang="en-US" dirty="0"/>
           </a:p>
@@ -13809,7 +13871,7 @@
           <a:p>
             <a:fld id="{7B7DB76D-28D5-4DAC-900A-A1330999554A}" type="slidenum">
               <a:rPr lang="en-US" smtClean="0"/>
-              <a:t>15</a:t>
+              <a:t>14</a:t>
             </a:fld>
             <a:endParaRPr lang="en-US"/>
           </a:p>
@@ -13838,7 +13900,7 @@
         </p:blipFill>
         <p:spPr bwMode="auto">
           <a:xfrm>
-            <a:off x="838200" y="2123159"/>
+            <a:off x="838200" y="2968501"/>
             <a:ext cx="5503303" cy="3800719"/>
           </a:xfrm>
           <a:prstGeom prst="rect">
@@ -13892,8 +13954,8 @@
         </p:blipFill>
         <p:spPr bwMode="auto">
           <a:xfrm>
-            <a:off x="6372364" y="2198299"/>
-            <a:ext cx="4476471" cy="3650439"/>
+            <a:off x="6869723" y="230821"/>
+            <a:ext cx="4560276" cy="3718779"/>
           </a:xfrm>
           <a:prstGeom prst="rect">
             <a:avLst/>
@@ -13923,6 +13985,67 @@
           </a:extLst>
         </p:spPr>
       </p:pic>
+      <p:sp>
+        <p:nvSpPr>
+          <p:cNvPr id="3" name="TextBox 2"/>
+          <p:cNvSpPr txBox="1"/>
+          <p:nvPr/>
+        </p:nvSpPr>
+        <p:spPr>
+          <a:xfrm>
+            <a:off x="838200" y="2081989"/>
+            <a:ext cx="5503303" cy="646331"/>
+          </a:xfrm>
+          <a:prstGeom prst="rect">
+            <a:avLst/>
+          </a:prstGeom>
+          <a:noFill/>
+        </p:spPr>
+        <p:txBody>
+          <a:bodyPr wrap="square" rtlCol="0">
+            <a:spAutoFit/>
+          </a:bodyPr>
+          <a:lstStyle/>
+          <a:p>
+            <a:pPr algn="ctr"/>
+            <a:r>
+              <a:rPr lang="en-US" dirty="0" smtClean="0"/>
+              <a:t>The histograms of the ages are relatively normal year over year</a:t>
+            </a:r>
+            <a:endParaRPr lang="en-US" dirty="0"/>
+          </a:p>
+        </p:txBody>
+      </p:sp>
+      <p:sp>
+        <p:nvSpPr>
+          <p:cNvPr id="7" name="TextBox 6"/>
+          <p:cNvSpPr txBox="1"/>
+          <p:nvPr/>
+        </p:nvSpPr>
+        <p:spPr>
+          <a:xfrm>
+            <a:off x="6869723" y="4032738"/>
+            <a:ext cx="4560276" cy="1200329"/>
+          </a:xfrm>
+          <a:prstGeom prst="rect">
+            <a:avLst/>
+          </a:prstGeom>
+          <a:noFill/>
+        </p:spPr>
+        <p:txBody>
+          <a:bodyPr wrap="square" rtlCol="0">
+            <a:spAutoFit/>
+          </a:bodyPr>
+          <a:lstStyle/>
+          <a:p>
+            <a:r>
+              <a:rPr lang="en-US" dirty="0" smtClean="0"/>
+              <a:t>QQ plots for each year also show a relatively flat line, indicating no true need for transformation of the data before proceeding. This data is normal! </a:t>
+            </a:r>
+            <a:endParaRPr lang="en-US" dirty="0"/>
+          </a:p>
+        </p:txBody>
+      </p:sp>
     </p:spTree>
     <p:extLst>
       <p:ext uri="{BB962C8B-B14F-4D97-AF65-F5344CB8AC3E}">
@@ -13936,7 +14059,7 @@
 </p:sld>
 </file>
 
-<file path=ppt/slides/slide16.xml><?xml version="1.0" encoding="utf-8"?>
+<file path=ppt/slides/slide15.xml><?xml version="1.0" encoding="utf-8"?>
 <p:sld xmlns:a="http://schemas.openxmlformats.org/drawingml/2006/main" xmlns:r="http://schemas.openxmlformats.org/officeDocument/2006/relationships" xmlns:p="http://schemas.openxmlformats.org/presentationml/2006/main">
   <p:cSld>
     <p:spTree>
@@ -13963,7 +14086,12 @@
             <p:ph type="title"/>
           </p:nvPr>
         </p:nvSpPr>
-        <p:spPr/>
+        <p:spPr>
+          <a:xfrm>
+            <a:off x="1141410" y="671824"/>
+            <a:ext cx="5934508" cy="690317"/>
+          </a:xfrm>
+        </p:spPr>
         <p:txBody>
           <a:bodyPr/>
           <a:lstStyle/>
@@ -13994,38 +14122,28 @@
             <p:ph type="body" sz="half" idx="2"/>
           </p:nvPr>
         </p:nvSpPr>
-        <p:spPr/>
+        <p:spPr>
+          <a:xfrm>
+            <a:off x="754548" y="1897701"/>
+            <a:ext cx="5934511" cy="3541714"/>
+          </a:xfrm>
+        </p:spPr>
         <p:txBody>
           <a:bodyPr/>
           <a:lstStyle/>
           <a:p>
             <a:r>
               <a:rPr lang="en-US" dirty="0" smtClean="0"/>
-              <a:t>Boxplot by Year</a:t>
-            </a:r>
+              <a:t>When compared side by side, the boxplot distribution at the top show an increase in average run times over the course of the 14 years. </a:t>
+            </a:r>
+          </a:p>
+          <a:p>
+            <a:endParaRPr lang="en-US" dirty="0" smtClean="0"/>
           </a:p>
           <a:p>
             <a:r>
               <a:rPr lang="en-US" dirty="0" smtClean="0"/>
-              <a:t>Boxplot by Age/Year</a:t>
-            </a:r>
-          </a:p>
-          <a:p>
-            <a:r>
-              <a:rPr lang="en-US" dirty="0" smtClean="0"/>
-              <a:t>Histogram</a:t>
-            </a:r>
-          </a:p>
-          <a:p>
-            <a:r>
-              <a:rPr lang="en-US" dirty="0" smtClean="0"/>
-              <a:t>Density plot</a:t>
-            </a:r>
-          </a:p>
-          <a:p>
-            <a:r>
-              <a:rPr lang="en-US" dirty="0" smtClean="0"/>
-              <a:t>QQ plot</a:t>
+              <a:t>The gradual increase in run times paired with the gradual decrease in age for the runners lead us to believe there were more serious, professional runners in 1999 than there were in 2012. </a:t>
             </a:r>
             <a:endParaRPr lang="en-US" dirty="0"/>
           </a:p>
@@ -14048,7 +14166,7 @@
           <a:p>
             <a:fld id="{7B7DB76D-28D5-4DAC-900A-A1330999554A}" type="slidenum">
               <a:rPr lang="en-US" smtClean="0"/>
-              <a:t>16</a:t>
+              <a:t>15</a:t>
             </a:fld>
             <a:endParaRPr lang="en-US"/>
           </a:p>
@@ -14175,7 +14293,7 @@
 </p:sld>
 </file>
 
-<file path=ppt/slides/slide17.xml><?xml version="1.0" encoding="utf-8"?>
+<file path=ppt/slides/slide16.xml><?xml version="1.0" encoding="utf-8"?>
 <p:sld xmlns:a="http://schemas.openxmlformats.org/drawingml/2006/main" xmlns:r="http://schemas.openxmlformats.org/officeDocument/2006/relationships" xmlns:p="http://schemas.openxmlformats.org/presentationml/2006/main">
   <p:cSld>
     <p:spTree>
@@ -14208,12 +14326,179 @@
           <a:lstStyle/>
           <a:p>
             <a:r>
+              <a:rPr lang="en-US" dirty="0" smtClean="0"/>
+              <a:t>How run times vary by year</a:t>
+            </a:r>
+            <a:endParaRPr lang="en-US" dirty="0"/>
+          </a:p>
+        </p:txBody>
+      </p:sp>
+      <p:pic>
+        <p:nvPicPr>
+          <p:cNvPr id="5" name="Content Placeholder 4"/>
+          <p:cNvPicPr>
+            <a:picLocks noGrp="1" noChangeAspect="1"/>
+          </p:cNvPicPr>
+          <p:nvPr>
+            <p:ph idx="1"/>
+          </p:nvPr>
+        </p:nvPicPr>
+        <p:blipFill>
+          <a:blip r:embed="rId3">
+            <a:extLst>
+              <a:ext uri="{28A0092B-C50C-407E-A947-70E740481C1C}">
+                <a14:useLocalDpi xmlns:a14="http://schemas.microsoft.com/office/drawing/2010/main" val="0"/>
+              </a:ext>
+            </a:extLst>
+          </a:blip>
+          <a:stretch>
+            <a:fillRect/>
+          </a:stretch>
+        </p:blipFill>
+        <p:spPr>
+          <a:xfrm>
+            <a:off x="4958760" y="1862259"/>
+            <a:ext cx="5842127" cy="4021015"/>
+          </a:xfrm>
+        </p:spPr>
+      </p:pic>
+      <p:sp>
+        <p:nvSpPr>
+          <p:cNvPr id="4" name="Slide Number Placeholder 3"/>
+          <p:cNvSpPr>
+            <a:spLocks noGrp="1"/>
+          </p:cNvSpPr>
+          <p:nvPr>
+            <p:ph type="sldNum" sz="quarter" idx="12"/>
+          </p:nvPr>
+        </p:nvSpPr>
+        <p:spPr/>
+        <p:txBody>
+          <a:bodyPr/>
+          <a:lstStyle/>
+          <a:p>
+            <a:fld id="{7B7DB76D-28D5-4DAC-900A-A1330999554A}" type="slidenum">
+              <a:rPr lang="en-US" smtClean="0"/>
+              <a:t>16</a:t>
+            </a:fld>
+            <a:endParaRPr lang="en-US"/>
+          </a:p>
+        </p:txBody>
+      </p:sp>
+      <p:sp>
+        <p:nvSpPr>
+          <p:cNvPr id="3" name="TextBox 2"/>
+          <p:cNvSpPr txBox="1"/>
+          <p:nvPr/>
+        </p:nvSpPr>
+        <p:spPr>
+          <a:xfrm>
+            <a:off x="1324708" y="1770185"/>
+            <a:ext cx="3458307" cy="2031325"/>
+          </a:xfrm>
+          <a:prstGeom prst="rect">
+            <a:avLst/>
+          </a:prstGeom>
+          <a:noFill/>
+        </p:spPr>
+        <p:txBody>
+          <a:bodyPr wrap="square" rtlCol="0">
+            <a:spAutoFit/>
+          </a:bodyPr>
+          <a:lstStyle/>
+          <a:p>
+            <a:r>
+              <a:rPr lang="en-US" dirty="0" smtClean="0"/>
+              <a:t>With this violin plot, we see the average run time gradually increasing over time. </a:t>
+            </a:r>
+          </a:p>
+          <a:p>
+            <a:endParaRPr lang="en-US" dirty="0"/>
+          </a:p>
+          <a:p>
+            <a:r>
+              <a:rPr lang="en-US" dirty="0" smtClean="0"/>
+              <a:t>The most dramatic shift is when the animation returns to 1999 from 2012.</a:t>
+            </a:r>
+            <a:endParaRPr lang="en-US" dirty="0"/>
+          </a:p>
+        </p:txBody>
+      </p:sp>
+    </p:spTree>
+    <p:extLst>
+      <p:ext uri="{BB962C8B-B14F-4D97-AF65-F5344CB8AC3E}">
+        <p14:creationId xmlns:p14="http://schemas.microsoft.com/office/powerpoint/2010/main" val="2807468785"/>
+      </p:ext>
+    </p:extLst>
+  </p:cSld>
+  <p:clrMapOvr>
+    <a:masterClrMapping/>
+  </p:clrMapOvr>
+  <p:timing>
+    <p:tnLst>
+      <p:par>
+        <p:cTn id="1" dur="indefinite" restart="never" nodeType="tmRoot"/>
+      </p:par>
+    </p:tnLst>
+  </p:timing>
+</p:sld>
+</file>
+
+<file path=ppt/slides/slide17.xml><?xml version="1.0" encoding="utf-8"?>
+<p:sld xmlns:a="http://schemas.openxmlformats.org/drawingml/2006/main" xmlns:r="http://schemas.openxmlformats.org/officeDocument/2006/relationships" xmlns:p="http://schemas.openxmlformats.org/presentationml/2006/main">
+  <p:cSld>
+    <p:spTree>
+      <p:nvGrpSpPr>
+        <p:cNvPr id="1" name=""/>
+        <p:cNvGrpSpPr/>
+        <p:nvPr/>
+      </p:nvGrpSpPr>
+      <p:grpSpPr>
+        <a:xfrm>
+          <a:off x="0" y="0"/>
+          <a:ext cx="0" cy="0"/>
+          <a:chOff x="0" y="0"/>
+          <a:chExt cx="0" cy="0"/>
+        </a:xfrm>
+      </p:grpSpPr>
+      <p:sp>
+        <p:nvSpPr>
+          <p:cNvPr id="2" name="Title 1"/>
+          <p:cNvSpPr>
+            <a:spLocks noGrp="1"/>
+          </p:cNvSpPr>
+          <p:nvPr>
+            <p:ph type="title"/>
+          </p:nvPr>
+        </p:nvSpPr>
+        <p:spPr>
+          <a:xfrm>
+            <a:off x="1141413" y="618518"/>
+            <a:ext cx="4954587" cy="1478570"/>
+          </a:xfrm>
+        </p:spPr>
+        <p:txBody>
+          <a:bodyPr/>
+          <a:lstStyle/>
+          <a:p>
+            <a:r>
               <a:rPr lang="en-US" dirty="0"/>
               <a:t>Men’s Runner Results </a:t>
             </a:r>
             <a:r>
               <a:rPr lang="en-US" dirty="0" smtClean="0"/>
-              <a:t>– Time (continued)</a:t>
+              <a:t/>
+            </a:r>
+            <a:br>
+              <a:rPr lang="en-US" dirty="0" smtClean="0"/>
+            </a:br>
+            <a:r>
+              <a:rPr lang="en-US" dirty="0" smtClean="0"/>
+              <a:t>– </a:t>
+            </a:r>
+            <a:r>
+              <a:rPr lang="en-US" dirty="0" smtClean="0"/>
+              <a:t>Time (continued)</a:t>
             </a:r>
             <a:endParaRPr lang="en-US" dirty="0"/>
           </a:p>
@@ -14265,62 +14550,8 @@
         </p:blipFill>
         <p:spPr bwMode="auto">
           <a:xfrm>
-            <a:off x="4369013" y="2237355"/>
-            <a:ext cx="3362670" cy="2850615"/>
-          </a:xfrm>
-          <a:prstGeom prst="rect">
-            <a:avLst/>
-          </a:prstGeom>
-          <a:noFill/>
-          <a:ln>
-            <a:noFill/>
-          </a:ln>
-          <a:extLst>
-            <a:ext uri="{909E8E84-426E-40DD-AFC4-6F175D3DCCD1}">
-              <a14:hiddenFill xmlns:a14="http://schemas.microsoft.com/office/drawing/2010/main">
-                <a:solidFill>
-                  <a:schemeClr val="accent1"/>
-                </a:solidFill>
-              </a14:hiddenFill>
-            </a:ext>
-            <a:ext uri="{91240B29-F687-4F45-9708-019B960494DF}">
-              <a14:hiddenLine xmlns:a14="http://schemas.microsoft.com/office/drawing/2010/main" w="9525">
-                <a:solidFill>
-                  <a:schemeClr val="tx1"/>
-                </a:solidFill>
-                <a:miter lim="800000"/>
-                <a:headEnd/>
-                <a:tailEnd/>
-              </a14:hiddenLine>
-            </a:ext>
-          </a:extLst>
-        </p:spPr>
-      </p:pic>
-      <p:pic>
-        <p:nvPicPr>
-          <p:cNvPr id="6" name="Picture 5"/>
-          <p:cNvPicPr>
-            <a:picLocks noChangeAspect="1" noChangeArrowheads="1"/>
-          </p:cNvPicPr>
-          <p:nvPr/>
-        </p:nvPicPr>
-        <p:blipFill>
-          <a:blip r:embed="rId3">
-            <a:extLst>
-              <a:ext uri="{28A0092B-C50C-407E-A947-70E740481C1C}">
-                <a14:useLocalDpi xmlns:a14="http://schemas.microsoft.com/office/drawing/2010/main" val="0"/>
-              </a:ext>
-            </a:extLst>
-          </a:blip>
-          <a:srcRect/>
-          <a:stretch>
-            <a:fillRect/>
-          </a:stretch>
-        </p:blipFill>
-        <p:spPr bwMode="auto">
-          <a:xfrm>
-            <a:off x="8132526" y="2097088"/>
-            <a:ext cx="3473823" cy="3131148"/>
+            <a:off x="6465780" y="3397784"/>
+            <a:ext cx="4021028" cy="3408721"/>
           </a:xfrm>
           <a:prstGeom prst="rect">
             <a:avLst/>
@@ -14359,7 +14590,7 @@
           <p:nvPr/>
         </p:nvPicPr>
         <p:blipFill>
-          <a:blip r:embed="rId4" cstate="print">
+          <a:blip r:embed="rId3" cstate="print">
             <a:extLst>
               <a:ext uri="{28A0092B-C50C-407E-A947-70E740481C1C}">
                 <a14:useLocalDpi xmlns:a14="http://schemas.microsoft.com/office/drawing/2010/main" val="0"/>
@@ -14373,8 +14604,103 @@
         </p:blipFill>
         <p:spPr bwMode="auto">
           <a:xfrm>
-            <a:off x="252549" y="2237354"/>
-            <a:ext cx="3715620" cy="2850616"/>
+            <a:off x="6465780" y="185815"/>
+            <a:ext cx="4021028" cy="3084924"/>
+          </a:xfrm>
+          <a:prstGeom prst="rect">
+            <a:avLst/>
+          </a:prstGeom>
+          <a:noFill/>
+          <a:ln>
+            <a:noFill/>
+          </a:ln>
+          <a:extLst>
+            <a:ext uri="{909E8E84-426E-40DD-AFC4-6F175D3DCCD1}">
+              <a14:hiddenFill xmlns:a14="http://schemas.microsoft.com/office/drawing/2010/main">
+                <a:solidFill>
+                  <a:schemeClr val="accent1"/>
+                </a:solidFill>
+              </a14:hiddenFill>
+            </a:ext>
+            <a:ext uri="{91240B29-F687-4F45-9708-019B960494DF}">
+              <a14:hiddenLine xmlns:a14="http://schemas.microsoft.com/office/drawing/2010/main" w="9525">
+                <a:solidFill>
+                  <a:schemeClr val="tx1"/>
+                </a:solidFill>
+                <a:miter lim="800000"/>
+                <a:headEnd/>
+                <a:tailEnd/>
+              </a14:hiddenLine>
+            </a:ext>
+          </a:extLst>
+        </p:spPr>
+      </p:pic>
+      <p:sp>
+        <p:nvSpPr>
+          <p:cNvPr id="3" name="TextBox 2"/>
+          <p:cNvSpPr txBox="1"/>
+          <p:nvPr/>
+        </p:nvSpPr>
+        <p:spPr>
+          <a:xfrm>
+            <a:off x="199291" y="2097088"/>
+            <a:ext cx="6013939" cy="1200329"/>
+          </a:xfrm>
+          <a:prstGeom prst="rect">
+            <a:avLst/>
+          </a:prstGeom>
+          <a:noFill/>
+        </p:spPr>
+        <p:txBody>
+          <a:bodyPr wrap="square" rtlCol="0">
+            <a:spAutoFit/>
+          </a:bodyPr>
+          <a:lstStyle/>
+          <a:p>
+            <a:r>
+              <a:rPr lang="en-US" dirty="0" smtClean="0"/>
+              <a:t>Looking at the QQ plots for the average run time year over year, we see this data is relatively normal as well. </a:t>
+            </a:r>
+          </a:p>
+          <a:p>
+            <a:endParaRPr lang="en-US" dirty="0" smtClean="0"/>
+          </a:p>
+          <a:p>
+            <a:r>
+              <a:rPr lang="en-US" dirty="0" smtClean="0"/>
+              <a:t>This can also be seen with the matrix of histograms. </a:t>
+            </a:r>
+            <a:endParaRPr lang="en-US" dirty="0"/>
+          </a:p>
+        </p:txBody>
+      </p:sp>
+      <p:pic>
+        <p:nvPicPr>
+          <p:cNvPr id="8" name="Content Placeholder 4"/>
+          <p:cNvPicPr>
+            <a:picLocks noGrp="1" noChangeAspect="1" noChangeArrowheads="1"/>
+          </p:cNvPicPr>
+          <p:nvPr>
+            <p:ph idx="1"/>
+          </p:nvPr>
+        </p:nvPicPr>
+        <p:blipFill>
+          <a:blip r:embed="rId4">
+            <a:extLst>
+              <a:ext uri="{28A0092B-C50C-407E-A947-70E740481C1C}">
+                <a14:useLocalDpi xmlns:a14="http://schemas.microsoft.com/office/drawing/2010/main" val="0"/>
+              </a:ext>
+            </a:extLst>
+          </a:blip>
+          <a:srcRect/>
+          <a:stretch>
+            <a:fillRect/>
+          </a:stretch>
+        </p:blipFill>
+        <p:spPr bwMode="auto">
+          <a:xfrm>
+            <a:off x="1505072" y="3397784"/>
+            <a:ext cx="4577319" cy="3362812"/>
           </a:xfrm>
           <a:prstGeom prst="rect">
             <a:avLst/>
@@ -14414,6 +14740,13 @@
   <p:clrMapOvr>
     <a:masterClrMapping/>
   </p:clrMapOvr>
+  <p:timing>
+    <p:tnLst>
+      <p:par>
+        <p:cTn id="1" dur="indefinite" restart="never" nodeType="tmRoot"/>
+      </p:par>
+    </p:tnLst>
+  </p:timing>
 </p:sld>
 </file>
 
@@ -14857,6 +15190,13 @@
   <p:clrMapOvr>
     <a:masterClrMapping/>
   </p:clrMapOvr>
+  <p:timing>
+    <p:tnLst>
+      <p:par>
+        <p:cTn id="1" dur="indefinite" restart="never" nodeType="tmRoot"/>
+      </p:par>
+    </p:tnLst>
+  </p:timing>
 </p:sld>
 </file>
 
@@ -14925,7 +15265,7 @@
         </p:blipFill>
         <p:spPr bwMode="auto">
           <a:xfrm>
-            <a:off x="4744635" y="3399700"/>
+            <a:off x="3961866" y="3425941"/>
             <a:ext cx="3179576" cy="2221941"/>
           </a:xfrm>
           <a:prstGeom prst="rect">
@@ -15090,6 +15430,13 @@
   <p:clrMapOvr>
     <a:masterClrMapping/>
   </p:clrMapOvr>
+  <p:timing>
+    <p:tnLst>
+      <p:par>
+        <p:cTn id="1" dur="indefinite" restart="never" nodeType="tmRoot"/>
+      </p:par>
+    </p:tnLst>
+  </p:timing>
 </p:sld>
 </file>
 
@@ -15340,6 +15687,13 @@
   <p:clrMapOvr>
     <a:masterClrMapping/>
   </p:clrMapOvr>
+  <p:timing>
+    <p:tnLst>
+      <p:par>
+        <p:cTn id="1" dur="indefinite" restart="never" nodeType="tmRoot"/>
+      </p:par>
+    </p:tnLst>
+  </p:timing>
 </p:sld>
 </file>
 
@@ -15515,6 +15869,13 @@
   <p:clrMapOvr>
     <a:masterClrMapping/>
   </p:clrMapOvr>
+  <p:timing>
+    <p:tnLst>
+      <p:par>
+        <p:cTn id="1" dur="indefinite" restart="never" nodeType="tmRoot"/>
+      </p:par>
+    </p:tnLst>
+  </p:timing>
 </p:sld>
 </file>
 
@@ -19078,59 +19439,6 @@
       </p:grpSpPr>
       <p:sp>
         <p:nvSpPr>
-          <p:cNvPr id="4" name="Slide Number Placeholder 3"/>
-          <p:cNvSpPr>
-            <a:spLocks noGrp="1"/>
-          </p:cNvSpPr>
-          <p:nvPr>
-            <p:ph type="sldNum" sz="quarter" idx="12"/>
-          </p:nvPr>
-        </p:nvSpPr>
-        <p:spPr/>
-        <p:txBody>
-          <a:bodyPr/>
-          <a:lstStyle/>
-          <a:p>
-            <a:fld id="{7B7DB76D-28D5-4DAC-900A-A1330999554A}" type="slidenum">
-              <a:rPr lang="en-US" smtClean="0"/>
-              <a:t>6</a:t>
-            </a:fld>
-            <a:endParaRPr lang="en-US"/>
-          </a:p>
-        </p:txBody>
-      </p:sp>
-    </p:spTree>
-    <p:extLst>
-      <p:ext uri="{BB962C8B-B14F-4D97-AF65-F5344CB8AC3E}">
-        <p14:creationId xmlns:p14="http://schemas.microsoft.com/office/powerpoint/2010/main" val="3643836349"/>
-      </p:ext>
-    </p:extLst>
-  </p:cSld>
-  <p:clrMapOvr>
-    <a:masterClrMapping/>
-  </p:clrMapOvr>
-</p:sld>
-</file>
-
-<file path=ppt/slides/slide7.xml><?xml version="1.0" encoding="utf-8"?>
-<p:sld xmlns:a="http://schemas.openxmlformats.org/drawingml/2006/main" xmlns:r="http://schemas.openxmlformats.org/officeDocument/2006/relationships" xmlns:p="http://schemas.openxmlformats.org/presentationml/2006/main">
-  <p:cSld>
-    <p:spTree>
-      <p:nvGrpSpPr>
-        <p:cNvPr id="1" name=""/>
-        <p:cNvGrpSpPr/>
-        <p:nvPr/>
-      </p:nvGrpSpPr>
-      <p:grpSpPr>
-        <a:xfrm>
-          <a:off x="0" y="0"/>
-          <a:ext cx="0" cy="0"/>
-          <a:chOff x="0" y="0"/>
-          <a:chExt cx="0" cy="0"/>
-        </a:xfrm>
-      </p:grpSpPr>
-      <p:sp>
-        <p:nvSpPr>
           <p:cNvPr id="2" name="Title 1"/>
           <p:cNvSpPr>
             <a:spLocks noGrp="1"/>
@@ -19242,7 +19550,7 @@
           <a:p>
             <a:fld id="{7B7DB76D-28D5-4DAC-900A-A1330999554A}" type="slidenum">
               <a:rPr lang="en-US" smtClean="0"/>
-              <a:t>7</a:t>
+              <a:t>6</a:t>
             </a:fld>
             <a:endParaRPr lang="en-US"/>
           </a:p>
@@ -19333,7 +19641,7 @@
 </p:sld>
 </file>
 
-<file path=ppt/slides/slide8.xml><?xml version="1.0" encoding="utf-8"?>
+<file path=ppt/slides/slide7.xml><?xml version="1.0" encoding="utf-8"?>
 <p:sld xmlns:a="http://schemas.openxmlformats.org/drawingml/2006/main" xmlns:r="http://schemas.openxmlformats.org/officeDocument/2006/relationships" xmlns:p="http://schemas.openxmlformats.org/presentationml/2006/main">
   <p:cSld>
     <p:spTree>
@@ -19466,7 +19774,7 @@
               <a:pPr>
                 <a:defRPr/>
               </a:pPr>
-              <a:t>8</a:t>
+              <a:t>7</a:t>
             </a:fld>
             <a:endParaRPr lang="en-US"/>
           </a:p>
@@ -19476,6 +19784,185 @@
     <p:extLst>
       <p:ext uri="{BB962C8B-B14F-4D97-AF65-F5344CB8AC3E}">
         <p14:creationId xmlns:p14="http://schemas.microsoft.com/office/powerpoint/2010/main" val="1520420049"/>
+      </p:ext>
+    </p:extLst>
+  </p:cSld>
+  <p:clrMapOvr>
+    <a:masterClrMapping/>
+  </p:clrMapOvr>
+</p:sld>
+</file>
+
+<file path=ppt/slides/slide8.xml><?xml version="1.0" encoding="utf-8"?>
+<p:sld xmlns:a="http://schemas.openxmlformats.org/drawingml/2006/main" xmlns:r="http://schemas.openxmlformats.org/officeDocument/2006/relationships" xmlns:p="http://schemas.openxmlformats.org/presentationml/2006/main">
+  <p:cSld>
+    <p:spTree>
+      <p:nvGrpSpPr>
+        <p:cNvPr id="1" name=""/>
+        <p:cNvGrpSpPr/>
+        <p:nvPr/>
+      </p:nvGrpSpPr>
+      <p:grpSpPr>
+        <a:xfrm>
+          <a:off x="0" y="0"/>
+          <a:ext cx="0" cy="0"/>
+          <a:chOff x="0" y="0"/>
+          <a:chExt cx="0" cy="0"/>
+        </a:xfrm>
+      </p:grpSpPr>
+      <p:sp>
+        <p:nvSpPr>
+          <p:cNvPr id="2" name="Title 1"/>
+          <p:cNvSpPr>
+            <a:spLocks noGrp="1"/>
+          </p:cNvSpPr>
+          <p:nvPr>
+            <p:ph type="title"/>
+          </p:nvPr>
+        </p:nvSpPr>
+        <p:spPr/>
+        <p:txBody>
+          <a:bodyPr/>
+          <a:lstStyle/>
+          <a:p>
+            <a:r>
+              <a:rPr lang="en-US" dirty="0" smtClean="0"/>
+              <a:t>Processing and Cleaning the Data</a:t>
+            </a:r>
+            <a:endParaRPr lang="en-US" dirty="0"/>
+          </a:p>
+        </p:txBody>
+      </p:sp>
+      <p:sp>
+        <p:nvSpPr>
+          <p:cNvPr id="3" name="Content Placeholder 2"/>
+          <p:cNvSpPr>
+            <a:spLocks noGrp="1"/>
+          </p:cNvSpPr>
+          <p:nvPr>
+            <p:ph idx="1"/>
+          </p:nvPr>
+        </p:nvSpPr>
+        <p:spPr/>
+        <p:txBody>
+          <a:bodyPr>
+            <a:normAutofit fontScale="92500" lnSpcReduction="20000"/>
+          </a:bodyPr>
+          <a:lstStyle/>
+          <a:p>
+            <a:r>
+              <a:rPr lang="en-US" dirty="0" smtClean="0"/>
+              <a:t>Determine Important  Features</a:t>
+            </a:r>
+          </a:p>
+          <a:p>
+            <a:pPr lvl="1"/>
+            <a:r>
+              <a:rPr lang="en-US" dirty="0" smtClean="0"/>
+              <a:t>Age</a:t>
+            </a:r>
+          </a:p>
+          <a:p>
+            <a:pPr lvl="1"/>
+            <a:r>
+              <a:rPr lang="en-US" dirty="0" smtClean="0"/>
+              <a:t>Time</a:t>
+            </a:r>
+          </a:p>
+          <a:p>
+            <a:pPr lvl="1"/>
+            <a:r>
+              <a:rPr lang="en-US" dirty="0" smtClean="0"/>
+              <a:t>Year</a:t>
+            </a:r>
+          </a:p>
+          <a:p>
+            <a:r>
+              <a:rPr lang="en-US" dirty="0" smtClean="0"/>
+              <a:t>Investigate outliers </a:t>
+            </a:r>
+          </a:p>
+          <a:p>
+            <a:pPr lvl="1"/>
+            <a:r>
+              <a:rPr lang="en-US" dirty="0" smtClean="0"/>
+              <a:t>Age</a:t>
+            </a:r>
+          </a:p>
+          <a:p>
+            <a:pPr lvl="1"/>
+            <a:r>
+              <a:rPr lang="en-US" dirty="0" smtClean="0"/>
+              <a:t>Time</a:t>
+            </a:r>
+          </a:p>
+          <a:p>
+            <a:r>
+              <a:rPr lang="en-US" dirty="0" smtClean="0"/>
+              <a:t>Data Wrangling</a:t>
+            </a:r>
+          </a:p>
+          <a:p>
+            <a:pPr lvl="1"/>
+            <a:r>
+              <a:rPr lang="en-US" dirty="0" smtClean="0"/>
+              <a:t>Age-Group</a:t>
+            </a:r>
+            <a:endParaRPr lang="en-US" dirty="0"/>
+          </a:p>
+        </p:txBody>
+      </p:sp>
+      <p:sp>
+        <p:nvSpPr>
+          <p:cNvPr id="4" name="Slide Number Placeholder 3"/>
+          <p:cNvSpPr>
+            <a:spLocks noGrp="1"/>
+          </p:cNvSpPr>
+          <p:nvPr>
+            <p:ph type="sldNum" sz="quarter" idx="12"/>
+          </p:nvPr>
+        </p:nvSpPr>
+        <p:spPr/>
+        <p:txBody>
+          <a:bodyPr/>
+          <a:lstStyle/>
+          <a:p>
+            <a:fld id="{7B7DB76D-28D5-4DAC-900A-A1330999554A}" type="slidenum">
+              <a:rPr lang="en-US" smtClean="0"/>
+              <a:t>8</a:t>
+            </a:fld>
+            <a:endParaRPr lang="en-US"/>
+          </a:p>
+        </p:txBody>
+      </p:sp>
+      <p:pic>
+        <p:nvPicPr>
+          <p:cNvPr id="5" name="Picture 4"/>
+          <p:cNvPicPr>
+            <a:picLocks noChangeAspect="1"/>
+          </p:cNvPicPr>
+          <p:nvPr/>
+        </p:nvPicPr>
+        <p:blipFill>
+          <a:blip r:embed="rId2"/>
+          <a:stretch>
+            <a:fillRect/>
+          </a:stretch>
+        </p:blipFill>
+        <p:spPr>
+          <a:xfrm>
+            <a:off x="5670764" y="2249487"/>
+            <a:ext cx="6060165" cy="1619128"/>
+          </a:xfrm>
+          <a:prstGeom prst="rect">
+            <a:avLst/>
+          </a:prstGeom>
+        </p:spPr>
+      </p:pic>
+    </p:spTree>
+    <p:extLst>
+      <p:ext uri="{BB962C8B-B14F-4D97-AF65-F5344CB8AC3E}">
+        <p14:creationId xmlns:p14="http://schemas.microsoft.com/office/powerpoint/2010/main" val="2405364122"/>
       </p:ext>
     </p:extLst>
   </p:cSld>
@@ -19519,7 +20006,7 @@
           <a:p>
             <a:r>
               <a:rPr lang="en-US" dirty="0" smtClean="0"/>
-              <a:t>Processing and Cleaning the Data</a:t>
+              <a:t>Exploratory</a:t>
             </a:r>
             <a:endParaRPr lang="en-US" dirty="0"/>
           </a:p>
@@ -19537,68 +20024,12 @@
         </p:nvSpPr>
         <p:spPr/>
         <p:txBody>
-          <a:bodyPr>
-            <a:normAutofit fontScale="92500" lnSpcReduction="20000"/>
-          </a:bodyPr>
+          <a:bodyPr/>
           <a:lstStyle/>
           <a:p>
             <a:r>
               <a:rPr lang="en-US" dirty="0" smtClean="0"/>
-              <a:t>Determine Important  Features</a:t>
-            </a:r>
-          </a:p>
-          <a:p>
-            <a:pPr lvl="1"/>
-            <a:r>
-              <a:rPr lang="en-US" dirty="0" smtClean="0"/>
-              <a:t>Age</a:t>
-            </a:r>
-          </a:p>
-          <a:p>
-            <a:pPr lvl="1"/>
-            <a:r>
-              <a:rPr lang="en-US" dirty="0" smtClean="0"/>
-              <a:t>Time</a:t>
-            </a:r>
-          </a:p>
-          <a:p>
-            <a:pPr lvl="1"/>
-            <a:r>
-              <a:rPr lang="en-US" dirty="0" smtClean="0"/>
-              <a:t>Year</a:t>
-            </a:r>
-          </a:p>
-          <a:p>
-            <a:r>
-              <a:rPr lang="en-US" dirty="0" smtClean="0"/>
-              <a:t>Investigate outliers </a:t>
-            </a:r>
-          </a:p>
-          <a:p>
-            <a:pPr lvl="1"/>
-            <a:r>
-              <a:rPr lang="en-US" dirty="0" smtClean="0"/>
-              <a:t>Age</a:t>
-            </a:r>
-          </a:p>
-          <a:p>
-            <a:pPr lvl="1"/>
-            <a:r>
-              <a:rPr lang="en-US" dirty="0" smtClean="0"/>
-              <a:t>Time</a:t>
-            </a:r>
-          </a:p>
-          <a:p>
-            <a:r>
-              <a:rPr lang="en-US" dirty="0" smtClean="0"/>
-              <a:t>Data Wrangling</a:t>
-            </a:r>
-          </a:p>
-          <a:p>
-            <a:pPr lvl="1"/>
-            <a:r>
-              <a:rPr lang="en-US" dirty="0" smtClean="0"/>
-              <a:t>Age-Group</a:t>
+              <a:t>Ben/Austin</a:t>
             </a:r>
             <a:endParaRPr lang="en-US" dirty="0"/>
           </a:p>
@@ -19630,13 +20061,20 @@
     </p:spTree>
     <p:extLst>
       <p:ext uri="{BB962C8B-B14F-4D97-AF65-F5344CB8AC3E}">
-        <p14:creationId xmlns:p14="http://schemas.microsoft.com/office/powerpoint/2010/main" val="2405364122"/>
+        <p14:creationId xmlns:p14="http://schemas.microsoft.com/office/powerpoint/2010/main" val="4270067039"/>
       </p:ext>
     </p:extLst>
   </p:cSld>
   <p:clrMapOvr>
     <a:masterClrMapping/>
   </p:clrMapOvr>
+  <p:timing>
+    <p:tnLst>
+      <p:par>
+        <p:cTn id="1" dur="indefinite" restart="never" nodeType="tmRoot"/>
+      </p:par>
+    </p:tnLst>
+  </p:timing>
 </p:sld>
 </file>
 

</xml_diff>

<commit_message>
More progress. Need to continue to work on slides around stddev year v. age. Conisdering altering
</commit_message>
<xml_diff>
--- a/infographic.pptx
+++ b/infographic.pptx
@@ -16,16 +16,16 @@
     <p:sldId id="282" r:id="rId7"/>
     <p:sldId id="273" r:id="rId8"/>
     <p:sldId id="274" r:id="rId9"/>
-    <p:sldId id="260" r:id="rId10"/>
-    <p:sldId id="284" r:id="rId11"/>
-    <p:sldId id="286" r:id="rId12"/>
-    <p:sldId id="285" r:id="rId13"/>
-    <p:sldId id="268" r:id="rId14"/>
-    <p:sldId id="279" r:id="rId15"/>
-    <p:sldId id="269" r:id="rId16"/>
+    <p:sldId id="284" r:id="rId10"/>
+    <p:sldId id="286" r:id="rId11"/>
+    <p:sldId id="285" r:id="rId12"/>
+    <p:sldId id="268" r:id="rId13"/>
+    <p:sldId id="279" r:id="rId14"/>
+    <p:sldId id="269" r:id="rId15"/>
+    <p:sldId id="280" r:id="rId16"/>
     <p:sldId id="283" r:id="rId17"/>
-    <p:sldId id="280" r:id="rId18"/>
-    <p:sldId id="270" r:id="rId19"/>
+    <p:sldId id="270" r:id="rId18"/>
+    <p:sldId id="287" r:id="rId19"/>
     <p:sldId id="271" r:id="rId20"/>
     <p:sldId id="275" r:id="rId21"/>
     <p:sldId id="277" r:id="rId22"/>
@@ -725,7 +725,7 @@
           <a:noFill/>
           <a:extLst>
             <a:ext uri="{909E8E84-426E-40dd-AFC4-6F175D3DCCD1}">
-              <a14:hiddenFill xmlns="" xmlns:a14="http://schemas.microsoft.com/office/drawing/2010/main">
+              <a14:hiddenFill xmlns:a14="http://schemas.microsoft.com/office/drawing/2010/main" xmlns="">
                 <a:solidFill>
                   <a:srgbClr val="FFFFFF"/>
                 </a:solidFill>
@@ -785,7 +785,7 @@
             </a:ln>
             <a:extLst>
               <a:ext uri="{91240B29-F687-4f45-9708-019B960494DF}">
-                <a14:hiddenLine xmlns="" xmlns:a14="http://schemas.microsoft.com/office/drawing/2010/main" w="9525">
+                <a14:hiddenLine xmlns:a14="http://schemas.microsoft.com/office/drawing/2010/main" xmlns="" w="9525">
                   <a:solidFill>
                     <a:srgbClr val="000000"/>
                   </a:solidFill>
@@ -875,7 +875,7 @@
             </a:ln>
             <a:extLst>
               <a:ext uri="{91240B29-F687-4f45-9708-019B960494DF}">
-                <a14:hiddenLine xmlns="" xmlns:a14="http://schemas.microsoft.com/office/drawing/2010/main" w="9525">
+                <a14:hiddenLine xmlns:a14="http://schemas.microsoft.com/office/drawing/2010/main" xmlns="" w="9525">
                   <a:solidFill>
                     <a:srgbClr val="000000"/>
                   </a:solidFill>
@@ -965,7 +965,7 @@
             </a:ln>
             <a:extLst>
               <a:ext uri="{91240B29-F687-4f45-9708-019B960494DF}">
-                <a14:hiddenLine xmlns="" xmlns:a14="http://schemas.microsoft.com/office/drawing/2010/main" w="9525">
+                <a14:hiddenLine xmlns:a14="http://schemas.microsoft.com/office/drawing/2010/main" xmlns="" w="9525">
                   <a:solidFill>
                     <a:srgbClr val="000000"/>
                   </a:solidFill>
@@ -999,7 +999,7 @@
             </a:ln>
             <a:extLst>
               <a:ext uri="{91240B29-F687-4f45-9708-019B960494DF}">
-                <a14:hiddenLine xmlns="" xmlns:a14="http://schemas.microsoft.com/office/drawing/2010/main" w="9525">
+                <a14:hiddenLine xmlns:a14="http://schemas.microsoft.com/office/drawing/2010/main" xmlns="" w="9525">
                   <a:solidFill>
                     <a:srgbClr val="000000"/>
                   </a:solidFill>
@@ -1089,7 +1089,7 @@
             </a:ln>
             <a:extLst>
               <a:ext uri="{91240B29-F687-4f45-9708-019B960494DF}">
-                <a14:hiddenLine xmlns="" xmlns:a14="http://schemas.microsoft.com/office/drawing/2010/main" w="9525">
+                <a14:hiddenLine xmlns:a14="http://schemas.microsoft.com/office/drawing/2010/main" xmlns="" w="9525">
                   <a:solidFill>
                     <a:srgbClr val="000000"/>
                   </a:solidFill>
@@ -1151,7 +1151,7 @@
             </a:ln>
             <a:extLst>
               <a:ext uri="{91240B29-F687-4f45-9708-019B960494DF}">
-                <a14:hiddenLine xmlns="" xmlns:a14="http://schemas.microsoft.com/office/drawing/2010/main" w="9525">
+                <a14:hiddenLine xmlns:a14="http://schemas.microsoft.com/office/drawing/2010/main" xmlns="" w="9525">
                   <a:solidFill>
                     <a:srgbClr val="000000"/>
                   </a:solidFill>
@@ -1213,7 +1213,7 @@
             </a:ln>
             <a:extLst>
               <a:ext uri="{91240B29-F687-4f45-9708-019B960494DF}">
-                <a14:hiddenLine xmlns="" xmlns:a14="http://schemas.microsoft.com/office/drawing/2010/main" w="9525">
+                <a14:hiddenLine xmlns:a14="http://schemas.microsoft.com/office/drawing/2010/main" xmlns="" w="9525">
                   <a:solidFill>
                     <a:srgbClr val="000000"/>
                   </a:solidFill>
@@ -1303,7 +1303,7 @@
             </a:ln>
             <a:extLst>
               <a:ext uri="{91240B29-F687-4f45-9708-019B960494DF}">
-                <a14:hiddenLine xmlns="" xmlns:a14="http://schemas.microsoft.com/office/drawing/2010/main" w="9525">
+                <a14:hiddenLine xmlns:a14="http://schemas.microsoft.com/office/drawing/2010/main" xmlns="" w="9525">
                   <a:solidFill>
                     <a:srgbClr val="000000"/>
                   </a:solidFill>
@@ -1365,7 +1365,7 @@
             </a:ln>
             <a:extLst>
               <a:ext uri="{91240B29-F687-4f45-9708-019B960494DF}">
-                <a14:hiddenLine xmlns="" xmlns:a14="http://schemas.microsoft.com/office/drawing/2010/main" w="9525">
+                <a14:hiddenLine xmlns:a14="http://schemas.microsoft.com/office/drawing/2010/main" xmlns="" w="9525">
                   <a:solidFill>
                     <a:srgbClr val="000000"/>
                   </a:solidFill>
@@ -1427,7 +1427,7 @@
             </a:ln>
             <a:extLst>
               <a:ext uri="{91240B29-F687-4f45-9708-019B960494DF}">
-                <a14:hiddenLine xmlns="" xmlns:a14="http://schemas.microsoft.com/office/drawing/2010/main" w="9525">
+                <a14:hiddenLine xmlns:a14="http://schemas.microsoft.com/office/drawing/2010/main" xmlns="" w="9525">
                   <a:solidFill>
                     <a:srgbClr val="000000"/>
                   </a:solidFill>
@@ -1517,7 +1517,7 @@
             </a:ln>
             <a:extLst>
               <a:ext uri="{91240B29-F687-4f45-9708-019B960494DF}">
-                <a14:hiddenLine xmlns="" xmlns:a14="http://schemas.microsoft.com/office/drawing/2010/main" w="9525">
+                <a14:hiddenLine xmlns:a14="http://schemas.microsoft.com/office/drawing/2010/main" xmlns="" w="9525">
                   <a:solidFill>
                     <a:srgbClr val="000000"/>
                   </a:solidFill>
@@ -1607,7 +1607,7 @@
             </a:ln>
             <a:extLst>
               <a:ext uri="{91240B29-F687-4f45-9708-019B960494DF}">
-                <a14:hiddenLine xmlns="" xmlns:a14="http://schemas.microsoft.com/office/drawing/2010/main" w="9525">
+                <a14:hiddenLine xmlns:a14="http://schemas.microsoft.com/office/drawing/2010/main" xmlns="" w="9525">
                   <a:solidFill>
                     <a:srgbClr val="000000"/>
                   </a:solidFill>
@@ -1669,7 +1669,7 @@
             </a:ln>
             <a:extLst>
               <a:ext uri="{91240B29-F687-4f45-9708-019B960494DF}">
-                <a14:hiddenLine xmlns="" xmlns:a14="http://schemas.microsoft.com/office/drawing/2010/main" w="9525">
+                <a14:hiddenLine xmlns:a14="http://schemas.microsoft.com/office/drawing/2010/main" xmlns="" w="9525">
                   <a:solidFill>
                     <a:srgbClr val="000000"/>
                   </a:solidFill>
@@ -1779,7 +1779,7 @@
             </a:ln>
             <a:extLst>
               <a:ext uri="{91240B29-F687-4f45-9708-019B960494DF}">
-                <a14:hiddenLine xmlns="" xmlns:a14="http://schemas.microsoft.com/office/drawing/2010/main" w="9525">
+                <a14:hiddenLine xmlns:a14="http://schemas.microsoft.com/office/drawing/2010/main" xmlns="" w="9525">
                   <a:solidFill>
                     <a:srgbClr val="000000"/>
                   </a:solidFill>
@@ -1841,7 +1841,7 @@
             </a:ln>
             <a:extLst>
               <a:ext uri="{91240B29-F687-4f45-9708-019B960494DF}">
-                <a14:hiddenLine xmlns="" xmlns:a14="http://schemas.microsoft.com/office/drawing/2010/main" w="9525">
+                <a14:hiddenLine xmlns:a14="http://schemas.microsoft.com/office/drawing/2010/main" xmlns="" w="9525">
                   <a:solidFill>
                     <a:srgbClr val="000000"/>
                   </a:solidFill>
@@ -1931,7 +1931,7 @@
             </a:ln>
             <a:extLst>
               <a:ext uri="{91240B29-F687-4f45-9708-019B960494DF}">
-                <a14:hiddenLine xmlns="" xmlns:a14="http://schemas.microsoft.com/office/drawing/2010/main" w="9525">
+                <a14:hiddenLine xmlns:a14="http://schemas.microsoft.com/office/drawing/2010/main" xmlns="" w="9525">
                   <a:solidFill>
                     <a:srgbClr val="000000"/>
                   </a:solidFill>
@@ -2021,7 +2021,7 @@
             </a:ln>
             <a:extLst>
               <a:ext uri="{91240B29-F687-4f45-9708-019B960494DF}">
-                <a14:hiddenLine xmlns="" xmlns:a14="http://schemas.microsoft.com/office/drawing/2010/main" w="9525">
+                <a14:hiddenLine xmlns:a14="http://schemas.microsoft.com/office/drawing/2010/main" xmlns="" w="9525">
                   <a:solidFill>
                     <a:srgbClr val="000000"/>
                   </a:solidFill>
@@ -2083,7 +2083,7 @@
             </a:ln>
             <a:extLst>
               <a:ext uri="{91240B29-F687-4f45-9708-019B960494DF}">
-                <a14:hiddenLine xmlns="" xmlns:a14="http://schemas.microsoft.com/office/drawing/2010/main" w="9525">
+                <a14:hiddenLine xmlns:a14="http://schemas.microsoft.com/office/drawing/2010/main" xmlns="" w="9525">
                   <a:solidFill>
                     <a:srgbClr val="000000"/>
                   </a:solidFill>
@@ -2173,7 +2173,7 @@
             </a:ln>
             <a:extLst>
               <a:ext uri="{91240B29-F687-4f45-9708-019B960494DF}">
-                <a14:hiddenLine xmlns="" xmlns:a14="http://schemas.microsoft.com/office/drawing/2010/main" w="9525">
+                <a14:hiddenLine xmlns:a14="http://schemas.microsoft.com/office/drawing/2010/main" xmlns="" w="9525">
                   <a:solidFill>
                     <a:srgbClr val="000000"/>
                   </a:solidFill>
@@ -2263,7 +2263,7 @@
             </a:ln>
             <a:extLst>
               <a:ext uri="{91240B29-F687-4f45-9708-019B960494DF}">
-                <a14:hiddenLine xmlns="" xmlns:a14="http://schemas.microsoft.com/office/drawing/2010/main" w="9525">
+                <a14:hiddenLine xmlns:a14="http://schemas.microsoft.com/office/drawing/2010/main" xmlns="" w="9525">
                   <a:solidFill>
                     <a:srgbClr val="000000"/>
                   </a:solidFill>
@@ -2319,7 +2319,7 @@
             </a:ln>
             <a:extLst>
               <a:ext uri="{91240B29-F687-4f45-9708-019B960494DF}">
-                <a14:hiddenLine xmlns="" xmlns:a14="http://schemas.microsoft.com/office/drawing/2010/main" w="9525">
+                <a14:hiddenLine xmlns:a14="http://schemas.microsoft.com/office/drawing/2010/main" xmlns="" w="9525">
                   <a:solidFill>
                     <a:srgbClr val="000000"/>
                   </a:solidFill>
@@ -2409,7 +2409,7 @@
             </a:ln>
             <a:extLst>
               <a:ext uri="{91240B29-F687-4f45-9708-019B960494DF}">
-                <a14:hiddenLine xmlns="" xmlns:a14="http://schemas.microsoft.com/office/drawing/2010/main" w="9525">
+                <a14:hiddenLine xmlns:a14="http://schemas.microsoft.com/office/drawing/2010/main" xmlns="" w="9525">
                   <a:solidFill>
                     <a:srgbClr val="000000"/>
                   </a:solidFill>
@@ -2465,7 +2465,7 @@
             </a:ln>
             <a:extLst>
               <a:ext uri="{91240B29-F687-4f45-9708-019B960494DF}">
-                <a14:hiddenLine xmlns="" xmlns:a14="http://schemas.microsoft.com/office/drawing/2010/main" w="9525">
+                <a14:hiddenLine xmlns:a14="http://schemas.microsoft.com/office/drawing/2010/main" xmlns="" w="9525">
                   <a:solidFill>
                     <a:srgbClr val="000000"/>
                   </a:solidFill>
@@ -2555,7 +2555,7 @@
             </a:ln>
             <a:extLst>
               <a:ext uri="{91240B29-F687-4f45-9708-019B960494DF}">
-                <a14:hiddenLine xmlns="" xmlns:a14="http://schemas.microsoft.com/office/drawing/2010/main" w="9525">
+                <a14:hiddenLine xmlns:a14="http://schemas.microsoft.com/office/drawing/2010/main" xmlns="" w="9525">
                   <a:solidFill>
                     <a:srgbClr val="000000"/>
                   </a:solidFill>
@@ -2623,7 +2623,7 @@
             </a:ln>
             <a:extLst>
               <a:ext uri="{91240B29-F687-4f45-9708-019B960494DF}">
-                <a14:hiddenLine xmlns="" xmlns:a14="http://schemas.microsoft.com/office/drawing/2010/main" w="9525">
+                <a14:hiddenLine xmlns:a14="http://schemas.microsoft.com/office/drawing/2010/main" xmlns="" w="9525">
                   <a:solidFill>
                     <a:srgbClr val="000000"/>
                   </a:solidFill>
@@ -2713,7 +2713,7 @@
             </a:ln>
             <a:extLst>
               <a:ext uri="{91240B29-F687-4f45-9708-019B960494DF}">
-                <a14:hiddenLine xmlns="" xmlns:a14="http://schemas.microsoft.com/office/drawing/2010/main" w="9525">
+                <a14:hiddenLine xmlns:a14="http://schemas.microsoft.com/office/drawing/2010/main" xmlns="" w="9525">
                   <a:solidFill>
                     <a:srgbClr val="000000"/>
                   </a:solidFill>
@@ -2781,7 +2781,7 @@
             </a:ln>
             <a:extLst>
               <a:ext uri="{91240B29-F687-4f45-9708-019B960494DF}">
-                <a14:hiddenLine xmlns="" xmlns:a14="http://schemas.microsoft.com/office/drawing/2010/main" w="9525">
+                <a14:hiddenLine xmlns:a14="http://schemas.microsoft.com/office/drawing/2010/main" xmlns="" w="9525">
                   <a:solidFill>
                     <a:srgbClr val="000000"/>
                   </a:solidFill>
@@ -2871,7 +2871,7 @@
             </a:ln>
             <a:extLst>
               <a:ext uri="{91240B29-F687-4f45-9708-019B960494DF}">
-                <a14:hiddenLine xmlns="" xmlns:a14="http://schemas.microsoft.com/office/drawing/2010/main" w="9525">
+                <a14:hiddenLine xmlns:a14="http://schemas.microsoft.com/office/drawing/2010/main" xmlns="" w="9525">
                   <a:solidFill>
                     <a:srgbClr val="000000"/>
                   </a:solidFill>
@@ -2905,7 +2905,7 @@
             </a:ln>
             <a:extLst>
               <a:ext uri="{91240B29-F687-4f45-9708-019B960494DF}">
-                <a14:hiddenLine xmlns="" xmlns:a14="http://schemas.microsoft.com/office/drawing/2010/main" w="9525">
+                <a14:hiddenLine xmlns:a14="http://schemas.microsoft.com/office/drawing/2010/main" xmlns="" w="9525">
                   <a:solidFill>
                     <a:srgbClr val="000000"/>
                   </a:solidFill>
@@ -2995,7 +2995,7 @@
             </a:ln>
             <a:extLst>
               <a:ext uri="{91240B29-F687-4f45-9708-019B960494DF}">
-                <a14:hiddenLine xmlns="" xmlns:a14="http://schemas.microsoft.com/office/drawing/2010/main" w="9525">
+                <a14:hiddenLine xmlns:a14="http://schemas.microsoft.com/office/drawing/2010/main" xmlns="" w="9525">
                   <a:solidFill>
                     <a:srgbClr val="000000"/>
                   </a:solidFill>
@@ -3057,7 +3057,7 @@
             </a:ln>
             <a:extLst>
               <a:ext uri="{91240B29-F687-4f45-9708-019B960494DF}">
-                <a14:hiddenLine xmlns="" xmlns:a14="http://schemas.microsoft.com/office/drawing/2010/main" w="9525">
+                <a14:hiddenLine xmlns:a14="http://schemas.microsoft.com/office/drawing/2010/main" xmlns="" w="9525">
                   <a:solidFill>
                     <a:srgbClr val="000000"/>
                   </a:solidFill>
@@ -3119,7 +3119,7 @@
             </a:ln>
             <a:extLst>
               <a:ext uri="{91240B29-F687-4f45-9708-019B960494DF}">
-                <a14:hiddenLine xmlns="" xmlns:a14="http://schemas.microsoft.com/office/drawing/2010/main" w="9525">
+                <a14:hiddenLine xmlns:a14="http://schemas.microsoft.com/office/drawing/2010/main" xmlns="" w="9525">
                   <a:solidFill>
                     <a:srgbClr val="000000"/>
                   </a:solidFill>
@@ -3209,7 +3209,7 @@
             </a:ln>
             <a:extLst>
               <a:ext uri="{91240B29-F687-4f45-9708-019B960494DF}">
-                <a14:hiddenLine xmlns="" xmlns:a14="http://schemas.microsoft.com/office/drawing/2010/main" w="9525">
+                <a14:hiddenLine xmlns:a14="http://schemas.microsoft.com/office/drawing/2010/main" xmlns="" w="9525">
                   <a:solidFill>
                     <a:srgbClr val="000000"/>
                   </a:solidFill>
@@ -3277,7 +3277,7 @@
             </a:ln>
             <a:extLst>
               <a:ext uri="{91240B29-F687-4f45-9708-019B960494DF}">
-                <a14:hiddenLine xmlns="" xmlns:a14="http://schemas.microsoft.com/office/drawing/2010/main" w="9525">
+                <a14:hiddenLine xmlns:a14="http://schemas.microsoft.com/office/drawing/2010/main" xmlns="" w="9525">
                   <a:solidFill>
                     <a:srgbClr val="000000"/>
                   </a:solidFill>
@@ -3339,7 +3339,7 @@
             </a:ln>
             <a:extLst>
               <a:ext uri="{91240B29-F687-4f45-9708-019B960494DF}">
-                <a14:hiddenLine xmlns="" xmlns:a14="http://schemas.microsoft.com/office/drawing/2010/main" w="9525">
+                <a14:hiddenLine xmlns:a14="http://schemas.microsoft.com/office/drawing/2010/main" xmlns="" w="9525">
                   <a:solidFill>
                     <a:srgbClr val="000000"/>
                   </a:solidFill>
@@ -3429,7 +3429,7 @@
             </a:ln>
             <a:extLst>
               <a:ext uri="{91240B29-F687-4f45-9708-019B960494DF}">
-                <a14:hiddenLine xmlns="" xmlns:a14="http://schemas.microsoft.com/office/drawing/2010/main" w="9525">
+                <a14:hiddenLine xmlns:a14="http://schemas.microsoft.com/office/drawing/2010/main" xmlns="" w="9525">
                   <a:solidFill>
                     <a:srgbClr val="000000"/>
                   </a:solidFill>
@@ -3491,7 +3491,7 @@
             </a:ln>
             <a:extLst>
               <a:ext uri="{91240B29-F687-4f45-9708-019B960494DF}">
-                <a14:hiddenLine xmlns="" xmlns:a14="http://schemas.microsoft.com/office/drawing/2010/main" w="9525">
+                <a14:hiddenLine xmlns:a14="http://schemas.microsoft.com/office/drawing/2010/main" xmlns="" w="9525">
                   <a:solidFill>
                     <a:srgbClr val="000000"/>
                   </a:solidFill>
@@ -3581,7 +3581,7 @@
             </a:ln>
             <a:extLst>
               <a:ext uri="{91240B29-F687-4f45-9708-019B960494DF}">
-                <a14:hiddenLine xmlns="" xmlns:a14="http://schemas.microsoft.com/office/drawing/2010/main" w="9525">
+                <a14:hiddenLine xmlns:a14="http://schemas.microsoft.com/office/drawing/2010/main" xmlns="" w="9525">
                   <a:solidFill>
                     <a:srgbClr val="000000"/>
                   </a:solidFill>
@@ -3643,7 +3643,7 @@
             </a:ln>
             <a:extLst>
               <a:ext uri="{91240B29-F687-4f45-9708-019B960494DF}">
-                <a14:hiddenLine xmlns="" xmlns:a14="http://schemas.microsoft.com/office/drawing/2010/main" w="9525">
+                <a14:hiddenLine xmlns:a14="http://schemas.microsoft.com/office/drawing/2010/main" xmlns="" w="9525">
                   <a:solidFill>
                     <a:srgbClr val="000000"/>
                   </a:solidFill>
@@ -3733,7 +3733,7 @@
             </a:ln>
             <a:extLst>
               <a:ext uri="{91240B29-F687-4f45-9708-019B960494DF}">
-                <a14:hiddenLine xmlns="" xmlns:a14="http://schemas.microsoft.com/office/drawing/2010/main" w="9525">
+                <a14:hiddenLine xmlns:a14="http://schemas.microsoft.com/office/drawing/2010/main" xmlns="" w="9525">
                   <a:solidFill>
                     <a:srgbClr val="000000"/>
                   </a:solidFill>
@@ -3767,7 +3767,7 @@
             </a:ln>
             <a:extLst>
               <a:ext uri="{91240B29-F687-4f45-9708-019B960494DF}">
-                <a14:hiddenLine xmlns="" xmlns:a14="http://schemas.microsoft.com/office/drawing/2010/main" w="9525">
+                <a14:hiddenLine xmlns:a14="http://schemas.microsoft.com/office/drawing/2010/main" xmlns="" w="9525">
                   <a:solidFill>
                     <a:srgbClr val="000000"/>
                   </a:solidFill>
@@ -3832,7 +3832,7 @@
             </a:ln>
             <a:extLst>
               <a:ext uri="{91240B29-F687-4f45-9708-019B960494DF}">
-                <a14:hiddenLine xmlns="" xmlns:a14="http://schemas.microsoft.com/office/drawing/2010/main" w="9525">
+                <a14:hiddenLine xmlns:a14="http://schemas.microsoft.com/office/drawing/2010/main" xmlns="" w="9525">
                   <a:solidFill>
                     <a:srgbClr val="000000"/>
                   </a:solidFill>
@@ -3922,7 +3922,7 @@
             </a:ln>
             <a:extLst>
               <a:ext uri="{91240B29-F687-4f45-9708-019B960494DF}">
-                <a14:hiddenLine xmlns="" xmlns:a14="http://schemas.microsoft.com/office/drawing/2010/main" w="9525">
+                <a14:hiddenLine xmlns:a14="http://schemas.microsoft.com/office/drawing/2010/main" xmlns="" w="9525">
                   <a:solidFill>
                     <a:srgbClr val="000000"/>
                   </a:solidFill>
@@ -3984,7 +3984,7 @@
             </a:ln>
             <a:extLst>
               <a:ext uri="{91240B29-F687-4f45-9708-019B960494DF}">
-                <a14:hiddenLine xmlns="" xmlns:a14="http://schemas.microsoft.com/office/drawing/2010/main" w="9525">
+                <a14:hiddenLine xmlns:a14="http://schemas.microsoft.com/office/drawing/2010/main" xmlns="" w="9525">
                   <a:solidFill>
                     <a:srgbClr val="000000"/>
                   </a:solidFill>
@@ -4074,7 +4074,7 @@
             </a:ln>
             <a:extLst>
               <a:ext uri="{91240B29-F687-4f45-9708-019B960494DF}">
-                <a14:hiddenLine xmlns="" xmlns:a14="http://schemas.microsoft.com/office/drawing/2010/main" w="9525">
+                <a14:hiddenLine xmlns:a14="http://schemas.microsoft.com/office/drawing/2010/main" xmlns="" w="9525">
                   <a:solidFill>
                     <a:srgbClr val="000000"/>
                   </a:solidFill>
@@ -4164,7 +4164,7 @@
             </a:ln>
             <a:extLst>
               <a:ext uri="{91240B29-F687-4f45-9708-019B960494DF}">
-                <a14:hiddenLine xmlns="" xmlns:a14="http://schemas.microsoft.com/office/drawing/2010/main" w="9525">
+                <a14:hiddenLine xmlns:a14="http://schemas.microsoft.com/office/drawing/2010/main" xmlns="" w="9525">
                   <a:solidFill>
                     <a:srgbClr val="000000"/>
                   </a:solidFill>
@@ -4229,7 +4229,7 @@
             </a:ln>
             <a:extLst>
               <a:ext uri="{91240B29-F687-4f45-9708-019B960494DF}">
-                <a14:hiddenLine xmlns="" xmlns:a14="http://schemas.microsoft.com/office/drawing/2010/main" w="9525">
+                <a14:hiddenLine xmlns:a14="http://schemas.microsoft.com/office/drawing/2010/main" xmlns="" w="9525">
                   <a:solidFill>
                     <a:srgbClr val="000000"/>
                   </a:solidFill>
@@ -4291,7 +4291,7 @@
             </a:ln>
             <a:extLst>
               <a:ext uri="{91240B29-F687-4f45-9708-019B960494DF}">
-                <a14:hiddenLine xmlns="" xmlns:a14="http://schemas.microsoft.com/office/drawing/2010/main" w="9525">
+                <a14:hiddenLine xmlns:a14="http://schemas.microsoft.com/office/drawing/2010/main" xmlns="" w="9525">
                   <a:solidFill>
                     <a:srgbClr val="000000"/>
                   </a:solidFill>
@@ -4381,7 +4381,7 @@
             </a:ln>
             <a:extLst>
               <a:ext uri="{91240B29-F687-4f45-9708-019B960494DF}">
-                <a14:hiddenLine xmlns="" xmlns:a14="http://schemas.microsoft.com/office/drawing/2010/main" w="9525">
+                <a14:hiddenLine xmlns:a14="http://schemas.microsoft.com/office/drawing/2010/main" xmlns="" w="9525">
                   <a:solidFill>
                     <a:srgbClr val="000000"/>
                   </a:solidFill>
@@ -4471,7 +4471,7 @@
             </a:ln>
             <a:extLst>
               <a:ext uri="{91240B29-F687-4f45-9708-019B960494DF}">
-                <a14:hiddenLine xmlns="" xmlns:a14="http://schemas.microsoft.com/office/drawing/2010/main" w="9525">
+                <a14:hiddenLine xmlns:a14="http://schemas.microsoft.com/office/drawing/2010/main" xmlns="" w="9525">
                   <a:solidFill>
                     <a:srgbClr val="000000"/>
                   </a:solidFill>
@@ -4533,7 +4533,7 @@
             </a:ln>
             <a:extLst>
               <a:ext uri="{91240B29-F687-4f45-9708-019B960494DF}">
-                <a14:hiddenLine xmlns="" xmlns:a14="http://schemas.microsoft.com/office/drawing/2010/main" w="9525">
+                <a14:hiddenLine xmlns:a14="http://schemas.microsoft.com/office/drawing/2010/main" xmlns="" w="9525">
                   <a:solidFill>
                     <a:srgbClr val="000000"/>
                   </a:solidFill>
@@ -4653,7 +4653,7 @@
             </a:ln>
             <a:extLst>
               <a:ext uri="{91240B29-F687-4f45-9708-019B960494DF}">
-                <a14:hiddenLine xmlns="" xmlns:a14="http://schemas.microsoft.com/office/drawing/2010/main" w="9525">
+                <a14:hiddenLine xmlns:a14="http://schemas.microsoft.com/office/drawing/2010/main" xmlns="" w="9525">
                   <a:solidFill>
                     <a:srgbClr val="000000"/>
                   </a:solidFill>
@@ -4721,7 +4721,7 @@
             </a:ln>
             <a:extLst>
               <a:ext uri="{91240B29-F687-4f45-9708-019B960494DF}">
-                <a14:hiddenLine xmlns="" xmlns:a14="http://schemas.microsoft.com/office/drawing/2010/main" w="9525">
+                <a14:hiddenLine xmlns:a14="http://schemas.microsoft.com/office/drawing/2010/main" xmlns="" w="9525">
                   <a:solidFill>
                     <a:srgbClr val="000000"/>
                   </a:solidFill>
@@ -4811,7 +4811,7 @@
             </a:ln>
             <a:extLst>
               <a:ext uri="{91240B29-F687-4f45-9708-019B960494DF}">
-                <a14:hiddenLine xmlns="" xmlns:a14="http://schemas.microsoft.com/office/drawing/2010/main" w="9525">
+                <a14:hiddenLine xmlns:a14="http://schemas.microsoft.com/office/drawing/2010/main" xmlns="" w="9525">
                   <a:solidFill>
                     <a:srgbClr val="000000"/>
                   </a:solidFill>
@@ -9624,7 +9624,7 @@
           <a:noFill/>
           <a:extLst>
             <a:ext uri="{909E8E84-426E-40dd-AFC4-6F175D3DCCD1}">
-              <a14:hiddenFill xmlns="" xmlns:a14="http://schemas.microsoft.com/office/drawing/2010/main">
+              <a14:hiddenFill xmlns:a14="http://schemas.microsoft.com/office/drawing/2010/main" xmlns="">
                 <a:solidFill>
                   <a:srgbClr val="FFFFFF"/>
                 </a:solidFill>
@@ -9698,7 +9698,7 @@
               </a:ln>
               <a:extLst>
                 <a:ext uri="{91240B29-F687-4f45-9708-019B960494DF}">
-                  <a14:hiddenLine xmlns="" xmlns:a14="http://schemas.microsoft.com/office/drawing/2010/main" w="9525">
+                  <a14:hiddenLine xmlns:a14="http://schemas.microsoft.com/office/drawing/2010/main" xmlns="" w="9525">
                     <a:solidFill>
                       <a:srgbClr val="000000"/>
                     </a:solidFill>
@@ -9788,7 +9788,7 @@
               </a:ln>
               <a:extLst>
                 <a:ext uri="{91240B29-F687-4f45-9708-019B960494DF}">
-                  <a14:hiddenLine xmlns="" xmlns:a14="http://schemas.microsoft.com/office/drawing/2010/main" w="9525">
+                  <a14:hiddenLine xmlns:a14="http://schemas.microsoft.com/office/drawing/2010/main" xmlns="" w="9525">
                     <a:solidFill>
                       <a:srgbClr val="000000"/>
                     </a:solidFill>
@@ -9878,7 +9878,7 @@
               </a:ln>
               <a:extLst>
                 <a:ext uri="{91240B29-F687-4f45-9708-019B960494DF}">
-                  <a14:hiddenLine xmlns="" xmlns:a14="http://schemas.microsoft.com/office/drawing/2010/main" w="9525">
+                  <a14:hiddenLine xmlns:a14="http://schemas.microsoft.com/office/drawing/2010/main" xmlns="" w="9525">
                     <a:solidFill>
                       <a:srgbClr val="000000"/>
                     </a:solidFill>
@@ -9940,7 +9940,7 @@
               </a:ln>
               <a:extLst>
                 <a:ext uri="{91240B29-F687-4f45-9708-019B960494DF}">
-                  <a14:hiddenLine xmlns="" xmlns:a14="http://schemas.microsoft.com/office/drawing/2010/main" w="9525">
+                  <a14:hiddenLine xmlns:a14="http://schemas.microsoft.com/office/drawing/2010/main" xmlns="" w="9525">
                     <a:solidFill>
                       <a:srgbClr val="000000"/>
                     </a:solidFill>
@@ -10030,7 +10030,7 @@
               </a:ln>
               <a:extLst>
                 <a:ext uri="{91240B29-F687-4f45-9708-019B960494DF}">
-                  <a14:hiddenLine xmlns="" xmlns:a14="http://schemas.microsoft.com/office/drawing/2010/main" w="9525">
+                  <a14:hiddenLine xmlns:a14="http://schemas.microsoft.com/office/drawing/2010/main" xmlns="" w="9525">
                     <a:solidFill>
                       <a:srgbClr val="000000"/>
                     </a:solidFill>
@@ -10092,7 +10092,7 @@
               </a:ln>
               <a:extLst>
                 <a:ext uri="{91240B29-F687-4f45-9708-019B960494DF}">
-                  <a14:hiddenLine xmlns="" xmlns:a14="http://schemas.microsoft.com/office/drawing/2010/main" w="9525">
+                  <a14:hiddenLine xmlns:a14="http://schemas.microsoft.com/office/drawing/2010/main" xmlns="" w="9525">
                     <a:solidFill>
                       <a:srgbClr val="000000"/>
                     </a:solidFill>
@@ -10154,7 +10154,7 @@
               </a:ln>
               <a:extLst>
                 <a:ext uri="{91240B29-F687-4f45-9708-019B960494DF}">
-                  <a14:hiddenLine xmlns="" xmlns:a14="http://schemas.microsoft.com/office/drawing/2010/main" w="9525">
+                  <a14:hiddenLine xmlns:a14="http://schemas.microsoft.com/office/drawing/2010/main" xmlns="" w="9525">
                     <a:solidFill>
                       <a:srgbClr val="000000"/>
                     </a:solidFill>
@@ -10244,7 +10244,7 @@
               </a:ln>
               <a:extLst>
                 <a:ext uri="{91240B29-F687-4f45-9708-019B960494DF}">
-                  <a14:hiddenLine xmlns="" xmlns:a14="http://schemas.microsoft.com/office/drawing/2010/main" w="9525">
+                  <a14:hiddenLine xmlns:a14="http://schemas.microsoft.com/office/drawing/2010/main" xmlns="" w="9525">
                     <a:solidFill>
                       <a:srgbClr val="000000"/>
                     </a:solidFill>
@@ -10334,7 +10334,7 @@
               </a:ln>
               <a:extLst>
                 <a:ext uri="{91240B29-F687-4f45-9708-019B960494DF}">
-                  <a14:hiddenLine xmlns="" xmlns:a14="http://schemas.microsoft.com/office/drawing/2010/main" w="9525">
+                  <a14:hiddenLine xmlns:a14="http://schemas.microsoft.com/office/drawing/2010/main" xmlns="" w="9525">
                     <a:solidFill>
                       <a:srgbClr val="000000"/>
                     </a:solidFill>
@@ -10396,7 +10396,7 @@
               </a:ln>
               <a:extLst>
                 <a:ext uri="{91240B29-F687-4f45-9708-019B960494DF}">
-                  <a14:hiddenLine xmlns="" xmlns:a14="http://schemas.microsoft.com/office/drawing/2010/main" w="9525">
+                  <a14:hiddenLine xmlns:a14="http://schemas.microsoft.com/office/drawing/2010/main" xmlns="" w="9525">
                     <a:solidFill>
                       <a:srgbClr val="000000"/>
                     </a:solidFill>
@@ -10506,7 +10506,7 @@
               </a:ln>
               <a:extLst>
                 <a:ext uri="{91240B29-F687-4f45-9708-019B960494DF}">
-                  <a14:hiddenLine xmlns="" xmlns:a14="http://schemas.microsoft.com/office/drawing/2010/main" w="9525">
+                  <a14:hiddenLine xmlns:a14="http://schemas.microsoft.com/office/drawing/2010/main" xmlns="" w="9525">
                     <a:solidFill>
                       <a:srgbClr val="000000"/>
                     </a:solidFill>
@@ -10590,7 +10590,7 @@
               </a:ln>
               <a:extLst>
                 <a:ext uri="{91240B29-F687-4f45-9708-019B960494DF}">
-                  <a14:hiddenLine xmlns="" xmlns:a14="http://schemas.microsoft.com/office/drawing/2010/main" w="9525">
+                  <a14:hiddenLine xmlns:a14="http://schemas.microsoft.com/office/drawing/2010/main" xmlns="" w="9525">
                     <a:solidFill>
                       <a:srgbClr val="000000"/>
                     </a:solidFill>
@@ -10652,7 +10652,7 @@
               </a:ln>
               <a:extLst>
                 <a:ext uri="{91240B29-F687-4f45-9708-019B960494DF}">
-                  <a14:hiddenLine xmlns="" xmlns:a14="http://schemas.microsoft.com/office/drawing/2010/main" w="9525">
+                  <a14:hiddenLine xmlns:a14="http://schemas.microsoft.com/office/drawing/2010/main" xmlns="" w="9525">
                     <a:solidFill>
                       <a:srgbClr val="000000"/>
                     </a:solidFill>
@@ -10714,7 +10714,7 @@
               </a:ln>
               <a:extLst>
                 <a:ext uri="{91240B29-F687-4f45-9708-019B960494DF}">
-                  <a14:hiddenLine xmlns="" xmlns:a14="http://schemas.microsoft.com/office/drawing/2010/main" w="9525">
+                  <a14:hiddenLine xmlns:a14="http://schemas.microsoft.com/office/drawing/2010/main" xmlns="" w="9525">
                     <a:solidFill>
                       <a:srgbClr val="000000"/>
                     </a:solidFill>
@@ -10804,7 +10804,7 @@
               </a:ln>
               <a:extLst>
                 <a:ext uri="{91240B29-F687-4f45-9708-019B960494DF}">
-                  <a14:hiddenLine xmlns="" xmlns:a14="http://schemas.microsoft.com/office/drawing/2010/main" w="9525">
+                  <a14:hiddenLine xmlns:a14="http://schemas.microsoft.com/office/drawing/2010/main" xmlns="" w="9525">
                     <a:solidFill>
                       <a:srgbClr val="000000"/>
                     </a:solidFill>
@@ -10838,7 +10838,7 @@
               </a:ln>
               <a:extLst>
                 <a:ext uri="{91240B29-F687-4f45-9708-019B960494DF}">
-                  <a14:hiddenLine xmlns="" xmlns:a14="http://schemas.microsoft.com/office/drawing/2010/main" w="9525">
+                  <a14:hiddenLine xmlns:a14="http://schemas.microsoft.com/office/drawing/2010/main" xmlns="" w="9525">
                     <a:solidFill>
                       <a:srgbClr val="000000"/>
                     </a:solidFill>
@@ -10903,7 +10903,7 @@
               </a:ln>
               <a:extLst>
                 <a:ext uri="{91240B29-F687-4f45-9708-019B960494DF}">
-                  <a14:hiddenLine xmlns="" xmlns:a14="http://schemas.microsoft.com/office/drawing/2010/main" w="9525">
+                  <a14:hiddenLine xmlns:a14="http://schemas.microsoft.com/office/drawing/2010/main" xmlns="" w="9525">
                     <a:solidFill>
                       <a:srgbClr val="000000"/>
                     </a:solidFill>
@@ -10993,7 +10993,7 @@
               </a:ln>
               <a:extLst>
                 <a:ext uri="{91240B29-F687-4f45-9708-019B960494DF}">
-                  <a14:hiddenLine xmlns="" xmlns:a14="http://schemas.microsoft.com/office/drawing/2010/main" w="9525">
+                  <a14:hiddenLine xmlns:a14="http://schemas.microsoft.com/office/drawing/2010/main" xmlns="" w="9525">
                     <a:solidFill>
                       <a:srgbClr val="000000"/>
                     </a:solidFill>
@@ -11055,7 +11055,7 @@
               </a:ln>
               <a:extLst>
                 <a:ext uri="{91240B29-F687-4f45-9708-019B960494DF}">
-                  <a14:hiddenLine xmlns="" xmlns:a14="http://schemas.microsoft.com/office/drawing/2010/main" w="9525">
+                  <a14:hiddenLine xmlns:a14="http://schemas.microsoft.com/office/drawing/2010/main" xmlns="" w="9525">
                     <a:solidFill>
                       <a:srgbClr val="000000"/>
                     </a:solidFill>
@@ -11145,7 +11145,7 @@
               </a:ln>
               <a:extLst>
                 <a:ext uri="{91240B29-F687-4f45-9708-019B960494DF}">
-                  <a14:hiddenLine xmlns="" xmlns:a14="http://schemas.microsoft.com/office/drawing/2010/main" w="9525">
+                  <a14:hiddenLine xmlns:a14="http://schemas.microsoft.com/office/drawing/2010/main" xmlns="" w="9525">
                     <a:solidFill>
                       <a:srgbClr val="000000"/>
                     </a:solidFill>
@@ -11210,7 +11210,7 @@
               </a:ln>
               <a:extLst>
                 <a:ext uri="{91240B29-F687-4f45-9708-019B960494DF}">
-                  <a14:hiddenLine xmlns="" xmlns:a14="http://schemas.microsoft.com/office/drawing/2010/main" w="9525">
+                  <a14:hiddenLine xmlns:a14="http://schemas.microsoft.com/office/drawing/2010/main" xmlns="" w="9525">
                     <a:solidFill>
                       <a:srgbClr val="000000"/>
                     </a:solidFill>
@@ -11272,7 +11272,7 @@
               </a:ln>
               <a:extLst>
                 <a:ext uri="{91240B29-F687-4f45-9708-019B960494DF}">
-                  <a14:hiddenLine xmlns="" xmlns:a14="http://schemas.microsoft.com/office/drawing/2010/main" w="9525">
+                  <a14:hiddenLine xmlns:a14="http://schemas.microsoft.com/office/drawing/2010/main" xmlns="" w="9525">
                     <a:solidFill>
                       <a:srgbClr val="000000"/>
                     </a:solidFill>
@@ -11362,7 +11362,7 @@
               </a:ln>
               <a:extLst>
                 <a:ext uri="{91240B29-F687-4f45-9708-019B960494DF}">
-                  <a14:hiddenLine xmlns="" xmlns:a14="http://schemas.microsoft.com/office/drawing/2010/main" w="9525">
+                  <a14:hiddenLine xmlns:a14="http://schemas.microsoft.com/office/drawing/2010/main" xmlns="" w="9525">
                     <a:solidFill>
                       <a:srgbClr val="000000"/>
                     </a:solidFill>
@@ -11452,7 +11452,7 @@
               </a:ln>
               <a:extLst>
                 <a:ext uri="{91240B29-F687-4f45-9708-019B960494DF}">
-                  <a14:hiddenLine xmlns="" xmlns:a14="http://schemas.microsoft.com/office/drawing/2010/main" w="9525">
+                  <a14:hiddenLine xmlns:a14="http://schemas.microsoft.com/office/drawing/2010/main" xmlns="" w="9525">
                     <a:solidFill>
                       <a:srgbClr val="000000"/>
                     </a:solidFill>
@@ -11517,7 +11517,7 @@
               </a:ln>
               <a:extLst>
                 <a:ext uri="{91240B29-F687-4f45-9708-019B960494DF}">
-                  <a14:hiddenLine xmlns="" xmlns:a14="http://schemas.microsoft.com/office/drawing/2010/main" w="9525">
+                  <a14:hiddenLine xmlns:a14="http://schemas.microsoft.com/office/drawing/2010/main" xmlns="" w="9525">
                     <a:solidFill>
                       <a:srgbClr val="000000"/>
                     </a:solidFill>
@@ -11637,7 +11637,7 @@
               </a:ln>
               <a:extLst>
                 <a:ext uri="{91240B29-F687-4f45-9708-019B960494DF}">
-                  <a14:hiddenLine xmlns="" xmlns:a14="http://schemas.microsoft.com/office/drawing/2010/main" w="9525">
+                  <a14:hiddenLine xmlns:a14="http://schemas.microsoft.com/office/drawing/2010/main" xmlns="" w="9525">
                     <a:solidFill>
                       <a:srgbClr val="000000"/>
                     </a:solidFill>
@@ -11735,7 +11735,7 @@
               </a:ln>
               <a:extLst>
                 <a:ext uri="{91240B29-F687-4f45-9708-019B960494DF}">
-                  <a14:hiddenLine xmlns="" xmlns:a14="http://schemas.microsoft.com/office/drawing/2010/main" w="9525">
+                  <a14:hiddenLine xmlns:a14="http://schemas.microsoft.com/office/drawing/2010/main" xmlns="" w="9525">
                     <a:solidFill>
                       <a:srgbClr val="000000"/>
                     </a:solidFill>
@@ -11850,7 +11850,7 @@
               </a:ln>
               <a:extLst>
                 <a:ext uri="{91240B29-F687-4f45-9708-019B960494DF}">
-                  <a14:hiddenLine xmlns="" xmlns:a14="http://schemas.microsoft.com/office/drawing/2010/main" w="9525">
+                  <a14:hiddenLine xmlns:a14="http://schemas.microsoft.com/office/drawing/2010/main" xmlns="" w="9525">
                     <a:solidFill>
                       <a:srgbClr val="000000"/>
                     </a:solidFill>
@@ -11940,7 +11940,7 @@
               </a:ln>
               <a:extLst>
                 <a:ext uri="{91240B29-F687-4f45-9708-019B960494DF}">
-                  <a14:hiddenLine xmlns="" xmlns:a14="http://schemas.microsoft.com/office/drawing/2010/main" w="9525">
+                  <a14:hiddenLine xmlns:a14="http://schemas.microsoft.com/office/drawing/2010/main" xmlns="" w="9525">
                     <a:solidFill>
                       <a:srgbClr val="000000"/>
                     </a:solidFill>
@@ -12005,7 +12005,7 @@
               </a:ln>
               <a:extLst>
                 <a:ext uri="{91240B29-F687-4f45-9708-019B960494DF}">
-                  <a14:hiddenLine xmlns="" xmlns:a14="http://schemas.microsoft.com/office/drawing/2010/main" w="9525">
+                  <a14:hiddenLine xmlns:a14="http://schemas.microsoft.com/office/drawing/2010/main" xmlns="" w="9525">
                     <a:solidFill>
                       <a:srgbClr val="000000"/>
                     </a:solidFill>
@@ -12095,7 +12095,7 @@
               </a:ln>
               <a:extLst>
                 <a:ext uri="{91240B29-F687-4f45-9708-019B960494DF}">
-                  <a14:hiddenLine xmlns="" xmlns:a14="http://schemas.microsoft.com/office/drawing/2010/main" w="9525">
+                  <a14:hiddenLine xmlns:a14="http://schemas.microsoft.com/office/drawing/2010/main" xmlns="" w="9525">
                     <a:solidFill>
                       <a:srgbClr val="000000"/>
                     </a:solidFill>
@@ -12163,7 +12163,7 @@
               </a:ln>
               <a:extLst>
                 <a:ext uri="{91240B29-F687-4f45-9708-019B960494DF}">
-                  <a14:hiddenLine xmlns="" xmlns:a14="http://schemas.microsoft.com/office/drawing/2010/main" w="9525">
+                  <a14:hiddenLine xmlns:a14="http://schemas.microsoft.com/office/drawing/2010/main" xmlns="" w="9525">
                     <a:solidFill>
                       <a:srgbClr val="000000"/>
                     </a:solidFill>
@@ -12253,7 +12253,7 @@
               </a:ln>
               <a:extLst>
                 <a:ext uri="{91240B29-F687-4f45-9708-019B960494DF}">
-                  <a14:hiddenLine xmlns="" xmlns:a14="http://schemas.microsoft.com/office/drawing/2010/main" w="9525">
+                  <a14:hiddenLine xmlns:a14="http://schemas.microsoft.com/office/drawing/2010/main" xmlns="" w="9525">
                     <a:solidFill>
                       <a:srgbClr val="000000"/>
                     </a:solidFill>
@@ -12321,7 +12321,7 @@
               </a:ln>
               <a:extLst>
                 <a:ext uri="{91240B29-F687-4f45-9708-019B960494DF}">
-                  <a14:hiddenLine xmlns="" xmlns:a14="http://schemas.microsoft.com/office/drawing/2010/main" w="9525">
+                  <a14:hiddenLine xmlns:a14="http://schemas.microsoft.com/office/drawing/2010/main" xmlns="" w="9525">
                     <a:solidFill>
                       <a:srgbClr val="000000"/>
                     </a:solidFill>
@@ -12411,7 +12411,7 @@
               </a:ln>
               <a:extLst>
                 <a:ext uri="{91240B29-F687-4f45-9708-019B960494DF}">
-                  <a14:hiddenLine xmlns="" xmlns:a14="http://schemas.microsoft.com/office/drawing/2010/main" w="9525">
+                  <a14:hiddenLine xmlns:a14="http://schemas.microsoft.com/office/drawing/2010/main" xmlns="" w="9525">
                     <a:solidFill>
                       <a:srgbClr val="000000"/>
                     </a:solidFill>
@@ -12445,7 +12445,7 @@
               </a:ln>
               <a:extLst>
                 <a:ext uri="{91240B29-F687-4f45-9708-019B960494DF}">
-                  <a14:hiddenLine xmlns="" xmlns:a14="http://schemas.microsoft.com/office/drawing/2010/main" w="9525">
+                  <a14:hiddenLine xmlns:a14="http://schemas.microsoft.com/office/drawing/2010/main" xmlns="" w="9525">
                     <a:solidFill>
                       <a:srgbClr val="000000"/>
                     </a:solidFill>
@@ -13156,41 +13156,41 @@
           <a:p>
             <a:r>
               <a:rPr lang="en-US" dirty="0" smtClean="0"/>
-              <a:t>How age distributions vary by year</a:t>
+              <a:t>What are these graphs telling us?</a:t>
             </a:r>
             <a:endParaRPr lang="en-US" dirty="0"/>
           </a:p>
         </p:txBody>
       </p:sp>
-      <p:pic>
-        <p:nvPicPr>
-          <p:cNvPr id="5" name="Content Placeholder 4"/>
-          <p:cNvPicPr>
-            <a:picLocks noGrp="1" noChangeAspect="1"/>
-          </p:cNvPicPr>
+      <p:sp>
+        <p:nvSpPr>
+          <p:cNvPr id="3" name="Content Placeholder 2"/>
+          <p:cNvSpPr>
+            <a:spLocks noGrp="1"/>
+          </p:cNvSpPr>
           <p:nvPr>
             <p:ph idx="1"/>
           </p:nvPr>
-        </p:nvPicPr>
-        <p:blipFill>
-          <a:blip r:embed="rId2">
-            <a:extLst>
-              <a:ext uri="{28A0092B-C50C-407E-A947-70E740481C1C}">
-                <a14:useLocalDpi xmlns:a14="http://schemas.microsoft.com/office/drawing/2010/main" val="0"/>
-              </a:ext>
-            </a:extLst>
-          </a:blip>
-          <a:stretch>
-            <a:fillRect/>
-          </a:stretch>
-        </p:blipFill>
-        <p:spPr>
-          <a:xfrm>
-            <a:off x="128953" y="2312815"/>
-            <a:ext cx="5908431" cy="4066651"/>
-          </a:xfrm>
-        </p:spPr>
-      </p:pic>
+        </p:nvSpPr>
+        <p:spPr/>
+        <p:txBody>
+          <a:bodyPr/>
+          <a:lstStyle/>
+          <a:p>
+            <a:r>
+              <a:rPr lang="en-US" dirty="0" smtClean="0"/>
+              <a:t>The mean of the boxplot animation  has a gradual shift to the left, indicating a lower mean age of the Men as the years of the race progress. </a:t>
+            </a:r>
+          </a:p>
+          <a:p>
+            <a:r>
+              <a:rPr lang="en-US" dirty="0" smtClean="0"/>
+              <a:t>The histogram rolls to the left at the same rate, validating our observation of the boxplot.</a:t>
+            </a:r>
+            <a:endParaRPr lang="en-US" dirty="0"/>
+          </a:p>
+        </p:txBody>
+      </p:sp>
       <p:sp>
         <p:nvSpPr>
           <p:cNvPr id="4" name="Slide Number Placeholder 3"/>
@@ -13214,40 +13214,10 @@
           </a:p>
         </p:txBody>
       </p:sp>
-      <p:pic>
-        <p:nvPicPr>
-          <p:cNvPr id="6" name="Picture 5"/>
-          <p:cNvPicPr>
-            <a:picLocks noChangeAspect="1"/>
-          </p:cNvPicPr>
-          <p:nvPr/>
-        </p:nvPicPr>
-        <p:blipFill>
-          <a:blip r:embed="rId3">
-            <a:extLst>
-              <a:ext uri="{28A0092B-C50C-407E-A947-70E740481C1C}">
-                <a14:useLocalDpi xmlns:a14="http://schemas.microsoft.com/office/drawing/2010/main" val="0"/>
-              </a:ext>
-            </a:extLst>
-          </a:blip>
-          <a:stretch>
-            <a:fillRect/>
-          </a:stretch>
-        </p:blipFill>
-        <p:spPr>
-          <a:xfrm>
-            <a:off x="6119446" y="2312816"/>
-            <a:ext cx="5911961" cy="4069080"/>
-          </a:xfrm>
-          <a:prstGeom prst="rect">
-            <a:avLst/>
-          </a:prstGeom>
-        </p:spPr>
-      </p:pic>
     </p:spTree>
     <p:extLst>
       <p:ext uri="{BB962C8B-B14F-4D97-AF65-F5344CB8AC3E}">
-        <p14:creationId xmlns:p14="http://schemas.microsoft.com/office/powerpoint/2010/main" val="1886516530"/>
+        <p14:creationId xmlns:p14="http://schemas.microsoft.com/office/powerpoint/2010/main" val="2660268130"/>
       </p:ext>
     </p:extLst>
   </p:cSld>
@@ -13298,111 +13268,6 @@
           <a:p>
             <a:r>
               <a:rPr lang="en-US" dirty="0" smtClean="0"/>
-              <a:t>What are these graphs telling us?</a:t>
-            </a:r>
-            <a:endParaRPr lang="en-US" dirty="0"/>
-          </a:p>
-        </p:txBody>
-      </p:sp>
-      <p:sp>
-        <p:nvSpPr>
-          <p:cNvPr id="3" name="Content Placeholder 2"/>
-          <p:cNvSpPr>
-            <a:spLocks noGrp="1"/>
-          </p:cNvSpPr>
-          <p:nvPr>
-            <p:ph idx="1"/>
-          </p:nvPr>
-        </p:nvSpPr>
-        <p:spPr/>
-        <p:txBody>
-          <a:bodyPr/>
-          <a:lstStyle/>
-          <a:p>
-            <a:r>
-              <a:rPr lang="en-US" dirty="0" smtClean="0"/>
-              <a:t>The mean of the boxplot animation  has a gradual shift to the left, indicating a lower mean age of the Men as the years of the race progress. </a:t>
-            </a:r>
-          </a:p>
-          <a:p>
-            <a:r>
-              <a:rPr lang="en-US" dirty="0" smtClean="0"/>
-              <a:t>The histogram rolls to the left at the same rate, validating our observation of the boxplot.</a:t>
-            </a:r>
-            <a:endParaRPr lang="en-US" dirty="0"/>
-          </a:p>
-        </p:txBody>
-      </p:sp>
-      <p:sp>
-        <p:nvSpPr>
-          <p:cNvPr id="4" name="Slide Number Placeholder 3"/>
-          <p:cNvSpPr>
-            <a:spLocks noGrp="1"/>
-          </p:cNvSpPr>
-          <p:nvPr>
-            <p:ph type="sldNum" sz="quarter" idx="12"/>
-          </p:nvPr>
-        </p:nvSpPr>
-        <p:spPr/>
-        <p:txBody>
-          <a:bodyPr/>
-          <a:lstStyle/>
-          <a:p>
-            <a:fld id="{7B7DB76D-28D5-4DAC-900A-A1330999554A}" type="slidenum">
-              <a:rPr lang="en-US" smtClean="0"/>
-              <a:t>11</a:t>
-            </a:fld>
-            <a:endParaRPr lang="en-US"/>
-          </a:p>
-        </p:txBody>
-      </p:sp>
-    </p:spTree>
-    <p:extLst>
-      <p:ext uri="{BB962C8B-B14F-4D97-AF65-F5344CB8AC3E}">
-        <p14:creationId xmlns:p14="http://schemas.microsoft.com/office/powerpoint/2010/main" val="2660268130"/>
-      </p:ext>
-    </p:extLst>
-  </p:cSld>
-  <p:clrMapOvr>
-    <a:masterClrMapping/>
-  </p:clrMapOvr>
-</p:sld>
-</file>
-
-<file path=ppt/slides/slide12.xml><?xml version="1.0" encoding="utf-8"?>
-<p:sld xmlns:a="http://schemas.openxmlformats.org/drawingml/2006/main" xmlns:r="http://schemas.openxmlformats.org/officeDocument/2006/relationships" xmlns:p="http://schemas.openxmlformats.org/presentationml/2006/main">
-  <p:cSld>
-    <p:spTree>
-      <p:nvGrpSpPr>
-        <p:cNvPr id="1" name=""/>
-        <p:cNvGrpSpPr/>
-        <p:nvPr/>
-      </p:nvGrpSpPr>
-      <p:grpSpPr>
-        <a:xfrm>
-          <a:off x="0" y="0"/>
-          <a:ext cx="0" cy="0"/>
-          <a:chOff x="0" y="0"/>
-          <a:chExt cx="0" cy="0"/>
-        </a:xfrm>
-      </p:grpSpPr>
-      <p:sp>
-        <p:nvSpPr>
-          <p:cNvPr id="2" name="Title 1"/>
-          <p:cNvSpPr>
-            <a:spLocks noGrp="1"/>
-          </p:cNvSpPr>
-          <p:nvPr>
-            <p:ph type="title"/>
-          </p:nvPr>
-        </p:nvSpPr>
-        <p:spPr/>
-        <p:txBody>
-          <a:bodyPr/>
-          <a:lstStyle/>
-          <a:p>
-            <a:r>
-              <a:rPr lang="en-US" dirty="0" smtClean="0"/>
               <a:t>Growth of race by year</a:t>
             </a:r>
             <a:endParaRPr lang="en-US" dirty="0"/>
@@ -13455,7 +13320,7 @@
           <a:p>
             <a:fld id="{7B7DB76D-28D5-4DAC-900A-A1330999554A}" type="slidenum">
               <a:rPr lang="en-US" smtClean="0"/>
-              <a:t>12</a:t>
+              <a:t>11</a:t>
             </a:fld>
             <a:endParaRPr lang="en-US"/>
           </a:p>
@@ -13481,7 +13346,7 @@
 </p:sld>
 </file>
 
-<file path=ppt/slides/slide13.xml><?xml version="1.0" encoding="utf-8"?>
+<file path=ppt/slides/slide12.xml><?xml version="1.0" encoding="utf-8"?>
 <p:sld xmlns:a="http://schemas.openxmlformats.org/drawingml/2006/main" xmlns:r="http://schemas.openxmlformats.org/officeDocument/2006/relationships" xmlns:p="http://schemas.openxmlformats.org/presentationml/2006/main">
   <p:cSld>
     <p:spTree>
@@ -13606,14 +13471,12 @@
               <a:rPr lang="en-US" dirty="0" smtClean="0"/>
               <a:t>Boxplot distribution shows the average runner’s age decreases over the years</a:t>
             </a:r>
-            <a:endParaRPr lang="en-US" dirty="0" smtClean="0"/>
           </a:p>
           <a:p>
             <a:r>
               <a:rPr lang="en-US" dirty="0" smtClean="0"/>
               <a:t>Density Plots indicate a shift to the left, validating the boxplot pattern. Vertical line is stationed at mean for 1999 and ends to the right of the mean for 2009.</a:t>
             </a:r>
-            <a:endParaRPr lang="en-US" dirty="0" smtClean="0"/>
           </a:p>
         </p:txBody>
       </p:sp>
@@ -13634,7 +13497,7 @@
           <a:p>
             <a:fld id="{7B7DB76D-28D5-4DAC-900A-A1330999554A}" type="slidenum">
               <a:rPr lang="en-US" smtClean="0"/>
-              <a:t>13</a:t>
+              <a:t>12</a:t>
             </a:fld>
             <a:endParaRPr lang="en-US"/>
           </a:p>
@@ -13785,7 +13648,7 @@
 </p:sld>
 </file>
 
-<file path=ppt/slides/slide14.xml><?xml version="1.0" encoding="utf-8"?>
+<file path=ppt/slides/slide13.xml><?xml version="1.0" encoding="utf-8"?>
 <p:sld xmlns:a="http://schemas.openxmlformats.org/drawingml/2006/main" xmlns:r="http://schemas.openxmlformats.org/officeDocument/2006/relationships" xmlns:p="http://schemas.openxmlformats.org/presentationml/2006/main">
   <p:cSld>
     <p:spTree>
@@ -13831,10 +13694,6 @@
               <a:rPr lang="en-US" dirty="0" smtClean="0"/>
               <a:t>– </a:t>
             </a:r>
-            <a:r>
-              <a:rPr lang="en-US" dirty="0" smtClean="0"/>
-              <a:t/>
-            </a:r>
             <a:br>
               <a:rPr lang="en-US" dirty="0" smtClean="0"/>
             </a:br>
@@ -13844,11 +13703,7 @@
             </a:r>
             <a:r>
               <a:rPr lang="en-US" dirty="0" smtClean="0"/>
-              <a:t>Age </a:t>
-            </a:r>
-            <a:r>
-              <a:rPr lang="en-US" dirty="0" smtClean="0"/>
-              <a:t>(continued)</a:t>
+              <a:t>Age (continued)</a:t>
             </a:r>
             <a:endParaRPr lang="en-US" dirty="0"/>
           </a:p>
@@ -13871,7 +13726,7 @@
           <a:p>
             <a:fld id="{7B7DB76D-28D5-4DAC-900A-A1330999554A}" type="slidenum">
               <a:rPr lang="en-US" smtClean="0"/>
-              <a:t>14</a:t>
+              <a:t>13</a:t>
             </a:fld>
             <a:endParaRPr lang="en-US"/>
           </a:p>
@@ -14059,7 +13914,7 @@
 </p:sld>
 </file>
 
-<file path=ppt/slides/slide15.xml><?xml version="1.0" encoding="utf-8"?>
+<file path=ppt/slides/slide14.xml><?xml version="1.0" encoding="utf-8"?>
 <p:sld xmlns:a="http://schemas.openxmlformats.org/drawingml/2006/main" xmlns:r="http://schemas.openxmlformats.org/officeDocument/2006/relationships" xmlns:p="http://schemas.openxmlformats.org/presentationml/2006/main">
   <p:cSld>
     <p:spTree>
@@ -14166,7 +14021,7 @@
           <a:p>
             <a:fld id="{7B7DB76D-28D5-4DAC-900A-A1330999554A}" type="slidenum">
               <a:rPr lang="en-US" smtClean="0"/>
-              <a:t>15</a:t>
+              <a:t>14</a:t>
             </a:fld>
             <a:endParaRPr lang="en-US"/>
           </a:p>
@@ -14293,158 +14148,7 @@
 </p:sld>
 </file>
 
-<file path=ppt/slides/slide16.xml><?xml version="1.0" encoding="utf-8"?>
-<p:sld xmlns:a="http://schemas.openxmlformats.org/drawingml/2006/main" xmlns:r="http://schemas.openxmlformats.org/officeDocument/2006/relationships" xmlns:p="http://schemas.openxmlformats.org/presentationml/2006/main">
-  <p:cSld>
-    <p:spTree>
-      <p:nvGrpSpPr>
-        <p:cNvPr id="1" name=""/>
-        <p:cNvGrpSpPr/>
-        <p:nvPr/>
-      </p:nvGrpSpPr>
-      <p:grpSpPr>
-        <a:xfrm>
-          <a:off x="0" y="0"/>
-          <a:ext cx="0" cy="0"/>
-          <a:chOff x="0" y="0"/>
-          <a:chExt cx="0" cy="0"/>
-        </a:xfrm>
-      </p:grpSpPr>
-      <p:sp>
-        <p:nvSpPr>
-          <p:cNvPr id="2" name="Title 1"/>
-          <p:cNvSpPr>
-            <a:spLocks noGrp="1"/>
-          </p:cNvSpPr>
-          <p:nvPr>
-            <p:ph type="title"/>
-          </p:nvPr>
-        </p:nvSpPr>
-        <p:spPr/>
-        <p:txBody>
-          <a:bodyPr/>
-          <a:lstStyle/>
-          <a:p>
-            <a:r>
-              <a:rPr lang="en-US" dirty="0" smtClean="0"/>
-              <a:t>How run times vary by year</a:t>
-            </a:r>
-            <a:endParaRPr lang="en-US" dirty="0"/>
-          </a:p>
-        </p:txBody>
-      </p:sp>
-      <p:pic>
-        <p:nvPicPr>
-          <p:cNvPr id="5" name="Content Placeholder 4"/>
-          <p:cNvPicPr>
-            <a:picLocks noGrp="1" noChangeAspect="1"/>
-          </p:cNvPicPr>
-          <p:nvPr>
-            <p:ph idx="1"/>
-          </p:nvPr>
-        </p:nvPicPr>
-        <p:blipFill>
-          <a:blip r:embed="rId3">
-            <a:extLst>
-              <a:ext uri="{28A0092B-C50C-407E-A947-70E740481C1C}">
-                <a14:useLocalDpi xmlns:a14="http://schemas.microsoft.com/office/drawing/2010/main" val="0"/>
-              </a:ext>
-            </a:extLst>
-          </a:blip>
-          <a:stretch>
-            <a:fillRect/>
-          </a:stretch>
-        </p:blipFill>
-        <p:spPr>
-          <a:xfrm>
-            <a:off x="4958760" y="1862259"/>
-            <a:ext cx="5842127" cy="4021015"/>
-          </a:xfrm>
-        </p:spPr>
-      </p:pic>
-      <p:sp>
-        <p:nvSpPr>
-          <p:cNvPr id="4" name="Slide Number Placeholder 3"/>
-          <p:cNvSpPr>
-            <a:spLocks noGrp="1"/>
-          </p:cNvSpPr>
-          <p:nvPr>
-            <p:ph type="sldNum" sz="quarter" idx="12"/>
-          </p:nvPr>
-        </p:nvSpPr>
-        <p:spPr/>
-        <p:txBody>
-          <a:bodyPr/>
-          <a:lstStyle/>
-          <a:p>
-            <a:fld id="{7B7DB76D-28D5-4DAC-900A-A1330999554A}" type="slidenum">
-              <a:rPr lang="en-US" smtClean="0"/>
-              <a:t>16</a:t>
-            </a:fld>
-            <a:endParaRPr lang="en-US"/>
-          </a:p>
-        </p:txBody>
-      </p:sp>
-      <p:sp>
-        <p:nvSpPr>
-          <p:cNvPr id="3" name="TextBox 2"/>
-          <p:cNvSpPr txBox="1"/>
-          <p:nvPr/>
-        </p:nvSpPr>
-        <p:spPr>
-          <a:xfrm>
-            <a:off x="1324708" y="1770185"/>
-            <a:ext cx="3458307" cy="2031325"/>
-          </a:xfrm>
-          <a:prstGeom prst="rect">
-            <a:avLst/>
-          </a:prstGeom>
-          <a:noFill/>
-        </p:spPr>
-        <p:txBody>
-          <a:bodyPr wrap="square" rtlCol="0">
-            <a:spAutoFit/>
-          </a:bodyPr>
-          <a:lstStyle/>
-          <a:p>
-            <a:r>
-              <a:rPr lang="en-US" dirty="0" smtClean="0"/>
-              <a:t>With this violin plot, we see the average run time gradually increasing over time. </a:t>
-            </a:r>
-          </a:p>
-          <a:p>
-            <a:endParaRPr lang="en-US" dirty="0"/>
-          </a:p>
-          <a:p>
-            <a:r>
-              <a:rPr lang="en-US" dirty="0" smtClean="0"/>
-              <a:t>The most dramatic shift is when the animation returns to 1999 from 2012.</a:t>
-            </a:r>
-            <a:endParaRPr lang="en-US" dirty="0"/>
-          </a:p>
-        </p:txBody>
-      </p:sp>
-    </p:spTree>
-    <p:extLst>
-      <p:ext uri="{BB962C8B-B14F-4D97-AF65-F5344CB8AC3E}">
-        <p14:creationId xmlns:p14="http://schemas.microsoft.com/office/powerpoint/2010/main" val="2807468785"/>
-      </p:ext>
-    </p:extLst>
-  </p:cSld>
-  <p:clrMapOvr>
-    <a:masterClrMapping/>
-  </p:clrMapOvr>
-  <p:timing>
-    <p:tnLst>
-      <p:par>
-        <p:cTn id="1" dur="indefinite" restart="never" nodeType="tmRoot"/>
-      </p:par>
-    </p:tnLst>
-  </p:timing>
-</p:sld>
-</file>
-
-<file path=ppt/slides/slide17.xml><?xml version="1.0" encoding="utf-8"?>
+<file path=ppt/slides/slide15.xml><?xml version="1.0" encoding="utf-8"?>
 <p:sld xmlns:a="http://schemas.openxmlformats.org/drawingml/2006/main" xmlns:r="http://schemas.openxmlformats.org/officeDocument/2006/relationships" xmlns:p="http://schemas.openxmlformats.org/presentationml/2006/main">
   <p:cSld>
     <p:spTree>
@@ -14494,11 +14198,7 @@
             </a:br>
             <a:r>
               <a:rPr lang="en-US" dirty="0" smtClean="0"/>
-              <a:t>– </a:t>
-            </a:r>
-            <a:r>
-              <a:rPr lang="en-US" dirty="0" smtClean="0"/>
-              <a:t>Time (continued)</a:t>
+              <a:t>– Time (continued)</a:t>
             </a:r>
             <a:endParaRPr lang="en-US" dirty="0"/>
           </a:p>
@@ -14521,7 +14221,7 @@
           <a:p>
             <a:fld id="{7B7DB76D-28D5-4DAC-900A-A1330999554A}" type="slidenum">
               <a:rPr lang="en-US" smtClean="0"/>
-              <a:t>17</a:t>
+              <a:t>15</a:t>
             </a:fld>
             <a:endParaRPr lang="en-US"/>
           </a:p>
@@ -14750,7 +14450,7 @@
 </p:sld>
 </file>
 
-<file path=ppt/slides/slide18.xml><?xml version="1.0" encoding="utf-8"?>
+<file path=ppt/slides/slide16.xml><?xml version="1.0" encoding="utf-8"?>
 <p:sld xmlns:a="http://schemas.openxmlformats.org/drawingml/2006/main" xmlns:r="http://schemas.openxmlformats.org/officeDocument/2006/relationships" xmlns:p="http://schemas.openxmlformats.org/presentationml/2006/main">
   <p:cSld>
     <p:spTree>
@@ -14784,6 +14484,157 @@
           <a:p>
             <a:r>
               <a:rPr lang="en-US" dirty="0" smtClean="0"/>
+              <a:t>How run times vary by year</a:t>
+            </a:r>
+            <a:endParaRPr lang="en-US" dirty="0"/>
+          </a:p>
+        </p:txBody>
+      </p:sp>
+      <p:pic>
+        <p:nvPicPr>
+          <p:cNvPr id="5" name="Content Placeholder 4"/>
+          <p:cNvPicPr>
+            <a:picLocks noGrp="1" noChangeAspect="1"/>
+          </p:cNvPicPr>
+          <p:nvPr>
+            <p:ph idx="1"/>
+          </p:nvPr>
+        </p:nvPicPr>
+        <p:blipFill>
+          <a:blip r:embed="rId3">
+            <a:extLst>
+              <a:ext uri="{28A0092B-C50C-407E-A947-70E740481C1C}">
+                <a14:useLocalDpi xmlns:a14="http://schemas.microsoft.com/office/drawing/2010/main" val="0"/>
+              </a:ext>
+            </a:extLst>
+          </a:blip>
+          <a:stretch>
+            <a:fillRect/>
+          </a:stretch>
+        </p:blipFill>
+        <p:spPr>
+          <a:xfrm>
+            <a:off x="4958760" y="1862259"/>
+            <a:ext cx="5842127" cy="4021015"/>
+          </a:xfrm>
+        </p:spPr>
+      </p:pic>
+      <p:sp>
+        <p:nvSpPr>
+          <p:cNvPr id="4" name="Slide Number Placeholder 3"/>
+          <p:cNvSpPr>
+            <a:spLocks noGrp="1"/>
+          </p:cNvSpPr>
+          <p:nvPr>
+            <p:ph type="sldNum" sz="quarter" idx="12"/>
+          </p:nvPr>
+        </p:nvSpPr>
+        <p:spPr/>
+        <p:txBody>
+          <a:bodyPr/>
+          <a:lstStyle/>
+          <a:p>
+            <a:fld id="{7B7DB76D-28D5-4DAC-900A-A1330999554A}" type="slidenum">
+              <a:rPr lang="en-US" smtClean="0"/>
+              <a:t>16</a:t>
+            </a:fld>
+            <a:endParaRPr lang="en-US"/>
+          </a:p>
+        </p:txBody>
+      </p:sp>
+      <p:sp>
+        <p:nvSpPr>
+          <p:cNvPr id="3" name="TextBox 2"/>
+          <p:cNvSpPr txBox="1"/>
+          <p:nvPr/>
+        </p:nvSpPr>
+        <p:spPr>
+          <a:xfrm>
+            <a:off x="1324708" y="1770185"/>
+            <a:ext cx="3458307" cy="2031325"/>
+          </a:xfrm>
+          <a:prstGeom prst="rect">
+            <a:avLst/>
+          </a:prstGeom>
+          <a:noFill/>
+        </p:spPr>
+        <p:txBody>
+          <a:bodyPr wrap="square" rtlCol="0">
+            <a:spAutoFit/>
+          </a:bodyPr>
+          <a:lstStyle/>
+          <a:p>
+            <a:r>
+              <a:rPr lang="en-US" dirty="0" smtClean="0"/>
+              <a:t>With this violin plot, we see the average run time gradually increasing over time. </a:t>
+            </a:r>
+          </a:p>
+          <a:p>
+            <a:endParaRPr lang="en-US" dirty="0"/>
+          </a:p>
+          <a:p>
+            <a:r>
+              <a:rPr lang="en-US" dirty="0" smtClean="0"/>
+              <a:t>The most dramatic shift is when the animation returns to 1999 from 2012.</a:t>
+            </a:r>
+            <a:endParaRPr lang="en-US" dirty="0"/>
+          </a:p>
+        </p:txBody>
+      </p:sp>
+    </p:spTree>
+    <p:extLst>
+      <p:ext uri="{BB962C8B-B14F-4D97-AF65-F5344CB8AC3E}">
+        <p14:creationId xmlns:p14="http://schemas.microsoft.com/office/powerpoint/2010/main" val="2807468785"/>
+      </p:ext>
+    </p:extLst>
+  </p:cSld>
+  <p:clrMapOvr>
+    <a:masterClrMapping/>
+  </p:clrMapOvr>
+  <p:timing>
+    <p:tnLst>
+      <p:par>
+        <p:cTn id="1" dur="indefinite" restart="never" nodeType="tmRoot"/>
+      </p:par>
+    </p:tnLst>
+  </p:timing>
+</p:sld>
+</file>
+
+<file path=ppt/slides/slide17.xml><?xml version="1.0" encoding="utf-8"?>
+<p:sld xmlns:a="http://schemas.openxmlformats.org/drawingml/2006/main" xmlns:r="http://schemas.openxmlformats.org/officeDocument/2006/relationships" xmlns:p="http://schemas.openxmlformats.org/presentationml/2006/main">
+  <p:cSld>
+    <p:spTree>
+      <p:nvGrpSpPr>
+        <p:cNvPr id="1" name=""/>
+        <p:cNvGrpSpPr/>
+        <p:nvPr/>
+      </p:nvGrpSpPr>
+      <p:grpSpPr>
+        <a:xfrm>
+          <a:off x="0" y="0"/>
+          <a:ext cx="0" cy="0"/>
+          <a:chOff x="0" y="0"/>
+          <a:chExt cx="0" cy="0"/>
+        </a:xfrm>
+      </p:grpSpPr>
+      <p:sp>
+        <p:nvSpPr>
+          <p:cNvPr id="2" name="Title 1"/>
+          <p:cNvSpPr>
+            <a:spLocks noGrp="1"/>
+          </p:cNvSpPr>
+          <p:nvPr>
+            <p:ph type="title"/>
+          </p:nvPr>
+        </p:nvSpPr>
+        <p:spPr/>
+        <p:txBody>
+          <a:bodyPr/>
+          <a:lstStyle/>
+          <a:p>
+            <a:r>
+              <a:rPr lang="en-US" dirty="0" smtClean="0"/>
               <a:t>Men’s Runners Results</a:t>
             </a:r>
             <a:br>
@@ -14904,7 +14755,7 @@
           <a:p>
             <a:fld id="{7B7DB76D-28D5-4DAC-900A-A1330999554A}" type="slidenum">
               <a:rPr lang="en-US" smtClean="0"/>
-              <a:t>18</a:t>
+              <a:t>17</a:t>
             </a:fld>
             <a:endParaRPr lang="en-US"/>
           </a:p>
@@ -15072,16 +14923,134 @@
           </a:extLst>
         </p:spPr>
       </p:pic>
+    </p:spTree>
+    <p:extLst>
+      <p:ext uri="{BB962C8B-B14F-4D97-AF65-F5344CB8AC3E}">
+        <p14:creationId xmlns:p14="http://schemas.microsoft.com/office/powerpoint/2010/main" val="2457170447"/>
+      </p:ext>
+    </p:extLst>
+  </p:cSld>
+  <p:clrMapOvr>
+    <a:masterClrMapping/>
+  </p:clrMapOvr>
+  <p:timing>
+    <p:tnLst>
+      <p:par>
+        <p:cTn id="1" dur="indefinite" restart="never" nodeType="tmRoot"/>
+      </p:par>
+    </p:tnLst>
+  </p:timing>
+</p:sld>
+</file>
+
+<file path=ppt/slides/slide18.xml><?xml version="1.0" encoding="utf-8"?>
+<p:sld xmlns:a="http://schemas.openxmlformats.org/drawingml/2006/main" xmlns:r="http://schemas.openxmlformats.org/officeDocument/2006/relationships" xmlns:p="http://schemas.openxmlformats.org/presentationml/2006/main">
+  <p:cSld>
+    <p:spTree>
+      <p:nvGrpSpPr>
+        <p:cNvPr id="1" name=""/>
+        <p:cNvGrpSpPr/>
+        <p:nvPr/>
+      </p:nvGrpSpPr>
+      <p:grpSpPr>
+        <a:xfrm>
+          <a:off x="0" y="0"/>
+          <a:ext cx="0" cy="0"/>
+          <a:chOff x="0" y="0"/>
+          <a:chExt cx="0" cy="0"/>
+        </a:xfrm>
+      </p:grpSpPr>
+      <p:sp>
+        <p:nvSpPr>
+          <p:cNvPr id="2" name="Title 1"/>
+          <p:cNvSpPr>
+            <a:spLocks noGrp="1"/>
+          </p:cNvSpPr>
+          <p:nvPr>
+            <p:ph type="title"/>
+          </p:nvPr>
+        </p:nvSpPr>
+        <p:spPr>
+          <a:xfrm>
+            <a:off x="1141413" y="618518"/>
+            <a:ext cx="5482127" cy="1478570"/>
+          </a:xfrm>
+        </p:spPr>
+        <p:txBody>
+          <a:bodyPr/>
+          <a:lstStyle/>
+          <a:p>
+            <a:r>
+              <a:rPr lang="en-US" dirty="0" smtClean="0"/>
+              <a:t>Averages by year</a:t>
+            </a:r>
+            <a:endParaRPr lang="en-US" dirty="0"/>
+          </a:p>
+        </p:txBody>
+      </p:sp>
+      <p:sp>
+        <p:nvSpPr>
+          <p:cNvPr id="3" name="Content Placeholder 2"/>
+          <p:cNvSpPr>
+            <a:spLocks noGrp="1"/>
+          </p:cNvSpPr>
+          <p:nvPr>
+            <p:ph idx="1"/>
+          </p:nvPr>
+        </p:nvSpPr>
+        <p:spPr>
+          <a:xfrm>
+            <a:off x="676956" y="1731466"/>
+            <a:ext cx="5926288" cy="3541714"/>
+          </a:xfrm>
+        </p:spPr>
+        <p:txBody>
+          <a:bodyPr>
+            <a:normAutofit lnSpcReduction="10000"/>
+          </a:bodyPr>
+          <a:lstStyle/>
+          <a:p>
+            <a:r>
+              <a:rPr lang="en-US" dirty="0" smtClean="0"/>
+              <a:t>One of our team’s hypotheses claims there was a higher percentage of professional runners in the early years of this data. With an increasing average time and a decreasing average age, we expect a higher number of people who join for the fun and not in preparation for more serious marathons.</a:t>
+            </a:r>
+            <a:endParaRPr lang="en-US" dirty="0"/>
+          </a:p>
+        </p:txBody>
+      </p:sp>
+      <p:sp>
+        <p:nvSpPr>
+          <p:cNvPr id="4" name="Slide Number Placeholder 3"/>
+          <p:cNvSpPr>
+            <a:spLocks noGrp="1"/>
+          </p:cNvSpPr>
+          <p:nvPr>
+            <p:ph type="sldNum" sz="quarter" idx="12"/>
+          </p:nvPr>
+        </p:nvSpPr>
+        <p:spPr/>
+        <p:txBody>
+          <a:bodyPr/>
+          <a:lstStyle/>
+          <a:p>
+            <a:fld id="{7B7DB76D-28D5-4DAC-900A-A1330999554A}" type="slidenum">
+              <a:rPr lang="en-US" smtClean="0"/>
+              <a:t>18</a:t>
+            </a:fld>
+            <a:endParaRPr lang="en-US"/>
+          </a:p>
+        </p:txBody>
+      </p:sp>
       <p:pic>
         <p:nvPicPr>
-          <p:cNvPr id="3077" name="Picture 5"/>
+          <p:cNvPr id="5" name="Picture 5"/>
           <p:cNvPicPr>
             <a:picLocks noChangeAspect="1" noChangeArrowheads="1"/>
           </p:cNvPicPr>
           <p:nvPr/>
         </p:nvPicPr>
         <p:blipFill>
-          <a:blip r:embed="rId5">
+          <a:blip r:embed="rId2">
             <a:extLst>
               <a:ext uri="{28A0092B-C50C-407E-A947-70E740481C1C}">
                 <a14:useLocalDpi xmlns:a14="http://schemas.microsoft.com/office/drawing/2010/main" val="0"/>
@@ -15095,8 +15064,8 @@
         </p:blipFill>
         <p:spPr bwMode="auto">
           <a:xfrm>
-            <a:off x="8512553" y="3319369"/>
-            <a:ext cx="2886636" cy="2563905"/>
+            <a:off x="6775184" y="3161743"/>
+            <a:ext cx="5105881" cy="3473103"/>
           </a:xfrm>
           <a:prstGeom prst="rect">
             <a:avLst/>
@@ -15128,14 +15097,14 @@
       </p:pic>
       <p:pic>
         <p:nvPicPr>
-          <p:cNvPr id="3078" name="Picture 6"/>
+          <p:cNvPr id="6" name="Picture 6"/>
           <p:cNvPicPr>
             <a:picLocks noChangeAspect="1" noChangeArrowheads="1"/>
           </p:cNvPicPr>
           <p:nvPr/>
         </p:nvPicPr>
         <p:blipFill>
-          <a:blip r:embed="rId6">
+          <a:blip r:embed="rId3">
             <a:extLst>
               <a:ext uri="{28A0092B-C50C-407E-A947-70E740481C1C}">
                 <a14:useLocalDpi xmlns:a14="http://schemas.microsoft.com/office/drawing/2010/main" val="0"/>
@@ -15149,8 +15118,8 @@
         </p:blipFill>
         <p:spPr bwMode="auto">
           <a:xfrm>
-            <a:off x="784692" y="3841376"/>
-            <a:ext cx="4056249" cy="2415989"/>
+            <a:off x="6775184" y="120571"/>
+            <a:ext cx="5105881" cy="3041172"/>
           </a:xfrm>
           <a:prstGeom prst="rect">
             <a:avLst/>
@@ -15180,10 +15149,224 @@
           </a:extLst>
         </p:spPr>
       </p:pic>
+      <p:grpSp>
+        <p:nvGrpSpPr>
+          <p:cNvPr id="10" name="Group 9"/>
+          <p:cNvGrpSpPr/>
+          <p:nvPr/>
+        </p:nvGrpSpPr>
+        <p:grpSpPr>
+          <a:xfrm rot="19555377">
+            <a:off x="9407052" y="1453294"/>
+            <a:ext cx="1442804" cy="790746"/>
+            <a:chOff x="4420213" y="1502839"/>
+            <a:chExt cx="1442804" cy="790746"/>
+          </a:xfrm>
+        </p:grpSpPr>
+        <p:sp>
+          <p:nvSpPr>
+            <p:cNvPr id="7" name="Up Arrow 6"/>
+            <p:cNvSpPr/>
+            <p:nvPr/>
+          </p:nvSpPr>
+          <p:spPr>
+            <a:xfrm rot="5400000">
+              <a:off x="4945117" y="1375685"/>
+              <a:ext cx="392996" cy="1442804"/>
+            </a:xfrm>
+            <a:prstGeom prst="upArrow">
+              <a:avLst/>
+            </a:prstGeom>
+            <a:ln>
+              <a:solidFill>
+                <a:srgbClr val="FF0000"/>
+              </a:solidFill>
+            </a:ln>
+          </p:spPr>
+          <p:style>
+            <a:lnRef idx="2">
+              <a:schemeClr val="accent1">
+                <a:shade val="50000"/>
+              </a:schemeClr>
+            </a:lnRef>
+            <a:fillRef idx="1">
+              <a:schemeClr val="accent1"/>
+            </a:fillRef>
+            <a:effectRef idx="0">
+              <a:schemeClr val="accent1"/>
+            </a:effectRef>
+            <a:fontRef idx="minor">
+              <a:schemeClr val="lt1"/>
+            </a:fontRef>
+          </p:style>
+          <p:txBody>
+            <a:bodyPr rtlCol="0" anchor="ctr"/>
+            <a:lstStyle/>
+            <a:p>
+              <a:pPr algn="ctr"/>
+              <a:endParaRPr lang="en-US"/>
+            </a:p>
+          </p:txBody>
+        </p:sp>
+        <p:sp>
+          <p:nvSpPr>
+            <p:cNvPr id="9" name="TextBox 8"/>
+            <p:cNvSpPr txBox="1"/>
+            <p:nvPr/>
+          </p:nvSpPr>
+          <p:spPr>
+            <a:xfrm>
+              <a:off x="4440442" y="1502839"/>
+              <a:ext cx="1334220" cy="461665"/>
+            </a:xfrm>
+            <a:prstGeom prst="rect">
+              <a:avLst/>
+            </a:prstGeom>
+            <a:noFill/>
+          </p:spPr>
+          <p:txBody>
+            <a:bodyPr wrap="square" rtlCol="0">
+              <a:spAutoFit/>
+            </a:bodyPr>
+            <a:lstStyle/>
+            <a:p>
+              <a:pPr algn="ctr"/>
+              <a:r>
+                <a:rPr lang="en-US" sz="2400" dirty="0" err="1" smtClean="0">
+                  <a:solidFill>
+                    <a:schemeClr val="bg1"/>
+                  </a:solidFill>
+                </a:rPr>
+                <a:t>Avg</a:t>
+              </a:r>
+              <a:r>
+                <a:rPr lang="en-US" sz="2400" dirty="0" smtClean="0">
+                  <a:solidFill>
+                    <a:schemeClr val="bg1"/>
+                  </a:solidFill>
+                </a:rPr>
+                <a:t> Time</a:t>
+              </a:r>
+              <a:endParaRPr lang="en-US" sz="2400" dirty="0">
+                <a:solidFill>
+                  <a:schemeClr val="bg1"/>
+                </a:solidFill>
+              </a:endParaRPr>
+            </a:p>
+          </p:txBody>
+        </p:sp>
+      </p:grpSp>
+      <p:grpSp>
+        <p:nvGrpSpPr>
+          <p:cNvPr id="11" name="Group 10"/>
+          <p:cNvGrpSpPr/>
+          <p:nvPr/>
+        </p:nvGrpSpPr>
+        <p:grpSpPr>
+          <a:xfrm rot="1987393">
+            <a:off x="7482432" y="4913933"/>
+            <a:ext cx="1496951" cy="790746"/>
+            <a:chOff x="4420213" y="1502839"/>
+            <a:chExt cx="1442804" cy="790746"/>
+          </a:xfrm>
+        </p:grpSpPr>
+        <p:sp>
+          <p:nvSpPr>
+            <p:cNvPr id="12" name="Up Arrow 11"/>
+            <p:cNvSpPr/>
+            <p:nvPr/>
+          </p:nvSpPr>
+          <p:spPr>
+            <a:xfrm rot="5400000">
+              <a:off x="4945117" y="1375685"/>
+              <a:ext cx="392996" cy="1442804"/>
+            </a:xfrm>
+            <a:prstGeom prst="upArrow">
+              <a:avLst/>
+            </a:prstGeom>
+            <a:ln>
+              <a:solidFill>
+                <a:srgbClr val="FF0000"/>
+              </a:solidFill>
+            </a:ln>
+          </p:spPr>
+          <p:style>
+            <a:lnRef idx="2">
+              <a:schemeClr val="accent1">
+                <a:shade val="50000"/>
+              </a:schemeClr>
+            </a:lnRef>
+            <a:fillRef idx="1">
+              <a:schemeClr val="accent1"/>
+            </a:fillRef>
+            <a:effectRef idx="0">
+              <a:schemeClr val="accent1"/>
+            </a:effectRef>
+            <a:fontRef idx="minor">
+              <a:schemeClr val="lt1"/>
+            </a:fontRef>
+          </p:style>
+          <p:txBody>
+            <a:bodyPr rtlCol="0" anchor="ctr"/>
+            <a:lstStyle/>
+            <a:p>
+              <a:pPr algn="ctr"/>
+              <a:endParaRPr lang="en-US"/>
+            </a:p>
+          </p:txBody>
+        </p:sp>
+        <p:sp>
+          <p:nvSpPr>
+            <p:cNvPr id="13" name="TextBox 12"/>
+            <p:cNvSpPr txBox="1"/>
+            <p:nvPr/>
+          </p:nvSpPr>
+          <p:spPr>
+            <a:xfrm>
+              <a:off x="4508569" y="1502839"/>
+              <a:ext cx="1266092" cy="461665"/>
+            </a:xfrm>
+            <a:prstGeom prst="rect">
+              <a:avLst/>
+            </a:prstGeom>
+            <a:noFill/>
+          </p:spPr>
+          <p:txBody>
+            <a:bodyPr wrap="square" rtlCol="0">
+              <a:spAutoFit/>
+            </a:bodyPr>
+            <a:lstStyle/>
+            <a:p>
+              <a:pPr algn="ctr"/>
+              <a:r>
+                <a:rPr lang="en-US" sz="2400" dirty="0" err="1" smtClean="0">
+                  <a:solidFill>
+                    <a:schemeClr val="bg1"/>
+                  </a:solidFill>
+                </a:rPr>
+                <a:t>Avg</a:t>
+              </a:r>
+              <a:r>
+                <a:rPr lang="en-US" sz="2400" dirty="0" smtClean="0">
+                  <a:solidFill>
+                    <a:schemeClr val="bg1"/>
+                  </a:solidFill>
+                </a:rPr>
+                <a:t> Age</a:t>
+              </a:r>
+              <a:endParaRPr lang="en-US" sz="2400" dirty="0">
+                <a:solidFill>
+                  <a:schemeClr val="bg1"/>
+                </a:solidFill>
+              </a:endParaRPr>
+            </a:p>
+          </p:txBody>
+        </p:sp>
+      </p:grpSp>
     </p:spTree>
     <p:extLst>
       <p:ext uri="{BB962C8B-B14F-4D97-AF65-F5344CB8AC3E}">
-        <p14:creationId xmlns:p14="http://schemas.microsoft.com/office/powerpoint/2010/main" val="2457170447"/>
+        <p14:creationId xmlns:p14="http://schemas.microsoft.com/office/powerpoint/2010/main" val="723082620"/>
       </p:ext>
     </p:extLst>
   </p:cSld>
@@ -15227,7 +15410,12 @@
             <p:ph type="title"/>
           </p:nvPr>
         </p:nvSpPr>
-        <p:spPr/>
+        <p:spPr>
+          <a:xfrm>
+            <a:off x="1141410" y="562706"/>
+            <a:ext cx="5934508" cy="561363"/>
+          </a:xfrm>
+        </p:spPr>
         <p:txBody>
           <a:bodyPr/>
           <a:lstStyle/>
@@ -15265,8 +15453,8 @@
         </p:blipFill>
         <p:spPr bwMode="auto">
           <a:xfrm>
-            <a:off x="3961866" y="3425941"/>
-            <a:ext cx="3179576" cy="2221941"/>
+            <a:off x="6096423" y="2851340"/>
+            <a:ext cx="5192899" cy="3628885"/>
           </a:xfrm>
           <a:prstGeom prst="rect">
             <a:avLst/>
@@ -15306,7 +15494,12 @@
             <p:ph type="body" sz="half" idx="2"/>
           </p:nvPr>
         </p:nvSpPr>
-        <p:spPr/>
+        <p:spPr>
+          <a:xfrm>
+            <a:off x="1141407" y="1124069"/>
+            <a:ext cx="5934511" cy="3541714"/>
+          </a:xfrm>
+        </p:spPr>
         <p:txBody>
           <a:bodyPr/>
           <a:lstStyle/>
@@ -15389,8 +15582,8 @@
         </p:blipFill>
         <p:spPr bwMode="auto">
           <a:xfrm>
-            <a:off x="896470" y="3452183"/>
-            <a:ext cx="2725271" cy="2169458"/>
+            <a:off x="134470" y="3065320"/>
+            <a:ext cx="4543462" cy="3616833"/>
           </a:xfrm>
           <a:prstGeom prst="rect">
             <a:avLst/>
@@ -20006,35 +20199,41 @@
           <a:p>
             <a:r>
               <a:rPr lang="en-US" dirty="0" smtClean="0"/>
-              <a:t>Exploratory</a:t>
+              <a:t>How age distributions vary by year</a:t>
             </a:r>
             <a:endParaRPr lang="en-US" dirty="0"/>
           </a:p>
         </p:txBody>
       </p:sp>
-      <p:sp>
-        <p:nvSpPr>
-          <p:cNvPr id="3" name="Content Placeholder 2"/>
-          <p:cNvSpPr>
-            <a:spLocks noGrp="1"/>
-          </p:cNvSpPr>
+      <p:pic>
+        <p:nvPicPr>
+          <p:cNvPr id="5" name="Content Placeholder 4"/>
+          <p:cNvPicPr>
+            <a:picLocks noGrp="1" noChangeAspect="1"/>
+          </p:cNvPicPr>
           <p:nvPr>
             <p:ph idx="1"/>
           </p:nvPr>
-        </p:nvSpPr>
-        <p:spPr/>
-        <p:txBody>
-          <a:bodyPr/>
-          <a:lstStyle/>
-          <a:p>
-            <a:r>
-              <a:rPr lang="en-US" dirty="0" smtClean="0"/>
-              <a:t>Ben/Austin</a:t>
-            </a:r>
-            <a:endParaRPr lang="en-US" dirty="0"/>
-          </a:p>
-        </p:txBody>
-      </p:sp>
+        </p:nvPicPr>
+        <p:blipFill>
+          <a:blip r:embed="rId2">
+            <a:extLst>
+              <a:ext uri="{28A0092B-C50C-407E-A947-70E740481C1C}">
+                <a14:useLocalDpi xmlns:a14="http://schemas.microsoft.com/office/drawing/2010/main" val="0"/>
+              </a:ext>
+            </a:extLst>
+          </a:blip>
+          <a:stretch>
+            <a:fillRect/>
+          </a:stretch>
+        </p:blipFill>
+        <p:spPr>
+          <a:xfrm>
+            <a:off x="128953" y="2312815"/>
+            <a:ext cx="5908431" cy="4066651"/>
+          </a:xfrm>
+        </p:spPr>
+      </p:pic>
       <p:sp>
         <p:nvSpPr>
           <p:cNvPr id="4" name="Slide Number Placeholder 3"/>
@@ -20058,10 +20257,40 @@
           </a:p>
         </p:txBody>
       </p:sp>
+      <p:pic>
+        <p:nvPicPr>
+          <p:cNvPr id="6" name="Picture 5"/>
+          <p:cNvPicPr>
+            <a:picLocks noChangeAspect="1"/>
+          </p:cNvPicPr>
+          <p:nvPr/>
+        </p:nvPicPr>
+        <p:blipFill>
+          <a:blip r:embed="rId3">
+            <a:extLst>
+              <a:ext uri="{28A0092B-C50C-407E-A947-70E740481C1C}">
+                <a14:useLocalDpi xmlns:a14="http://schemas.microsoft.com/office/drawing/2010/main" val="0"/>
+              </a:ext>
+            </a:extLst>
+          </a:blip>
+          <a:stretch>
+            <a:fillRect/>
+          </a:stretch>
+        </p:blipFill>
+        <p:spPr>
+          <a:xfrm>
+            <a:off x="6119446" y="2312816"/>
+            <a:ext cx="5911961" cy="4069080"/>
+          </a:xfrm>
+          <a:prstGeom prst="rect">
+            <a:avLst/>
+          </a:prstGeom>
+        </p:spPr>
+      </p:pic>
     </p:spTree>
     <p:extLst>
       <p:ext uri="{BB962C8B-B14F-4D97-AF65-F5344CB8AC3E}">
-        <p14:creationId xmlns:p14="http://schemas.microsoft.com/office/powerpoint/2010/main" val="4270067039"/>
+        <p14:creationId xmlns:p14="http://schemas.microsoft.com/office/powerpoint/2010/main" val="1886516530"/>
       </p:ext>
     </p:extLst>
   </p:cSld>

</xml_diff>

<commit_message>
Added conclusion and minor changes.
</commit_message>
<xml_diff>
--- a/infographic.pptx
+++ b/infographic.pptx
@@ -232,7 +232,7 @@
           <a:p>
             <a:fld id="{E3A6CB1D-A3B7-434B-ABB5-99D9CB0EF729}" type="datetimeFigureOut">
               <a:rPr lang="en-US" smtClean="0"/>
-              <a:t>7/4/2017</a:t>
+              <a:t>7/5/2017</a:t>
             </a:fld>
             <a:endParaRPr lang="en-US"/>
           </a:p>
@@ -296,38 +296,37 @@
           <a:p>
             <a:pPr lvl="0"/>
             <a:r>
-              <a:rPr lang="en-US" smtClean="0"/>
+              <a:rPr lang="en-US"/>
               <a:t>Click to edit Master text styles</a:t>
             </a:r>
           </a:p>
           <a:p>
             <a:pPr lvl="1"/>
             <a:r>
-              <a:rPr lang="en-US" smtClean="0"/>
+              <a:rPr lang="en-US"/>
               <a:t>Second level</a:t>
             </a:r>
           </a:p>
           <a:p>
             <a:pPr lvl="2"/>
             <a:r>
-              <a:rPr lang="en-US" smtClean="0"/>
+              <a:rPr lang="en-US"/>
               <a:t>Third level</a:t>
             </a:r>
           </a:p>
           <a:p>
             <a:pPr lvl="3"/>
             <a:r>
-              <a:rPr lang="en-US" smtClean="0"/>
+              <a:rPr lang="en-US"/>
               <a:t>Fourth level</a:t>
             </a:r>
           </a:p>
           <a:p>
             <a:pPr lvl="4"/>
             <a:r>
-              <a:rPr lang="en-US" smtClean="0"/>
+              <a:rPr lang="en-US"/>
               <a:t>Fifth level</a:t>
             </a:r>
-            <a:endParaRPr lang="en-US"/>
           </a:p>
         </p:txBody>
       </p:sp>
@@ -629,11 +628,11 @@
           <a:lstStyle/>
           <a:p>
             <a:r>
-              <a:rPr lang="en-US" dirty="0" smtClean="0"/>
+              <a:rPr lang="en-US" dirty="0"/>
               <a:t>This slide helps</a:t>
             </a:r>
             <a:r>
-              <a:rPr lang="en-US" baseline="0" dirty="0" smtClean="0"/>
+              <a:rPr lang="en-US" baseline="0" dirty="0"/>
               <a:t> blend the Scientific Method with Data Science.</a:t>
             </a:r>
           </a:p>
@@ -804,11 +803,11 @@
           <a:lstStyle/>
           <a:p>
             <a:r>
-              <a:rPr lang="en-US" dirty="0" smtClean="0"/>
+              <a:rPr lang="en-US" dirty="0"/>
               <a:t>Should we put the findings section on another</a:t>
             </a:r>
             <a:r>
-              <a:rPr lang="en-US" baseline="0" dirty="0" smtClean="0"/>
+              <a:rPr lang="en-US" baseline="0" dirty="0"/>
               <a:t> slide? </a:t>
             </a:r>
             <a:endParaRPr lang="en-US" dirty="0"/>
@@ -1027,7 +1026,7 @@
           </a:lstStyle>
           <a:p>
             <a:r>
-              <a:rPr lang="en-US" smtClean="0"/>
+              <a:rPr lang="en-US"/>
               <a:t>Click to edit Master title style</a:t>
             </a:r>
             <a:endParaRPr lang="en-US" dirty="0"/>
@@ -1147,7 +1146,7 @@
           </a:lstStyle>
           <a:p>
             <a:r>
-              <a:rPr lang="en-US" smtClean="0"/>
+              <a:rPr lang="en-US"/>
               <a:t>Click to edit Master subtitle style</a:t>
             </a:r>
             <a:endParaRPr lang="en-US" dirty="0"/>
@@ -1186,7 +1185,7 @@
           <a:p>
             <a:fld id="{2BFD8FD3-6BC4-425F-891D-0741A439FEF5}" type="datetime1">
               <a:rPr lang="en-US" smtClean="0"/>
-              <a:t>7/4/2017</a:t>
+              <a:t>7/5/2017</a:t>
             </a:fld>
             <a:endParaRPr lang="en-US"/>
           </a:p>
@@ -2097,7 +2096,7 @@
           </a:lstStyle>
           <a:p>
             <a:r>
-              <a:rPr lang="en-US" smtClean="0"/>
+              <a:rPr lang="en-US"/>
               <a:t>Click to edit Master title style</a:t>
             </a:r>
             <a:endParaRPr lang="en-US" dirty="0"/>
@@ -2176,7 +2175,7 @@
           </a:lstStyle>
           <a:p>
             <a:r>
-              <a:rPr lang="en-US" smtClean="0"/>
+              <a:rPr lang="en-US"/>
               <a:t>Click icon to add picture</a:t>
             </a:r>
             <a:endParaRPr lang="en-US" dirty="0"/>
@@ -2251,7 +2250,7 @@
           <a:p>
             <a:pPr lvl="0"/>
             <a:r>
-              <a:rPr lang="en-US" smtClean="0"/>
+              <a:rPr lang="en-US"/>
               <a:t>Click to edit Master text styles</a:t>
             </a:r>
           </a:p>
@@ -2274,7 +2273,7 @@
           <a:p>
             <a:fld id="{441CFBDD-FC00-4979-962A-B16E941AAB17}" type="datetime1">
               <a:rPr lang="en-US" smtClean="0"/>
-              <a:t>7/4/2017</a:t>
+              <a:t>7/5/2017</a:t>
             </a:fld>
             <a:endParaRPr lang="en-US"/>
           </a:p>
@@ -3164,7 +3163,7 @@
           </a:lstStyle>
           <a:p>
             <a:r>
-              <a:rPr lang="en-US" smtClean="0"/>
+              <a:rPr lang="en-US"/>
               <a:t>Click to edit Master title style</a:t>
             </a:r>
             <a:endParaRPr lang="en-US" dirty="0"/>
@@ -3232,7 +3231,7 @@
           <a:p>
             <a:pPr lvl="0"/>
             <a:r>
-              <a:rPr lang="en-US" smtClean="0"/>
+              <a:rPr lang="en-US"/>
               <a:t>Click to edit Master text styles</a:t>
             </a:r>
           </a:p>
@@ -3255,7 +3254,7 @@
           <a:p>
             <a:fld id="{441CFBDD-FC00-4979-962A-B16E941AAB17}" type="datetime1">
               <a:rPr lang="en-US" smtClean="0"/>
-              <a:t>7/4/2017</a:t>
+              <a:t>7/5/2017</a:t>
             </a:fld>
             <a:endParaRPr lang="en-US"/>
           </a:p>
@@ -4223,7 +4222,7 @@
           </a:lstStyle>
           <a:p>
             <a:r>
-              <a:rPr lang="en-US" smtClean="0"/>
+              <a:rPr lang="en-US"/>
               <a:t>Click to edit Master title style</a:t>
             </a:r>
             <a:endParaRPr lang="en-US" dirty="0"/>
@@ -4300,7 +4299,7 @@
           <a:p>
             <a:pPr lvl="0"/>
             <a:r>
-              <a:rPr lang="en-US" smtClean="0"/>
+              <a:rPr lang="en-US"/>
               <a:t>Click to edit Master text styles</a:t>
             </a:r>
           </a:p>
@@ -4367,7 +4366,7 @@
           <a:p>
             <a:pPr lvl="0"/>
             <a:r>
-              <a:rPr lang="en-US" smtClean="0"/>
+              <a:rPr lang="en-US"/>
               <a:t>Click to edit Master text styles</a:t>
             </a:r>
           </a:p>
@@ -4390,7 +4389,7 @@
           <a:p>
             <a:fld id="{441CFBDD-FC00-4979-962A-B16E941AAB17}" type="datetime1">
               <a:rPr lang="en-US" smtClean="0"/>
-              <a:t>7/4/2017</a:t>
+              <a:t>7/5/2017</a:t>
             </a:fld>
             <a:endParaRPr lang="en-US"/>
           </a:p>
@@ -5280,7 +5279,7 @@
           </a:lstStyle>
           <a:p>
             <a:r>
-              <a:rPr lang="en-US" smtClean="0"/>
+              <a:rPr lang="en-US"/>
               <a:t>Click to edit Master title style</a:t>
             </a:r>
             <a:endParaRPr lang="en-US" dirty="0"/>
@@ -5401,7 +5400,7 @@
           <a:p>
             <a:pPr lvl="0"/>
             <a:r>
-              <a:rPr lang="en-US" smtClean="0"/>
+              <a:rPr lang="en-US"/>
               <a:t>Click to edit Master text styles</a:t>
             </a:r>
           </a:p>
@@ -5424,7 +5423,7 @@
           <a:p>
             <a:fld id="{441CFBDD-FC00-4979-962A-B16E941AAB17}" type="datetime1">
               <a:rPr lang="en-US" smtClean="0"/>
-              <a:t>7/4/2017</a:t>
+              <a:t>7/5/2017</a:t>
             </a:fld>
             <a:endParaRPr lang="en-US"/>
           </a:p>
@@ -5564,7 +5563,7 @@
           </a:lstStyle>
           <a:p>
             <a:r>
-              <a:rPr lang="en-US" smtClean="0"/>
+              <a:rPr lang="en-US"/>
               <a:t>Click to edit Master title style</a:t>
             </a:r>
             <a:endParaRPr lang="en-US" dirty="0"/>
@@ -5639,7 +5638,7 @@
           <a:p>
             <a:pPr lvl="0"/>
             <a:r>
-              <a:rPr lang="en-US" smtClean="0"/>
+              <a:rPr lang="en-US"/>
               <a:t>Click to edit Master text styles</a:t>
             </a:r>
           </a:p>
@@ -5706,7 +5705,7 @@
           <a:p>
             <a:pPr lvl="0"/>
             <a:r>
-              <a:rPr lang="en-US" smtClean="0"/>
+              <a:rPr lang="en-US"/>
               <a:t>Click to edit Master text styles</a:t>
             </a:r>
           </a:p>
@@ -5780,7 +5779,7 @@
           <a:p>
             <a:pPr lvl="0"/>
             <a:r>
-              <a:rPr lang="en-US" smtClean="0"/>
+              <a:rPr lang="en-US"/>
               <a:t>Click to edit Master text styles</a:t>
             </a:r>
           </a:p>
@@ -5847,7 +5846,7 @@
           <a:p>
             <a:pPr lvl="0"/>
             <a:r>
-              <a:rPr lang="en-US" smtClean="0"/>
+              <a:rPr lang="en-US"/>
               <a:t>Click to edit Master text styles</a:t>
             </a:r>
           </a:p>
@@ -5921,7 +5920,7 @@
           <a:p>
             <a:pPr lvl="0"/>
             <a:r>
-              <a:rPr lang="en-US" smtClean="0"/>
+              <a:rPr lang="en-US"/>
               <a:t>Click to edit Master text styles</a:t>
             </a:r>
           </a:p>
@@ -5988,7 +5987,7 @@
           <a:p>
             <a:pPr lvl="0"/>
             <a:r>
-              <a:rPr lang="en-US" smtClean="0"/>
+              <a:rPr lang="en-US"/>
               <a:t>Click to edit Master text styles</a:t>
             </a:r>
           </a:p>
@@ -6085,7 +6084,7 @@
           <a:p>
             <a:fld id="{441CFBDD-FC00-4979-962A-B16E941AAB17}" type="datetime1">
               <a:rPr lang="en-US" smtClean="0"/>
-              <a:t>7/4/2017</a:t>
+              <a:t>7/5/2017</a:t>
             </a:fld>
             <a:endParaRPr lang="en-US"/>
           </a:p>
@@ -6189,7 +6188,7 @@
           </a:lstStyle>
           <a:p>
             <a:r>
-              <a:rPr lang="en-US" smtClean="0"/>
+              <a:rPr lang="en-US"/>
               <a:t>Click to edit Master title style</a:t>
             </a:r>
             <a:endParaRPr lang="en-US" dirty="0"/>
@@ -6264,7 +6263,7 @@
           <a:p>
             <a:pPr lvl="0"/>
             <a:r>
-              <a:rPr lang="en-US" smtClean="0"/>
+              <a:rPr lang="en-US"/>
               <a:t>Click to edit Master text styles</a:t>
             </a:r>
           </a:p>
@@ -6342,7 +6341,7 @@
           </a:lstStyle>
           <a:p>
             <a:r>
-              <a:rPr lang="en-US" smtClean="0"/>
+              <a:rPr lang="en-US"/>
               <a:t>Click icon to add picture</a:t>
             </a:r>
             <a:endParaRPr lang="en-US" dirty="0"/>
@@ -6410,7 +6409,7 @@
           <a:p>
             <a:pPr lvl="0"/>
             <a:r>
-              <a:rPr lang="en-US" smtClean="0"/>
+              <a:rPr lang="en-US"/>
               <a:t>Click to edit Master text styles</a:t>
             </a:r>
           </a:p>
@@ -6484,7 +6483,7 @@
           <a:p>
             <a:pPr lvl="0"/>
             <a:r>
-              <a:rPr lang="en-US" smtClean="0"/>
+              <a:rPr lang="en-US"/>
               <a:t>Click to edit Master text styles</a:t>
             </a:r>
           </a:p>
@@ -6562,7 +6561,7 @@
           </a:lstStyle>
           <a:p>
             <a:r>
-              <a:rPr lang="en-US" smtClean="0"/>
+              <a:rPr lang="en-US"/>
               <a:t>Click icon to add picture</a:t>
             </a:r>
             <a:endParaRPr lang="en-US" dirty="0"/>
@@ -6630,7 +6629,7 @@
           <a:p>
             <a:pPr lvl="0"/>
             <a:r>
-              <a:rPr lang="en-US" smtClean="0"/>
+              <a:rPr lang="en-US"/>
               <a:t>Click to edit Master text styles</a:t>
             </a:r>
           </a:p>
@@ -6704,7 +6703,7 @@
           <a:p>
             <a:pPr lvl="0"/>
             <a:r>
-              <a:rPr lang="en-US" smtClean="0"/>
+              <a:rPr lang="en-US"/>
               <a:t>Click to edit Master text styles</a:t>
             </a:r>
           </a:p>
@@ -6782,7 +6781,7 @@
           </a:lstStyle>
           <a:p>
             <a:r>
-              <a:rPr lang="en-US" smtClean="0"/>
+              <a:rPr lang="en-US"/>
               <a:t>Click icon to add picture</a:t>
             </a:r>
             <a:endParaRPr lang="en-US" dirty="0"/>
@@ -6850,7 +6849,7 @@
           <a:p>
             <a:pPr lvl="0"/>
             <a:r>
-              <a:rPr lang="en-US" smtClean="0"/>
+              <a:rPr lang="en-US"/>
               <a:t>Click to edit Master text styles</a:t>
             </a:r>
           </a:p>
@@ -6947,7 +6946,7 @@
           <a:p>
             <a:fld id="{441CFBDD-FC00-4979-962A-B16E941AAB17}" type="datetime1">
               <a:rPr lang="en-US" smtClean="0"/>
-              <a:t>7/4/2017</a:t>
+              <a:t>7/5/2017</a:t>
             </a:fld>
             <a:endParaRPr lang="en-US"/>
           </a:p>
@@ -7052,7 +7051,7 @@
           <a:lstStyle/>
           <a:p>
             <a:r>
-              <a:rPr lang="en-US" smtClean="0"/>
+              <a:rPr lang="en-US"/>
               <a:t>Click to edit Master title style</a:t>
             </a:r>
             <a:endParaRPr lang="en-US" dirty="0"/>
@@ -7081,35 +7080,35 @@
           <a:p>
             <a:pPr lvl="0"/>
             <a:r>
-              <a:rPr lang="en-US" smtClean="0"/>
+              <a:rPr lang="en-US"/>
               <a:t>Click to edit Master text styles</a:t>
             </a:r>
           </a:p>
           <a:p>
             <a:pPr lvl="1"/>
             <a:r>
-              <a:rPr lang="en-US" smtClean="0"/>
+              <a:rPr lang="en-US"/>
               <a:t>Second level</a:t>
             </a:r>
           </a:p>
           <a:p>
             <a:pPr lvl="2"/>
             <a:r>
-              <a:rPr lang="en-US" smtClean="0"/>
+              <a:rPr lang="en-US"/>
               <a:t>Third level</a:t>
             </a:r>
           </a:p>
           <a:p>
             <a:pPr lvl="3"/>
             <a:r>
-              <a:rPr lang="en-US" smtClean="0"/>
+              <a:rPr lang="en-US"/>
               <a:t>Fourth level</a:t>
             </a:r>
           </a:p>
           <a:p>
             <a:pPr lvl="4"/>
             <a:r>
-              <a:rPr lang="en-US" smtClean="0"/>
+              <a:rPr lang="en-US"/>
               <a:t>Fifth level</a:t>
             </a:r>
             <a:endParaRPr lang="en-US" dirty="0"/>
@@ -7138,7 +7137,7 @@
           <a:p>
             <a:fld id="{B05E5C68-9EED-413E-B086-4145A3935548}" type="datetime1">
               <a:rPr lang="en-US" smtClean="0"/>
-              <a:t>7/4/2017</a:t>
+              <a:t>7/5/2017</a:t>
             </a:fld>
             <a:endParaRPr lang="en-US"/>
           </a:p>
@@ -8024,7 +8023,7 @@
           <a:lstStyle/>
           <a:p>
             <a:r>
-              <a:rPr lang="en-US" smtClean="0"/>
+              <a:rPr lang="en-US"/>
               <a:t>Click to edit Master title style</a:t>
             </a:r>
             <a:endParaRPr lang="en-US" dirty="0"/>
@@ -8053,35 +8052,35 @@
           <a:p>
             <a:pPr lvl="0"/>
             <a:r>
-              <a:rPr lang="en-US" smtClean="0"/>
+              <a:rPr lang="en-US"/>
               <a:t>Click to edit Master text styles</a:t>
             </a:r>
           </a:p>
           <a:p>
             <a:pPr lvl="1"/>
             <a:r>
-              <a:rPr lang="en-US" smtClean="0"/>
+              <a:rPr lang="en-US"/>
               <a:t>Second level</a:t>
             </a:r>
           </a:p>
           <a:p>
             <a:pPr lvl="2"/>
             <a:r>
-              <a:rPr lang="en-US" smtClean="0"/>
+              <a:rPr lang="en-US"/>
               <a:t>Third level</a:t>
             </a:r>
           </a:p>
           <a:p>
             <a:pPr lvl="3"/>
             <a:r>
-              <a:rPr lang="en-US" smtClean="0"/>
+              <a:rPr lang="en-US"/>
               <a:t>Fourth level</a:t>
             </a:r>
           </a:p>
           <a:p>
             <a:pPr lvl="4"/>
             <a:r>
-              <a:rPr lang="en-US" smtClean="0"/>
+              <a:rPr lang="en-US"/>
               <a:t>Fifth level</a:t>
             </a:r>
             <a:endParaRPr lang="en-US" dirty="0"/>
@@ -8110,7 +8109,7 @@
           <a:p>
             <a:fld id="{D6E95037-ADD3-4F59-BB44-F82689BBE7AE}" type="datetime1">
               <a:rPr lang="en-US" smtClean="0"/>
-              <a:t>7/4/2017</a:t>
+              <a:t>7/5/2017</a:t>
             </a:fld>
             <a:endParaRPr lang="en-US"/>
           </a:p>
@@ -8240,7 +8239,7 @@
           <a:lstStyle/>
           <a:p>
             <a:r>
-              <a:rPr lang="en-US" smtClean="0"/>
+              <a:rPr lang="en-US"/>
               <a:t>Click to edit Master title style</a:t>
             </a:r>
             <a:endParaRPr lang="en-US" dirty="0"/>
@@ -8269,35 +8268,35 @@
           <a:p>
             <a:pPr lvl="0"/>
             <a:r>
-              <a:rPr lang="en-US" smtClean="0"/>
+              <a:rPr lang="en-US"/>
               <a:t>Click to edit Master text styles</a:t>
             </a:r>
           </a:p>
           <a:p>
             <a:pPr lvl="1"/>
             <a:r>
-              <a:rPr lang="en-US" smtClean="0"/>
+              <a:rPr lang="en-US"/>
               <a:t>Second level</a:t>
             </a:r>
           </a:p>
           <a:p>
             <a:pPr lvl="2"/>
             <a:r>
-              <a:rPr lang="en-US" smtClean="0"/>
+              <a:rPr lang="en-US"/>
               <a:t>Third level</a:t>
             </a:r>
           </a:p>
           <a:p>
             <a:pPr lvl="3"/>
             <a:r>
-              <a:rPr lang="en-US" smtClean="0"/>
+              <a:rPr lang="en-US"/>
               <a:t>Fourth level</a:t>
             </a:r>
           </a:p>
           <a:p>
             <a:pPr lvl="4"/>
             <a:r>
-              <a:rPr lang="en-US" smtClean="0"/>
+              <a:rPr lang="en-US"/>
               <a:t>Fifth level</a:t>
             </a:r>
             <a:endParaRPr lang="en-US" dirty="0"/>
@@ -8321,7 +8320,7 @@
           <a:p>
             <a:fld id="{8D37BDF8-5683-484F-8DBC-E9A1DA889130}" type="datetime1">
               <a:rPr lang="en-US" smtClean="0"/>
-              <a:t>7/4/2017</a:t>
+              <a:t>7/5/2017</a:t>
             </a:fld>
             <a:endParaRPr lang="en-US"/>
           </a:p>
@@ -9211,7 +9210,7 @@
           </a:lstStyle>
           <a:p>
             <a:r>
-              <a:rPr lang="en-US" smtClean="0"/>
+              <a:rPr lang="en-US"/>
               <a:t>Click to edit Master title style</a:t>
             </a:r>
             <a:endParaRPr lang="en-US" dirty="0"/>
@@ -9332,7 +9331,7 @@
           <a:p>
             <a:pPr lvl="0"/>
             <a:r>
-              <a:rPr lang="en-US" smtClean="0"/>
+              <a:rPr lang="en-US"/>
               <a:t>Click to edit Master text styles</a:t>
             </a:r>
           </a:p>
@@ -9355,7 +9354,7 @@
           <a:p>
             <a:fld id="{4DECC4F6-A32E-467C-A154-8BAEC0788F1F}" type="datetime1">
               <a:rPr lang="en-US" smtClean="0"/>
-              <a:t>7/4/2017</a:t>
+              <a:t>7/5/2017</a:t>
             </a:fld>
             <a:endParaRPr lang="en-US"/>
           </a:p>
@@ -9485,7 +9484,7 @@
           <a:lstStyle/>
           <a:p>
             <a:r>
-              <a:rPr lang="en-US" smtClean="0"/>
+              <a:rPr lang="en-US"/>
               <a:t>Click to edit Master title style</a:t>
             </a:r>
             <a:endParaRPr lang="en-US" dirty="0"/>
@@ -9516,35 +9515,35 @@
           <a:p>
             <a:pPr lvl="0"/>
             <a:r>
-              <a:rPr lang="en-US" smtClean="0"/>
+              <a:rPr lang="en-US"/>
               <a:t>Click to edit Master text styles</a:t>
             </a:r>
           </a:p>
           <a:p>
             <a:pPr lvl="1"/>
             <a:r>
-              <a:rPr lang="en-US" smtClean="0"/>
+              <a:rPr lang="en-US"/>
               <a:t>Second level</a:t>
             </a:r>
           </a:p>
           <a:p>
             <a:pPr lvl="2"/>
             <a:r>
-              <a:rPr lang="en-US" smtClean="0"/>
+              <a:rPr lang="en-US"/>
               <a:t>Third level</a:t>
             </a:r>
           </a:p>
           <a:p>
             <a:pPr lvl="3"/>
             <a:r>
-              <a:rPr lang="en-US" smtClean="0"/>
+              <a:rPr lang="en-US"/>
               <a:t>Fourth level</a:t>
             </a:r>
           </a:p>
           <a:p>
             <a:pPr lvl="4"/>
             <a:r>
-              <a:rPr lang="en-US" smtClean="0"/>
+              <a:rPr lang="en-US"/>
               <a:t>Fifth level</a:t>
             </a:r>
             <a:endParaRPr lang="en-US" dirty="0"/>
@@ -9575,35 +9574,35 @@
           <a:p>
             <a:pPr lvl="0"/>
             <a:r>
-              <a:rPr lang="en-US" smtClean="0"/>
+              <a:rPr lang="en-US"/>
               <a:t>Click to edit Master text styles</a:t>
             </a:r>
           </a:p>
           <a:p>
             <a:pPr lvl="1"/>
             <a:r>
-              <a:rPr lang="en-US" smtClean="0"/>
+              <a:rPr lang="en-US"/>
               <a:t>Second level</a:t>
             </a:r>
           </a:p>
           <a:p>
             <a:pPr lvl="2"/>
             <a:r>
-              <a:rPr lang="en-US" smtClean="0"/>
+              <a:rPr lang="en-US"/>
               <a:t>Third level</a:t>
             </a:r>
           </a:p>
           <a:p>
             <a:pPr lvl="3"/>
             <a:r>
-              <a:rPr lang="en-US" smtClean="0"/>
+              <a:rPr lang="en-US"/>
               <a:t>Fourth level</a:t>
             </a:r>
           </a:p>
           <a:p>
             <a:pPr lvl="4"/>
             <a:r>
-              <a:rPr lang="en-US" smtClean="0"/>
+              <a:rPr lang="en-US"/>
               <a:t>Fifth level</a:t>
             </a:r>
             <a:endParaRPr lang="en-US" dirty="0"/>
@@ -9627,7 +9626,7 @@
           <a:p>
             <a:fld id="{29A1F4E2-A66E-4CEA-BAB6-29487134D526}" type="datetime1">
               <a:rPr lang="en-US" smtClean="0"/>
-              <a:t>7/4/2017</a:t>
+              <a:t>7/5/2017</a:t>
             </a:fld>
             <a:endParaRPr lang="en-US"/>
           </a:p>
@@ -9725,7 +9724,7 @@
           </a:lstStyle>
           <a:p>
             <a:r>
-              <a:rPr lang="en-US" smtClean="0"/>
+              <a:rPr lang="en-US"/>
               <a:t>Click to edit Master title style</a:t>
             </a:r>
             <a:endParaRPr lang="en-US" dirty="0"/>
@@ -9797,7 +9796,7 @@
           <a:p>
             <a:pPr lvl="0"/>
             <a:r>
-              <a:rPr lang="en-US" smtClean="0"/>
+              <a:rPr lang="en-US"/>
               <a:t>Click to edit Master text styles</a:t>
             </a:r>
           </a:p>
@@ -9827,35 +9826,35 @@
           <a:p>
             <a:pPr lvl="0"/>
             <a:r>
-              <a:rPr lang="en-US" smtClean="0"/>
+              <a:rPr lang="en-US"/>
               <a:t>Click to edit Master text styles</a:t>
             </a:r>
           </a:p>
           <a:p>
             <a:pPr lvl="1"/>
             <a:r>
-              <a:rPr lang="en-US" smtClean="0"/>
+              <a:rPr lang="en-US"/>
               <a:t>Second level</a:t>
             </a:r>
           </a:p>
           <a:p>
             <a:pPr lvl="2"/>
             <a:r>
-              <a:rPr lang="en-US" smtClean="0"/>
+              <a:rPr lang="en-US"/>
               <a:t>Third level</a:t>
             </a:r>
           </a:p>
           <a:p>
             <a:pPr lvl="3"/>
             <a:r>
-              <a:rPr lang="en-US" smtClean="0"/>
+              <a:rPr lang="en-US"/>
               <a:t>Fourth level</a:t>
             </a:r>
           </a:p>
           <a:p>
             <a:pPr lvl="4"/>
             <a:r>
-              <a:rPr lang="en-US" smtClean="0"/>
+              <a:rPr lang="en-US"/>
               <a:t>Fifth level</a:t>
             </a:r>
             <a:endParaRPr lang="en-US" dirty="0"/>
@@ -9927,7 +9926,7 @@
           <a:p>
             <a:pPr lvl="0"/>
             <a:r>
-              <a:rPr lang="en-US" smtClean="0"/>
+              <a:rPr lang="en-US"/>
               <a:t>Click to edit Master text styles</a:t>
             </a:r>
           </a:p>
@@ -9985,35 +9984,35 @@
           <a:p>
             <a:pPr lvl="0"/>
             <a:r>
-              <a:rPr lang="en-US" smtClean="0"/>
+              <a:rPr lang="en-US"/>
               <a:t>Click to edit Master text styles</a:t>
             </a:r>
           </a:p>
           <a:p>
             <a:pPr lvl="1"/>
             <a:r>
-              <a:rPr lang="en-US" smtClean="0"/>
+              <a:rPr lang="en-US"/>
               <a:t>Second level</a:t>
             </a:r>
           </a:p>
           <a:p>
             <a:pPr lvl="2"/>
             <a:r>
-              <a:rPr lang="en-US" smtClean="0"/>
+              <a:rPr lang="en-US"/>
               <a:t>Third level</a:t>
             </a:r>
           </a:p>
           <a:p>
             <a:pPr lvl="3"/>
             <a:r>
-              <a:rPr lang="en-US" smtClean="0"/>
+              <a:rPr lang="en-US"/>
               <a:t>Fourth level</a:t>
             </a:r>
           </a:p>
           <a:p>
             <a:pPr lvl="4"/>
             <a:r>
-              <a:rPr lang="en-US" smtClean="0"/>
+              <a:rPr lang="en-US"/>
               <a:t>Fifth level</a:t>
             </a:r>
             <a:endParaRPr lang="en-US" dirty="0"/>
@@ -10037,7 +10036,7 @@
           <a:p>
             <a:fld id="{AD5924CE-E8D1-46CA-9144-2068016453D9}" type="datetime1">
               <a:rPr lang="en-US" smtClean="0"/>
-              <a:t>7/4/2017</a:t>
+              <a:t>7/5/2017</a:t>
             </a:fld>
             <a:endParaRPr lang="en-US"/>
           </a:p>
@@ -10140,7 +10139,7 @@
           </a:lstStyle>
           <a:p>
             <a:r>
-              <a:rPr lang="en-US" smtClean="0"/>
+              <a:rPr lang="en-US"/>
               <a:t>Click to edit Master title style</a:t>
             </a:r>
             <a:endParaRPr lang="en-US" dirty="0"/>
@@ -10164,7 +10163,7 @@
           <a:p>
             <a:fld id="{A818CF9F-D515-4605-8464-4C06C1DFB243}" type="datetime1">
               <a:rPr lang="en-US" smtClean="0"/>
-              <a:t>7/4/2017</a:t>
+              <a:t>7/5/2017</a:t>
             </a:fld>
             <a:endParaRPr lang="en-US"/>
           </a:p>
@@ -10259,7 +10258,7 @@
           <a:p>
             <a:fld id="{D6C9B92B-7D36-4A45-A718-E0E1FC80AFD2}" type="datetime1">
               <a:rPr lang="en-US" smtClean="0"/>
-              <a:t>7/4/2017</a:t>
+              <a:t>7/5/2017</a:t>
             </a:fld>
             <a:endParaRPr lang="en-US"/>
           </a:p>
@@ -11185,7 +11184,7 @@
           </a:lstStyle>
           <a:p>
             <a:r>
-              <a:rPr lang="en-US" smtClean="0"/>
+              <a:rPr lang="en-US"/>
               <a:t>Click to edit Master title style</a:t>
             </a:r>
             <a:endParaRPr lang="en-US" dirty="0"/>
@@ -11216,35 +11215,35 @@
           <a:p>
             <a:pPr lvl="0"/>
             <a:r>
-              <a:rPr lang="en-US" smtClean="0"/>
+              <a:rPr lang="en-US"/>
               <a:t>Click to edit Master text styles</a:t>
             </a:r>
           </a:p>
           <a:p>
             <a:pPr lvl="1"/>
             <a:r>
-              <a:rPr lang="en-US" smtClean="0"/>
+              <a:rPr lang="en-US"/>
               <a:t>Second level</a:t>
             </a:r>
           </a:p>
           <a:p>
             <a:pPr lvl="2"/>
             <a:r>
-              <a:rPr lang="en-US" smtClean="0"/>
+              <a:rPr lang="en-US"/>
               <a:t>Third level</a:t>
             </a:r>
           </a:p>
           <a:p>
             <a:pPr lvl="3"/>
             <a:r>
-              <a:rPr lang="en-US" smtClean="0"/>
+              <a:rPr lang="en-US"/>
               <a:t>Fourth level</a:t>
             </a:r>
           </a:p>
           <a:p>
             <a:pPr lvl="4"/>
             <a:r>
-              <a:rPr lang="en-US" smtClean="0"/>
+              <a:rPr lang="en-US"/>
               <a:t>Fifth level</a:t>
             </a:r>
             <a:endParaRPr lang="en-US" dirty="0"/>
@@ -11317,7 +11316,7 @@
           <a:p>
             <a:pPr lvl="0"/>
             <a:r>
-              <a:rPr lang="en-US" smtClean="0"/>
+              <a:rPr lang="en-US"/>
               <a:t>Click to edit Master text styles</a:t>
             </a:r>
           </a:p>
@@ -11340,7 +11339,7 @@
           <a:p>
             <a:fld id="{B68FD5C0-512F-45C2-ACB2-607A00A4510C}" type="datetime1">
               <a:rPr lang="en-US" smtClean="0"/>
-              <a:t>7/4/2017</a:t>
+              <a:t>7/5/2017</a:t>
             </a:fld>
             <a:endParaRPr lang="en-US"/>
           </a:p>
@@ -12268,7 +12267,7 @@
           </a:lstStyle>
           <a:p>
             <a:r>
-              <a:rPr lang="en-US" smtClean="0"/>
+              <a:rPr lang="en-US"/>
               <a:t>Click to edit Master title style</a:t>
             </a:r>
             <a:endParaRPr lang="en-US" dirty="0"/>
@@ -12350,7 +12349,7 @@
               <a:buNone/>
             </a:pPr>
             <a:r>
-              <a:rPr lang="en-US" smtClean="0"/>
+              <a:rPr lang="en-US"/>
               <a:t>Click icon to add picture</a:t>
             </a:r>
             <a:endParaRPr lang="en-US" dirty="0"/>
@@ -12425,7 +12424,7 @@
           <a:p>
             <a:pPr lvl="0"/>
             <a:r>
-              <a:rPr lang="en-US" smtClean="0"/>
+              <a:rPr lang="en-US"/>
               <a:t>Click to edit Master text styles</a:t>
             </a:r>
           </a:p>
@@ -12448,7 +12447,7 @@
           <a:p>
             <a:fld id="{A8C85F23-E154-4B47-A9F9-89A52AA15E6B}" type="datetime1">
               <a:rPr lang="en-US" smtClean="0"/>
-              <a:t>7/4/2017</a:t>
+              <a:t>7/5/2017</a:t>
             </a:fld>
             <a:endParaRPr lang="en-US"/>
           </a:p>
@@ -13343,7 +13342,7 @@
           <a:lstStyle/>
           <a:p>
             <a:r>
-              <a:rPr lang="en-US" smtClean="0"/>
+              <a:rPr lang="en-US"/>
               <a:t>Click to edit Master title style</a:t>
             </a:r>
             <a:endParaRPr lang="en-US" dirty="0"/>
@@ -13377,35 +13376,35 @@
           <a:p>
             <a:pPr lvl="0"/>
             <a:r>
-              <a:rPr lang="en-US" smtClean="0"/>
+              <a:rPr lang="en-US"/>
               <a:t>Click to edit Master text styles</a:t>
             </a:r>
           </a:p>
           <a:p>
             <a:pPr lvl="1"/>
             <a:r>
-              <a:rPr lang="en-US" smtClean="0"/>
+              <a:rPr lang="en-US"/>
               <a:t>Second level</a:t>
             </a:r>
           </a:p>
           <a:p>
             <a:pPr lvl="2"/>
             <a:r>
-              <a:rPr lang="en-US" smtClean="0"/>
+              <a:rPr lang="en-US"/>
               <a:t>Third level</a:t>
             </a:r>
           </a:p>
           <a:p>
             <a:pPr lvl="3"/>
             <a:r>
-              <a:rPr lang="en-US" smtClean="0"/>
+              <a:rPr lang="en-US"/>
               <a:t>Fourth level</a:t>
             </a:r>
           </a:p>
           <a:p>
             <a:pPr lvl="4"/>
             <a:r>
-              <a:rPr lang="en-US" smtClean="0"/>
+              <a:rPr lang="en-US"/>
               <a:t>Fifth level</a:t>
             </a:r>
             <a:endParaRPr lang="en-US" dirty="0"/>
@@ -13445,7 +13444,7 @@
           <a:p>
             <a:fld id="{441CFBDD-FC00-4979-962A-B16E941AAB17}" type="datetime1">
               <a:rPr lang="en-US" smtClean="0"/>
-              <a:t>7/4/2017</a:t>
+              <a:t>7/5/2017</a:t>
             </a:fld>
             <a:endParaRPr lang="en-US"/>
           </a:p>
@@ -14026,7 +14025,7 @@
           <a:lstStyle/>
           <a:p>
             <a:r>
-              <a:rPr lang="en-US" dirty="0" smtClean="0">
+              <a:rPr lang="en-US" dirty="0">
                 <a:solidFill>
                   <a:schemeClr val="bg1"/>
                 </a:solidFill>
@@ -14034,14 +14033,14 @@
               <a:t>Case Study 08</a:t>
             </a:r>
             <a:br>
-              <a:rPr lang="en-US" dirty="0" smtClean="0">
+              <a:rPr lang="en-US" dirty="0">
                 <a:solidFill>
                   <a:schemeClr val="bg1"/>
                 </a:solidFill>
               </a:rPr>
             </a:br>
             <a:r>
-              <a:rPr lang="en-US" sz="4400" dirty="0" smtClean="0">
+              <a:rPr lang="en-US" sz="4400" dirty="0">
                 <a:solidFill>
                   <a:schemeClr val="bg1"/>
                 </a:solidFill>
@@ -14077,18 +14076,13 @@
           <a:lstStyle/>
           <a:p>
             <a:r>
-              <a:rPr lang="en-US" i="1" dirty="0" smtClean="0">
+              <a:rPr lang="en-US" i="1" dirty="0">
                 <a:solidFill>
                   <a:schemeClr val="bg1"/>
                 </a:solidFill>
               </a:rPr>
               <a:t>Matthew Baldree, Ben Brock, Tom Elkins, Austin Kelly</a:t>
             </a:r>
-            <a:endParaRPr lang="en-US" i="1" dirty="0">
-              <a:solidFill>
-                <a:schemeClr val="bg1"/>
-              </a:solidFill>
-            </a:endParaRPr>
           </a:p>
         </p:txBody>
       </p:sp>
@@ -14138,10 +14132,9 @@
           <a:lstStyle/>
           <a:p>
             <a:r>
-              <a:rPr lang="en-US" dirty="0" smtClean="0"/>
+              <a:rPr lang="en-US" dirty="0"/>
               <a:t>How age distributions vary by year</a:t>
             </a:r>
-            <a:endParaRPr lang="en-US" dirty="0"/>
           </a:p>
         </p:txBody>
       </p:sp>
@@ -14307,13 +14300,6 @@
   <p:clrMapOvr>
     <a:masterClrMapping/>
   </p:clrMapOvr>
-  <p:timing>
-    <p:tnLst>
-      <p:par>
-        <p:cTn id="1" dur="indefinite" restart="never" nodeType="tmRoot"/>
-      </p:par>
-    </p:tnLst>
-  </p:timing>
 </p:sld>
 </file>
 
@@ -14350,10 +14336,9 @@
           <a:lstStyle/>
           <a:p>
             <a:r>
-              <a:rPr lang="en-US" dirty="0" smtClean="0"/>
+              <a:rPr lang="en-US" dirty="0"/>
               <a:t>Growth of race by year</a:t>
             </a:r>
-            <a:endParaRPr lang="en-US" dirty="0"/>
           </a:p>
         </p:txBody>
       </p:sp>
@@ -14381,7 +14366,7 @@
         </p:blipFill>
         <p:spPr>
           <a:xfrm>
-            <a:off x="2814258" y="1733075"/>
+            <a:off x="2255506" y="2263953"/>
             <a:ext cx="6560308" cy="4515324"/>
           </a:xfrm>
         </p:spPr>
@@ -14419,13 +14404,6 @@
   <p:clrMapOvr>
     <a:masterClrMapping/>
   </p:clrMapOvr>
-  <p:timing>
-    <p:tnLst>
-      <p:par>
-        <p:cTn id="1" dur="indefinite" restart="never" nodeType="tmRoot"/>
-      </p:par>
-    </p:tnLst>
-  </p:timing>
 </p:sld>
 </file>
 
@@ -14472,18 +14450,13 @@
           <a:lstStyle/>
           <a:p>
             <a:r>
-              <a:rPr lang="en-US" dirty="0" smtClean="0">
+              <a:rPr lang="en-US" dirty="0">
                 <a:solidFill>
                   <a:srgbClr val="0070C0"/>
                 </a:solidFill>
               </a:rPr>
               <a:t>Men’s Runner Results - Age</a:t>
             </a:r>
-            <a:endParaRPr lang="en-US" dirty="0">
-              <a:solidFill>
-                <a:srgbClr val="0070C0"/>
-              </a:solidFill>
-            </a:endParaRPr>
           </a:p>
         </p:txBody>
       </p:sp>
@@ -14566,13 +14539,13 @@
           <a:lstStyle/>
           <a:p>
             <a:r>
-              <a:rPr lang="en-US" sz="2000" dirty="0" smtClean="0"/>
+              <a:rPr lang="en-US" sz="2000" dirty="0"/>
               <a:t>Boxplot distribution shows the average runner’s age decreases over the years</a:t>
             </a:r>
           </a:p>
           <a:p>
             <a:r>
-              <a:rPr lang="en-US" sz="2000" dirty="0" smtClean="0"/>
+              <a:rPr lang="en-US" sz="2000" dirty="0"/>
               <a:t>Density Plots indicate a shift to the left, validating the boxplot pattern. Vertical line is stationed at mean for 1999 and ends to the right of the mean for 2009.</a:t>
             </a:r>
           </a:p>
@@ -14699,7 +14672,7 @@
         </p:nvCxnSpPr>
         <p:spPr>
           <a:xfrm flipH="1" flipV="1">
-            <a:off x="7045568" y="1488831"/>
+            <a:off x="7209070" y="1555443"/>
             <a:ext cx="0" cy="2672861"/>
           </a:xfrm>
           <a:prstGeom prst="line">
@@ -14736,13 +14709,6 @@
   <p:clrMapOvr>
     <a:masterClrMapping/>
   </p:clrMapOvr>
-  <p:timing>
-    <p:tnLst>
-      <p:par>
-        <p:cTn id="1" dur="indefinite" restart="never" nodeType="tmRoot"/>
-      </p:par>
-    </p:tnLst>
-  </p:timing>
 </p:sld>
 </file>
 
@@ -14786,28 +14752,15 @@
             <a:pPr algn="r"/>
             <a:r>
               <a:rPr lang="en-US" dirty="0"/>
-              <a:t>Men’s Runner </a:t>
-            </a:r>
-            <a:r>
-              <a:rPr lang="en-US" dirty="0" smtClean="0"/>
-              <a:t>Results– </a:t>
-            </a:r>
-            <a:r>
-              <a:rPr lang="en-US" dirty="0" smtClean="0"/>
-              <a:t/>
+              <a:t>Men’s Runner Results– </a:t>
             </a:r>
             <a:br>
-              <a:rPr lang="en-US" dirty="0" smtClean="0"/>
+              <a:rPr lang="en-US" dirty="0"/>
             </a:br>
             <a:r>
               <a:rPr lang="en-US" dirty="0"/>
-              <a:t>	</a:t>
-            </a:r>
-            <a:r>
-              <a:rPr lang="en-US" dirty="0" smtClean="0"/>
-              <a:t>Age (continued)</a:t>
-            </a:r>
-            <a:endParaRPr lang="en-US" dirty="0"/>
+              <a:t>	Age (continued)</a:t>
+            </a:r>
           </a:p>
         </p:txBody>
       </p:sp>
@@ -14966,10 +14919,9 @@
           <a:p>
             <a:pPr algn="ctr"/>
             <a:r>
-              <a:rPr lang="en-US" sz="2000" dirty="0" smtClean="0"/>
+              <a:rPr lang="en-US" sz="2000" dirty="0"/>
               <a:t>The histograms of the ages are relatively normal year over year</a:t>
             </a:r>
-            <a:endParaRPr lang="en-US" sz="2000" dirty="0"/>
           </a:p>
         </p:txBody>
       </p:sp>
@@ -14996,10 +14948,9 @@
           <a:lstStyle/>
           <a:p>
             <a:r>
-              <a:rPr lang="en-US" sz="2000" dirty="0" smtClean="0"/>
+              <a:rPr lang="en-US" sz="2000" dirty="0"/>
               <a:t>QQ plots for each year also show a relatively flat line, indicating no true need for transformation of the data before proceeding. This data is normal! </a:t>
             </a:r>
-            <a:endParaRPr lang="en-US" sz="2000" dirty="0"/>
           </a:p>
         </p:txBody>
       </p:sp>
@@ -15056,57 +15007,28 @@
           <a:lstStyle/>
           <a:p>
             <a:r>
-              <a:rPr lang="en-US" dirty="0" smtClean="0">
-                <a:solidFill>
-                  <a:srgbClr val="0070C0"/>
-                </a:solidFill>
-              </a:rPr>
-              <a:t>Men’s </a:t>
-            </a:r>
-            <a:r>
               <a:rPr lang="en-US" dirty="0">
                 <a:solidFill>
                   <a:srgbClr val="0070C0"/>
                 </a:solidFill>
               </a:rPr>
-              <a:t>Runner Results </a:t>
-            </a:r>
-            <a:r>
-              <a:rPr lang="en-US" dirty="0" smtClean="0">
-                <a:solidFill>
-                  <a:srgbClr val="0070C0"/>
-                </a:solidFill>
-              </a:rPr>
-              <a:t/>
+              <a:t>Men’s Runner Results </a:t>
             </a:r>
             <a:br>
-              <a:rPr lang="en-US" dirty="0" smtClean="0">
+              <a:rPr lang="en-US" dirty="0">
                 <a:solidFill>
                   <a:srgbClr val="0070C0"/>
                 </a:solidFill>
               </a:rPr>
             </a:br>
             <a:r>
-              <a:rPr lang="en-US" dirty="0" smtClean="0">
+              <a:rPr lang="en-US" dirty="0">
                 <a:solidFill>
                   <a:srgbClr val="0070C0"/>
                 </a:solidFill>
               </a:rPr>
-              <a:t>- </a:t>
-            </a:r>
-            <a:r>
-              <a:rPr lang="en-US" dirty="0" smtClean="0">
-                <a:solidFill>
-                  <a:srgbClr val="0070C0"/>
-                </a:solidFill>
-              </a:rPr>
-              <a:t>Time</a:t>
-            </a:r>
-            <a:endParaRPr lang="en-US" dirty="0">
-              <a:solidFill>
-                <a:srgbClr val="0070C0"/>
-              </a:solidFill>
-            </a:endParaRPr>
+              <a:t>- Time</a:t>
+            </a:r>
           </a:p>
         </p:txBody>
       </p:sp>
@@ -15133,16 +15055,15 @@
           <a:lstStyle/>
           <a:p>
             <a:r>
-              <a:rPr lang="en-US" sz="2000" dirty="0" smtClean="0"/>
+              <a:rPr lang="en-US" sz="2000" dirty="0"/>
               <a:t>When compared side by side, the boxplot distribution at the top show an increase in average run times over the course of the 14 years. </a:t>
             </a:r>
           </a:p>
           <a:p>
             <a:r>
-              <a:rPr lang="en-US" sz="2000" dirty="0" smtClean="0"/>
+              <a:rPr lang="en-US" sz="2000" dirty="0"/>
               <a:t>The gradual increase in run times paired with the gradual decrease in age for the runners lead us to believe there were more serious, professional runners in 1999 than there were in 2012. </a:t>
             </a:r>
-            <a:endParaRPr lang="en-US" sz="2000" dirty="0"/>
           </a:p>
         </p:txBody>
       </p:sp>
@@ -15331,18 +15252,13 @@
               <a:rPr lang="en-US" dirty="0"/>
               <a:t>Men’s Runner Results </a:t>
             </a:r>
-            <a:r>
-              <a:rPr lang="en-US" dirty="0" smtClean="0"/>
-              <a:t/>
-            </a:r>
             <a:br>
-              <a:rPr lang="en-US" dirty="0" smtClean="0"/>
+              <a:rPr lang="en-US" dirty="0"/>
             </a:br>
             <a:r>
-              <a:rPr lang="en-US" dirty="0" smtClean="0"/>
+              <a:rPr lang="en-US" dirty="0"/>
               <a:t>– Time (continued)</a:t>
             </a:r>
-            <a:endParaRPr lang="en-US" dirty="0"/>
           </a:p>
         </p:txBody>
       </p:sp>
@@ -15556,18 +15472,9 @@
           <a:lstStyle/>
           <a:p>
             <a:r>
-              <a:rPr lang="en-US" sz="2000" dirty="0" smtClean="0"/>
-              <a:t>Looking at the QQ plots for the average run time year over year, we see this data is relatively normal as well. </a:t>
-            </a:r>
-            <a:r>
-              <a:rPr lang="en-US" sz="2000" dirty="0" smtClean="0"/>
-              <a:t>This </a:t>
-            </a:r>
-            <a:r>
-              <a:rPr lang="en-US" sz="2000" dirty="0" smtClean="0"/>
-              <a:t>can also be seen with the matrix of histograms. </a:t>
-            </a:r>
-            <a:endParaRPr lang="en-US" sz="2000" dirty="0"/>
+              <a:rPr lang="en-US" sz="2000" dirty="0"/>
+              <a:t>Looking at the QQ plots for the average run time year over year, we see this data is relatively normal as well. This can also be seen with the matrix of histograms. </a:t>
+            </a:r>
           </a:p>
         </p:txBody>
       </p:sp>
@@ -15581,13 +15488,6 @@
   <p:clrMapOvr>
     <a:masterClrMapping/>
   </p:clrMapOvr>
-  <p:timing>
-    <p:tnLst>
-      <p:par>
-        <p:cTn id="1" dur="indefinite" restart="never" nodeType="tmRoot"/>
-      </p:par>
-    </p:tnLst>
-  </p:timing>
 </p:sld>
 </file>
 
@@ -15624,10 +15524,9 @@
           <a:lstStyle/>
           <a:p>
             <a:r>
-              <a:rPr lang="en-US" dirty="0" smtClean="0"/>
+              <a:rPr lang="en-US" dirty="0"/>
               <a:t>How run times vary by year</a:t>
             </a:r>
-            <a:endParaRPr lang="en-US" dirty="0"/>
           </a:p>
         </p:txBody>
       </p:sp>
@@ -15692,7 +15591,7 @@
         <p:spPr>
           <a:xfrm>
             <a:off x="740508" y="2633785"/>
-            <a:ext cx="3458307" cy="3416320"/>
+            <a:ext cx="3583211" cy="3416320"/>
           </a:xfrm>
           <a:prstGeom prst="rect">
             <a:avLst/>
@@ -15706,7 +15605,7 @@
           <a:lstStyle/>
           <a:p>
             <a:r>
-              <a:rPr lang="en-US" sz="2400" dirty="0" smtClean="0"/>
+              <a:rPr lang="en-US" sz="2400" dirty="0"/>
               <a:t>With this violin plot, we see the average run time gradually increasing over time. </a:t>
             </a:r>
           </a:p>
@@ -15715,10 +15614,9 @@
           </a:p>
           <a:p>
             <a:r>
-              <a:rPr lang="en-US" sz="2400" dirty="0" smtClean="0"/>
-              <a:t>The most dramatic shift is when the animation returns to 1999 from 2012.</a:t>
-            </a:r>
-            <a:endParaRPr lang="en-US" sz="2400" dirty="0"/>
+              <a:rPr lang="en-US" sz="2400" dirty="0"/>
+              <a:t>We can see the gradual change from the initial average relative to the red line.</a:t>
+            </a:r>
           </a:p>
         </p:txBody>
       </p:sp>
@@ -15762,13 +15660,6 @@
   <p:clrMapOvr>
     <a:masterClrMapping/>
   </p:clrMapOvr>
-  <p:timing>
-    <p:tnLst>
-      <p:par>
-        <p:cTn id="1" dur="indefinite" restart="never" nodeType="tmRoot"/>
-      </p:par>
-    </p:tnLst>
-  </p:timing>
 </p:sld>
 </file>
 
@@ -15812,32 +15703,23 @@
           <a:lstStyle/>
           <a:p>
             <a:r>
-              <a:rPr lang="en-US" dirty="0" smtClean="0"/>
+              <a:rPr lang="en-US" dirty="0"/>
               <a:t>Men’s Runners Results</a:t>
             </a:r>
             <a:br>
-              <a:rPr lang="en-US" dirty="0" smtClean="0"/>
+              <a:rPr lang="en-US" dirty="0"/>
             </a:br>
             <a:r>
-              <a:rPr lang="en-US" dirty="0" smtClean="0"/>
-              <a:t>Age versus Time and </a:t>
-            </a:r>
-            <a:r>
-              <a:rPr lang="en-US" dirty="0" smtClean="0"/>
-              <a:t>Age</a:t>
+              <a:rPr lang="en-US" dirty="0"/>
+              <a:t>Age versus Time and Age</a:t>
             </a:r>
             <a:br>
-              <a:rPr lang="en-US" dirty="0" smtClean="0"/>
+              <a:rPr lang="en-US" dirty="0"/>
             </a:br>
             <a:r>
-              <a:rPr lang="en-US" dirty="0" smtClean="0"/>
-              <a:t> </a:t>
-            </a:r>
-            <a:r>
-              <a:rPr lang="en-US" dirty="0" smtClean="0"/>
-              <a:t>per Year</a:t>
-            </a:r>
-            <a:endParaRPr lang="en-US" dirty="0"/>
+              <a:rPr lang="en-US" dirty="0"/>
+              <a:t> per Year</a:t>
+            </a:r>
           </a:p>
         </p:txBody>
       </p:sp>
@@ -15864,63 +15746,63 @@
           <a:lstStyle/>
           <a:p>
             <a:r>
-              <a:rPr lang="en-US" sz="2000" dirty="0" smtClean="0"/>
+              <a:rPr lang="en-US" sz="2000" dirty="0"/>
               <a:t>XY Plot – Time versus Age by Year</a:t>
             </a:r>
           </a:p>
           <a:p>
             <a:r>
-              <a:rPr lang="en-US" sz="2000" dirty="0" smtClean="0"/>
+              <a:rPr lang="en-US" sz="2000" dirty="0"/>
               <a:t>XY Plot – Time vs Age Regression by  Year</a:t>
             </a:r>
           </a:p>
           <a:p>
             <a:r>
-              <a:rPr lang="en-US" sz="2000" dirty="0" smtClean="0"/>
+              <a:rPr lang="en-US" sz="2000" dirty="0"/>
               <a:t>XY Plot –  Time vs. </a:t>
             </a:r>
             <a:r>
-              <a:rPr lang="en-US" sz="2000" dirty="0" err="1" smtClean="0"/>
+              <a:rPr lang="en-US" sz="2000" dirty="0" err="1"/>
               <a:t>Avg</a:t>
             </a:r>
             <a:r>
-              <a:rPr lang="en-US" sz="2000" dirty="0" smtClean="0"/>
+              <a:rPr lang="en-US" sz="2000" dirty="0"/>
               <a:t> Time for </a:t>
             </a:r>
             <a:r>
-              <a:rPr lang="en-US" sz="2000" dirty="0" err="1" smtClean="0"/>
+              <a:rPr lang="en-US" sz="2000" dirty="0" err="1"/>
               <a:t>Avg</a:t>
             </a:r>
             <a:r>
-              <a:rPr lang="en-US" sz="2000" dirty="0" smtClean="0"/>
+              <a:rPr lang="en-US" sz="2000" dirty="0"/>
               <a:t> Age</a:t>
             </a:r>
           </a:p>
           <a:p>
             <a:r>
-              <a:rPr lang="en-US" sz="2000" dirty="0" smtClean="0"/>
+              <a:rPr lang="en-US" sz="2000" dirty="0"/>
               <a:t>XY Plot – Age vs. </a:t>
             </a:r>
             <a:r>
-              <a:rPr lang="en-US" sz="2000" dirty="0" err="1" smtClean="0"/>
+              <a:rPr lang="en-US" sz="2000" dirty="0" err="1"/>
               <a:t>Avg</a:t>
             </a:r>
             <a:r>
-              <a:rPr lang="en-US" sz="2000" dirty="0" smtClean="0"/>
+              <a:rPr lang="en-US" sz="2000" dirty="0"/>
               <a:t> Age by Year</a:t>
             </a:r>
           </a:p>
           <a:p>
             <a:r>
-              <a:rPr lang="en-US" sz="2000" dirty="0" smtClean="0"/>
+              <a:rPr lang="en-US" sz="2000" dirty="0"/>
               <a:t>XY Plot – Time vs. </a:t>
             </a:r>
             <a:r>
-              <a:rPr lang="en-US" sz="2000" dirty="0" err="1" smtClean="0"/>
+              <a:rPr lang="en-US" sz="2000" dirty="0" err="1"/>
               <a:t>Avg</a:t>
             </a:r>
             <a:r>
-              <a:rPr lang="en-US" sz="2000" dirty="0" smtClean="0"/>
+              <a:rPr lang="en-US" sz="2000" dirty="0"/>
               <a:t> Time by Year</a:t>
             </a:r>
           </a:p>
@@ -16121,13 +16003,6 @@
   <p:clrMapOvr>
     <a:masterClrMapping/>
   </p:clrMapOvr>
-  <p:timing>
-    <p:tnLst>
-      <p:par>
-        <p:cTn id="1" dur="indefinite" restart="never" nodeType="tmRoot"/>
-      </p:par>
-    </p:tnLst>
-  </p:timing>
 </p:sld>
 </file>
 
@@ -16169,10 +16044,9 @@
           <a:lstStyle/>
           <a:p>
             <a:r>
-              <a:rPr lang="en-US" dirty="0" smtClean="0"/>
+              <a:rPr lang="en-US" dirty="0"/>
               <a:t>Averages by year</a:t>
             </a:r>
-            <a:endParaRPr lang="en-US" dirty="0"/>
           </a:p>
         </p:txBody>
       </p:sp>
@@ -16202,10 +16076,9 @@
               <a:buNone/>
             </a:pPr>
             <a:r>
-              <a:rPr lang="en-US" dirty="0" smtClean="0"/>
+              <a:rPr lang="en-US" dirty="0"/>
               <a:t>One of our team’s hypotheses claims there was a higher percentage of professional runners in the early years of this data. With an increasing average time and a decreasing average age, we expect a higher number of people who join for the fun and not in preparation for more serious marathons.</a:t>
             </a:r>
-            <a:endParaRPr lang="en-US" dirty="0"/>
           </a:p>
         </p:txBody>
       </p:sp>
@@ -16423,7 +16296,7 @@
             <a:p>
               <a:pPr algn="ctr"/>
               <a:r>
-                <a:rPr lang="en-US" sz="2400" dirty="0" err="1" smtClean="0">
+                <a:rPr lang="en-US" sz="2400" dirty="0" err="1">
                   <a:solidFill>
                     <a:schemeClr val="accent6">
                       <a:lumMod val="75000"/>
@@ -16433,7 +16306,7 @@
                 <a:t>Avg</a:t>
               </a:r>
               <a:r>
-                <a:rPr lang="en-US" sz="2400" dirty="0" smtClean="0">
+                <a:rPr lang="en-US" sz="2400" dirty="0">
                   <a:solidFill>
                     <a:schemeClr val="accent6">
                       <a:lumMod val="75000"/>
@@ -16442,13 +16315,6 @@
                 </a:rPr>
                 <a:t> Time</a:t>
               </a:r>
-              <a:endParaRPr lang="en-US" sz="2400" dirty="0">
-                <a:solidFill>
-                  <a:schemeClr val="accent6">
-                    <a:lumMod val="75000"/>
-                  </a:schemeClr>
-                </a:solidFill>
-              </a:endParaRPr>
             </a:p>
           </p:txBody>
         </p:sp>
@@ -16536,7 +16402,7 @@
             <a:p>
               <a:pPr algn="ctr"/>
               <a:r>
-                <a:rPr lang="en-US" sz="2400" dirty="0" err="1" smtClean="0">
+                <a:rPr lang="en-US" sz="2400" dirty="0" err="1">
                   <a:solidFill>
                     <a:schemeClr val="accent6">
                       <a:lumMod val="75000"/>
@@ -16546,7 +16412,7 @@
                 <a:t>Avg</a:t>
               </a:r>
               <a:r>
-                <a:rPr lang="en-US" sz="2400" dirty="0" smtClean="0">
+                <a:rPr lang="en-US" sz="2400" dirty="0">
                   <a:solidFill>
                     <a:schemeClr val="accent6">
                       <a:lumMod val="75000"/>
@@ -16555,13 +16421,6 @@
                 </a:rPr>
                 <a:t> Age</a:t>
               </a:r>
-              <a:endParaRPr lang="en-US" sz="2400" dirty="0">
-                <a:solidFill>
-                  <a:schemeClr val="accent6">
-                    <a:lumMod val="75000"/>
-                  </a:schemeClr>
-                </a:solidFill>
-              </a:endParaRPr>
             </a:p>
           </p:txBody>
         </p:sp>
@@ -16576,13 +16435,6 @@
   <p:clrMapOvr>
     <a:masterClrMapping/>
   </p:clrMapOvr>
-  <p:timing>
-    <p:tnLst>
-      <p:par>
-        <p:cTn id="1" dur="indefinite" restart="never" nodeType="tmRoot"/>
-      </p:par>
-    </p:tnLst>
-  </p:timing>
 </p:sld>
 </file>
 
@@ -16626,10 +16478,9 @@
           <a:lstStyle/>
           <a:p>
             <a:r>
-              <a:rPr lang="en-US" dirty="0" smtClean="0"/>
+              <a:rPr lang="en-US" dirty="0"/>
               <a:t>More …..</a:t>
             </a:r>
-            <a:endParaRPr lang="en-US" dirty="0"/>
           </a:p>
         </p:txBody>
       </p:sp>
@@ -16712,29 +16563,29 @@
           <a:lstStyle/>
           <a:p>
             <a:r>
-              <a:rPr lang="en-US" sz="2000" dirty="0" smtClean="0"/>
+              <a:rPr lang="en-US" sz="2000" dirty="0"/>
               <a:t>XY Plot – Time vs. </a:t>
             </a:r>
             <a:r>
-              <a:rPr lang="en-US" sz="2000" dirty="0" err="1" smtClean="0"/>
+              <a:rPr lang="en-US" sz="2000" dirty="0" err="1"/>
               <a:t>Avg</a:t>
             </a:r>
             <a:r>
-              <a:rPr lang="en-US" sz="2000" dirty="0" smtClean="0"/>
+              <a:rPr lang="en-US" sz="2000" dirty="0"/>
               <a:t> Time by Year for Age Group 40-49</a:t>
             </a:r>
           </a:p>
           <a:p>
             <a:r>
-              <a:rPr lang="en-US" sz="2000" dirty="0" smtClean="0"/>
+              <a:rPr lang="en-US" sz="2000" dirty="0"/>
               <a:t>XY Plot – Time vs. Std. Dev Time vs </a:t>
             </a:r>
             <a:r>
-              <a:rPr lang="en-US" sz="2000" dirty="0" err="1" smtClean="0"/>
+              <a:rPr lang="en-US" sz="2000" dirty="0" err="1"/>
               <a:t>Std</a:t>
             </a:r>
             <a:r>
-              <a:rPr lang="en-US" sz="2000" dirty="0" smtClean="0"/>
+              <a:rPr lang="en-US" sz="2000" dirty="0"/>
               <a:t> Dev Age</a:t>
             </a:r>
           </a:p>
@@ -16830,13 +16681,6 @@
   <p:clrMapOvr>
     <a:masterClrMapping/>
   </p:clrMapOvr>
-  <p:timing>
-    <p:tnLst>
-      <p:par>
-        <p:cTn id="1" dur="indefinite" restart="never" nodeType="tmRoot"/>
-      </p:par>
-    </p:tnLst>
-  </p:timing>
 </p:sld>
 </file>
 
@@ -16873,10 +16717,9 @@
           <a:lstStyle/>
           <a:p>
             <a:r>
-              <a:rPr lang="en-US" dirty="0" smtClean="0"/>
+              <a:rPr lang="en-US" dirty="0"/>
               <a:t>Abstract</a:t>
             </a:r>
-            <a:endParaRPr lang="en-US" dirty="0"/>
           </a:p>
         </p:txBody>
       </p:sp>
@@ -16903,16 +16746,8 @@
           <a:lstStyle/>
           <a:p>
             <a:r>
-              <a:rPr lang="en-US" sz="2400" i="1" dirty="0" smtClean="0"/>
-              <a:t>Data analysis of the annual Washington D.C. Cherry Blossom Race from 1999 through 2012 reveal there are noticeable differences of age and </a:t>
-            </a:r>
-            <a:r>
-              <a:rPr lang="en-US" sz="2400" i="1" dirty="0" smtClean="0"/>
-              <a:t>elapsed </a:t>
-            </a:r>
-            <a:r>
-              <a:rPr lang="en-US" sz="2400" i="1" dirty="0" smtClean="0"/>
-              <a:t>race time. In addition, the abrupt change in run times might be due to a race contestant lottery established in 2010.</a:t>
+              <a:rPr lang="en-US" sz="2400" i="1" dirty="0"/>
+              <a:t>Data analysis of the annual Washington D.C. Cherry Blossom Race from 1999 through 2012 reveal there are noticeable differences of age and elapsed race time. In addition, the abrupt change in run times might be due to a race contestant lottery established in 2010.</a:t>
             </a:r>
             <a:endParaRPr lang="en-US" sz="2400" dirty="0"/>
           </a:p>
@@ -17011,10 +16846,9 @@
           <a:lstStyle/>
           <a:p>
             <a:r>
-              <a:rPr lang="en-US" dirty="0" smtClean="0"/>
+              <a:rPr lang="en-US" dirty="0"/>
               <a:t>Models &amp; Algorithms  - used in the R code</a:t>
             </a:r>
-            <a:endParaRPr lang="en-US" dirty="0"/>
           </a:p>
         </p:txBody>
       </p:sp>
@@ -17036,30 +16870,26 @@
           <a:lstStyle/>
           <a:p>
             <a:r>
-              <a:rPr lang="en-US" dirty="0" smtClean="0"/>
+              <a:rPr lang="en-US" dirty="0"/>
               <a:t>MANOVA is a Multivariate extension of ANOVA with the only difference being that in MANOVA there are Multiple Dependent Variables (DV).</a:t>
             </a:r>
           </a:p>
           <a:p>
             <a:r>
-              <a:rPr lang="en-US" dirty="0" smtClean="0"/>
+              <a:rPr lang="en-US" dirty="0"/>
               <a:t>ANOVA  - 1 DV</a:t>
             </a:r>
           </a:p>
           <a:p>
             <a:r>
-              <a:rPr lang="en-US" dirty="0" smtClean="0"/>
+              <a:rPr lang="en-US" dirty="0"/>
               <a:t>MANOVA – 2 or more DVs</a:t>
             </a:r>
           </a:p>
           <a:p>
             <a:r>
               <a:rPr lang="en-US" dirty="0"/>
-              <a:t>Experimental designs in which researchers manipulate or control one or more IVs to determine the effect on one DV (ANOVA) or more DVs (MANOVA</a:t>
-            </a:r>
-            <a:r>
-              <a:rPr lang="en-US" dirty="0" smtClean="0"/>
-              <a:t>)</a:t>
+              <a:t>Experimental designs in which researchers manipulate or control one or more IVs to determine the effect on one DV (ANOVA) or more DVs (MANOVA)</a:t>
             </a:r>
           </a:p>
         </p:txBody>
@@ -17097,13 +16927,6 @@
   <p:clrMapOvr>
     <a:masterClrMapping/>
   </p:clrMapOvr>
-  <p:timing>
-    <p:tnLst>
-      <p:par>
-        <p:cTn id="1" dur="indefinite" restart="never" nodeType="tmRoot"/>
-      </p:par>
-    </p:tnLst>
-  </p:timing>
 </p:sld>
 </file>
 
@@ -17140,10 +16963,9 @@
           <a:lstStyle/>
           <a:p>
             <a:r>
-              <a:rPr lang="en-US" dirty="0" smtClean="0"/>
+              <a:rPr lang="en-US" dirty="0"/>
               <a:t>Models &amp; Algorithms  - used in Excel</a:t>
             </a:r>
-            <a:endParaRPr lang="en-US" dirty="0"/>
           </a:p>
         </p:txBody>
       </p:sp>
@@ -17170,42 +16992,41 @@
           <a:lstStyle/>
           <a:p>
             <a:r>
-              <a:rPr lang="en-US" b="1" dirty="0" smtClean="0"/>
+              <a:rPr lang="en-US" b="1" dirty="0"/>
               <a:t>T-Test: (parametric) </a:t>
             </a:r>
             <a:r>
-              <a:rPr lang="en-US" dirty="0" smtClean="0"/>
+              <a:rPr lang="en-US" dirty="0"/>
               <a:t>Used to compare two groups means</a:t>
             </a:r>
           </a:p>
           <a:p>
             <a:pPr lvl="1"/>
             <a:r>
-              <a:rPr lang="en-US" dirty="0" smtClean="0"/>
+              <a:rPr lang="en-US" dirty="0"/>
               <a:t>Can only be used for two Age groups (not multiple)</a:t>
             </a:r>
           </a:p>
           <a:p>
             <a:pPr lvl="1"/>
             <a:r>
-              <a:rPr lang="en-US" dirty="0" smtClean="0"/>
+              <a:rPr lang="en-US" dirty="0"/>
               <a:t>Assume the data to have a normal distribution (bell-shaped curve)</a:t>
             </a:r>
           </a:p>
           <a:p>
             <a:pPr lvl="1"/>
             <a:r>
-              <a:rPr lang="en-US" dirty="0" smtClean="0"/>
+              <a:rPr lang="en-US" dirty="0"/>
               <a:t>Similar standard deviation</a:t>
             </a:r>
           </a:p>
           <a:p>
             <a:pPr lvl="1"/>
             <a:r>
-              <a:rPr lang="en-US" dirty="0" smtClean="0"/>
+              <a:rPr lang="en-US" dirty="0"/>
               <a:t>Data must be measured values</a:t>
             </a:r>
-            <a:endParaRPr lang="en-US" dirty="0"/>
           </a:p>
         </p:txBody>
       </p:sp>
@@ -17232,31 +17053,30 @@
           <a:lstStyle/>
           <a:p>
             <a:r>
-              <a:rPr lang="en-US" b="1" dirty="0" smtClean="0"/>
+              <a:rPr lang="en-US" b="1" dirty="0"/>
               <a:t>Chi-Square Test: (non-parametric)</a:t>
             </a:r>
           </a:p>
           <a:p>
             <a:pPr lvl="1"/>
             <a:r>
-              <a:rPr lang="en-US" dirty="0" smtClean="0"/>
+              <a:rPr lang="en-US" dirty="0"/>
               <a:t>Sample size must be more than 20</a:t>
             </a:r>
           </a:p>
           <a:p>
             <a:pPr lvl="1"/>
             <a:r>
-              <a:rPr lang="en-US" dirty="0" smtClean="0"/>
+              <a:rPr lang="en-US" dirty="0"/>
               <a:t>Only be used to compare an experimental result w/a theoretical outcome</a:t>
             </a:r>
           </a:p>
           <a:p>
             <a:pPr lvl="1"/>
             <a:r>
-              <a:rPr lang="en-US" dirty="0" smtClean="0"/>
+              <a:rPr lang="en-US" dirty="0"/>
               <a:t>Aims to test the null hypothesis of NO DIFFERENCE between data sets</a:t>
             </a:r>
-            <a:endParaRPr lang="en-US" dirty="0"/>
           </a:p>
         </p:txBody>
       </p:sp>
@@ -17293,13 +17113,6 @@
   <p:clrMapOvr>
     <a:masterClrMapping/>
   </p:clrMapOvr>
-  <p:timing>
-    <p:tnLst>
-      <p:par>
-        <p:cTn id="1" dur="indefinite" restart="never" nodeType="tmRoot"/>
-      </p:par>
-    </p:tnLst>
-  </p:timing>
 </p:sld>
 </file>
 
@@ -17360,38 +17173,37 @@
           <a:lstStyle/>
           <a:p>
             <a:r>
-              <a:rPr lang="en-US" sz="2800" dirty="0" smtClean="0"/>
+              <a:rPr lang="en-US" sz="2800" dirty="0"/>
               <a:t>Models used</a:t>
             </a:r>
           </a:p>
           <a:p>
             <a:pPr lvl="1"/>
             <a:r>
-              <a:rPr lang="en-US" sz="2400" dirty="0" smtClean="0"/>
+              <a:rPr lang="en-US" sz="2400" dirty="0"/>
               <a:t>T-Test</a:t>
             </a:r>
           </a:p>
           <a:p>
             <a:pPr lvl="2"/>
             <a:r>
-              <a:rPr lang="en-US" sz="2000" dirty="0" smtClean="0"/>
+              <a:rPr lang="en-US" sz="2000" dirty="0"/>
               <a:t>2009 compared to 2010 age group means</a:t>
             </a:r>
           </a:p>
           <a:p>
             <a:pPr lvl="1"/>
             <a:r>
-              <a:rPr lang="en-US" sz="2400" dirty="0" smtClean="0"/>
+              <a:rPr lang="en-US" sz="2400" dirty="0"/>
               <a:t>Chi-Square</a:t>
             </a:r>
           </a:p>
           <a:p>
             <a:pPr lvl="2"/>
             <a:r>
-              <a:rPr lang="en-US" sz="2000" dirty="0" smtClean="0"/>
+              <a:rPr lang="en-US" sz="2000" dirty="0"/>
               <a:t>Compared two or more groups variances</a:t>
             </a:r>
-            <a:endParaRPr lang="en-US" sz="2000" dirty="0"/>
           </a:p>
         </p:txBody>
       </p:sp>
@@ -17484,13 +17296,6 @@
   <p:clrMapOvr>
     <a:masterClrMapping/>
   </p:clrMapOvr>
-  <p:timing>
-    <p:tnLst>
-      <p:par>
-        <p:cTn id="1" dur="indefinite" restart="never" nodeType="tmRoot"/>
-      </p:par>
-    </p:tnLst>
-  </p:timing>
 </p:sld>
 </file>
 
@@ -17617,10 +17422,9 @@
           <a:lstStyle/>
           <a:p>
             <a:r>
-              <a:rPr lang="en-US" sz="2800" dirty="0" smtClean="0"/>
+              <a:rPr lang="en-US" sz="2800" dirty="0"/>
               <a:t>Testing a claim of bias</a:t>
             </a:r>
-            <a:endParaRPr lang="en-US" sz="2800" dirty="0"/>
           </a:p>
         </p:txBody>
       </p:sp>
@@ -17742,16 +17546,16 @@
           <a:lstStyle/>
           <a:p>
             <a:r>
-              <a:rPr lang="en-US" sz="1600" dirty="0" smtClean="0"/>
+              <a:rPr lang="en-US" sz="1600" dirty="0"/>
               <a:t>from </a:t>
             </a:r>
             <a:r>
-              <a:rPr lang="en-US" sz="1600" dirty="0" smtClean="0">
+              <a:rPr lang="en-US" sz="1600" dirty="0">
                 <a:hlinkClick r:id="rId6"/>
               </a:rPr>
               <a:t>Lottery FAQ</a:t>
             </a:r>
-            <a:endParaRPr lang="en-US" sz="1600" dirty="0" smtClean="0"/>
+            <a:endParaRPr lang="en-US" sz="1600" dirty="0"/>
           </a:p>
         </p:txBody>
       </p:sp>
@@ -17780,7 +17584,7 @@
               <a:lstStyle/>
               <a:p>
                 <a:r>
-                  <a:rPr lang="en-US" sz="1400" b="1" dirty="0" smtClean="0">
+                  <a:rPr lang="en-US" sz="1400" b="1" dirty="0">
                     <a:solidFill>
                       <a:srgbClr val="00B050"/>
                     </a:solidFill>
@@ -17790,85 +17594,85 @@
               </a:p>
               <a:p>
                 <a:r>
-                  <a:rPr lang="en-US" sz="1400" dirty="0" smtClean="0"/>
+                  <a:rPr lang="en-US" sz="1400" dirty="0"/>
                   <a:t>H</a:t>
                 </a:r>
                 <a:r>
-                  <a:rPr lang="en-US" sz="1400" baseline="-25000" dirty="0" smtClean="0"/>
+                  <a:rPr lang="en-US" sz="1400" baseline="-25000" dirty="0"/>
                   <a:t>0</a:t>
                 </a:r>
                 <a:r>
-                  <a:rPr lang="en-US" sz="1400" dirty="0" smtClean="0"/>
+                  <a:rPr lang="en-US" sz="1400" dirty="0"/>
                   <a:t>: </a:t>
                 </a:r>
                 <a:r>
-                  <a:rPr lang="en-US" sz="1400" dirty="0" err="1" smtClean="0"/>
+                  <a:rPr lang="en-US" sz="1400" dirty="0" err="1"/>
                   <a:t>Avg</a:t>
                 </a:r>
                 <a:r>
-                  <a:rPr lang="en-US" sz="1400" dirty="0" smtClean="0"/>
+                  <a:rPr lang="en-US" sz="1400" dirty="0"/>
                   <a:t> run times are the same pre/post lottery</a:t>
                 </a:r>
               </a:p>
               <a:p>
                 <a:r>
-                  <a:rPr lang="en-US" sz="1400" dirty="0" smtClean="0"/>
+                  <a:rPr lang="en-US" sz="1400" dirty="0"/>
                   <a:t>H</a:t>
                 </a:r>
                 <a:r>
-                  <a:rPr lang="en-US" sz="1400" baseline="-25000" dirty="0" smtClean="0"/>
+                  <a:rPr lang="en-US" sz="1400" baseline="-25000" dirty="0"/>
                   <a:t>A</a:t>
                 </a:r>
                 <a:r>
-                  <a:rPr lang="en-US" sz="1400" dirty="0" smtClean="0"/>
+                  <a:rPr lang="en-US" sz="1400" dirty="0"/>
                   <a:t>: </a:t>
                 </a:r>
                 <a:r>
-                  <a:rPr lang="en-US" sz="1400" dirty="0" err="1" smtClean="0"/>
+                  <a:rPr lang="en-US" sz="1400" dirty="0" err="1"/>
                   <a:t>Avg</a:t>
                 </a:r>
                 <a:r>
-                  <a:rPr lang="en-US" sz="1400" dirty="0" smtClean="0"/>
+                  <a:rPr lang="en-US" sz="1400" dirty="0"/>
                   <a:t> run times were different</a:t>
                 </a:r>
               </a:p>
               <a:p>
                 <a:r>
-                  <a:rPr lang="en-US" sz="1400" dirty="0" err="1" smtClean="0"/>
+                  <a:rPr lang="en-US" sz="1400" dirty="0" err="1"/>
                   <a:t>T</a:t>
                 </a:r>
                 <a:r>
-                  <a:rPr lang="en-US" sz="1400" baseline="-25000" dirty="0" err="1" smtClean="0"/>
+                  <a:rPr lang="en-US" sz="1400" baseline="-25000" dirty="0" err="1"/>
                   <a:t>critical</a:t>
                 </a:r>
                 <a:r>
-                  <a:rPr lang="en-US" sz="1400" baseline="-25000" dirty="0" smtClean="0"/>
+                  <a:rPr lang="en-US" sz="1400" baseline="-25000" dirty="0"/>
                   <a:t>,</a:t>
                 </a:r>
                 <a:r>
-                  <a:rPr lang="el-GR" sz="1400" baseline="-25000" dirty="0" smtClean="0"/>
+                  <a:rPr lang="el-GR" sz="1400" baseline="-25000" dirty="0"/>
                   <a:t>α</a:t>
                 </a:r>
                 <a:r>
-                  <a:rPr lang="en-US" sz="1400" baseline="-25000" dirty="0" smtClean="0"/>
+                  <a:rPr lang="en-US" sz="1400" baseline="-25000" dirty="0"/>
                   <a:t>=0.05</a:t>
                 </a:r>
                 <a:r>
-                  <a:rPr lang="en-US" sz="1400" dirty="0" smtClean="0"/>
+                  <a:rPr lang="en-US" sz="1400" dirty="0"/>
                   <a:t> = 1.645</a:t>
                 </a:r>
               </a:p>
               <a:p>
                 <a:r>
-                  <a:rPr lang="el-GR" sz="1400" dirty="0" smtClean="0"/>
+                  <a:rPr lang="el-GR" sz="1400" dirty="0"/>
                   <a:t>μ</a:t>
                 </a:r>
                 <a:r>
-                  <a:rPr lang="en-US" sz="1400" baseline="-25000" dirty="0" smtClean="0"/>
+                  <a:rPr lang="en-US" sz="1400" baseline="-25000" dirty="0"/>
                   <a:t>2009</a:t>
                 </a:r>
                 <a:r>
-                  <a:rPr lang="en-US" sz="1400" dirty="0" smtClean="0"/>
+                  <a:rPr lang="en-US" sz="1400" dirty="0"/>
                   <a:t> = 88.5608; </a:t>
                 </a:r>
               </a:p>
@@ -17896,71 +17700,70 @@
                   </m:oMath>
                 </a14:m>
                 <a:r>
-                  <a:rPr lang="en-US" sz="1400" baseline="-25000" dirty="0" smtClean="0"/>
+                  <a:rPr lang="en-US" sz="1400" baseline="-25000" dirty="0"/>
                   <a:t>2010</a:t>
                 </a:r>
                 <a:r>
-                  <a:rPr lang="en-US" sz="1400" dirty="0" smtClean="0"/>
+                  <a:rPr lang="en-US" sz="1400" dirty="0"/>
                   <a:t> = 89.1214, s</a:t>
                 </a:r>
                 <a:r>
-                  <a:rPr lang="en-US" sz="1400" baseline="-25000" dirty="0" smtClean="0"/>
+                  <a:rPr lang="en-US" sz="1400" baseline="-25000" dirty="0"/>
                   <a:t>2010 </a:t>
                 </a:r>
                 <a:r>
-                  <a:rPr lang="en-US" sz="1400" dirty="0" smtClean="0"/>
+                  <a:rPr lang="en-US" sz="1400" dirty="0"/>
                   <a:t>= 15.5223, n = 6907; </a:t>
                 </a:r>
               </a:p>
               <a:p>
                 <a:r>
-                  <a:rPr lang="en-US" sz="1400" dirty="0" err="1" smtClean="0"/>
+                  <a:rPr lang="en-US" sz="1400" dirty="0" err="1"/>
                   <a:t>T</a:t>
                 </a:r>
                 <a:r>
-                  <a:rPr lang="en-US" sz="1400" baseline="-25000" dirty="0" err="1" smtClean="0"/>
+                  <a:rPr lang="en-US" sz="1400" baseline="-25000" dirty="0" err="1"/>
                   <a:t>test</a:t>
                 </a:r>
                 <a:r>
-                  <a:rPr lang="en-US" sz="1400" baseline="-25000" dirty="0" smtClean="0"/>
+                  <a:rPr lang="en-US" sz="1400" baseline="-25000" dirty="0"/>
                   <a:t> </a:t>
                 </a:r>
                 <a:r>
-                  <a:rPr lang="en-US" sz="1400" dirty="0" smtClean="0"/>
+                  <a:rPr lang="en-US" sz="1400" dirty="0"/>
                   <a:t>= 3.002; Much greater than </a:t>
                 </a:r>
                 <a:r>
-                  <a:rPr lang="en-US" sz="1400" dirty="0" err="1" smtClean="0"/>
+                  <a:rPr lang="en-US" sz="1400" dirty="0" err="1"/>
                   <a:t>T</a:t>
                 </a:r>
                 <a:r>
-                  <a:rPr lang="en-US" sz="1400" baseline="-25000" dirty="0" err="1" smtClean="0"/>
+                  <a:rPr lang="en-US" sz="1400" baseline="-25000" dirty="0" err="1"/>
                   <a:t>critical</a:t>
                 </a:r>
-                <a:endParaRPr lang="en-US" sz="1400" baseline="-25000" dirty="0" smtClean="0"/>
+                <a:endParaRPr lang="en-US" sz="1400" baseline="-25000" dirty="0"/>
               </a:p>
               <a:p>
                 <a:r>
-                  <a:rPr lang="en-US" sz="1400" dirty="0" smtClean="0"/>
+                  <a:rPr lang="en-US" sz="1400" dirty="0"/>
                   <a:t>Reject H</a:t>
                 </a:r>
                 <a:r>
-                  <a:rPr lang="en-US" sz="1400" baseline="-25000" dirty="0" smtClean="0"/>
+                  <a:rPr lang="en-US" sz="1400" baseline="-25000" dirty="0"/>
                   <a:t>0</a:t>
                 </a:r>
                 <a:r>
-                  <a:rPr lang="en-US" sz="1400" dirty="0" smtClean="0"/>
+                  <a:rPr lang="en-US" sz="1400" dirty="0"/>
                   <a:t> – the run times </a:t>
                 </a:r>
                 <a:r>
-                  <a:rPr lang="en-US" sz="1400" b="1" dirty="0" smtClean="0"/>
+                  <a:rPr lang="en-US" sz="1400" b="1" dirty="0"/>
                   <a:t>are</a:t>
                 </a:r>
                 <a:r>
-                  <a:rPr lang="en-US" sz="1400" dirty="0" smtClean="0"/>
+                  <a:rPr lang="en-US" sz="1400" dirty="0"/>
                   <a:t> different        (p-value 0.0044)</a:t>
                 </a:r>
-                <a:endParaRPr lang="en-US" sz="1400" dirty="0"/>
               </a:p>
             </p:txBody>
           </p:sp>
@@ -18029,7 +17832,7 @@
               <a:lstStyle/>
               <a:p>
                 <a:r>
-                  <a:rPr lang="en-US" sz="1400" b="1" dirty="0" smtClean="0">
+                  <a:rPr lang="en-US" sz="1400" b="1" dirty="0">
                     <a:solidFill>
                       <a:srgbClr val="FF0000"/>
                     </a:solidFill>
@@ -18039,85 +17842,85 @@
               </a:p>
               <a:p>
                 <a:r>
-                  <a:rPr lang="en-US" sz="1400" dirty="0" smtClean="0"/>
+                  <a:rPr lang="en-US" sz="1400" dirty="0"/>
                   <a:t>H</a:t>
                 </a:r>
                 <a:r>
-                  <a:rPr lang="en-US" sz="1400" baseline="-25000" dirty="0" smtClean="0"/>
+                  <a:rPr lang="en-US" sz="1400" baseline="-25000" dirty="0"/>
                   <a:t>0</a:t>
                 </a:r>
                 <a:r>
-                  <a:rPr lang="en-US" sz="1400" dirty="0" smtClean="0"/>
+                  <a:rPr lang="en-US" sz="1400" dirty="0"/>
                   <a:t>: </a:t>
                 </a:r>
                 <a:r>
-                  <a:rPr lang="en-US" sz="1400" dirty="0" err="1" smtClean="0"/>
+                  <a:rPr lang="en-US" sz="1400" dirty="0" err="1"/>
                   <a:t>Avg</a:t>
                 </a:r>
                 <a:r>
-                  <a:rPr lang="en-US" sz="1400" dirty="0" smtClean="0"/>
+                  <a:rPr lang="en-US" sz="1400" dirty="0"/>
                   <a:t> run time for 2008 and 2009 are similar</a:t>
                 </a:r>
               </a:p>
               <a:p>
                 <a:r>
-                  <a:rPr lang="en-US" sz="1400" dirty="0" smtClean="0"/>
+                  <a:rPr lang="en-US" sz="1400" dirty="0"/>
                   <a:t>H</a:t>
                 </a:r>
                 <a:r>
-                  <a:rPr lang="en-US" sz="1400" baseline="-25000" dirty="0" smtClean="0"/>
+                  <a:rPr lang="en-US" sz="1400" baseline="-25000" dirty="0"/>
                   <a:t>A</a:t>
                 </a:r>
                 <a:r>
-                  <a:rPr lang="en-US" sz="1400" dirty="0" smtClean="0"/>
+                  <a:rPr lang="en-US" sz="1400" dirty="0"/>
                   <a:t>: </a:t>
                 </a:r>
                 <a:r>
-                  <a:rPr lang="en-US" sz="1400" dirty="0" err="1" smtClean="0"/>
+                  <a:rPr lang="en-US" sz="1400" dirty="0" err="1"/>
                   <a:t>Avg</a:t>
                 </a:r>
                 <a:r>
-                  <a:rPr lang="en-US" sz="1400" dirty="0" smtClean="0"/>
+                  <a:rPr lang="en-US" sz="1400" dirty="0"/>
                   <a:t> run times are different</a:t>
                 </a:r>
               </a:p>
               <a:p>
                 <a:r>
-                  <a:rPr lang="en-US" sz="1400" dirty="0" err="1" smtClean="0"/>
+                  <a:rPr lang="en-US" sz="1400" dirty="0" err="1"/>
                   <a:t>T</a:t>
                 </a:r>
                 <a:r>
-                  <a:rPr lang="en-US" sz="1400" baseline="-25000" dirty="0" err="1" smtClean="0"/>
+                  <a:rPr lang="en-US" sz="1400" baseline="-25000" dirty="0" err="1"/>
                   <a:t>critical</a:t>
                 </a:r>
                 <a:r>
-                  <a:rPr lang="en-US" sz="1400" baseline="-25000" dirty="0" smtClean="0"/>
+                  <a:rPr lang="en-US" sz="1400" baseline="-25000" dirty="0"/>
                   <a:t>,</a:t>
                 </a:r>
                 <a:r>
-                  <a:rPr lang="el-GR" sz="1400" baseline="-25000" dirty="0" smtClean="0"/>
+                  <a:rPr lang="el-GR" sz="1400" baseline="-25000" dirty="0"/>
                   <a:t>α</a:t>
                 </a:r>
                 <a:r>
-                  <a:rPr lang="en-US" sz="1400" baseline="-25000" dirty="0" smtClean="0"/>
+                  <a:rPr lang="en-US" sz="1400" baseline="-25000" dirty="0"/>
                   <a:t>=0.05</a:t>
                 </a:r>
                 <a:r>
-                  <a:rPr lang="en-US" sz="1400" dirty="0" smtClean="0"/>
+                  <a:rPr lang="en-US" sz="1400" dirty="0"/>
                   <a:t> = 1.645</a:t>
                 </a:r>
               </a:p>
               <a:p>
                 <a:r>
-                  <a:rPr lang="el-GR" sz="1400" dirty="0" smtClean="0"/>
+                  <a:rPr lang="el-GR" sz="1400" dirty="0"/>
                   <a:t>μ</a:t>
                 </a:r>
                 <a:r>
-                  <a:rPr lang="en-US" sz="1400" baseline="-25000" dirty="0" smtClean="0"/>
+                  <a:rPr lang="en-US" sz="1400" baseline="-25000" dirty="0"/>
                   <a:t>2008</a:t>
                 </a:r>
                 <a:r>
-                  <a:rPr lang="en-US" sz="1400" dirty="0" smtClean="0"/>
+                  <a:rPr lang="en-US" sz="1400" dirty="0"/>
                   <a:t> = 88.2567</a:t>
                 </a:r>
               </a:p>
@@ -18145,63 +17948,62 @@
                   </m:oMath>
                 </a14:m>
                 <a:r>
-                  <a:rPr lang="en-US" sz="1400" baseline="-25000" dirty="0" smtClean="0"/>
+                  <a:rPr lang="en-US" sz="1400" baseline="-25000" dirty="0"/>
                   <a:t>2009</a:t>
                 </a:r>
                 <a:r>
-                  <a:rPr lang="en-US" sz="1400" dirty="0" smtClean="0"/>
+                  <a:rPr lang="en-US" sz="1400" dirty="0"/>
                   <a:t> = 88.5608, s</a:t>
                 </a:r>
                 <a:r>
-                  <a:rPr lang="en-US" sz="1400" baseline="-25000" dirty="0" smtClean="0"/>
+                  <a:rPr lang="en-US" sz="1400" baseline="-25000" dirty="0"/>
                   <a:t>2009 </a:t>
                 </a:r>
                 <a:r>
-                  <a:rPr lang="en-US" sz="1400" dirty="0" smtClean="0"/>
+                  <a:rPr lang="en-US" sz="1400" dirty="0"/>
                   <a:t>= 15.0897, n = 6649</a:t>
                 </a:r>
               </a:p>
               <a:p>
                 <a:r>
-                  <a:rPr lang="en-US" sz="1400" dirty="0" err="1" smtClean="0"/>
+                  <a:rPr lang="en-US" sz="1400" dirty="0" err="1"/>
                   <a:t>T</a:t>
                 </a:r>
                 <a:r>
-                  <a:rPr lang="en-US" sz="1400" baseline="-25000" dirty="0" err="1" smtClean="0"/>
+                  <a:rPr lang="en-US" sz="1400" baseline="-25000" dirty="0" err="1"/>
                   <a:t>test</a:t>
                 </a:r>
                 <a:r>
-                  <a:rPr lang="en-US" sz="1400" dirty="0" smtClean="0"/>
+                  <a:rPr lang="en-US" sz="1400" dirty="0"/>
                   <a:t> = 1.643; less than </a:t>
                 </a:r>
                 <a:r>
-                  <a:rPr lang="en-US" sz="1400" dirty="0" err="1" smtClean="0"/>
+                  <a:rPr lang="en-US" sz="1400" dirty="0" err="1"/>
                   <a:t>T</a:t>
                 </a:r>
                 <a:r>
-                  <a:rPr lang="en-US" sz="1400" baseline="-25000" dirty="0" err="1" smtClean="0"/>
+                  <a:rPr lang="en-US" sz="1400" baseline="-25000" dirty="0" err="1"/>
                   <a:t>critical</a:t>
                 </a:r>
-                <a:endParaRPr lang="en-US" sz="1400" dirty="0" smtClean="0"/>
+                <a:endParaRPr lang="en-US" sz="1400" dirty="0"/>
               </a:p>
               <a:p>
                 <a:r>
-                  <a:rPr lang="en-US" sz="1400" dirty="0" smtClean="0"/>
+                  <a:rPr lang="en-US" sz="1400" dirty="0"/>
                   <a:t>Fail to reject H</a:t>
                 </a:r>
                 <a:r>
-                  <a:rPr lang="en-US" sz="1400" baseline="-25000" dirty="0" smtClean="0"/>
+                  <a:rPr lang="en-US" sz="1400" baseline="-25000" dirty="0"/>
                   <a:t>0</a:t>
                 </a:r>
                 <a:r>
-                  <a:rPr lang="en-US" sz="1400" dirty="0" smtClean="0"/>
+                  <a:rPr lang="en-US" sz="1400" dirty="0"/>
                   <a:t> – 2008 and 2009 were </a:t>
                 </a:r>
                 <a:r>
-                  <a:rPr lang="en-US" sz="1400" b="1" dirty="0" smtClean="0"/>
+                  <a:rPr lang="en-US" sz="1400" b="1" dirty="0"/>
                   <a:t>similar</a:t>
                 </a:r>
-                <a:endParaRPr lang="en-US" sz="1400" b="1" dirty="0"/>
               </a:p>
             </p:txBody>
           </p:sp>
@@ -18266,10 +18068,34 @@
                 <a:tableStyleId>{00A15C55-8517-42AA-B614-E9B94910E393}</a:tableStyleId>
               </a:tblPr>
               <a:tblGrid>
-                <a:gridCol w="610307"/>
-                <a:gridCol w="687705"/>
-                <a:gridCol w="725805"/>
-                <a:gridCol w="672465"/>
+                <a:gridCol w="610307">
+                  <a:extLst>
+                    <a:ext uri="{9D8B030D-6E8A-4147-A177-3AD203B41FA5}">
+                      <a16:colId xmlns:a16="http://schemas.microsoft.com/office/drawing/2014/main" val="20000"/>
+                    </a:ext>
+                  </a:extLst>
+                </a:gridCol>
+                <a:gridCol w="687705">
+                  <a:extLst>
+                    <a:ext uri="{9D8B030D-6E8A-4147-A177-3AD203B41FA5}">
+                      <a16:colId xmlns:a16="http://schemas.microsoft.com/office/drawing/2014/main" val="20001"/>
+                    </a:ext>
+                  </a:extLst>
+                </a:gridCol>
+                <a:gridCol w="725805">
+                  <a:extLst>
+                    <a:ext uri="{9D8B030D-6E8A-4147-A177-3AD203B41FA5}">
+                      <a16:colId xmlns:a16="http://schemas.microsoft.com/office/drawing/2014/main" val="20002"/>
+                    </a:ext>
+                  </a:extLst>
+                </a:gridCol>
+                <a:gridCol w="672465">
+                  <a:extLst>
+                    <a:ext uri="{9D8B030D-6E8A-4147-A177-3AD203B41FA5}">
+                      <a16:colId xmlns:a16="http://schemas.microsoft.com/office/drawing/2014/main" val="20003"/>
+                    </a:ext>
+                  </a:extLst>
+                </a:gridCol>
               </a:tblGrid>
               <a:tr h="260604">
                 <a:tc>
@@ -18278,10 +18104,9 @@
                     <a:lstStyle/>
                     <a:p>
                       <a:r>
-                        <a:rPr lang="en-US" sz="1100" dirty="0" smtClean="0"/>
+                        <a:rPr lang="en-US" sz="1100" dirty="0"/>
                         <a:t>Age Group</a:t>
                       </a:r>
-                      <a:endParaRPr lang="en-US" sz="1100" dirty="0"/>
                     </a:p>
                   </a:txBody>
                   <a:tcPr/>
@@ -18292,10 +18117,9 @@
                     <a:lstStyle/>
                     <a:p>
                       <a:r>
-                        <a:rPr lang="en-US" sz="1100" dirty="0" smtClean="0"/>
+                        <a:rPr lang="en-US" sz="1100" dirty="0"/>
                         <a:t>2009</a:t>
                       </a:r>
-                      <a:endParaRPr lang="en-US" sz="1100" dirty="0"/>
                     </a:p>
                   </a:txBody>
                   <a:tcPr/>
@@ -18306,10 +18130,9 @@
                     <a:lstStyle/>
                     <a:p>
                       <a:r>
-                        <a:rPr lang="en-US" sz="1100" dirty="0" smtClean="0"/>
+                        <a:rPr lang="en-US" sz="1100" dirty="0"/>
                         <a:t>2010</a:t>
                       </a:r>
-                      <a:endParaRPr lang="en-US" sz="1100" dirty="0"/>
                     </a:p>
                   </a:txBody>
                   <a:tcPr/>
@@ -18320,14 +18143,18 @@
                     <a:lstStyle/>
                     <a:p>
                       <a:r>
-                        <a:rPr lang="en-US" sz="1100" dirty="0" smtClean="0"/>
+                        <a:rPr lang="en-US" sz="1100" dirty="0"/>
                         <a:t>Row total</a:t>
                       </a:r>
-                      <a:endParaRPr lang="en-US" sz="1100" dirty="0"/>
                     </a:p>
                   </a:txBody>
                   <a:tcPr/>
                 </a:tc>
+                <a:extLst>
+                  <a:ext uri="{0D108BD9-81ED-4DB2-BD59-A6C34878D82A}">
+                    <a16:rowId xmlns:a16="http://schemas.microsoft.com/office/drawing/2014/main" val="10000"/>
+                  </a:ext>
+                </a:extLst>
               </a:tr>
               <a:tr h="202158">
                 <a:tc>
@@ -18336,10 +18163,9 @@
                     <a:lstStyle/>
                     <a:p>
                       <a:r>
-                        <a:rPr lang="en-US" sz="1100" dirty="0" smtClean="0"/>
+                        <a:rPr lang="en-US" sz="1100" dirty="0"/>
                         <a:t>&lt;20</a:t>
                       </a:r>
-                      <a:endParaRPr lang="en-US" sz="1100" dirty="0"/>
                     </a:p>
                   </a:txBody>
                   <a:tcPr/>
@@ -18350,16 +18176,15 @@
                     <a:lstStyle/>
                     <a:p>
                       <a:r>
-                        <a:rPr lang="en-US" sz="1100" dirty="0" smtClean="0"/>
+                        <a:rPr lang="en-US" sz="1100" dirty="0"/>
                         <a:t>73</a:t>
                       </a:r>
                     </a:p>
                     <a:p>
                       <a:r>
-                        <a:rPr lang="en-US" sz="1100" dirty="0" smtClean="0"/>
+                        <a:rPr lang="en-US" sz="1100" dirty="0"/>
                         <a:t>86.53</a:t>
                       </a:r>
-                      <a:endParaRPr lang="en-US" sz="1100" dirty="0"/>
                     </a:p>
                   </a:txBody>
                   <a:tcPr/>
@@ -18370,16 +18195,15 @@
                     <a:lstStyle/>
                     <a:p>
                       <a:r>
-                        <a:rPr lang="en-US" sz="1100" dirty="0" smtClean="0"/>
+                        <a:rPr lang="en-US" sz="1100" dirty="0"/>
                         <a:t>111</a:t>
                       </a:r>
                     </a:p>
                     <a:p>
                       <a:r>
-                        <a:rPr lang="en-US" sz="1100" dirty="0" smtClean="0"/>
+                        <a:rPr lang="en-US" sz="1100" dirty="0"/>
                         <a:t>97.46</a:t>
                       </a:r>
-                      <a:endParaRPr lang="en-US" sz="1100" dirty="0"/>
                     </a:p>
                   </a:txBody>
                   <a:tcPr/>
@@ -18390,14 +18214,18 @@
                     <a:lstStyle/>
                     <a:p>
                       <a:r>
-                        <a:rPr lang="en-US" sz="1100" dirty="0" smtClean="0"/>
+                        <a:rPr lang="en-US" sz="1100" dirty="0"/>
                         <a:t>184</a:t>
                       </a:r>
-                      <a:endParaRPr lang="en-US" sz="1100" dirty="0"/>
                     </a:p>
                   </a:txBody>
                   <a:tcPr/>
                 </a:tc>
+                <a:extLst>
+                  <a:ext uri="{0D108BD9-81ED-4DB2-BD59-A6C34878D82A}">
+                    <a16:rowId xmlns:a16="http://schemas.microsoft.com/office/drawing/2014/main" val="10001"/>
+                  </a:ext>
+                </a:extLst>
               </a:tr>
               <a:tr h="0">
                 <a:tc>
@@ -18406,10 +18234,9 @@
                     <a:lstStyle/>
                     <a:p>
                       <a:r>
-                        <a:rPr lang="en-US" sz="1100" dirty="0" smtClean="0"/>
+                        <a:rPr lang="en-US" sz="1100" dirty="0"/>
                         <a:t>&lt;40</a:t>
                       </a:r>
-                      <a:endParaRPr lang="en-US" sz="1100" dirty="0"/>
                     </a:p>
                   </a:txBody>
                   <a:tcPr/>
@@ -18420,16 +18247,15 @@
                     <a:lstStyle/>
                     <a:p>
                       <a:r>
-                        <a:rPr lang="en-US" sz="1100" dirty="0" smtClean="0"/>
+                        <a:rPr lang="en-US" sz="1100" dirty="0"/>
                         <a:t>3944</a:t>
                       </a:r>
                     </a:p>
                     <a:p>
                       <a:r>
-                        <a:rPr lang="en-US" sz="1100" dirty="0" smtClean="0"/>
+                        <a:rPr lang="en-US" sz="1100" dirty="0"/>
                         <a:t>3993.43</a:t>
                       </a:r>
-                      <a:endParaRPr lang="en-US" sz="1100" dirty="0"/>
                     </a:p>
                   </a:txBody>
                   <a:tcPr/>
@@ -18440,16 +18266,15 @@
                     <a:lstStyle/>
                     <a:p>
                       <a:r>
-                        <a:rPr lang="en-US" sz="1100" dirty="0" smtClean="0"/>
+                        <a:rPr lang="en-US" sz="1100" dirty="0"/>
                         <a:t>4547</a:t>
                       </a:r>
                     </a:p>
                     <a:p>
                       <a:r>
-                        <a:rPr lang="en-US" sz="1100" dirty="0" smtClean="0"/>
+                        <a:rPr lang="en-US" sz="1100" dirty="0"/>
                         <a:t>4497.57</a:t>
                       </a:r>
-                      <a:endParaRPr lang="en-US" sz="1100" dirty="0"/>
                     </a:p>
                   </a:txBody>
                   <a:tcPr/>
@@ -18460,14 +18285,18 @@
                     <a:lstStyle/>
                     <a:p>
                       <a:r>
-                        <a:rPr lang="en-US" sz="1100" dirty="0" smtClean="0"/>
+                        <a:rPr lang="en-US" sz="1100" dirty="0"/>
                         <a:t>8491</a:t>
                       </a:r>
-                      <a:endParaRPr lang="en-US" sz="1100" dirty="0"/>
                     </a:p>
                   </a:txBody>
                   <a:tcPr/>
                 </a:tc>
+                <a:extLst>
+                  <a:ext uri="{0D108BD9-81ED-4DB2-BD59-A6C34878D82A}">
+                    <a16:rowId xmlns:a16="http://schemas.microsoft.com/office/drawing/2014/main" val="10002"/>
+                  </a:ext>
+                </a:extLst>
               </a:tr>
               <a:tr h="0">
                 <a:tc>
@@ -18476,10 +18305,9 @@
                     <a:lstStyle/>
                     <a:p>
                       <a:r>
-                        <a:rPr lang="en-US" sz="1100" dirty="0" smtClean="0"/>
+                        <a:rPr lang="en-US" sz="1100" dirty="0"/>
                         <a:t>&lt;60</a:t>
                       </a:r>
-                      <a:endParaRPr lang="en-US" sz="1100" dirty="0"/>
                     </a:p>
                   </a:txBody>
                   <a:tcPr/>
@@ -18490,16 +18318,15 @@
                     <a:lstStyle/>
                     <a:p>
                       <a:r>
-                        <a:rPr lang="en-US" sz="1100" dirty="0" smtClean="0"/>
+                        <a:rPr lang="en-US" sz="1100" dirty="0"/>
                         <a:t>1912</a:t>
                       </a:r>
                     </a:p>
                     <a:p>
                       <a:r>
-                        <a:rPr lang="en-US" sz="1100" dirty="0" smtClean="0"/>
+                        <a:rPr lang="en-US" sz="1100" dirty="0"/>
                         <a:t>1859.62</a:t>
                       </a:r>
-                      <a:endParaRPr lang="en-US" sz="1100" dirty="0"/>
                     </a:p>
                   </a:txBody>
                   <a:tcPr/>
@@ -18510,16 +18337,15 @@
                     <a:lstStyle/>
                     <a:p>
                       <a:r>
-                        <a:rPr lang="en-US" sz="1100" dirty="0" smtClean="0"/>
+                        <a:rPr lang="en-US" sz="1100" dirty="0"/>
                         <a:t>2042</a:t>
                       </a:r>
                     </a:p>
                     <a:p>
                       <a:r>
-                        <a:rPr lang="en-US" sz="1100" dirty="0" smtClean="0"/>
+                        <a:rPr lang="en-US" sz="1100" dirty="0"/>
                         <a:t>2094.38</a:t>
                       </a:r>
-                      <a:endParaRPr lang="en-US" sz="1100" dirty="0"/>
                     </a:p>
                   </a:txBody>
                   <a:tcPr/>
@@ -18530,14 +18356,18 @@
                     <a:lstStyle/>
                     <a:p>
                       <a:r>
-                        <a:rPr lang="en-US" sz="1100" dirty="0" smtClean="0"/>
+                        <a:rPr lang="en-US" sz="1100" dirty="0"/>
                         <a:t>3954</a:t>
                       </a:r>
-                      <a:endParaRPr lang="en-US" sz="1100" dirty="0"/>
                     </a:p>
                   </a:txBody>
                   <a:tcPr/>
                 </a:tc>
+                <a:extLst>
+                  <a:ext uri="{0D108BD9-81ED-4DB2-BD59-A6C34878D82A}">
+                    <a16:rowId xmlns:a16="http://schemas.microsoft.com/office/drawing/2014/main" val="10003"/>
+                  </a:ext>
+                </a:extLst>
               </a:tr>
               <a:tr h="0">
                 <a:tc>
@@ -18546,10 +18376,9 @@
                     <a:lstStyle/>
                     <a:p>
                       <a:r>
-                        <a:rPr lang="en-US" sz="1100" dirty="0" smtClean="0"/>
+                        <a:rPr lang="en-US" sz="1100" dirty="0"/>
                         <a:t>&lt;80</a:t>
                       </a:r>
-                      <a:endParaRPr lang="en-US" sz="1100" dirty="0"/>
                     </a:p>
                   </a:txBody>
                   <a:tcPr/>
@@ -18560,16 +18389,15 @@
                     <a:lstStyle/>
                     <a:p>
                       <a:r>
-                        <a:rPr lang="en-US" sz="1100" dirty="0" smtClean="0"/>
+                        <a:rPr lang="en-US" sz="1100" dirty="0"/>
                         <a:t>202</a:t>
                       </a:r>
                     </a:p>
                     <a:p>
                       <a:r>
-                        <a:rPr lang="en-US" sz="1100" dirty="0" smtClean="0"/>
+                        <a:rPr lang="en-US" sz="1100" dirty="0"/>
                         <a:t>191.42</a:t>
                       </a:r>
-                      <a:endParaRPr lang="en-US" sz="1100" dirty="0"/>
                     </a:p>
                   </a:txBody>
                   <a:tcPr/>
@@ -18580,16 +18408,15 @@
                     <a:lstStyle/>
                     <a:p>
                       <a:r>
-                        <a:rPr lang="en-US" sz="1100" dirty="0" smtClean="0"/>
+                        <a:rPr lang="en-US" sz="1100" dirty="0"/>
                         <a:t>205</a:t>
                       </a:r>
                     </a:p>
                     <a:p>
                       <a:r>
-                        <a:rPr lang="en-US" sz="1100" dirty="0" smtClean="0"/>
+                        <a:rPr lang="en-US" sz="1100" dirty="0"/>
                         <a:t>215.58</a:t>
                       </a:r>
-                      <a:endParaRPr lang="en-US" sz="1100" dirty="0"/>
                     </a:p>
                   </a:txBody>
                   <a:tcPr/>
@@ -18600,14 +18427,18 @@
                     <a:lstStyle/>
                     <a:p>
                       <a:r>
-                        <a:rPr lang="en-US" sz="1100" dirty="0" smtClean="0"/>
+                        <a:rPr lang="en-US" sz="1100" dirty="0"/>
                         <a:t>407</a:t>
                       </a:r>
-                      <a:endParaRPr lang="en-US" sz="1100" dirty="0"/>
                     </a:p>
                   </a:txBody>
                   <a:tcPr/>
                 </a:tc>
+                <a:extLst>
+                  <a:ext uri="{0D108BD9-81ED-4DB2-BD59-A6C34878D82A}">
+                    <a16:rowId xmlns:a16="http://schemas.microsoft.com/office/drawing/2014/main" val="10004"/>
+                  </a:ext>
+                </a:extLst>
               </a:tr>
               <a:tr h="370840">
                 <a:tc>
@@ -18616,10 +18447,9 @@
                     <a:lstStyle/>
                     <a:p>
                       <a:r>
-                        <a:rPr lang="en-US" sz="1100" dirty="0" smtClean="0"/>
+                        <a:rPr lang="en-US" sz="1100" dirty="0"/>
                         <a:t>Col totals</a:t>
                       </a:r>
-                      <a:endParaRPr lang="en-US" sz="1100" dirty="0"/>
                     </a:p>
                   </a:txBody>
                   <a:tcPr/>
@@ -18630,10 +18460,9 @@
                     <a:lstStyle/>
                     <a:p>
                       <a:r>
-                        <a:rPr lang="en-US" sz="1100" dirty="0" smtClean="0"/>
+                        <a:rPr lang="en-US" sz="1100" dirty="0"/>
                         <a:t>6131</a:t>
                       </a:r>
-                      <a:endParaRPr lang="en-US" sz="1100" dirty="0"/>
                     </a:p>
                   </a:txBody>
                   <a:tcPr/>
@@ -18644,10 +18473,9 @@
                     <a:lstStyle/>
                     <a:p>
                       <a:r>
-                        <a:rPr lang="en-US" sz="1100" dirty="0" smtClean="0"/>
+                        <a:rPr lang="en-US" sz="1100" dirty="0"/>
                         <a:t>6905</a:t>
                       </a:r>
-                      <a:endParaRPr lang="en-US" sz="1100" dirty="0"/>
                     </a:p>
                   </a:txBody>
                   <a:tcPr/>
@@ -18658,14 +18486,18 @@
                     <a:lstStyle/>
                     <a:p>
                       <a:r>
-                        <a:rPr lang="en-US" sz="1100" dirty="0" smtClean="0"/>
+                        <a:rPr lang="en-US" sz="1100" dirty="0"/>
                         <a:t>13036</a:t>
                       </a:r>
-                      <a:endParaRPr lang="en-US" sz="1100" dirty="0"/>
                     </a:p>
                   </a:txBody>
                   <a:tcPr/>
                 </a:tc>
+                <a:extLst>
+                  <a:ext uri="{0D108BD9-81ED-4DB2-BD59-A6C34878D82A}">
+                    <a16:rowId xmlns:a16="http://schemas.microsoft.com/office/drawing/2014/main" val="10005"/>
+                  </a:ext>
+                </a:extLst>
               </a:tr>
             </a:tbl>
           </a:graphicData>
@@ -18694,111 +18526,110 @@
           <a:lstStyle/>
           <a:p>
             <a:r>
-              <a:rPr lang="en-US" sz="1400" dirty="0" smtClean="0"/>
+              <a:rPr lang="en-US" sz="1400" dirty="0"/>
               <a:t>H</a:t>
             </a:r>
             <a:r>
-              <a:rPr lang="en-US" sz="1400" baseline="-25000" dirty="0" smtClean="0"/>
+              <a:rPr lang="en-US" sz="1400" baseline="-25000" dirty="0"/>
               <a:t>0</a:t>
             </a:r>
             <a:r>
-              <a:rPr lang="en-US" sz="1400" dirty="0" smtClean="0"/>
+              <a:rPr lang="en-US" sz="1400" dirty="0"/>
               <a:t>: Age groups were not affected</a:t>
             </a:r>
           </a:p>
           <a:p>
             <a:r>
-              <a:rPr lang="en-US" sz="1400" dirty="0" smtClean="0"/>
+              <a:rPr lang="en-US" sz="1400" dirty="0"/>
               <a:t>H</a:t>
             </a:r>
             <a:r>
-              <a:rPr lang="en-US" sz="1400" baseline="-25000" dirty="0" smtClean="0"/>
+              <a:rPr lang="en-US" sz="1400" baseline="-25000" dirty="0"/>
               <a:t>A</a:t>
             </a:r>
             <a:r>
-              <a:rPr lang="en-US" sz="1400" dirty="0" smtClean="0"/>
+              <a:rPr lang="en-US" sz="1400" dirty="0"/>
               <a:t>: One or more age groups were affected</a:t>
             </a:r>
           </a:p>
           <a:p>
             <a:r>
-              <a:rPr lang="el-GR" sz="1400" dirty="0" smtClean="0"/>
+              <a:rPr lang="el-GR" sz="1400" dirty="0"/>
               <a:t>χ</a:t>
             </a:r>
             <a:r>
-              <a:rPr lang="en-US" sz="1400" baseline="30000" dirty="0" smtClean="0"/>
+              <a:rPr lang="en-US" sz="1400" baseline="30000" dirty="0"/>
               <a:t>2</a:t>
             </a:r>
             <a:r>
-              <a:rPr lang="en-US" sz="1400" baseline="-25000" dirty="0" smtClean="0"/>
+              <a:rPr lang="en-US" sz="1400" baseline="-25000" dirty="0"/>
               <a:t>critical,</a:t>
             </a:r>
             <a:r>
-              <a:rPr lang="el-GR" sz="1400" baseline="-25000" dirty="0" smtClean="0"/>
+              <a:rPr lang="el-GR" sz="1400" baseline="-25000" dirty="0"/>
               <a:t>α</a:t>
             </a:r>
             <a:r>
-              <a:rPr lang="en-US" sz="1400" baseline="-25000" dirty="0" smtClean="0"/>
+              <a:rPr lang="en-US" sz="1400" baseline="-25000" dirty="0"/>
               <a:t>=0.05</a:t>
             </a:r>
             <a:r>
-              <a:rPr lang="en-US" sz="1400" dirty="0" smtClean="0"/>
+              <a:rPr lang="en-US" sz="1400" dirty="0"/>
               <a:t> = 7.815</a:t>
             </a:r>
           </a:p>
           <a:p>
             <a:r>
-              <a:rPr lang="el-GR" sz="1400" dirty="0" smtClean="0"/>
+              <a:rPr lang="el-GR" sz="1400" dirty="0"/>
               <a:t>χ</a:t>
             </a:r>
             <a:r>
-              <a:rPr lang="en-US" sz="1400" baseline="30000" dirty="0" smtClean="0"/>
+              <a:rPr lang="en-US" sz="1400" baseline="30000" dirty="0"/>
               <a:t>2</a:t>
             </a:r>
             <a:r>
-              <a:rPr lang="en-US" sz="1400" baseline="-25000" dirty="0" smtClean="0"/>
+              <a:rPr lang="en-US" sz="1400" baseline="-25000" dirty="0"/>
               <a:t>test</a:t>
             </a:r>
             <a:r>
-              <a:rPr lang="en-US" sz="1400" dirty="0" smtClean="0"/>
+              <a:rPr lang="en-US" sz="1400" dirty="0"/>
               <a:t> = 9.043: Greater than </a:t>
             </a:r>
             <a:r>
-              <a:rPr lang="el-GR" sz="1400" dirty="0" smtClean="0"/>
+              <a:rPr lang="el-GR" sz="1400" dirty="0"/>
               <a:t>χ</a:t>
             </a:r>
             <a:r>
-              <a:rPr lang="en-US" sz="1400" baseline="30000" dirty="0" smtClean="0"/>
+              <a:rPr lang="en-US" sz="1400" baseline="30000" dirty="0"/>
               <a:t>2</a:t>
             </a:r>
             <a:r>
-              <a:rPr lang="en-US" sz="1400" baseline="-25000" dirty="0" smtClean="0"/>
+              <a:rPr lang="en-US" sz="1400" baseline="-25000" dirty="0"/>
               <a:t>critical</a:t>
             </a:r>
-            <a:endParaRPr lang="en-US" sz="1400" dirty="0" smtClean="0"/>
-          </a:p>
-          <a:p>
-            <a:r>
-              <a:rPr lang="en-US" sz="1400" dirty="0" smtClean="0"/>
+            <a:endParaRPr lang="en-US" sz="1400" dirty="0"/>
+          </a:p>
+          <a:p>
+            <a:r>
+              <a:rPr lang="en-US" sz="1400" dirty="0"/>
               <a:t>Reject H</a:t>
             </a:r>
             <a:r>
-              <a:rPr lang="en-US" sz="1400" baseline="-25000" dirty="0" smtClean="0"/>
+              <a:rPr lang="en-US" sz="1400" baseline="-25000" dirty="0"/>
               <a:t>0</a:t>
             </a:r>
             <a:r>
-              <a:rPr lang="en-US" sz="1400" dirty="0" smtClean="0"/>
+              <a:rPr lang="en-US" sz="1400" dirty="0"/>
               <a:t> – age groups </a:t>
             </a:r>
             <a:r>
-              <a:rPr lang="en-US" sz="1400" b="1" dirty="0" smtClean="0"/>
+              <a:rPr lang="en-US" sz="1400" b="1" dirty="0"/>
               <a:t>were</a:t>
             </a:r>
             <a:r>
-              <a:rPr lang="en-US" sz="1400" dirty="0" smtClean="0"/>
+              <a:rPr lang="en-US" sz="1400" dirty="0"/>
               <a:t> affected</a:t>
             </a:r>
-            <a:endParaRPr lang="en-US" sz="1400" dirty="0"/>
           </a:p>
         </p:txBody>
       </p:sp>
@@ -18825,7 +18656,7 @@
           <a:lstStyle/>
           <a:p>
             <a:r>
-              <a:rPr lang="en-US" sz="1600" b="1" dirty="0" smtClean="0">
+              <a:rPr lang="en-US" sz="1600" b="1" dirty="0">
                 <a:solidFill>
                   <a:schemeClr val="accent4">
                     <a:lumMod val="75000"/>
@@ -18834,13 +18665,6 @@
               </a:rPr>
               <a:t>Was it age-related?</a:t>
             </a:r>
-            <a:endParaRPr lang="en-US" sz="1600" b="1" dirty="0">
-              <a:solidFill>
-                <a:schemeClr val="accent4">
-                  <a:lumMod val="75000"/>
-                </a:schemeClr>
-              </a:solidFill>
-            </a:endParaRPr>
           </a:p>
         </p:txBody>
       </p:sp>
@@ -18867,7 +18691,7 @@
           <a:lstStyle/>
           <a:p>
             <a:r>
-              <a:rPr lang="en-US" sz="1600" b="1" dirty="0" smtClean="0">
+              <a:rPr lang="en-US" sz="1600" b="1" dirty="0">
                 <a:solidFill>
                   <a:schemeClr val="accent1">
                     <a:lumMod val="60000"/>
@@ -18877,14 +18701,6 @@
               </a:rPr>
               <a:t>Was it time/distance-related?</a:t>
             </a:r>
-            <a:endParaRPr lang="en-US" sz="1600" b="1" dirty="0">
-              <a:solidFill>
-                <a:schemeClr val="accent1">
-                  <a:lumMod val="60000"/>
-                  <a:lumOff val="40000"/>
-                </a:schemeClr>
-              </a:solidFill>
-            </a:endParaRPr>
           </a:p>
         </p:txBody>
       </p:sp>
@@ -18909,10 +18725,34 @@
                 <a:tableStyleId>{93296810-A885-4BE3-A3E7-6D5BEEA58F35}</a:tableStyleId>
               </a:tblPr>
               <a:tblGrid>
-                <a:gridCol w="897255"/>
-                <a:gridCol w="703580"/>
-                <a:gridCol w="703580"/>
-                <a:gridCol w="767720"/>
+                <a:gridCol w="897255">
+                  <a:extLst>
+                    <a:ext uri="{9D8B030D-6E8A-4147-A177-3AD203B41FA5}">
+                      <a16:colId xmlns:a16="http://schemas.microsoft.com/office/drawing/2014/main" val="20000"/>
+                    </a:ext>
+                  </a:extLst>
+                </a:gridCol>
+                <a:gridCol w="703580">
+                  <a:extLst>
+                    <a:ext uri="{9D8B030D-6E8A-4147-A177-3AD203B41FA5}">
+                      <a16:colId xmlns:a16="http://schemas.microsoft.com/office/drawing/2014/main" val="20001"/>
+                    </a:ext>
+                  </a:extLst>
+                </a:gridCol>
+                <a:gridCol w="703580">
+                  <a:extLst>
+                    <a:ext uri="{9D8B030D-6E8A-4147-A177-3AD203B41FA5}">
+                      <a16:colId xmlns:a16="http://schemas.microsoft.com/office/drawing/2014/main" val="20002"/>
+                    </a:ext>
+                  </a:extLst>
+                </a:gridCol>
+                <a:gridCol w="767720">
+                  <a:extLst>
+                    <a:ext uri="{9D8B030D-6E8A-4147-A177-3AD203B41FA5}">
+                      <a16:colId xmlns:a16="http://schemas.microsoft.com/office/drawing/2014/main" val="20003"/>
+                    </a:ext>
+                  </a:extLst>
+                </a:gridCol>
               </a:tblGrid>
               <a:tr h="228861">
                 <a:tc>
@@ -18921,10 +18761,9 @@
                     <a:lstStyle/>
                     <a:p>
                       <a:r>
-                        <a:rPr lang="en-US" sz="1050" dirty="0" smtClean="0"/>
+                        <a:rPr lang="en-US" sz="1050" dirty="0"/>
                         <a:t>Location</a:t>
                       </a:r>
-                      <a:endParaRPr lang="en-US" sz="1050" dirty="0"/>
                     </a:p>
                   </a:txBody>
                   <a:tcPr/>
@@ -18935,10 +18774,9 @@
                     <a:lstStyle/>
                     <a:p>
                       <a:r>
-                        <a:rPr lang="en-US" sz="1050" dirty="0" smtClean="0"/>
+                        <a:rPr lang="en-US" sz="1050" dirty="0"/>
                         <a:t>2009</a:t>
                       </a:r>
-                      <a:endParaRPr lang="en-US" sz="1050" dirty="0"/>
                     </a:p>
                   </a:txBody>
                   <a:tcPr/>
@@ -18949,10 +18787,9 @@
                     <a:lstStyle/>
                     <a:p>
                       <a:r>
-                        <a:rPr lang="en-US" sz="1050" dirty="0" smtClean="0"/>
+                        <a:rPr lang="en-US" sz="1050" dirty="0"/>
                         <a:t>2010</a:t>
                       </a:r>
-                      <a:endParaRPr lang="en-US" sz="1050" dirty="0"/>
                     </a:p>
                   </a:txBody>
                   <a:tcPr/>
@@ -18963,14 +18800,18 @@
                     <a:lstStyle/>
                     <a:p>
                       <a:r>
-                        <a:rPr lang="en-US" sz="1050" dirty="0" smtClean="0"/>
+                        <a:rPr lang="en-US" sz="1050" dirty="0"/>
                         <a:t>Row total</a:t>
                       </a:r>
-                      <a:endParaRPr lang="en-US" sz="1050" dirty="0"/>
                     </a:p>
                   </a:txBody>
                   <a:tcPr/>
                 </a:tc>
+                <a:extLst>
+                  <a:ext uri="{0D108BD9-81ED-4DB2-BD59-A6C34878D82A}">
+                    <a16:rowId xmlns:a16="http://schemas.microsoft.com/office/drawing/2014/main" val="10000"/>
+                  </a:ext>
+                </a:extLst>
               </a:tr>
               <a:tr h="374499">
                 <a:tc>
@@ -18979,10 +18820,9 @@
                     <a:lstStyle/>
                     <a:p>
                       <a:r>
-                        <a:rPr lang="en-US" sz="1050" dirty="0" smtClean="0"/>
+                        <a:rPr lang="en-US" sz="1050" dirty="0"/>
                         <a:t>East Coast</a:t>
                       </a:r>
-                      <a:endParaRPr lang="en-US" sz="1050" dirty="0"/>
                     </a:p>
                   </a:txBody>
                   <a:tcPr/>
@@ -18993,16 +18833,15 @@
                     <a:lstStyle/>
                     <a:p>
                       <a:r>
-                        <a:rPr lang="en-US" sz="1050" dirty="0" smtClean="0"/>
+                        <a:rPr lang="en-US" sz="1050" dirty="0"/>
                         <a:t>6423</a:t>
                       </a:r>
                     </a:p>
                     <a:p>
                       <a:r>
-                        <a:rPr lang="en-US" sz="1050" dirty="0" smtClean="0"/>
+                        <a:rPr lang="en-US" sz="1050" dirty="0"/>
                         <a:t>6414.96</a:t>
                       </a:r>
-                      <a:endParaRPr lang="en-US" sz="1050" dirty="0"/>
                     </a:p>
                   </a:txBody>
                   <a:tcPr/>
@@ -19013,16 +18852,15 @@
                     <a:lstStyle/>
                     <a:p>
                       <a:r>
-                        <a:rPr lang="en-US" sz="1050" dirty="0" smtClean="0"/>
+                        <a:rPr lang="en-US" sz="1050" dirty="0"/>
                         <a:t>6657</a:t>
                       </a:r>
                     </a:p>
                     <a:p>
                       <a:r>
-                        <a:rPr lang="en-US" sz="1050" dirty="0" smtClean="0"/>
+                        <a:rPr lang="en-US" sz="1050" dirty="0"/>
                         <a:t>6665.04</a:t>
                       </a:r>
-                      <a:endParaRPr lang="en-US" sz="1050" dirty="0"/>
                     </a:p>
                   </a:txBody>
                   <a:tcPr/>
@@ -19033,14 +18871,18 @@
                     <a:lstStyle/>
                     <a:p>
                       <a:r>
-                        <a:rPr lang="en-US" sz="1050" dirty="0" smtClean="0"/>
+                        <a:rPr lang="en-US" sz="1050" dirty="0"/>
                         <a:t>13080</a:t>
                       </a:r>
-                      <a:endParaRPr lang="en-US" sz="1050" dirty="0"/>
                     </a:p>
                   </a:txBody>
                   <a:tcPr/>
                 </a:tc>
+                <a:extLst>
+                  <a:ext uri="{0D108BD9-81ED-4DB2-BD59-A6C34878D82A}">
+                    <a16:rowId xmlns:a16="http://schemas.microsoft.com/office/drawing/2014/main" val="10001"/>
+                  </a:ext>
+                </a:extLst>
               </a:tr>
               <a:tr h="374499">
                 <a:tc>
@@ -19049,10 +18891,9 @@
                     <a:lstStyle/>
                     <a:p>
                       <a:r>
-                        <a:rPr lang="en-US" sz="1050" dirty="0" smtClean="0"/>
+                        <a:rPr lang="en-US" sz="1050" dirty="0"/>
                         <a:t>Central</a:t>
                       </a:r>
-                      <a:endParaRPr lang="en-US" sz="1050" dirty="0"/>
                     </a:p>
                   </a:txBody>
                   <a:tcPr/>
@@ -19063,16 +18904,15 @@
                     <a:lstStyle/>
                     <a:p>
                       <a:r>
-                        <a:rPr lang="en-US" sz="1050" dirty="0" smtClean="0"/>
+                        <a:rPr lang="en-US" sz="1050" dirty="0"/>
                         <a:t>131</a:t>
                       </a:r>
                     </a:p>
                     <a:p>
                       <a:r>
-                        <a:rPr lang="en-US" sz="1050" dirty="0" smtClean="0"/>
+                        <a:rPr lang="en-US" sz="1050" dirty="0"/>
                         <a:t>136.83</a:t>
                       </a:r>
-                      <a:endParaRPr lang="en-US" sz="1050" dirty="0"/>
                     </a:p>
                   </a:txBody>
                   <a:tcPr/>
@@ -19083,16 +18923,15 @@
                     <a:lstStyle/>
                     <a:p>
                       <a:r>
-                        <a:rPr lang="en-US" sz="1050" dirty="0" smtClean="0"/>
+                        <a:rPr lang="en-US" sz="1050" dirty="0"/>
                         <a:t>148</a:t>
                       </a:r>
                     </a:p>
                     <a:p>
                       <a:r>
-                        <a:rPr lang="en-US" sz="1050" dirty="0" smtClean="0"/>
+                        <a:rPr lang="en-US" sz="1050" dirty="0"/>
                         <a:t>142.17</a:t>
                       </a:r>
-                      <a:endParaRPr lang="en-US" sz="1050" dirty="0"/>
                     </a:p>
                   </a:txBody>
                   <a:tcPr/>
@@ -19103,14 +18942,18 @@
                     <a:lstStyle/>
                     <a:p>
                       <a:r>
-                        <a:rPr lang="en-US" sz="1050" dirty="0" smtClean="0"/>
+                        <a:rPr lang="en-US" sz="1050" dirty="0"/>
                         <a:t>279</a:t>
                       </a:r>
-                      <a:endParaRPr lang="en-US" sz="1050" dirty="0"/>
                     </a:p>
                   </a:txBody>
                   <a:tcPr/>
                 </a:tc>
+                <a:extLst>
+                  <a:ext uri="{0D108BD9-81ED-4DB2-BD59-A6C34878D82A}">
+                    <a16:rowId xmlns:a16="http://schemas.microsoft.com/office/drawing/2014/main" val="10002"/>
+                  </a:ext>
+                </a:extLst>
               </a:tr>
               <a:tr h="374499">
                 <a:tc>
@@ -19119,10 +18962,9 @@
                     <a:lstStyle/>
                     <a:p>
                       <a:r>
-                        <a:rPr lang="en-US" sz="1050" dirty="0" smtClean="0"/>
+                        <a:rPr lang="en-US" sz="1050" dirty="0"/>
                         <a:t>Mountain</a:t>
                       </a:r>
-                      <a:endParaRPr lang="en-US" sz="1050" dirty="0"/>
                     </a:p>
                   </a:txBody>
                   <a:tcPr/>
@@ -19133,16 +18975,15 @@
                     <a:lstStyle/>
                     <a:p>
                       <a:r>
-                        <a:rPr lang="en-US" sz="1050" dirty="0" smtClean="0"/>
+                        <a:rPr lang="en-US" sz="1050" dirty="0"/>
                         <a:t>22</a:t>
                       </a:r>
                     </a:p>
                     <a:p>
                       <a:r>
-                        <a:rPr lang="en-US" sz="1050" dirty="0" smtClean="0"/>
+                        <a:rPr lang="en-US" sz="1050" dirty="0"/>
                         <a:t>21.58</a:t>
                       </a:r>
-                      <a:endParaRPr lang="en-US" sz="1050" dirty="0"/>
                     </a:p>
                   </a:txBody>
                   <a:tcPr/>
@@ -19153,16 +18994,15 @@
                     <a:lstStyle/>
                     <a:p>
                       <a:r>
-                        <a:rPr lang="en-US" sz="1050" dirty="0" smtClean="0"/>
+                        <a:rPr lang="en-US" sz="1050" dirty="0"/>
                         <a:t>22</a:t>
                       </a:r>
                     </a:p>
                     <a:p>
                       <a:r>
-                        <a:rPr lang="en-US" sz="1050" dirty="0" smtClean="0"/>
+                        <a:rPr lang="en-US" sz="1050" dirty="0"/>
                         <a:t>22.42</a:t>
                       </a:r>
-                      <a:endParaRPr lang="en-US" sz="1050" dirty="0"/>
                     </a:p>
                   </a:txBody>
                   <a:tcPr/>
@@ -19173,14 +19013,18 @@
                     <a:lstStyle/>
                     <a:p>
                       <a:r>
-                        <a:rPr lang="en-US" sz="1050" dirty="0" smtClean="0"/>
+                        <a:rPr lang="en-US" sz="1050" dirty="0"/>
                         <a:t>44</a:t>
                       </a:r>
-                      <a:endParaRPr lang="en-US" sz="1050" dirty="0"/>
                     </a:p>
                   </a:txBody>
                   <a:tcPr/>
                 </a:tc>
+                <a:extLst>
+                  <a:ext uri="{0D108BD9-81ED-4DB2-BD59-A6C34878D82A}">
+                    <a16:rowId xmlns:a16="http://schemas.microsoft.com/office/drawing/2014/main" val="10003"/>
+                  </a:ext>
+                </a:extLst>
               </a:tr>
               <a:tr h="374499">
                 <a:tc>
@@ -19189,10 +19033,9 @@
                     <a:lstStyle/>
                     <a:p>
                       <a:r>
-                        <a:rPr lang="en-US" sz="1050" dirty="0" smtClean="0"/>
+                        <a:rPr lang="en-US" sz="1050" dirty="0"/>
                         <a:t>Pacific</a:t>
                       </a:r>
-                      <a:endParaRPr lang="en-US" sz="1050" dirty="0"/>
                     </a:p>
                   </a:txBody>
                   <a:tcPr/>
@@ -19203,16 +19046,15 @@
                     <a:lstStyle/>
                     <a:p>
                       <a:r>
-                        <a:rPr lang="en-US" sz="1050" dirty="0" smtClean="0"/>
+                        <a:rPr lang="en-US" sz="1050" dirty="0"/>
                         <a:t>50</a:t>
                       </a:r>
                     </a:p>
                     <a:p>
                       <a:r>
-                        <a:rPr lang="en-US" sz="1050" dirty="0" smtClean="0"/>
+                        <a:rPr lang="en-US" sz="1050" dirty="0"/>
                         <a:t>51.50</a:t>
                       </a:r>
-                      <a:endParaRPr lang="en-US" sz="1050" dirty="0"/>
                     </a:p>
                   </a:txBody>
                   <a:tcPr/>
@@ -19223,16 +19065,15 @@
                     <a:lstStyle/>
                     <a:p>
                       <a:r>
-                        <a:rPr lang="en-US" sz="1050" dirty="0" smtClean="0"/>
+                        <a:rPr lang="en-US" sz="1050" dirty="0"/>
                         <a:t>55</a:t>
                       </a:r>
                     </a:p>
                     <a:p>
                       <a:r>
-                        <a:rPr lang="en-US" sz="1050" dirty="0" smtClean="0"/>
+                        <a:rPr lang="en-US" sz="1050" dirty="0"/>
                         <a:t>53.50</a:t>
                       </a:r>
-                      <a:endParaRPr lang="en-US" sz="1050" dirty="0"/>
                     </a:p>
                   </a:txBody>
                   <a:tcPr/>
@@ -19243,14 +19084,18 @@
                     <a:lstStyle/>
                     <a:p>
                       <a:r>
-                        <a:rPr lang="en-US" sz="1050" dirty="0" smtClean="0"/>
+                        <a:rPr lang="en-US" sz="1050" dirty="0"/>
                         <a:t>105</a:t>
                       </a:r>
-                      <a:endParaRPr lang="en-US" sz="1050" dirty="0"/>
                     </a:p>
                   </a:txBody>
                   <a:tcPr/>
                 </a:tc>
+                <a:extLst>
+                  <a:ext uri="{0D108BD9-81ED-4DB2-BD59-A6C34878D82A}">
+                    <a16:rowId xmlns:a16="http://schemas.microsoft.com/office/drawing/2014/main" val="10004"/>
+                  </a:ext>
+                </a:extLst>
               </a:tr>
               <a:tr h="374499">
                 <a:tc>
@@ -19259,16 +19104,15 @@
                     <a:lstStyle/>
                     <a:p>
                       <a:r>
-                        <a:rPr lang="en-US" sz="1050" dirty="0" smtClean="0"/>
+                        <a:rPr lang="en-US" sz="1050" dirty="0"/>
                         <a:t>Europe/</a:t>
                       </a:r>
                     </a:p>
                     <a:p>
                       <a:r>
-                        <a:rPr lang="en-US" sz="1050" dirty="0" smtClean="0"/>
+                        <a:rPr lang="en-US" sz="1050" dirty="0"/>
                         <a:t>Africa</a:t>
                       </a:r>
-                      <a:endParaRPr lang="en-US" sz="1050" dirty="0"/>
                     </a:p>
                   </a:txBody>
                   <a:tcPr/>
@@ -19279,16 +19123,15 @@
                     <a:lstStyle/>
                     <a:p>
                       <a:r>
-                        <a:rPr lang="en-US" sz="1050" dirty="0" smtClean="0"/>
+                        <a:rPr lang="en-US" sz="1050" dirty="0"/>
                         <a:t>18</a:t>
                       </a:r>
                     </a:p>
                     <a:p>
                       <a:r>
-                        <a:rPr lang="en-US" sz="1050" dirty="0" smtClean="0"/>
+                        <a:rPr lang="en-US" sz="1050" dirty="0"/>
                         <a:t>19.13</a:t>
                       </a:r>
-                      <a:endParaRPr lang="en-US" sz="1050" dirty="0"/>
                     </a:p>
                   </a:txBody>
                   <a:tcPr/>
@@ -19299,16 +19142,15 @@
                     <a:lstStyle/>
                     <a:p>
                       <a:r>
-                        <a:rPr lang="en-US" sz="1050" dirty="0" smtClean="0"/>
+                        <a:rPr lang="en-US" sz="1050" dirty="0"/>
                         <a:t>21</a:t>
                       </a:r>
                     </a:p>
                     <a:p>
                       <a:r>
-                        <a:rPr lang="en-US" sz="1050" dirty="0" smtClean="0"/>
+                        <a:rPr lang="en-US" sz="1050" dirty="0"/>
                         <a:t>19.87</a:t>
                       </a:r>
-                      <a:endParaRPr lang="en-US" sz="1050" dirty="0"/>
                     </a:p>
                   </a:txBody>
                   <a:tcPr/>
@@ -19319,14 +19161,18 @@
                     <a:lstStyle/>
                     <a:p>
                       <a:r>
-                        <a:rPr lang="en-US" sz="1050" dirty="0" smtClean="0"/>
+                        <a:rPr lang="en-US" sz="1050" dirty="0"/>
                         <a:t>39</a:t>
                       </a:r>
-                      <a:endParaRPr lang="en-US" sz="1050" dirty="0"/>
                     </a:p>
                   </a:txBody>
                   <a:tcPr/>
                 </a:tc>
+                <a:extLst>
+                  <a:ext uri="{0D108BD9-81ED-4DB2-BD59-A6C34878D82A}">
+                    <a16:rowId xmlns:a16="http://schemas.microsoft.com/office/drawing/2014/main" val="10005"/>
+                  </a:ext>
+                </a:extLst>
               </a:tr>
               <a:tr h="317096">
                 <a:tc>
@@ -19335,10 +19181,9 @@
                     <a:lstStyle/>
                     <a:p>
                       <a:r>
-                        <a:rPr lang="en-US" sz="1050" dirty="0" smtClean="0"/>
+                        <a:rPr lang="en-US" sz="1050" dirty="0"/>
                         <a:t>Col totals</a:t>
                       </a:r>
-                      <a:endParaRPr lang="en-US" sz="1050" dirty="0"/>
                     </a:p>
                   </a:txBody>
                   <a:tcPr/>
@@ -19349,10 +19194,9 @@
                     <a:lstStyle/>
                     <a:p>
                       <a:r>
-                        <a:rPr lang="en-US" sz="1050" dirty="0" smtClean="0"/>
+                        <a:rPr lang="en-US" sz="1050" dirty="0"/>
                         <a:t>6644</a:t>
                       </a:r>
-                      <a:endParaRPr lang="en-US" sz="1050" dirty="0"/>
                     </a:p>
                   </a:txBody>
                   <a:tcPr/>
@@ -19363,10 +19207,9 @@
                     <a:lstStyle/>
                     <a:p>
                       <a:r>
-                        <a:rPr lang="en-US" sz="1050" dirty="0" smtClean="0"/>
+                        <a:rPr lang="en-US" sz="1050" dirty="0"/>
                         <a:t>6903</a:t>
                       </a:r>
-                      <a:endParaRPr lang="en-US" sz="1050" dirty="0"/>
                     </a:p>
                   </a:txBody>
                   <a:tcPr/>
@@ -19377,14 +19220,18 @@
                     <a:lstStyle/>
                     <a:p>
                       <a:r>
-                        <a:rPr lang="en-US" sz="1050" dirty="0" smtClean="0"/>
+                        <a:rPr lang="en-US" sz="1050" dirty="0"/>
                         <a:t>13547</a:t>
                       </a:r>
-                      <a:endParaRPr lang="en-US" sz="1050" dirty="0"/>
                     </a:p>
                   </a:txBody>
                   <a:tcPr/>
                 </a:tc>
+                <a:extLst>
+                  <a:ext uri="{0D108BD9-81ED-4DB2-BD59-A6C34878D82A}">
+                    <a16:rowId xmlns:a16="http://schemas.microsoft.com/office/drawing/2014/main" val="10006"/>
+                  </a:ext>
+                </a:extLst>
               </a:tr>
             </a:tbl>
           </a:graphicData>
@@ -19413,111 +19260,110 @@
           <a:lstStyle/>
           <a:p>
             <a:r>
-              <a:rPr lang="en-US" sz="1400" dirty="0" smtClean="0"/>
+              <a:rPr lang="en-US" sz="1400" dirty="0"/>
               <a:t>H</a:t>
             </a:r>
             <a:r>
-              <a:rPr lang="en-US" sz="1400" baseline="-25000" dirty="0" smtClean="0"/>
+              <a:rPr lang="en-US" sz="1400" baseline="-25000" dirty="0"/>
               <a:t>0</a:t>
             </a:r>
             <a:r>
-              <a:rPr lang="en-US" sz="1400" dirty="0" smtClean="0"/>
+              <a:rPr lang="en-US" sz="1400" dirty="0"/>
               <a:t>: Geographically separated registrants were not affected</a:t>
             </a:r>
           </a:p>
           <a:p>
             <a:r>
-              <a:rPr lang="en-US" sz="1400" dirty="0" smtClean="0"/>
+              <a:rPr lang="en-US" sz="1400" dirty="0"/>
               <a:t>H</a:t>
             </a:r>
             <a:r>
-              <a:rPr lang="en-US" sz="1400" baseline="-25000" dirty="0" smtClean="0"/>
+              <a:rPr lang="en-US" sz="1400" baseline="-25000" dirty="0"/>
               <a:t>A</a:t>
             </a:r>
             <a:r>
-              <a:rPr lang="en-US" sz="1400" dirty="0" smtClean="0"/>
+              <a:rPr lang="en-US" sz="1400" dirty="0"/>
               <a:t>: One or more groups were affected</a:t>
             </a:r>
           </a:p>
           <a:p>
             <a:r>
-              <a:rPr lang="el-GR" sz="1400" dirty="0" smtClean="0"/>
+              <a:rPr lang="el-GR" sz="1400" dirty="0"/>
               <a:t>χ</a:t>
             </a:r>
             <a:r>
-              <a:rPr lang="en-US" sz="1400" baseline="30000" dirty="0" smtClean="0"/>
+              <a:rPr lang="en-US" sz="1400" baseline="30000" dirty="0"/>
               <a:t>2</a:t>
             </a:r>
             <a:r>
-              <a:rPr lang="en-US" sz="1400" baseline="-25000" dirty="0" smtClean="0"/>
+              <a:rPr lang="en-US" sz="1400" baseline="-25000" dirty="0"/>
               <a:t>critical,</a:t>
             </a:r>
             <a:r>
-              <a:rPr lang="el-GR" sz="1400" baseline="-25000" dirty="0" smtClean="0"/>
+              <a:rPr lang="el-GR" sz="1400" baseline="-25000" dirty="0"/>
               <a:t>α</a:t>
             </a:r>
             <a:r>
-              <a:rPr lang="en-US" sz="1400" baseline="-25000" dirty="0" smtClean="0"/>
+              <a:rPr lang="en-US" sz="1400" baseline="-25000" dirty="0"/>
               <a:t>=0.05</a:t>
             </a:r>
             <a:r>
-              <a:rPr lang="en-US" sz="1400" dirty="0" smtClean="0"/>
+              <a:rPr lang="en-US" sz="1400" dirty="0"/>
               <a:t> = 9.488</a:t>
             </a:r>
           </a:p>
           <a:p>
             <a:r>
-              <a:rPr lang="el-GR" sz="1400" dirty="0" smtClean="0"/>
+              <a:rPr lang="el-GR" sz="1400" dirty="0"/>
               <a:t>χ</a:t>
             </a:r>
             <a:r>
-              <a:rPr lang="en-US" sz="1400" baseline="30000" dirty="0" smtClean="0"/>
+              <a:rPr lang="en-US" sz="1400" baseline="30000" dirty="0"/>
               <a:t>2</a:t>
             </a:r>
             <a:r>
-              <a:rPr lang="en-US" sz="1400" baseline="-25000" dirty="0" smtClean="0"/>
+              <a:rPr lang="en-US" sz="1400" baseline="-25000" dirty="0"/>
               <a:t>test</a:t>
             </a:r>
             <a:r>
-              <a:rPr lang="en-US" sz="1400" dirty="0" smtClean="0"/>
+              <a:rPr lang="en-US" sz="1400" dirty="0"/>
               <a:t> = 0.7395: MUCH less than </a:t>
             </a:r>
             <a:r>
-              <a:rPr lang="el-GR" sz="1400" dirty="0" smtClean="0"/>
+              <a:rPr lang="el-GR" sz="1400" dirty="0"/>
               <a:t>χ</a:t>
             </a:r>
             <a:r>
-              <a:rPr lang="en-US" sz="1400" baseline="30000" dirty="0" smtClean="0"/>
+              <a:rPr lang="en-US" sz="1400" baseline="30000" dirty="0"/>
               <a:t>2</a:t>
             </a:r>
             <a:r>
-              <a:rPr lang="en-US" sz="1400" baseline="-25000" dirty="0" smtClean="0"/>
+              <a:rPr lang="en-US" sz="1400" baseline="-25000" dirty="0"/>
               <a:t>critical</a:t>
             </a:r>
-            <a:endParaRPr lang="en-US" sz="1400" dirty="0" smtClean="0"/>
-          </a:p>
-          <a:p>
-            <a:r>
-              <a:rPr lang="en-US" sz="1400" dirty="0" smtClean="0"/>
+            <a:endParaRPr lang="en-US" sz="1400" dirty="0"/>
+          </a:p>
+          <a:p>
+            <a:r>
+              <a:rPr lang="en-US" sz="1400" dirty="0"/>
               <a:t>Fail to reject H</a:t>
             </a:r>
             <a:r>
-              <a:rPr lang="en-US" sz="1400" baseline="-25000" dirty="0" smtClean="0"/>
+              <a:rPr lang="en-US" sz="1400" baseline="-25000" dirty="0"/>
               <a:t>0</a:t>
             </a:r>
             <a:r>
-              <a:rPr lang="en-US" sz="1400" dirty="0" smtClean="0"/>
+              <a:rPr lang="en-US" sz="1400" dirty="0"/>
               <a:t> – </a:t>
             </a:r>
             <a:r>
-              <a:rPr lang="en-US" sz="1400" b="1" dirty="0" smtClean="0"/>
+              <a:rPr lang="en-US" sz="1400" b="1" dirty="0"/>
               <a:t>not</a:t>
             </a:r>
             <a:r>
-              <a:rPr lang="en-US" sz="1400" dirty="0" smtClean="0"/>
+              <a:rPr lang="en-US" sz="1400" dirty="0"/>
               <a:t> affected by time/distance</a:t>
             </a:r>
-            <a:endParaRPr lang="en-US" sz="1400" dirty="0"/>
           </a:p>
         </p:txBody>
       </p:sp>
@@ -19546,18 +19392,13 @@
           <a:lstStyle/>
           <a:p>
             <a:r>
-              <a:rPr lang="en-US" dirty="0" smtClean="0">
+              <a:rPr lang="en-US" dirty="0">
                 <a:solidFill>
                   <a:schemeClr val="bg1"/>
                 </a:solidFill>
               </a:rPr>
               <a:t>START</a:t>
             </a:r>
-            <a:endParaRPr lang="en-US" dirty="0">
-              <a:solidFill>
-                <a:schemeClr val="bg1"/>
-              </a:solidFill>
-            </a:endParaRPr>
           </a:p>
         </p:txBody>
       </p:sp>
@@ -19893,20 +19734,19 @@
           <a:lstStyle/>
           <a:p>
             <a:r>
-              <a:rPr lang="en-US" sz="1200" b="1" dirty="0" smtClean="0"/>
+              <a:rPr lang="en-US" sz="1200" b="1" dirty="0"/>
               <a:t>Findings</a:t>
             </a:r>
             <a:r>
-              <a:rPr lang="en-US" sz="1200" dirty="0" smtClean="0"/>
+              <a:rPr lang="en-US" sz="1200" dirty="0"/>
               <a:t>:</a:t>
             </a:r>
           </a:p>
           <a:p>
             <a:r>
-              <a:rPr lang="en-US" sz="1200" dirty="0" smtClean="0"/>
+              <a:rPr lang="en-US" sz="1200" dirty="0"/>
               <a:t>The introduction of the lottery system had an impact on the registration process, which had an impact on the average run times compared to 2008/2009; however, it may not have been as surmised by the organizers: composition of geographically separated registrants did not change, but distribution in age group did.</a:t>
             </a:r>
-            <a:endParaRPr lang="en-US" sz="1200" dirty="0"/>
           </a:p>
         </p:txBody>
       </p:sp>
@@ -19943,13 +19783,6 @@
   <p:clrMapOvr>
     <a:masterClrMapping/>
   </p:clrMapOvr>
-  <p:timing>
-    <p:tnLst>
-      <p:par>
-        <p:cTn id="1" dur="indefinite" restart="never" nodeType="tmRoot"/>
-      </p:par>
-    </p:tnLst>
-  </p:timing>
 </p:sld>
 </file>
 
@@ -19986,10 +19819,9 @@
           <a:lstStyle/>
           <a:p>
             <a:r>
-              <a:rPr lang="en-US" dirty="0" smtClean="0"/>
+              <a:rPr lang="en-US" dirty="0"/>
               <a:t>Conclusion/Discussions</a:t>
             </a:r>
-            <a:endParaRPr lang="en-US" dirty="0"/>
           </a:p>
         </p:txBody>
       </p:sp>
@@ -20009,10 +19841,21 @@
           <a:lstStyle/>
           <a:p>
             <a:r>
-              <a:rPr lang="en-US" dirty="0" smtClean="0"/>
-              <a:t>All</a:t>
-            </a:r>
-            <a:endParaRPr lang="en-US" dirty="0"/>
+              <a:rPr lang="en-US" dirty="0"/>
+              <a:t>Over the course of 14 years, it is evident the general makeup of the participants of the Cherry Blossom Race in Washington D.C. shifted from a group of older, dedicated runners to a group of younger, less serious runners. </a:t>
+            </a:r>
+          </a:p>
+          <a:p>
+            <a:r>
+              <a:rPr lang="en-US" dirty="0"/>
+              <a:t>The implementation of a lottery system in 2009 influenced both the run times and age group distributions. </a:t>
+            </a:r>
+          </a:p>
+          <a:p>
+            <a:r>
+              <a:rPr lang="en-US" dirty="0"/>
+              <a:t>Runner geographic distribution was not influenced as claimed by the hosts of the race.</a:t>
+            </a:r>
           </a:p>
         </p:txBody>
       </p:sp>
@@ -20049,13 +19892,6 @@
   <p:clrMapOvr>
     <a:masterClrMapping/>
   </p:clrMapOvr>
-  <p:timing>
-    <p:tnLst>
-      <p:par>
-        <p:cTn id="1" dur="indefinite" restart="never" nodeType="tmRoot"/>
-      </p:par>
-    </p:tnLst>
-  </p:timing>
 </p:sld>
 </file>
 
@@ -20092,10 +19928,9 @@
           <a:lstStyle/>
           <a:p>
             <a:r>
-              <a:rPr lang="en-US" dirty="0" smtClean="0"/>
+              <a:rPr lang="en-US" dirty="0"/>
               <a:t>REFERENCES</a:t>
             </a:r>
-            <a:endParaRPr lang="en-US" dirty="0"/>
           </a:p>
         </p:txBody>
       </p:sp>
@@ -20172,13 +20007,8 @@
             </a:pPr>
             <a:r>
               <a:rPr lang="en-US" dirty="0"/>
-              <a:t>R Code with supporting functions; </a:t>
-            </a:r>
-            <a:r>
-              <a:rPr lang="en-US" dirty="0" smtClean="0"/>
-              <a:t>MSDS7333-Case08-fx.</a:t>
-            </a:r>
-            <a:endParaRPr lang="en-US" dirty="0"/>
+              <a:t>R Code with supporting functions; MSDS7333-Case08-fx.</a:t>
+            </a:r>
           </a:p>
         </p:txBody>
       </p:sp>
@@ -20251,10 +20081,9 @@
           <a:lstStyle/>
           <a:p>
             <a:r>
-              <a:rPr lang="en-US" dirty="0" smtClean="0"/>
+              <a:rPr lang="en-US" dirty="0"/>
               <a:t>Background</a:t>
             </a:r>
-            <a:endParaRPr lang="en-US" dirty="0"/>
           </a:p>
         </p:txBody>
       </p:sp>
@@ -20281,34 +20110,34 @@
           <a:lstStyle/>
           <a:p>
             <a:r>
-              <a:rPr lang="en-US" sz="2000" dirty="0" smtClean="0"/>
+              <a:rPr lang="en-US" sz="2000" dirty="0"/>
               <a:t>This case study is based on the case study: </a:t>
             </a:r>
             <a:r>
-              <a:rPr lang="en-US" sz="2000" i="1" dirty="0" smtClean="0"/>
+              <a:rPr lang="en-US" sz="2000" i="1" dirty="0"/>
               <a:t>“Getting the data into the right format.” [1]</a:t>
             </a:r>
-            <a:endParaRPr lang="en-US" sz="2000" dirty="0" smtClean="0"/>
-          </a:p>
-          <a:p>
-            <a:r>
-              <a:rPr lang="en-US" sz="2000" dirty="0" smtClean="0"/>
+            <a:endParaRPr lang="en-US" sz="2000" dirty="0"/>
+          </a:p>
+          <a:p>
+            <a:r>
+              <a:rPr lang="en-US" sz="2000" dirty="0"/>
               <a:t>Race results were scraped from </a:t>
             </a:r>
             <a:r>
-              <a:rPr lang="en-US" sz="2000" dirty="0" smtClean="0">
+              <a:rPr lang="en-US" sz="2000" dirty="0">
                 <a:hlinkClick r:id="rId2"/>
               </a:rPr>
               <a:t>www.cherryblossom.org</a:t>
             </a:r>
             <a:r>
-              <a:rPr lang="en-US" sz="2000" dirty="0" smtClean="0"/>
+              <a:rPr lang="en-US" sz="2000" dirty="0"/>
               <a:t> from 2001 through 2012. Results from 1999 through 2001 were not available online and were obtained elsewhere.</a:t>
             </a:r>
           </a:p>
           <a:p>
             <a:r>
-              <a:rPr lang="en-US" sz="2000" dirty="0" smtClean="0"/>
+              <a:rPr lang="en-US" sz="2000" dirty="0"/>
               <a:t>Runner-selection moved to a lottery system in 2009. The organization claims the introduction may have affected the geographic distribution of runners.</a:t>
             </a:r>
           </a:p>
@@ -20396,10 +20225,9 @@
               <a:defRPr/>
             </a:pPr>
             <a:r>
-              <a:rPr lang="en-US" dirty="0" smtClean="0"/>
+              <a:rPr lang="en-US" dirty="0"/>
               <a:t>What Do Data Scientists Do?</a:t>
             </a:r>
-            <a:endParaRPr lang="en-US" dirty="0"/>
           </a:p>
         </p:txBody>
       </p:sp>
@@ -20534,10 +20362,9 @@
           <a:lstStyle/>
           <a:p>
             <a:r>
-              <a:rPr lang="en-US" dirty="0" smtClean="0"/>
+              <a:rPr lang="en-US" dirty="0"/>
               <a:t>Questions</a:t>
             </a:r>
-            <a:endParaRPr lang="en-US" dirty="0"/>
           </a:p>
         </p:txBody>
       </p:sp>
@@ -20564,8 +20391,8 @@
           <a:lstStyle/>
           <a:p>
             <a:r>
-              <a:rPr lang="en-US" sz="2400" dirty="0" smtClean="0"/>
-              <a:t>Did the increase in popularity change the results of the race?</a:t>
+              <a:rPr lang="en-US" sz="2400" dirty="0"/>
+              <a:t>Did the increase in popularity influence the results of the race?</a:t>
             </a:r>
           </a:p>
           <a:p>
@@ -20573,7 +20400,7 @@
           </a:p>
           <a:p>
             <a:r>
-              <a:rPr lang="en-US" sz="2400" dirty="0" smtClean="0"/>
+              <a:rPr lang="en-US" sz="2400" dirty="0"/>
               <a:t>Did the distribution in the age of the runners change?</a:t>
             </a:r>
           </a:p>
@@ -20582,7 +20409,7 @@
           </a:p>
           <a:p>
             <a:r>
-              <a:rPr lang="en-US" sz="2400" dirty="0" smtClean="0"/>
+              <a:rPr lang="en-US" sz="2400" dirty="0"/>
               <a:t>Did the change to a lottery-based registration process impact the results?</a:t>
             </a:r>
           </a:p>
@@ -20624,13 +20451,6 @@
   <p:clrMapOvr>
     <a:masterClrMapping/>
   </p:clrMapOvr>
-  <p:timing>
-    <p:tnLst>
-      <p:par>
-        <p:cTn id="1" dur="indefinite" restart="never" nodeType="tmRoot"/>
-      </p:par>
-    </p:tnLst>
-  </p:timing>
 </p:sld>
 </file>
 
@@ -20667,10 +20487,9 @@
           <a:lstStyle/>
           <a:p>
             <a:r>
-              <a:rPr lang="en-US" dirty="0" smtClean="0"/>
+              <a:rPr lang="en-US" dirty="0"/>
               <a:t>Data Loading/Prep</a:t>
             </a:r>
-            <a:endParaRPr lang="en-US" dirty="0"/>
           </a:p>
         </p:txBody>
       </p:sp>
@@ -20907,64 +20726,64 @@
             </a:lstStyle>
             <a:p>
               <a:r>
-                <a:rPr lang="en-US" dirty="0" smtClean="0"/>
+                <a:rPr lang="en-US" dirty="0"/>
                 <a:t>Data was loaded from Cherry Blossom and github sites. [2] [3] [4]</a:t>
               </a:r>
             </a:p>
             <a:p>
               <a:pPr lvl="1"/>
               <a:r>
-                <a:rPr lang="en-US" dirty="0" smtClean="0"/>
+                <a:rPr lang="en-US" dirty="0"/>
                 <a:t>R data: 1999 and 2000 from dtkaplan/</a:t>
               </a:r>
               <a:r>
-                <a:rPr lang="en-US" dirty="0" err="1" smtClean="0"/>
+                <a:rPr lang="en-US" dirty="0" err="1"/>
                 <a:t>statisticalModeling</a:t>
               </a:r>
               <a:r>
-                <a:rPr lang="en-US" dirty="0" smtClean="0"/>
+                <a:rPr lang="en-US" dirty="0"/>
                 <a:t> site</a:t>
               </a:r>
             </a:p>
             <a:p>
               <a:pPr lvl="1"/>
               <a:r>
-                <a:rPr lang="en-US" dirty="0" smtClean="0"/>
+                <a:rPr lang="en-US" dirty="0"/>
                 <a:t>Web data: 2001 through 2012 from ”</a:t>
               </a:r>
               <a:r>
-                <a:rPr lang="mr-IN" dirty="0" smtClean="0"/>
+                <a:rPr lang="mr-IN" dirty="0"/>
                 <a:t>…</a:t>
               </a:r>
               <a:r>
-                <a:rPr lang="en-US" dirty="0" smtClean="0"/>
+                <a:rPr lang="en-US" dirty="0"/>
                 <a:t>/results/year/</a:t>
               </a:r>
               <a:r>
-                <a:rPr lang="mr-IN" dirty="0" smtClean="0"/>
+                <a:rPr lang="mr-IN" dirty="0"/>
                 <a:t>…</a:t>
               </a:r>
               <a:r>
-                <a:rPr lang="en-US" dirty="0" smtClean="0"/>
+                <a:rPr lang="en-US" dirty="0"/>
                 <a:t>” pages</a:t>
               </a:r>
             </a:p>
             <a:p>
               <a:pPr lvl="1"/>
-              <a:endParaRPr lang="en-US" dirty="0" smtClean="0"/>
+              <a:endParaRPr lang="en-US" dirty="0"/>
             </a:p>
             <a:p>
               <a:pPr lvl="1"/>
-              <a:endParaRPr lang="en-US" dirty="0" smtClean="0"/>
+              <a:endParaRPr lang="en-US" dirty="0"/>
             </a:p>
             <a:p>
               <a:r>
-                <a:rPr lang="en-US" dirty="0" smtClean="0"/>
+                <a:rPr lang="en-US" dirty="0"/>
                 <a:t>Data frames created from R and Web sites (see next two slides) were merged into one data frame.</a:t>
               </a:r>
             </a:p>
             <a:p>
-              <a:endParaRPr lang="en-US" dirty="0" smtClean="0"/>
+              <a:endParaRPr lang="en-US" dirty="0"/>
             </a:p>
           </p:txBody>
         </p:sp>
@@ -21040,10 +20859,9 @@
           <a:lstStyle/>
           <a:p>
             <a:r>
-              <a:rPr lang="en-US" smtClean="0"/>
+              <a:rPr lang="en-US"/>
               <a:t>1999-2000</a:t>
             </a:r>
-            <a:endParaRPr lang="en-US"/>
           </a:p>
         </p:txBody>
       </p:sp>
@@ -21070,18 +20888,17 @@
           <a:lstStyle/>
           <a:p>
             <a:r>
-              <a:rPr lang="en-US" dirty="0" smtClean="0"/>
+              <a:rPr lang="en-US" dirty="0"/>
               <a:t>2001</a:t>
             </a:r>
             <a:r>
-              <a:rPr lang="mr-IN" dirty="0" smtClean="0"/>
+              <a:rPr lang="mr-IN" dirty="0"/>
               <a:t>…</a:t>
             </a:r>
             <a:r>
-              <a:rPr lang="en-US" dirty="0" smtClean="0"/>
+              <a:rPr lang="en-US" dirty="0"/>
               <a:t>2012</a:t>
             </a:r>
-            <a:endParaRPr lang="en-US" dirty="0"/>
           </a:p>
         </p:txBody>
       </p:sp>
@@ -21371,13 +21188,6 @@
   <p:clrMapOvr>
     <a:masterClrMapping/>
   </p:clrMapOvr>
-  <p:timing>
-    <p:tnLst>
-      <p:par>
-        <p:cTn id="1" dur="indefinite" restart="never" nodeType="tmRoot"/>
-      </p:par>
-    </p:tnLst>
-  </p:timing>
 </p:sld>
 </file>
 
@@ -21414,10 +21224,9 @@
           <a:lstStyle/>
           <a:p>
             <a:r>
-              <a:rPr lang="en-US" dirty="0" smtClean="0"/>
+              <a:rPr lang="en-US" dirty="0"/>
               <a:t>Data loading: years 1999 and 2000</a:t>
             </a:r>
-            <a:endParaRPr lang="en-US" dirty="0"/>
           </a:p>
         </p:txBody>
       </p:sp>
@@ -21444,54 +21253,41 @@
           <a:lstStyle/>
           <a:p>
             <a:r>
-              <a:rPr lang="en-US" dirty="0" smtClean="0"/>
+              <a:rPr lang="en-US" dirty="0"/>
               <a:t>Load </a:t>
             </a:r>
             <a:r>
-              <a:rPr lang="en-US" b="1" dirty="0" err="1" smtClean="0"/>
+              <a:rPr lang="en-US" b="1" dirty="0" err="1"/>
               <a:t>devtools</a:t>
             </a:r>
             <a:r>
-              <a:rPr lang="en-US" dirty="0" smtClean="0"/>
-              <a:t> in order to load R library from GitHub </a:t>
-            </a:r>
-            <a:r>
               <a:rPr lang="en-US" dirty="0"/>
-              <a:t>that </a:t>
-            </a:r>
-            <a:r>
-              <a:rPr lang="en-US" dirty="0" smtClean="0"/>
-              <a:t>contain </a:t>
-            </a:r>
+              <a:t> in order to load R library from GitHub that contain previous race results.</a:t>
+            </a:r>
+          </a:p>
+          <a:p>
             <a:r>
               <a:rPr lang="en-US" dirty="0"/>
-              <a:t>previous race results.</a:t>
-            </a:r>
-            <a:endParaRPr lang="en-US" dirty="0" smtClean="0"/>
-          </a:p>
-          <a:p>
-            <a:r>
-              <a:rPr lang="en-US" dirty="0" smtClean="0"/>
               <a:t>Load data </a:t>
             </a:r>
             <a:r>
-              <a:rPr lang="en-US" i="1" dirty="0" smtClean="0"/>
+              <a:rPr lang="en-US" i="1" dirty="0"/>
               <a:t>Runners </a:t>
             </a:r>
             <a:r>
-              <a:rPr lang="en-US" dirty="0" smtClean="0"/>
+              <a:rPr lang="en-US" dirty="0"/>
               <a:t>and filter on the years we need; i.e., 1999 and 2000.</a:t>
             </a:r>
           </a:p>
           <a:p>
             <a:r>
-              <a:rPr lang="en-US" dirty="0" smtClean="0"/>
+              <a:rPr lang="en-US" dirty="0"/>
               <a:t>Drop columns and data that we do not need.</a:t>
             </a:r>
           </a:p>
           <a:p>
             <a:r>
-              <a:rPr lang="en-US" dirty="0" smtClean="0"/>
+              <a:rPr lang="en-US" dirty="0"/>
               <a:t>Rename column for merging.</a:t>
             </a:r>
           </a:p>
@@ -21578,13 +21374,6 @@
   <p:clrMapOvr>
     <a:masterClrMapping/>
   </p:clrMapOvr>
-  <p:timing>
-    <p:tnLst>
-      <p:par>
-        <p:cTn id="1" dur="indefinite" restart="never" nodeType="tmRoot"/>
-      </p:par>
-    </p:tnLst>
-  </p:timing>
 </p:sld>
 </file>
 
@@ -21626,18 +21415,17 @@
           <a:lstStyle/>
           <a:p>
             <a:r>
-              <a:rPr lang="en-US" dirty="0" smtClean="0"/>
+              <a:rPr lang="en-US" dirty="0"/>
               <a:t>Data Loading: 2001 </a:t>
             </a:r>
             <a:r>
-              <a:rPr lang="mr-IN" dirty="0" smtClean="0"/>
+              <a:rPr lang="mr-IN" dirty="0"/>
               <a:t>–</a:t>
             </a:r>
             <a:r>
-              <a:rPr lang="en-US" dirty="0" smtClean="0"/>
+              <a:rPr lang="en-US" dirty="0"/>
               <a:t> 2012 Years</a:t>
             </a:r>
-            <a:endParaRPr lang="en-US" dirty="0"/>
           </a:p>
         </p:txBody>
       </p:sp>
@@ -21662,46 +21450,42 @@
           <a:lstStyle/>
           <a:p>
             <a:r>
-              <a:rPr lang="en-US" dirty="0" smtClean="0"/>
-              <a:t>Extract data from web pages into table with year heading</a:t>
-            </a:r>
-            <a:r>
-              <a:rPr lang="en-US" dirty="0" smtClean="0"/>
-              <a:t>.</a:t>
-            </a:r>
-          </a:p>
-          <a:p>
-            <a:endParaRPr lang="en-US" dirty="0" smtClean="0"/>
-          </a:p>
-          <a:p>
-            <a:r>
-              <a:rPr lang="en-US" dirty="0" smtClean="0"/>
+              <a:rPr lang="en-US" dirty="0"/>
+              <a:t>Extract data from web pages into table with year heading.</a:t>
+            </a:r>
+          </a:p>
+          <a:p>
+            <a:endParaRPr lang="en-US" dirty="0"/>
+          </a:p>
+          <a:p>
+            <a:r>
+              <a:rPr lang="en-US" dirty="0"/>
               <a:t>Extract variables from tables and create data frame per year.</a:t>
             </a:r>
           </a:p>
           <a:p>
-            <a:endParaRPr lang="en-US" dirty="0" smtClean="0"/>
-          </a:p>
-          <a:p>
-            <a:endParaRPr lang="en-US" dirty="0" smtClean="0"/>
-          </a:p>
-          <a:p>
-            <a:endParaRPr lang="en-US" dirty="0" smtClean="0"/>
-          </a:p>
-          <a:p>
-            <a:r>
-              <a:rPr lang="en-US" dirty="0" smtClean="0"/>
+            <a:endParaRPr lang="en-US" dirty="0"/>
+          </a:p>
+          <a:p>
+            <a:endParaRPr lang="en-US" dirty="0"/>
+          </a:p>
+          <a:p>
+            <a:endParaRPr lang="en-US" dirty="0"/>
+          </a:p>
+          <a:p>
+            <a:r>
+              <a:rPr lang="en-US" dirty="0"/>
               <a:t>Merge yearly data frame into one data frame.</a:t>
             </a:r>
           </a:p>
           <a:p>
-            <a:endParaRPr lang="en-US" dirty="0" smtClean="0"/>
-          </a:p>
-          <a:p>
-            <a:endParaRPr lang="en-US" dirty="0" smtClean="0"/>
-          </a:p>
-          <a:p>
-            <a:endParaRPr lang="en-US" dirty="0" smtClean="0"/>
+            <a:endParaRPr lang="en-US" dirty="0"/>
+          </a:p>
+          <a:p>
+            <a:endParaRPr lang="en-US" dirty="0"/>
+          </a:p>
+          <a:p>
+            <a:endParaRPr lang="en-US" dirty="0"/>
           </a:p>
         </p:txBody>
       </p:sp>
@@ -21846,10 +21630,9 @@
           <a:lstStyle/>
           <a:p>
             <a:r>
-              <a:rPr lang="en-US" dirty="0" smtClean="0"/>
+              <a:rPr lang="en-US" dirty="0"/>
               <a:t>Processing and Cleaning the Data</a:t>
             </a:r>
-            <a:endParaRPr lang="en-US" dirty="0"/>
           </a:p>
         </p:txBody>
       </p:sp>
@@ -21871,64 +21654,63 @@
           <a:lstStyle/>
           <a:p>
             <a:r>
-              <a:rPr lang="en-US" dirty="0" smtClean="0"/>
+              <a:rPr lang="en-US" dirty="0"/>
               <a:t>Determine Important  Features</a:t>
             </a:r>
           </a:p>
           <a:p>
             <a:pPr lvl="1"/>
             <a:r>
-              <a:rPr lang="en-US" dirty="0" smtClean="0"/>
+              <a:rPr lang="en-US" dirty="0"/>
               <a:t>Age</a:t>
             </a:r>
           </a:p>
           <a:p>
             <a:pPr lvl="1"/>
             <a:r>
-              <a:rPr lang="en-US" dirty="0" smtClean="0"/>
+              <a:rPr lang="en-US" dirty="0"/>
               <a:t>Time</a:t>
             </a:r>
           </a:p>
           <a:p>
             <a:pPr lvl="1"/>
             <a:r>
-              <a:rPr lang="en-US" dirty="0" smtClean="0"/>
+              <a:rPr lang="en-US" dirty="0"/>
               <a:t>Year</a:t>
             </a:r>
           </a:p>
           <a:p>
             <a:r>
-              <a:rPr lang="en-US" dirty="0" smtClean="0"/>
+              <a:rPr lang="en-US" dirty="0"/>
               <a:t>Investigate outliers </a:t>
             </a:r>
           </a:p>
           <a:p>
             <a:pPr lvl="1"/>
             <a:r>
-              <a:rPr lang="en-US" dirty="0" smtClean="0"/>
+              <a:rPr lang="en-US" dirty="0"/>
               <a:t>Age</a:t>
             </a:r>
           </a:p>
           <a:p>
             <a:pPr lvl="1"/>
             <a:r>
-              <a:rPr lang="en-US" dirty="0" smtClean="0"/>
+              <a:rPr lang="en-US" dirty="0"/>
               <a:t>Time</a:t>
             </a:r>
           </a:p>
           <a:p>
             <a:r>
-              <a:rPr lang="en-US" dirty="0" smtClean="0"/>
+              <a:rPr lang="en-US" dirty="0"/>
               <a:t>Data Wrangling</a:t>
             </a:r>
           </a:p>
           <a:p>
             <a:pPr lvl="1"/>
             <a:r>
-              <a:rPr lang="en-US" dirty="0" smtClean="0"/>
+              <a:rPr lang="en-US" dirty="0"/>
               <a:t>Age-Group</a:t>
             </a:r>
-            <a:endParaRPr lang="en-US" dirty="0"/>
           </a:p>
         </p:txBody>
       </p:sp>
@@ -21994,8 +21776,8 @@
             <a:avLst>
               <a:gd name="adj1" fmla="val 18750"/>
               <a:gd name="adj2" fmla="val -8333"/>
-              <a:gd name="adj3" fmla="val -6068"/>
-              <a:gd name="adj4" fmla="val -39148"/>
+              <a:gd name="adj3" fmla="val 16556"/>
+              <a:gd name="adj4" fmla="val -35434"/>
             </a:avLst>
           </a:prstGeom>
           <a:solidFill>
@@ -22099,11 +21881,11 @@
           <a:lstStyle/>
           <a:p>
             <a:r>
-              <a:rPr lang="en-US" dirty="0" smtClean="0"/>
+              <a:rPr lang="en-US" dirty="0"/>
               <a:t>Added USATF standard 10 year </a:t>
             </a:r>
             <a:r>
-              <a:rPr lang="en-US" smtClean="0"/>
+              <a:rPr lang="en-US"/>
               <a:t>age groupings.</a:t>
             </a:r>
             <a:endParaRPr lang="en-US" dirty="0"/>

</xml_diff>

<commit_message>
Linked conclusions to our initial questions
</commit_message>
<xml_diff>
--- a/infographic.pptx
+++ b/infographic.pptx
@@ -5,7 +5,7 @@
     <p:sldMasterId id="2147483678" r:id="rId1"/>
   </p:sldMasterIdLst>
   <p:notesMasterIdLst>
-    <p:notesMasterId r:id="rId27"/>
+    <p:notesMasterId r:id="rId28"/>
   </p:notesMasterIdLst>
   <p:sldIdLst>
     <p:sldId id="257" r:id="rId2"/>
@@ -31,8 +31,9 @@
     <p:sldId id="277" r:id="rId22"/>
     <p:sldId id="278" r:id="rId23"/>
     <p:sldId id="290" r:id="rId24"/>
-    <p:sldId id="261" r:id="rId25"/>
-    <p:sldId id="288" r:id="rId26"/>
+    <p:sldId id="291" r:id="rId25"/>
+    <p:sldId id="261" r:id="rId26"/>
+    <p:sldId id="288" r:id="rId27"/>
   </p:sldIdLst>
   <p:sldSz cx="12192000" cy="6858000"/>
   <p:notesSz cx="6858000" cy="9144000"/>
@@ -232,7 +233,7 @@
           <a:p>
             <a:fld id="{E3A6CB1D-A3B7-434B-ABB5-99D9CB0EF729}" type="datetimeFigureOut">
               <a:rPr lang="en-US" smtClean="0"/>
-              <a:t>7/5/2017</a:t>
+              <a:t>07/05/2017</a:t>
             </a:fld>
             <a:endParaRPr lang="en-US"/>
           </a:p>
@@ -1185,7 +1186,7 @@
           <a:p>
             <a:fld id="{2BFD8FD3-6BC4-425F-891D-0741A439FEF5}" type="datetime1">
               <a:rPr lang="en-US" smtClean="0"/>
-              <a:t>7/5/2017</a:t>
+              <a:t>07/05/2017</a:t>
             </a:fld>
             <a:endParaRPr lang="en-US"/>
           </a:p>
@@ -2273,7 +2274,7 @@
           <a:p>
             <a:fld id="{441CFBDD-FC00-4979-962A-B16E941AAB17}" type="datetime1">
               <a:rPr lang="en-US" smtClean="0"/>
-              <a:t>7/5/2017</a:t>
+              <a:t>07/05/2017</a:t>
             </a:fld>
             <a:endParaRPr lang="en-US"/>
           </a:p>
@@ -3254,7 +3255,7 @@
           <a:p>
             <a:fld id="{441CFBDD-FC00-4979-962A-B16E941AAB17}" type="datetime1">
               <a:rPr lang="en-US" smtClean="0"/>
-              <a:t>7/5/2017</a:t>
+              <a:t>07/05/2017</a:t>
             </a:fld>
             <a:endParaRPr lang="en-US"/>
           </a:p>
@@ -4389,7 +4390,7 @@
           <a:p>
             <a:fld id="{441CFBDD-FC00-4979-962A-B16E941AAB17}" type="datetime1">
               <a:rPr lang="en-US" smtClean="0"/>
-              <a:t>7/5/2017</a:t>
+              <a:t>07/05/2017</a:t>
             </a:fld>
             <a:endParaRPr lang="en-US"/>
           </a:p>
@@ -5423,7 +5424,7 @@
           <a:p>
             <a:fld id="{441CFBDD-FC00-4979-962A-B16E941AAB17}" type="datetime1">
               <a:rPr lang="en-US" smtClean="0"/>
-              <a:t>7/5/2017</a:t>
+              <a:t>07/05/2017</a:t>
             </a:fld>
             <a:endParaRPr lang="en-US"/>
           </a:p>
@@ -6084,7 +6085,7 @@
           <a:p>
             <a:fld id="{441CFBDD-FC00-4979-962A-B16E941AAB17}" type="datetime1">
               <a:rPr lang="en-US" smtClean="0"/>
-              <a:t>7/5/2017</a:t>
+              <a:t>07/05/2017</a:t>
             </a:fld>
             <a:endParaRPr lang="en-US"/>
           </a:p>
@@ -6946,7 +6947,7 @@
           <a:p>
             <a:fld id="{441CFBDD-FC00-4979-962A-B16E941AAB17}" type="datetime1">
               <a:rPr lang="en-US" smtClean="0"/>
-              <a:t>7/5/2017</a:t>
+              <a:t>07/05/2017</a:t>
             </a:fld>
             <a:endParaRPr lang="en-US"/>
           </a:p>
@@ -7137,7 +7138,7 @@
           <a:p>
             <a:fld id="{B05E5C68-9EED-413E-B086-4145A3935548}" type="datetime1">
               <a:rPr lang="en-US" smtClean="0"/>
-              <a:t>7/5/2017</a:t>
+              <a:t>07/05/2017</a:t>
             </a:fld>
             <a:endParaRPr lang="en-US"/>
           </a:p>
@@ -8109,7 +8110,7 @@
           <a:p>
             <a:fld id="{D6E95037-ADD3-4F59-BB44-F82689BBE7AE}" type="datetime1">
               <a:rPr lang="en-US" smtClean="0"/>
-              <a:t>7/5/2017</a:t>
+              <a:t>07/05/2017</a:t>
             </a:fld>
             <a:endParaRPr lang="en-US"/>
           </a:p>
@@ -8320,7 +8321,7 @@
           <a:p>
             <a:fld id="{8D37BDF8-5683-484F-8DBC-E9A1DA889130}" type="datetime1">
               <a:rPr lang="en-US" smtClean="0"/>
-              <a:t>7/5/2017</a:t>
+              <a:t>07/05/2017</a:t>
             </a:fld>
             <a:endParaRPr lang="en-US"/>
           </a:p>
@@ -9354,7 +9355,7 @@
           <a:p>
             <a:fld id="{4DECC4F6-A32E-467C-A154-8BAEC0788F1F}" type="datetime1">
               <a:rPr lang="en-US" smtClean="0"/>
-              <a:t>7/5/2017</a:t>
+              <a:t>07/05/2017</a:t>
             </a:fld>
             <a:endParaRPr lang="en-US"/>
           </a:p>
@@ -9626,7 +9627,7 @@
           <a:p>
             <a:fld id="{29A1F4E2-A66E-4CEA-BAB6-29487134D526}" type="datetime1">
               <a:rPr lang="en-US" smtClean="0"/>
-              <a:t>7/5/2017</a:t>
+              <a:t>07/05/2017</a:t>
             </a:fld>
             <a:endParaRPr lang="en-US"/>
           </a:p>
@@ -10036,7 +10037,7 @@
           <a:p>
             <a:fld id="{AD5924CE-E8D1-46CA-9144-2068016453D9}" type="datetime1">
               <a:rPr lang="en-US" smtClean="0"/>
-              <a:t>7/5/2017</a:t>
+              <a:t>07/05/2017</a:t>
             </a:fld>
             <a:endParaRPr lang="en-US"/>
           </a:p>
@@ -10163,7 +10164,7 @@
           <a:p>
             <a:fld id="{A818CF9F-D515-4605-8464-4C06C1DFB243}" type="datetime1">
               <a:rPr lang="en-US" smtClean="0"/>
-              <a:t>7/5/2017</a:t>
+              <a:t>07/05/2017</a:t>
             </a:fld>
             <a:endParaRPr lang="en-US"/>
           </a:p>
@@ -10258,7 +10259,7 @@
           <a:p>
             <a:fld id="{D6C9B92B-7D36-4A45-A718-E0E1FC80AFD2}" type="datetime1">
               <a:rPr lang="en-US" smtClean="0"/>
-              <a:t>7/5/2017</a:t>
+              <a:t>07/05/2017</a:t>
             </a:fld>
             <a:endParaRPr lang="en-US"/>
           </a:p>
@@ -11339,7 +11340,7 @@
           <a:p>
             <a:fld id="{B68FD5C0-512F-45C2-ACB2-607A00A4510C}" type="datetime1">
               <a:rPr lang="en-US" smtClean="0"/>
-              <a:t>7/5/2017</a:t>
+              <a:t>07/05/2017</a:t>
             </a:fld>
             <a:endParaRPr lang="en-US"/>
           </a:p>
@@ -12447,7 +12448,7 @@
           <a:p>
             <a:fld id="{A8C85F23-E154-4B47-A9F9-89A52AA15E6B}" type="datetime1">
               <a:rPr lang="en-US" smtClean="0"/>
-              <a:t>7/5/2017</a:t>
+              <a:t>07/05/2017</a:t>
             </a:fld>
             <a:endParaRPr lang="en-US"/>
           </a:p>
@@ -13444,7 +13445,7 @@
           <a:p>
             <a:fld id="{441CFBDD-FC00-4979-962A-B16E941AAB17}" type="datetime1">
               <a:rPr lang="en-US" smtClean="0"/>
-              <a:t>7/5/2017</a:t>
+              <a:t>07/05/2017</a:t>
             </a:fld>
             <a:endParaRPr lang="en-US"/>
           </a:p>
@@ -16747,7 +16748,11 @@
           <a:p>
             <a:r>
               <a:rPr lang="en-US" sz="2400" i="1" dirty="0"/>
-              <a:t>Data analysis of the annual Washington D.C. Cherry Blossom Race from 1999 through 2012 reveal there are noticeable differences of age and elapsed race time. In addition, the abrupt change in run times might be due to a race contestant lottery established in 2010.</a:t>
+              <a:t>Data analysis of the annual Washington D.C. Cherry Blossom Race from 1999 through 2012 reveal there are noticeable differences of age and elapsed race time. In addition, the abrupt change in run times might be due to a race contestant lottery established in </a:t>
+            </a:r>
+            <a:r>
+              <a:rPr lang="en-US" sz="2400" i="1" dirty="0" smtClean="0"/>
+              <a:t>2009.</a:t>
             </a:r>
             <a:endParaRPr lang="en-US" sz="2400" dirty="0"/>
           </a:p>
@@ -18071,28 +18076,28 @@
                 <a:gridCol w="610307">
                   <a:extLst>
                     <a:ext uri="{9D8B030D-6E8A-4147-A177-3AD203B41FA5}">
-                      <a16:colId xmlns:a16="http://schemas.microsoft.com/office/drawing/2014/main" val="20000"/>
+                      <a16:colId xmlns:a16="http://schemas.microsoft.com/office/drawing/2014/main" xmlns="" val="20000"/>
                     </a:ext>
                   </a:extLst>
                 </a:gridCol>
                 <a:gridCol w="687705">
                   <a:extLst>
                     <a:ext uri="{9D8B030D-6E8A-4147-A177-3AD203B41FA5}">
-                      <a16:colId xmlns:a16="http://schemas.microsoft.com/office/drawing/2014/main" val="20001"/>
+                      <a16:colId xmlns:a16="http://schemas.microsoft.com/office/drawing/2014/main" xmlns="" val="20001"/>
                     </a:ext>
                   </a:extLst>
                 </a:gridCol>
                 <a:gridCol w="725805">
                   <a:extLst>
                     <a:ext uri="{9D8B030D-6E8A-4147-A177-3AD203B41FA5}">
-                      <a16:colId xmlns:a16="http://schemas.microsoft.com/office/drawing/2014/main" val="20002"/>
+                      <a16:colId xmlns:a16="http://schemas.microsoft.com/office/drawing/2014/main" xmlns="" val="20002"/>
                     </a:ext>
                   </a:extLst>
                 </a:gridCol>
                 <a:gridCol w="672465">
                   <a:extLst>
                     <a:ext uri="{9D8B030D-6E8A-4147-A177-3AD203B41FA5}">
-                      <a16:colId xmlns:a16="http://schemas.microsoft.com/office/drawing/2014/main" val="20003"/>
+                      <a16:colId xmlns:a16="http://schemas.microsoft.com/office/drawing/2014/main" xmlns="" val="20003"/>
                     </a:ext>
                   </a:extLst>
                 </a:gridCol>
@@ -18152,7 +18157,7 @@
                 </a:tc>
                 <a:extLst>
                   <a:ext uri="{0D108BD9-81ED-4DB2-BD59-A6C34878D82A}">
-                    <a16:rowId xmlns:a16="http://schemas.microsoft.com/office/drawing/2014/main" val="10000"/>
+                    <a16:rowId xmlns:a16="http://schemas.microsoft.com/office/drawing/2014/main" xmlns="" val="10000"/>
                   </a:ext>
                 </a:extLst>
               </a:tr>
@@ -18223,7 +18228,7 @@
                 </a:tc>
                 <a:extLst>
                   <a:ext uri="{0D108BD9-81ED-4DB2-BD59-A6C34878D82A}">
-                    <a16:rowId xmlns:a16="http://schemas.microsoft.com/office/drawing/2014/main" val="10001"/>
+                    <a16:rowId xmlns:a16="http://schemas.microsoft.com/office/drawing/2014/main" xmlns="" val="10001"/>
                   </a:ext>
                 </a:extLst>
               </a:tr>
@@ -18294,7 +18299,7 @@
                 </a:tc>
                 <a:extLst>
                   <a:ext uri="{0D108BD9-81ED-4DB2-BD59-A6C34878D82A}">
-                    <a16:rowId xmlns:a16="http://schemas.microsoft.com/office/drawing/2014/main" val="10002"/>
+                    <a16:rowId xmlns:a16="http://schemas.microsoft.com/office/drawing/2014/main" xmlns="" val="10002"/>
                   </a:ext>
                 </a:extLst>
               </a:tr>
@@ -18365,7 +18370,7 @@
                 </a:tc>
                 <a:extLst>
                   <a:ext uri="{0D108BD9-81ED-4DB2-BD59-A6C34878D82A}">
-                    <a16:rowId xmlns:a16="http://schemas.microsoft.com/office/drawing/2014/main" val="10003"/>
+                    <a16:rowId xmlns:a16="http://schemas.microsoft.com/office/drawing/2014/main" xmlns="" val="10003"/>
                   </a:ext>
                 </a:extLst>
               </a:tr>
@@ -18436,7 +18441,7 @@
                 </a:tc>
                 <a:extLst>
                   <a:ext uri="{0D108BD9-81ED-4DB2-BD59-A6C34878D82A}">
-                    <a16:rowId xmlns:a16="http://schemas.microsoft.com/office/drawing/2014/main" val="10004"/>
+                    <a16:rowId xmlns:a16="http://schemas.microsoft.com/office/drawing/2014/main" xmlns="" val="10004"/>
                   </a:ext>
                 </a:extLst>
               </a:tr>
@@ -18495,7 +18500,7 @@
                 </a:tc>
                 <a:extLst>
                   <a:ext uri="{0D108BD9-81ED-4DB2-BD59-A6C34878D82A}">
-                    <a16:rowId xmlns:a16="http://schemas.microsoft.com/office/drawing/2014/main" val="10005"/>
+                    <a16:rowId xmlns:a16="http://schemas.microsoft.com/office/drawing/2014/main" xmlns="" val="10005"/>
                   </a:ext>
                 </a:extLst>
               </a:tr>
@@ -18728,28 +18733,28 @@
                 <a:gridCol w="897255">
                   <a:extLst>
                     <a:ext uri="{9D8B030D-6E8A-4147-A177-3AD203B41FA5}">
-                      <a16:colId xmlns:a16="http://schemas.microsoft.com/office/drawing/2014/main" val="20000"/>
+                      <a16:colId xmlns:a16="http://schemas.microsoft.com/office/drawing/2014/main" xmlns="" val="20000"/>
                     </a:ext>
                   </a:extLst>
                 </a:gridCol>
                 <a:gridCol w="703580">
                   <a:extLst>
                     <a:ext uri="{9D8B030D-6E8A-4147-A177-3AD203B41FA5}">
-                      <a16:colId xmlns:a16="http://schemas.microsoft.com/office/drawing/2014/main" val="20001"/>
+                      <a16:colId xmlns:a16="http://schemas.microsoft.com/office/drawing/2014/main" xmlns="" val="20001"/>
                     </a:ext>
                   </a:extLst>
                 </a:gridCol>
                 <a:gridCol w="703580">
                   <a:extLst>
                     <a:ext uri="{9D8B030D-6E8A-4147-A177-3AD203B41FA5}">
-                      <a16:colId xmlns:a16="http://schemas.microsoft.com/office/drawing/2014/main" val="20002"/>
+                      <a16:colId xmlns:a16="http://schemas.microsoft.com/office/drawing/2014/main" xmlns="" val="20002"/>
                     </a:ext>
                   </a:extLst>
                 </a:gridCol>
                 <a:gridCol w="767720">
                   <a:extLst>
                     <a:ext uri="{9D8B030D-6E8A-4147-A177-3AD203B41FA5}">
-                      <a16:colId xmlns:a16="http://schemas.microsoft.com/office/drawing/2014/main" val="20003"/>
+                      <a16:colId xmlns:a16="http://schemas.microsoft.com/office/drawing/2014/main" xmlns="" val="20003"/>
                     </a:ext>
                   </a:extLst>
                 </a:gridCol>
@@ -18809,7 +18814,7 @@
                 </a:tc>
                 <a:extLst>
                   <a:ext uri="{0D108BD9-81ED-4DB2-BD59-A6C34878D82A}">
-                    <a16:rowId xmlns:a16="http://schemas.microsoft.com/office/drawing/2014/main" val="10000"/>
+                    <a16:rowId xmlns:a16="http://schemas.microsoft.com/office/drawing/2014/main" xmlns="" val="10000"/>
                   </a:ext>
                 </a:extLst>
               </a:tr>
@@ -18880,7 +18885,7 @@
                 </a:tc>
                 <a:extLst>
                   <a:ext uri="{0D108BD9-81ED-4DB2-BD59-A6C34878D82A}">
-                    <a16:rowId xmlns:a16="http://schemas.microsoft.com/office/drawing/2014/main" val="10001"/>
+                    <a16:rowId xmlns:a16="http://schemas.microsoft.com/office/drawing/2014/main" xmlns="" val="10001"/>
                   </a:ext>
                 </a:extLst>
               </a:tr>
@@ -18951,7 +18956,7 @@
                 </a:tc>
                 <a:extLst>
                   <a:ext uri="{0D108BD9-81ED-4DB2-BD59-A6C34878D82A}">
-                    <a16:rowId xmlns:a16="http://schemas.microsoft.com/office/drawing/2014/main" val="10002"/>
+                    <a16:rowId xmlns:a16="http://schemas.microsoft.com/office/drawing/2014/main" xmlns="" val="10002"/>
                   </a:ext>
                 </a:extLst>
               </a:tr>
@@ -19022,7 +19027,7 @@
                 </a:tc>
                 <a:extLst>
                   <a:ext uri="{0D108BD9-81ED-4DB2-BD59-A6C34878D82A}">
-                    <a16:rowId xmlns:a16="http://schemas.microsoft.com/office/drawing/2014/main" val="10003"/>
+                    <a16:rowId xmlns:a16="http://schemas.microsoft.com/office/drawing/2014/main" xmlns="" val="10003"/>
                   </a:ext>
                 </a:extLst>
               </a:tr>
@@ -19093,7 +19098,7 @@
                 </a:tc>
                 <a:extLst>
                   <a:ext uri="{0D108BD9-81ED-4DB2-BD59-A6C34878D82A}">
-                    <a16:rowId xmlns:a16="http://schemas.microsoft.com/office/drawing/2014/main" val="10004"/>
+                    <a16:rowId xmlns:a16="http://schemas.microsoft.com/office/drawing/2014/main" xmlns="" val="10004"/>
                   </a:ext>
                 </a:extLst>
               </a:tr>
@@ -19170,7 +19175,7 @@
                 </a:tc>
                 <a:extLst>
                   <a:ext uri="{0D108BD9-81ED-4DB2-BD59-A6C34878D82A}">
-                    <a16:rowId xmlns:a16="http://schemas.microsoft.com/office/drawing/2014/main" val="10005"/>
+                    <a16:rowId xmlns:a16="http://schemas.microsoft.com/office/drawing/2014/main" xmlns="" val="10005"/>
                   </a:ext>
                 </a:extLst>
               </a:tr>
@@ -19229,7 +19234,7 @@
                 </a:tc>
                 <a:extLst>
                   <a:ext uri="{0D108BD9-81ED-4DB2-BD59-A6C34878D82A}">
-                    <a16:rowId xmlns:a16="http://schemas.microsoft.com/office/drawing/2014/main" val="10006"/>
+                    <a16:rowId xmlns:a16="http://schemas.microsoft.com/office/drawing/2014/main" xmlns="" val="10006"/>
                   </a:ext>
                 </a:extLst>
               </a:tr>
@@ -19525,7 +19530,7 @@
         </p:nvSpPr>
         <p:spPr>
           <a:xfrm>
-            <a:off x="6765837" y="1845276"/>
+            <a:off x="6703141" y="1791351"/>
             <a:ext cx="3902163" cy="255373"/>
           </a:xfrm>
           <a:prstGeom prst="rect">
@@ -19827,40 +19832,6 @@
       </p:sp>
       <p:sp>
         <p:nvSpPr>
-          <p:cNvPr id="3" name="Content Placeholder 2"/>
-          <p:cNvSpPr>
-            <a:spLocks noGrp="1"/>
-          </p:cNvSpPr>
-          <p:nvPr>
-            <p:ph idx="1"/>
-          </p:nvPr>
-        </p:nvSpPr>
-        <p:spPr/>
-        <p:txBody>
-          <a:bodyPr/>
-          <a:lstStyle/>
-          <a:p>
-            <a:r>
-              <a:rPr lang="en-US" dirty="0"/>
-              <a:t>Over the course of 14 years, it is evident the general makeup of the participants of the Cherry Blossom Race in Washington D.C. shifted from a group of older, dedicated runners to a group of younger, less serious runners. </a:t>
-            </a:r>
-          </a:p>
-          <a:p>
-            <a:r>
-              <a:rPr lang="en-US" dirty="0"/>
-              <a:t>The implementation of a lottery system in 2009 influenced both the run times and age group distributions. </a:t>
-            </a:r>
-          </a:p>
-          <a:p>
-            <a:r>
-              <a:rPr lang="en-US" dirty="0"/>
-              <a:t>Runner geographic distribution was not influenced as claimed by the hosts of the race.</a:t>
-            </a:r>
-          </a:p>
-        </p:txBody>
-      </p:sp>
-      <p:sp>
-        <p:nvSpPr>
           <p:cNvPr id="4" name="Slide Number Placeholder 3"/>
           <p:cNvSpPr>
             <a:spLocks noGrp="1"/>
@@ -19882,10 +19853,317 @@
           </a:p>
         </p:txBody>
       </p:sp>
+      <p:sp>
+        <p:nvSpPr>
+          <p:cNvPr id="5" name="Content Placeholder 2"/>
+          <p:cNvSpPr txBox="1">
+            <a:spLocks/>
+          </p:cNvSpPr>
+          <p:nvPr/>
+        </p:nvSpPr>
+        <p:spPr>
+          <a:xfrm>
+            <a:off x="656094" y="2371723"/>
+            <a:ext cx="11059656" cy="4152901"/>
+          </a:xfrm>
+          <a:prstGeom prst="rect">
+            <a:avLst/>
+          </a:prstGeom>
+        </p:spPr>
+        <p:txBody>
+          <a:bodyPr vert="horz" lIns="91440" tIns="45720" rIns="91440" bIns="45720" rtlCol="0">
+            <a:noAutofit/>
+          </a:bodyPr>
+          <a:lstStyle>
+            <a:lvl1pPr marL="342900" indent="-342900" algn="l" defTabSz="457200" rtl="0" eaLnBrk="1" latinLnBrk="0" hangingPunct="1">
+              <a:spcBef>
+                <a:spcPts val="1000"/>
+              </a:spcBef>
+              <a:spcAft>
+                <a:spcPts val="0"/>
+              </a:spcAft>
+              <a:buClr>
+                <a:schemeClr val="accent1"/>
+              </a:buClr>
+              <a:buSzPct val="80000"/>
+              <a:buFont typeface="Wingdings 3" charset="2"/>
+              <a:buChar char=""/>
+              <a:defRPr sz="1800" b="0" i="0" kern="1200">
+                <a:solidFill>
+                  <a:schemeClr val="tx1">
+                    <a:lumMod val="75000"/>
+                    <a:lumOff val="25000"/>
+                  </a:schemeClr>
+                </a:solidFill>
+                <a:latin typeface="+mn-lt"/>
+                <a:ea typeface="+mn-ea"/>
+                <a:cs typeface="+mn-cs"/>
+              </a:defRPr>
+            </a:lvl1pPr>
+            <a:lvl2pPr marL="742950" indent="-285750" algn="l" defTabSz="457200" rtl="0" eaLnBrk="1" latinLnBrk="0" hangingPunct="1">
+              <a:spcBef>
+                <a:spcPts val="1000"/>
+              </a:spcBef>
+              <a:spcAft>
+                <a:spcPts val="0"/>
+              </a:spcAft>
+              <a:buClr>
+                <a:schemeClr val="accent1"/>
+              </a:buClr>
+              <a:buSzPct val="80000"/>
+              <a:buFont typeface="Wingdings 3" charset="2"/>
+              <a:buChar char=""/>
+              <a:defRPr sz="1600" b="0" i="0" kern="1200">
+                <a:solidFill>
+                  <a:schemeClr val="tx1">
+                    <a:lumMod val="75000"/>
+                    <a:lumOff val="25000"/>
+                  </a:schemeClr>
+                </a:solidFill>
+                <a:latin typeface="+mn-lt"/>
+                <a:ea typeface="+mn-ea"/>
+                <a:cs typeface="+mn-cs"/>
+              </a:defRPr>
+            </a:lvl2pPr>
+            <a:lvl3pPr marL="1143000" indent="-228600" algn="l" defTabSz="457200" rtl="0" eaLnBrk="1" latinLnBrk="0" hangingPunct="1">
+              <a:spcBef>
+                <a:spcPts val="1000"/>
+              </a:spcBef>
+              <a:spcAft>
+                <a:spcPts val="0"/>
+              </a:spcAft>
+              <a:buClr>
+                <a:schemeClr val="accent1"/>
+              </a:buClr>
+              <a:buSzPct val="80000"/>
+              <a:buFont typeface="Wingdings 3" charset="2"/>
+              <a:buChar char=""/>
+              <a:defRPr sz="1400" b="0" i="0" kern="1200">
+                <a:solidFill>
+                  <a:schemeClr val="tx1">
+                    <a:lumMod val="75000"/>
+                    <a:lumOff val="25000"/>
+                  </a:schemeClr>
+                </a:solidFill>
+                <a:latin typeface="+mn-lt"/>
+                <a:ea typeface="+mn-ea"/>
+                <a:cs typeface="+mn-cs"/>
+              </a:defRPr>
+            </a:lvl3pPr>
+            <a:lvl4pPr marL="1600200" indent="-228600" algn="l" defTabSz="457200" rtl="0" eaLnBrk="1" latinLnBrk="0" hangingPunct="1">
+              <a:spcBef>
+                <a:spcPts val="1000"/>
+              </a:spcBef>
+              <a:spcAft>
+                <a:spcPts val="0"/>
+              </a:spcAft>
+              <a:buClr>
+                <a:schemeClr val="accent1"/>
+              </a:buClr>
+              <a:buSzPct val="80000"/>
+              <a:buFont typeface="Wingdings 3" charset="2"/>
+              <a:buChar char=""/>
+              <a:defRPr sz="1200" b="0" i="0" kern="1200">
+                <a:solidFill>
+                  <a:schemeClr val="tx1">
+                    <a:lumMod val="75000"/>
+                    <a:lumOff val="25000"/>
+                  </a:schemeClr>
+                </a:solidFill>
+                <a:latin typeface="+mn-lt"/>
+                <a:ea typeface="+mn-ea"/>
+                <a:cs typeface="+mn-cs"/>
+              </a:defRPr>
+            </a:lvl4pPr>
+            <a:lvl5pPr marL="2057400" indent="-228600" algn="l" defTabSz="457200" rtl="0" eaLnBrk="1" latinLnBrk="0" hangingPunct="1">
+              <a:spcBef>
+                <a:spcPts val="1000"/>
+              </a:spcBef>
+              <a:spcAft>
+                <a:spcPts val="0"/>
+              </a:spcAft>
+              <a:buClr>
+                <a:schemeClr val="accent1"/>
+              </a:buClr>
+              <a:buSzPct val="80000"/>
+              <a:buFont typeface="Wingdings 3" charset="2"/>
+              <a:buChar char=""/>
+              <a:defRPr sz="1200" b="0" i="0" kern="1200">
+                <a:solidFill>
+                  <a:schemeClr val="tx1">
+                    <a:lumMod val="75000"/>
+                    <a:lumOff val="25000"/>
+                  </a:schemeClr>
+                </a:solidFill>
+                <a:latin typeface="+mn-lt"/>
+                <a:ea typeface="+mn-ea"/>
+                <a:cs typeface="+mn-cs"/>
+              </a:defRPr>
+            </a:lvl5pPr>
+            <a:lvl6pPr marL="2514600" indent="-228600" algn="l" defTabSz="457200" rtl="0" eaLnBrk="1" latinLnBrk="0" hangingPunct="1">
+              <a:spcBef>
+                <a:spcPts val="1000"/>
+              </a:spcBef>
+              <a:spcAft>
+                <a:spcPts val="0"/>
+              </a:spcAft>
+              <a:buClr>
+                <a:schemeClr val="accent1"/>
+              </a:buClr>
+              <a:buSzPct val="80000"/>
+              <a:buFont typeface="Wingdings 3" charset="2"/>
+              <a:buChar char=""/>
+              <a:defRPr sz="1200" b="0" i="0" kern="1200">
+                <a:solidFill>
+                  <a:schemeClr val="tx1">
+                    <a:lumMod val="75000"/>
+                    <a:lumOff val="25000"/>
+                  </a:schemeClr>
+                </a:solidFill>
+                <a:latin typeface="+mn-lt"/>
+                <a:ea typeface="+mn-ea"/>
+                <a:cs typeface="+mn-cs"/>
+              </a:defRPr>
+            </a:lvl6pPr>
+            <a:lvl7pPr marL="2971800" indent="-228600" algn="l" defTabSz="457200" rtl="0" eaLnBrk="1" latinLnBrk="0" hangingPunct="1">
+              <a:spcBef>
+                <a:spcPts val="1000"/>
+              </a:spcBef>
+              <a:spcAft>
+                <a:spcPts val="0"/>
+              </a:spcAft>
+              <a:buClr>
+                <a:schemeClr val="accent1"/>
+              </a:buClr>
+              <a:buSzPct val="80000"/>
+              <a:buFont typeface="Wingdings 3" charset="2"/>
+              <a:buChar char=""/>
+              <a:defRPr sz="1200" b="0" i="0" kern="1200">
+                <a:solidFill>
+                  <a:schemeClr val="tx1">
+                    <a:lumMod val="75000"/>
+                    <a:lumOff val="25000"/>
+                  </a:schemeClr>
+                </a:solidFill>
+                <a:latin typeface="+mn-lt"/>
+                <a:ea typeface="+mn-ea"/>
+                <a:cs typeface="+mn-cs"/>
+              </a:defRPr>
+            </a:lvl7pPr>
+            <a:lvl8pPr marL="3429000" indent="-228600" algn="l" defTabSz="457200" rtl="0" eaLnBrk="1" latinLnBrk="0" hangingPunct="1">
+              <a:spcBef>
+                <a:spcPts val="1000"/>
+              </a:spcBef>
+              <a:spcAft>
+                <a:spcPts val="0"/>
+              </a:spcAft>
+              <a:buClr>
+                <a:schemeClr val="accent1"/>
+              </a:buClr>
+              <a:buSzPct val="80000"/>
+              <a:buFont typeface="Wingdings 3" charset="2"/>
+              <a:buChar char=""/>
+              <a:defRPr sz="1200" b="0" i="0" kern="1200">
+                <a:solidFill>
+                  <a:schemeClr val="tx1">
+                    <a:lumMod val="75000"/>
+                    <a:lumOff val="25000"/>
+                  </a:schemeClr>
+                </a:solidFill>
+                <a:latin typeface="+mn-lt"/>
+                <a:ea typeface="+mn-ea"/>
+                <a:cs typeface="+mn-cs"/>
+              </a:defRPr>
+            </a:lvl8pPr>
+            <a:lvl9pPr marL="3886200" indent="-228600" algn="l" defTabSz="457200" rtl="0" eaLnBrk="1" latinLnBrk="0" hangingPunct="1">
+              <a:spcBef>
+                <a:spcPts val="1000"/>
+              </a:spcBef>
+              <a:spcAft>
+                <a:spcPts val="0"/>
+              </a:spcAft>
+              <a:buClr>
+                <a:schemeClr val="accent1"/>
+              </a:buClr>
+              <a:buSzPct val="80000"/>
+              <a:buFont typeface="Wingdings 3" charset="2"/>
+              <a:buChar char=""/>
+              <a:defRPr sz="1200" b="0" i="0" kern="1200">
+                <a:solidFill>
+                  <a:schemeClr val="tx1">
+                    <a:lumMod val="75000"/>
+                    <a:lumOff val="25000"/>
+                  </a:schemeClr>
+                </a:solidFill>
+                <a:latin typeface="+mn-lt"/>
+                <a:ea typeface="+mn-ea"/>
+                <a:cs typeface="+mn-cs"/>
+              </a:defRPr>
+            </a:lvl9pPr>
+          </a:lstStyle>
+          <a:p>
+            <a:r>
+              <a:rPr lang="en-US" b="1" dirty="0" smtClean="0"/>
+              <a:t>Did the increase in popularity influence the results of the race?</a:t>
+            </a:r>
+          </a:p>
+          <a:p>
+            <a:pPr lvl="1"/>
+            <a:r>
+              <a:rPr lang="en-US" sz="1800" dirty="0" smtClean="0"/>
+              <a:t>Our analysis showed the dramatic increase in race participation, and, as the popularity increased, the mean race time increased (became slower).</a:t>
+            </a:r>
+          </a:p>
+          <a:p>
+            <a:r>
+              <a:rPr lang="en-US" b="1" dirty="0" smtClean="0"/>
+              <a:t>Did the distribution in the age of the runners change?</a:t>
+            </a:r>
+          </a:p>
+          <a:p>
+            <a:pPr lvl="1"/>
+            <a:r>
+              <a:rPr lang="en-US" sz="1800" dirty="0" smtClean="0"/>
+              <a:t>Our analysis showed a steady shift </a:t>
+            </a:r>
+            <a:r>
+              <a:rPr lang="en-US" sz="1800" dirty="0"/>
+              <a:t>to the left (younger</a:t>
+            </a:r>
+            <a:r>
+              <a:rPr lang="en-US" sz="1800" dirty="0" smtClean="0"/>
+              <a:t>) in age distribution.</a:t>
+            </a:r>
+          </a:p>
+          <a:p>
+            <a:r>
+              <a:rPr lang="en-US" b="1" dirty="0" smtClean="0"/>
+              <a:t>Did the change to a lottery-based registration process impact the results?</a:t>
+            </a:r>
+          </a:p>
+          <a:p>
+            <a:pPr lvl="1"/>
+            <a:r>
+              <a:rPr lang="en-US" sz="1800" dirty="0" smtClean="0"/>
+              <a:t>T-tests showed that the introduction of the lottery-based registration did have an impact in the mean race time.</a:t>
+            </a:r>
+          </a:p>
+          <a:p>
+            <a:pPr lvl="1"/>
+            <a:r>
+              <a:rPr lang="en-US" sz="1800" dirty="0" smtClean="0"/>
+              <a:t>Chi-squared analyses showed that the change was most noticeable in the distribution in age groups and not with  geographically-dispersed groups.</a:t>
+            </a:r>
+          </a:p>
+          <a:p>
+            <a:endParaRPr lang="en-US" dirty="0"/>
+          </a:p>
+        </p:txBody>
+      </p:sp>
     </p:spTree>
     <p:extLst>
       <p:ext uri="{BB962C8B-B14F-4D97-AF65-F5344CB8AC3E}">
-        <p14:creationId xmlns:p14="http://schemas.microsoft.com/office/powerpoint/2010/main" val="721653042"/>
+        <p14:creationId xmlns:p14="http://schemas.microsoft.com/office/powerpoint/2010/main" val="684563151"/>
       </p:ext>
     </p:extLst>
   </p:cSld>
@@ -19929,7 +20207,7 @@
           <a:p>
             <a:r>
               <a:rPr lang="en-US" dirty="0"/>
-              <a:t>REFERENCES</a:t>
+              <a:t>Conclusion/Discussions</a:t>
             </a:r>
           </a:p>
         </p:txBody>
@@ -19946,68 +20224,24 @@
         </p:nvSpPr>
         <p:spPr/>
         <p:txBody>
-          <a:bodyPr>
-            <a:normAutofit/>
-          </a:bodyPr>
+          <a:bodyPr/>
           <a:lstStyle/>
           <a:p>
-            <a:pPr marL="457200" indent="-457200">
-              <a:buFont typeface="+mj-lt"/>
-              <a:buAutoNum type="arabicPeriod"/>
-            </a:pPr>
             <a:r>
               <a:rPr lang="en-US" dirty="0"/>
-              <a:t>Nolan, Deborah; Lang, Duncan Temple; Data Science in R: A Case Studies Approach to Computational Reasoning and Problem Solving; 2015.</a:t>
-            </a:r>
-          </a:p>
-          <a:p>
-            <a:pPr marL="457200" indent="-457200">
-              <a:buFont typeface="+mj-lt"/>
-              <a:buAutoNum type="arabicPeriod"/>
-            </a:pPr>
+              <a:t>Over the course of 14 years, it is evident the general makeup of the participants of the Cherry Blossom Race in Washington D.C. shifted from a group of older, dedicated runners to a group of younger, less serious runners. </a:t>
+            </a:r>
+          </a:p>
+          <a:p>
             <a:r>
               <a:rPr lang="en-US" dirty="0"/>
-              <a:t>Cherry Blossom Race; </a:t>
-            </a:r>
-            <a:r>
-              <a:rPr lang="en-US" dirty="0">
-                <a:hlinkClick r:id="rId2"/>
-              </a:rPr>
-              <a:t>http://www.cherryblossom.org/</a:t>
-            </a:r>
+              <a:t>The implementation of a lottery system in 2009 influenced both the run times and age group distributions. </a:t>
+            </a:r>
+          </a:p>
+          <a:p>
             <a:r>
               <a:rPr lang="en-US" dirty="0"/>
-              <a:t>.</a:t>
-            </a:r>
-          </a:p>
-          <a:p>
-            <a:pPr marL="457200" indent="-457200">
-              <a:buFont typeface="+mj-lt"/>
-              <a:buAutoNum type="arabicPeriod"/>
-            </a:pPr>
-            <a:r>
-              <a:rPr lang="en-US" dirty="0"/>
-              <a:t>R Code to explore and analyze data; MSDS7333-Case08-Master.R</a:t>
-            </a:r>
-          </a:p>
-          <a:p>
-            <a:pPr marL="457200" indent="-457200">
-              <a:buFont typeface="+mj-lt"/>
-              <a:buAutoNum type="arabicPeriod"/>
-            </a:pPr>
-            <a:r>
-              <a:rPr lang="en-US" dirty="0"/>
-              <a:t>R Code to load data and create data frame; MSDS7333-Case08-DataLoad.R</a:t>
-            </a:r>
-          </a:p>
-          <a:p>
-            <a:pPr marL="457200" indent="-457200">
-              <a:buFont typeface="+mj-lt"/>
-              <a:buAutoNum type="arabicPeriod"/>
-            </a:pPr>
-            <a:r>
-              <a:rPr lang="en-US" dirty="0"/>
-              <a:t>R Code with supporting functions; MSDS7333-Case08-fx.</a:t>
+              <a:t>Runner geographic distribution was not influenced as claimed by the hosts of the race.</a:t>
             </a:r>
           </a:p>
         </p:txBody>
@@ -20030,6 +20264,159 @@
             <a:fld id="{7B7DB76D-28D5-4DAC-900A-A1330999554A}" type="slidenum">
               <a:rPr lang="en-US" smtClean="0"/>
               <a:t>25</a:t>
+            </a:fld>
+            <a:endParaRPr lang="en-US"/>
+          </a:p>
+        </p:txBody>
+      </p:sp>
+    </p:spTree>
+    <p:extLst>
+      <p:ext uri="{BB962C8B-B14F-4D97-AF65-F5344CB8AC3E}">
+        <p14:creationId xmlns:p14="http://schemas.microsoft.com/office/powerpoint/2010/main" val="721653042"/>
+      </p:ext>
+    </p:extLst>
+  </p:cSld>
+  <p:clrMapOvr>
+    <a:masterClrMapping/>
+  </p:clrMapOvr>
+</p:sld>
+</file>
+
+<file path=ppt/slides/slide26.xml><?xml version="1.0" encoding="utf-8"?>
+<p:sld xmlns:a="http://schemas.openxmlformats.org/drawingml/2006/main" xmlns:r="http://schemas.openxmlformats.org/officeDocument/2006/relationships" xmlns:p="http://schemas.openxmlformats.org/presentationml/2006/main">
+  <p:cSld>
+    <p:spTree>
+      <p:nvGrpSpPr>
+        <p:cNvPr id="1" name=""/>
+        <p:cNvGrpSpPr/>
+        <p:nvPr/>
+      </p:nvGrpSpPr>
+      <p:grpSpPr>
+        <a:xfrm>
+          <a:off x="0" y="0"/>
+          <a:ext cx="0" cy="0"/>
+          <a:chOff x="0" y="0"/>
+          <a:chExt cx="0" cy="0"/>
+        </a:xfrm>
+      </p:grpSpPr>
+      <p:sp>
+        <p:nvSpPr>
+          <p:cNvPr id="2" name="Title 1"/>
+          <p:cNvSpPr>
+            <a:spLocks noGrp="1"/>
+          </p:cNvSpPr>
+          <p:nvPr>
+            <p:ph type="title"/>
+          </p:nvPr>
+        </p:nvSpPr>
+        <p:spPr/>
+        <p:txBody>
+          <a:bodyPr/>
+          <a:lstStyle/>
+          <a:p>
+            <a:r>
+              <a:rPr lang="en-US" dirty="0"/>
+              <a:t>REFERENCES</a:t>
+            </a:r>
+          </a:p>
+        </p:txBody>
+      </p:sp>
+      <p:sp>
+        <p:nvSpPr>
+          <p:cNvPr id="3" name="Content Placeholder 2"/>
+          <p:cNvSpPr>
+            <a:spLocks noGrp="1"/>
+          </p:cNvSpPr>
+          <p:nvPr>
+            <p:ph idx="1"/>
+          </p:nvPr>
+        </p:nvSpPr>
+        <p:spPr/>
+        <p:txBody>
+          <a:bodyPr>
+            <a:normAutofit/>
+          </a:bodyPr>
+          <a:lstStyle/>
+          <a:p>
+            <a:pPr marL="457200" indent="-457200">
+              <a:buFont typeface="+mj-lt"/>
+              <a:buAutoNum type="arabicPeriod"/>
+            </a:pPr>
+            <a:r>
+              <a:rPr lang="en-US" dirty="0"/>
+              <a:t>Nolan, Deborah; Lang, Duncan Temple; Data Science in R: A Case Studies Approach to Computational Reasoning and Problem Solving; 2015.</a:t>
+            </a:r>
+          </a:p>
+          <a:p>
+            <a:pPr marL="457200" indent="-457200">
+              <a:buFont typeface="+mj-lt"/>
+              <a:buAutoNum type="arabicPeriod"/>
+            </a:pPr>
+            <a:r>
+              <a:rPr lang="en-US" dirty="0"/>
+              <a:t>Cherry Blossom Race; </a:t>
+            </a:r>
+            <a:r>
+              <a:rPr lang="en-US" dirty="0">
+                <a:hlinkClick r:id="rId2"/>
+              </a:rPr>
+              <a:t>http://www.cherryblossom.org/</a:t>
+            </a:r>
+            <a:r>
+              <a:rPr lang="en-US" dirty="0"/>
+              <a:t>.</a:t>
+            </a:r>
+          </a:p>
+          <a:p>
+            <a:pPr marL="457200" indent="-457200">
+              <a:buFont typeface="+mj-lt"/>
+              <a:buAutoNum type="arabicPeriod"/>
+            </a:pPr>
+            <a:r>
+              <a:rPr lang="en-US" dirty="0"/>
+              <a:t>R Code to explore and analyze data; MSDS7333-Case08-Master.R</a:t>
+            </a:r>
+          </a:p>
+          <a:p>
+            <a:pPr marL="457200" indent="-457200">
+              <a:buFont typeface="+mj-lt"/>
+              <a:buAutoNum type="arabicPeriod"/>
+            </a:pPr>
+            <a:r>
+              <a:rPr lang="en-US" dirty="0"/>
+              <a:t>R Code to load data and create data frame; MSDS7333-Case08-DataLoad.R</a:t>
+            </a:r>
+          </a:p>
+          <a:p>
+            <a:pPr marL="457200" indent="-457200">
+              <a:buFont typeface="+mj-lt"/>
+              <a:buAutoNum type="arabicPeriod"/>
+            </a:pPr>
+            <a:r>
+              <a:rPr lang="en-US" dirty="0"/>
+              <a:t>R Code with supporting functions; MSDS7333-Case08-fx.</a:t>
+            </a:r>
+          </a:p>
+        </p:txBody>
+      </p:sp>
+      <p:sp>
+        <p:nvSpPr>
+          <p:cNvPr id="4" name="Slide Number Placeholder 3"/>
+          <p:cNvSpPr>
+            <a:spLocks noGrp="1"/>
+          </p:cNvSpPr>
+          <p:nvPr>
+            <p:ph type="sldNum" sz="quarter" idx="12"/>
+          </p:nvPr>
+        </p:nvSpPr>
+        <p:spPr/>
+        <p:txBody>
+          <a:bodyPr/>
+          <a:lstStyle/>
+          <a:p>
+            <a:fld id="{7B7DB76D-28D5-4DAC-900A-A1330999554A}" type="slidenum">
+              <a:rPr lang="en-US" smtClean="0"/>
+              <a:t>26</a:t>
             </a:fld>
             <a:endParaRPr lang="en-US"/>
           </a:p>
@@ -20138,8 +20525,21 @@
           <a:p>
             <a:r>
               <a:rPr lang="en-US" sz="2000" dirty="0"/>
-              <a:t>Runner-selection moved to a lottery system in 2009. The organization claims the introduction may have affected the geographic distribution of runners.</a:t>
-            </a:r>
+              <a:t>Runner-selection moved to a lottery system in 2009. The organization claims the </a:t>
+            </a:r>
+            <a:r>
+              <a:rPr lang="en-US" sz="2000" dirty="0" smtClean="0"/>
+              <a:t>previous first-come-first-served system </a:t>
+            </a:r>
+            <a:r>
+              <a:rPr lang="en-US" sz="2000" dirty="0"/>
+              <a:t>may have </a:t>
+            </a:r>
+            <a:r>
+              <a:rPr lang="en-US" sz="2000" dirty="0" smtClean="0"/>
+              <a:t>negatively affected registrants who could not get to the website before the race filled up.</a:t>
+            </a:r>
+            <a:endParaRPr lang="en-US" sz="2000" dirty="0"/>
           </a:p>
           <a:p>
             <a:endParaRPr lang="en-US" sz="2000" dirty="0"/>
@@ -21406,7 +21806,7 @@
         </p:nvSpPr>
         <p:spPr>
           <a:xfrm>
-            <a:off x="1141412" y="-67612"/>
+            <a:off x="1141412" y="490482"/>
             <a:ext cx="9905998" cy="1478570"/>
           </a:xfrm>
         </p:spPr>

</xml_diff>

<commit_message>
slide reformat and added reference
</commit_message>
<xml_diff>
--- a/infographic.pptx
+++ b/infographic.pptx
@@ -233,7 +233,7 @@
           <a:p>
             <a:fld id="{E3A6CB1D-A3B7-434B-ABB5-99D9CB0EF729}" type="datetimeFigureOut">
               <a:rPr lang="en-US" smtClean="0"/>
-              <a:t>07/05/2017</a:t>
+              <a:t>7/5/17</a:t>
             </a:fld>
             <a:endParaRPr lang="en-US"/>
           </a:p>
@@ -1186,7 +1186,7 @@
           <a:p>
             <a:fld id="{2BFD8FD3-6BC4-425F-891D-0741A439FEF5}" type="datetime1">
               <a:rPr lang="en-US" smtClean="0"/>
-              <a:t>07/05/2017</a:t>
+              <a:t>7/5/17</a:t>
             </a:fld>
             <a:endParaRPr lang="en-US"/>
           </a:p>
@@ -2274,7 +2274,7 @@
           <a:p>
             <a:fld id="{441CFBDD-FC00-4979-962A-B16E941AAB17}" type="datetime1">
               <a:rPr lang="en-US" smtClean="0"/>
-              <a:t>07/05/2017</a:t>
+              <a:t>7/5/17</a:t>
             </a:fld>
             <a:endParaRPr lang="en-US"/>
           </a:p>
@@ -3255,7 +3255,7 @@
           <a:p>
             <a:fld id="{441CFBDD-FC00-4979-962A-B16E941AAB17}" type="datetime1">
               <a:rPr lang="en-US" smtClean="0"/>
-              <a:t>07/05/2017</a:t>
+              <a:t>7/5/17</a:t>
             </a:fld>
             <a:endParaRPr lang="en-US"/>
           </a:p>
@@ -4390,7 +4390,7 @@
           <a:p>
             <a:fld id="{441CFBDD-FC00-4979-962A-B16E941AAB17}" type="datetime1">
               <a:rPr lang="en-US" smtClean="0"/>
-              <a:t>07/05/2017</a:t>
+              <a:t>7/5/17</a:t>
             </a:fld>
             <a:endParaRPr lang="en-US"/>
           </a:p>
@@ -5424,7 +5424,7 @@
           <a:p>
             <a:fld id="{441CFBDD-FC00-4979-962A-B16E941AAB17}" type="datetime1">
               <a:rPr lang="en-US" smtClean="0"/>
-              <a:t>07/05/2017</a:t>
+              <a:t>7/5/17</a:t>
             </a:fld>
             <a:endParaRPr lang="en-US"/>
           </a:p>
@@ -6085,7 +6085,7 @@
           <a:p>
             <a:fld id="{441CFBDD-FC00-4979-962A-B16E941AAB17}" type="datetime1">
               <a:rPr lang="en-US" smtClean="0"/>
-              <a:t>07/05/2017</a:t>
+              <a:t>7/5/17</a:t>
             </a:fld>
             <a:endParaRPr lang="en-US"/>
           </a:p>
@@ -6947,7 +6947,7 @@
           <a:p>
             <a:fld id="{441CFBDD-FC00-4979-962A-B16E941AAB17}" type="datetime1">
               <a:rPr lang="en-US" smtClean="0"/>
-              <a:t>07/05/2017</a:t>
+              <a:t>7/5/17</a:t>
             </a:fld>
             <a:endParaRPr lang="en-US"/>
           </a:p>
@@ -7138,7 +7138,7 @@
           <a:p>
             <a:fld id="{B05E5C68-9EED-413E-B086-4145A3935548}" type="datetime1">
               <a:rPr lang="en-US" smtClean="0"/>
-              <a:t>07/05/2017</a:t>
+              <a:t>7/5/17</a:t>
             </a:fld>
             <a:endParaRPr lang="en-US"/>
           </a:p>
@@ -8110,7 +8110,7 @@
           <a:p>
             <a:fld id="{D6E95037-ADD3-4F59-BB44-F82689BBE7AE}" type="datetime1">
               <a:rPr lang="en-US" smtClean="0"/>
-              <a:t>07/05/2017</a:t>
+              <a:t>7/5/17</a:t>
             </a:fld>
             <a:endParaRPr lang="en-US"/>
           </a:p>
@@ -8321,7 +8321,7 @@
           <a:p>
             <a:fld id="{8D37BDF8-5683-484F-8DBC-E9A1DA889130}" type="datetime1">
               <a:rPr lang="en-US" smtClean="0"/>
-              <a:t>07/05/2017</a:t>
+              <a:t>7/5/17</a:t>
             </a:fld>
             <a:endParaRPr lang="en-US"/>
           </a:p>
@@ -9355,7 +9355,7 @@
           <a:p>
             <a:fld id="{4DECC4F6-A32E-467C-A154-8BAEC0788F1F}" type="datetime1">
               <a:rPr lang="en-US" smtClean="0"/>
-              <a:t>07/05/2017</a:t>
+              <a:t>7/5/17</a:t>
             </a:fld>
             <a:endParaRPr lang="en-US"/>
           </a:p>
@@ -9627,7 +9627,7 @@
           <a:p>
             <a:fld id="{29A1F4E2-A66E-4CEA-BAB6-29487134D526}" type="datetime1">
               <a:rPr lang="en-US" smtClean="0"/>
-              <a:t>07/05/2017</a:t>
+              <a:t>7/5/17</a:t>
             </a:fld>
             <a:endParaRPr lang="en-US"/>
           </a:p>
@@ -10037,7 +10037,7 @@
           <a:p>
             <a:fld id="{AD5924CE-E8D1-46CA-9144-2068016453D9}" type="datetime1">
               <a:rPr lang="en-US" smtClean="0"/>
-              <a:t>07/05/2017</a:t>
+              <a:t>7/5/17</a:t>
             </a:fld>
             <a:endParaRPr lang="en-US"/>
           </a:p>
@@ -10164,7 +10164,7 @@
           <a:p>
             <a:fld id="{A818CF9F-D515-4605-8464-4C06C1DFB243}" type="datetime1">
               <a:rPr lang="en-US" smtClean="0"/>
-              <a:t>07/05/2017</a:t>
+              <a:t>7/5/17</a:t>
             </a:fld>
             <a:endParaRPr lang="en-US"/>
           </a:p>
@@ -10259,7 +10259,7 @@
           <a:p>
             <a:fld id="{D6C9B92B-7D36-4A45-A718-E0E1FC80AFD2}" type="datetime1">
               <a:rPr lang="en-US" smtClean="0"/>
-              <a:t>07/05/2017</a:t>
+              <a:t>7/5/17</a:t>
             </a:fld>
             <a:endParaRPr lang="en-US"/>
           </a:p>
@@ -11340,7 +11340,7 @@
           <a:p>
             <a:fld id="{B68FD5C0-512F-45C2-ACB2-607A00A4510C}" type="datetime1">
               <a:rPr lang="en-US" smtClean="0"/>
-              <a:t>07/05/2017</a:t>
+              <a:t>7/5/17</a:t>
             </a:fld>
             <a:endParaRPr lang="en-US"/>
           </a:p>
@@ -12448,7 +12448,7 @@
           <a:p>
             <a:fld id="{A8C85F23-E154-4B47-A9F9-89A52AA15E6B}" type="datetime1">
               <a:rPr lang="en-US" smtClean="0"/>
-              <a:t>07/05/2017</a:t>
+              <a:t>7/5/17</a:t>
             </a:fld>
             <a:endParaRPr lang="en-US"/>
           </a:p>
@@ -13445,7 +13445,7 @@
           <a:p>
             <a:fld id="{441CFBDD-FC00-4979-962A-B16E941AAB17}" type="datetime1">
               <a:rPr lang="en-US" smtClean="0"/>
-              <a:t>07/05/2017</a:t>
+              <a:t>7/5/17</a:t>
             </a:fld>
             <a:endParaRPr lang="en-US"/>
           </a:p>
@@ -14436,28 +14436,47 @@
           </p:nvPr>
         </p:nvSpPr>
         <p:spPr>
-          <a:xfrm>
-            <a:off x="564662" y="415367"/>
-            <a:ext cx="5934508" cy="648049"/>
-          </a:xfrm>
           <a:ln>
             <a:noFill/>
           </a:ln>
         </p:spPr>
         <p:txBody>
           <a:bodyPr>
-            <a:normAutofit fontScale="90000"/>
+            <a:normAutofit/>
           </a:bodyPr>
           <a:lstStyle/>
           <a:p>
             <a:r>
               <a:rPr lang="en-US" dirty="0">
                 <a:solidFill>
-                  <a:srgbClr val="0070C0"/>
+                  <a:schemeClr val="bg1"/>
                 </a:solidFill>
               </a:rPr>
               <a:t>Men’s Runner Results - Age</a:t>
             </a:r>
+          </a:p>
+        </p:txBody>
+      </p:sp>
+      <p:sp>
+        <p:nvSpPr>
+          <p:cNvPr id="4" name="Slide Number Placeholder 3"/>
+          <p:cNvSpPr>
+            <a:spLocks noGrp="1"/>
+          </p:cNvSpPr>
+          <p:nvPr>
+            <p:ph type="sldNum" sz="quarter" idx="12"/>
+          </p:nvPr>
+        </p:nvSpPr>
+        <p:spPr/>
+        <p:txBody>
+          <a:bodyPr/>
+          <a:lstStyle/>
+          <a:p>
+            <a:fld id="{7B7DB76D-28D5-4DAC-900A-A1330999554A}" type="slidenum">
+              <a:rPr lang="en-US" smtClean="0"/>
+              <a:t>12</a:t>
+            </a:fld>
+            <a:endParaRPr lang="en-US"/>
           </a:p>
         </p:txBody>
       </p:sp>
@@ -14468,7 +14487,7 @@
             <a:picLocks noGrp="1" noChangeAspect="1" noChangeArrowheads="1"/>
           </p:cNvPicPr>
           <p:nvPr>
-            <p:ph type="pic" idx="1"/>
+            <p:ph type="pic" idx="4294967295"/>
           </p:nvPr>
         </p:nvPicPr>
         <p:blipFill>
@@ -14486,8 +14505,8 @@
         </p:blipFill>
         <p:spPr bwMode="auto">
           <a:xfrm>
-            <a:off x="675244" y="1070652"/>
-            <a:ext cx="5324981" cy="3370385"/>
+            <a:off x="573625" y="1882842"/>
+            <a:ext cx="5326063" cy="3371850"/>
           </a:xfrm>
           <a:prstGeom prst="rect">
             <a:avLst/>
@@ -14524,13 +14543,13 @@
             <a:spLocks noGrp="1"/>
           </p:cNvSpPr>
           <p:nvPr>
-            <p:ph type="body" sz="half" idx="2"/>
+            <p:ph type="body" sz="half" idx="4294967295"/>
           </p:nvPr>
         </p:nvSpPr>
         <p:spPr>
           <a:xfrm>
-            <a:off x="1161561" y="4592810"/>
-            <a:ext cx="8323385" cy="1853246"/>
+            <a:off x="147484" y="5456902"/>
+            <a:ext cx="10363200" cy="1275877"/>
           </a:xfrm>
         </p:spPr>
         <p:txBody>
@@ -14549,29 +14568,6 @@
               <a:rPr lang="en-US" sz="2000" dirty="0"/>
               <a:t>Density Plots indicate a shift to the left, validating the boxplot pattern. Vertical line is stationed at mean for 1999 and ends to the right of the mean for 2009.</a:t>
             </a:r>
-          </a:p>
-        </p:txBody>
-      </p:sp>
-      <p:sp>
-        <p:nvSpPr>
-          <p:cNvPr id="4" name="Slide Number Placeholder 3"/>
-          <p:cNvSpPr>
-            <a:spLocks noGrp="1"/>
-          </p:cNvSpPr>
-          <p:nvPr>
-            <p:ph type="sldNum" sz="quarter" idx="12"/>
-          </p:nvPr>
-        </p:nvSpPr>
-        <p:spPr/>
-        <p:txBody>
-          <a:bodyPr/>
-          <a:lstStyle/>
-          <a:p>
-            <a:fld id="{7B7DB76D-28D5-4DAC-900A-A1330999554A}" type="slidenum">
-              <a:rPr lang="en-US" smtClean="0"/>
-              <a:t>12</a:t>
-            </a:fld>
-            <a:endParaRPr lang="en-US"/>
           </a:p>
         </p:txBody>
       </p:sp>
@@ -14598,7 +14594,7 @@
         </p:blipFill>
         <p:spPr bwMode="auto">
           <a:xfrm>
-            <a:off x="6381907" y="987707"/>
+            <a:off x="6180529" y="1722582"/>
             <a:ext cx="4808832" cy="3673932"/>
           </a:xfrm>
           <a:prstGeom prst="rect">
@@ -14637,7 +14633,7 @@
         </p:nvCxnSpPr>
         <p:spPr>
           <a:xfrm>
-            <a:off x="1060919" y="2824673"/>
+            <a:off x="965305" y="4065288"/>
             <a:ext cx="4700953" cy="326032"/>
           </a:xfrm>
           <a:prstGeom prst="straightConnector1">
@@ -14673,7 +14669,7 @@
         </p:nvCxnSpPr>
         <p:spPr>
           <a:xfrm flipH="1" flipV="1">
-            <a:off x="7209070" y="1555443"/>
+            <a:off x="6982928" y="2263799"/>
             <a:ext cx="0" cy="2672861"/>
           </a:xfrm>
           <a:prstGeom prst="line">
@@ -14995,41 +14991,60 @@
             <p:ph type="title"/>
           </p:nvPr>
         </p:nvSpPr>
-        <p:spPr>
-          <a:xfrm>
-            <a:off x="633912" y="840708"/>
-            <a:ext cx="5934508" cy="690317"/>
-          </a:xfrm>
-        </p:spPr>
+        <p:spPr/>
         <p:txBody>
           <a:bodyPr>
-            <a:normAutofit fontScale="90000"/>
+            <a:normAutofit/>
           </a:bodyPr>
           <a:lstStyle/>
           <a:p>
             <a:r>
               <a:rPr lang="en-US" dirty="0">
                 <a:solidFill>
-                  <a:srgbClr val="0070C0"/>
+                  <a:schemeClr val="bg1"/>
                 </a:solidFill>
               </a:rPr>
-              <a:t>Men’s Runner Results </a:t>
-            </a:r>
-            <a:br>
+              <a:t>Men’s Runner </a:t>
+            </a:r>
+            <a:r>
+              <a:rPr lang="en-US" dirty="0" smtClean="0">
+                <a:solidFill>
+                  <a:schemeClr val="bg1"/>
+                </a:solidFill>
+              </a:rPr>
+              <a:t>Results - </a:t>
+            </a:r>
+            <a:r>
               <a:rPr lang="en-US" dirty="0">
                 <a:solidFill>
-                  <a:srgbClr val="0070C0"/>
+                  <a:schemeClr val="bg1"/>
                 </a:solidFill>
               </a:rPr>
-            </a:br>
-            <a:r>
-              <a:rPr lang="en-US" dirty="0">
-                <a:solidFill>
-                  <a:srgbClr val="0070C0"/>
-                </a:solidFill>
-              </a:rPr>
-              <a:t>- Time</a:t>
-            </a:r>
+              <a:t>Time</a:t>
+            </a:r>
+          </a:p>
+        </p:txBody>
+      </p:sp>
+      <p:sp>
+        <p:nvSpPr>
+          <p:cNvPr id="5" name="Slide Number Placeholder 4"/>
+          <p:cNvSpPr>
+            <a:spLocks noGrp="1"/>
+          </p:cNvSpPr>
+          <p:nvPr>
+            <p:ph type="sldNum" sz="quarter" idx="12"/>
+          </p:nvPr>
+        </p:nvSpPr>
+        <p:spPr/>
+        <p:txBody>
+          <a:bodyPr/>
+          <a:lstStyle/>
+          <a:p>
+            <a:fld id="{7B7DB76D-28D5-4DAC-900A-A1330999554A}" type="slidenum">
+              <a:rPr lang="en-US" smtClean="0"/>
+              <a:t>14</a:t>
+            </a:fld>
+            <a:endParaRPr lang="en-US"/>
           </a:p>
         </p:txBody>
       </p:sp>
@@ -15040,13 +15055,13 @@
             <a:spLocks noGrp="1"/>
           </p:cNvSpPr>
           <p:nvPr>
-            <p:ph type="body" sz="half" idx="2"/>
+            <p:ph type="body" sz="half" idx="4294967295"/>
           </p:nvPr>
         </p:nvSpPr>
         <p:spPr>
           <a:xfrm>
-            <a:off x="486735" y="1973901"/>
-            <a:ext cx="5401340" cy="3541714"/>
+            <a:off x="134985" y="2504204"/>
+            <a:ext cx="4820473" cy="4034247"/>
           </a:xfrm>
         </p:spPr>
         <p:txBody>
@@ -15068,39 +15083,16 @@
           </a:p>
         </p:txBody>
       </p:sp>
-      <p:sp>
-        <p:nvSpPr>
-          <p:cNvPr id="5" name="Slide Number Placeholder 4"/>
-          <p:cNvSpPr>
-            <a:spLocks noGrp="1"/>
-          </p:cNvSpPr>
-          <p:nvPr>
-            <p:ph type="sldNum" sz="quarter" idx="12"/>
-          </p:nvPr>
-        </p:nvSpPr>
-        <p:spPr/>
-        <p:txBody>
-          <a:bodyPr/>
-          <a:lstStyle/>
-          <a:p>
-            <a:fld id="{7B7DB76D-28D5-4DAC-900A-A1330999554A}" type="slidenum">
-              <a:rPr lang="en-US" smtClean="0"/>
-              <a:t>14</a:t>
-            </a:fld>
-            <a:endParaRPr lang="en-US"/>
-          </a:p>
-        </p:txBody>
-      </p:sp>
       <p:pic>
         <p:nvPicPr>
-          <p:cNvPr id="2050" name="Picture 2"/>
+          <p:cNvPr id="2051" name="Picture 3"/>
           <p:cNvPicPr>
             <a:picLocks noChangeAspect="1" noChangeArrowheads="1"/>
           </p:cNvPicPr>
           <p:nvPr/>
         </p:nvPicPr>
         <p:blipFill>
-          <a:blip r:embed="rId2">
+          <a:blip r:embed="rId2" cstate="print">
             <a:extLst>
               <a:ext uri="{28A0092B-C50C-407E-A947-70E740481C1C}">
                 <a14:useLocalDpi xmlns:a14="http://schemas.microsoft.com/office/drawing/2010/main" val="0"/>
@@ -15114,8 +15106,8 @@
         </p:blipFill>
         <p:spPr bwMode="auto">
           <a:xfrm>
-            <a:off x="6162883" y="179299"/>
-            <a:ext cx="4037257" cy="3294771"/>
+            <a:off x="4827640" y="3475418"/>
+            <a:ext cx="4109884" cy="3262121"/>
           </a:xfrm>
           <a:prstGeom prst="rect">
             <a:avLst/>
@@ -15147,14 +15139,14 @@
       </p:pic>
       <p:pic>
         <p:nvPicPr>
-          <p:cNvPr id="2051" name="Picture 3"/>
+          <p:cNvPr id="2050" name="Picture 2"/>
           <p:cNvPicPr>
             <a:picLocks noChangeAspect="1" noChangeArrowheads="1"/>
           </p:cNvPicPr>
           <p:nvPr/>
         </p:nvPicPr>
         <p:blipFill>
-          <a:blip r:embed="rId3" cstate="print">
+          <a:blip r:embed="rId3">
             <a:extLst>
               <a:ext uri="{28A0092B-C50C-407E-A947-70E740481C1C}">
                 <a14:useLocalDpi xmlns:a14="http://schemas.microsoft.com/office/drawing/2010/main" val="0"/>
@@ -15168,8 +15160,8 @@
         </p:blipFill>
         <p:spPr bwMode="auto">
           <a:xfrm>
-            <a:off x="6315283" y="3474070"/>
-            <a:ext cx="4037257" cy="3204475"/>
+            <a:off x="8093665" y="1209469"/>
+            <a:ext cx="3541985" cy="2890584"/>
           </a:xfrm>
           <a:prstGeom prst="rect">
             <a:avLst/>
@@ -15263,62 +15255,6 @@
           </a:p>
         </p:txBody>
       </p:sp>
-      <p:pic>
-        <p:nvPicPr>
-          <p:cNvPr id="8" name="Content Placeholder 4"/>
-          <p:cNvPicPr>
-            <a:picLocks noGrp="1" noChangeAspect="1" noChangeArrowheads="1"/>
-          </p:cNvPicPr>
-          <p:nvPr>
-            <p:ph idx="1"/>
-          </p:nvPr>
-        </p:nvPicPr>
-        <p:blipFill>
-          <a:blip r:embed="rId2">
-            <a:extLst>
-              <a:ext uri="{28A0092B-C50C-407E-A947-70E740481C1C}">
-                <a14:useLocalDpi xmlns:a14="http://schemas.microsoft.com/office/drawing/2010/main" val="0"/>
-              </a:ext>
-            </a:extLst>
-          </a:blip>
-          <a:srcRect/>
-          <a:stretch>
-            <a:fillRect/>
-          </a:stretch>
-        </p:blipFill>
-        <p:spPr bwMode="auto">
-          <a:xfrm>
-            <a:off x="2369482" y="3378993"/>
-            <a:ext cx="4577319" cy="3362812"/>
-          </a:xfrm>
-          <a:prstGeom prst="rect">
-            <a:avLst/>
-          </a:prstGeom>
-          <a:noFill/>
-          <a:ln>
-            <a:noFill/>
-          </a:ln>
-          <a:extLst>
-            <a:ext uri="{909E8E84-426E-40DD-AFC4-6F175D3DCCD1}">
-              <a14:hiddenFill xmlns:a14="http://schemas.microsoft.com/office/drawing/2010/main">
-                <a:solidFill>
-                  <a:schemeClr val="accent1"/>
-                </a:solidFill>
-              </a14:hiddenFill>
-            </a:ext>
-            <a:ext uri="{91240B29-F687-4F45-9708-019B960494DF}">
-              <a14:hiddenLine xmlns:a14="http://schemas.microsoft.com/office/drawing/2010/main" w="9525">
-                <a:solidFill>
-                  <a:schemeClr val="tx1"/>
-                </a:solidFill>
-                <a:miter lim="800000"/>
-                <a:headEnd/>
-                <a:tailEnd/>
-              </a14:hiddenLine>
-            </a:ext>
-          </a:extLst>
-        </p:spPr>
-      </p:pic>
       <p:sp>
         <p:nvSpPr>
           <p:cNvPr id="4" name="Slide Number Placeholder 3"/>
@@ -15351,7 +15287,7 @@
           <p:nvPr/>
         </p:nvPicPr>
         <p:blipFill>
-          <a:blip r:embed="rId3" cstate="print">
+          <a:blip r:embed="rId2" cstate="print">
             <a:extLst>
               <a:ext uri="{28A0092B-C50C-407E-A947-70E740481C1C}">
                 <a14:useLocalDpi xmlns:a14="http://schemas.microsoft.com/office/drawing/2010/main" val="0"/>
@@ -15365,7 +15301,7 @@
         </p:blipFill>
         <p:spPr bwMode="auto">
           <a:xfrm>
-            <a:off x="7169711" y="3378993"/>
+            <a:off x="7623994" y="3249852"/>
             <a:ext cx="4021028" cy="3408721"/>
           </a:xfrm>
           <a:prstGeom prst="rect">
@@ -15405,7 +15341,7 @@
           <p:nvPr/>
         </p:nvPicPr>
         <p:blipFill>
-          <a:blip r:embed="rId4" cstate="print">
+          <a:blip r:embed="rId3" cstate="print">
             <a:extLst>
               <a:ext uri="{28A0092B-C50C-407E-A947-70E740481C1C}">
                 <a14:useLocalDpi xmlns:a14="http://schemas.microsoft.com/office/drawing/2010/main" val="0"/>
@@ -15419,8 +15355,8 @@
         </p:blipFill>
         <p:spPr bwMode="auto">
           <a:xfrm>
-            <a:off x="6398646" y="294069"/>
-            <a:ext cx="4021028" cy="3084924"/>
+            <a:off x="3139085" y="3154725"/>
+            <a:ext cx="4077289" cy="3128087"/>
           </a:xfrm>
           <a:prstGeom prst="rect">
             <a:avLst/>
@@ -15458,8 +15394,8 @@
         </p:nvSpPr>
         <p:spPr>
           <a:xfrm>
-            <a:off x="161797" y="2334954"/>
-            <a:ext cx="6013939" cy="1323439"/>
+            <a:off x="334297" y="2403778"/>
+            <a:ext cx="2804787" cy="2862322"/>
           </a:xfrm>
           <a:prstGeom prst="rect">
             <a:avLst/>
@@ -15479,6 +15415,62 @@
           </a:p>
         </p:txBody>
       </p:sp>
+      <p:pic>
+        <p:nvPicPr>
+          <p:cNvPr id="8" name="Content Placeholder 4"/>
+          <p:cNvPicPr>
+            <a:picLocks noGrp="1" noChangeAspect="1" noChangeArrowheads="1"/>
+          </p:cNvPicPr>
+          <p:nvPr>
+            <p:ph idx="1"/>
+          </p:nvPr>
+        </p:nvPicPr>
+        <p:blipFill>
+          <a:blip r:embed="rId4">
+            <a:extLst>
+              <a:ext uri="{28A0092B-C50C-407E-A947-70E740481C1C}">
+                <a14:useLocalDpi xmlns:a14="http://schemas.microsoft.com/office/drawing/2010/main" val="0"/>
+              </a:ext>
+            </a:extLst>
+          </a:blip>
+          <a:srcRect/>
+          <a:stretch>
+            <a:fillRect/>
+          </a:stretch>
+        </p:blipFill>
+        <p:spPr bwMode="auto">
+          <a:xfrm>
+            <a:off x="6033943" y="295729"/>
+            <a:ext cx="4021028" cy="2954123"/>
+          </a:xfrm>
+          <a:prstGeom prst="rect">
+            <a:avLst/>
+          </a:prstGeom>
+          <a:noFill/>
+          <a:ln>
+            <a:noFill/>
+          </a:ln>
+          <a:extLst>
+            <a:ext uri="{909E8E84-426E-40DD-AFC4-6F175D3DCCD1}">
+              <a14:hiddenFill xmlns:a14="http://schemas.microsoft.com/office/drawing/2010/main">
+                <a:solidFill>
+                  <a:schemeClr val="accent1"/>
+                </a:solidFill>
+              </a14:hiddenFill>
+            </a:ext>
+            <a:ext uri="{91240B29-F687-4F45-9708-019B960494DF}">
+              <a14:hiddenLine xmlns:a14="http://schemas.microsoft.com/office/drawing/2010/main" w="9525">
+                <a:solidFill>
+                  <a:schemeClr val="tx1"/>
+                </a:solidFill>
+                <a:miter lim="800000"/>
+                <a:headEnd/>
+                <a:tailEnd/>
+              </a14:hiddenLine>
+            </a:ext>
+          </a:extLst>
+        </p:spPr>
+      </p:pic>
     </p:spTree>
     <p:extLst>
       <p:ext uri="{BB962C8B-B14F-4D97-AF65-F5344CB8AC3E}">
@@ -15693,8 +15685,8 @@
         </p:nvSpPr>
         <p:spPr>
           <a:xfrm>
-            <a:off x="643236" y="679572"/>
-            <a:ext cx="6747945" cy="1166037"/>
+            <a:off x="1154954" y="472226"/>
+            <a:ext cx="8761413" cy="1494226"/>
           </a:xfrm>
         </p:spPr>
         <p:txBody>
@@ -15726,18 +15718,41 @@
       </p:sp>
       <p:sp>
         <p:nvSpPr>
+          <p:cNvPr id="5" name="Slide Number Placeholder 4"/>
+          <p:cNvSpPr>
+            <a:spLocks noGrp="1"/>
+          </p:cNvSpPr>
+          <p:nvPr>
+            <p:ph type="sldNum" sz="quarter" idx="12"/>
+          </p:nvPr>
+        </p:nvSpPr>
+        <p:spPr/>
+        <p:txBody>
+          <a:bodyPr/>
+          <a:lstStyle/>
+          <a:p>
+            <a:fld id="{7B7DB76D-28D5-4DAC-900A-A1330999554A}" type="slidenum">
+              <a:rPr lang="en-US" smtClean="0"/>
+              <a:t>17</a:t>
+            </a:fld>
+            <a:endParaRPr lang="en-US"/>
+          </a:p>
+        </p:txBody>
+      </p:sp>
+      <p:sp>
+        <p:nvSpPr>
           <p:cNvPr id="4" name="Text Placeholder 3"/>
           <p:cNvSpPr>
             <a:spLocks noGrp="1"/>
           </p:cNvSpPr>
           <p:nvPr>
-            <p:ph type="body" sz="half" idx="2"/>
+            <p:ph type="body" sz="half" idx="4294967295"/>
           </p:nvPr>
         </p:nvSpPr>
         <p:spPr>
           <a:xfrm>
-            <a:off x="502351" y="2092360"/>
-            <a:ext cx="6103574" cy="2488831"/>
+            <a:off x="209183" y="2564272"/>
+            <a:ext cx="3938586" cy="3698875"/>
           </a:xfrm>
         </p:spPr>
         <p:txBody>
@@ -15806,29 +15821,6 @@
               <a:rPr lang="en-US" sz="2000" dirty="0"/>
               <a:t> Time by Year</a:t>
             </a:r>
-          </a:p>
-        </p:txBody>
-      </p:sp>
-      <p:sp>
-        <p:nvSpPr>
-          <p:cNvPr id="5" name="Slide Number Placeholder 4"/>
-          <p:cNvSpPr>
-            <a:spLocks noGrp="1"/>
-          </p:cNvSpPr>
-          <p:nvPr>
-            <p:ph type="sldNum" sz="quarter" idx="12"/>
-          </p:nvPr>
-        </p:nvSpPr>
-        <p:spPr/>
-        <p:txBody>
-          <a:bodyPr/>
-          <a:lstStyle/>
-          <a:p>
-            <a:fld id="{7B7DB76D-28D5-4DAC-900A-A1330999554A}" type="slidenum">
-              <a:rPr lang="en-US" smtClean="0"/>
-              <a:t>17</a:t>
-            </a:fld>
-            <a:endParaRPr lang="en-US"/>
           </a:p>
         </p:txBody>
       </p:sp>
@@ -15855,8 +15847,8 @@
         </p:blipFill>
         <p:spPr bwMode="auto">
           <a:xfrm>
-            <a:off x="3826373" y="4174791"/>
-            <a:ext cx="3418611" cy="2630804"/>
+            <a:off x="4034510" y="3401007"/>
+            <a:ext cx="3859766" cy="2970296"/>
           </a:xfrm>
           <a:prstGeom prst="rect">
             <a:avLst/>
@@ -15909,8 +15901,8 @@
         </p:blipFill>
         <p:spPr bwMode="auto">
           <a:xfrm>
-            <a:off x="6449238" y="233848"/>
-            <a:ext cx="3631584" cy="2776352"/>
+            <a:off x="6439510" y="292456"/>
+            <a:ext cx="3913030" cy="2991518"/>
           </a:xfrm>
           <a:prstGeom prst="rect">
             <a:avLst/>
@@ -15963,7 +15955,7 @@
         </p:blipFill>
         <p:spPr bwMode="auto">
           <a:xfrm>
-            <a:off x="7517219" y="3155163"/>
+            <a:off x="7736959" y="3233271"/>
             <a:ext cx="4455041" cy="3640403"/>
           </a:xfrm>
           <a:prstGeom prst="rect">
@@ -16466,15 +16458,10 @@
             <p:ph type="title"/>
           </p:nvPr>
         </p:nvSpPr>
-        <p:spPr>
-          <a:xfrm>
-            <a:off x="1141410" y="562706"/>
-            <a:ext cx="5934508" cy="561363"/>
-          </a:xfrm>
-        </p:spPr>
+        <p:spPr/>
         <p:txBody>
           <a:bodyPr>
-            <a:normAutofit fontScale="90000"/>
+            <a:normAutofit/>
           </a:bodyPr>
           <a:lstStyle/>
           <a:p>
@@ -16482,6 +16469,29 @@
               <a:rPr lang="en-US" dirty="0"/>
               <a:t>More …..</a:t>
             </a:r>
+          </a:p>
+        </p:txBody>
+      </p:sp>
+      <p:sp>
+        <p:nvSpPr>
+          <p:cNvPr id="5" name="Slide Number Placeholder 4"/>
+          <p:cNvSpPr>
+            <a:spLocks noGrp="1"/>
+          </p:cNvSpPr>
+          <p:nvPr>
+            <p:ph type="sldNum" sz="quarter" idx="12"/>
+          </p:nvPr>
+        </p:nvSpPr>
+        <p:spPr/>
+        <p:txBody>
+          <a:bodyPr/>
+          <a:lstStyle/>
+          <a:p>
+            <a:fld id="{7B7DB76D-28D5-4DAC-900A-A1330999554A}" type="slidenum">
+              <a:rPr lang="en-US" smtClean="0"/>
+              <a:t>19</a:t>
+            </a:fld>
+            <a:endParaRPr lang="en-US"/>
           </a:p>
         </p:txBody>
       </p:sp>
@@ -16492,7 +16502,7 @@
             <a:picLocks noGrp="1" noChangeAspect="1" noChangeArrowheads="1"/>
           </p:cNvPicPr>
           <p:nvPr>
-            <p:ph type="pic" idx="1"/>
+            <p:ph type="pic" idx="4294967295"/>
           </p:nvPr>
         </p:nvPicPr>
         <p:blipFill>
@@ -16510,8 +16520,8 @@
         </p:blipFill>
         <p:spPr bwMode="auto">
           <a:xfrm>
-            <a:off x="6138953" y="2619514"/>
-            <a:ext cx="5192899" cy="3628885"/>
+            <a:off x="6121042" y="505439"/>
+            <a:ext cx="4228999" cy="2955516"/>
           </a:xfrm>
           <a:prstGeom prst="rect">
             <a:avLst/>
@@ -16548,13 +16558,13 @@
             <a:spLocks noGrp="1"/>
           </p:cNvSpPr>
           <p:nvPr>
-            <p:ph type="body" sz="half" idx="2"/>
+            <p:ph type="body" sz="half" idx="4294967295"/>
           </p:nvPr>
         </p:nvSpPr>
         <p:spPr>
           <a:xfrm>
-            <a:off x="1141407" y="1124069"/>
-            <a:ext cx="7396537" cy="1363950"/>
+            <a:off x="442455" y="2625213"/>
+            <a:ext cx="4621157" cy="3726426"/>
           </a:xfrm>
         </p:spPr>
         <p:txBody>
@@ -16592,29 +16602,6 @@
           </a:p>
           <a:p>
             <a:endParaRPr lang="en-US" sz="2000" dirty="0"/>
-          </a:p>
-        </p:txBody>
-      </p:sp>
-      <p:sp>
-        <p:nvSpPr>
-          <p:cNvPr id="5" name="Slide Number Placeholder 4"/>
-          <p:cNvSpPr>
-            <a:spLocks noGrp="1"/>
-          </p:cNvSpPr>
-          <p:nvPr>
-            <p:ph type="sldNum" sz="quarter" idx="12"/>
-          </p:nvPr>
-        </p:nvSpPr>
-        <p:spPr/>
-        <p:txBody>
-          <a:bodyPr/>
-          <a:lstStyle/>
-          <a:p>
-            <a:fld id="{7B7DB76D-28D5-4DAC-900A-A1330999554A}" type="slidenum">
-              <a:rPr lang="en-US" smtClean="0"/>
-              <a:t>19</a:t>
-            </a:fld>
-            <a:endParaRPr lang="en-US"/>
           </a:p>
         </p:txBody>
       </p:sp>
@@ -16641,8 +16628,8 @@
         </p:blipFill>
         <p:spPr bwMode="auto">
           <a:xfrm>
-            <a:off x="1141407" y="2631566"/>
-            <a:ext cx="4543462" cy="3616833"/>
+            <a:off x="6056669" y="3470905"/>
+            <a:ext cx="4254865" cy="3387095"/>
           </a:xfrm>
           <a:prstGeom prst="rect">
             <a:avLst/>
@@ -16867,7 +16854,12 @@
             <p:ph idx="1"/>
           </p:nvPr>
         </p:nvSpPr>
-        <p:spPr/>
+        <p:spPr>
+          <a:xfrm>
+            <a:off x="1154954" y="2662492"/>
+            <a:ext cx="8825659" cy="3416300"/>
+          </a:xfrm>
+        </p:spPr>
         <p:txBody>
           <a:bodyPr>
             <a:normAutofit/>
@@ -17413,7 +17405,7 @@
         <p:spPr>
           <a:xfrm>
             <a:off x="129473" y="97816"/>
-            <a:ext cx="3356303" cy="523220"/>
+            <a:ext cx="4568879" cy="523220"/>
           </a:xfrm>
           <a:prstGeom prst="rect">
             <a:avLst/>
@@ -17428,8 +17420,13 @@
           <a:p>
             <a:r>
               <a:rPr lang="en-US" sz="2800" dirty="0"/>
-              <a:t>Testing a claim of bias</a:t>
-            </a:r>
+              <a:t>Testing a claim of </a:t>
+            </a:r>
+            <a:r>
+              <a:rPr lang="en-US" sz="2800" dirty="0" smtClean="0"/>
+              <a:t>bias [6]</a:t>
+            </a:r>
+            <a:endParaRPr lang="en-US" sz="2800" dirty="0"/>
           </a:p>
         </p:txBody>
       </p:sp>
@@ -17689,7 +17686,7 @@
                         <m:chr m:val="̅"/>
                         <m:ctrlPr>
                           <a:rPr lang="en-US" sz="1400" i="1" dirty="0" smtClean="0">
-                            <a:latin typeface="Cambria Math" panose="02040503050406030204" pitchFamily="18" charset="0"/>
+                            <a:latin typeface="Cambria Math" charset="0"/>
                           </a:rPr>
                         </m:ctrlPr>
                       </m:accPr>
@@ -17937,7 +17934,7 @@
                         <m:chr m:val="̅"/>
                         <m:ctrlPr>
                           <a:rPr lang="en-US" sz="1400" i="1" dirty="0" smtClean="0">
-                            <a:latin typeface="Cambria Math" panose="02040503050406030204" pitchFamily="18" charset="0"/>
+                            <a:latin typeface="Cambria Math" charset="0"/>
                           </a:rPr>
                         </m:ctrlPr>
                       </m:accPr>
@@ -19863,7 +19860,7 @@
         </p:nvSpPr>
         <p:spPr>
           <a:xfrm>
-            <a:off x="656094" y="2371723"/>
+            <a:off x="656094" y="2529039"/>
             <a:ext cx="11059656" cy="4152901"/>
           </a:xfrm>
           <a:prstGeom prst="rect">
@@ -20394,8 +20391,23 @@
             </a:pPr>
             <a:r>
               <a:rPr lang="en-US" dirty="0"/>
-              <a:t>R Code with supporting functions; MSDS7333-Case08-fx.</a:t>
-            </a:r>
+              <a:t>R Code with supporting functions; MSDS7333-Case08-fx</a:t>
+            </a:r>
+            <a:r>
+              <a:rPr lang="en-US" dirty="0" smtClean="0"/>
+              <a:t>.</a:t>
+            </a:r>
+          </a:p>
+          <a:p>
+            <a:pPr marL="457200" indent="-457200">
+              <a:buFont typeface="+mj-lt"/>
+              <a:buAutoNum type="arabicPeriod"/>
+            </a:pPr>
+            <a:r>
+              <a:rPr lang="en-US" dirty="0" smtClean="0"/>
+              <a:t>Excel Code for bias testing of race lottery.</a:t>
+            </a:r>
+            <a:endParaRPr lang="en-US" dirty="0"/>
           </a:p>
         </p:txBody>
       </p:sp>

</xml_diff>